<commit_message>
Last Update 18-12-2018 10:22:49.15
</commit_message>
<xml_diff>
--- a/Slides/GE8291-U1.pptx
+++ b/Slides/GE8291-U1.pptx
@@ -5,7 +5,7 @@
     <p:sldMasterId id="2147483648" r:id="rId1"/>
   </p:sldMasterIdLst>
   <p:notesMasterIdLst>
-    <p:notesMasterId r:id="rId27"/>
+    <p:notesMasterId r:id="rId29"/>
   </p:notesMasterIdLst>
   <p:sldIdLst>
     <p:sldId id="256" r:id="rId2"/>
@@ -32,7 +32,9 @@
     <p:sldId id="294" r:id="rId23"/>
     <p:sldId id="295" r:id="rId24"/>
     <p:sldId id="296" r:id="rId25"/>
-    <p:sldId id="272" r:id="rId26"/>
+    <p:sldId id="297" r:id="rId26"/>
+    <p:sldId id="298" r:id="rId27"/>
+    <p:sldId id="272" r:id="rId28"/>
   </p:sldIdLst>
   <p:sldSz cx="9144000" cy="6858000" type="screen4x3"/>
   <p:notesSz cx="6858000" cy="9144000"/>
@@ -2739,58 +2741,6 @@
         </dgm:presLayoutVars>
       </dgm:prSet>
       <dgm:spPr/>
-    </dgm:pt>
-    <dgm:pt modelId="{655FFEDE-2DCF-4852-8D19-40C478A3E988}" type="pres">
-      <dgm:prSet presAssocID="{62CD2F92-67D1-42F2-82D8-E44BA13F5871}" presName="hierRoot1" presStyleCnt="0">
-        <dgm:presLayoutVars>
-          <dgm:hierBranch val="init"/>
-        </dgm:presLayoutVars>
-      </dgm:prSet>
-      <dgm:spPr/>
-    </dgm:pt>
-    <dgm:pt modelId="{BAAD81C7-922A-43C5-AA07-7368CF9F9B1B}" type="pres">
-      <dgm:prSet presAssocID="{62CD2F92-67D1-42F2-82D8-E44BA13F5871}" presName="rootComposite1" presStyleCnt="0"/>
-      <dgm:spPr/>
-    </dgm:pt>
-    <dgm:pt modelId="{7C0DC374-EC83-4EF5-815B-8B4DB303D388}" type="pres">
-      <dgm:prSet presAssocID="{62CD2F92-67D1-42F2-82D8-E44BA13F5871}" presName="rootText1" presStyleLbl="node0" presStyleIdx="0" presStyleCnt="1">
-        <dgm:presLayoutVars>
-          <dgm:chPref val="3"/>
-        </dgm:presLayoutVars>
-      </dgm:prSet>
-      <dgm:spPr/>
-    </dgm:pt>
-    <dgm:pt modelId="{2FAB245F-D0EA-429A-B169-D396D0054243}" type="pres">
-      <dgm:prSet presAssocID="{62CD2F92-67D1-42F2-82D8-E44BA13F5871}" presName="rootConnector1" presStyleLbl="node1" presStyleIdx="0" presStyleCnt="0"/>
-      <dgm:spPr/>
-    </dgm:pt>
-    <dgm:pt modelId="{6999E2EA-3C1D-4AB5-B1A9-A341FCC08BF0}" type="pres">
-      <dgm:prSet presAssocID="{62CD2F92-67D1-42F2-82D8-E44BA13F5871}" presName="hierChild2" presStyleCnt="0"/>
-      <dgm:spPr/>
-    </dgm:pt>
-    <dgm:pt modelId="{649E9FC4-0653-44C7-9689-DC743DF91669}" type="pres">
-      <dgm:prSet presAssocID="{25F1C896-6120-4023-97DF-CA2B6F26AAAA}" presName="Name37" presStyleLbl="parChTrans1D2" presStyleIdx="0" presStyleCnt="2"/>
-      <dgm:spPr/>
-    </dgm:pt>
-    <dgm:pt modelId="{92408A05-4661-47A6-82A7-BD507245200C}" type="pres">
-      <dgm:prSet presAssocID="{9865DEC0-D025-4798-98A8-C46ABE87EC17}" presName="hierRoot2" presStyleCnt="0">
-        <dgm:presLayoutVars>
-          <dgm:hierBranch val="init"/>
-        </dgm:presLayoutVars>
-      </dgm:prSet>
-      <dgm:spPr/>
-    </dgm:pt>
-    <dgm:pt modelId="{30E35589-C06E-4889-B886-9C0218C7C69A}" type="pres">
-      <dgm:prSet presAssocID="{9865DEC0-D025-4798-98A8-C46ABE87EC17}" presName="rootComposite" presStyleCnt="0"/>
-      <dgm:spPr/>
-    </dgm:pt>
-    <dgm:pt modelId="{88DDF2EA-3960-4499-BD2D-E21BC3F5F746}" type="pres">
-      <dgm:prSet presAssocID="{9865DEC0-D025-4798-98A8-C46ABE87EC17}" presName="rootText" presStyleLbl="node2" presStyleIdx="0" presStyleCnt="2" custScaleX="156244">
-        <dgm:presLayoutVars>
-          <dgm:chPref val="3"/>
-        </dgm:presLayoutVars>
-      </dgm:prSet>
-      <dgm:spPr/>
       <dgm:t>
         <a:bodyPr/>
         <a:lstStyle/>
@@ -2799,32 +2749,20 @@
         </a:p>
       </dgm:t>
     </dgm:pt>
-    <dgm:pt modelId="{8B336876-CEEE-4B02-BC8D-9137E7F88973}" type="pres">
-      <dgm:prSet presAssocID="{9865DEC0-D025-4798-98A8-C46ABE87EC17}" presName="rootConnector" presStyleLbl="node2" presStyleIdx="0" presStyleCnt="2"/>
-      <dgm:spPr/>
-    </dgm:pt>
-    <dgm:pt modelId="{8DD88883-5EE6-4482-8CD2-56D0FDDB5690}" type="pres">
-      <dgm:prSet presAssocID="{9865DEC0-D025-4798-98A8-C46ABE87EC17}" presName="hierChild4" presStyleCnt="0"/>
-      <dgm:spPr/>
-    </dgm:pt>
-    <dgm:pt modelId="{72EDD89F-F6D4-4B35-988A-0EF5C924C88B}" type="pres">
-      <dgm:prSet presAssocID="{69C11C85-A3AC-4B3B-8603-00C0E053F7D0}" presName="Name37" presStyleLbl="parChTrans1D3" presStyleIdx="0" presStyleCnt="5"/>
-      <dgm:spPr/>
-    </dgm:pt>
-    <dgm:pt modelId="{215B5FAE-FB5A-4D1D-BACF-7F40815F683D}" type="pres">
-      <dgm:prSet presAssocID="{BF688012-A4AB-43BD-AD67-B342DA9EB1A1}" presName="hierRoot2" presStyleCnt="0">
+    <dgm:pt modelId="{655FFEDE-2DCF-4852-8D19-40C478A3E988}" type="pres">
+      <dgm:prSet presAssocID="{62CD2F92-67D1-42F2-82D8-E44BA13F5871}" presName="hierRoot1" presStyleCnt="0">
         <dgm:presLayoutVars>
           <dgm:hierBranch val="init"/>
         </dgm:presLayoutVars>
       </dgm:prSet>
       <dgm:spPr/>
     </dgm:pt>
-    <dgm:pt modelId="{CD318DA9-8C9C-4D57-9739-A43A099BB61D}" type="pres">
-      <dgm:prSet presAssocID="{BF688012-A4AB-43BD-AD67-B342DA9EB1A1}" presName="rootComposite" presStyleCnt="0"/>
-      <dgm:spPr/>
-    </dgm:pt>
-    <dgm:pt modelId="{54179FE0-E21E-468C-91A1-90D7E80FDCE3}" type="pres">
-      <dgm:prSet presAssocID="{BF688012-A4AB-43BD-AD67-B342DA9EB1A1}" presName="rootText" presStyleLbl="node3" presStyleIdx="0" presStyleCnt="5">
+    <dgm:pt modelId="{BAAD81C7-922A-43C5-AA07-7368CF9F9B1B}" type="pres">
+      <dgm:prSet presAssocID="{62CD2F92-67D1-42F2-82D8-E44BA13F5871}" presName="rootComposite1" presStyleCnt="0"/>
+      <dgm:spPr/>
+    </dgm:pt>
+    <dgm:pt modelId="{7C0DC374-EC83-4EF5-815B-8B4DB303D388}" type="pres">
+      <dgm:prSet presAssocID="{62CD2F92-67D1-42F2-82D8-E44BA13F5871}" presName="rootText1" presStyleLbl="node0" presStyleIdx="0" presStyleCnt="1">
         <dgm:presLayoutVars>
           <dgm:chPref val="3"/>
         </dgm:presLayoutVars>
@@ -2838,36 +2776,8 @@
         </a:p>
       </dgm:t>
     </dgm:pt>
-    <dgm:pt modelId="{66DC34A8-A7E5-4938-A3F2-D6902157BF3B}" type="pres">
-      <dgm:prSet presAssocID="{BF688012-A4AB-43BD-AD67-B342DA9EB1A1}" presName="rootConnector" presStyleLbl="node3" presStyleIdx="0" presStyleCnt="5"/>
-      <dgm:spPr/>
-    </dgm:pt>
-    <dgm:pt modelId="{B3D44583-C583-43B6-A394-860D2CE62203}" type="pres">
-      <dgm:prSet presAssocID="{BF688012-A4AB-43BD-AD67-B342DA9EB1A1}" presName="hierChild4" presStyleCnt="0"/>
-      <dgm:spPr/>
-    </dgm:pt>
-    <dgm:pt modelId="{A3AB63B1-6FF6-4CFE-BE56-37A3A8D2594D}" type="pres">
-      <dgm:prSet presAssocID="{80A001E8-4F9D-4E91-B59C-F2776E57C053}" presName="Name37" presStyleLbl="parChTrans1D4" presStyleIdx="0" presStyleCnt="10"/>
-      <dgm:spPr/>
-    </dgm:pt>
-    <dgm:pt modelId="{69EF91B3-4C2A-4E67-BCC9-7BAF7708B62D}" type="pres">
-      <dgm:prSet presAssocID="{6C6B25E2-10A9-4E80-85A1-564097713135}" presName="hierRoot2" presStyleCnt="0">
-        <dgm:presLayoutVars>
-          <dgm:hierBranch val="init"/>
-        </dgm:presLayoutVars>
-      </dgm:prSet>
-      <dgm:spPr/>
-    </dgm:pt>
-    <dgm:pt modelId="{6B9F6473-6333-4690-997F-486155B735DC}" type="pres">
-      <dgm:prSet presAssocID="{6C6B25E2-10A9-4E80-85A1-564097713135}" presName="rootComposite" presStyleCnt="0"/>
-      <dgm:spPr/>
-    </dgm:pt>
-    <dgm:pt modelId="{E4E57F41-042F-45A5-8D92-5723CFA79F87}" type="pres">
-      <dgm:prSet presAssocID="{6C6B25E2-10A9-4E80-85A1-564097713135}" presName="rootText" presStyleLbl="node4" presStyleIdx="0" presStyleCnt="10">
-        <dgm:presLayoutVars>
-          <dgm:chPref val="3"/>
-        </dgm:presLayoutVars>
-      </dgm:prSet>
+    <dgm:pt modelId="{2FAB245F-D0EA-429A-B169-D396D0054243}" type="pres">
+      <dgm:prSet presAssocID="{62CD2F92-67D1-42F2-82D8-E44BA13F5871}" presName="rootConnector1" presStyleLbl="node1" presStyleIdx="0" presStyleCnt="0"/>
       <dgm:spPr/>
       <dgm:t>
         <a:bodyPr/>
@@ -2877,152 +2787,12 @@
         </a:p>
       </dgm:t>
     </dgm:pt>
-    <dgm:pt modelId="{22AEF71C-1F6A-4A30-83ED-D0E222A1371D}" type="pres">
-      <dgm:prSet presAssocID="{6C6B25E2-10A9-4E80-85A1-564097713135}" presName="rootConnector" presStyleLbl="node4" presStyleIdx="0" presStyleCnt="10"/>
-      <dgm:spPr/>
-    </dgm:pt>
-    <dgm:pt modelId="{1783ACD0-E611-4899-A713-D8AF642DC7B8}" type="pres">
-      <dgm:prSet presAssocID="{6C6B25E2-10A9-4E80-85A1-564097713135}" presName="hierChild4" presStyleCnt="0"/>
-      <dgm:spPr/>
-    </dgm:pt>
-    <dgm:pt modelId="{0136CBB3-7AB6-47B2-A6C4-9DD91746F7C4}" type="pres">
-      <dgm:prSet presAssocID="{6C6B25E2-10A9-4E80-85A1-564097713135}" presName="hierChild5" presStyleCnt="0"/>
-      <dgm:spPr/>
-    </dgm:pt>
-    <dgm:pt modelId="{FDB13833-990D-41FB-8281-8DBC63378CDE}" type="pres">
-      <dgm:prSet presAssocID="{B3167CFE-AC5C-4306-ACF3-68303FC955E4}" presName="Name37" presStyleLbl="parChTrans1D4" presStyleIdx="1" presStyleCnt="10"/>
-      <dgm:spPr/>
-    </dgm:pt>
-    <dgm:pt modelId="{30816F05-29C5-4129-A639-1BF535F2B864}" type="pres">
-      <dgm:prSet presAssocID="{8C1B2657-5F7E-404A-8CE0-B4A07CF673E2}" presName="hierRoot2" presStyleCnt="0">
-        <dgm:presLayoutVars>
-          <dgm:hierBranch val="init"/>
-        </dgm:presLayoutVars>
-      </dgm:prSet>
-      <dgm:spPr/>
-    </dgm:pt>
-    <dgm:pt modelId="{9FE2AF0D-C333-47D8-92D1-CC58F01CAC9E}" type="pres">
-      <dgm:prSet presAssocID="{8C1B2657-5F7E-404A-8CE0-B4A07CF673E2}" presName="rootComposite" presStyleCnt="0"/>
-      <dgm:spPr/>
-    </dgm:pt>
-    <dgm:pt modelId="{5ECA00EF-B94E-4E22-A142-A63424C6E283}" type="pres">
-      <dgm:prSet presAssocID="{8C1B2657-5F7E-404A-8CE0-B4A07CF673E2}" presName="rootText" presStyleLbl="node4" presStyleIdx="1" presStyleCnt="10">
-        <dgm:presLayoutVars>
-          <dgm:chPref val="3"/>
-        </dgm:presLayoutVars>
-      </dgm:prSet>
-      <dgm:spPr/>
-    </dgm:pt>
-    <dgm:pt modelId="{8FE2F7CD-050B-453A-A061-F705FDBDBADC}" type="pres">
-      <dgm:prSet presAssocID="{8C1B2657-5F7E-404A-8CE0-B4A07CF673E2}" presName="rootConnector" presStyleLbl="node4" presStyleIdx="1" presStyleCnt="10"/>
-      <dgm:spPr/>
-    </dgm:pt>
-    <dgm:pt modelId="{F7B05C10-A967-4A96-8AFF-5447A22E4A62}" type="pres">
-      <dgm:prSet presAssocID="{8C1B2657-5F7E-404A-8CE0-B4A07CF673E2}" presName="hierChild4" presStyleCnt="0"/>
-      <dgm:spPr/>
-    </dgm:pt>
-    <dgm:pt modelId="{9770F9CD-6048-4A37-AED5-7A8584D1A904}" type="pres">
-      <dgm:prSet presAssocID="{8C1B2657-5F7E-404A-8CE0-B4A07CF673E2}" presName="hierChild5" presStyleCnt="0"/>
-      <dgm:spPr/>
-    </dgm:pt>
-    <dgm:pt modelId="{9DD49CB5-9275-460B-9C6B-CD2D60334277}" type="pres">
-      <dgm:prSet presAssocID="{E48B2AB6-26CB-4E1B-8B9F-1DC0CD81B351}" presName="Name37" presStyleLbl="parChTrans1D4" presStyleIdx="2" presStyleCnt="10"/>
-      <dgm:spPr/>
-    </dgm:pt>
-    <dgm:pt modelId="{AA4A8397-AB12-4570-9A38-97B27DF95C09}" type="pres">
-      <dgm:prSet presAssocID="{2173B93B-7E8D-4C49-AC97-64857F82749B}" presName="hierRoot2" presStyleCnt="0">
-        <dgm:presLayoutVars>
-          <dgm:hierBranch val="init"/>
-        </dgm:presLayoutVars>
-      </dgm:prSet>
-      <dgm:spPr/>
-    </dgm:pt>
-    <dgm:pt modelId="{8B0F16B4-361F-4939-A433-72C93DD802D1}" type="pres">
-      <dgm:prSet presAssocID="{2173B93B-7E8D-4C49-AC97-64857F82749B}" presName="rootComposite" presStyleCnt="0"/>
-      <dgm:spPr/>
-    </dgm:pt>
-    <dgm:pt modelId="{1A320179-1009-4B6D-954B-90BC43F13266}" type="pres">
-      <dgm:prSet presAssocID="{2173B93B-7E8D-4C49-AC97-64857F82749B}" presName="rootText" presStyleLbl="node4" presStyleIdx="2" presStyleCnt="10">
-        <dgm:presLayoutVars>
-          <dgm:chPref val="3"/>
-        </dgm:presLayoutVars>
-      </dgm:prSet>
-      <dgm:spPr/>
-    </dgm:pt>
-    <dgm:pt modelId="{9253B386-F021-43BE-BAEC-A09FD83909F6}" type="pres">
-      <dgm:prSet presAssocID="{2173B93B-7E8D-4C49-AC97-64857F82749B}" presName="rootConnector" presStyleLbl="node4" presStyleIdx="2" presStyleCnt="10"/>
-      <dgm:spPr/>
-    </dgm:pt>
-    <dgm:pt modelId="{B6EBD99A-FFEA-4ECC-BF83-96DD50BC8B5C}" type="pres">
-      <dgm:prSet presAssocID="{2173B93B-7E8D-4C49-AC97-64857F82749B}" presName="hierChild4" presStyleCnt="0"/>
-      <dgm:spPr/>
-    </dgm:pt>
-    <dgm:pt modelId="{336226EB-BF8D-4DE2-B858-ECA58F5CE4A9}" type="pres">
-      <dgm:prSet presAssocID="{2173B93B-7E8D-4C49-AC97-64857F82749B}" presName="hierChild5" presStyleCnt="0"/>
-      <dgm:spPr/>
-    </dgm:pt>
-    <dgm:pt modelId="{CA65C09C-229D-4D64-B2FD-89469AA9897A}" type="pres">
-      <dgm:prSet presAssocID="{3872A134-C573-43E3-90EC-1CD53F585656}" presName="Name37" presStyleLbl="parChTrans1D4" presStyleIdx="3" presStyleCnt="10"/>
-      <dgm:spPr/>
-    </dgm:pt>
-    <dgm:pt modelId="{000ACA4F-F856-4693-901D-8640660F55E8}" type="pres">
-      <dgm:prSet presAssocID="{EF231D0F-4B8A-47EF-9993-CF9E4EC9FDAD}" presName="hierRoot2" presStyleCnt="0">
-        <dgm:presLayoutVars>
-          <dgm:hierBranch val="init"/>
-        </dgm:presLayoutVars>
-      </dgm:prSet>
-      <dgm:spPr/>
-    </dgm:pt>
-    <dgm:pt modelId="{03C070C8-1699-444C-BBA5-5C0C89EA89AD}" type="pres">
-      <dgm:prSet presAssocID="{EF231D0F-4B8A-47EF-9993-CF9E4EC9FDAD}" presName="rootComposite" presStyleCnt="0"/>
-      <dgm:spPr/>
-    </dgm:pt>
-    <dgm:pt modelId="{95E08B68-777F-4D00-8FCB-A8680867E0C0}" type="pres">
-      <dgm:prSet presAssocID="{EF231D0F-4B8A-47EF-9993-CF9E4EC9FDAD}" presName="rootText" presStyleLbl="node4" presStyleIdx="3" presStyleCnt="10" custScaleX="139530">
-        <dgm:presLayoutVars>
-          <dgm:chPref val="3"/>
-        </dgm:presLayoutVars>
-      </dgm:prSet>
-      <dgm:spPr/>
-    </dgm:pt>
-    <dgm:pt modelId="{C36626A7-CAC8-4F7D-B4FF-5D99259F655E}" type="pres">
-      <dgm:prSet presAssocID="{EF231D0F-4B8A-47EF-9993-CF9E4EC9FDAD}" presName="rootConnector" presStyleLbl="node4" presStyleIdx="3" presStyleCnt="10"/>
-      <dgm:spPr/>
-    </dgm:pt>
-    <dgm:pt modelId="{F3335808-7EF0-447B-B5DD-0A191B282F87}" type="pres">
-      <dgm:prSet presAssocID="{EF231D0F-4B8A-47EF-9993-CF9E4EC9FDAD}" presName="hierChild4" presStyleCnt="0"/>
-      <dgm:spPr/>
-    </dgm:pt>
-    <dgm:pt modelId="{65F0ACF3-EE42-4FE7-A144-23C0CD9EBDDA}" type="pres">
-      <dgm:prSet presAssocID="{EF231D0F-4B8A-47EF-9993-CF9E4EC9FDAD}" presName="hierChild5" presStyleCnt="0"/>
-      <dgm:spPr/>
-    </dgm:pt>
-    <dgm:pt modelId="{B8A4DAC1-AD02-46DB-99E6-14CCF4FE9D4E}" type="pres">
-      <dgm:prSet presAssocID="{BF688012-A4AB-43BD-AD67-B342DA9EB1A1}" presName="hierChild5" presStyleCnt="0"/>
-      <dgm:spPr/>
-    </dgm:pt>
-    <dgm:pt modelId="{48114D2C-411D-468B-8557-F6099245D351}" type="pres">
-      <dgm:prSet presAssocID="{5678B143-443A-4963-9137-479830FB38DB}" presName="Name37" presStyleLbl="parChTrans1D3" presStyleIdx="1" presStyleCnt="5"/>
-      <dgm:spPr/>
-    </dgm:pt>
-    <dgm:pt modelId="{CD95494D-23D8-422F-8553-E6DFFDB0B050}" type="pres">
-      <dgm:prSet presAssocID="{E001767D-6D35-4A6C-B9A6-7740121562D5}" presName="hierRoot2" presStyleCnt="0">
-        <dgm:presLayoutVars>
-          <dgm:hierBranch val="init"/>
-        </dgm:presLayoutVars>
-      </dgm:prSet>
-      <dgm:spPr/>
-    </dgm:pt>
-    <dgm:pt modelId="{20BEE6F9-CBBF-4FA3-952E-932EB3A79015}" type="pres">
-      <dgm:prSet presAssocID="{E001767D-6D35-4A6C-B9A6-7740121562D5}" presName="rootComposite" presStyleCnt="0"/>
-      <dgm:spPr/>
-    </dgm:pt>
-    <dgm:pt modelId="{566A6DF9-374F-4469-AD40-0EC0C4A60C2C}" type="pres">
-      <dgm:prSet presAssocID="{E001767D-6D35-4A6C-B9A6-7740121562D5}" presName="rootText" presStyleLbl="node3" presStyleIdx="1" presStyleCnt="5">
-        <dgm:presLayoutVars>
-          <dgm:chPref val="3"/>
-        </dgm:presLayoutVars>
-      </dgm:prSet>
+    <dgm:pt modelId="{6999E2EA-3C1D-4AB5-B1A9-A341FCC08BF0}" type="pres">
+      <dgm:prSet presAssocID="{62CD2F92-67D1-42F2-82D8-E44BA13F5871}" presName="hierChild2" presStyleCnt="0"/>
+      <dgm:spPr/>
+    </dgm:pt>
+    <dgm:pt modelId="{649E9FC4-0653-44C7-9689-DC743DF91669}" type="pres">
+      <dgm:prSet presAssocID="{25F1C896-6120-4023-97DF-CA2B6F26AAAA}" presName="Name37" presStyleLbl="parChTrans1D2" presStyleIdx="0" presStyleCnt="2"/>
       <dgm:spPr/>
       <dgm:t>
         <a:bodyPr/>
@@ -3032,32 +2802,20 @@
         </a:p>
       </dgm:t>
     </dgm:pt>
-    <dgm:pt modelId="{5106A322-C110-4F01-A3A7-4696D1FB2F75}" type="pres">
-      <dgm:prSet presAssocID="{E001767D-6D35-4A6C-B9A6-7740121562D5}" presName="rootConnector" presStyleLbl="node3" presStyleIdx="1" presStyleCnt="5"/>
-      <dgm:spPr/>
-    </dgm:pt>
-    <dgm:pt modelId="{C136FE72-BD20-464E-AD4D-3744D369415B}" type="pres">
-      <dgm:prSet presAssocID="{E001767D-6D35-4A6C-B9A6-7740121562D5}" presName="hierChild4" presStyleCnt="0"/>
-      <dgm:spPr/>
-    </dgm:pt>
-    <dgm:pt modelId="{CF8A37F1-7162-499F-BFFD-EF955C673C25}" type="pres">
-      <dgm:prSet presAssocID="{A004CB57-A062-4ED3-801D-E645530CAD54}" presName="Name37" presStyleLbl="parChTrans1D4" presStyleIdx="4" presStyleCnt="10"/>
-      <dgm:spPr/>
-    </dgm:pt>
-    <dgm:pt modelId="{4B66F780-95F6-4B5B-8155-831546DCA988}" type="pres">
-      <dgm:prSet presAssocID="{083F4181-BB32-437B-9476-74609C2591A2}" presName="hierRoot2" presStyleCnt="0">
+    <dgm:pt modelId="{92408A05-4661-47A6-82A7-BD507245200C}" type="pres">
+      <dgm:prSet presAssocID="{9865DEC0-D025-4798-98A8-C46ABE87EC17}" presName="hierRoot2" presStyleCnt="0">
         <dgm:presLayoutVars>
           <dgm:hierBranch val="init"/>
         </dgm:presLayoutVars>
       </dgm:prSet>
       <dgm:spPr/>
     </dgm:pt>
-    <dgm:pt modelId="{9C8364FF-D6E1-457C-A6D0-156B3BBD913D}" type="pres">
-      <dgm:prSet presAssocID="{083F4181-BB32-437B-9476-74609C2591A2}" presName="rootComposite" presStyleCnt="0"/>
-      <dgm:spPr/>
-    </dgm:pt>
-    <dgm:pt modelId="{A6D4204E-923B-47BE-9AA1-5A46215F12C5}" type="pres">
-      <dgm:prSet presAssocID="{083F4181-BB32-437B-9476-74609C2591A2}" presName="rootText" presStyleLbl="node4" presStyleIdx="4" presStyleCnt="10">
+    <dgm:pt modelId="{30E35589-C06E-4889-B886-9C0218C7C69A}" type="pres">
+      <dgm:prSet presAssocID="{9865DEC0-D025-4798-98A8-C46ABE87EC17}" presName="rootComposite" presStyleCnt="0"/>
+      <dgm:spPr/>
+    </dgm:pt>
+    <dgm:pt modelId="{88DDF2EA-3960-4499-BD2D-E21BC3F5F746}" type="pres">
+      <dgm:prSet presAssocID="{9865DEC0-D025-4798-98A8-C46ABE87EC17}" presName="rootText" presStyleLbl="node2" presStyleIdx="0" presStyleCnt="2" custScaleX="156244">
         <dgm:presLayoutVars>
           <dgm:chPref val="3"/>
         </dgm:presLayoutVars>
@@ -3071,152 +2829,8 @@
         </a:p>
       </dgm:t>
     </dgm:pt>
-    <dgm:pt modelId="{FF785875-DC96-4A01-A6B2-EA63D58F4FEB}" type="pres">
-      <dgm:prSet presAssocID="{083F4181-BB32-437B-9476-74609C2591A2}" presName="rootConnector" presStyleLbl="node4" presStyleIdx="4" presStyleCnt="10"/>
-      <dgm:spPr/>
-    </dgm:pt>
-    <dgm:pt modelId="{3F4DBC68-3955-4D5A-B2A3-8EC16A5C92E5}" type="pres">
-      <dgm:prSet presAssocID="{083F4181-BB32-437B-9476-74609C2591A2}" presName="hierChild4" presStyleCnt="0"/>
-      <dgm:spPr/>
-    </dgm:pt>
-    <dgm:pt modelId="{53B98020-580D-4734-AB79-08C9D22D16C6}" type="pres">
-      <dgm:prSet presAssocID="{083F4181-BB32-437B-9476-74609C2591A2}" presName="hierChild5" presStyleCnt="0"/>
-      <dgm:spPr/>
-    </dgm:pt>
-    <dgm:pt modelId="{5339DA53-2B94-40C5-A189-1BD162D72DA8}" type="pres">
-      <dgm:prSet presAssocID="{5343FAF3-3C83-4C8E-896F-6FCFE89ADDF5}" presName="Name37" presStyleLbl="parChTrans1D4" presStyleIdx="5" presStyleCnt="10"/>
-      <dgm:spPr/>
-    </dgm:pt>
-    <dgm:pt modelId="{C5F10E29-E35F-42FE-BDDF-670A8E7CB976}" type="pres">
-      <dgm:prSet presAssocID="{3F15C59F-F17C-45CC-9D61-F0735F2ABC44}" presName="hierRoot2" presStyleCnt="0">
-        <dgm:presLayoutVars>
-          <dgm:hierBranch val="init"/>
-        </dgm:presLayoutVars>
-      </dgm:prSet>
-      <dgm:spPr/>
-    </dgm:pt>
-    <dgm:pt modelId="{24188A5B-6D47-48CB-8B2A-78484FBC45AC}" type="pres">
-      <dgm:prSet presAssocID="{3F15C59F-F17C-45CC-9D61-F0735F2ABC44}" presName="rootComposite" presStyleCnt="0"/>
-      <dgm:spPr/>
-    </dgm:pt>
-    <dgm:pt modelId="{323A37B4-C59E-4A21-B72C-90DA273EA45B}" type="pres">
-      <dgm:prSet presAssocID="{3F15C59F-F17C-45CC-9D61-F0735F2ABC44}" presName="rootText" presStyleLbl="node4" presStyleIdx="5" presStyleCnt="10">
-        <dgm:presLayoutVars>
-          <dgm:chPref val="3"/>
-        </dgm:presLayoutVars>
-      </dgm:prSet>
-      <dgm:spPr/>
-    </dgm:pt>
-    <dgm:pt modelId="{CDA672C7-E272-4507-A580-7D8912352F83}" type="pres">
-      <dgm:prSet presAssocID="{3F15C59F-F17C-45CC-9D61-F0735F2ABC44}" presName="rootConnector" presStyleLbl="node4" presStyleIdx="5" presStyleCnt="10"/>
-      <dgm:spPr/>
-    </dgm:pt>
-    <dgm:pt modelId="{EF04B3BD-9444-4B0C-923B-EBB95F86EABE}" type="pres">
-      <dgm:prSet presAssocID="{3F15C59F-F17C-45CC-9D61-F0735F2ABC44}" presName="hierChild4" presStyleCnt="0"/>
-      <dgm:spPr/>
-    </dgm:pt>
-    <dgm:pt modelId="{FD078B60-DE11-4B38-ABB9-7A370AFADB0F}" type="pres">
-      <dgm:prSet presAssocID="{3F15C59F-F17C-45CC-9D61-F0735F2ABC44}" presName="hierChild5" presStyleCnt="0"/>
-      <dgm:spPr/>
-    </dgm:pt>
-    <dgm:pt modelId="{150BD734-8A8C-4C28-8AC3-2FDF05FFC52F}" type="pres">
-      <dgm:prSet presAssocID="{B8C29E49-2928-48E6-80EB-7F706E7FC5DD}" presName="Name37" presStyleLbl="parChTrans1D4" presStyleIdx="6" presStyleCnt="10"/>
-      <dgm:spPr/>
-    </dgm:pt>
-    <dgm:pt modelId="{5C1F7831-8C09-4A8A-AD50-40F9858D240F}" type="pres">
-      <dgm:prSet presAssocID="{3930C99B-97E6-4BDF-B18D-85EE3E6D3C40}" presName="hierRoot2" presStyleCnt="0">
-        <dgm:presLayoutVars>
-          <dgm:hierBranch val="init"/>
-        </dgm:presLayoutVars>
-      </dgm:prSet>
-      <dgm:spPr/>
-    </dgm:pt>
-    <dgm:pt modelId="{1F9C8C90-A0BB-4DB9-A971-AE5DB7D4E8FB}" type="pres">
-      <dgm:prSet presAssocID="{3930C99B-97E6-4BDF-B18D-85EE3E6D3C40}" presName="rootComposite" presStyleCnt="0"/>
-      <dgm:spPr/>
-    </dgm:pt>
-    <dgm:pt modelId="{579AFED9-5216-4D3E-8327-8AF77B1E3E0E}" type="pres">
-      <dgm:prSet presAssocID="{3930C99B-97E6-4BDF-B18D-85EE3E6D3C40}" presName="rootText" presStyleLbl="node4" presStyleIdx="6" presStyleCnt="10">
-        <dgm:presLayoutVars>
-          <dgm:chPref val="3"/>
-        </dgm:presLayoutVars>
-      </dgm:prSet>
-      <dgm:spPr/>
-    </dgm:pt>
-    <dgm:pt modelId="{3E36BB7F-DE5E-4BC7-91AE-BD47FBF73405}" type="pres">
-      <dgm:prSet presAssocID="{3930C99B-97E6-4BDF-B18D-85EE3E6D3C40}" presName="rootConnector" presStyleLbl="node4" presStyleIdx="6" presStyleCnt="10"/>
-      <dgm:spPr/>
-    </dgm:pt>
-    <dgm:pt modelId="{F0B48898-49A9-4812-AD29-2166FED1A4C9}" type="pres">
-      <dgm:prSet presAssocID="{3930C99B-97E6-4BDF-B18D-85EE3E6D3C40}" presName="hierChild4" presStyleCnt="0"/>
-      <dgm:spPr/>
-    </dgm:pt>
-    <dgm:pt modelId="{673E4CB2-5E43-4E56-932F-AF87B90C7C81}" type="pres">
-      <dgm:prSet presAssocID="{3930C99B-97E6-4BDF-B18D-85EE3E6D3C40}" presName="hierChild5" presStyleCnt="0"/>
-      <dgm:spPr/>
-    </dgm:pt>
-    <dgm:pt modelId="{F5279349-0B37-428B-8EA3-4D04D7543E2F}" type="pres">
-      <dgm:prSet presAssocID="{E001767D-6D35-4A6C-B9A6-7740121562D5}" presName="hierChild5" presStyleCnt="0"/>
-      <dgm:spPr/>
-    </dgm:pt>
-    <dgm:pt modelId="{4AD4F881-E327-4B53-9165-06AA92328090}" type="pres">
-      <dgm:prSet presAssocID="{9865DEC0-D025-4798-98A8-C46ABE87EC17}" presName="hierChild5" presStyleCnt="0"/>
-      <dgm:spPr/>
-    </dgm:pt>
-    <dgm:pt modelId="{16D09170-3A44-4A74-89DF-E76112F215EE}" type="pres">
-      <dgm:prSet presAssocID="{2CAB26BC-C5D9-46DC-A754-0BC5C13823DA}" presName="Name37" presStyleLbl="parChTrans1D2" presStyleIdx="1" presStyleCnt="2"/>
-      <dgm:spPr/>
-    </dgm:pt>
-    <dgm:pt modelId="{CE30B49F-C12F-427F-BB1E-C58986CB09D3}" type="pres">
-      <dgm:prSet presAssocID="{A07C290F-AC18-4321-8B25-D3221D0E84C9}" presName="hierRoot2" presStyleCnt="0">
-        <dgm:presLayoutVars>
-          <dgm:hierBranch val="init"/>
-        </dgm:presLayoutVars>
-      </dgm:prSet>
-      <dgm:spPr/>
-    </dgm:pt>
-    <dgm:pt modelId="{94F9E6C9-71EC-4647-9E45-542F009FC51E}" type="pres">
-      <dgm:prSet presAssocID="{A07C290F-AC18-4321-8B25-D3221D0E84C9}" presName="rootComposite" presStyleCnt="0"/>
-      <dgm:spPr/>
-    </dgm:pt>
-    <dgm:pt modelId="{7671796F-ADCE-4E28-92EA-923FC010BB66}" type="pres">
-      <dgm:prSet presAssocID="{A07C290F-AC18-4321-8B25-D3221D0E84C9}" presName="rootText" presStyleLbl="node2" presStyleIdx="1" presStyleCnt="2" custScaleX="202839">
-        <dgm:presLayoutVars>
-          <dgm:chPref val="3"/>
-        </dgm:presLayoutVars>
-      </dgm:prSet>
-      <dgm:spPr/>
-    </dgm:pt>
-    <dgm:pt modelId="{332A815B-B084-4882-AF9F-5D502D65535B}" type="pres">
-      <dgm:prSet presAssocID="{A07C290F-AC18-4321-8B25-D3221D0E84C9}" presName="rootConnector" presStyleLbl="node2" presStyleIdx="1" presStyleCnt="2"/>
-      <dgm:spPr/>
-    </dgm:pt>
-    <dgm:pt modelId="{661FF34E-72E4-4593-AF3E-C3E1B37A3069}" type="pres">
-      <dgm:prSet presAssocID="{A07C290F-AC18-4321-8B25-D3221D0E84C9}" presName="hierChild4" presStyleCnt="0"/>
-      <dgm:spPr/>
-    </dgm:pt>
-    <dgm:pt modelId="{6AD2365B-3588-4178-8141-6BFB42A34A66}" type="pres">
-      <dgm:prSet presAssocID="{5277690B-52E9-4875-9F8A-83396E7C12A6}" presName="Name37" presStyleLbl="parChTrans1D3" presStyleIdx="2" presStyleCnt="5"/>
-      <dgm:spPr/>
-    </dgm:pt>
-    <dgm:pt modelId="{866F4F71-C8E4-4E12-8B89-C10852A8381B}" type="pres">
-      <dgm:prSet presAssocID="{7620FD18-4838-4468-B172-A6B784463028}" presName="hierRoot2" presStyleCnt="0">
-        <dgm:presLayoutVars>
-          <dgm:hierBranch val="init"/>
-        </dgm:presLayoutVars>
-      </dgm:prSet>
-      <dgm:spPr/>
-    </dgm:pt>
-    <dgm:pt modelId="{FD139EF3-FF31-41E4-9FD1-E87E8CF8BEE7}" type="pres">
-      <dgm:prSet presAssocID="{7620FD18-4838-4468-B172-A6B784463028}" presName="rootComposite" presStyleCnt="0"/>
-      <dgm:spPr/>
-    </dgm:pt>
-    <dgm:pt modelId="{C24A5D1C-BC85-4C9C-8130-21B624143549}" type="pres">
-      <dgm:prSet presAssocID="{7620FD18-4838-4468-B172-A6B784463028}" presName="rootText" presStyleLbl="node3" presStyleIdx="2" presStyleCnt="5">
-        <dgm:presLayoutVars>
-          <dgm:chPref val="3"/>
-        </dgm:presLayoutVars>
-      </dgm:prSet>
+    <dgm:pt modelId="{8B336876-CEEE-4B02-BC8D-9137E7F88973}" type="pres">
+      <dgm:prSet presAssocID="{9865DEC0-D025-4798-98A8-C46ABE87EC17}" presName="rootConnector" presStyleLbl="node2" presStyleIdx="0" presStyleCnt="2"/>
       <dgm:spPr/>
       <dgm:t>
         <a:bodyPr/>
@@ -3226,72 +2840,12 @@
         </a:p>
       </dgm:t>
     </dgm:pt>
-    <dgm:pt modelId="{5A6678EB-7128-4F8F-B047-B26E028C719D}" type="pres">
-      <dgm:prSet presAssocID="{7620FD18-4838-4468-B172-A6B784463028}" presName="rootConnector" presStyleLbl="node3" presStyleIdx="2" presStyleCnt="5"/>
-      <dgm:spPr/>
-    </dgm:pt>
-    <dgm:pt modelId="{98B27B02-3D96-482B-98C3-B9B402B65761}" type="pres">
-      <dgm:prSet presAssocID="{7620FD18-4838-4468-B172-A6B784463028}" presName="hierChild4" presStyleCnt="0"/>
-      <dgm:spPr/>
-    </dgm:pt>
-    <dgm:pt modelId="{5DC64FC6-CB20-476E-B164-24B6A0F0BAB1}" type="pres">
-      <dgm:prSet presAssocID="{7620FD18-4838-4468-B172-A6B784463028}" presName="hierChild5" presStyleCnt="0"/>
-      <dgm:spPr/>
-    </dgm:pt>
-    <dgm:pt modelId="{D4531E96-6B31-4849-8709-2602F0648367}" type="pres">
-      <dgm:prSet presAssocID="{E1D4F0F6-B5AA-4085-B5D2-D8B40B0A7442}" presName="Name37" presStyleLbl="parChTrans1D3" presStyleIdx="3" presStyleCnt="5"/>
-      <dgm:spPr/>
-    </dgm:pt>
-    <dgm:pt modelId="{90950F4E-5256-485B-BD59-D0DA03AD24E6}" type="pres">
-      <dgm:prSet presAssocID="{7A3C7205-EAAC-4B5D-915D-5FE855339856}" presName="hierRoot2" presStyleCnt="0">
-        <dgm:presLayoutVars>
-          <dgm:hierBranch val="init"/>
-        </dgm:presLayoutVars>
-      </dgm:prSet>
-      <dgm:spPr/>
-    </dgm:pt>
-    <dgm:pt modelId="{B08C7B81-24CC-4585-8595-BBE819D2266D}" type="pres">
-      <dgm:prSet presAssocID="{7A3C7205-EAAC-4B5D-915D-5FE855339856}" presName="rootComposite" presStyleCnt="0"/>
-      <dgm:spPr/>
-    </dgm:pt>
-    <dgm:pt modelId="{B226F02C-62A4-4448-AA42-E9BB76D7873B}" type="pres">
-      <dgm:prSet presAssocID="{7A3C7205-EAAC-4B5D-915D-5FE855339856}" presName="rootText" presStyleLbl="node3" presStyleIdx="3" presStyleCnt="5">
-        <dgm:presLayoutVars>
-          <dgm:chPref val="3"/>
-        </dgm:presLayoutVars>
-      </dgm:prSet>
-      <dgm:spPr/>
-    </dgm:pt>
-    <dgm:pt modelId="{86FA19A9-1844-48D1-BBD0-A64C22FC1AC1}" type="pres">
-      <dgm:prSet presAssocID="{7A3C7205-EAAC-4B5D-915D-5FE855339856}" presName="rootConnector" presStyleLbl="node3" presStyleIdx="3" presStyleCnt="5"/>
-      <dgm:spPr/>
-    </dgm:pt>
-    <dgm:pt modelId="{9E934FE1-D7A3-465D-953C-1965D22E6FB4}" type="pres">
-      <dgm:prSet presAssocID="{7A3C7205-EAAC-4B5D-915D-5FE855339856}" presName="hierChild4" presStyleCnt="0"/>
-      <dgm:spPr/>
-    </dgm:pt>
-    <dgm:pt modelId="{06F6250B-A68A-44D4-82E8-AB48F93939B5}" type="pres">
-      <dgm:prSet presAssocID="{75CC2F58-C17C-43C3-AFAD-B96D79B02C9C}" presName="Name37" presStyleLbl="parChTrans1D4" presStyleIdx="7" presStyleCnt="10"/>
-      <dgm:spPr/>
-    </dgm:pt>
-    <dgm:pt modelId="{54D0682F-43BF-4D89-9A7A-CE96468BBF1C}" type="pres">
-      <dgm:prSet presAssocID="{FEB668BB-EAB8-415D-B6CF-CA5219B9B56B}" presName="hierRoot2" presStyleCnt="0">
-        <dgm:presLayoutVars>
-          <dgm:hierBranch val="init"/>
-        </dgm:presLayoutVars>
-      </dgm:prSet>
-      <dgm:spPr/>
-    </dgm:pt>
-    <dgm:pt modelId="{336A230D-E688-4EA1-92DC-26ED5B80421C}" type="pres">
-      <dgm:prSet presAssocID="{FEB668BB-EAB8-415D-B6CF-CA5219B9B56B}" presName="rootComposite" presStyleCnt="0"/>
-      <dgm:spPr/>
-    </dgm:pt>
-    <dgm:pt modelId="{A0185BAE-3C86-4B5B-97B5-8EDFBB0BC9DD}" type="pres">
-      <dgm:prSet presAssocID="{FEB668BB-EAB8-415D-B6CF-CA5219B9B56B}" presName="rootText" presStyleLbl="node4" presStyleIdx="7" presStyleCnt="10">
-        <dgm:presLayoutVars>
-          <dgm:chPref val="3"/>
-        </dgm:presLayoutVars>
-      </dgm:prSet>
+    <dgm:pt modelId="{8DD88883-5EE6-4482-8CD2-56D0FDDB5690}" type="pres">
+      <dgm:prSet presAssocID="{9865DEC0-D025-4798-98A8-C46ABE87EC17}" presName="hierChild4" presStyleCnt="0"/>
+      <dgm:spPr/>
+    </dgm:pt>
+    <dgm:pt modelId="{72EDD89F-F6D4-4B35-988A-0EF5C924C88B}" type="pres">
+      <dgm:prSet presAssocID="{69C11C85-A3AC-4B3B-8603-00C0E053F7D0}" presName="Name37" presStyleLbl="parChTrans1D3" presStyleIdx="0" presStyleCnt="5"/>
       <dgm:spPr/>
       <dgm:t>
         <a:bodyPr/>
@@ -3301,112 +2855,20 @@
         </a:p>
       </dgm:t>
     </dgm:pt>
-    <dgm:pt modelId="{699F2A82-D7E3-40C9-896A-33AC22BC8E58}" type="pres">
-      <dgm:prSet presAssocID="{FEB668BB-EAB8-415D-B6CF-CA5219B9B56B}" presName="rootConnector" presStyleLbl="node4" presStyleIdx="7" presStyleCnt="10"/>
-      <dgm:spPr/>
-    </dgm:pt>
-    <dgm:pt modelId="{49FB919D-A6A7-4056-875D-052624D640C6}" type="pres">
-      <dgm:prSet presAssocID="{FEB668BB-EAB8-415D-B6CF-CA5219B9B56B}" presName="hierChild4" presStyleCnt="0"/>
-      <dgm:spPr/>
-    </dgm:pt>
-    <dgm:pt modelId="{7FA85D27-9128-4BE8-A7C9-C6CAE9ECCF19}" type="pres">
-      <dgm:prSet presAssocID="{FEB668BB-EAB8-415D-B6CF-CA5219B9B56B}" presName="hierChild5" presStyleCnt="0"/>
-      <dgm:spPr/>
-    </dgm:pt>
-    <dgm:pt modelId="{2A389793-3294-4BF8-92AF-66E45906D15D}" type="pres">
-      <dgm:prSet presAssocID="{5F1C10C6-36CC-4703-9733-4BACC3DE4EA5}" presName="Name37" presStyleLbl="parChTrans1D4" presStyleIdx="8" presStyleCnt="10"/>
-      <dgm:spPr/>
-    </dgm:pt>
-    <dgm:pt modelId="{21698F3F-6E9D-42F7-867B-204B46F004E9}" type="pres">
-      <dgm:prSet presAssocID="{90BCFBA6-F895-4CE3-AD64-DF9E61328D90}" presName="hierRoot2" presStyleCnt="0">
+    <dgm:pt modelId="{215B5FAE-FB5A-4D1D-BACF-7F40815F683D}" type="pres">
+      <dgm:prSet presAssocID="{BF688012-A4AB-43BD-AD67-B342DA9EB1A1}" presName="hierRoot2" presStyleCnt="0">
         <dgm:presLayoutVars>
           <dgm:hierBranch val="init"/>
         </dgm:presLayoutVars>
       </dgm:prSet>
       <dgm:spPr/>
     </dgm:pt>
-    <dgm:pt modelId="{8E8E9C92-6A59-4501-A540-E34551FD0F07}" type="pres">
-      <dgm:prSet presAssocID="{90BCFBA6-F895-4CE3-AD64-DF9E61328D90}" presName="rootComposite" presStyleCnt="0"/>
-      <dgm:spPr/>
-    </dgm:pt>
-    <dgm:pt modelId="{5BCC797F-6BB1-4070-B9FD-B195C913EED0}" type="pres">
-      <dgm:prSet presAssocID="{90BCFBA6-F895-4CE3-AD64-DF9E61328D90}" presName="rootText" presStyleLbl="node4" presStyleIdx="8" presStyleCnt="10">
-        <dgm:presLayoutVars>
-          <dgm:chPref val="3"/>
-        </dgm:presLayoutVars>
-      </dgm:prSet>
-      <dgm:spPr/>
-    </dgm:pt>
-    <dgm:pt modelId="{D2BA3124-902C-4BDC-B6A4-88FC64AEE88C}" type="pres">
-      <dgm:prSet presAssocID="{90BCFBA6-F895-4CE3-AD64-DF9E61328D90}" presName="rootConnector" presStyleLbl="node4" presStyleIdx="8" presStyleCnt="10"/>
-      <dgm:spPr/>
-    </dgm:pt>
-    <dgm:pt modelId="{6C51A3CC-4E29-4A19-BA3E-0AA869AF9CEE}" type="pres">
-      <dgm:prSet presAssocID="{90BCFBA6-F895-4CE3-AD64-DF9E61328D90}" presName="hierChild4" presStyleCnt="0"/>
-      <dgm:spPr/>
-    </dgm:pt>
-    <dgm:pt modelId="{B474A36A-279D-4C92-9D26-41BC1F9BD140}" type="pres">
-      <dgm:prSet presAssocID="{90BCFBA6-F895-4CE3-AD64-DF9E61328D90}" presName="hierChild5" presStyleCnt="0"/>
-      <dgm:spPr/>
-    </dgm:pt>
-    <dgm:pt modelId="{EE0106A1-E5B1-42CF-ACE6-D4517C63B683}" type="pres">
-      <dgm:prSet presAssocID="{FE956D94-D05D-4D03-8567-4FE224FFC262}" presName="Name37" presStyleLbl="parChTrans1D4" presStyleIdx="9" presStyleCnt="10"/>
-      <dgm:spPr/>
-    </dgm:pt>
-    <dgm:pt modelId="{AC980134-5BEA-47E9-8A47-A79A642D79BD}" type="pres">
-      <dgm:prSet presAssocID="{4D280E73-C220-4E30-B63E-9B1739A95856}" presName="hierRoot2" presStyleCnt="0">
-        <dgm:presLayoutVars>
-          <dgm:hierBranch val="init"/>
-        </dgm:presLayoutVars>
-      </dgm:prSet>
-      <dgm:spPr/>
-    </dgm:pt>
-    <dgm:pt modelId="{B8847EBD-6637-4EAE-A455-E45EC2DB97D9}" type="pres">
-      <dgm:prSet presAssocID="{4D280E73-C220-4E30-B63E-9B1739A95856}" presName="rootComposite" presStyleCnt="0"/>
-      <dgm:spPr/>
-    </dgm:pt>
-    <dgm:pt modelId="{B9264E8D-B910-4FA7-ACF4-6F1FAD9F38C2}" type="pres">
-      <dgm:prSet presAssocID="{4D280E73-C220-4E30-B63E-9B1739A95856}" presName="rootText" presStyleLbl="node4" presStyleIdx="9" presStyleCnt="10">
-        <dgm:presLayoutVars>
-          <dgm:chPref val="3"/>
-        </dgm:presLayoutVars>
-      </dgm:prSet>
-      <dgm:spPr/>
-    </dgm:pt>
-    <dgm:pt modelId="{799469BD-9AEA-4CEB-806D-325C3C43584F}" type="pres">
-      <dgm:prSet presAssocID="{4D280E73-C220-4E30-B63E-9B1739A95856}" presName="rootConnector" presStyleLbl="node4" presStyleIdx="9" presStyleCnt="10"/>
-      <dgm:spPr/>
-    </dgm:pt>
-    <dgm:pt modelId="{AAF291CD-8192-48C8-A2F5-14BA98CCA2DA}" type="pres">
-      <dgm:prSet presAssocID="{4D280E73-C220-4E30-B63E-9B1739A95856}" presName="hierChild4" presStyleCnt="0"/>
-      <dgm:spPr/>
-    </dgm:pt>
-    <dgm:pt modelId="{3B26F720-21B9-4917-925C-4B8DBC62E4BD}" type="pres">
-      <dgm:prSet presAssocID="{4D280E73-C220-4E30-B63E-9B1739A95856}" presName="hierChild5" presStyleCnt="0"/>
-      <dgm:spPr/>
-    </dgm:pt>
-    <dgm:pt modelId="{7E90A091-0F8C-4768-83FE-93C36231FE07}" type="pres">
-      <dgm:prSet presAssocID="{7A3C7205-EAAC-4B5D-915D-5FE855339856}" presName="hierChild5" presStyleCnt="0"/>
-      <dgm:spPr/>
-    </dgm:pt>
-    <dgm:pt modelId="{1AD96763-63C0-4FA5-8EA5-118782686E59}" type="pres">
-      <dgm:prSet presAssocID="{61D67F75-F592-4776-8F53-A7589C845C0E}" presName="Name37" presStyleLbl="parChTrans1D3" presStyleIdx="4" presStyleCnt="5"/>
-      <dgm:spPr/>
-    </dgm:pt>
-    <dgm:pt modelId="{836AA608-AAC1-4231-B09C-F4BD8C4B3974}" type="pres">
-      <dgm:prSet presAssocID="{42EDB7D4-A283-43B3-B2C1-8C2292516AF5}" presName="hierRoot2" presStyleCnt="0">
-        <dgm:presLayoutVars>
-          <dgm:hierBranch val="init"/>
-        </dgm:presLayoutVars>
-      </dgm:prSet>
-      <dgm:spPr/>
-    </dgm:pt>
-    <dgm:pt modelId="{4A04527F-C274-4949-8686-C21185B4D623}" type="pres">
-      <dgm:prSet presAssocID="{42EDB7D4-A283-43B3-B2C1-8C2292516AF5}" presName="rootComposite" presStyleCnt="0"/>
-      <dgm:spPr/>
-    </dgm:pt>
-    <dgm:pt modelId="{CEEAAF22-0B04-45D0-8A00-642A0031A2A2}" type="pres">
-      <dgm:prSet presAssocID="{42EDB7D4-A283-43B3-B2C1-8C2292516AF5}" presName="rootText" presStyleLbl="node3" presStyleIdx="4" presStyleCnt="5">
+    <dgm:pt modelId="{CD318DA9-8C9C-4D57-9739-A43A099BB61D}" type="pres">
+      <dgm:prSet presAssocID="{BF688012-A4AB-43BD-AD67-B342DA9EB1A1}" presName="rootComposite" presStyleCnt="0"/>
+      <dgm:spPr/>
+    </dgm:pt>
+    <dgm:pt modelId="{54179FE0-E21E-468C-91A1-90D7E80FDCE3}" type="pres">
+      <dgm:prSet presAssocID="{BF688012-A4AB-43BD-AD67-B342DA9EB1A1}" presName="rootText" presStyleLbl="node3" presStyleIdx="0" presStyleCnt="5">
         <dgm:presLayoutVars>
           <dgm:chPref val="3"/>
         </dgm:presLayoutVars>
@@ -3420,9 +2882,871 @@
         </a:p>
       </dgm:t>
     </dgm:pt>
+    <dgm:pt modelId="{66DC34A8-A7E5-4938-A3F2-D6902157BF3B}" type="pres">
+      <dgm:prSet presAssocID="{BF688012-A4AB-43BD-AD67-B342DA9EB1A1}" presName="rootConnector" presStyleLbl="node3" presStyleIdx="0" presStyleCnt="5"/>
+      <dgm:spPr/>
+      <dgm:t>
+        <a:bodyPr/>
+        <a:lstStyle/>
+        <a:p>
+          <a:endParaRPr lang="en-US"/>
+        </a:p>
+      </dgm:t>
+    </dgm:pt>
+    <dgm:pt modelId="{B3D44583-C583-43B6-A394-860D2CE62203}" type="pres">
+      <dgm:prSet presAssocID="{BF688012-A4AB-43BD-AD67-B342DA9EB1A1}" presName="hierChild4" presStyleCnt="0"/>
+      <dgm:spPr/>
+    </dgm:pt>
+    <dgm:pt modelId="{A3AB63B1-6FF6-4CFE-BE56-37A3A8D2594D}" type="pres">
+      <dgm:prSet presAssocID="{80A001E8-4F9D-4E91-B59C-F2776E57C053}" presName="Name37" presStyleLbl="parChTrans1D4" presStyleIdx="0" presStyleCnt="10"/>
+      <dgm:spPr/>
+      <dgm:t>
+        <a:bodyPr/>
+        <a:lstStyle/>
+        <a:p>
+          <a:endParaRPr lang="en-US"/>
+        </a:p>
+      </dgm:t>
+    </dgm:pt>
+    <dgm:pt modelId="{69EF91B3-4C2A-4E67-BCC9-7BAF7708B62D}" type="pres">
+      <dgm:prSet presAssocID="{6C6B25E2-10A9-4E80-85A1-564097713135}" presName="hierRoot2" presStyleCnt="0">
+        <dgm:presLayoutVars>
+          <dgm:hierBranch val="init"/>
+        </dgm:presLayoutVars>
+      </dgm:prSet>
+      <dgm:spPr/>
+    </dgm:pt>
+    <dgm:pt modelId="{6B9F6473-6333-4690-997F-486155B735DC}" type="pres">
+      <dgm:prSet presAssocID="{6C6B25E2-10A9-4E80-85A1-564097713135}" presName="rootComposite" presStyleCnt="0"/>
+      <dgm:spPr/>
+    </dgm:pt>
+    <dgm:pt modelId="{E4E57F41-042F-45A5-8D92-5723CFA79F87}" type="pres">
+      <dgm:prSet presAssocID="{6C6B25E2-10A9-4E80-85A1-564097713135}" presName="rootText" presStyleLbl="node4" presStyleIdx="0" presStyleCnt="10">
+        <dgm:presLayoutVars>
+          <dgm:chPref val="3"/>
+        </dgm:presLayoutVars>
+      </dgm:prSet>
+      <dgm:spPr/>
+      <dgm:t>
+        <a:bodyPr/>
+        <a:lstStyle/>
+        <a:p>
+          <a:endParaRPr lang="en-US"/>
+        </a:p>
+      </dgm:t>
+    </dgm:pt>
+    <dgm:pt modelId="{22AEF71C-1F6A-4A30-83ED-D0E222A1371D}" type="pres">
+      <dgm:prSet presAssocID="{6C6B25E2-10A9-4E80-85A1-564097713135}" presName="rootConnector" presStyleLbl="node4" presStyleIdx="0" presStyleCnt="10"/>
+      <dgm:spPr/>
+      <dgm:t>
+        <a:bodyPr/>
+        <a:lstStyle/>
+        <a:p>
+          <a:endParaRPr lang="en-US"/>
+        </a:p>
+      </dgm:t>
+    </dgm:pt>
+    <dgm:pt modelId="{1783ACD0-E611-4899-A713-D8AF642DC7B8}" type="pres">
+      <dgm:prSet presAssocID="{6C6B25E2-10A9-4E80-85A1-564097713135}" presName="hierChild4" presStyleCnt="0"/>
+      <dgm:spPr/>
+    </dgm:pt>
+    <dgm:pt modelId="{0136CBB3-7AB6-47B2-A6C4-9DD91746F7C4}" type="pres">
+      <dgm:prSet presAssocID="{6C6B25E2-10A9-4E80-85A1-564097713135}" presName="hierChild5" presStyleCnt="0"/>
+      <dgm:spPr/>
+    </dgm:pt>
+    <dgm:pt modelId="{FDB13833-990D-41FB-8281-8DBC63378CDE}" type="pres">
+      <dgm:prSet presAssocID="{B3167CFE-AC5C-4306-ACF3-68303FC955E4}" presName="Name37" presStyleLbl="parChTrans1D4" presStyleIdx="1" presStyleCnt="10"/>
+      <dgm:spPr/>
+      <dgm:t>
+        <a:bodyPr/>
+        <a:lstStyle/>
+        <a:p>
+          <a:endParaRPr lang="en-US"/>
+        </a:p>
+      </dgm:t>
+    </dgm:pt>
+    <dgm:pt modelId="{30816F05-29C5-4129-A639-1BF535F2B864}" type="pres">
+      <dgm:prSet presAssocID="{8C1B2657-5F7E-404A-8CE0-B4A07CF673E2}" presName="hierRoot2" presStyleCnt="0">
+        <dgm:presLayoutVars>
+          <dgm:hierBranch val="init"/>
+        </dgm:presLayoutVars>
+      </dgm:prSet>
+      <dgm:spPr/>
+    </dgm:pt>
+    <dgm:pt modelId="{9FE2AF0D-C333-47D8-92D1-CC58F01CAC9E}" type="pres">
+      <dgm:prSet presAssocID="{8C1B2657-5F7E-404A-8CE0-B4A07CF673E2}" presName="rootComposite" presStyleCnt="0"/>
+      <dgm:spPr/>
+    </dgm:pt>
+    <dgm:pt modelId="{5ECA00EF-B94E-4E22-A142-A63424C6E283}" type="pres">
+      <dgm:prSet presAssocID="{8C1B2657-5F7E-404A-8CE0-B4A07CF673E2}" presName="rootText" presStyleLbl="node4" presStyleIdx="1" presStyleCnt="10">
+        <dgm:presLayoutVars>
+          <dgm:chPref val="3"/>
+        </dgm:presLayoutVars>
+      </dgm:prSet>
+      <dgm:spPr/>
+      <dgm:t>
+        <a:bodyPr/>
+        <a:lstStyle/>
+        <a:p>
+          <a:endParaRPr lang="en-US"/>
+        </a:p>
+      </dgm:t>
+    </dgm:pt>
+    <dgm:pt modelId="{8FE2F7CD-050B-453A-A061-F705FDBDBADC}" type="pres">
+      <dgm:prSet presAssocID="{8C1B2657-5F7E-404A-8CE0-B4A07CF673E2}" presName="rootConnector" presStyleLbl="node4" presStyleIdx="1" presStyleCnt="10"/>
+      <dgm:spPr/>
+      <dgm:t>
+        <a:bodyPr/>
+        <a:lstStyle/>
+        <a:p>
+          <a:endParaRPr lang="en-US"/>
+        </a:p>
+      </dgm:t>
+    </dgm:pt>
+    <dgm:pt modelId="{F7B05C10-A967-4A96-8AFF-5447A22E4A62}" type="pres">
+      <dgm:prSet presAssocID="{8C1B2657-5F7E-404A-8CE0-B4A07CF673E2}" presName="hierChild4" presStyleCnt="0"/>
+      <dgm:spPr/>
+    </dgm:pt>
+    <dgm:pt modelId="{9770F9CD-6048-4A37-AED5-7A8584D1A904}" type="pres">
+      <dgm:prSet presAssocID="{8C1B2657-5F7E-404A-8CE0-B4A07CF673E2}" presName="hierChild5" presStyleCnt="0"/>
+      <dgm:spPr/>
+    </dgm:pt>
+    <dgm:pt modelId="{9DD49CB5-9275-460B-9C6B-CD2D60334277}" type="pres">
+      <dgm:prSet presAssocID="{E48B2AB6-26CB-4E1B-8B9F-1DC0CD81B351}" presName="Name37" presStyleLbl="parChTrans1D4" presStyleIdx="2" presStyleCnt="10"/>
+      <dgm:spPr/>
+      <dgm:t>
+        <a:bodyPr/>
+        <a:lstStyle/>
+        <a:p>
+          <a:endParaRPr lang="en-US"/>
+        </a:p>
+      </dgm:t>
+    </dgm:pt>
+    <dgm:pt modelId="{AA4A8397-AB12-4570-9A38-97B27DF95C09}" type="pres">
+      <dgm:prSet presAssocID="{2173B93B-7E8D-4C49-AC97-64857F82749B}" presName="hierRoot2" presStyleCnt="0">
+        <dgm:presLayoutVars>
+          <dgm:hierBranch val="init"/>
+        </dgm:presLayoutVars>
+      </dgm:prSet>
+      <dgm:spPr/>
+    </dgm:pt>
+    <dgm:pt modelId="{8B0F16B4-361F-4939-A433-72C93DD802D1}" type="pres">
+      <dgm:prSet presAssocID="{2173B93B-7E8D-4C49-AC97-64857F82749B}" presName="rootComposite" presStyleCnt="0"/>
+      <dgm:spPr/>
+    </dgm:pt>
+    <dgm:pt modelId="{1A320179-1009-4B6D-954B-90BC43F13266}" type="pres">
+      <dgm:prSet presAssocID="{2173B93B-7E8D-4C49-AC97-64857F82749B}" presName="rootText" presStyleLbl="node4" presStyleIdx="2" presStyleCnt="10">
+        <dgm:presLayoutVars>
+          <dgm:chPref val="3"/>
+        </dgm:presLayoutVars>
+      </dgm:prSet>
+      <dgm:spPr/>
+      <dgm:t>
+        <a:bodyPr/>
+        <a:lstStyle/>
+        <a:p>
+          <a:endParaRPr lang="en-US"/>
+        </a:p>
+      </dgm:t>
+    </dgm:pt>
+    <dgm:pt modelId="{9253B386-F021-43BE-BAEC-A09FD83909F6}" type="pres">
+      <dgm:prSet presAssocID="{2173B93B-7E8D-4C49-AC97-64857F82749B}" presName="rootConnector" presStyleLbl="node4" presStyleIdx="2" presStyleCnt="10"/>
+      <dgm:spPr/>
+      <dgm:t>
+        <a:bodyPr/>
+        <a:lstStyle/>
+        <a:p>
+          <a:endParaRPr lang="en-US"/>
+        </a:p>
+      </dgm:t>
+    </dgm:pt>
+    <dgm:pt modelId="{B6EBD99A-FFEA-4ECC-BF83-96DD50BC8B5C}" type="pres">
+      <dgm:prSet presAssocID="{2173B93B-7E8D-4C49-AC97-64857F82749B}" presName="hierChild4" presStyleCnt="0"/>
+      <dgm:spPr/>
+    </dgm:pt>
+    <dgm:pt modelId="{336226EB-BF8D-4DE2-B858-ECA58F5CE4A9}" type="pres">
+      <dgm:prSet presAssocID="{2173B93B-7E8D-4C49-AC97-64857F82749B}" presName="hierChild5" presStyleCnt="0"/>
+      <dgm:spPr/>
+    </dgm:pt>
+    <dgm:pt modelId="{CA65C09C-229D-4D64-B2FD-89469AA9897A}" type="pres">
+      <dgm:prSet presAssocID="{3872A134-C573-43E3-90EC-1CD53F585656}" presName="Name37" presStyleLbl="parChTrans1D4" presStyleIdx="3" presStyleCnt="10"/>
+      <dgm:spPr/>
+      <dgm:t>
+        <a:bodyPr/>
+        <a:lstStyle/>
+        <a:p>
+          <a:endParaRPr lang="en-US"/>
+        </a:p>
+      </dgm:t>
+    </dgm:pt>
+    <dgm:pt modelId="{000ACA4F-F856-4693-901D-8640660F55E8}" type="pres">
+      <dgm:prSet presAssocID="{EF231D0F-4B8A-47EF-9993-CF9E4EC9FDAD}" presName="hierRoot2" presStyleCnt="0">
+        <dgm:presLayoutVars>
+          <dgm:hierBranch val="init"/>
+        </dgm:presLayoutVars>
+      </dgm:prSet>
+      <dgm:spPr/>
+    </dgm:pt>
+    <dgm:pt modelId="{03C070C8-1699-444C-BBA5-5C0C89EA89AD}" type="pres">
+      <dgm:prSet presAssocID="{EF231D0F-4B8A-47EF-9993-CF9E4EC9FDAD}" presName="rootComposite" presStyleCnt="0"/>
+      <dgm:spPr/>
+    </dgm:pt>
+    <dgm:pt modelId="{95E08B68-777F-4D00-8FCB-A8680867E0C0}" type="pres">
+      <dgm:prSet presAssocID="{EF231D0F-4B8A-47EF-9993-CF9E4EC9FDAD}" presName="rootText" presStyleLbl="node4" presStyleIdx="3" presStyleCnt="10" custScaleX="139530">
+        <dgm:presLayoutVars>
+          <dgm:chPref val="3"/>
+        </dgm:presLayoutVars>
+      </dgm:prSet>
+      <dgm:spPr/>
+      <dgm:t>
+        <a:bodyPr/>
+        <a:lstStyle/>
+        <a:p>
+          <a:endParaRPr lang="en-US"/>
+        </a:p>
+      </dgm:t>
+    </dgm:pt>
+    <dgm:pt modelId="{C36626A7-CAC8-4F7D-B4FF-5D99259F655E}" type="pres">
+      <dgm:prSet presAssocID="{EF231D0F-4B8A-47EF-9993-CF9E4EC9FDAD}" presName="rootConnector" presStyleLbl="node4" presStyleIdx="3" presStyleCnt="10"/>
+      <dgm:spPr/>
+      <dgm:t>
+        <a:bodyPr/>
+        <a:lstStyle/>
+        <a:p>
+          <a:endParaRPr lang="en-US"/>
+        </a:p>
+      </dgm:t>
+    </dgm:pt>
+    <dgm:pt modelId="{F3335808-7EF0-447B-B5DD-0A191B282F87}" type="pres">
+      <dgm:prSet presAssocID="{EF231D0F-4B8A-47EF-9993-CF9E4EC9FDAD}" presName="hierChild4" presStyleCnt="0"/>
+      <dgm:spPr/>
+    </dgm:pt>
+    <dgm:pt modelId="{65F0ACF3-EE42-4FE7-A144-23C0CD9EBDDA}" type="pres">
+      <dgm:prSet presAssocID="{EF231D0F-4B8A-47EF-9993-CF9E4EC9FDAD}" presName="hierChild5" presStyleCnt="0"/>
+      <dgm:spPr/>
+    </dgm:pt>
+    <dgm:pt modelId="{B8A4DAC1-AD02-46DB-99E6-14CCF4FE9D4E}" type="pres">
+      <dgm:prSet presAssocID="{BF688012-A4AB-43BD-AD67-B342DA9EB1A1}" presName="hierChild5" presStyleCnt="0"/>
+      <dgm:spPr/>
+    </dgm:pt>
+    <dgm:pt modelId="{48114D2C-411D-468B-8557-F6099245D351}" type="pres">
+      <dgm:prSet presAssocID="{5678B143-443A-4963-9137-479830FB38DB}" presName="Name37" presStyleLbl="parChTrans1D3" presStyleIdx="1" presStyleCnt="5"/>
+      <dgm:spPr/>
+      <dgm:t>
+        <a:bodyPr/>
+        <a:lstStyle/>
+        <a:p>
+          <a:endParaRPr lang="en-US"/>
+        </a:p>
+      </dgm:t>
+    </dgm:pt>
+    <dgm:pt modelId="{CD95494D-23D8-422F-8553-E6DFFDB0B050}" type="pres">
+      <dgm:prSet presAssocID="{E001767D-6D35-4A6C-B9A6-7740121562D5}" presName="hierRoot2" presStyleCnt="0">
+        <dgm:presLayoutVars>
+          <dgm:hierBranch val="init"/>
+        </dgm:presLayoutVars>
+      </dgm:prSet>
+      <dgm:spPr/>
+    </dgm:pt>
+    <dgm:pt modelId="{20BEE6F9-CBBF-4FA3-952E-932EB3A79015}" type="pres">
+      <dgm:prSet presAssocID="{E001767D-6D35-4A6C-B9A6-7740121562D5}" presName="rootComposite" presStyleCnt="0"/>
+      <dgm:spPr/>
+    </dgm:pt>
+    <dgm:pt modelId="{566A6DF9-374F-4469-AD40-0EC0C4A60C2C}" type="pres">
+      <dgm:prSet presAssocID="{E001767D-6D35-4A6C-B9A6-7740121562D5}" presName="rootText" presStyleLbl="node3" presStyleIdx="1" presStyleCnt="5">
+        <dgm:presLayoutVars>
+          <dgm:chPref val="3"/>
+        </dgm:presLayoutVars>
+      </dgm:prSet>
+      <dgm:spPr/>
+      <dgm:t>
+        <a:bodyPr/>
+        <a:lstStyle/>
+        <a:p>
+          <a:endParaRPr lang="en-US"/>
+        </a:p>
+      </dgm:t>
+    </dgm:pt>
+    <dgm:pt modelId="{5106A322-C110-4F01-A3A7-4696D1FB2F75}" type="pres">
+      <dgm:prSet presAssocID="{E001767D-6D35-4A6C-B9A6-7740121562D5}" presName="rootConnector" presStyleLbl="node3" presStyleIdx="1" presStyleCnt="5"/>
+      <dgm:spPr/>
+      <dgm:t>
+        <a:bodyPr/>
+        <a:lstStyle/>
+        <a:p>
+          <a:endParaRPr lang="en-US"/>
+        </a:p>
+      </dgm:t>
+    </dgm:pt>
+    <dgm:pt modelId="{C136FE72-BD20-464E-AD4D-3744D369415B}" type="pres">
+      <dgm:prSet presAssocID="{E001767D-6D35-4A6C-B9A6-7740121562D5}" presName="hierChild4" presStyleCnt="0"/>
+      <dgm:spPr/>
+    </dgm:pt>
+    <dgm:pt modelId="{CF8A37F1-7162-499F-BFFD-EF955C673C25}" type="pres">
+      <dgm:prSet presAssocID="{A004CB57-A062-4ED3-801D-E645530CAD54}" presName="Name37" presStyleLbl="parChTrans1D4" presStyleIdx="4" presStyleCnt="10"/>
+      <dgm:spPr/>
+      <dgm:t>
+        <a:bodyPr/>
+        <a:lstStyle/>
+        <a:p>
+          <a:endParaRPr lang="en-US"/>
+        </a:p>
+      </dgm:t>
+    </dgm:pt>
+    <dgm:pt modelId="{4B66F780-95F6-4B5B-8155-831546DCA988}" type="pres">
+      <dgm:prSet presAssocID="{083F4181-BB32-437B-9476-74609C2591A2}" presName="hierRoot2" presStyleCnt="0">
+        <dgm:presLayoutVars>
+          <dgm:hierBranch val="init"/>
+        </dgm:presLayoutVars>
+      </dgm:prSet>
+      <dgm:spPr/>
+    </dgm:pt>
+    <dgm:pt modelId="{9C8364FF-D6E1-457C-A6D0-156B3BBD913D}" type="pres">
+      <dgm:prSet presAssocID="{083F4181-BB32-437B-9476-74609C2591A2}" presName="rootComposite" presStyleCnt="0"/>
+      <dgm:spPr/>
+    </dgm:pt>
+    <dgm:pt modelId="{A6D4204E-923B-47BE-9AA1-5A46215F12C5}" type="pres">
+      <dgm:prSet presAssocID="{083F4181-BB32-437B-9476-74609C2591A2}" presName="rootText" presStyleLbl="node4" presStyleIdx="4" presStyleCnt="10">
+        <dgm:presLayoutVars>
+          <dgm:chPref val="3"/>
+        </dgm:presLayoutVars>
+      </dgm:prSet>
+      <dgm:spPr/>
+      <dgm:t>
+        <a:bodyPr/>
+        <a:lstStyle/>
+        <a:p>
+          <a:endParaRPr lang="en-US"/>
+        </a:p>
+      </dgm:t>
+    </dgm:pt>
+    <dgm:pt modelId="{FF785875-DC96-4A01-A6B2-EA63D58F4FEB}" type="pres">
+      <dgm:prSet presAssocID="{083F4181-BB32-437B-9476-74609C2591A2}" presName="rootConnector" presStyleLbl="node4" presStyleIdx="4" presStyleCnt="10"/>
+      <dgm:spPr/>
+      <dgm:t>
+        <a:bodyPr/>
+        <a:lstStyle/>
+        <a:p>
+          <a:endParaRPr lang="en-US"/>
+        </a:p>
+      </dgm:t>
+    </dgm:pt>
+    <dgm:pt modelId="{3F4DBC68-3955-4D5A-B2A3-8EC16A5C92E5}" type="pres">
+      <dgm:prSet presAssocID="{083F4181-BB32-437B-9476-74609C2591A2}" presName="hierChild4" presStyleCnt="0"/>
+      <dgm:spPr/>
+    </dgm:pt>
+    <dgm:pt modelId="{53B98020-580D-4734-AB79-08C9D22D16C6}" type="pres">
+      <dgm:prSet presAssocID="{083F4181-BB32-437B-9476-74609C2591A2}" presName="hierChild5" presStyleCnt="0"/>
+      <dgm:spPr/>
+    </dgm:pt>
+    <dgm:pt modelId="{5339DA53-2B94-40C5-A189-1BD162D72DA8}" type="pres">
+      <dgm:prSet presAssocID="{5343FAF3-3C83-4C8E-896F-6FCFE89ADDF5}" presName="Name37" presStyleLbl="parChTrans1D4" presStyleIdx="5" presStyleCnt="10"/>
+      <dgm:spPr/>
+      <dgm:t>
+        <a:bodyPr/>
+        <a:lstStyle/>
+        <a:p>
+          <a:endParaRPr lang="en-US"/>
+        </a:p>
+      </dgm:t>
+    </dgm:pt>
+    <dgm:pt modelId="{C5F10E29-E35F-42FE-BDDF-670A8E7CB976}" type="pres">
+      <dgm:prSet presAssocID="{3F15C59F-F17C-45CC-9D61-F0735F2ABC44}" presName="hierRoot2" presStyleCnt="0">
+        <dgm:presLayoutVars>
+          <dgm:hierBranch val="init"/>
+        </dgm:presLayoutVars>
+      </dgm:prSet>
+      <dgm:spPr/>
+    </dgm:pt>
+    <dgm:pt modelId="{24188A5B-6D47-48CB-8B2A-78484FBC45AC}" type="pres">
+      <dgm:prSet presAssocID="{3F15C59F-F17C-45CC-9D61-F0735F2ABC44}" presName="rootComposite" presStyleCnt="0"/>
+      <dgm:spPr/>
+    </dgm:pt>
+    <dgm:pt modelId="{323A37B4-C59E-4A21-B72C-90DA273EA45B}" type="pres">
+      <dgm:prSet presAssocID="{3F15C59F-F17C-45CC-9D61-F0735F2ABC44}" presName="rootText" presStyleLbl="node4" presStyleIdx="5" presStyleCnt="10">
+        <dgm:presLayoutVars>
+          <dgm:chPref val="3"/>
+        </dgm:presLayoutVars>
+      </dgm:prSet>
+      <dgm:spPr/>
+      <dgm:t>
+        <a:bodyPr/>
+        <a:lstStyle/>
+        <a:p>
+          <a:endParaRPr lang="en-US"/>
+        </a:p>
+      </dgm:t>
+    </dgm:pt>
+    <dgm:pt modelId="{CDA672C7-E272-4507-A580-7D8912352F83}" type="pres">
+      <dgm:prSet presAssocID="{3F15C59F-F17C-45CC-9D61-F0735F2ABC44}" presName="rootConnector" presStyleLbl="node4" presStyleIdx="5" presStyleCnt="10"/>
+      <dgm:spPr/>
+      <dgm:t>
+        <a:bodyPr/>
+        <a:lstStyle/>
+        <a:p>
+          <a:endParaRPr lang="en-US"/>
+        </a:p>
+      </dgm:t>
+    </dgm:pt>
+    <dgm:pt modelId="{EF04B3BD-9444-4B0C-923B-EBB95F86EABE}" type="pres">
+      <dgm:prSet presAssocID="{3F15C59F-F17C-45CC-9D61-F0735F2ABC44}" presName="hierChild4" presStyleCnt="0"/>
+      <dgm:spPr/>
+    </dgm:pt>
+    <dgm:pt modelId="{FD078B60-DE11-4B38-ABB9-7A370AFADB0F}" type="pres">
+      <dgm:prSet presAssocID="{3F15C59F-F17C-45CC-9D61-F0735F2ABC44}" presName="hierChild5" presStyleCnt="0"/>
+      <dgm:spPr/>
+    </dgm:pt>
+    <dgm:pt modelId="{150BD734-8A8C-4C28-8AC3-2FDF05FFC52F}" type="pres">
+      <dgm:prSet presAssocID="{B8C29E49-2928-48E6-80EB-7F706E7FC5DD}" presName="Name37" presStyleLbl="parChTrans1D4" presStyleIdx="6" presStyleCnt="10"/>
+      <dgm:spPr/>
+      <dgm:t>
+        <a:bodyPr/>
+        <a:lstStyle/>
+        <a:p>
+          <a:endParaRPr lang="en-US"/>
+        </a:p>
+      </dgm:t>
+    </dgm:pt>
+    <dgm:pt modelId="{5C1F7831-8C09-4A8A-AD50-40F9858D240F}" type="pres">
+      <dgm:prSet presAssocID="{3930C99B-97E6-4BDF-B18D-85EE3E6D3C40}" presName="hierRoot2" presStyleCnt="0">
+        <dgm:presLayoutVars>
+          <dgm:hierBranch val="init"/>
+        </dgm:presLayoutVars>
+      </dgm:prSet>
+      <dgm:spPr/>
+    </dgm:pt>
+    <dgm:pt modelId="{1F9C8C90-A0BB-4DB9-A971-AE5DB7D4E8FB}" type="pres">
+      <dgm:prSet presAssocID="{3930C99B-97E6-4BDF-B18D-85EE3E6D3C40}" presName="rootComposite" presStyleCnt="0"/>
+      <dgm:spPr/>
+    </dgm:pt>
+    <dgm:pt modelId="{579AFED9-5216-4D3E-8327-8AF77B1E3E0E}" type="pres">
+      <dgm:prSet presAssocID="{3930C99B-97E6-4BDF-B18D-85EE3E6D3C40}" presName="rootText" presStyleLbl="node4" presStyleIdx="6" presStyleCnt="10">
+        <dgm:presLayoutVars>
+          <dgm:chPref val="3"/>
+        </dgm:presLayoutVars>
+      </dgm:prSet>
+      <dgm:spPr/>
+      <dgm:t>
+        <a:bodyPr/>
+        <a:lstStyle/>
+        <a:p>
+          <a:endParaRPr lang="en-US"/>
+        </a:p>
+      </dgm:t>
+    </dgm:pt>
+    <dgm:pt modelId="{3E36BB7F-DE5E-4BC7-91AE-BD47FBF73405}" type="pres">
+      <dgm:prSet presAssocID="{3930C99B-97E6-4BDF-B18D-85EE3E6D3C40}" presName="rootConnector" presStyleLbl="node4" presStyleIdx="6" presStyleCnt="10"/>
+      <dgm:spPr/>
+      <dgm:t>
+        <a:bodyPr/>
+        <a:lstStyle/>
+        <a:p>
+          <a:endParaRPr lang="en-US"/>
+        </a:p>
+      </dgm:t>
+    </dgm:pt>
+    <dgm:pt modelId="{F0B48898-49A9-4812-AD29-2166FED1A4C9}" type="pres">
+      <dgm:prSet presAssocID="{3930C99B-97E6-4BDF-B18D-85EE3E6D3C40}" presName="hierChild4" presStyleCnt="0"/>
+      <dgm:spPr/>
+    </dgm:pt>
+    <dgm:pt modelId="{673E4CB2-5E43-4E56-932F-AF87B90C7C81}" type="pres">
+      <dgm:prSet presAssocID="{3930C99B-97E6-4BDF-B18D-85EE3E6D3C40}" presName="hierChild5" presStyleCnt="0"/>
+      <dgm:spPr/>
+    </dgm:pt>
+    <dgm:pt modelId="{F5279349-0B37-428B-8EA3-4D04D7543E2F}" type="pres">
+      <dgm:prSet presAssocID="{E001767D-6D35-4A6C-B9A6-7740121562D5}" presName="hierChild5" presStyleCnt="0"/>
+      <dgm:spPr/>
+    </dgm:pt>
+    <dgm:pt modelId="{4AD4F881-E327-4B53-9165-06AA92328090}" type="pres">
+      <dgm:prSet presAssocID="{9865DEC0-D025-4798-98A8-C46ABE87EC17}" presName="hierChild5" presStyleCnt="0"/>
+      <dgm:spPr/>
+    </dgm:pt>
+    <dgm:pt modelId="{16D09170-3A44-4A74-89DF-E76112F215EE}" type="pres">
+      <dgm:prSet presAssocID="{2CAB26BC-C5D9-46DC-A754-0BC5C13823DA}" presName="Name37" presStyleLbl="parChTrans1D2" presStyleIdx="1" presStyleCnt="2"/>
+      <dgm:spPr/>
+      <dgm:t>
+        <a:bodyPr/>
+        <a:lstStyle/>
+        <a:p>
+          <a:endParaRPr lang="en-US"/>
+        </a:p>
+      </dgm:t>
+    </dgm:pt>
+    <dgm:pt modelId="{CE30B49F-C12F-427F-BB1E-C58986CB09D3}" type="pres">
+      <dgm:prSet presAssocID="{A07C290F-AC18-4321-8B25-D3221D0E84C9}" presName="hierRoot2" presStyleCnt="0">
+        <dgm:presLayoutVars>
+          <dgm:hierBranch val="init"/>
+        </dgm:presLayoutVars>
+      </dgm:prSet>
+      <dgm:spPr/>
+    </dgm:pt>
+    <dgm:pt modelId="{94F9E6C9-71EC-4647-9E45-542F009FC51E}" type="pres">
+      <dgm:prSet presAssocID="{A07C290F-AC18-4321-8B25-D3221D0E84C9}" presName="rootComposite" presStyleCnt="0"/>
+      <dgm:spPr/>
+    </dgm:pt>
+    <dgm:pt modelId="{7671796F-ADCE-4E28-92EA-923FC010BB66}" type="pres">
+      <dgm:prSet presAssocID="{A07C290F-AC18-4321-8B25-D3221D0E84C9}" presName="rootText" presStyleLbl="node2" presStyleIdx="1" presStyleCnt="2" custScaleX="202839">
+        <dgm:presLayoutVars>
+          <dgm:chPref val="3"/>
+        </dgm:presLayoutVars>
+      </dgm:prSet>
+      <dgm:spPr/>
+      <dgm:t>
+        <a:bodyPr/>
+        <a:lstStyle/>
+        <a:p>
+          <a:endParaRPr lang="en-US"/>
+        </a:p>
+      </dgm:t>
+    </dgm:pt>
+    <dgm:pt modelId="{332A815B-B084-4882-AF9F-5D502D65535B}" type="pres">
+      <dgm:prSet presAssocID="{A07C290F-AC18-4321-8B25-D3221D0E84C9}" presName="rootConnector" presStyleLbl="node2" presStyleIdx="1" presStyleCnt="2"/>
+      <dgm:spPr/>
+      <dgm:t>
+        <a:bodyPr/>
+        <a:lstStyle/>
+        <a:p>
+          <a:endParaRPr lang="en-US"/>
+        </a:p>
+      </dgm:t>
+    </dgm:pt>
+    <dgm:pt modelId="{661FF34E-72E4-4593-AF3E-C3E1B37A3069}" type="pres">
+      <dgm:prSet presAssocID="{A07C290F-AC18-4321-8B25-D3221D0E84C9}" presName="hierChild4" presStyleCnt="0"/>
+      <dgm:spPr/>
+    </dgm:pt>
+    <dgm:pt modelId="{6AD2365B-3588-4178-8141-6BFB42A34A66}" type="pres">
+      <dgm:prSet presAssocID="{5277690B-52E9-4875-9F8A-83396E7C12A6}" presName="Name37" presStyleLbl="parChTrans1D3" presStyleIdx="2" presStyleCnt="5"/>
+      <dgm:spPr/>
+      <dgm:t>
+        <a:bodyPr/>
+        <a:lstStyle/>
+        <a:p>
+          <a:endParaRPr lang="en-US"/>
+        </a:p>
+      </dgm:t>
+    </dgm:pt>
+    <dgm:pt modelId="{866F4F71-C8E4-4E12-8B89-C10852A8381B}" type="pres">
+      <dgm:prSet presAssocID="{7620FD18-4838-4468-B172-A6B784463028}" presName="hierRoot2" presStyleCnt="0">
+        <dgm:presLayoutVars>
+          <dgm:hierBranch val="init"/>
+        </dgm:presLayoutVars>
+      </dgm:prSet>
+      <dgm:spPr/>
+    </dgm:pt>
+    <dgm:pt modelId="{FD139EF3-FF31-41E4-9FD1-E87E8CF8BEE7}" type="pres">
+      <dgm:prSet presAssocID="{7620FD18-4838-4468-B172-A6B784463028}" presName="rootComposite" presStyleCnt="0"/>
+      <dgm:spPr/>
+    </dgm:pt>
+    <dgm:pt modelId="{C24A5D1C-BC85-4C9C-8130-21B624143549}" type="pres">
+      <dgm:prSet presAssocID="{7620FD18-4838-4468-B172-A6B784463028}" presName="rootText" presStyleLbl="node3" presStyleIdx="2" presStyleCnt="5">
+        <dgm:presLayoutVars>
+          <dgm:chPref val="3"/>
+        </dgm:presLayoutVars>
+      </dgm:prSet>
+      <dgm:spPr/>
+      <dgm:t>
+        <a:bodyPr/>
+        <a:lstStyle/>
+        <a:p>
+          <a:endParaRPr lang="en-US"/>
+        </a:p>
+      </dgm:t>
+    </dgm:pt>
+    <dgm:pt modelId="{5A6678EB-7128-4F8F-B047-B26E028C719D}" type="pres">
+      <dgm:prSet presAssocID="{7620FD18-4838-4468-B172-A6B784463028}" presName="rootConnector" presStyleLbl="node3" presStyleIdx="2" presStyleCnt="5"/>
+      <dgm:spPr/>
+      <dgm:t>
+        <a:bodyPr/>
+        <a:lstStyle/>
+        <a:p>
+          <a:endParaRPr lang="en-US"/>
+        </a:p>
+      </dgm:t>
+    </dgm:pt>
+    <dgm:pt modelId="{98B27B02-3D96-482B-98C3-B9B402B65761}" type="pres">
+      <dgm:prSet presAssocID="{7620FD18-4838-4468-B172-A6B784463028}" presName="hierChild4" presStyleCnt="0"/>
+      <dgm:spPr/>
+    </dgm:pt>
+    <dgm:pt modelId="{5DC64FC6-CB20-476E-B164-24B6A0F0BAB1}" type="pres">
+      <dgm:prSet presAssocID="{7620FD18-4838-4468-B172-A6B784463028}" presName="hierChild5" presStyleCnt="0"/>
+      <dgm:spPr/>
+    </dgm:pt>
+    <dgm:pt modelId="{D4531E96-6B31-4849-8709-2602F0648367}" type="pres">
+      <dgm:prSet presAssocID="{E1D4F0F6-B5AA-4085-B5D2-D8B40B0A7442}" presName="Name37" presStyleLbl="parChTrans1D3" presStyleIdx="3" presStyleCnt="5"/>
+      <dgm:spPr/>
+      <dgm:t>
+        <a:bodyPr/>
+        <a:lstStyle/>
+        <a:p>
+          <a:endParaRPr lang="en-US"/>
+        </a:p>
+      </dgm:t>
+    </dgm:pt>
+    <dgm:pt modelId="{90950F4E-5256-485B-BD59-D0DA03AD24E6}" type="pres">
+      <dgm:prSet presAssocID="{7A3C7205-EAAC-4B5D-915D-5FE855339856}" presName="hierRoot2" presStyleCnt="0">
+        <dgm:presLayoutVars>
+          <dgm:hierBranch val="init"/>
+        </dgm:presLayoutVars>
+      </dgm:prSet>
+      <dgm:spPr/>
+    </dgm:pt>
+    <dgm:pt modelId="{B08C7B81-24CC-4585-8595-BBE819D2266D}" type="pres">
+      <dgm:prSet presAssocID="{7A3C7205-EAAC-4B5D-915D-5FE855339856}" presName="rootComposite" presStyleCnt="0"/>
+      <dgm:spPr/>
+    </dgm:pt>
+    <dgm:pt modelId="{B226F02C-62A4-4448-AA42-E9BB76D7873B}" type="pres">
+      <dgm:prSet presAssocID="{7A3C7205-EAAC-4B5D-915D-5FE855339856}" presName="rootText" presStyleLbl="node3" presStyleIdx="3" presStyleCnt="5">
+        <dgm:presLayoutVars>
+          <dgm:chPref val="3"/>
+        </dgm:presLayoutVars>
+      </dgm:prSet>
+      <dgm:spPr/>
+      <dgm:t>
+        <a:bodyPr/>
+        <a:lstStyle/>
+        <a:p>
+          <a:endParaRPr lang="en-US"/>
+        </a:p>
+      </dgm:t>
+    </dgm:pt>
+    <dgm:pt modelId="{86FA19A9-1844-48D1-BBD0-A64C22FC1AC1}" type="pres">
+      <dgm:prSet presAssocID="{7A3C7205-EAAC-4B5D-915D-5FE855339856}" presName="rootConnector" presStyleLbl="node3" presStyleIdx="3" presStyleCnt="5"/>
+      <dgm:spPr/>
+      <dgm:t>
+        <a:bodyPr/>
+        <a:lstStyle/>
+        <a:p>
+          <a:endParaRPr lang="en-US"/>
+        </a:p>
+      </dgm:t>
+    </dgm:pt>
+    <dgm:pt modelId="{9E934FE1-D7A3-465D-953C-1965D22E6FB4}" type="pres">
+      <dgm:prSet presAssocID="{7A3C7205-EAAC-4B5D-915D-5FE855339856}" presName="hierChild4" presStyleCnt="0"/>
+      <dgm:spPr/>
+    </dgm:pt>
+    <dgm:pt modelId="{06F6250B-A68A-44D4-82E8-AB48F93939B5}" type="pres">
+      <dgm:prSet presAssocID="{75CC2F58-C17C-43C3-AFAD-B96D79B02C9C}" presName="Name37" presStyleLbl="parChTrans1D4" presStyleIdx="7" presStyleCnt="10"/>
+      <dgm:spPr/>
+      <dgm:t>
+        <a:bodyPr/>
+        <a:lstStyle/>
+        <a:p>
+          <a:endParaRPr lang="en-US"/>
+        </a:p>
+      </dgm:t>
+    </dgm:pt>
+    <dgm:pt modelId="{54D0682F-43BF-4D89-9A7A-CE96468BBF1C}" type="pres">
+      <dgm:prSet presAssocID="{FEB668BB-EAB8-415D-B6CF-CA5219B9B56B}" presName="hierRoot2" presStyleCnt="0">
+        <dgm:presLayoutVars>
+          <dgm:hierBranch val="init"/>
+        </dgm:presLayoutVars>
+      </dgm:prSet>
+      <dgm:spPr/>
+    </dgm:pt>
+    <dgm:pt modelId="{336A230D-E688-4EA1-92DC-26ED5B80421C}" type="pres">
+      <dgm:prSet presAssocID="{FEB668BB-EAB8-415D-B6CF-CA5219B9B56B}" presName="rootComposite" presStyleCnt="0"/>
+      <dgm:spPr/>
+    </dgm:pt>
+    <dgm:pt modelId="{A0185BAE-3C86-4B5B-97B5-8EDFBB0BC9DD}" type="pres">
+      <dgm:prSet presAssocID="{FEB668BB-EAB8-415D-B6CF-CA5219B9B56B}" presName="rootText" presStyleLbl="node4" presStyleIdx="7" presStyleCnt="10">
+        <dgm:presLayoutVars>
+          <dgm:chPref val="3"/>
+        </dgm:presLayoutVars>
+      </dgm:prSet>
+      <dgm:spPr/>
+      <dgm:t>
+        <a:bodyPr/>
+        <a:lstStyle/>
+        <a:p>
+          <a:endParaRPr lang="en-US"/>
+        </a:p>
+      </dgm:t>
+    </dgm:pt>
+    <dgm:pt modelId="{699F2A82-D7E3-40C9-896A-33AC22BC8E58}" type="pres">
+      <dgm:prSet presAssocID="{FEB668BB-EAB8-415D-B6CF-CA5219B9B56B}" presName="rootConnector" presStyleLbl="node4" presStyleIdx="7" presStyleCnt="10"/>
+      <dgm:spPr/>
+      <dgm:t>
+        <a:bodyPr/>
+        <a:lstStyle/>
+        <a:p>
+          <a:endParaRPr lang="en-US"/>
+        </a:p>
+      </dgm:t>
+    </dgm:pt>
+    <dgm:pt modelId="{49FB919D-A6A7-4056-875D-052624D640C6}" type="pres">
+      <dgm:prSet presAssocID="{FEB668BB-EAB8-415D-B6CF-CA5219B9B56B}" presName="hierChild4" presStyleCnt="0"/>
+      <dgm:spPr/>
+    </dgm:pt>
+    <dgm:pt modelId="{7FA85D27-9128-4BE8-A7C9-C6CAE9ECCF19}" type="pres">
+      <dgm:prSet presAssocID="{FEB668BB-EAB8-415D-B6CF-CA5219B9B56B}" presName="hierChild5" presStyleCnt="0"/>
+      <dgm:spPr/>
+    </dgm:pt>
+    <dgm:pt modelId="{2A389793-3294-4BF8-92AF-66E45906D15D}" type="pres">
+      <dgm:prSet presAssocID="{5F1C10C6-36CC-4703-9733-4BACC3DE4EA5}" presName="Name37" presStyleLbl="parChTrans1D4" presStyleIdx="8" presStyleCnt="10"/>
+      <dgm:spPr/>
+      <dgm:t>
+        <a:bodyPr/>
+        <a:lstStyle/>
+        <a:p>
+          <a:endParaRPr lang="en-US"/>
+        </a:p>
+      </dgm:t>
+    </dgm:pt>
+    <dgm:pt modelId="{21698F3F-6E9D-42F7-867B-204B46F004E9}" type="pres">
+      <dgm:prSet presAssocID="{90BCFBA6-F895-4CE3-AD64-DF9E61328D90}" presName="hierRoot2" presStyleCnt="0">
+        <dgm:presLayoutVars>
+          <dgm:hierBranch val="init"/>
+        </dgm:presLayoutVars>
+      </dgm:prSet>
+      <dgm:spPr/>
+    </dgm:pt>
+    <dgm:pt modelId="{8E8E9C92-6A59-4501-A540-E34551FD0F07}" type="pres">
+      <dgm:prSet presAssocID="{90BCFBA6-F895-4CE3-AD64-DF9E61328D90}" presName="rootComposite" presStyleCnt="0"/>
+      <dgm:spPr/>
+    </dgm:pt>
+    <dgm:pt modelId="{5BCC797F-6BB1-4070-B9FD-B195C913EED0}" type="pres">
+      <dgm:prSet presAssocID="{90BCFBA6-F895-4CE3-AD64-DF9E61328D90}" presName="rootText" presStyleLbl="node4" presStyleIdx="8" presStyleCnt="10">
+        <dgm:presLayoutVars>
+          <dgm:chPref val="3"/>
+        </dgm:presLayoutVars>
+      </dgm:prSet>
+      <dgm:spPr/>
+      <dgm:t>
+        <a:bodyPr/>
+        <a:lstStyle/>
+        <a:p>
+          <a:endParaRPr lang="en-US"/>
+        </a:p>
+      </dgm:t>
+    </dgm:pt>
+    <dgm:pt modelId="{D2BA3124-902C-4BDC-B6A4-88FC64AEE88C}" type="pres">
+      <dgm:prSet presAssocID="{90BCFBA6-F895-4CE3-AD64-DF9E61328D90}" presName="rootConnector" presStyleLbl="node4" presStyleIdx="8" presStyleCnt="10"/>
+      <dgm:spPr/>
+      <dgm:t>
+        <a:bodyPr/>
+        <a:lstStyle/>
+        <a:p>
+          <a:endParaRPr lang="en-US"/>
+        </a:p>
+      </dgm:t>
+    </dgm:pt>
+    <dgm:pt modelId="{6C51A3CC-4E29-4A19-BA3E-0AA869AF9CEE}" type="pres">
+      <dgm:prSet presAssocID="{90BCFBA6-F895-4CE3-AD64-DF9E61328D90}" presName="hierChild4" presStyleCnt="0"/>
+      <dgm:spPr/>
+    </dgm:pt>
+    <dgm:pt modelId="{B474A36A-279D-4C92-9D26-41BC1F9BD140}" type="pres">
+      <dgm:prSet presAssocID="{90BCFBA6-F895-4CE3-AD64-DF9E61328D90}" presName="hierChild5" presStyleCnt="0"/>
+      <dgm:spPr/>
+    </dgm:pt>
+    <dgm:pt modelId="{EE0106A1-E5B1-42CF-ACE6-D4517C63B683}" type="pres">
+      <dgm:prSet presAssocID="{FE956D94-D05D-4D03-8567-4FE224FFC262}" presName="Name37" presStyleLbl="parChTrans1D4" presStyleIdx="9" presStyleCnt="10"/>
+      <dgm:spPr/>
+      <dgm:t>
+        <a:bodyPr/>
+        <a:lstStyle/>
+        <a:p>
+          <a:endParaRPr lang="en-US"/>
+        </a:p>
+      </dgm:t>
+    </dgm:pt>
+    <dgm:pt modelId="{AC980134-5BEA-47E9-8A47-A79A642D79BD}" type="pres">
+      <dgm:prSet presAssocID="{4D280E73-C220-4E30-B63E-9B1739A95856}" presName="hierRoot2" presStyleCnt="0">
+        <dgm:presLayoutVars>
+          <dgm:hierBranch val="init"/>
+        </dgm:presLayoutVars>
+      </dgm:prSet>
+      <dgm:spPr/>
+    </dgm:pt>
+    <dgm:pt modelId="{B8847EBD-6637-4EAE-A455-E45EC2DB97D9}" type="pres">
+      <dgm:prSet presAssocID="{4D280E73-C220-4E30-B63E-9B1739A95856}" presName="rootComposite" presStyleCnt="0"/>
+      <dgm:spPr/>
+    </dgm:pt>
+    <dgm:pt modelId="{B9264E8D-B910-4FA7-ACF4-6F1FAD9F38C2}" type="pres">
+      <dgm:prSet presAssocID="{4D280E73-C220-4E30-B63E-9B1739A95856}" presName="rootText" presStyleLbl="node4" presStyleIdx="9" presStyleCnt="10">
+        <dgm:presLayoutVars>
+          <dgm:chPref val="3"/>
+        </dgm:presLayoutVars>
+      </dgm:prSet>
+      <dgm:spPr/>
+      <dgm:t>
+        <a:bodyPr/>
+        <a:lstStyle/>
+        <a:p>
+          <a:endParaRPr lang="en-US"/>
+        </a:p>
+      </dgm:t>
+    </dgm:pt>
+    <dgm:pt modelId="{799469BD-9AEA-4CEB-806D-325C3C43584F}" type="pres">
+      <dgm:prSet presAssocID="{4D280E73-C220-4E30-B63E-9B1739A95856}" presName="rootConnector" presStyleLbl="node4" presStyleIdx="9" presStyleCnt="10"/>
+      <dgm:spPr/>
+      <dgm:t>
+        <a:bodyPr/>
+        <a:lstStyle/>
+        <a:p>
+          <a:endParaRPr lang="en-US"/>
+        </a:p>
+      </dgm:t>
+    </dgm:pt>
+    <dgm:pt modelId="{AAF291CD-8192-48C8-A2F5-14BA98CCA2DA}" type="pres">
+      <dgm:prSet presAssocID="{4D280E73-C220-4E30-B63E-9B1739A95856}" presName="hierChild4" presStyleCnt="0"/>
+      <dgm:spPr/>
+    </dgm:pt>
+    <dgm:pt modelId="{3B26F720-21B9-4917-925C-4B8DBC62E4BD}" type="pres">
+      <dgm:prSet presAssocID="{4D280E73-C220-4E30-B63E-9B1739A95856}" presName="hierChild5" presStyleCnt="0"/>
+      <dgm:spPr/>
+    </dgm:pt>
+    <dgm:pt modelId="{7E90A091-0F8C-4768-83FE-93C36231FE07}" type="pres">
+      <dgm:prSet presAssocID="{7A3C7205-EAAC-4B5D-915D-5FE855339856}" presName="hierChild5" presStyleCnt="0"/>
+      <dgm:spPr/>
+    </dgm:pt>
+    <dgm:pt modelId="{1AD96763-63C0-4FA5-8EA5-118782686E59}" type="pres">
+      <dgm:prSet presAssocID="{61D67F75-F592-4776-8F53-A7589C845C0E}" presName="Name37" presStyleLbl="parChTrans1D3" presStyleIdx="4" presStyleCnt="5"/>
+      <dgm:spPr/>
+      <dgm:t>
+        <a:bodyPr/>
+        <a:lstStyle/>
+        <a:p>
+          <a:endParaRPr lang="en-US"/>
+        </a:p>
+      </dgm:t>
+    </dgm:pt>
+    <dgm:pt modelId="{836AA608-AAC1-4231-B09C-F4BD8C4B3974}" type="pres">
+      <dgm:prSet presAssocID="{42EDB7D4-A283-43B3-B2C1-8C2292516AF5}" presName="hierRoot2" presStyleCnt="0">
+        <dgm:presLayoutVars>
+          <dgm:hierBranch val="init"/>
+        </dgm:presLayoutVars>
+      </dgm:prSet>
+      <dgm:spPr/>
+    </dgm:pt>
+    <dgm:pt modelId="{4A04527F-C274-4949-8686-C21185B4D623}" type="pres">
+      <dgm:prSet presAssocID="{42EDB7D4-A283-43B3-B2C1-8C2292516AF5}" presName="rootComposite" presStyleCnt="0"/>
+      <dgm:spPr/>
+    </dgm:pt>
+    <dgm:pt modelId="{CEEAAF22-0B04-45D0-8A00-642A0031A2A2}" type="pres">
+      <dgm:prSet presAssocID="{42EDB7D4-A283-43B3-B2C1-8C2292516AF5}" presName="rootText" presStyleLbl="node3" presStyleIdx="4" presStyleCnt="5">
+        <dgm:presLayoutVars>
+          <dgm:chPref val="3"/>
+        </dgm:presLayoutVars>
+      </dgm:prSet>
+      <dgm:spPr/>
+      <dgm:t>
+        <a:bodyPr/>
+        <a:lstStyle/>
+        <a:p>
+          <a:endParaRPr lang="en-US"/>
+        </a:p>
+      </dgm:t>
+    </dgm:pt>
     <dgm:pt modelId="{8FA63504-6396-444A-882B-9FA3141E2465}" type="pres">
       <dgm:prSet presAssocID="{42EDB7D4-A283-43B3-B2C1-8C2292516AF5}" presName="rootConnector" presStyleLbl="node3" presStyleIdx="4" presStyleCnt="5"/>
       <dgm:spPr/>
+      <dgm:t>
+        <a:bodyPr/>
+        <a:lstStyle/>
+        <a:p>
+          <a:endParaRPr lang="en-US"/>
+        </a:p>
+      </dgm:t>
     </dgm:pt>
     <dgm:pt modelId="{EA006D3E-6E76-4450-BCBC-87F0F8494791}" type="pres">
       <dgm:prSet presAssocID="{42EDB7D4-A283-43B3-B2C1-8C2292516AF5}" presName="hierChild4" presStyleCnt="0"/>
@@ -3503,8 +3827,8 @@
     <dgm:cxn modelId="{A6CF6271-3CF8-4D40-9F92-DBE099EED50A}" type="presOf" srcId="{FE956D94-D05D-4D03-8567-4FE224FFC262}" destId="{EE0106A1-E5B1-42CF-ACE6-D4517C63B683}" srcOrd="0" destOrd="0" presId="urn:microsoft.com/office/officeart/2005/8/layout/orgChart1"/>
     <dgm:cxn modelId="{06DE750B-626C-4088-B7B3-94286FCF6508}" type="presOf" srcId="{2CAB26BC-C5D9-46DC-A754-0BC5C13823DA}" destId="{16D09170-3A44-4A74-89DF-E76112F215EE}" srcOrd="0" destOrd="0" presId="urn:microsoft.com/office/officeart/2005/8/layout/orgChart1"/>
     <dgm:cxn modelId="{5AD7452F-3031-4D05-B3E6-C8DA3E745134}" type="presOf" srcId="{8C1B2657-5F7E-404A-8CE0-B4A07CF673E2}" destId="{5ECA00EF-B94E-4E22-A142-A63424C6E283}" srcOrd="0" destOrd="0" presId="urn:microsoft.com/office/officeart/2005/8/layout/orgChart1"/>
+    <dgm:cxn modelId="{2724335C-91C5-4ABE-B28F-FF0D6D611DEA}" type="presOf" srcId="{42EDB7D4-A283-43B3-B2C1-8C2292516AF5}" destId="{8FA63504-6396-444A-882B-9FA3141E2465}" srcOrd="1" destOrd="0" presId="urn:microsoft.com/office/officeart/2005/8/layout/orgChart1"/>
     <dgm:cxn modelId="{C57527B2-7BC5-4A09-A7B0-6DB3867EA357}" type="presOf" srcId="{6C6B25E2-10A9-4E80-85A1-564097713135}" destId="{E4E57F41-042F-45A5-8D92-5723CFA79F87}" srcOrd="0" destOrd="0" presId="urn:microsoft.com/office/officeart/2005/8/layout/orgChart1"/>
-    <dgm:cxn modelId="{2724335C-91C5-4ABE-B28F-FF0D6D611DEA}" type="presOf" srcId="{42EDB7D4-A283-43B3-B2C1-8C2292516AF5}" destId="{8FA63504-6396-444A-882B-9FA3141E2465}" srcOrd="1" destOrd="0" presId="urn:microsoft.com/office/officeart/2005/8/layout/orgChart1"/>
     <dgm:cxn modelId="{3B3FD2CE-09D9-4DDC-9BF4-18FE03D7A5D1}" srcId="{2EBD4A55-9279-4BC6-A6FA-9FC62D72F31C}" destId="{62CD2F92-67D1-42F2-82D8-E44BA13F5871}" srcOrd="0" destOrd="0" parTransId="{7BE560D8-C2A5-4694-A3CC-4AAECDF3A8D2}" sibTransId="{F5C65613-03A1-4C46-9A3C-874711BFD563}"/>
     <dgm:cxn modelId="{C6568566-7E4B-4208-9D7A-929AEA3C3153}" type="presOf" srcId="{083F4181-BB32-437B-9476-74609C2591A2}" destId="{FF785875-DC96-4A01-A6B2-EA63D58F4FEB}" srcOrd="1" destOrd="0" presId="urn:microsoft.com/office/officeart/2005/8/layout/orgChart1"/>
     <dgm:cxn modelId="{231AFDB7-134F-4C1A-B9C8-47E20EF46913}" type="presOf" srcId="{69C11C85-A3AC-4B3B-8603-00C0E053F7D0}" destId="{72EDD89F-F6D4-4B35-988A-0EF5C924C88B}" srcOrd="0" destOrd="0" presId="urn:microsoft.com/office/officeart/2005/8/layout/orgChart1"/>
@@ -12456,13 +12780,8 @@
           <a:p>
             <a:r>
               <a:rPr lang="en-IN" dirty="0" smtClean="0"/>
-              <a:t>Primary </a:t>
-            </a:r>
-            <a:r>
-              <a:rPr lang="en-IN" dirty="0" smtClean="0"/>
-              <a:t>Consumers</a:t>
-            </a:r>
-            <a:endParaRPr lang="en-IN" dirty="0" smtClean="0"/>
+              <a:t>Primary Consumers</a:t>
+            </a:r>
           </a:p>
           <a:p>
             <a:pPr lvl="1"/>
@@ -12476,15 +12795,7 @@
                   <a:srgbClr val="FF0000"/>
                 </a:solidFill>
               </a:rPr>
-              <a:t>P</a:t>
-            </a:r>
-            <a:r>
-              <a:rPr lang="en-IN" dirty="0" smtClean="0">
-                <a:solidFill>
-                  <a:srgbClr val="FF0000"/>
-                </a:solidFill>
-              </a:rPr>
-              <a:t>lants</a:t>
+              <a:t>Plants</a:t>
             </a:r>
           </a:p>
           <a:p>
@@ -12609,11 +12920,6 @@
               </a:rPr>
               <a:t>Herbivores</a:t>
             </a:r>
-            <a:endParaRPr lang="en-IN" dirty="0" smtClean="0">
-              <a:solidFill>
-                <a:srgbClr val="FF0000"/>
-              </a:solidFill>
-            </a:endParaRPr>
           </a:p>
           <a:p>
             <a:pPr lvl="1"/>
@@ -12823,13 +13129,8 @@
             <a:pPr lvl="1"/>
             <a:r>
               <a:rPr lang="en-IN" dirty="0" smtClean="0"/>
-              <a:t>Also know as </a:t>
-            </a:r>
-            <a:r>
-              <a:rPr lang="en-IN" dirty="0" smtClean="0"/>
-              <a:t>large carnivores </a:t>
-            </a:r>
-            <a:endParaRPr lang="en-IN" dirty="0" smtClean="0"/>
+              <a:t>Also know as large carnivores </a:t>
+            </a:r>
           </a:p>
           <a:p>
             <a:endParaRPr lang="en-US" dirty="0"/>
@@ -13826,6 +14127,181 @@
 </file>
 
 <file path=ppt/slides/slide25.xml><?xml version="1.0" encoding="utf-8"?>
+<p:sld xmlns:a="http://schemas.openxmlformats.org/drawingml/2006/main" xmlns:r="http://schemas.openxmlformats.org/officeDocument/2006/relationships" xmlns:p="http://schemas.openxmlformats.org/presentationml/2006/main">
+  <p:cSld>
+    <p:spTree>
+      <p:nvGrpSpPr>
+        <p:cNvPr id="1" name=""/>
+        <p:cNvGrpSpPr/>
+        <p:nvPr/>
+      </p:nvGrpSpPr>
+      <p:grpSpPr>
+        <a:xfrm>
+          <a:off x="0" y="0"/>
+          <a:ext cx="0" cy="0"/>
+          <a:chOff x="0" y="0"/>
+          <a:chExt cx="0" cy="0"/>
+        </a:xfrm>
+      </p:grpSpPr>
+      <p:sp>
+        <p:nvSpPr>
+          <p:cNvPr id="2" name="Title 1"/>
+          <p:cNvSpPr>
+            <a:spLocks noGrp="1"/>
+          </p:cNvSpPr>
+          <p:nvPr>
+            <p:ph type="title"/>
+          </p:nvPr>
+        </p:nvSpPr>
+        <p:spPr/>
+        <p:txBody>
+          <a:bodyPr/>
+          <a:lstStyle/>
+          <a:p>
+            <a:r>
+              <a:rPr lang="en-IN" dirty="0" smtClean="0"/>
+              <a:t>Ecological Pyramid</a:t>
+            </a:r>
+            <a:endParaRPr lang="en-US" dirty="0"/>
+          </a:p>
+        </p:txBody>
+      </p:sp>
+      <p:sp>
+        <p:nvSpPr>
+          <p:cNvPr id="3" name="Content Placeholder 2"/>
+          <p:cNvSpPr>
+            <a:spLocks noGrp="1"/>
+          </p:cNvSpPr>
+          <p:nvPr>
+            <p:ph idx="1"/>
+          </p:nvPr>
+        </p:nvSpPr>
+        <p:spPr/>
+        <p:txBody>
+          <a:bodyPr/>
+          <a:lstStyle/>
+          <a:p>
+            <a:pPr algn="just"/>
+            <a:r>
+              <a:rPr lang="en-IN" dirty="0" smtClean="0"/>
+              <a:t>The graphical representation of structure and function of each tropic level of an ecosystems are referred as ecological pyramid.</a:t>
+            </a:r>
+          </a:p>
+          <a:p>
+            <a:pPr algn="just"/>
+            <a:endParaRPr lang="en-US" dirty="0"/>
+          </a:p>
+        </p:txBody>
+      </p:sp>
+      <p:pic>
+        <p:nvPicPr>
+          <p:cNvPr id="1026" name="Picture 2" descr="Image result for ecological pyramid"/>
+          <p:cNvPicPr>
+            <a:picLocks noChangeAspect="1" noChangeArrowheads="1"/>
+          </p:cNvPicPr>
+          <p:nvPr/>
+        </p:nvPicPr>
+        <p:blipFill>
+          <a:blip r:embed="rId2"/>
+          <a:srcRect/>
+          <a:stretch>
+            <a:fillRect/>
+          </a:stretch>
+        </p:blipFill>
+        <p:spPr bwMode="auto">
+          <a:xfrm>
+            <a:off x="3143240" y="3500438"/>
+            <a:ext cx="3743325" cy="3105150"/>
+          </a:xfrm>
+          <a:prstGeom prst="rect">
+            <a:avLst/>
+          </a:prstGeom>
+          <a:noFill/>
+        </p:spPr>
+      </p:pic>
+    </p:spTree>
+  </p:cSld>
+  <p:clrMapOvr>
+    <a:masterClrMapping/>
+  </p:clrMapOvr>
+</p:sld>
+</file>
+
+<file path=ppt/slides/slide26.xml><?xml version="1.0" encoding="utf-8"?>
+<p:sld xmlns:a="http://schemas.openxmlformats.org/drawingml/2006/main" xmlns:r="http://schemas.openxmlformats.org/officeDocument/2006/relationships" xmlns:p="http://schemas.openxmlformats.org/presentationml/2006/main">
+  <p:cSld>
+    <p:spTree>
+      <p:nvGrpSpPr>
+        <p:cNvPr id="1" name=""/>
+        <p:cNvGrpSpPr/>
+        <p:nvPr/>
+      </p:nvGrpSpPr>
+      <p:grpSpPr>
+        <a:xfrm>
+          <a:off x="0" y="0"/>
+          <a:ext cx="0" cy="0"/>
+          <a:chOff x="0" y="0"/>
+          <a:chExt cx="0" cy="0"/>
+        </a:xfrm>
+      </p:grpSpPr>
+      <p:sp>
+        <p:nvSpPr>
+          <p:cNvPr id="2" name="Title 1"/>
+          <p:cNvSpPr>
+            <a:spLocks noGrp="1"/>
+          </p:cNvSpPr>
+          <p:nvPr>
+            <p:ph type="title"/>
+          </p:nvPr>
+        </p:nvSpPr>
+        <p:spPr/>
+        <p:txBody>
+          <a:bodyPr/>
+          <a:lstStyle/>
+          <a:p>
+            <a:r>
+              <a:rPr lang="en-IN" dirty="0" smtClean="0"/>
+              <a:t>Energy Level Pyramid</a:t>
+            </a:r>
+            <a:endParaRPr lang="en-US" dirty="0"/>
+          </a:p>
+        </p:txBody>
+      </p:sp>
+      <p:pic>
+        <p:nvPicPr>
+          <p:cNvPr id="40962" name="Picture 2" descr="Image result for energy pyramid"/>
+          <p:cNvPicPr>
+            <a:picLocks noChangeAspect="1" noChangeArrowheads="1"/>
+          </p:cNvPicPr>
+          <p:nvPr/>
+        </p:nvPicPr>
+        <p:blipFill>
+          <a:blip r:embed="rId2"/>
+          <a:srcRect/>
+          <a:stretch>
+            <a:fillRect/>
+          </a:stretch>
+        </p:blipFill>
+        <p:spPr bwMode="auto">
+          <a:xfrm>
+            <a:off x="1571604" y="1714488"/>
+            <a:ext cx="5429250" cy="4619626"/>
+          </a:xfrm>
+          <a:prstGeom prst="rect">
+            <a:avLst/>
+          </a:prstGeom>
+          <a:noFill/>
+        </p:spPr>
+      </p:pic>
+    </p:spTree>
+  </p:cSld>
+  <p:clrMapOvr>
+    <a:masterClrMapping/>
+  </p:clrMapOvr>
+</p:sld>
+</file>
+
+<file path=ppt/slides/slide27.xml><?xml version="1.0" encoding="utf-8"?>
 <p:sld xmlns:a="http://schemas.openxmlformats.org/drawingml/2006/main" xmlns:r="http://schemas.openxmlformats.org/officeDocument/2006/relationships" xmlns:p="http://schemas.openxmlformats.org/presentationml/2006/main">
   <p:cSld>
     <p:spTree>

</xml_diff>

<commit_message>
Last Update 21-12-2018 12:25:39.93
</commit_message>
<xml_diff>
--- a/Slides/GE8291-U1.pptx
+++ b/Slides/GE8291-U1.pptx
@@ -5,7 +5,7 @@
     <p:sldMasterId id="2147483648" r:id="rId1"/>
   </p:sldMasterIdLst>
   <p:notesMasterIdLst>
-    <p:notesMasterId r:id="rId46"/>
+    <p:notesMasterId r:id="rId62"/>
   </p:notesMasterIdLst>
   <p:sldIdLst>
     <p:sldId id="256" r:id="rId2"/>
@@ -51,7 +51,23 @@
     <p:sldId id="313" r:id="rId42"/>
     <p:sldId id="314" r:id="rId43"/>
     <p:sldId id="316" r:id="rId44"/>
-    <p:sldId id="272" r:id="rId45"/>
+    <p:sldId id="327" r:id="rId45"/>
+    <p:sldId id="317" r:id="rId46"/>
+    <p:sldId id="319" r:id="rId47"/>
+    <p:sldId id="320" r:id="rId48"/>
+    <p:sldId id="321" r:id="rId49"/>
+    <p:sldId id="322" r:id="rId50"/>
+    <p:sldId id="324" r:id="rId51"/>
+    <p:sldId id="323" r:id="rId52"/>
+    <p:sldId id="325" r:id="rId53"/>
+    <p:sldId id="328" r:id="rId54"/>
+    <p:sldId id="331" r:id="rId55"/>
+    <p:sldId id="326" r:id="rId56"/>
+    <p:sldId id="329" r:id="rId57"/>
+    <p:sldId id="330" r:id="rId58"/>
+    <p:sldId id="332" r:id="rId59"/>
+    <p:sldId id="333" r:id="rId60"/>
+    <p:sldId id="272" r:id="rId61"/>
   </p:sldIdLst>
   <p:sldSz cx="9144000" cy="6858000" type="screen4x3"/>
   <p:notesSz cx="6858000" cy="9144000"/>
@@ -6429,11 +6445,7 @@
         <a:p>
           <a:r>
             <a:rPr lang="en-IN" sz="4400" dirty="0" smtClean="0"/>
-            <a:t>Primary  </a:t>
-          </a:r>
-          <a:r>
-            <a:rPr lang="en-IN" sz="4400" dirty="0" smtClean="0"/>
-            <a:t>Succession</a:t>
+            <a:t>Primary  Succession</a:t>
           </a:r>
           <a:endParaRPr lang="en-US" sz="4400" dirty="0"/>
         </a:p>
@@ -6473,26 +6485,6 @@
         </dgm:presLayoutVars>
       </dgm:prSet>
       <dgm:spPr/>
-    </dgm:pt>
-    <dgm:pt modelId="{ED1A191C-F5F1-44CE-969B-D7777D655B40}" type="pres">
-      <dgm:prSet presAssocID="{E5E5FAC6-6137-493A-AFCF-48F0DB7E5841}" presName="hierRoot1" presStyleCnt="0">
-        <dgm:presLayoutVars>
-          <dgm:hierBranch val="init"/>
-        </dgm:presLayoutVars>
-      </dgm:prSet>
-      <dgm:spPr/>
-    </dgm:pt>
-    <dgm:pt modelId="{8573027C-1730-4E2F-8252-C400E4CB13D1}" type="pres">
-      <dgm:prSet presAssocID="{E5E5FAC6-6137-493A-AFCF-48F0DB7E5841}" presName="rootComposite1" presStyleCnt="0"/>
-      <dgm:spPr/>
-    </dgm:pt>
-    <dgm:pt modelId="{027085D2-6C34-4733-9E48-D4023F973D39}" type="pres">
-      <dgm:prSet presAssocID="{E5E5FAC6-6137-493A-AFCF-48F0DB7E5841}" presName="rootText1" presStyleLbl="node0" presStyleIdx="0" presStyleCnt="1">
-        <dgm:presLayoutVars>
-          <dgm:chPref val="3"/>
-        </dgm:presLayoutVars>
-      </dgm:prSet>
-      <dgm:spPr/>
       <dgm:t>
         <a:bodyPr/>
         <a:lstStyle/>
@@ -6501,68 +6493,20 @@
         </a:p>
       </dgm:t>
     </dgm:pt>
-    <dgm:pt modelId="{092955F6-5152-42F7-A936-98A57A547EE7}" type="pres">
-      <dgm:prSet presAssocID="{E5E5FAC6-6137-493A-AFCF-48F0DB7E5841}" presName="rootConnector1" presStyleLbl="node1" presStyleIdx="0" presStyleCnt="0"/>
-      <dgm:spPr/>
-    </dgm:pt>
-    <dgm:pt modelId="{F01BF0C3-060C-4EA2-8A0B-D9051CF8A1F6}" type="pres">
-      <dgm:prSet presAssocID="{E5E5FAC6-6137-493A-AFCF-48F0DB7E5841}" presName="hierChild2" presStyleCnt="0"/>
-      <dgm:spPr/>
-    </dgm:pt>
-    <dgm:pt modelId="{FFFFF3DB-F186-430A-9FD4-5E501E28B13A}" type="pres">
-      <dgm:prSet presAssocID="{5E8BD9AC-D52D-41EE-A2C4-EF4216569D2C}" presName="Name37" presStyleLbl="parChTrans1D2" presStyleIdx="0" presStyleCnt="2"/>
-      <dgm:spPr/>
-    </dgm:pt>
-    <dgm:pt modelId="{29BB77F8-E775-429B-B3EB-632F058776DF}" type="pres">
-      <dgm:prSet presAssocID="{CBBFD718-5C73-4CA7-A8C1-B95794128BF8}" presName="hierRoot2" presStyleCnt="0">
+    <dgm:pt modelId="{ED1A191C-F5F1-44CE-969B-D7777D655B40}" type="pres">
+      <dgm:prSet presAssocID="{E5E5FAC6-6137-493A-AFCF-48F0DB7E5841}" presName="hierRoot1" presStyleCnt="0">
         <dgm:presLayoutVars>
           <dgm:hierBranch val="init"/>
         </dgm:presLayoutVars>
       </dgm:prSet>
       <dgm:spPr/>
     </dgm:pt>
-    <dgm:pt modelId="{48E0D862-AC45-41CB-AA07-0C324958F413}" type="pres">
-      <dgm:prSet presAssocID="{CBBFD718-5C73-4CA7-A8C1-B95794128BF8}" presName="rootComposite" presStyleCnt="0"/>
-      <dgm:spPr/>
-    </dgm:pt>
-    <dgm:pt modelId="{0A077FA9-5195-4CA5-9B9E-9404BD96984F}" type="pres">
-      <dgm:prSet presAssocID="{CBBFD718-5C73-4CA7-A8C1-B95794128BF8}" presName="rootText" presStyleLbl="node2" presStyleIdx="0" presStyleCnt="2">
-        <dgm:presLayoutVars>
-          <dgm:chPref val="3"/>
-        </dgm:presLayoutVars>
-      </dgm:prSet>
-      <dgm:spPr/>
-    </dgm:pt>
-    <dgm:pt modelId="{5DCD1722-B9E1-4CC8-A323-22382DE4F7DF}" type="pres">
-      <dgm:prSet presAssocID="{CBBFD718-5C73-4CA7-A8C1-B95794128BF8}" presName="rootConnector" presStyleLbl="node2" presStyleIdx="0" presStyleCnt="2"/>
-      <dgm:spPr/>
-    </dgm:pt>
-    <dgm:pt modelId="{BB11FBE9-57AE-4416-8321-7385A7C0D98B}" type="pres">
-      <dgm:prSet presAssocID="{CBBFD718-5C73-4CA7-A8C1-B95794128BF8}" presName="hierChild4" presStyleCnt="0"/>
-      <dgm:spPr/>
-    </dgm:pt>
-    <dgm:pt modelId="{980D4C83-C6A8-406A-A50E-565BB06E57D0}" type="pres">
-      <dgm:prSet presAssocID="{CBBFD718-5C73-4CA7-A8C1-B95794128BF8}" presName="hierChild5" presStyleCnt="0"/>
-      <dgm:spPr/>
-    </dgm:pt>
-    <dgm:pt modelId="{4CEB6F93-9673-4746-858E-29CC1BB14E77}" type="pres">
-      <dgm:prSet presAssocID="{C10FD2ED-AEDE-4125-A5DE-7081129DB763}" presName="Name37" presStyleLbl="parChTrans1D2" presStyleIdx="1" presStyleCnt="2"/>
-      <dgm:spPr/>
-    </dgm:pt>
-    <dgm:pt modelId="{9933A808-ECF2-4B33-A883-2E91B70E54BA}" type="pres">
-      <dgm:prSet presAssocID="{7744D2B1-315B-4DC3-B122-A3153F29193E}" presName="hierRoot2" presStyleCnt="0">
-        <dgm:presLayoutVars>
-          <dgm:hierBranch val="init"/>
-        </dgm:presLayoutVars>
-      </dgm:prSet>
-      <dgm:spPr/>
-    </dgm:pt>
-    <dgm:pt modelId="{480DDE15-6E23-49C0-9E2A-37525111835B}" type="pres">
-      <dgm:prSet presAssocID="{7744D2B1-315B-4DC3-B122-A3153F29193E}" presName="rootComposite" presStyleCnt="0"/>
-      <dgm:spPr/>
-    </dgm:pt>
-    <dgm:pt modelId="{4CD82B40-3485-4437-9838-A88F5B5F8179}" type="pres">
-      <dgm:prSet presAssocID="{7744D2B1-315B-4DC3-B122-A3153F29193E}" presName="rootText" presStyleLbl="node2" presStyleIdx="1" presStyleCnt="2">
+    <dgm:pt modelId="{8573027C-1730-4E2F-8252-C400E4CB13D1}" type="pres">
+      <dgm:prSet presAssocID="{E5E5FAC6-6137-493A-AFCF-48F0DB7E5841}" presName="rootComposite1" presStyleCnt="0"/>
+      <dgm:spPr/>
+    </dgm:pt>
+    <dgm:pt modelId="{027085D2-6C34-4733-9E48-D4023F973D39}" type="pres">
+      <dgm:prSet presAssocID="{E5E5FAC6-6137-493A-AFCF-48F0DB7E5841}" presName="rootText1" presStyleLbl="node0" presStyleIdx="0" presStyleCnt="1">
         <dgm:presLayoutVars>
           <dgm:chPref val="3"/>
         </dgm:presLayoutVars>
@@ -6576,9 +6520,126 @@
         </a:p>
       </dgm:t>
     </dgm:pt>
+    <dgm:pt modelId="{092955F6-5152-42F7-A936-98A57A547EE7}" type="pres">
+      <dgm:prSet presAssocID="{E5E5FAC6-6137-493A-AFCF-48F0DB7E5841}" presName="rootConnector1" presStyleLbl="node1" presStyleIdx="0" presStyleCnt="0"/>
+      <dgm:spPr/>
+      <dgm:t>
+        <a:bodyPr/>
+        <a:lstStyle/>
+        <a:p>
+          <a:endParaRPr lang="en-US"/>
+        </a:p>
+      </dgm:t>
+    </dgm:pt>
+    <dgm:pt modelId="{F01BF0C3-060C-4EA2-8A0B-D9051CF8A1F6}" type="pres">
+      <dgm:prSet presAssocID="{E5E5FAC6-6137-493A-AFCF-48F0DB7E5841}" presName="hierChild2" presStyleCnt="0"/>
+      <dgm:spPr/>
+    </dgm:pt>
+    <dgm:pt modelId="{FFFFF3DB-F186-430A-9FD4-5E501E28B13A}" type="pres">
+      <dgm:prSet presAssocID="{5E8BD9AC-D52D-41EE-A2C4-EF4216569D2C}" presName="Name37" presStyleLbl="parChTrans1D2" presStyleIdx="0" presStyleCnt="2"/>
+      <dgm:spPr/>
+      <dgm:t>
+        <a:bodyPr/>
+        <a:lstStyle/>
+        <a:p>
+          <a:endParaRPr lang="en-US"/>
+        </a:p>
+      </dgm:t>
+    </dgm:pt>
+    <dgm:pt modelId="{29BB77F8-E775-429B-B3EB-632F058776DF}" type="pres">
+      <dgm:prSet presAssocID="{CBBFD718-5C73-4CA7-A8C1-B95794128BF8}" presName="hierRoot2" presStyleCnt="0">
+        <dgm:presLayoutVars>
+          <dgm:hierBranch val="init"/>
+        </dgm:presLayoutVars>
+      </dgm:prSet>
+      <dgm:spPr/>
+    </dgm:pt>
+    <dgm:pt modelId="{48E0D862-AC45-41CB-AA07-0C324958F413}" type="pres">
+      <dgm:prSet presAssocID="{CBBFD718-5C73-4CA7-A8C1-B95794128BF8}" presName="rootComposite" presStyleCnt="0"/>
+      <dgm:spPr/>
+    </dgm:pt>
+    <dgm:pt modelId="{0A077FA9-5195-4CA5-9B9E-9404BD96984F}" type="pres">
+      <dgm:prSet presAssocID="{CBBFD718-5C73-4CA7-A8C1-B95794128BF8}" presName="rootText" presStyleLbl="node2" presStyleIdx="0" presStyleCnt="2">
+        <dgm:presLayoutVars>
+          <dgm:chPref val="3"/>
+        </dgm:presLayoutVars>
+      </dgm:prSet>
+      <dgm:spPr/>
+      <dgm:t>
+        <a:bodyPr/>
+        <a:lstStyle/>
+        <a:p>
+          <a:endParaRPr lang="en-US"/>
+        </a:p>
+      </dgm:t>
+    </dgm:pt>
+    <dgm:pt modelId="{5DCD1722-B9E1-4CC8-A323-22382DE4F7DF}" type="pres">
+      <dgm:prSet presAssocID="{CBBFD718-5C73-4CA7-A8C1-B95794128BF8}" presName="rootConnector" presStyleLbl="node2" presStyleIdx="0" presStyleCnt="2"/>
+      <dgm:spPr/>
+      <dgm:t>
+        <a:bodyPr/>
+        <a:lstStyle/>
+        <a:p>
+          <a:endParaRPr lang="en-US"/>
+        </a:p>
+      </dgm:t>
+    </dgm:pt>
+    <dgm:pt modelId="{BB11FBE9-57AE-4416-8321-7385A7C0D98B}" type="pres">
+      <dgm:prSet presAssocID="{CBBFD718-5C73-4CA7-A8C1-B95794128BF8}" presName="hierChild4" presStyleCnt="0"/>
+      <dgm:spPr/>
+    </dgm:pt>
+    <dgm:pt modelId="{980D4C83-C6A8-406A-A50E-565BB06E57D0}" type="pres">
+      <dgm:prSet presAssocID="{CBBFD718-5C73-4CA7-A8C1-B95794128BF8}" presName="hierChild5" presStyleCnt="0"/>
+      <dgm:spPr/>
+    </dgm:pt>
+    <dgm:pt modelId="{4CEB6F93-9673-4746-858E-29CC1BB14E77}" type="pres">
+      <dgm:prSet presAssocID="{C10FD2ED-AEDE-4125-A5DE-7081129DB763}" presName="Name37" presStyleLbl="parChTrans1D2" presStyleIdx="1" presStyleCnt="2"/>
+      <dgm:spPr/>
+      <dgm:t>
+        <a:bodyPr/>
+        <a:lstStyle/>
+        <a:p>
+          <a:endParaRPr lang="en-US"/>
+        </a:p>
+      </dgm:t>
+    </dgm:pt>
+    <dgm:pt modelId="{9933A808-ECF2-4B33-A883-2E91B70E54BA}" type="pres">
+      <dgm:prSet presAssocID="{7744D2B1-315B-4DC3-B122-A3153F29193E}" presName="hierRoot2" presStyleCnt="0">
+        <dgm:presLayoutVars>
+          <dgm:hierBranch val="init"/>
+        </dgm:presLayoutVars>
+      </dgm:prSet>
+      <dgm:spPr/>
+    </dgm:pt>
+    <dgm:pt modelId="{480DDE15-6E23-49C0-9E2A-37525111835B}" type="pres">
+      <dgm:prSet presAssocID="{7744D2B1-315B-4DC3-B122-A3153F29193E}" presName="rootComposite" presStyleCnt="0"/>
+      <dgm:spPr/>
+    </dgm:pt>
+    <dgm:pt modelId="{4CD82B40-3485-4437-9838-A88F5B5F8179}" type="pres">
+      <dgm:prSet presAssocID="{7744D2B1-315B-4DC3-B122-A3153F29193E}" presName="rootText" presStyleLbl="node2" presStyleIdx="1" presStyleCnt="2">
+        <dgm:presLayoutVars>
+          <dgm:chPref val="3"/>
+        </dgm:presLayoutVars>
+      </dgm:prSet>
+      <dgm:spPr/>
+      <dgm:t>
+        <a:bodyPr/>
+        <a:lstStyle/>
+        <a:p>
+          <a:endParaRPr lang="en-US"/>
+        </a:p>
+      </dgm:t>
+    </dgm:pt>
     <dgm:pt modelId="{84052D5F-2742-4104-96ED-E0512FF76418}" type="pres">
       <dgm:prSet presAssocID="{7744D2B1-315B-4DC3-B122-A3153F29193E}" presName="rootConnector" presStyleLbl="node2" presStyleIdx="1" presStyleCnt="2"/>
       <dgm:spPr/>
+      <dgm:t>
+        <a:bodyPr/>
+        <a:lstStyle/>
+        <a:p>
+          <a:endParaRPr lang="en-US"/>
+        </a:p>
+      </dgm:t>
     </dgm:pt>
     <dgm:pt modelId="{DE4F60A7-CFD7-42D8-951B-1761BC4DACE5}" type="pres">
       <dgm:prSet presAssocID="{7744D2B1-315B-4DC3-B122-A3153F29193E}" presName="hierChild4" presStyleCnt="0"/>
@@ -6594,18 +6655,18 @@
     </dgm:pt>
   </dgm:ptLst>
   <dgm:cxnLst>
-    <dgm:cxn modelId="{5B8CDEED-5B3A-464A-A4BF-50B28F581222}" type="presOf" srcId="{E5E5FAC6-6137-493A-AFCF-48F0DB7E5841}" destId="{092955F6-5152-42F7-A936-98A57A547EE7}" srcOrd="1" destOrd="0" presId="urn:microsoft.com/office/officeart/2005/8/layout/orgChart1"/>
-    <dgm:cxn modelId="{C6CA273D-C315-4B51-BAB4-DB836A5DA0BA}" type="presOf" srcId="{7744D2B1-315B-4DC3-B122-A3153F29193E}" destId="{84052D5F-2742-4104-96ED-E0512FF76418}" srcOrd="1" destOrd="0" presId="urn:microsoft.com/office/officeart/2005/8/layout/orgChart1"/>
-    <dgm:cxn modelId="{1EF7433B-1DD2-40B6-B0D3-7DD1B652702D}" type="presOf" srcId="{C10FD2ED-AEDE-4125-A5DE-7081129DB763}" destId="{4CEB6F93-9673-4746-858E-29CC1BB14E77}" srcOrd="0" destOrd="0" presId="urn:microsoft.com/office/officeart/2005/8/layout/orgChart1"/>
-    <dgm:cxn modelId="{0617F088-3F1C-476B-A2A9-B48BA731EFB7}" type="presOf" srcId="{A7570A90-78D5-4E48-A224-D64597EBD661}" destId="{CDE1ACCA-4F6E-40EE-9BE2-28B38AD78DC6}" srcOrd="0" destOrd="0" presId="urn:microsoft.com/office/officeart/2005/8/layout/orgChart1"/>
+    <dgm:cxn modelId="{D8F97A6C-71E6-45CF-8C9E-8B039FFFCE65}" srcId="{E5E5FAC6-6137-493A-AFCF-48F0DB7E5841}" destId="{7744D2B1-315B-4DC3-B122-A3153F29193E}" srcOrd="1" destOrd="0" parTransId="{C10FD2ED-AEDE-4125-A5DE-7081129DB763}" sibTransId="{98818A19-52F1-41BA-A410-963E704CB68F}"/>
+    <dgm:cxn modelId="{F730C472-7353-47FA-B3DA-E9EEEABDC6FA}" srcId="{E5E5FAC6-6137-493A-AFCF-48F0DB7E5841}" destId="{CBBFD718-5C73-4CA7-A8C1-B95794128BF8}" srcOrd="0" destOrd="0" parTransId="{5E8BD9AC-D52D-41EE-A2C4-EF4216569D2C}" sibTransId="{E246867B-BFB4-418B-9332-CB0AA8C7434C}"/>
     <dgm:cxn modelId="{C98D3CF9-BD6E-48D2-9096-5B34436E1472}" type="presOf" srcId="{E5E5FAC6-6137-493A-AFCF-48F0DB7E5841}" destId="{027085D2-6C34-4733-9E48-D4023F973D39}" srcOrd="0" destOrd="0" presId="urn:microsoft.com/office/officeart/2005/8/layout/orgChart1"/>
-    <dgm:cxn modelId="{16FB144F-0713-426E-8D67-D1ABB51B82B3}" type="presOf" srcId="{CBBFD718-5C73-4CA7-A8C1-B95794128BF8}" destId="{0A077FA9-5195-4CA5-9B9E-9404BD96984F}" srcOrd="0" destOrd="0" presId="urn:microsoft.com/office/officeart/2005/8/layout/orgChart1"/>
-    <dgm:cxn modelId="{54C1FDCA-3AE8-4B12-B206-BE1655FE3F75}" srcId="{A7570A90-78D5-4E48-A224-D64597EBD661}" destId="{E5E5FAC6-6137-493A-AFCF-48F0DB7E5841}" srcOrd="0" destOrd="0" parTransId="{0C6655A7-A367-423E-BE05-7D1FF4F5C4D3}" sibTransId="{52F9C9CB-09B3-48E5-B0CD-760993F2307A}"/>
-    <dgm:cxn modelId="{F730C472-7353-47FA-B3DA-E9EEEABDC6FA}" srcId="{E5E5FAC6-6137-493A-AFCF-48F0DB7E5841}" destId="{CBBFD718-5C73-4CA7-A8C1-B95794128BF8}" srcOrd="0" destOrd="0" parTransId="{5E8BD9AC-D52D-41EE-A2C4-EF4216569D2C}" sibTransId="{E246867B-BFB4-418B-9332-CB0AA8C7434C}"/>
     <dgm:cxn modelId="{6BAA1D6D-7240-43B1-B135-656216CA1901}" type="presOf" srcId="{CBBFD718-5C73-4CA7-A8C1-B95794128BF8}" destId="{5DCD1722-B9E1-4CC8-A323-22382DE4F7DF}" srcOrd="1" destOrd="0" presId="urn:microsoft.com/office/officeart/2005/8/layout/orgChart1"/>
     <dgm:cxn modelId="{412D6539-2E12-42CF-BA6C-D61E3F88BFE2}" type="presOf" srcId="{5E8BD9AC-D52D-41EE-A2C4-EF4216569D2C}" destId="{FFFFF3DB-F186-430A-9FD4-5E501E28B13A}" srcOrd="0" destOrd="0" presId="urn:microsoft.com/office/officeart/2005/8/layout/orgChart1"/>
+    <dgm:cxn modelId="{54C1FDCA-3AE8-4B12-B206-BE1655FE3F75}" srcId="{A7570A90-78D5-4E48-A224-D64597EBD661}" destId="{E5E5FAC6-6137-493A-AFCF-48F0DB7E5841}" srcOrd="0" destOrd="0" parTransId="{0C6655A7-A367-423E-BE05-7D1FF4F5C4D3}" sibTransId="{52F9C9CB-09B3-48E5-B0CD-760993F2307A}"/>
+    <dgm:cxn modelId="{0617F088-3F1C-476B-A2A9-B48BA731EFB7}" type="presOf" srcId="{A7570A90-78D5-4E48-A224-D64597EBD661}" destId="{CDE1ACCA-4F6E-40EE-9BE2-28B38AD78DC6}" srcOrd="0" destOrd="0" presId="urn:microsoft.com/office/officeart/2005/8/layout/orgChart1"/>
+    <dgm:cxn modelId="{16FB144F-0713-426E-8D67-D1ABB51B82B3}" type="presOf" srcId="{CBBFD718-5C73-4CA7-A8C1-B95794128BF8}" destId="{0A077FA9-5195-4CA5-9B9E-9404BD96984F}" srcOrd="0" destOrd="0" presId="urn:microsoft.com/office/officeart/2005/8/layout/orgChart1"/>
     <dgm:cxn modelId="{51F23762-D643-4815-9BD3-3F2A1CDE1EF5}" type="presOf" srcId="{7744D2B1-315B-4DC3-B122-A3153F29193E}" destId="{4CD82B40-3485-4437-9838-A88F5B5F8179}" srcOrd="0" destOrd="0" presId="urn:microsoft.com/office/officeart/2005/8/layout/orgChart1"/>
-    <dgm:cxn modelId="{D8F97A6C-71E6-45CF-8C9E-8B039FFFCE65}" srcId="{E5E5FAC6-6137-493A-AFCF-48F0DB7E5841}" destId="{7744D2B1-315B-4DC3-B122-A3153F29193E}" srcOrd="1" destOrd="0" parTransId="{C10FD2ED-AEDE-4125-A5DE-7081129DB763}" sibTransId="{98818A19-52F1-41BA-A410-963E704CB68F}"/>
+    <dgm:cxn modelId="{5B8CDEED-5B3A-464A-A4BF-50B28F581222}" type="presOf" srcId="{E5E5FAC6-6137-493A-AFCF-48F0DB7E5841}" destId="{092955F6-5152-42F7-A936-98A57A547EE7}" srcOrd="1" destOrd="0" presId="urn:microsoft.com/office/officeart/2005/8/layout/orgChart1"/>
+    <dgm:cxn modelId="{1EF7433B-1DD2-40B6-B0D3-7DD1B652702D}" type="presOf" srcId="{C10FD2ED-AEDE-4125-A5DE-7081129DB763}" destId="{4CEB6F93-9673-4746-858E-29CC1BB14E77}" srcOrd="0" destOrd="0" presId="urn:microsoft.com/office/officeart/2005/8/layout/orgChart1"/>
+    <dgm:cxn modelId="{C6CA273D-C315-4B51-BAB4-DB836A5DA0BA}" type="presOf" srcId="{7744D2B1-315B-4DC3-B122-A3153F29193E}" destId="{84052D5F-2742-4104-96ED-E0512FF76418}" srcOrd="1" destOrd="0" presId="urn:microsoft.com/office/officeart/2005/8/layout/orgChart1"/>
     <dgm:cxn modelId="{59343923-2B8A-4CA1-8B1C-4BEFFE237CD6}" type="presParOf" srcId="{CDE1ACCA-4F6E-40EE-9BE2-28B38AD78DC6}" destId="{ED1A191C-F5F1-44CE-969B-D7777D655B40}" srcOrd="0" destOrd="0" presId="urn:microsoft.com/office/officeart/2005/8/layout/orgChart1"/>
     <dgm:cxn modelId="{40BD0139-922B-4F84-9378-4F5E9B299972}" type="presParOf" srcId="{ED1A191C-F5F1-44CE-969B-D7777D655B40}" destId="{8573027C-1730-4E2F-8252-C400E4CB13D1}" srcOrd="0" destOrd="0" presId="urn:microsoft.com/office/officeart/2005/8/layout/orgChart1"/>
     <dgm:cxn modelId="{A8722378-215D-442C-B307-281C2530F7FD}" type="presParOf" srcId="{8573027C-1730-4E2F-8252-C400E4CB13D1}" destId="{027085D2-6C34-4733-9E48-D4023F973D39}" srcOrd="0" destOrd="0" presId="urn:microsoft.com/office/officeart/2005/8/layout/orgChart1"/>
@@ -6951,14 +7012,35 @@
         </dgm:presLayoutVars>
       </dgm:prSet>
       <dgm:spPr/>
+      <dgm:t>
+        <a:bodyPr/>
+        <a:lstStyle/>
+        <a:p>
+          <a:endParaRPr lang="en-US"/>
+        </a:p>
+      </dgm:t>
     </dgm:pt>
     <dgm:pt modelId="{20262314-1671-480A-9E81-70DF05D47B74}" type="pres">
       <dgm:prSet presAssocID="{C5485345-1FEB-4BFA-AE2E-79B532928A84}" presName="sibTrans" presStyleLbl="sibTrans1D1" presStyleIdx="0" presStyleCnt="7"/>
       <dgm:spPr/>
+      <dgm:t>
+        <a:bodyPr/>
+        <a:lstStyle/>
+        <a:p>
+          <a:endParaRPr lang="en-US"/>
+        </a:p>
+      </dgm:t>
     </dgm:pt>
     <dgm:pt modelId="{D10F74A4-29F7-476A-8333-D5A8AF43CB1C}" type="pres">
       <dgm:prSet presAssocID="{C5485345-1FEB-4BFA-AE2E-79B532928A84}" presName="connectorText" presStyleLbl="sibTrans1D1" presStyleIdx="0" presStyleCnt="7"/>
       <dgm:spPr/>
+      <dgm:t>
+        <a:bodyPr/>
+        <a:lstStyle/>
+        <a:p>
+          <a:endParaRPr lang="en-US"/>
+        </a:p>
+      </dgm:t>
     </dgm:pt>
     <dgm:pt modelId="{7084BB0B-BD20-429A-A4CD-AD72DF04F99B}" type="pres">
       <dgm:prSet presAssocID="{E2299760-B0D4-404A-9CB9-A58AC28848AC}" presName="node" presStyleLbl="node1" presStyleIdx="1" presStyleCnt="8">
@@ -6967,14 +7049,35 @@
         </dgm:presLayoutVars>
       </dgm:prSet>
       <dgm:spPr/>
+      <dgm:t>
+        <a:bodyPr/>
+        <a:lstStyle/>
+        <a:p>
+          <a:endParaRPr lang="en-US"/>
+        </a:p>
+      </dgm:t>
     </dgm:pt>
     <dgm:pt modelId="{CBD0AFA0-6BC1-4C32-BF50-B880F7A0B383}" type="pres">
       <dgm:prSet presAssocID="{6076BBA9-B7A8-45A9-B3AD-F648D1EE4EF8}" presName="sibTrans" presStyleLbl="sibTrans1D1" presStyleIdx="1" presStyleCnt="7"/>
       <dgm:spPr/>
+      <dgm:t>
+        <a:bodyPr/>
+        <a:lstStyle/>
+        <a:p>
+          <a:endParaRPr lang="en-US"/>
+        </a:p>
+      </dgm:t>
     </dgm:pt>
     <dgm:pt modelId="{6978034D-F608-4659-9128-71F98EC8E58B}" type="pres">
       <dgm:prSet presAssocID="{6076BBA9-B7A8-45A9-B3AD-F648D1EE4EF8}" presName="connectorText" presStyleLbl="sibTrans1D1" presStyleIdx="1" presStyleCnt="7"/>
       <dgm:spPr/>
+      <dgm:t>
+        <a:bodyPr/>
+        <a:lstStyle/>
+        <a:p>
+          <a:endParaRPr lang="en-US"/>
+        </a:p>
+      </dgm:t>
     </dgm:pt>
     <dgm:pt modelId="{E953EB40-DE25-40D4-B358-AB78D22BB191}" type="pres">
       <dgm:prSet presAssocID="{273BCF21-B834-4BE7-BFF2-A3BF8465A53F}" presName="node" presStyleLbl="node1" presStyleIdx="2" presStyleCnt="8">
@@ -6983,14 +7086,35 @@
         </dgm:presLayoutVars>
       </dgm:prSet>
       <dgm:spPr/>
+      <dgm:t>
+        <a:bodyPr/>
+        <a:lstStyle/>
+        <a:p>
+          <a:endParaRPr lang="en-US"/>
+        </a:p>
+      </dgm:t>
     </dgm:pt>
     <dgm:pt modelId="{2285F4ED-8377-4AAE-8983-73210395BBEA}" type="pres">
       <dgm:prSet presAssocID="{49F5C075-6F91-4534-90EF-1E3C46B7CDAB}" presName="sibTrans" presStyleLbl="sibTrans1D1" presStyleIdx="2" presStyleCnt="7"/>
       <dgm:spPr/>
+      <dgm:t>
+        <a:bodyPr/>
+        <a:lstStyle/>
+        <a:p>
+          <a:endParaRPr lang="en-US"/>
+        </a:p>
+      </dgm:t>
     </dgm:pt>
     <dgm:pt modelId="{4564C43D-E089-4EA6-A6B9-ED5CB86087FE}" type="pres">
       <dgm:prSet presAssocID="{49F5C075-6F91-4534-90EF-1E3C46B7CDAB}" presName="connectorText" presStyleLbl="sibTrans1D1" presStyleIdx="2" presStyleCnt="7"/>
       <dgm:spPr/>
+      <dgm:t>
+        <a:bodyPr/>
+        <a:lstStyle/>
+        <a:p>
+          <a:endParaRPr lang="en-US"/>
+        </a:p>
+      </dgm:t>
     </dgm:pt>
     <dgm:pt modelId="{978F40F7-1170-4426-9F6D-C85BB73408CF}" type="pres">
       <dgm:prSet presAssocID="{5884A237-5755-41CC-8582-8E6C88D4C50A}" presName="node" presStyleLbl="node1" presStyleIdx="3" presStyleCnt="8">
@@ -6999,14 +7123,35 @@
         </dgm:presLayoutVars>
       </dgm:prSet>
       <dgm:spPr/>
+      <dgm:t>
+        <a:bodyPr/>
+        <a:lstStyle/>
+        <a:p>
+          <a:endParaRPr lang="en-US"/>
+        </a:p>
+      </dgm:t>
     </dgm:pt>
     <dgm:pt modelId="{93E0DD11-107C-4740-A25F-830761CDA98E}" type="pres">
       <dgm:prSet presAssocID="{FD8B56A7-F781-4359-A392-18A5A5EAFD08}" presName="sibTrans" presStyleLbl="sibTrans1D1" presStyleIdx="3" presStyleCnt="7"/>
       <dgm:spPr/>
+      <dgm:t>
+        <a:bodyPr/>
+        <a:lstStyle/>
+        <a:p>
+          <a:endParaRPr lang="en-US"/>
+        </a:p>
+      </dgm:t>
     </dgm:pt>
     <dgm:pt modelId="{32D3371C-2473-4D1C-8EEE-C1A1B80CEC07}" type="pres">
       <dgm:prSet presAssocID="{FD8B56A7-F781-4359-A392-18A5A5EAFD08}" presName="connectorText" presStyleLbl="sibTrans1D1" presStyleIdx="3" presStyleCnt="7"/>
       <dgm:spPr/>
+      <dgm:t>
+        <a:bodyPr/>
+        <a:lstStyle/>
+        <a:p>
+          <a:endParaRPr lang="en-US"/>
+        </a:p>
+      </dgm:t>
     </dgm:pt>
     <dgm:pt modelId="{CCE20427-E360-40CC-B4B1-9BA59CA86C94}" type="pres">
       <dgm:prSet presAssocID="{D771E5F0-E6ED-48C0-8CCD-F931688ADE09}" presName="node" presStyleLbl="node1" presStyleIdx="4" presStyleCnt="8">
@@ -7015,14 +7160,35 @@
         </dgm:presLayoutVars>
       </dgm:prSet>
       <dgm:spPr/>
+      <dgm:t>
+        <a:bodyPr/>
+        <a:lstStyle/>
+        <a:p>
+          <a:endParaRPr lang="en-US"/>
+        </a:p>
+      </dgm:t>
     </dgm:pt>
     <dgm:pt modelId="{AF214629-685D-4AAE-A91E-8FADE0AD143F}" type="pres">
       <dgm:prSet presAssocID="{50E9E6FB-F2A1-4C3C-8ED0-BAE19D73E35E}" presName="sibTrans" presStyleLbl="sibTrans1D1" presStyleIdx="4" presStyleCnt="7"/>
       <dgm:spPr/>
+      <dgm:t>
+        <a:bodyPr/>
+        <a:lstStyle/>
+        <a:p>
+          <a:endParaRPr lang="en-US"/>
+        </a:p>
+      </dgm:t>
     </dgm:pt>
     <dgm:pt modelId="{2FAA9B58-6B5D-4335-A250-181F004764F0}" type="pres">
       <dgm:prSet presAssocID="{50E9E6FB-F2A1-4C3C-8ED0-BAE19D73E35E}" presName="connectorText" presStyleLbl="sibTrans1D1" presStyleIdx="4" presStyleCnt="7"/>
       <dgm:spPr/>
+      <dgm:t>
+        <a:bodyPr/>
+        <a:lstStyle/>
+        <a:p>
+          <a:endParaRPr lang="en-US"/>
+        </a:p>
+      </dgm:t>
     </dgm:pt>
     <dgm:pt modelId="{9F5AD9FD-D879-4A9C-A91D-4A29D743FF70}" type="pres">
       <dgm:prSet presAssocID="{D904E3A6-6AFE-46A0-8334-D62B7D1609EC}" presName="node" presStyleLbl="node1" presStyleIdx="5" presStyleCnt="8">
@@ -7031,14 +7197,35 @@
         </dgm:presLayoutVars>
       </dgm:prSet>
       <dgm:spPr/>
+      <dgm:t>
+        <a:bodyPr/>
+        <a:lstStyle/>
+        <a:p>
+          <a:endParaRPr lang="en-US"/>
+        </a:p>
+      </dgm:t>
     </dgm:pt>
     <dgm:pt modelId="{25F3FB88-54D6-425B-AC4E-7DD9E1B1A196}" type="pres">
       <dgm:prSet presAssocID="{5C45A363-7A7A-4FA3-9ECD-B022C15B934E}" presName="sibTrans" presStyleLbl="sibTrans1D1" presStyleIdx="5" presStyleCnt="7"/>
       <dgm:spPr/>
+      <dgm:t>
+        <a:bodyPr/>
+        <a:lstStyle/>
+        <a:p>
+          <a:endParaRPr lang="en-US"/>
+        </a:p>
+      </dgm:t>
     </dgm:pt>
     <dgm:pt modelId="{80167E65-E64B-46C6-B4D8-E698702E54E2}" type="pres">
       <dgm:prSet presAssocID="{5C45A363-7A7A-4FA3-9ECD-B022C15B934E}" presName="connectorText" presStyleLbl="sibTrans1D1" presStyleIdx="5" presStyleCnt="7"/>
       <dgm:spPr/>
+      <dgm:t>
+        <a:bodyPr/>
+        <a:lstStyle/>
+        <a:p>
+          <a:endParaRPr lang="en-US"/>
+        </a:p>
+      </dgm:t>
     </dgm:pt>
     <dgm:pt modelId="{8F19D433-964C-4295-8103-ED9156835325}" type="pres">
       <dgm:prSet presAssocID="{692AF6EC-90A6-4438-B374-6D128451B9C6}" presName="node" presStyleLbl="node1" presStyleIdx="6" presStyleCnt="8">
@@ -7047,14 +7234,35 @@
         </dgm:presLayoutVars>
       </dgm:prSet>
       <dgm:spPr/>
+      <dgm:t>
+        <a:bodyPr/>
+        <a:lstStyle/>
+        <a:p>
+          <a:endParaRPr lang="en-US"/>
+        </a:p>
+      </dgm:t>
     </dgm:pt>
     <dgm:pt modelId="{58269705-6462-4062-A853-0836726E2AD2}" type="pres">
       <dgm:prSet presAssocID="{66EBE6AC-FFBA-4B21-9CFD-A20A2C50B09C}" presName="sibTrans" presStyleLbl="sibTrans1D1" presStyleIdx="6" presStyleCnt="7"/>
       <dgm:spPr/>
+      <dgm:t>
+        <a:bodyPr/>
+        <a:lstStyle/>
+        <a:p>
+          <a:endParaRPr lang="en-US"/>
+        </a:p>
+      </dgm:t>
     </dgm:pt>
     <dgm:pt modelId="{59843F75-1210-4E69-AB1B-7DBEB2EBD213}" type="pres">
       <dgm:prSet presAssocID="{66EBE6AC-FFBA-4B21-9CFD-A20A2C50B09C}" presName="connectorText" presStyleLbl="sibTrans1D1" presStyleIdx="6" presStyleCnt="7"/>
       <dgm:spPr/>
+      <dgm:t>
+        <a:bodyPr/>
+        <a:lstStyle/>
+        <a:p>
+          <a:endParaRPr lang="en-US"/>
+        </a:p>
+      </dgm:t>
     </dgm:pt>
     <dgm:pt modelId="{3D29F44E-3A44-478A-B972-695C660220F9}" type="pres">
       <dgm:prSet presAssocID="{7AFCBDAD-B0CB-4971-B541-3D3D791D477E}" presName="node" presStyleLbl="node1" presStyleIdx="7" presStyleCnt="8">
@@ -7063,6 +7271,13 @@
         </dgm:presLayoutVars>
       </dgm:prSet>
       <dgm:spPr/>
+      <dgm:t>
+        <a:bodyPr/>
+        <a:lstStyle/>
+        <a:p>
+          <a:endParaRPr lang="en-US"/>
+        </a:p>
+      </dgm:t>
     </dgm:pt>
   </dgm:ptLst>
   <dgm:cxnLst>
@@ -7648,26 +7863,6 @@
         </dgm:presLayoutVars>
       </dgm:prSet>
       <dgm:spPr/>
-    </dgm:pt>
-    <dgm:pt modelId="{0D357D5C-ECCD-4A64-B24D-3BF678D5F03F}" type="pres">
-      <dgm:prSet presAssocID="{4CE94B52-B7CA-49DB-913E-DFFD0B512971}" presName="hierRoot1" presStyleCnt="0">
-        <dgm:presLayoutVars>
-          <dgm:hierBranch val="init"/>
-        </dgm:presLayoutVars>
-      </dgm:prSet>
-      <dgm:spPr/>
-    </dgm:pt>
-    <dgm:pt modelId="{7D20DFB5-4B04-473A-A502-E55F1C28E1C1}" type="pres">
-      <dgm:prSet presAssocID="{4CE94B52-B7CA-49DB-913E-DFFD0B512971}" presName="rootComposite1" presStyleCnt="0"/>
-      <dgm:spPr/>
-    </dgm:pt>
-    <dgm:pt modelId="{10EFC701-3233-4158-BF9F-CBAA1551CA49}" type="pres">
-      <dgm:prSet presAssocID="{4CE94B52-B7CA-49DB-913E-DFFD0B512971}" presName="rootText1" presStyleLbl="node0" presStyleIdx="0" presStyleCnt="1" custScaleX="165180">
-        <dgm:presLayoutVars>
-          <dgm:chPref val="3"/>
-        </dgm:presLayoutVars>
-      </dgm:prSet>
-      <dgm:spPr/>
       <dgm:t>
         <a:bodyPr/>
         <a:lstStyle/>
@@ -7676,64 +7871,20 @@
         </a:p>
       </dgm:t>
     </dgm:pt>
-    <dgm:pt modelId="{04D61C4A-BCC4-4F2B-8268-1FD1E38A7A4F}" type="pres">
-      <dgm:prSet presAssocID="{4CE94B52-B7CA-49DB-913E-DFFD0B512971}" presName="rootConnector1" presStyleLbl="node1" presStyleIdx="0" presStyleCnt="0"/>
-      <dgm:spPr/>
-    </dgm:pt>
-    <dgm:pt modelId="{9743ADAF-5A05-40B3-B1C4-2F62BD116CC4}" type="pres">
-      <dgm:prSet presAssocID="{4CE94B52-B7CA-49DB-913E-DFFD0B512971}" presName="hierChild2" presStyleCnt="0"/>
-      <dgm:spPr/>
-    </dgm:pt>
-    <dgm:pt modelId="{CEE9C22B-F0CD-490A-9E68-231107E7778E}" type="pres">
-      <dgm:prSet presAssocID="{5291BAFE-50EB-4AEB-9CE0-3B2F36452EFC}" presName="Name37" presStyleLbl="parChTrans1D2" presStyleIdx="0" presStyleCnt="2"/>
-      <dgm:spPr/>
-    </dgm:pt>
-    <dgm:pt modelId="{8F8A3C4F-2E6C-4395-A321-52AE9944CBBD}" type="pres">
-      <dgm:prSet presAssocID="{8C46C7A8-C3A6-416C-BE4D-1D59C04A0616}" presName="hierRoot2" presStyleCnt="0">
+    <dgm:pt modelId="{0D357D5C-ECCD-4A64-B24D-3BF678D5F03F}" type="pres">
+      <dgm:prSet presAssocID="{4CE94B52-B7CA-49DB-913E-DFFD0B512971}" presName="hierRoot1" presStyleCnt="0">
         <dgm:presLayoutVars>
           <dgm:hierBranch val="init"/>
         </dgm:presLayoutVars>
       </dgm:prSet>
       <dgm:spPr/>
     </dgm:pt>
-    <dgm:pt modelId="{27D7FF5F-4A41-4B8A-81D4-57BBC2EDE54A}" type="pres">
-      <dgm:prSet presAssocID="{8C46C7A8-C3A6-416C-BE4D-1D59C04A0616}" presName="rootComposite" presStyleCnt="0"/>
-      <dgm:spPr/>
-    </dgm:pt>
-    <dgm:pt modelId="{9205F97A-6733-4AD4-83C7-F9CC58361622}" type="pres">
-      <dgm:prSet presAssocID="{8C46C7A8-C3A6-416C-BE4D-1D59C04A0616}" presName="rootText" presStyleLbl="node2" presStyleIdx="0" presStyleCnt="2">
-        <dgm:presLayoutVars>
-          <dgm:chPref val="3"/>
-        </dgm:presLayoutVars>
-      </dgm:prSet>
-      <dgm:spPr/>
-    </dgm:pt>
-    <dgm:pt modelId="{1A16ED28-EE93-42F0-8ECD-B0B8EA6681AE}" type="pres">
-      <dgm:prSet presAssocID="{8C46C7A8-C3A6-416C-BE4D-1D59C04A0616}" presName="rootConnector" presStyleLbl="node2" presStyleIdx="0" presStyleCnt="2"/>
-      <dgm:spPr/>
-    </dgm:pt>
-    <dgm:pt modelId="{7CC735E5-D14E-4BBD-8866-A01C983E8A09}" type="pres">
-      <dgm:prSet presAssocID="{8C46C7A8-C3A6-416C-BE4D-1D59C04A0616}" presName="hierChild4" presStyleCnt="0"/>
-      <dgm:spPr/>
-    </dgm:pt>
-    <dgm:pt modelId="{77606003-3225-44DD-BFD3-B9CBC451291F}" type="pres">
-      <dgm:prSet presAssocID="{7E3A6A4B-4C53-4A48-A69D-10730FB2351B}" presName="Name37" presStyleLbl="parChTrans1D3" presStyleIdx="0" presStyleCnt="3"/>
-      <dgm:spPr/>
-    </dgm:pt>
-    <dgm:pt modelId="{77014639-F787-4E5E-957E-323C7B3F4F0E}" type="pres">
-      <dgm:prSet presAssocID="{94BEEE13-130E-4EEC-9DDD-C7717CBEA280}" presName="hierRoot2" presStyleCnt="0">
-        <dgm:presLayoutVars>
-          <dgm:hierBranch val="init"/>
-        </dgm:presLayoutVars>
-      </dgm:prSet>
-      <dgm:spPr/>
-    </dgm:pt>
-    <dgm:pt modelId="{C8E0C274-3D79-498B-BAC7-568BF8913758}" type="pres">
-      <dgm:prSet presAssocID="{94BEEE13-130E-4EEC-9DDD-C7717CBEA280}" presName="rootComposite" presStyleCnt="0"/>
-      <dgm:spPr/>
-    </dgm:pt>
-    <dgm:pt modelId="{A9AB6393-0EAF-4B5A-ABA6-A74820A21F63}" type="pres">
-      <dgm:prSet presAssocID="{94BEEE13-130E-4EEC-9DDD-C7717CBEA280}" presName="rootText" presStyleLbl="node3" presStyleIdx="0" presStyleCnt="3" custScaleX="154097" custScaleY="206998">
+    <dgm:pt modelId="{7D20DFB5-4B04-473A-A502-E55F1C28E1C1}" type="pres">
+      <dgm:prSet presAssocID="{4CE94B52-B7CA-49DB-913E-DFFD0B512971}" presName="rootComposite1" presStyleCnt="0"/>
+      <dgm:spPr/>
+    </dgm:pt>
+    <dgm:pt modelId="{10EFC701-3233-4158-BF9F-CBAA1551CA49}" type="pres">
+      <dgm:prSet presAssocID="{4CE94B52-B7CA-49DB-913E-DFFD0B512971}" presName="rootText1" presStyleLbl="node0" presStyleIdx="0" presStyleCnt="1" custScaleX="165180">
         <dgm:presLayoutVars>
           <dgm:chPref val="3"/>
         </dgm:presLayoutVars>
@@ -7747,36 +7898,8 @@
         </a:p>
       </dgm:t>
     </dgm:pt>
-    <dgm:pt modelId="{20DA65EC-B977-44BC-B913-624B459DC3A9}" type="pres">
-      <dgm:prSet presAssocID="{94BEEE13-130E-4EEC-9DDD-C7717CBEA280}" presName="rootConnector" presStyleLbl="node3" presStyleIdx="0" presStyleCnt="3"/>
-      <dgm:spPr/>
-    </dgm:pt>
-    <dgm:pt modelId="{A511EDA9-ACBF-4C4B-B213-EAD6C9F56E5E}" type="pres">
-      <dgm:prSet presAssocID="{94BEEE13-130E-4EEC-9DDD-C7717CBEA280}" presName="hierChild4" presStyleCnt="0"/>
-      <dgm:spPr/>
-    </dgm:pt>
-    <dgm:pt modelId="{C3860371-915D-47FF-A999-7D063E26ABDD}" type="pres">
-      <dgm:prSet presAssocID="{A1B07B9E-D37E-4073-B9A4-7F959FA327DA}" presName="Name37" presStyleLbl="parChTrans1D4" presStyleIdx="0" presStyleCnt="7"/>
-      <dgm:spPr/>
-    </dgm:pt>
-    <dgm:pt modelId="{F34C029F-0E7D-4B01-B3A8-FBF590A2C6F6}" type="pres">
-      <dgm:prSet presAssocID="{11C32C24-0F03-4FC0-8630-1882A84D8B03}" presName="hierRoot2" presStyleCnt="0">
-        <dgm:presLayoutVars>
-          <dgm:hierBranch val="init"/>
-        </dgm:presLayoutVars>
-      </dgm:prSet>
-      <dgm:spPr/>
-    </dgm:pt>
-    <dgm:pt modelId="{883DF94F-0C20-463D-9F91-C72670AD8E44}" type="pres">
-      <dgm:prSet presAssocID="{11C32C24-0F03-4FC0-8630-1882A84D8B03}" presName="rootComposite" presStyleCnt="0"/>
-      <dgm:spPr/>
-    </dgm:pt>
-    <dgm:pt modelId="{D8A96AEF-FF26-4596-89A9-7AB6BD721D94}" type="pres">
-      <dgm:prSet presAssocID="{11C32C24-0F03-4FC0-8630-1882A84D8B03}" presName="rootText" presStyleLbl="node4" presStyleIdx="0" presStyleCnt="7" custScaleX="165463">
-        <dgm:presLayoutVars>
-          <dgm:chPref val="3"/>
-        </dgm:presLayoutVars>
-      </dgm:prSet>
+    <dgm:pt modelId="{04D61C4A-BCC4-4F2B-8268-1FD1E38A7A4F}" type="pres">
+      <dgm:prSet presAssocID="{4CE94B52-B7CA-49DB-913E-DFFD0B512971}" presName="rootConnector1" presStyleLbl="node1" presStyleIdx="0" presStyleCnt="0"/>
       <dgm:spPr/>
       <dgm:t>
         <a:bodyPr/>
@@ -7786,116 +7909,12 @@
         </a:p>
       </dgm:t>
     </dgm:pt>
-    <dgm:pt modelId="{73A01B37-EE71-4A30-937E-38642B6A8CC0}" type="pres">
-      <dgm:prSet presAssocID="{11C32C24-0F03-4FC0-8630-1882A84D8B03}" presName="rootConnector" presStyleLbl="node4" presStyleIdx="0" presStyleCnt="7"/>
-      <dgm:spPr/>
-    </dgm:pt>
-    <dgm:pt modelId="{A37CBCA5-FEF6-41FD-B38B-FF2A0DE86861}" type="pres">
-      <dgm:prSet presAssocID="{11C32C24-0F03-4FC0-8630-1882A84D8B03}" presName="hierChild4" presStyleCnt="0"/>
-      <dgm:spPr/>
-    </dgm:pt>
-    <dgm:pt modelId="{3CE59808-0C7B-407F-BF37-B861CC3A66D4}" type="pres">
-      <dgm:prSet presAssocID="{11C32C24-0F03-4FC0-8630-1882A84D8B03}" presName="hierChild5" presStyleCnt="0"/>
-      <dgm:spPr/>
-    </dgm:pt>
-    <dgm:pt modelId="{673A353D-F32F-47C9-B81A-BD74B18A837F}" type="pres">
-      <dgm:prSet presAssocID="{8AC781BD-4676-40BC-A90F-00CBE2982E9F}" presName="Name37" presStyleLbl="parChTrans1D4" presStyleIdx="1" presStyleCnt="7"/>
-      <dgm:spPr/>
-    </dgm:pt>
-    <dgm:pt modelId="{4A1F4709-3036-4F06-823C-94DEC6269301}" type="pres">
-      <dgm:prSet presAssocID="{4C125362-B319-4302-82C6-B82336E14B66}" presName="hierRoot2" presStyleCnt="0">
-        <dgm:presLayoutVars>
-          <dgm:hierBranch val="init"/>
-        </dgm:presLayoutVars>
-      </dgm:prSet>
-      <dgm:spPr/>
-    </dgm:pt>
-    <dgm:pt modelId="{C9D0555B-6EC1-4344-81EF-D26EA52AA196}" type="pres">
-      <dgm:prSet presAssocID="{4C125362-B319-4302-82C6-B82336E14B66}" presName="rootComposite" presStyleCnt="0"/>
-      <dgm:spPr/>
-    </dgm:pt>
-    <dgm:pt modelId="{25141F2D-D674-49BB-AE68-0CA0C220D782}" type="pres">
-      <dgm:prSet presAssocID="{4C125362-B319-4302-82C6-B82336E14B66}" presName="rootText" presStyleLbl="node4" presStyleIdx="1" presStyleCnt="7">
-        <dgm:presLayoutVars>
-          <dgm:chPref val="3"/>
-        </dgm:presLayoutVars>
-      </dgm:prSet>
-      <dgm:spPr/>
-    </dgm:pt>
-    <dgm:pt modelId="{4DE4485D-C966-4760-8B60-C48354DCE04F}" type="pres">
-      <dgm:prSet presAssocID="{4C125362-B319-4302-82C6-B82336E14B66}" presName="rootConnector" presStyleLbl="node4" presStyleIdx="1" presStyleCnt="7"/>
-      <dgm:spPr/>
-    </dgm:pt>
-    <dgm:pt modelId="{39E14A84-CC4B-4B80-B1C5-801BD307B276}" type="pres">
-      <dgm:prSet presAssocID="{4C125362-B319-4302-82C6-B82336E14B66}" presName="hierChild4" presStyleCnt="0"/>
-      <dgm:spPr/>
-    </dgm:pt>
-    <dgm:pt modelId="{BA6A95F2-0C44-4BCD-A802-62D9AB0DA317}" type="pres">
-      <dgm:prSet presAssocID="{4C125362-B319-4302-82C6-B82336E14B66}" presName="hierChild5" presStyleCnt="0"/>
-      <dgm:spPr/>
-    </dgm:pt>
-    <dgm:pt modelId="{1A5C9C4F-64FB-40ED-A99E-D38A51E57A1A}" type="pres">
-      <dgm:prSet presAssocID="{344E5DE4-1469-41EC-A8E3-47C52589CB06}" presName="Name37" presStyleLbl="parChTrans1D4" presStyleIdx="2" presStyleCnt="7"/>
-      <dgm:spPr/>
-    </dgm:pt>
-    <dgm:pt modelId="{1BFF744C-63DA-43CB-BA7C-91E82388DB82}" type="pres">
-      <dgm:prSet presAssocID="{0ABD9981-A34B-4DEB-9533-9BA9A24DF6E1}" presName="hierRoot2" presStyleCnt="0">
-        <dgm:presLayoutVars>
-          <dgm:hierBranch val="init"/>
-        </dgm:presLayoutVars>
-      </dgm:prSet>
-      <dgm:spPr/>
-    </dgm:pt>
-    <dgm:pt modelId="{D2AEBBC9-CEA7-4B6C-AECE-C2E3C8BB2DCA}" type="pres">
-      <dgm:prSet presAssocID="{0ABD9981-A34B-4DEB-9533-9BA9A24DF6E1}" presName="rootComposite" presStyleCnt="0"/>
-      <dgm:spPr/>
-    </dgm:pt>
-    <dgm:pt modelId="{22DAC826-D102-4123-835A-EC61AC6F795E}" type="pres">
-      <dgm:prSet presAssocID="{0ABD9981-A34B-4DEB-9533-9BA9A24DF6E1}" presName="rootText" presStyleLbl="node4" presStyleIdx="2" presStyleCnt="7">
-        <dgm:presLayoutVars>
-          <dgm:chPref val="3"/>
-        </dgm:presLayoutVars>
-      </dgm:prSet>
-      <dgm:spPr/>
-    </dgm:pt>
-    <dgm:pt modelId="{7742CE8A-E277-4714-A730-CBE9A02DA09F}" type="pres">
-      <dgm:prSet presAssocID="{0ABD9981-A34B-4DEB-9533-9BA9A24DF6E1}" presName="rootConnector" presStyleLbl="node4" presStyleIdx="2" presStyleCnt="7"/>
-      <dgm:spPr/>
-    </dgm:pt>
-    <dgm:pt modelId="{F72AB67B-7721-44DE-8260-00B3755D1887}" type="pres">
-      <dgm:prSet presAssocID="{0ABD9981-A34B-4DEB-9533-9BA9A24DF6E1}" presName="hierChild4" presStyleCnt="0"/>
-      <dgm:spPr/>
-    </dgm:pt>
-    <dgm:pt modelId="{1C84342F-6FCA-40C8-B21C-44A7BF3E9642}" type="pres">
-      <dgm:prSet presAssocID="{0ABD9981-A34B-4DEB-9533-9BA9A24DF6E1}" presName="hierChild5" presStyleCnt="0"/>
-      <dgm:spPr/>
-    </dgm:pt>
-    <dgm:pt modelId="{F3BF9B28-4953-4D4C-BE5C-661CE240EC49}" type="pres">
-      <dgm:prSet presAssocID="{94BEEE13-130E-4EEC-9DDD-C7717CBEA280}" presName="hierChild5" presStyleCnt="0"/>
-      <dgm:spPr/>
-    </dgm:pt>
-    <dgm:pt modelId="{905FA4BD-823A-4DBC-B6C3-AE0EF7EB544B}" type="pres">
-      <dgm:prSet presAssocID="{69AD430E-C984-4C3F-AD04-6AE9245422DE}" presName="Name37" presStyleLbl="parChTrans1D3" presStyleIdx="1" presStyleCnt="3"/>
-      <dgm:spPr/>
-    </dgm:pt>
-    <dgm:pt modelId="{4873CAC8-FE62-4BE0-94BF-388805DEB728}" type="pres">
-      <dgm:prSet presAssocID="{A7DDCA00-0048-4EF5-BC53-905A55164BDF}" presName="hierRoot2" presStyleCnt="0">
-        <dgm:presLayoutVars>
-          <dgm:hierBranch val="init"/>
-        </dgm:presLayoutVars>
-      </dgm:prSet>
-      <dgm:spPr/>
-    </dgm:pt>
-    <dgm:pt modelId="{8C45D077-8D4B-46A3-AE00-BBFD59D5AA49}" type="pres">
-      <dgm:prSet presAssocID="{A7DDCA00-0048-4EF5-BC53-905A55164BDF}" presName="rootComposite" presStyleCnt="0"/>
-      <dgm:spPr/>
-    </dgm:pt>
-    <dgm:pt modelId="{3622CEB4-DF89-40B5-B6FF-C861F20516A8}" type="pres">
-      <dgm:prSet presAssocID="{A7DDCA00-0048-4EF5-BC53-905A55164BDF}" presName="rootText" presStyleLbl="node3" presStyleIdx="1" presStyleCnt="3" custScaleX="154642" custScaleY="167153">
-        <dgm:presLayoutVars>
-          <dgm:chPref val="3"/>
-        </dgm:presLayoutVars>
-      </dgm:prSet>
+    <dgm:pt modelId="{9743ADAF-5A05-40B3-B1C4-2F62BD116CC4}" type="pres">
+      <dgm:prSet presAssocID="{4CE94B52-B7CA-49DB-913E-DFFD0B512971}" presName="hierChild2" presStyleCnt="0"/>
+      <dgm:spPr/>
+    </dgm:pt>
+    <dgm:pt modelId="{CEE9C22B-F0CD-490A-9E68-231107E7778E}" type="pres">
+      <dgm:prSet presAssocID="{5291BAFE-50EB-4AEB-9CE0-3B2F36452EFC}" presName="Name37" presStyleLbl="parChTrans1D2" presStyleIdx="0" presStyleCnt="2"/>
       <dgm:spPr/>
       <dgm:t>
         <a:bodyPr/>
@@ -7905,32 +7924,20 @@
         </a:p>
       </dgm:t>
     </dgm:pt>
-    <dgm:pt modelId="{E5ED7200-733D-4CAE-BB2A-46639CCAD156}" type="pres">
-      <dgm:prSet presAssocID="{A7DDCA00-0048-4EF5-BC53-905A55164BDF}" presName="rootConnector" presStyleLbl="node3" presStyleIdx="1" presStyleCnt="3"/>
-      <dgm:spPr/>
-    </dgm:pt>
-    <dgm:pt modelId="{D1530FFE-FEAA-462E-9883-76AFAFC29795}" type="pres">
-      <dgm:prSet presAssocID="{A7DDCA00-0048-4EF5-BC53-905A55164BDF}" presName="hierChild4" presStyleCnt="0"/>
-      <dgm:spPr/>
-    </dgm:pt>
-    <dgm:pt modelId="{D50F4E5B-178E-44D3-9177-4EEFFF1B0323}" type="pres">
-      <dgm:prSet presAssocID="{6CC03B51-957D-426F-A27A-E70488D0C692}" presName="Name37" presStyleLbl="parChTrans1D4" presStyleIdx="3" presStyleCnt="7"/>
-      <dgm:spPr/>
-    </dgm:pt>
-    <dgm:pt modelId="{A7F66EDC-906D-47D7-AA3F-69562A25313C}" type="pres">
-      <dgm:prSet presAssocID="{6F627769-1BC1-4180-BBAD-43FBEF02E7A3}" presName="hierRoot2" presStyleCnt="0">
+    <dgm:pt modelId="{8F8A3C4F-2E6C-4395-A321-52AE9944CBBD}" type="pres">
+      <dgm:prSet presAssocID="{8C46C7A8-C3A6-416C-BE4D-1D59C04A0616}" presName="hierRoot2" presStyleCnt="0">
         <dgm:presLayoutVars>
           <dgm:hierBranch val="init"/>
         </dgm:presLayoutVars>
       </dgm:prSet>
       <dgm:spPr/>
     </dgm:pt>
-    <dgm:pt modelId="{D4012BB7-D28A-4888-A477-F70D4718414A}" type="pres">
-      <dgm:prSet presAssocID="{6F627769-1BC1-4180-BBAD-43FBEF02E7A3}" presName="rootComposite" presStyleCnt="0"/>
-      <dgm:spPr/>
-    </dgm:pt>
-    <dgm:pt modelId="{8C178A2A-732D-4104-AE7D-0EB7E87922FE}" type="pres">
-      <dgm:prSet presAssocID="{6F627769-1BC1-4180-BBAD-43FBEF02E7A3}" presName="rootText" presStyleLbl="node4" presStyleIdx="3" presStyleCnt="7" custScaleX="211254">
+    <dgm:pt modelId="{27D7FF5F-4A41-4B8A-81D4-57BBC2EDE54A}" type="pres">
+      <dgm:prSet presAssocID="{8C46C7A8-C3A6-416C-BE4D-1D59C04A0616}" presName="rootComposite" presStyleCnt="0"/>
+      <dgm:spPr/>
+    </dgm:pt>
+    <dgm:pt modelId="{9205F97A-6733-4AD4-83C7-F9CC58361622}" type="pres">
+      <dgm:prSet presAssocID="{8C46C7A8-C3A6-416C-BE4D-1D59C04A0616}" presName="rootText" presStyleLbl="node2" presStyleIdx="0" presStyleCnt="2">
         <dgm:presLayoutVars>
           <dgm:chPref val="3"/>
         </dgm:presLayoutVars>
@@ -7944,40 +7951,8 @@
         </a:p>
       </dgm:t>
     </dgm:pt>
-    <dgm:pt modelId="{39D0D6DF-99F7-4929-B687-2955C2238DF2}" type="pres">
-      <dgm:prSet presAssocID="{6F627769-1BC1-4180-BBAD-43FBEF02E7A3}" presName="rootConnector" presStyleLbl="node4" presStyleIdx="3" presStyleCnt="7"/>
-      <dgm:spPr/>
-    </dgm:pt>
-    <dgm:pt modelId="{A9A22F3E-972A-4716-A6E2-3B655E7050BB}" type="pres">
-      <dgm:prSet presAssocID="{6F627769-1BC1-4180-BBAD-43FBEF02E7A3}" presName="hierChild4" presStyleCnt="0"/>
-      <dgm:spPr/>
-    </dgm:pt>
-    <dgm:pt modelId="{B123CEDC-7E39-42BD-9449-50C00CA165A3}" type="pres">
-      <dgm:prSet presAssocID="{6F627769-1BC1-4180-BBAD-43FBEF02E7A3}" presName="hierChild5" presStyleCnt="0"/>
-      <dgm:spPr/>
-    </dgm:pt>
-    <dgm:pt modelId="{4315641D-3433-4048-9721-FF13A4E44DEB}" type="pres">
-      <dgm:prSet presAssocID="{1660E291-5E37-40E6-A617-32F4A793FD75}" presName="Name37" presStyleLbl="parChTrans1D4" presStyleIdx="4" presStyleCnt="7"/>
-      <dgm:spPr/>
-    </dgm:pt>
-    <dgm:pt modelId="{4C4D2D2C-C449-42BE-B33A-CCAF08073502}" type="pres">
-      <dgm:prSet presAssocID="{62BB8B7A-11B3-4683-A3B2-198F9DB8CF18}" presName="hierRoot2" presStyleCnt="0">
-        <dgm:presLayoutVars>
-          <dgm:hierBranch val="init"/>
-        </dgm:presLayoutVars>
-      </dgm:prSet>
-      <dgm:spPr/>
-    </dgm:pt>
-    <dgm:pt modelId="{70D38A1B-53A2-42BA-9CFA-1809FC0DCA4E}" type="pres">
-      <dgm:prSet presAssocID="{62BB8B7A-11B3-4683-A3B2-198F9DB8CF18}" presName="rootComposite" presStyleCnt="0"/>
-      <dgm:spPr/>
-    </dgm:pt>
-    <dgm:pt modelId="{5A4A4BF7-7BE8-4BB9-AAB6-20BADDFABE1C}" type="pres">
-      <dgm:prSet presAssocID="{62BB8B7A-11B3-4683-A3B2-198F9DB8CF18}" presName="rootText" presStyleLbl="node4" presStyleIdx="4" presStyleCnt="7" custScaleX="211924" custScaleY="171556">
-        <dgm:presLayoutVars>
-          <dgm:chPref val="3"/>
-        </dgm:presLayoutVars>
-      </dgm:prSet>
+    <dgm:pt modelId="{1A16ED28-EE93-42F0-8ECD-B0B8EA6681AE}" type="pres">
+      <dgm:prSet presAssocID="{8C46C7A8-C3A6-416C-BE4D-1D59C04A0616}" presName="rootConnector" presStyleLbl="node2" presStyleIdx="0" presStyleCnt="2"/>
       <dgm:spPr/>
       <dgm:t>
         <a:bodyPr/>
@@ -7987,36 +7962,12 @@
         </a:p>
       </dgm:t>
     </dgm:pt>
-    <dgm:pt modelId="{667723AA-80BA-4063-808C-36ED4D8CF8FE}" type="pres">
-      <dgm:prSet presAssocID="{62BB8B7A-11B3-4683-A3B2-198F9DB8CF18}" presName="rootConnector" presStyleLbl="node4" presStyleIdx="4" presStyleCnt="7"/>
-      <dgm:spPr/>
-    </dgm:pt>
-    <dgm:pt modelId="{09841FA1-2C35-4E05-A935-8BAB10D9FDC3}" type="pres">
-      <dgm:prSet presAssocID="{62BB8B7A-11B3-4683-A3B2-198F9DB8CF18}" presName="hierChild4" presStyleCnt="0"/>
-      <dgm:spPr/>
-    </dgm:pt>
-    <dgm:pt modelId="{986EBD1B-F624-49CF-A7A2-8DAECA30A5D6}" type="pres">
-      <dgm:prSet presAssocID="{7137F455-13A3-4DC9-8C7B-BC8FD94C6324}" presName="Name37" presStyleLbl="parChTrans1D4" presStyleIdx="5" presStyleCnt="7"/>
-      <dgm:spPr/>
-    </dgm:pt>
-    <dgm:pt modelId="{E1E0F46F-872E-42CB-B313-DDB3BD8A7938}" type="pres">
-      <dgm:prSet presAssocID="{4046CB89-1C62-4AE9-8F32-765CFB574D93}" presName="hierRoot2" presStyleCnt="0">
-        <dgm:presLayoutVars>
-          <dgm:hierBranch val="init"/>
-        </dgm:presLayoutVars>
-      </dgm:prSet>
-      <dgm:spPr/>
-    </dgm:pt>
-    <dgm:pt modelId="{86272E65-AC4E-4F19-A97C-0C584592A2F9}" type="pres">
-      <dgm:prSet presAssocID="{4046CB89-1C62-4AE9-8F32-765CFB574D93}" presName="rootComposite" presStyleCnt="0"/>
-      <dgm:spPr/>
-    </dgm:pt>
-    <dgm:pt modelId="{E5E5B2AC-9F7D-45F5-A433-916DB59D58EA}" type="pres">
-      <dgm:prSet presAssocID="{4046CB89-1C62-4AE9-8F32-765CFB574D93}" presName="rootText" presStyleLbl="node4" presStyleIdx="5" presStyleCnt="7" custScaleX="189827" custScaleY="183093">
-        <dgm:presLayoutVars>
-          <dgm:chPref val="3"/>
-        </dgm:presLayoutVars>
-      </dgm:prSet>
+    <dgm:pt modelId="{7CC735E5-D14E-4BBD-8866-A01C983E8A09}" type="pres">
+      <dgm:prSet presAssocID="{8C46C7A8-C3A6-416C-BE4D-1D59C04A0616}" presName="hierChild4" presStyleCnt="0"/>
+      <dgm:spPr/>
+    </dgm:pt>
+    <dgm:pt modelId="{77606003-3225-44DD-BFD3-B9CBC451291F}" type="pres">
+      <dgm:prSet presAssocID="{7E3A6A4B-4C53-4A48-A69D-10730FB2351B}" presName="Name37" presStyleLbl="parChTrans1D3" presStyleIdx="0" presStyleCnt="3"/>
       <dgm:spPr/>
       <dgm:t>
         <a:bodyPr/>
@@ -8026,36 +7977,20 @@
         </a:p>
       </dgm:t>
     </dgm:pt>
-    <dgm:pt modelId="{DF52E326-4209-46ED-A116-13A781D164D3}" type="pres">
-      <dgm:prSet presAssocID="{4046CB89-1C62-4AE9-8F32-765CFB574D93}" presName="rootConnector" presStyleLbl="node4" presStyleIdx="5" presStyleCnt="7"/>
-      <dgm:spPr/>
-    </dgm:pt>
-    <dgm:pt modelId="{E5DADB2A-7D09-470C-AF51-551BC3D05C65}" type="pres">
-      <dgm:prSet presAssocID="{4046CB89-1C62-4AE9-8F32-765CFB574D93}" presName="hierChild4" presStyleCnt="0"/>
-      <dgm:spPr/>
-    </dgm:pt>
-    <dgm:pt modelId="{F96CB32D-8604-411D-BB64-CFD5D6FEC74C}" type="pres">
-      <dgm:prSet presAssocID="{4046CB89-1C62-4AE9-8F32-765CFB574D93}" presName="hierChild5" presStyleCnt="0"/>
-      <dgm:spPr/>
-    </dgm:pt>
-    <dgm:pt modelId="{6D56C6D8-74B1-43BE-B288-DF6E5634A838}" type="pres">
-      <dgm:prSet presAssocID="{FD1BDC84-2197-4366-887A-CA22AD7CB0C7}" presName="Name37" presStyleLbl="parChTrans1D4" presStyleIdx="6" presStyleCnt="7"/>
-      <dgm:spPr/>
-    </dgm:pt>
-    <dgm:pt modelId="{7F654A20-DB41-43FE-B704-E9C9012367B8}" type="pres">
-      <dgm:prSet presAssocID="{32566BEC-8261-4EDA-BD80-21C6B4E839C2}" presName="hierRoot2" presStyleCnt="0">
+    <dgm:pt modelId="{77014639-F787-4E5E-957E-323C7B3F4F0E}" type="pres">
+      <dgm:prSet presAssocID="{94BEEE13-130E-4EEC-9DDD-C7717CBEA280}" presName="hierRoot2" presStyleCnt="0">
         <dgm:presLayoutVars>
           <dgm:hierBranch val="init"/>
         </dgm:presLayoutVars>
       </dgm:prSet>
       <dgm:spPr/>
     </dgm:pt>
-    <dgm:pt modelId="{2E6388E9-097B-42F1-AB11-8BE37D211DA8}" type="pres">
-      <dgm:prSet presAssocID="{32566BEC-8261-4EDA-BD80-21C6B4E839C2}" presName="rootComposite" presStyleCnt="0"/>
-      <dgm:spPr/>
-    </dgm:pt>
-    <dgm:pt modelId="{42DE635D-FEA7-4D13-A18B-3D2CDD8D9D25}" type="pres">
-      <dgm:prSet presAssocID="{32566BEC-8261-4EDA-BD80-21C6B4E839C2}" presName="rootText" presStyleLbl="node4" presStyleIdx="6" presStyleCnt="7" custScaleX="179431" custScaleY="157932">
+    <dgm:pt modelId="{C8E0C274-3D79-498B-BAC7-568BF8913758}" type="pres">
+      <dgm:prSet presAssocID="{94BEEE13-130E-4EEC-9DDD-C7717CBEA280}" presName="rootComposite" presStyleCnt="0"/>
+      <dgm:spPr/>
+    </dgm:pt>
+    <dgm:pt modelId="{A9AB6393-0EAF-4B5A-ABA6-A74820A21F63}" type="pres">
+      <dgm:prSet presAssocID="{94BEEE13-130E-4EEC-9DDD-C7717CBEA280}" presName="rootText" presStyleLbl="node3" presStyleIdx="0" presStyleCnt="3" custScaleX="154097" custScaleY="206998">
         <dgm:presLayoutVars>
           <dgm:chPref val="3"/>
         </dgm:presLayoutVars>
@@ -8069,84 +8004,8 @@
         </a:p>
       </dgm:t>
     </dgm:pt>
-    <dgm:pt modelId="{B11876D7-9C9C-47A0-BAE8-985FB97E955A}" type="pres">
-      <dgm:prSet presAssocID="{32566BEC-8261-4EDA-BD80-21C6B4E839C2}" presName="rootConnector" presStyleLbl="node4" presStyleIdx="6" presStyleCnt="7"/>
-      <dgm:spPr/>
-    </dgm:pt>
-    <dgm:pt modelId="{7149AC93-0A7E-4376-B741-2D1E8BBB9B7A}" type="pres">
-      <dgm:prSet presAssocID="{32566BEC-8261-4EDA-BD80-21C6B4E839C2}" presName="hierChild4" presStyleCnt="0"/>
-      <dgm:spPr/>
-    </dgm:pt>
-    <dgm:pt modelId="{F08E0979-6240-42F4-A2B1-9147B9F56D4D}" type="pres">
-      <dgm:prSet presAssocID="{32566BEC-8261-4EDA-BD80-21C6B4E839C2}" presName="hierChild5" presStyleCnt="0"/>
-      <dgm:spPr/>
-    </dgm:pt>
-    <dgm:pt modelId="{529233A1-AC31-4533-A22C-1C06F6290184}" type="pres">
-      <dgm:prSet presAssocID="{62BB8B7A-11B3-4683-A3B2-198F9DB8CF18}" presName="hierChild5" presStyleCnt="0"/>
-      <dgm:spPr/>
-    </dgm:pt>
-    <dgm:pt modelId="{548D0BD2-F83A-4047-A44A-4DCB054D0A56}" type="pres">
-      <dgm:prSet presAssocID="{A7DDCA00-0048-4EF5-BC53-905A55164BDF}" presName="hierChild5" presStyleCnt="0"/>
-      <dgm:spPr/>
-    </dgm:pt>
-    <dgm:pt modelId="{164CBA5A-B4C0-4193-9C93-FD63DB9C9512}" type="pres">
-      <dgm:prSet presAssocID="{8C46C7A8-C3A6-416C-BE4D-1D59C04A0616}" presName="hierChild5" presStyleCnt="0"/>
-      <dgm:spPr/>
-    </dgm:pt>
-    <dgm:pt modelId="{6F0B2341-6DE9-45F7-B07F-BCBA3B1ED4CE}" type="pres">
-      <dgm:prSet presAssocID="{CB20C354-CF44-483E-B30D-65DCD4BEFBCF}" presName="Name37" presStyleLbl="parChTrans1D2" presStyleIdx="1" presStyleCnt="2"/>
-      <dgm:spPr/>
-    </dgm:pt>
-    <dgm:pt modelId="{DD00BECB-9214-492E-B5E5-6FEEAB8A3FB2}" type="pres">
-      <dgm:prSet presAssocID="{57BAB4A4-4C96-4566-A071-764E0D6471C5}" presName="hierRoot2" presStyleCnt="0">
-        <dgm:presLayoutVars>
-          <dgm:hierBranch val="init"/>
-        </dgm:presLayoutVars>
-      </dgm:prSet>
-      <dgm:spPr/>
-    </dgm:pt>
-    <dgm:pt modelId="{981279A5-ADBA-4490-8B59-257144D3FAE3}" type="pres">
-      <dgm:prSet presAssocID="{57BAB4A4-4C96-4566-A071-764E0D6471C5}" presName="rootComposite" presStyleCnt="0"/>
-      <dgm:spPr/>
-    </dgm:pt>
-    <dgm:pt modelId="{A496B5B2-802E-4CBA-BE8F-87A65B7CD56B}" type="pres">
-      <dgm:prSet presAssocID="{57BAB4A4-4C96-4566-A071-764E0D6471C5}" presName="rootText" presStyleLbl="node2" presStyleIdx="1" presStyleCnt="2">
-        <dgm:presLayoutVars>
-          <dgm:chPref val="3"/>
-        </dgm:presLayoutVars>
-      </dgm:prSet>
-      <dgm:spPr/>
-    </dgm:pt>
-    <dgm:pt modelId="{891DBB9B-425B-45B8-BBC7-37546DA44D81}" type="pres">
-      <dgm:prSet presAssocID="{57BAB4A4-4C96-4566-A071-764E0D6471C5}" presName="rootConnector" presStyleLbl="node2" presStyleIdx="1" presStyleCnt="2"/>
-      <dgm:spPr/>
-    </dgm:pt>
-    <dgm:pt modelId="{A1C2E667-4D87-49F0-BA37-475CD204276D}" type="pres">
-      <dgm:prSet presAssocID="{57BAB4A4-4C96-4566-A071-764E0D6471C5}" presName="hierChild4" presStyleCnt="0"/>
-      <dgm:spPr/>
-    </dgm:pt>
-    <dgm:pt modelId="{C2F241C3-3447-4734-B4A8-C7B001806B4A}" type="pres">
-      <dgm:prSet presAssocID="{D9CBFF1D-85A4-4066-8DBB-D04869593D0B}" presName="Name37" presStyleLbl="parChTrans1D3" presStyleIdx="2" presStyleCnt="3"/>
-      <dgm:spPr/>
-    </dgm:pt>
-    <dgm:pt modelId="{7A2F127E-4808-4CB8-82D0-46BD5BA3A8D5}" type="pres">
-      <dgm:prSet presAssocID="{79F3DFFE-3EBC-4C48-85F0-30EB10204FB9}" presName="hierRoot2" presStyleCnt="0">
-        <dgm:presLayoutVars>
-          <dgm:hierBranch val="init"/>
-        </dgm:presLayoutVars>
-      </dgm:prSet>
-      <dgm:spPr/>
-    </dgm:pt>
-    <dgm:pt modelId="{535B667D-E115-46D5-A1EB-AE70A1D0BA3A}" type="pres">
-      <dgm:prSet presAssocID="{79F3DFFE-3EBC-4C48-85F0-30EB10204FB9}" presName="rootComposite" presStyleCnt="0"/>
-      <dgm:spPr/>
-    </dgm:pt>
-    <dgm:pt modelId="{D1370E5A-24B5-48E4-A609-70BFD9FCB851}" type="pres">
-      <dgm:prSet presAssocID="{79F3DFFE-3EBC-4C48-85F0-30EB10204FB9}" presName="rootText" presStyleLbl="node3" presStyleIdx="2" presStyleCnt="3" custScaleX="243168" custScaleY="154558">
-        <dgm:presLayoutVars>
-          <dgm:chPref val="3"/>
-        </dgm:presLayoutVars>
-      </dgm:prSet>
+    <dgm:pt modelId="{20DA65EC-B977-44BC-B913-624B459DC3A9}" type="pres">
+      <dgm:prSet presAssocID="{94BEEE13-130E-4EEC-9DDD-C7717CBEA280}" presName="rootConnector" presStyleLbl="node3" presStyleIdx="0" presStyleCnt="3"/>
       <dgm:spPr/>
       <dgm:t>
         <a:bodyPr/>
@@ -8156,9 +8015,575 @@
         </a:p>
       </dgm:t>
     </dgm:pt>
+    <dgm:pt modelId="{A511EDA9-ACBF-4C4B-B213-EAD6C9F56E5E}" type="pres">
+      <dgm:prSet presAssocID="{94BEEE13-130E-4EEC-9DDD-C7717CBEA280}" presName="hierChild4" presStyleCnt="0"/>
+      <dgm:spPr/>
+    </dgm:pt>
+    <dgm:pt modelId="{C3860371-915D-47FF-A999-7D063E26ABDD}" type="pres">
+      <dgm:prSet presAssocID="{A1B07B9E-D37E-4073-B9A4-7F959FA327DA}" presName="Name37" presStyleLbl="parChTrans1D4" presStyleIdx="0" presStyleCnt="7"/>
+      <dgm:spPr/>
+      <dgm:t>
+        <a:bodyPr/>
+        <a:lstStyle/>
+        <a:p>
+          <a:endParaRPr lang="en-US"/>
+        </a:p>
+      </dgm:t>
+    </dgm:pt>
+    <dgm:pt modelId="{F34C029F-0E7D-4B01-B3A8-FBF590A2C6F6}" type="pres">
+      <dgm:prSet presAssocID="{11C32C24-0F03-4FC0-8630-1882A84D8B03}" presName="hierRoot2" presStyleCnt="0">
+        <dgm:presLayoutVars>
+          <dgm:hierBranch val="init"/>
+        </dgm:presLayoutVars>
+      </dgm:prSet>
+      <dgm:spPr/>
+    </dgm:pt>
+    <dgm:pt modelId="{883DF94F-0C20-463D-9F91-C72670AD8E44}" type="pres">
+      <dgm:prSet presAssocID="{11C32C24-0F03-4FC0-8630-1882A84D8B03}" presName="rootComposite" presStyleCnt="0"/>
+      <dgm:spPr/>
+    </dgm:pt>
+    <dgm:pt modelId="{D8A96AEF-FF26-4596-89A9-7AB6BD721D94}" type="pres">
+      <dgm:prSet presAssocID="{11C32C24-0F03-4FC0-8630-1882A84D8B03}" presName="rootText" presStyleLbl="node4" presStyleIdx="0" presStyleCnt="7" custScaleX="165463">
+        <dgm:presLayoutVars>
+          <dgm:chPref val="3"/>
+        </dgm:presLayoutVars>
+      </dgm:prSet>
+      <dgm:spPr/>
+      <dgm:t>
+        <a:bodyPr/>
+        <a:lstStyle/>
+        <a:p>
+          <a:endParaRPr lang="en-US"/>
+        </a:p>
+      </dgm:t>
+    </dgm:pt>
+    <dgm:pt modelId="{73A01B37-EE71-4A30-937E-38642B6A8CC0}" type="pres">
+      <dgm:prSet presAssocID="{11C32C24-0F03-4FC0-8630-1882A84D8B03}" presName="rootConnector" presStyleLbl="node4" presStyleIdx="0" presStyleCnt="7"/>
+      <dgm:spPr/>
+      <dgm:t>
+        <a:bodyPr/>
+        <a:lstStyle/>
+        <a:p>
+          <a:endParaRPr lang="en-US"/>
+        </a:p>
+      </dgm:t>
+    </dgm:pt>
+    <dgm:pt modelId="{A37CBCA5-FEF6-41FD-B38B-FF2A0DE86861}" type="pres">
+      <dgm:prSet presAssocID="{11C32C24-0F03-4FC0-8630-1882A84D8B03}" presName="hierChild4" presStyleCnt="0"/>
+      <dgm:spPr/>
+    </dgm:pt>
+    <dgm:pt modelId="{3CE59808-0C7B-407F-BF37-B861CC3A66D4}" type="pres">
+      <dgm:prSet presAssocID="{11C32C24-0F03-4FC0-8630-1882A84D8B03}" presName="hierChild5" presStyleCnt="0"/>
+      <dgm:spPr/>
+    </dgm:pt>
+    <dgm:pt modelId="{673A353D-F32F-47C9-B81A-BD74B18A837F}" type="pres">
+      <dgm:prSet presAssocID="{8AC781BD-4676-40BC-A90F-00CBE2982E9F}" presName="Name37" presStyleLbl="parChTrans1D4" presStyleIdx="1" presStyleCnt="7"/>
+      <dgm:spPr/>
+      <dgm:t>
+        <a:bodyPr/>
+        <a:lstStyle/>
+        <a:p>
+          <a:endParaRPr lang="en-US"/>
+        </a:p>
+      </dgm:t>
+    </dgm:pt>
+    <dgm:pt modelId="{4A1F4709-3036-4F06-823C-94DEC6269301}" type="pres">
+      <dgm:prSet presAssocID="{4C125362-B319-4302-82C6-B82336E14B66}" presName="hierRoot2" presStyleCnt="0">
+        <dgm:presLayoutVars>
+          <dgm:hierBranch val="init"/>
+        </dgm:presLayoutVars>
+      </dgm:prSet>
+      <dgm:spPr/>
+    </dgm:pt>
+    <dgm:pt modelId="{C9D0555B-6EC1-4344-81EF-D26EA52AA196}" type="pres">
+      <dgm:prSet presAssocID="{4C125362-B319-4302-82C6-B82336E14B66}" presName="rootComposite" presStyleCnt="0"/>
+      <dgm:spPr/>
+    </dgm:pt>
+    <dgm:pt modelId="{25141F2D-D674-49BB-AE68-0CA0C220D782}" type="pres">
+      <dgm:prSet presAssocID="{4C125362-B319-4302-82C6-B82336E14B66}" presName="rootText" presStyleLbl="node4" presStyleIdx="1" presStyleCnt="7">
+        <dgm:presLayoutVars>
+          <dgm:chPref val="3"/>
+        </dgm:presLayoutVars>
+      </dgm:prSet>
+      <dgm:spPr/>
+      <dgm:t>
+        <a:bodyPr/>
+        <a:lstStyle/>
+        <a:p>
+          <a:endParaRPr lang="en-US"/>
+        </a:p>
+      </dgm:t>
+    </dgm:pt>
+    <dgm:pt modelId="{4DE4485D-C966-4760-8B60-C48354DCE04F}" type="pres">
+      <dgm:prSet presAssocID="{4C125362-B319-4302-82C6-B82336E14B66}" presName="rootConnector" presStyleLbl="node4" presStyleIdx="1" presStyleCnt="7"/>
+      <dgm:spPr/>
+      <dgm:t>
+        <a:bodyPr/>
+        <a:lstStyle/>
+        <a:p>
+          <a:endParaRPr lang="en-US"/>
+        </a:p>
+      </dgm:t>
+    </dgm:pt>
+    <dgm:pt modelId="{39E14A84-CC4B-4B80-B1C5-801BD307B276}" type="pres">
+      <dgm:prSet presAssocID="{4C125362-B319-4302-82C6-B82336E14B66}" presName="hierChild4" presStyleCnt="0"/>
+      <dgm:spPr/>
+    </dgm:pt>
+    <dgm:pt modelId="{BA6A95F2-0C44-4BCD-A802-62D9AB0DA317}" type="pres">
+      <dgm:prSet presAssocID="{4C125362-B319-4302-82C6-B82336E14B66}" presName="hierChild5" presStyleCnt="0"/>
+      <dgm:spPr/>
+    </dgm:pt>
+    <dgm:pt modelId="{1A5C9C4F-64FB-40ED-A99E-D38A51E57A1A}" type="pres">
+      <dgm:prSet presAssocID="{344E5DE4-1469-41EC-A8E3-47C52589CB06}" presName="Name37" presStyleLbl="parChTrans1D4" presStyleIdx="2" presStyleCnt="7"/>
+      <dgm:spPr/>
+      <dgm:t>
+        <a:bodyPr/>
+        <a:lstStyle/>
+        <a:p>
+          <a:endParaRPr lang="en-US"/>
+        </a:p>
+      </dgm:t>
+    </dgm:pt>
+    <dgm:pt modelId="{1BFF744C-63DA-43CB-BA7C-91E82388DB82}" type="pres">
+      <dgm:prSet presAssocID="{0ABD9981-A34B-4DEB-9533-9BA9A24DF6E1}" presName="hierRoot2" presStyleCnt="0">
+        <dgm:presLayoutVars>
+          <dgm:hierBranch val="init"/>
+        </dgm:presLayoutVars>
+      </dgm:prSet>
+      <dgm:spPr/>
+    </dgm:pt>
+    <dgm:pt modelId="{D2AEBBC9-CEA7-4B6C-AECE-C2E3C8BB2DCA}" type="pres">
+      <dgm:prSet presAssocID="{0ABD9981-A34B-4DEB-9533-9BA9A24DF6E1}" presName="rootComposite" presStyleCnt="0"/>
+      <dgm:spPr/>
+    </dgm:pt>
+    <dgm:pt modelId="{22DAC826-D102-4123-835A-EC61AC6F795E}" type="pres">
+      <dgm:prSet presAssocID="{0ABD9981-A34B-4DEB-9533-9BA9A24DF6E1}" presName="rootText" presStyleLbl="node4" presStyleIdx="2" presStyleCnt="7">
+        <dgm:presLayoutVars>
+          <dgm:chPref val="3"/>
+        </dgm:presLayoutVars>
+      </dgm:prSet>
+      <dgm:spPr/>
+      <dgm:t>
+        <a:bodyPr/>
+        <a:lstStyle/>
+        <a:p>
+          <a:endParaRPr lang="en-US"/>
+        </a:p>
+      </dgm:t>
+    </dgm:pt>
+    <dgm:pt modelId="{7742CE8A-E277-4714-A730-CBE9A02DA09F}" type="pres">
+      <dgm:prSet presAssocID="{0ABD9981-A34B-4DEB-9533-9BA9A24DF6E1}" presName="rootConnector" presStyleLbl="node4" presStyleIdx="2" presStyleCnt="7"/>
+      <dgm:spPr/>
+      <dgm:t>
+        <a:bodyPr/>
+        <a:lstStyle/>
+        <a:p>
+          <a:endParaRPr lang="en-US"/>
+        </a:p>
+      </dgm:t>
+    </dgm:pt>
+    <dgm:pt modelId="{F72AB67B-7721-44DE-8260-00B3755D1887}" type="pres">
+      <dgm:prSet presAssocID="{0ABD9981-A34B-4DEB-9533-9BA9A24DF6E1}" presName="hierChild4" presStyleCnt="0"/>
+      <dgm:spPr/>
+    </dgm:pt>
+    <dgm:pt modelId="{1C84342F-6FCA-40C8-B21C-44A7BF3E9642}" type="pres">
+      <dgm:prSet presAssocID="{0ABD9981-A34B-4DEB-9533-9BA9A24DF6E1}" presName="hierChild5" presStyleCnt="0"/>
+      <dgm:spPr/>
+    </dgm:pt>
+    <dgm:pt modelId="{F3BF9B28-4953-4D4C-BE5C-661CE240EC49}" type="pres">
+      <dgm:prSet presAssocID="{94BEEE13-130E-4EEC-9DDD-C7717CBEA280}" presName="hierChild5" presStyleCnt="0"/>
+      <dgm:spPr/>
+    </dgm:pt>
+    <dgm:pt modelId="{905FA4BD-823A-4DBC-B6C3-AE0EF7EB544B}" type="pres">
+      <dgm:prSet presAssocID="{69AD430E-C984-4C3F-AD04-6AE9245422DE}" presName="Name37" presStyleLbl="parChTrans1D3" presStyleIdx="1" presStyleCnt="3"/>
+      <dgm:spPr/>
+      <dgm:t>
+        <a:bodyPr/>
+        <a:lstStyle/>
+        <a:p>
+          <a:endParaRPr lang="en-US"/>
+        </a:p>
+      </dgm:t>
+    </dgm:pt>
+    <dgm:pt modelId="{4873CAC8-FE62-4BE0-94BF-388805DEB728}" type="pres">
+      <dgm:prSet presAssocID="{A7DDCA00-0048-4EF5-BC53-905A55164BDF}" presName="hierRoot2" presStyleCnt="0">
+        <dgm:presLayoutVars>
+          <dgm:hierBranch val="init"/>
+        </dgm:presLayoutVars>
+      </dgm:prSet>
+      <dgm:spPr/>
+    </dgm:pt>
+    <dgm:pt modelId="{8C45D077-8D4B-46A3-AE00-BBFD59D5AA49}" type="pres">
+      <dgm:prSet presAssocID="{A7DDCA00-0048-4EF5-BC53-905A55164BDF}" presName="rootComposite" presStyleCnt="0"/>
+      <dgm:spPr/>
+    </dgm:pt>
+    <dgm:pt modelId="{3622CEB4-DF89-40B5-B6FF-C861F20516A8}" type="pres">
+      <dgm:prSet presAssocID="{A7DDCA00-0048-4EF5-BC53-905A55164BDF}" presName="rootText" presStyleLbl="node3" presStyleIdx="1" presStyleCnt="3" custScaleX="154642" custScaleY="167153">
+        <dgm:presLayoutVars>
+          <dgm:chPref val="3"/>
+        </dgm:presLayoutVars>
+      </dgm:prSet>
+      <dgm:spPr/>
+      <dgm:t>
+        <a:bodyPr/>
+        <a:lstStyle/>
+        <a:p>
+          <a:endParaRPr lang="en-US"/>
+        </a:p>
+      </dgm:t>
+    </dgm:pt>
+    <dgm:pt modelId="{E5ED7200-733D-4CAE-BB2A-46639CCAD156}" type="pres">
+      <dgm:prSet presAssocID="{A7DDCA00-0048-4EF5-BC53-905A55164BDF}" presName="rootConnector" presStyleLbl="node3" presStyleIdx="1" presStyleCnt="3"/>
+      <dgm:spPr/>
+      <dgm:t>
+        <a:bodyPr/>
+        <a:lstStyle/>
+        <a:p>
+          <a:endParaRPr lang="en-US"/>
+        </a:p>
+      </dgm:t>
+    </dgm:pt>
+    <dgm:pt modelId="{D1530FFE-FEAA-462E-9883-76AFAFC29795}" type="pres">
+      <dgm:prSet presAssocID="{A7DDCA00-0048-4EF5-BC53-905A55164BDF}" presName="hierChild4" presStyleCnt="0"/>
+      <dgm:spPr/>
+    </dgm:pt>
+    <dgm:pt modelId="{D50F4E5B-178E-44D3-9177-4EEFFF1B0323}" type="pres">
+      <dgm:prSet presAssocID="{6CC03B51-957D-426F-A27A-E70488D0C692}" presName="Name37" presStyleLbl="parChTrans1D4" presStyleIdx="3" presStyleCnt="7"/>
+      <dgm:spPr/>
+      <dgm:t>
+        <a:bodyPr/>
+        <a:lstStyle/>
+        <a:p>
+          <a:endParaRPr lang="en-US"/>
+        </a:p>
+      </dgm:t>
+    </dgm:pt>
+    <dgm:pt modelId="{A7F66EDC-906D-47D7-AA3F-69562A25313C}" type="pres">
+      <dgm:prSet presAssocID="{6F627769-1BC1-4180-BBAD-43FBEF02E7A3}" presName="hierRoot2" presStyleCnt="0">
+        <dgm:presLayoutVars>
+          <dgm:hierBranch val="init"/>
+        </dgm:presLayoutVars>
+      </dgm:prSet>
+      <dgm:spPr/>
+    </dgm:pt>
+    <dgm:pt modelId="{D4012BB7-D28A-4888-A477-F70D4718414A}" type="pres">
+      <dgm:prSet presAssocID="{6F627769-1BC1-4180-BBAD-43FBEF02E7A3}" presName="rootComposite" presStyleCnt="0"/>
+      <dgm:spPr/>
+    </dgm:pt>
+    <dgm:pt modelId="{8C178A2A-732D-4104-AE7D-0EB7E87922FE}" type="pres">
+      <dgm:prSet presAssocID="{6F627769-1BC1-4180-BBAD-43FBEF02E7A3}" presName="rootText" presStyleLbl="node4" presStyleIdx="3" presStyleCnt="7" custScaleX="211254">
+        <dgm:presLayoutVars>
+          <dgm:chPref val="3"/>
+        </dgm:presLayoutVars>
+      </dgm:prSet>
+      <dgm:spPr/>
+      <dgm:t>
+        <a:bodyPr/>
+        <a:lstStyle/>
+        <a:p>
+          <a:endParaRPr lang="en-US"/>
+        </a:p>
+      </dgm:t>
+    </dgm:pt>
+    <dgm:pt modelId="{39D0D6DF-99F7-4929-B687-2955C2238DF2}" type="pres">
+      <dgm:prSet presAssocID="{6F627769-1BC1-4180-BBAD-43FBEF02E7A3}" presName="rootConnector" presStyleLbl="node4" presStyleIdx="3" presStyleCnt="7"/>
+      <dgm:spPr/>
+      <dgm:t>
+        <a:bodyPr/>
+        <a:lstStyle/>
+        <a:p>
+          <a:endParaRPr lang="en-US"/>
+        </a:p>
+      </dgm:t>
+    </dgm:pt>
+    <dgm:pt modelId="{A9A22F3E-972A-4716-A6E2-3B655E7050BB}" type="pres">
+      <dgm:prSet presAssocID="{6F627769-1BC1-4180-BBAD-43FBEF02E7A3}" presName="hierChild4" presStyleCnt="0"/>
+      <dgm:spPr/>
+    </dgm:pt>
+    <dgm:pt modelId="{B123CEDC-7E39-42BD-9449-50C00CA165A3}" type="pres">
+      <dgm:prSet presAssocID="{6F627769-1BC1-4180-BBAD-43FBEF02E7A3}" presName="hierChild5" presStyleCnt="0"/>
+      <dgm:spPr/>
+    </dgm:pt>
+    <dgm:pt modelId="{4315641D-3433-4048-9721-FF13A4E44DEB}" type="pres">
+      <dgm:prSet presAssocID="{1660E291-5E37-40E6-A617-32F4A793FD75}" presName="Name37" presStyleLbl="parChTrans1D4" presStyleIdx="4" presStyleCnt="7"/>
+      <dgm:spPr/>
+      <dgm:t>
+        <a:bodyPr/>
+        <a:lstStyle/>
+        <a:p>
+          <a:endParaRPr lang="en-US"/>
+        </a:p>
+      </dgm:t>
+    </dgm:pt>
+    <dgm:pt modelId="{4C4D2D2C-C449-42BE-B33A-CCAF08073502}" type="pres">
+      <dgm:prSet presAssocID="{62BB8B7A-11B3-4683-A3B2-198F9DB8CF18}" presName="hierRoot2" presStyleCnt="0">
+        <dgm:presLayoutVars>
+          <dgm:hierBranch val="init"/>
+        </dgm:presLayoutVars>
+      </dgm:prSet>
+      <dgm:spPr/>
+    </dgm:pt>
+    <dgm:pt modelId="{70D38A1B-53A2-42BA-9CFA-1809FC0DCA4E}" type="pres">
+      <dgm:prSet presAssocID="{62BB8B7A-11B3-4683-A3B2-198F9DB8CF18}" presName="rootComposite" presStyleCnt="0"/>
+      <dgm:spPr/>
+    </dgm:pt>
+    <dgm:pt modelId="{5A4A4BF7-7BE8-4BB9-AAB6-20BADDFABE1C}" type="pres">
+      <dgm:prSet presAssocID="{62BB8B7A-11B3-4683-A3B2-198F9DB8CF18}" presName="rootText" presStyleLbl="node4" presStyleIdx="4" presStyleCnt="7" custScaleX="211924" custScaleY="171556">
+        <dgm:presLayoutVars>
+          <dgm:chPref val="3"/>
+        </dgm:presLayoutVars>
+      </dgm:prSet>
+      <dgm:spPr/>
+      <dgm:t>
+        <a:bodyPr/>
+        <a:lstStyle/>
+        <a:p>
+          <a:endParaRPr lang="en-US"/>
+        </a:p>
+      </dgm:t>
+    </dgm:pt>
+    <dgm:pt modelId="{667723AA-80BA-4063-808C-36ED4D8CF8FE}" type="pres">
+      <dgm:prSet presAssocID="{62BB8B7A-11B3-4683-A3B2-198F9DB8CF18}" presName="rootConnector" presStyleLbl="node4" presStyleIdx="4" presStyleCnt="7"/>
+      <dgm:spPr/>
+      <dgm:t>
+        <a:bodyPr/>
+        <a:lstStyle/>
+        <a:p>
+          <a:endParaRPr lang="en-US"/>
+        </a:p>
+      </dgm:t>
+    </dgm:pt>
+    <dgm:pt modelId="{09841FA1-2C35-4E05-A935-8BAB10D9FDC3}" type="pres">
+      <dgm:prSet presAssocID="{62BB8B7A-11B3-4683-A3B2-198F9DB8CF18}" presName="hierChild4" presStyleCnt="0"/>
+      <dgm:spPr/>
+    </dgm:pt>
+    <dgm:pt modelId="{986EBD1B-F624-49CF-A7A2-8DAECA30A5D6}" type="pres">
+      <dgm:prSet presAssocID="{7137F455-13A3-4DC9-8C7B-BC8FD94C6324}" presName="Name37" presStyleLbl="parChTrans1D4" presStyleIdx="5" presStyleCnt="7"/>
+      <dgm:spPr/>
+      <dgm:t>
+        <a:bodyPr/>
+        <a:lstStyle/>
+        <a:p>
+          <a:endParaRPr lang="en-US"/>
+        </a:p>
+      </dgm:t>
+    </dgm:pt>
+    <dgm:pt modelId="{E1E0F46F-872E-42CB-B313-DDB3BD8A7938}" type="pres">
+      <dgm:prSet presAssocID="{4046CB89-1C62-4AE9-8F32-765CFB574D93}" presName="hierRoot2" presStyleCnt="0">
+        <dgm:presLayoutVars>
+          <dgm:hierBranch val="init"/>
+        </dgm:presLayoutVars>
+      </dgm:prSet>
+      <dgm:spPr/>
+    </dgm:pt>
+    <dgm:pt modelId="{86272E65-AC4E-4F19-A97C-0C584592A2F9}" type="pres">
+      <dgm:prSet presAssocID="{4046CB89-1C62-4AE9-8F32-765CFB574D93}" presName="rootComposite" presStyleCnt="0"/>
+      <dgm:spPr/>
+    </dgm:pt>
+    <dgm:pt modelId="{E5E5B2AC-9F7D-45F5-A433-916DB59D58EA}" type="pres">
+      <dgm:prSet presAssocID="{4046CB89-1C62-4AE9-8F32-765CFB574D93}" presName="rootText" presStyleLbl="node4" presStyleIdx="5" presStyleCnt="7" custScaleX="189827" custScaleY="183093">
+        <dgm:presLayoutVars>
+          <dgm:chPref val="3"/>
+        </dgm:presLayoutVars>
+      </dgm:prSet>
+      <dgm:spPr/>
+      <dgm:t>
+        <a:bodyPr/>
+        <a:lstStyle/>
+        <a:p>
+          <a:endParaRPr lang="en-US"/>
+        </a:p>
+      </dgm:t>
+    </dgm:pt>
+    <dgm:pt modelId="{DF52E326-4209-46ED-A116-13A781D164D3}" type="pres">
+      <dgm:prSet presAssocID="{4046CB89-1C62-4AE9-8F32-765CFB574D93}" presName="rootConnector" presStyleLbl="node4" presStyleIdx="5" presStyleCnt="7"/>
+      <dgm:spPr/>
+      <dgm:t>
+        <a:bodyPr/>
+        <a:lstStyle/>
+        <a:p>
+          <a:endParaRPr lang="en-US"/>
+        </a:p>
+      </dgm:t>
+    </dgm:pt>
+    <dgm:pt modelId="{E5DADB2A-7D09-470C-AF51-551BC3D05C65}" type="pres">
+      <dgm:prSet presAssocID="{4046CB89-1C62-4AE9-8F32-765CFB574D93}" presName="hierChild4" presStyleCnt="0"/>
+      <dgm:spPr/>
+    </dgm:pt>
+    <dgm:pt modelId="{F96CB32D-8604-411D-BB64-CFD5D6FEC74C}" type="pres">
+      <dgm:prSet presAssocID="{4046CB89-1C62-4AE9-8F32-765CFB574D93}" presName="hierChild5" presStyleCnt="0"/>
+      <dgm:spPr/>
+    </dgm:pt>
+    <dgm:pt modelId="{6D56C6D8-74B1-43BE-B288-DF6E5634A838}" type="pres">
+      <dgm:prSet presAssocID="{FD1BDC84-2197-4366-887A-CA22AD7CB0C7}" presName="Name37" presStyleLbl="parChTrans1D4" presStyleIdx="6" presStyleCnt="7"/>
+      <dgm:spPr/>
+      <dgm:t>
+        <a:bodyPr/>
+        <a:lstStyle/>
+        <a:p>
+          <a:endParaRPr lang="en-US"/>
+        </a:p>
+      </dgm:t>
+    </dgm:pt>
+    <dgm:pt modelId="{7F654A20-DB41-43FE-B704-E9C9012367B8}" type="pres">
+      <dgm:prSet presAssocID="{32566BEC-8261-4EDA-BD80-21C6B4E839C2}" presName="hierRoot2" presStyleCnt="0">
+        <dgm:presLayoutVars>
+          <dgm:hierBranch val="init"/>
+        </dgm:presLayoutVars>
+      </dgm:prSet>
+      <dgm:spPr/>
+    </dgm:pt>
+    <dgm:pt modelId="{2E6388E9-097B-42F1-AB11-8BE37D211DA8}" type="pres">
+      <dgm:prSet presAssocID="{32566BEC-8261-4EDA-BD80-21C6B4E839C2}" presName="rootComposite" presStyleCnt="0"/>
+      <dgm:spPr/>
+    </dgm:pt>
+    <dgm:pt modelId="{42DE635D-FEA7-4D13-A18B-3D2CDD8D9D25}" type="pres">
+      <dgm:prSet presAssocID="{32566BEC-8261-4EDA-BD80-21C6B4E839C2}" presName="rootText" presStyleLbl="node4" presStyleIdx="6" presStyleCnt="7" custScaleX="179431" custScaleY="157932">
+        <dgm:presLayoutVars>
+          <dgm:chPref val="3"/>
+        </dgm:presLayoutVars>
+      </dgm:prSet>
+      <dgm:spPr/>
+      <dgm:t>
+        <a:bodyPr/>
+        <a:lstStyle/>
+        <a:p>
+          <a:endParaRPr lang="en-US"/>
+        </a:p>
+      </dgm:t>
+    </dgm:pt>
+    <dgm:pt modelId="{B11876D7-9C9C-47A0-BAE8-985FB97E955A}" type="pres">
+      <dgm:prSet presAssocID="{32566BEC-8261-4EDA-BD80-21C6B4E839C2}" presName="rootConnector" presStyleLbl="node4" presStyleIdx="6" presStyleCnt="7"/>
+      <dgm:spPr/>
+      <dgm:t>
+        <a:bodyPr/>
+        <a:lstStyle/>
+        <a:p>
+          <a:endParaRPr lang="en-US"/>
+        </a:p>
+      </dgm:t>
+    </dgm:pt>
+    <dgm:pt modelId="{7149AC93-0A7E-4376-B741-2D1E8BBB9B7A}" type="pres">
+      <dgm:prSet presAssocID="{32566BEC-8261-4EDA-BD80-21C6B4E839C2}" presName="hierChild4" presStyleCnt="0"/>
+      <dgm:spPr/>
+    </dgm:pt>
+    <dgm:pt modelId="{F08E0979-6240-42F4-A2B1-9147B9F56D4D}" type="pres">
+      <dgm:prSet presAssocID="{32566BEC-8261-4EDA-BD80-21C6B4E839C2}" presName="hierChild5" presStyleCnt="0"/>
+      <dgm:spPr/>
+    </dgm:pt>
+    <dgm:pt modelId="{529233A1-AC31-4533-A22C-1C06F6290184}" type="pres">
+      <dgm:prSet presAssocID="{62BB8B7A-11B3-4683-A3B2-198F9DB8CF18}" presName="hierChild5" presStyleCnt="0"/>
+      <dgm:spPr/>
+    </dgm:pt>
+    <dgm:pt modelId="{548D0BD2-F83A-4047-A44A-4DCB054D0A56}" type="pres">
+      <dgm:prSet presAssocID="{A7DDCA00-0048-4EF5-BC53-905A55164BDF}" presName="hierChild5" presStyleCnt="0"/>
+      <dgm:spPr/>
+    </dgm:pt>
+    <dgm:pt modelId="{164CBA5A-B4C0-4193-9C93-FD63DB9C9512}" type="pres">
+      <dgm:prSet presAssocID="{8C46C7A8-C3A6-416C-BE4D-1D59C04A0616}" presName="hierChild5" presStyleCnt="0"/>
+      <dgm:spPr/>
+    </dgm:pt>
+    <dgm:pt modelId="{6F0B2341-6DE9-45F7-B07F-BCBA3B1ED4CE}" type="pres">
+      <dgm:prSet presAssocID="{CB20C354-CF44-483E-B30D-65DCD4BEFBCF}" presName="Name37" presStyleLbl="parChTrans1D2" presStyleIdx="1" presStyleCnt="2"/>
+      <dgm:spPr/>
+      <dgm:t>
+        <a:bodyPr/>
+        <a:lstStyle/>
+        <a:p>
+          <a:endParaRPr lang="en-US"/>
+        </a:p>
+      </dgm:t>
+    </dgm:pt>
+    <dgm:pt modelId="{DD00BECB-9214-492E-B5E5-6FEEAB8A3FB2}" type="pres">
+      <dgm:prSet presAssocID="{57BAB4A4-4C96-4566-A071-764E0D6471C5}" presName="hierRoot2" presStyleCnt="0">
+        <dgm:presLayoutVars>
+          <dgm:hierBranch val="init"/>
+        </dgm:presLayoutVars>
+      </dgm:prSet>
+      <dgm:spPr/>
+    </dgm:pt>
+    <dgm:pt modelId="{981279A5-ADBA-4490-8B59-257144D3FAE3}" type="pres">
+      <dgm:prSet presAssocID="{57BAB4A4-4C96-4566-A071-764E0D6471C5}" presName="rootComposite" presStyleCnt="0"/>
+      <dgm:spPr/>
+    </dgm:pt>
+    <dgm:pt modelId="{A496B5B2-802E-4CBA-BE8F-87A65B7CD56B}" type="pres">
+      <dgm:prSet presAssocID="{57BAB4A4-4C96-4566-A071-764E0D6471C5}" presName="rootText" presStyleLbl="node2" presStyleIdx="1" presStyleCnt="2">
+        <dgm:presLayoutVars>
+          <dgm:chPref val="3"/>
+        </dgm:presLayoutVars>
+      </dgm:prSet>
+      <dgm:spPr/>
+      <dgm:t>
+        <a:bodyPr/>
+        <a:lstStyle/>
+        <a:p>
+          <a:endParaRPr lang="en-US"/>
+        </a:p>
+      </dgm:t>
+    </dgm:pt>
+    <dgm:pt modelId="{891DBB9B-425B-45B8-BBC7-37546DA44D81}" type="pres">
+      <dgm:prSet presAssocID="{57BAB4A4-4C96-4566-A071-764E0D6471C5}" presName="rootConnector" presStyleLbl="node2" presStyleIdx="1" presStyleCnt="2"/>
+      <dgm:spPr/>
+      <dgm:t>
+        <a:bodyPr/>
+        <a:lstStyle/>
+        <a:p>
+          <a:endParaRPr lang="en-US"/>
+        </a:p>
+      </dgm:t>
+    </dgm:pt>
+    <dgm:pt modelId="{A1C2E667-4D87-49F0-BA37-475CD204276D}" type="pres">
+      <dgm:prSet presAssocID="{57BAB4A4-4C96-4566-A071-764E0D6471C5}" presName="hierChild4" presStyleCnt="0"/>
+      <dgm:spPr/>
+    </dgm:pt>
+    <dgm:pt modelId="{C2F241C3-3447-4734-B4A8-C7B001806B4A}" type="pres">
+      <dgm:prSet presAssocID="{D9CBFF1D-85A4-4066-8DBB-D04869593D0B}" presName="Name37" presStyleLbl="parChTrans1D3" presStyleIdx="2" presStyleCnt="3"/>
+      <dgm:spPr/>
+      <dgm:t>
+        <a:bodyPr/>
+        <a:lstStyle/>
+        <a:p>
+          <a:endParaRPr lang="en-US"/>
+        </a:p>
+      </dgm:t>
+    </dgm:pt>
+    <dgm:pt modelId="{7A2F127E-4808-4CB8-82D0-46BD5BA3A8D5}" type="pres">
+      <dgm:prSet presAssocID="{79F3DFFE-3EBC-4C48-85F0-30EB10204FB9}" presName="hierRoot2" presStyleCnt="0">
+        <dgm:presLayoutVars>
+          <dgm:hierBranch val="init"/>
+        </dgm:presLayoutVars>
+      </dgm:prSet>
+      <dgm:spPr/>
+    </dgm:pt>
+    <dgm:pt modelId="{535B667D-E115-46D5-A1EB-AE70A1D0BA3A}" type="pres">
+      <dgm:prSet presAssocID="{79F3DFFE-3EBC-4C48-85F0-30EB10204FB9}" presName="rootComposite" presStyleCnt="0"/>
+      <dgm:spPr/>
+    </dgm:pt>
+    <dgm:pt modelId="{D1370E5A-24B5-48E4-A609-70BFD9FCB851}" type="pres">
+      <dgm:prSet presAssocID="{79F3DFFE-3EBC-4C48-85F0-30EB10204FB9}" presName="rootText" presStyleLbl="node3" presStyleIdx="2" presStyleCnt="3" custScaleX="243168" custScaleY="154558">
+        <dgm:presLayoutVars>
+          <dgm:chPref val="3"/>
+        </dgm:presLayoutVars>
+      </dgm:prSet>
+      <dgm:spPr/>
+      <dgm:t>
+        <a:bodyPr/>
+        <a:lstStyle/>
+        <a:p>
+          <a:endParaRPr lang="en-US"/>
+        </a:p>
+      </dgm:t>
+    </dgm:pt>
     <dgm:pt modelId="{09C0EBA3-7236-4AE4-A870-635EA7F58EE0}" type="pres">
       <dgm:prSet presAssocID="{79F3DFFE-3EBC-4C48-85F0-30EB10204FB9}" presName="rootConnector" presStyleLbl="node3" presStyleIdx="2" presStyleCnt="3"/>
       <dgm:spPr/>
+      <dgm:t>
+        <a:bodyPr/>
+        <a:lstStyle/>
+        <a:p>
+          <a:endParaRPr lang="en-US"/>
+        </a:p>
+      </dgm:t>
     </dgm:pt>
     <dgm:pt modelId="{D6913B3B-FB86-4493-86E5-658C954B2B07}" type="pres">
       <dgm:prSet presAssocID="{79F3DFFE-3EBC-4C48-85F0-30EB10204FB9}" presName="hierChild4" presStyleCnt="0"/>
@@ -8178,8 +8603,8 @@
     </dgm:pt>
   </dgm:ptLst>
   <dgm:cxnLst>
+    <dgm:cxn modelId="{C465531C-EEB3-4705-AA50-51151B5CE178}" type="presOf" srcId="{4046CB89-1C62-4AE9-8F32-765CFB574D93}" destId="{E5E5B2AC-9F7D-45F5-A433-916DB59D58EA}" srcOrd="0" destOrd="0" presId="urn:microsoft.com/office/officeart/2005/8/layout/orgChart1"/>
     <dgm:cxn modelId="{4F634258-E33A-4481-8B3C-D9C3E4BC6BDC}" type="presOf" srcId="{62BB8B7A-11B3-4683-A3B2-198F9DB8CF18}" destId="{5A4A4BF7-7BE8-4BB9-AAB6-20BADDFABE1C}" srcOrd="0" destOrd="0" presId="urn:microsoft.com/office/officeart/2005/8/layout/orgChart1"/>
-    <dgm:cxn modelId="{C465531C-EEB3-4705-AA50-51151B5CE178}" type="presOf" srcId="{4046CB89-1C62-4AE9-8F32-765CFB574D93}" destId="{E5E5B2AC-9F7D-45F5-A433-916DB59D58EA}" srcOrd="0" destOrd="0" presId="urn:microsoft.com/office/officeart/2005/8/layout/orgChart1"/>
     <dgm:cxn modelId="{26BC7450-88D1-49DE-81F8-35593FDABAC3}" type="presOf" srcId="{8AC781BD-4676-40BC-A90F-00CBE2982E9F}" destId="{673A353D-F32F-47C9-B81A-BD74B18A837F}" srcOrd="0" destOrd="0" presId="urn:microsoft.com/office/officeart/2005/8/layout/orgChart1"/>
     <dgm:cxn modelId="{04E8A6D2-8D08-407C-B328-0EA6CFF0DE79}" type="presOf" srcId="{7E3A6A4B-4C53-4A48-A69D-10730FB2351B}" destId="{77606003-3225-44DD-BFD3-B9CBC451291F}" srcOrd="0" destOrd="0" presId="urn:microsoft.com/office/officeart/2005/8/layout/orgChart1"/>
     <dgm:cxn modelId="{DB910594-0FA0-4A78-9E95-15E18EBBE642}" type="presOf" srcId="{0ABD9981-A34B-4DEB-9533-9BA9A24DF6E1}" destId="{22DAC826-D102-4123-835A-EC61AC6F795E}" srcOrd="0" destOrd="0" presId="urn:microsoft.com/office/officeart/2005/8/layout/orgChart1"/>
@@ -8222,8 +8647,8 @@
     <dgm:cxn modelId="{E180A5B4-23FC-4DA4-AA8F-BAD2FAD130FD}" type="presOf" srcId="{62BB8B7A-11B3-4683-A3B2-198F9DB8CF18}" destId="{667723AA-80BA-4063-808C-36ED4D8CF8FE}" srcOrd="1" destOrd="0" presId="urn:microsoft.com/office/officeart/2005/8/layout/orgChart1"/>
     <dgm:cxn modelId="{067363B5-9A36-49E5-B189-186492D5F7D3}" type="presOf" srcId="{4CE94B52-B7CA-49DB-913E-DFFD0B512971}" destId="{10EFC701-3233-4158-BF9F-CBAA1551CA49}" srcOrd="0" destOrd="0" presId="urn:microsoft.com/office/officeart/2005/8/layout/orgChart1"/>
     <dgm:cxn modelId="{A5A0C5CF-0DE8-44FB-8EF9-578A2ABA1AA0}" type="presOf" srcId="{CB20C354-CF44-483E-B30D-65DCD4BEFBCF}" destId="{6F0B2341-6DE9-45F7-B07F-BCBA3B1ED4CE}" srcOrd="0" destOrd="0" presId="urn:microsoft.com/office/officeart/2005/8/layout/orgChart1"/>
+    <dgm:cxn modelId="{AE34F005-0BC6-4724-8AE5-C6EF23CA19AB}" type="presOf" srcId="{79F3DFFE-3EBC-4C48-85F0-30EB10204FB9}" destId="{D1370E5A-24B5-48E4-A609-70BFD9FCB851}" srcOrd="0" destOrd="0" presId="urn:microsoft.com/office/officeart/2005/8/layout/orgChart1"/>
     <dgm:cxn modelId="{2A78422B-1B78-4A05-89B6-1D93375C9A11}" type="presOf" srcId="{79F3DFFE-3EBC-4C48-85F0-30EB10204FB9}" destId="{09C0EBA3-7236-4AE4-A870-635EA7F58EE0}" srcOrd="1" destOrd="0" presId="urn:microsoft.com/office/officeart/2005/8/layout/orgChart1"/>
-    <dgm:cxn modelId="{AE34F005-0BC6-4724-8AE5-C6EF23CA19AB}" type="presOf" srcId="{79F3DFFE-3EBC-4C48-85F0-30EB10204FB9}" destId="{D1370E5A-24B5-48E4-A609-70BFD9FCB851}" srcOrd="0" destOrd="0" presId="urn:microsoft.com/office/officeart/2005/8/layout/orgChart1"/>
     <dgm:cxn modelId="{B8DAF96E-AF23-4208-8F4C-2BA517CC7B21}" type="presOf" srcId="{344E5DE4-1469-41EC-A8E3-47C52589CB06}" destId="{1A5C9C4F-64FB-40ED-A99E-D38A51E57A1A}" srcOrd="0" destOrd="0" presId="urn:microsoft.com/office/officeart/2005/8/layout/orgChart1"/>
     <dgm:cxn modelId="{D68CD62D-E676-4558-B5B2-C7155D893189}" type="presOf" srcId="{32566BEC-8261-4EDA-BD80-21C6B4E839C2}" destId="{B11876D7-9C9C-47A0-BAE8-985FB97E955A}" srcOrd="1" destOrd="0" presId="urn:microsoft.com/office/officeart/2005/8/layout/orgChart1"/>
     <dgm:cxn modelId="{734512D6-4F45-4F55-B098-B9F33F98EAE9}" type="presOf" srcId="{6F627769-1BC1-4180-BBAD-43FBEF02E7A3}" destId="{8C178A2A-732D-4104-AE7D-0EB7E87922FE}" srcOrd="0" destOrd="0" presId="urn:microsoft.com/office/officeart/2005/8/layout/orgChart1"/>
@@ -18730,7 +19155,7 @@
             <a:fld id="{9515075B-F3F0-4441-A1BD-B7B515B708FF}" type="datetimeFigureOut">
               <a:rPr lang="en-US" smtClean="0"/>
               <a:pPr/>
-              <a:t>12/19/2018</a:t>
+              <a:t>12/21/2018</a:t>
             </a:fld>
             <a:endParaRPr lang="en-US"/>
           </a:p>
@@ -19197,7 +19622,7 @@
             <a:fld id="{6E658DF8-B8C0-4C7F-85EB-B53A2DDD44A9}" type="datetimeFigureOut">
               <a:rPr lang="en-US" smtClean="0"/>
               <a:pPr/>
-              <a:t>12/19/2018</a:t>
+              <a:t>12/21/2018</a:t>
             </a:fld>
             <a:endParaRPr lang="en-US"/>
           </a:p>
@@ -19364,7 +19789,7 @@
             <a:fld id="{6E658DF8-B8C0-4C7F-85EB-B53A2DDD44A9}" type="datetimeFigureOut">
               <a:rPr lang="en-US" smtClean="0"/>
               <a:pPr/>
-              <a:t>12/19/2018</a:t>
+              <a:t>12/21/2018</a:t>
             </a:fld>
             <a:endParaRPr lang="en-US"/>
           </a:p>
@@ -19541,7 +19966,7 @@
             <a:fld id="{6E658DF8-B8C0-4C7F-85EB-B53A2DDD44A9}" type="datetimeFigureOut">
               <a:rPr lang="en-US" smtClean="0"/>
               <a:pPr/>
-              <a:t>12/19/2018</a:t>
+              <a:t>12/21/2018</a:t>
             </a:fld>
             <a:endParaRPr lang="en-US"/>
           </a:p>
@@ -19740,7 +20165,7 @@
             <a:fld id="{6E658DF8-B8C0-4C7F-85EB-B53A2DDD44A9}" type="datetimeFigureOut">
               <a:rPr lang="en-US" smtClean="0"/>
               <a:pPr/>
-              <a:t>12/19/2018</a:t>
+              <a:t>12/21/2018</a:t>
             </a:fld>
             <a:endParaRPr lang="en-US"/>
           </a:p>
@@ -19983,7 +20408,7 @@
             <a:fld id="{6E658DF8-B8C0-4C7F-85EB-B53A2DDD44A9}" type="datetimeFigureOut">
               <a:rPr lang="en-US" smtClean="0"/>
               <a:pPr/>
-              <a:t>12/19/2018</a:t>
+              <a:t>12/21/2018</a:t>
             </a:fld>
             <a:endParaRPr lang="en-US"/>
           </a:p>
@@ -20268,7 +20693,7 @@
             <a:fld id="{6E658DF8-B8C0-4C7F-85EB-B53A2DDD44A9}" type="datetimeFigureOut">
               <a:rPr lang="en-US" smtClean="0"/>
               <a:pPr/>
-              <a:t>12/19/2018</a:t>
+              <a:t>12/21/2018</a:t>
             </a:fld>
             <a:endParaRPr lang="en-US"/>
           </a:p>
@@ -20687,7 +21112,7 @@
             <a:fld id="{6E658DF8-B8C0-4C7F-85EB-B53A2DDD44A9}" type="datetimeFigureOut">
               <a:rPr lang="en-US" smtClean="0"/>
               <a:pPr/>
-              <a:t>12/19/2018</a:t>
+              <a:t>12/21/2018</a:t>
             </a:fld>
             <a:endParaRPr lang="en-US"/>
           </a:p>
@@ -20802,7 +21227,7 @@
             <a:fld id="{6E658DF8-B8C0-4C7F-85EB-B53A2DDD44A9}" type="datetimeFigureOut">
               <a:rPr lang="en-US" smtClean="0"/>
               <a:pPr/>
-              <a:t>12/19/2018</a:t>
+              <a:t>12/21/2018</a:t>
             </a:fld>
             <a:endParaRPr lang="en-US"/>
           </a:p>
@@ -20894,7 +21319,7 @@
             <a:fld id="{6E658DF8-B8C0-4C7F-85EB-B53A2DDD44A9}" type="datetimeFigureOut">
               <a:rPr lang="en-US" smtClean="0"/>
               <a:pPr/>
-              <a:t>12/19/2018</a:t>
+              <a:t>12/21/2018</a:t>
             </a:fld>
             <a:endParaRPr lang="en-US"/>
           </a:p>
@@ -21168,7 +21593,7 @@
             <a:fld id="{6E658DF8-B8C0-4C7F-85EB-B53A2DDD44A9}" type="datetimeFigureOut">
               <a:rPr lang="en-US" smtClean="0"/>
               <a:pPr/>
-              <a:t>12/19/2018</a:t>
+              <a:t>12/21/2018</a:t>
             </a:fld>
             <a:endParaRPr lang="en-US"/>
           </a:p>
@@ -21422,7 +21847,7 @@
             <a:fld id="{6E658DF8-B8C0-4C7F-85EB-B53A2DDD44A9}" type="datetimeFigureOut">
               <a:rPr lang="en-US" smtClean="0"/>
               <a:pPr/>
-              <a:t>12/19/2018</a:t>
+              <a:t>12/21/2018</a:t>
             </a:fld>
             <a:endParaRPr lang="en-US"/>
           </a:p>
@@ -21644,7 +22069,7 @@
             <a:fld id="{6E658DF8-B8C0-4C7F-85EB-B53A2DDD44A9}" type="datetimeFigureOut">
               <a:rPr lang="en-US" smtClean="0"/>
               <a:pPr/>
-              <a:t>12/19/2018</a:t>
+              <a:t>12/21/2018</a:t>
             </a:fld>
             <a:endParaRPr lang="en-US"/>
           </a:p>
@@ -25776,11 +26201,7 @@
           <a:p>
             <a:r>
               <a:rPr lang="en-IN" dirty="0" smtClean="0"/>
-              <a:t>Ecological </a:t>
-            </a:r>
-            <a:r>
-              <a:rPr lang="en-IN" dirty="0" smtClean="0"/>
-              <a:t>Succession</a:t>
+              <a:t>Ecological Succession</a:t>
             </a:r>
             <a:endParaRPr lang="en-US" dirty="0"/>
           </a:p>
@@ -25804,22 +26225,14 @@
             <a:pPr algn="just"/>
             <a:r>
               <a:rPr lang="en-IN" dirty="0" smtClean="0"/>
-              <a:t>The progressive replacement of plants and animals communities by anothe</a:t>
-            </a:r>
+              <a:t>The progressive replacement of plants and animals communities by another in given area, till the establishment of stable or climax community is called as ecological succession.</a:t>
+            </a:r>
+          </a:p>
+          <a:p>
+            <a:pPr algn="just"/>
             <a:r>
               <a:rPr lang="en-IN" dirty="0" smtClean="0"/>
-              <a:t>r in given area, till the establishment of stable or climax community is called as ecological succession.</a:t>
-            </a:r>
-          </a:p>
-          <a:p>
-            <a:pPr algn="just"/>
-            <a:r>
-              <a:rPr lang="en-IN" dirty="0" smtClean="0"/>
-              <a:t>The establishment of community.</a:t>
-            </a:r>
-            <a:r>
-              <a:rPr lang="en-IN" dirty="0" smtClean="0"/>
-              <a:t> </a:t>
+              <a:t>The establishment of community. </a:t>
             </a:r>
             <a:endParaRPr lang="en-US" dirty="0"/>
           </a:p>
@@ -26193,11 +26606,7 @@
           <a:p>
             <a:r>
               <a:rPr lang="en-IN" sz="3200" dirty="0" smtClean="0"/>
-              <a:t>Ecological </a:t>
-            </a:r>
-            <a:r>
-              <a:rPr lang="en-IN" sz="3200" dirty="0" smtClean="0"/>
-              <a:t>Succession</a:t>
+              <a:t>Ecological Succession</a:t>
             </a:r>
             <a:br>
               <a:rPr lang="en-IN" sz="3200" dirty="0" smtClean="0"/>
@@ -26452,11 +26861,7 @@
             <a:pPr lvl="1"/>
             <a:r>
               <a:rPr lang="en-IN" dirty="0" smtClean="0"/>
-              <a:t>A</a:t>
-            </a:r>
-            <a:r>
-              <a:rPr lang="en-IN" dirty="0" smtClean="0"/>
-              <a:t>n individual species are established in the area is called pioneer community.</a:t>
+              <a:t>An individual species are established in the area is called pioneer community.</a:t>
             </a:r>
           </a:p>
           <a:p>
@@ -26688,15 +27093,7 @@
             <a:pPr lvl="1"/>
             <a:r>
               <a:rPr lang="en-IN" dirty="0" smtClean="0"/>
-              <a:t>After aggregation of large number of species in a limited place, there is a competition between the colonisers and invaders for water</a:t>
-            </a:r>
-            <a:r>
-              <a:rPr lang="en-IN" dirty="0" smtClean="0"/>
-              <a:t> </a:t>
-            </a:r>
-            <a:r>
-              <a:rPr lang="en-IN" dirty="0" smtClean="0"/>
-              <a:t>and nutrition's.</a:t>
+              <a:t>After aggregation of large number of species in a limited place, there is a competition between the colonisers and invaders for water and nutrition's.</a:t>
             </a:r>
           </a:p>
           <a:p>
@@ -26820,7 +27217,6 @@
               <a:rPr lang="en-IN" dirty="0" smtClean="0"/>
               <a:t>Changes in soil, water, light conditions, temperatures due to their growth.</a:t>
             </a:r>
-            <a:endParaRPr lang="en-IN" dirty="0" smtClean="0"/>
           </a:p>
           <a:p>
             <a:pPr lvl="1"/>
@@ -26940,15 +27336,7 @@
             <a:pPr lvl="1"/>
             <a:r>
               <a:rPr lang="en-IN" dirty="0" smtClean="0"/>
-              <a:t>No further changes will occur in vegetation it is known as climax and </a:t>
-            </a:r>
-            <a:r>
-              <a:rPr lang="en-IN" dirty="0" smtClean="0"/>
-              <a:t>community </a:t>
-            </a:r>
-            <a:r>
-              <a:rPr lang="en-IN" dirty="0" smtClean="0"/>
-              <a:t>known as climax community.</a:t>
+              <a:t>No further changes will occur in vegetation it is known as climax and community known as climax community.</a:t>
             </a:r>
           </a:p>
         </p:txBody>
@@ -27046,6 +27434,57 @@
           <a:chExt cx="0" cy="0"/>
         </a:xfrm>
       </p:grpSpPr>
+      <p:pic>
+        <p:nvPicPr>
+          <p:cNvPr id="1026" name="Picture 2" descr="Image result for forest ecosystem"/>
+          <p:cNvPicPr>
+            <a:picLocks noChangeAspect="1" noChangeArrowheads="1"/>
+          </p:cNvPicPr>
+          <p:nvPr/>
+        </p:nvPicPr>
+        <p:blipFill>
+          <a:blip r:embed="rId2"/>
+          <a:srcRect/>
+          <a:stretch>
+            <a:fillRect/>
+          </a:stretch>
+        </p:blipFill>
+        <p:spPr bwMode="auto">
+          <a:xfrm>
+            <a:off x="357157" y="642918"/>
+            <a:ext cx="8452957" cy="5286412"/>
+          </a:xfrm>
+          <a:prstGeom prst="rect">
+            <a:avLst/>
+          </a:prstGeom>
+          <a:noFill/>
+        </p:spPr>
+      </p:pic>
+    </p:spTree>
+  </p:cSld>
+  <p:clrMapOvr>
+    <a:masterClrMapping/>
+  </p:clrMapOvr>
+</p:sld>
+</file>
+
+<file path=ppt/slides/slide45.xml><?xml version="1.0" encoding="utf-8"?>
+<p:sld xmlns:a="http://schemas.openxmlformats.org/drawingml/2006/main" xmlns:r="http://schemas.openxmlformats.org/officeDocument/2006/relationships" xmlns:p="http://schemas.openxmlformats.org/presentationml/2006/main">
+  <p:cSld>
+    <p:spTree>
+      <p:nvGrpSpPr>
+        <p:cNvPr id="1" name=""/>
+        <p:cNvGrpSpPr/>
+        <p:nvPr/>
+      </p:nvGrpSpPr>
+      <p:grpSpPr>
+        <a:xfrm>
+          <a:off x="0" y="0"/>
+          <a:ext cx="0" cy="0"/>
+          <a:chOff x="0" y="0"/>
+          <a:chExt cx="0" cy="0"/>
+        </a:xfrm>
+      </p:grpSpPr>
       <p:sp>
         <p:nvSpPr>
           <p:cNvPr id="2" name="Title 1"/>
@@ -27056,19 +27495,14 @@
             <p:ph type="title"/>
           </p:nvPr>
         </p:nvSpPr>
-        <p:spPr>
-          <a:xfrm>
-            <a:off x="457200" y="1981200"/>
-            <a:ext cx="8229600" cy="1143000"/>
-          </a:xfrm>
-        </p:spPr>
+        <p:spPr/>
         <p:txBody>
           <a:bodyPr/>
           <a:lstStyle/>
           <a:p>
             <a:r>
               <a:rPr lang="en-US" dirty="0" smtClean="0"/>
-              <a:t>Thank You</a:t>
+              <a:t>Forest Ecosystem</a:t>
             </a:r>
             <a:endParaRPr lang="en-US" dirty="0"/>
           </a:p>
@@ -27076,317 +27510,71 @@
       </p:sp>
       <p:sp>
         <p:nvSpPr>
-          <p:cNvPr id="4" name="Subtitle 2"/>
-          <p:cNvSpPr txBox="1">
-            <a:spLocks/>
+          <p:cNvPr id="3" name="Content Placeholder 2"/>
+          <p:cNvSpPr>
+            <a:spLocks noGrp="1"/>
           </p:cNvSpPr>
-          <p:nvPr/>
+          <p:nvPr>
+            <p:ph idx="1"/>
+          </p:nvPr>
         </p:nvSpPr>
-        <p:spPr>
-          <a:xfrm>
-            <a:off x="4038600" y="4191000"/>
-            <a:ext cx="4191000" cy="1752600"/>
-          </a:xfrm>
-          <a:prstGeom prst="rect">
-            <a:avLst/>
-          </a:prstGeom>
-        </p:spPr>
+        <p:spPr/>
         <p:txBody>
-          <a:bodyPr vert="horz" lIns="91440" tIns="45720" rIns="91440" bIns="45720" rtlCol="0">
-            <a:normAutofit fontScale="92500" lnSpcReduction="10000"/>
-          </a:bodyPr>
+          <a:bodyPr/>
           <a:lstStyle/>
           <a:p>
-            <a:pPr marL="342900" marR="0" lvl="0" indent="-342900" algn="r" defTabSz="914400" rtl="0" eaLnBrk="1" fontAlgn="auto" latinLnBrk="0" hangingPunct="1">
-              <a:lnSpc>
-                <a:spcPct val="100000"/>
-              </a:lnSpc>
-              <a:spcBef>
-                <a:spcPct val="20000"/>
-              </a:spcBef>
-              <a:spcAft>
-                <a:spcPts val="0"/>
-              </a:spcAft>
-              <a:buClrTx/>
-              <a:buSzTx/>
-              <a:tabLst/>
-              <a:defRPr/>
-            </a:pPr>
-            <a:r>
-              <a:rPr kumimoji="0" lang="en-US" sz="2200" b="0" i="0" u="none" strike="noStrike" kern="1200" cap="none" spc="0" normalizeH="0" baseline="0" noProof="0" dirty="0" err="1" smtClean="0">
-                <a:ln>
-                  <a:noFill/>
-                </a:ln>
-                <a:solidFill>
-                  <a:schemeClr val="tx1"/>
-                </a:solidFill>
-                <a:effectLst/>
-                <a:uLnTx/>
-                <a:uFillTx/>
-                <a:latin typeface="Cambria" pitchFamily="18" charset="0"/>
-                <a:ea typeface="+mn-ea"/>
-                <a:cs typeface="+mn-cs"/>
-              </a:rPr>
-              <a:t>Rajasekaran</a:t>
-            </a:r>
-            <a:r>
-              <a:rPr kumimoji="0" lang="en-US" sz="2200" b="0" i="0" u="none" strike="noStrike" kern="1200" cap="none" spc="0" normalizeH="0" baseline="0" noProof="0" dirty="0" smtClean="0">
-                <a:ln>
-                  <a:noFill/>
-                </a:ln>
-                <a:solidFill>
-                  <a:schemeClr val="tx1"/>
-                </a:solidFill>
-                <a:effectLst/>
-                <a:uLnTx/>
-                <a:uFillTx/>
-                <a:latin typeface="Cambria" pitchFamily="18" charset="0"/>
-                <a:ea typeface="+mn-ea"/>
-                <a:cs typeface="+mn-cs"/>
-              </a:rPr>
-              <a:t> S</a:t>
-            </a:r>
-          </a:p>
-          <a:p>
-            <a:pPr marL="342900" marR="0" lvl="0" indent="-342900" algn="r" defTabSz="914400" rtl="0" eaLnBrk="1" fontAlgn="auto" latinLnBrk="0" hangingPunct="1">
-              <a:lnSpc>
-                <a:spcPct val="100000"/>
-              </a:lnSpc>
-              <a:spcBef>
-                <a:spcPct val="20000"/>
-              </a:spcBef>
-              <a:spcAft>
-                <a:spcPts val="0"/>
-              </a:spcAft>
-              <a:buClrTx/>
-              <a:buSzTx/>
-              <a:tabLst/>
-              <a:defRPr/>
-            </a:pPr>
-            <a:r>
-              <a:rPr kumimoji="0" lang="en-US" sz="1600" b="0" i="0" u="none" strike="noStrike" kern="1200" cap="none" spc="0" normalizeH="0" baseline="0" noProof="0" dirty="0" smtClean="0">
-                <a:ln>
-                  <a:noFill/>
-                </a:ln>
-                <a:solidFill>
-                  <a:schemeClr val="tx1"/>
-                </a:solidFill>
-                <a:effectLst/>
-                <a:uLnTx/>
-                <a:uFillTx/>
-                <a:latin typeface="Cambria" pitchFamily="18" charset="0"/>
-                <a:ea typeface="+mn-ea"/>
-                <a:cs typeface="+mn-cs"/>
-              </a:rPr>
-              <a:t>Assistant Professor,</a:t>
-            </a:r>
-          </a:p>
-          <a:p>
-            <a:pPr marL="342900" marR="0" lvl="0" indent="-342900" algn="r" defTabSz="914400" rtl="0" eaLnBrk="1" fontAlgn="auto" latinLnBrk="0" hangingPunct="1">
-              <a:lnSpc>
-                <a:spcPct val="100000"/>
-              </a:lnSpc>
-              <a:spcBef>
-                <a:spcPct val="20000"/>
-              </a:spcBef>
-              <a:spcAft>
-                <a:spcPts val="0"/>
-              </a:spcAft>
-              <a:buClrTx/>
-              <a:buSzTx/>
-              <a:tabLst/>
-              <a:defRPr/>
-            </a:pPr>
-            <a:r>
-              <a:rPr kumimoji="0" lang="en-US" sz="1600" b="0" i="0" u="none" strike="noStrike" kern="1200" cap="none" spc="0" normalizeH="0" baseline="0" noProof="0" dirty="0" smtClean="0">
-                <a:ln>
-                  <a:noFill/>
-                </a:ln>
-                <a:solidFill>
-                  <a:schemeClr val="tx1"/>
-                </a:solidFill>
-                <a:effectLst/>
-                <a:uLnTx/>
-                <a:uFillTx/>
-                <a:latin typeface="Cambria" pitchFamily="18" charset="0"/>
-                <a:ea typeface="+mn-ea"/>
-                <a:cs typeface="+mn-cs"/>
-              </a:rPr>
-              <a:t>Department of Information Technology,</a:t>
-            </a:r>
-          </a:p>
-          <a:p>
-            <a:pPr marL="342900" marR="0" lvl="0" indent="-342900" algn="r" defTabSz="914400" rtl="0" eaLnBrk="1" fontAlgn="auto" latinLnBrk="0" hangingPunct="1">
-              <a:lnSpc>
-                <a:spcPct val="100000"/>
-              </a:lnSpc>
-              <a:spcBef>
-                <a:spcPct val="20000"/>
-              </a:spcBef>
-              <a:spcAft>
-                <a:spcPts val="0"/>
-              </a:spcAft>
-              <a:buClrTx/>
-              <a:buSzTx/>
-              <a:tabLst/>
-              <a:defRPr/>
-            </a:pPr>
-            <a:r>
-              <a:rPr kumimoji="0" lang="en-US" sz="1600" b="0" i="0" u="none" strike="noStrike" kern="1200" cap="none" spc="0" normalizeH="0" baseline="0" noProof="0" dirty="0" err="1" smtClean="0">
-                <a:ln>
-                  <a:noFill/>
-                </a:ln>
-                <a:solidFill>
-                  <a:schemeClr val="tx1"/>
-                </a:solidFill>
-                <a:effectLst/>
-                <a:uLnTx/>
-                <a:uFillTx/>
-                <a:latin typeface="Cambria" pitchFamily="18" charset="0"/>
-                <a:ea typeface="+mn-ea"/>
-                <a:cs typeface="+mn-cs"/>
-              </a:rPr>
-              <a:t>KGiSL</a:t>
-            </a:r>
-            <a:r>
-              <a:rPr kumimoji="0" lang="en-US" sz="1600" b="0" i="0" u="none" strike="noStrike" kern="1200" cap="none" spc="0" normalizeH="0" baseline="0" noProof="0" dirty="0" smtClean="0">
-                <a:ln>
-                  <a:noFill/>
-                </a:ln>
-                <a:solidFill>
-                  <a:schemeClr val="tx1"/>
-                </a:solidFill>
-                <a:effectLst/>
-                <a:uLnTx/>
-                <a:uFillTx/>
-                <a:latin typeface="Cambria" pitchFamily="18" charset="0"/>
-                <a:ea typeface="+mn-ea"/>
-                <a:cs typeface="+mn-cs"/>
-              </a:rPr>
-              <a:t> Institute of Technology,</a:t>
-            </a:r>
-          </a:p>
-          <a:p>
-            <a:pPr marL="342900" marR="0" lvl="0" indent="-342900" algn="r" defTabSz="914400" rtl="0" eaLnBrk="1" fontAlgn="auto" latinLnBrk="0" hangingPunct="1">
-              <a:lnSpc>
-                <a:spcPct val="100000"/>
-              </a:lnSpc>
-              <a:spcBef>
-                <a:spcPct val="20000"/>
-              </a:spcBef>
-              <a:spcAft>
-                <a:spcPts val="0"/>
-              </a:spcAft>
-              <a:buClrTx/>
-              <a:buSzTx/>
-              <a:tabLst/>
-              <a:defRPr/>
-            </a:pPr>
-            <a:r>
-              <a:rPr kumimoji="0" lang="en-US" sz="1600" b="0" i="0" u="none" strike="noStrike" kern="1200" cap="none" spc="0" normalizeH="0" baseline="0" noProof="0" dirty="0" smtClean="0">
-                <a:ln>
-                  <a:noFill/>
-                </a:ln>
-                <a:solidFill>
-                  <a:schemeClr val="tx1"/>
-                </a:solidFill>
-                <a:effectLst/>
-                <a:uLnTx/>
-                <a:uFillTx/>
-                <a:latin typeface="Cambria" pitchFamily="18" charset="0"/>
-                <a:ea typeface="+mn-ea"/>
-                <a:cs typeface="+mn-cs"/>
-              </a:rPr>
-              <a:t>email: </a:t>
-            </a:r>
-            <a:r>
-              <a:rPr kumimoji="0" lang="en-US" sz="1600" b="0" i="0" u="none" strike="noStrike" kern="1200" cap="none" spc="0" normalizeH="0" baseline="0" noProof="0" dirty="0" smtClean="0">
-                <a:ln>
-                  <a:noFill/>
-                </a:ln>
-                <a:solidFill>
-                  <a:schemeClr val="tx1"/>
-                </a:solidFill>
-                <a:effectLst/>
-                <a:uLnTx/>
-                <a:uFillTx/>
-                <a:latin typeface="Cambria" pitchFamily="18" charset="0"/>
-                <a:ea typeface="+mn-ea"/>
-                <a:cs typeface="+mn-cs"/>
-                <a:hlinkClick r:id="rId2"/>
-              </a:rPr>
-              <a:t>proffraja@gmail.com</a:t>
-            </a:r>
-            <a:endParaRPr lang="en-US" sz="1600" dirty="0" smtClean="0">
-              <a:latin typeface="Cambria" pitchFamily="18" charset="0"/>
-            </a:endParaRPr>
-          </a:p>
-          <a:p>
-            <a:pPr marL="342900" marR="0" lvl="0" indent="-342900" algn="r" defTabSz="914400" rtl="0" eaLnBrk="1" fontAlgn="auto" latinLnBrk="0" hangingPunct="1">
-              <a:lnSpc>
-                <a:spcPct val="100000"/>
-              </a:lnSpc>
-              <a:spcBef>
-                <a:spcPct val="20000"/>
-              </a:spcBef>
-              <a:spcAft>
-                <a:spcPts val="0"/>
-              </a:spcAft>
-              <a:buClrTx/>
-              <a:buSzTx/>
-              <a:tabLst/>
-              <a:defRPr/>
-            </a:pPr>
-            <a:r>
-              <a:rPr lang="en-US" sz="1600" dirty="0" err="1" smtClean="0">
-                <a:latin typeface="Cambria" pitchFamily="18" charset="0"/>
-              </a:rPr>
-              <a:t>Github:</a:t>
-            </a:r>
-            <a:r>
-              <a:rPr lang="en-US" sz="1600" dirty="0" err="1" smtClean="0">
-                <a:latin typeface="Cambria" pitchFamily="18" charset="0"/>
-                <a:hlinkClick r:id="rId3"/>
-              </a:rPr>
-              <a:t>www.github.com</a:t>
-            </a:r>
-            <a:r>
-              <a:rPr lang="en-US" sz="1600" dirty="0" smtClean="0">
-                <a:latin typeface="Cambria" pitchFamily="18" charset="0"/>
-                <a:hlinkClick r:id="rId3"/>
-              </a:rPr>
-              <a:t>/</a:t>
-            </a:r>
-            <a:r>
-              <a:rPr lang="en-US" sz="1600" dirty="0" err="1" smtClean="0">
-                <a:latin typeface="Cambria" pitchFamily="18" charset="0"/>
-                <a:hlinkClick r:id="rId3"/>
-              </a:rPr>
-              <a:t>rajasekaranap</a:t>
-            </a:r>
-            <a:endParaRPr lang="en-US" sz="1600" dirty="0" smtClean="0">
-              <a:latin typeface="Cambria" pitchFamily="18" charset="0"/>
-            </a:endParaRPr>
-          </a:p>
-          <a:p>
-            <a:pPr marL="342900" marR="0" lvl="0" indent="-342900" algn="r" defTabSz="914400" rtl="0" eaLnBrk="1" fontAlgn="auto" latinLnBrk="0" hangingPunct="1">
-              <a:lnSpc>
-                <a:spcPct val="100000"/>
-              </a:lnSpc>
-              <a:spcBef>
-                <a:spcPct val="20000"/>
-              </a:spcBef>
-              <a:spcAft>
-                <a:spcPts val="0"/>
-              </a:spcAft>
-              <a:buClrTx/>
-              <a:buSzTx/>
-              <a:tabLst/>
-              <a:defRPr/>
-            </a:pPr>
-            <a:endParaRPr lang="en-US" sz="1600" dirty="0" smtClean="0">
-              <a:latin typeface="Cambria" pitchFamily="18" charset="0"/>
-            </a:endParaRPr>
+            <a:r>
+              <a:rPr lang="en-US" dirty="0" smtClean="0"/>
+              <a:t>It contains tall tress [12 to 30m] and dense herbs support for animals and birds.</a:t>
+            </a:r>
+          </a:p>
+          <a:p>
+            <a:r>
+              <a:rPr lang="en-US" dirty="0" smtClean="0"/>
+              <a:t>Development of forest based on</a:t>
+            </a:r>
+          </a:p>
+          <a:p>
+            <a:pPr lvl="1"/>
+            <a:r>
+              <a:rPr lang="en-US" dirty="0" smtClean="0"/>
+              <a:t>Rainfall</a:t>
+            </a:r>
+          </a:p>
+          <a:p>
+            <a:pPr lvl="1"/>
+            <a:r>
+              <a:rPr lang="en-US" dirty="0" smtClean="0"/>
+              <a:t>Humidity</a:t>
+            </a:r>
+          </a:p>
+          <a:p>
+            <a:pPr lvl="1"/>
+            <a:r>
+              <a:rPr lang="en-US" dirty="0" smtClean="0"/>
+              <a:t>Temperature</a:t>
+            </a:r>
+          </a:p>
+          <a:p>
+            <a:r>
+              <a:rPr lang="en-US" dirty="0" smtClean="0"/>
+              <a:t>40 % land covered in world.</a:t>
+            </a:r>
+          </a:p>
+          <a:p>
+            <a:r>
+              <a:rPr lang="en-US" dirty="0" smtClean="0"/>
+              <a:t>19 % in </a:t>
+            </a:r>
+            <a:r>
+              <a:rPr lang="en-US" dirty="0" err="1" smtClean="0"/>
+              <a:t>india</a:t>
+            </a:r>
+            <a:r>
+              <a:rPr lang="en-US" dirty="0" smtClean="0"/>
+              <a:t>.</a:t>
+            </a:r>
+            <a:endParaRPr lang="en-US" dirty="0"/>
           </a:p>
         </p:txBody>
       </p:sp>
@@ -27395,13 +27583,482 @@
   <p:clrMapOvr>
     <a:masterClrMapping/>
   </p:clrMapOvr>
-  <p:timing>
-    <p:tnLst>
-      <p:par>
-        <p:cTn id="1" dur="indefinite" restart="never" nodeType="tmRoot"/>
-      </p:par>
-    </p:tnLst>
-  </p:timing>
+</p:sld>
+</file>
+
+<file path=ppt/slides/slide46.xml><?xml version="1.0" encoding="utf-8"?>
+<p:sld xmlns:a="http://schemas.openxmlformats.org/drawingml/2006/main" xmlns:r="http://schemas.openxmlformats.org/officeDocument/2006/relationships" xmlns:p="http://schemas.openxmlformats.org/presentationml/2006/main">
+  <p:cSld>
+    <p:spTree>
+      <p:nvGrpSpPr>
+        <p:cNvPr id="1" name=""/>
+        <p:cNvGrpSpPr/>
+        <p:nvPr/>
+      </p:nvGrpSpPr>
+      <p:grpSpPr>
+        <a:xfrm>
+          <a:off x="0" y="0"/>
+          <a:ext cx="0" cy="0"/>
+          <a:chOff x="0" y="0"/>
+          <a:chExt cx="0" cy="0"/>
+        </a:xfrm>
+      </p:grpSpPr>
+      <p:sp>
+        <p:nvSpPr>
+          <p:cNvPr id="2" name="Title 1"/>
+          <p:cNvSpPr>
+            <a:spLocks noGrp="1"/>
+          </p:cNvSpPr>
+          <p:nvPr>
+            <p:ph type="title"/>
+          </p:nvPr>
+        </p:nvSpPr>
+        <p:spPr/>
+        <p:txBody>
+          <a:bodyPr/>
+          <a:lstStyle/>
+          <a:p>
+            <a:r>
+              <a:rPr lang="en-US" dirty="0" smtClean="0"/>
+              <a:t>Forest Ecosystem</a:t>
+            </a:r>
+            <a:endParaRPr lang="en-US" dirty="0"/>
+          </a:p>
+        </p:txBody>
+      </p:sp>
+      <p:sp>
+        <p:nvSpPr>
+          <p:cNvPr id="3" name="Content Placeholder 2"/>
+          <p:cNvSpPr>
+            <a:spLocks noGrp="1"/>
+          </p:cNvSpPr>
+          <p:nvPr>
+            <p:ph idx="1"/>
+          </p:nvPr>
+        </p:nvSpPr>
+        <p:spPr/>
+        <p:txBody>
+          <a:bodyPr>
+            <a:normAutofit fontScale="92500" lnSpcReduction="10000"/>
+          </a:bodyPr>
+          <a:lstStyle/>
+          <a:p>
+            <a:r>
+              <a:rPr lang="en-US" dirty="0" smtClean="0"/>
+              <a:t>Characteristics of forests</a:t>
+            </a:r>
+          </a:p>
+          <a:p>
+            <a:pPr lvl="1"/>
+            <a:r>
+              <a:rPr lang="en-US" dirty="0" smtClean="0"/>
+              <a:t>Adequate rainfall forms number of ponds, lakes</a:t>
+            </a:r>
+          </a:p>
+          <a:p>
+            <a:pPr lvl="1"/>
+            <a:r>
+              <a:rPr lang="en-US" dirty="0" smtClean="0"/>
+              <a:t>Tall trees supports many wild animals in ecosystem.</a:t>
+            </a:r>
+          </a:p>
+          <a:p>
+            <a:pPr lvl="1"/>
+            <a:r>
+              <a:rPr lang="en-US" dirty="0" smtClean="0"/>
+              <a:t>Penetration of light is poor so conversion of organic matter to nutrient is fast.</a:t>
+            </a:r>
+          </a:p>
+          <a:p>
+            <a:pPr lvl="1"/>
+            <a:r>
+              <a:rPr lang="en-US" dirty="0" smtClean="0"/>
+              <a:t>Soil is rich is organic maters and nutrients</a:t>
+            </a:r>
+          </a:p>
+          <a:p>
+            <a:pPr lvl="1"/>
+            <a:r>
+              <a:rPr lang="en-US" dirty="0" smtClean="0"/>
+              <a:t>Occupies more space in land compare to other ecosystem.</a:t>
+            </a:r>
+          </a:p>
+          <a:p>
+            <a:pPr lvl="1"/>
+            <a:r>
+              <a:rPr lang="en-US" dirty="0" smtClean="0"/>
+              <a:t>Maintains uniform temperature throughout the season  </a:t>
+            </a:r>
+            <a:endParaRPr lang="en-US" dirty="0"/>
+          </a:p>
+        </p:txBody>
+      </p:sp>
+    </p:spTree>
+  </p:cSld>
+  <p:clrMapOvr>
+    <a:masterClrMapping/>
+  </p:clrMapOvr>
+</p:sld>
+</file>
+
+<file path=ppt/slides/slide47.xml><?xml version="1.0" encoding="utf-8"?>
+<p:sld xmlns:a="http://schemas.openxmlformats.org/drawingml/2006/main" xmlns:r="http://schemas.openxmlformats.org/officeDocument/2006/relationships" xmlns:p="http://schemas.openxmlformats.org/presentationml/2006/main">
+  <p:cSld>
+    <p:spTree>
+      <p:nvGrpSpPr>
+        <p:cNvPr id="1" name=""/>
+        <p:cNvGrpSpPr/>
+        <p:nvPr/>
+      </p:nvGrpSpPr>
+      <p:grpSpPr>
+        <a:xfrm>
+          <a:off x="0" y="0"/>
+          <a:ext cx="0" cy="0"/>
+          <a:chOff x="0" y="0"/>
+          <a:chExt cx="0" cy="0"/>
+        </a:xfrm>
+      </p:grpSpPr>
+      <p:sp>
+        <p:nvSpPr>
+          <p:cNvPr id="2" name="Title 1"/>
+          <p:cNvSpPr>
+            <a:spLocks noGrp="1"/>
+          </p:cNvSpPr>
+          <p:nvPr>
+            <p:ph type="title"/>
+          </p:nvPr>
+        </p:nvSpPr>
+        <p:spPr/>
+        <p:txBody>
+          <a:bodyPr/>
+          <a:lstStyle/>
+          <a:p>
+            <a:r>
+              <a:rPr lang="en-US" dirty="0" smtClean="0"/>
+              <a:t>Structure of Forest Ecosystem</a:t>
+            </a:r>
+            <a:endParaRPr lang="en-US" dirty="0"/>
+          </a:p>
+        </p:txBody>
+      </p:sp>
+      <p:sp>
+        <p:nvSpPr>
+          <p:cNvPr id="3" name="Content Placeholder 2"/>
+          <p:cNvSpPr>
+            <a:spLocks noGrp="1"/>
+          </p:cNvSpPr>
+          <p:nvPr>
+            <p:ph idx="1"/>
+          </p:nvPr>
+        </p:nvSpPr>
+        <p:spPr/>
+        <p:txBody>
+          <a:bodyPr>
+            <a:normAutofit/>
+          </a:bodyPr>
+          <a:lstStyle/>
+          <a:p>
+            <a:r>
+              <a:rPr lang="en-US" dirty="0" err="1" smtClean="0"/>
+              <a:t>Abiotic</a:t>
+            </a:r>
+            <a:r>
+              <a:rPr lang="en-US" dirty="0" smtClean="0"/>
+              <a:t> Components</a:t>
+            </a:r>
+          </a:p>
+          <a:p>
+            <a:pPr lvl="1"/>
+            <a:r>
+              <a:rPr lang="en-US" dirty="0" smtClean="0"/>
+              <a:t>Chemical </a:t>
+            </a:r>
+          </a:p>
+          <a:p>
+            <a:pPr lvl="2"/>
+            <a:r>
+              <a:rPr lang="en-US" dirty="0" smtClean="0"/>
+              <a:t>Organic mater </a:t>
+            </a:r>
+          </a:p>
+          <a:p>
+            <a:pPr lvl="2"/>
+            <a:r>
+              <a:rPr lang="en-US" dirty="0" smtClean="0"/>
+              <a:t>Atmosphere</a:t>
+            </a:r>
+          </a:p>
+          <a:p>
+            <a:pPr lvl="1"/>
+            <a:r>
+              <a:rPr lang="en-US" dirty="0" smtClean="0"/>
+              <a:t>Climate</a:t>
+            </a:r>
+          </a:p>
+          <a:p>
+            <a:pPr lvl="2"/>
+            <a:r>
+              <a:rPr lang="en-US" dirty="0" smtClean="0"/>
+              <a:t>Warm temperature</a:t>
+            </a:r>
+          </a:p>
+          <a:p>
+            <a:pPr lvl="2"/>
+            <a:r>
+              <a:rPr lang="en-US" dirty="0" smtClean="0"/>
+              <a:t>Poor light</a:t>
+            </a:r>
+          </a:p>
+          <a:p>
+            <a:pPr lvl="2"/>
+            <a:r>
+              <a:rPr lang="en-US" dirty="0" smtClean="0"/>
+              <a:t>heavy rainfall</a:t>
+            </a:r>
+            <a:endParaRPr lang="en-US" dirty="0" smtClean="0"/>
+          </a:p>
+        </p:txBody>
+      </p:sp>
+    </p:spTree>
+  </p:cSld>
+  <p:clrMapOvr>
+    <a:masterClrMapping/>
+  </p:clrMapOvr>
+</p:sld>
+</file>
+
+<file path=ppt/slides/slide48.xml><?xml version="1.0" encoding="utf-8"?>
+<p:sld xmlns:a="http://schemas.openxmlformats.org/drawingml/2006/main" xmlns:r="http://schemas.openxmlformats.org/officeDocument/2006/relationships" xmlns:p="http://schemas.openxmlformats.org/presentationml/2006/main">
+  <p:cSld>
+    <p:spTree>
+      <p:nvGrpSpPr>
+        <p:cNvPr id="1" name=""/>
+        <p:cNvGrpSpPr/>
+        <p:nvPr/>
+      </p:nvGrpSpPr>
+      <p:grpSpPr>
+        <a:xfrm>
+          <a:off x="0" y="0"/>
+          <a:ext cx="0" cy="0"/>
+          <a:chOff x="0" y="0"/>
+          <a:chExt cx="0" cy="0"/>
+        </a:xfrm>
+      </p:grpSpPr>
+      <p:sp>
+        <p:nvSpPr>
+          <p:cNvPr id="2" name="Title 1"/>
+          <p:cNvSpPr>
+            <a:spLocks noGrp="1"/>
+          </p:cNvSpPr>
+          <p:nvPr>
+            <p:ph type="title"/>
+          </p:nvPr>
+        </p:nvSpPr>
+        <p:spPr/>
+        <p:txBody>
+          <a:bodyPr/>
+          <a:lstStyle/>
+          <a:p>
+            <a:r>
+              <a:rPr lang="en-US" dirty="0" smtClean="0"/>
+              <a:t>Structure of Forest Ecosystem</a:t>
+            </a:r>
+            <a:endParaRPr lang="en-US" dirty="0"/>
+          </a:p>
+        </p:txBody>
+      </p:sp>
+      <p:sp>
+        <p:nvSpPr>
+          <p:cNvPr id="3" name="Content Placeholder 2"/>
+          <p:cNvSpPr>
+            <a:spLocks noGrp="1"/>
+          </p:cNvSpPr>
+          <p:nvPr>
+            <p:ph idx="1"/>
+          </p:nvPr>
+        </p:nvSpPr>
+        <p:spPr/>
+        <p:txBody>
+          <a:bodyPr>
+            <a:normAutofit/>
+          </a:bodyPr>
+          <a:lstStyle/>
+          <a:p>
+            <a:r>
+              <a:rPr lang="en-US" dirty="0" smtClean="0"/>
+              <a:t>Biotic Components</a:t>
+            </a:r>
+          </a:p>
+          <a:p>
+            <a:pPr lvl="1"/>
+            <a:r>
+              <a:rPr lang="en-US" dirty="0" smtClean="0"/>
+              <a:t>Producers</a:t>
+            </a:r>
+          </a:p>
+          <a:p>
+            <a:pPr lvl="2"/>
+            <a:r>
+              <a:rPr lang="en-US" dirty="0" smtClean="0"/>
+              <a:t>Trees and Shrubs</a:t>
+            </a:r>
+          </a:p>
+          <a:p>
+            <a:pPr lvl="1"/>
+            <a:r>
+              <a:rPr lang="en-US" dirty="0" smtClean="0"/>
+              <a:t>Consumer</a:t>
+            </a:r>
+          </a:p>
+          <a:p>
+            <a:pPr lvl="2"/>
+            <a:r>
+              <a:rPr lang="en-US" dirty="0" smtClean="0"/>
+              <a:t>Primary</a:t>
+            </a:r>
+          </a:p>
+          <a:p>
+            <a:pPr lvl="3"/>
+            <a:r>
+              <a:rPr lang="en-US" dirty="0" smtClean="0"/>
+              <a:t>Ant’s, Flies, Insects, mice, deer</a:t>
+            </a:r>
+          </a:p>
+          <a:p>
+            <a:pPr lvl="2"/>
+            <a:r>
+              <a:rPr lang="en-US" dirty="0" smtClean="0"/>
+              <a:t>Secondary</a:t>
+            </a:r>
+          </a:p>
+          <a:p>
+            <a:pPr lvl="3"/>
+            <a:r>
+              <a:rPr lang="en-US" dirty="0" smtClean="0"/>
+              <a:t>Snakes, Birds, Foxes, etc.,</a:t>
+            </a:r>
+          </a:p>
+          <a:p>
+            <a:pPr lvl="2"/>
+            <a:r>
+              <a:rPr lang="en-US" dirty="0" smtClean="0"/>
+              <a:t>Tertiary</a:t>
+            </a:r>
+          </a:p>
+          <a:p>
+            <a:pPr lvl="3"/>
+            <a:r>
+              <a:rPr lang="en-US" dirty="0" smtClean="0"/>
+              <a:t>Lions, Tigers, Eagles</a:t>
+            </a:r>
+          </a:p>
+        </p:txBody>
+      </p:sp>
+    </p:spTree>
+  </p:cSld>
+  <p:clrMapOvr>
+    <a:masterClrMapping/>
+  </p:clrMapOvr>
+</p:sld>
+</file>
+
+<file path=ppt/slides/slide49.xml><?xml version="1.0" encoding="utf-8"?>
+<p:sld xmlns:a="http://schemas.openxmlformats.org/drawingml/2006/main" xmlns:r="http://schemas.openxmlformats.org/officeDocument/2006/relationships" xmlns:p="http://schemas.openxmlformats.org/presentationml/2006/main">
+  <p:cSld>
+    <p:spTree>
+      <p:nvGrpSpPr>
+        <p:cNvPr id="1" name=""/>
+        <p:cNvGrpSpPr/>
+        <p:nvPr/>
+      </p:nvGrpSpPr>
+      <p:grpSpPr>
+        <a:xfrm>
+          <a:off x="0" y="0"/>
+          <a:ext cx="0" cy="0"/>
+          <a:chOff x="0" y="0"/>
+          <a:chExt cx="0" cy="0"/>
+        </a:xfrm>
+      </p:grpSpPr>
+      <p:sp>
+        <p:nvSpPr>
+          <p:cNvPr id="2" name="Title 1"/>
+          <p:cNvSpPr>
+            <a:spLocks noGrp="1"/>
+          </p:cNvSpPr>
+          <p:nvPr>
+            <p:ph type="title"/>
+          </p:nvPr>
+        </p:nvSpPr>
+        <p:spPr/>
+        <p:txBody>
+          <a:bodyPr/>
+          <a:lstStyle/>
+          <a:p>
+            <a:r>
+              <a:rPr lang="en-US" dirty="0" smtClean="0"/>
+              <a:t>Structure of Forest Ecosystem</a:t>
+            </a:r>
+            <a:endParaRPr lang="en-US" dirty="0"/>
+          </a:p>
+        </p:txBody>
+      </p:sp>
+      <p:sp>
+        <p:nvSpPr>
+          <p:cNvPr id="3" name="Content Placeholder 2"/>
+          <p:cNvSpPr>
+            <a:spLocks noGrp="1"/>
+          </p:cNvSpPr>
+          <p:nvPr>
+            <p:ph idx="1"/>
+          </p:nvPr>
+        </p:nvSpPr>
+        <p:spPr/>
+        <p:txBody>
+          <a:bodyPr>
+            <a:normAutofit/>
+          </a:bodyPr>
+          <a:lstStyle/>
+          <a:p>
+            <a:r>
+              <a:rPr lang="en-US" dirty="0" smtClean="0"/>
+              <a:t>Biotic Components</a:t>
+            </a:r>
+          </a:p>
+          <a:p>
+            <a:pPr lvl="1"/>
+            <a:r>
+              <a:rPr lang="en-US" dirty="0" smtClean="0"/>
+              <a:t>Decomposers</a:t>
+            </a:r>
+          </a:p>
+          <a:p>
+            <a:pPr lvl="2"/>
+            <a:r>
+              <a:rPr lang="en-US" dirty="0" smtClean="0"/>
+              <a:t>Microorganisms</a:t>
+            </a:r>
+          </a:p>
+          <a:p>
+            <a:pPr lvl="3"/>
+            <a:r>
+              <a:rPr lang="en-US" dirty="0" smtClean="0"/>
+              <a:t>Fungi</a:t>
+            </a:r>
+          </a:p>
+          <a:p>
+            <a:pPr lvl="3"/>
+            <a:r>
+              <a:rPr lang="en-US" dirty="0" smtClean="0"/>
+              <a:t>Bacteria </a:t>
+            </a:r>
+          </a:p>
+        </p:txBody>
+      </p:sp>
+    </p:spTree>
+  </p:cSld>
+  <p:clrMapOvr>
+    <a:masterClrMapping/>
+  </p:clrMapOvr>
 </p:sld>
 </file>
 
@@ -27491,6 +28148,1120 @@
               <a:t>To conduct environmental programs  in terms of social, economic, ecological and ascetic factors</a:t>
             </a:r>
             <a:endParaRPr lang="en-US" dirty="0"/>
+          </a:p>
+        </p:txBody>
+      </p:sp>
+    </p:spTree>
+  </p:cSld>
+  <p:clrMapOvr>
+    <a:masterClrMapping/>
+  </p:clrMapOvr>
+</p:sld>
+</file>
+
+<file path=ppt/slides/slide50.xml><?xml version="1.0" encoding="utf-8"?>
+<p:sld xmlns:a="http://schemas.openxmlformats.org/drawingml/2006/main" xmlns:r="http://schemas.openxmlformats.org/officeDocument/2006/relationships" xmlns:p="http://schemas.openxmlformats.org/presentationml/2006/main">
+  <p:cSld>
+    <p:spTree>
+      <p:nvGrpSpPr>
+        <p:cNvPr id="1" name=""/>
+        <p:cNvGrpSpPr/>
+        <p:nvPr/>
+      </p:nvGrpSpPr>
+      <p:grpSpPr>
+        <a:xfrm>
+          <a:off x="0" y="0"/>
+          <a:ext cx="0" cy="0"/>
+          <a:chOff x="0" y="0"/>
+          <a:chExt cx="0" cy="0"/>
+        </a:xfrm>
+      </p:grpSpPr>
+      <p:sp>
+        <p:nvSpPr>
+          <p:cNvPr id="2" name="Title 1"/>
+          <p:cNvSpPr>
+            <a:spLocks noGrp="1"/>
+          </p:cNvSpPr>
+          <p:nvPr>
+            <p:ph type="title"/>
+          </p:nvPr>
+        </p:nvSpPr>
+        <p:spPr/>
+        <p:txBody>
+          <a:bodyPr/>
+          <a:lstStyle/>
+          <a:p>
+            <a:r>
+              <a:rPr lang="en-US" dirty="0" smtClean="0"/>
+              <a:t>Food Chain of Forest Ecosystem</a:t>
+            </a:r>
+            <a:endParaRPr lang="en-US" dirty="0"/>
+          </a:p>
+        </p:txBody>
+      </p:sp>
+      <p:sp>
+        <p:nvSpPr>
+          <p:cNvPr id="3" name="Content Placeholder 2"/>
+          <p:cNvSpPr>
+            <a:spLocks noGrp="1"/>
+          </p:cNvSpPr>
+          <p:nvPr>
+            <p:ph idx="1"/>
+          </p:nvPr>
+        </p:nvSpPr>
+        <p:spPr/>
+        <p:txBody>
+          <a:bodyPr>
+            <a:normAutofit/>
+          </a:bodyPr>
+          <a:lstStyle/>
+          <a:p>
+            <a:r>
+              <a:rPr lang="en-US" dirty="0" smtClean="0"/>
+              <a:t>Food Chain</a:t>
+            </a:r>
+          </a:p>
+          <a:p>
+            <a:pPr lvl="1"/>
+            <a:r>
+              <a:rPr lang="en-US" dirty="0" smtClean="0"/>
+              <a:t>Plants </a:t>
+            </a:r>
+            <a:r>
+              <a:rPr lang="en-US" dirty="0" smtClean="0">
+                <a:sym typeface="Wingdings" pitchFamily="2" charset="2"/>
+              </a:rPr>
+              <a:t> Deer Tiger</a:t>
+            </a:r>
+          </a:p>
+          <a:p>
+            <a:pPr lvl="1"/>
+            <a:r>
+              <a:rPr lang="en-US" dirty="0" smtClean="0"/>
+              <a:t>Plants </a:t>
+            </a:r>
+            <a:r>
+              <a:rPr lang="en-US" dirty="0" smtClean="0">
+                <a:sym typeface="Wingdings" pitchFamily="2" charset="2"/>
+              </a:rPr>
+              <a:t> Rabbits Snakes Eagles</a:t>
+            </a:r>
+            <a:endParaRPr lang="en-IN" dirty="0" smtClean="0">
+              <a:sym typeface="Wingdings" pitchFamily="2" charset="2"/>
+            </a:endParaRPr>
+          </a:p>
+          <a:p>
+            <a:r>
+              <a:rPr lang="en-IN" dirty="0" smtClean="0">
+                <a:sym typeface="Wingdings" pitchFamily="2" charset="2"/>
+              </a:rPr>
+              <a:t>Examples</a:t>
+            </a:r>
+          </a:p>
+          <a:p>
+            <a:pPr lvl="1"/>
+            <a:r>
+              <a:rPr lang="en-IN" dirty="0" smtClean="0">
+                <a:sym typeface="Wingdings" pitchFamily="2" charset="2"/>
+              </a:rPr>
+              <a:t>Western Ghats in </a:t>
+            </a:r>
+            <a:r>
+              <a:rPr lang="en-IN" dirty="0" err="1" smtClean="0">
+                <a:sym typeface="Wingdings" pitchFamily="2" charset="2"/>
+              </a:rPr>
+              <a:t>india</a:t>
+            </a:r>
+            <a:r>
+              <a:rPr lang="en-IN" dirty="0" smtClean="0">
+                <a:sym typeface="Wingdings" pitchFamily="2" charset="2"/>
+              </a:rPr>
+              <a:t> </a:t>
+            </a:r>
+            <a:endParaRPr lang="en-US" dirty="0" smtClean="0"/>
+          </a:p>
+        </p:txBody>
+      </p:sp>
+    </p:spTree>
+  </p:cSld>
+  <p:clrMapOvr>
+    <a:masterClrMapping/>
+  </p:clrMapOvr>
+</p:sld>
+</file>
+
+<file path=ppt/slides/slide51.xml><?xml version="1.0" encoding="utf-8"?>
+<p:sld xmlns:a="http://schemas.openxmlformats.org/drawingml/2006/main" xmlns:r="http://schemas.openxmlformats.org/officeDocument/2006/relationships" xmlns:p="http://schemas.openxmlformats.org/presentationml/2006/main">
+  <p:cSld>
+    <p:spTree>
+      <p:nvGrpSpPr>
+        <p:cNvPr id="1" name=""/>
+        <p:cNvGrpSpPr/>
+        <p:nvPr/>
+      </p:nvGrpSpPr>
+      <p:grpSpPr>
+        <a:xfrm>
+          <a:off x="0" y="0"/>
+          <a:ext cx="0" cy="0"/>
+          <a:chOff x="0" y="0"/>
+          <a:chExt cx="0" cy="0"/>
+        </a:xfrm>
+      </p:grpSpPr>
+      <p:sp>
+        <p:nvSpPr>
+          <p:cNvPr id="2" name="Title 1"/>
+          <p:cNvSpPr>
+            <a:spLocks noGrp="1"/>
+          </p:cNvSpPr>
+          <p:nvPr>
+            <p:ph type="title"/>
+          </p:nvPr>
+        </p:nvSpPr>
+        <p:spPr/>
+        <p:txBody>
+          <a:bodyPr/>
+          <a:lstStyle/>
+          <a:p>
+            <a:r>
+              <a:rPr lang="en-US" dirty="0" smtClean="0"/>
+              <a:t>Function of Forest Ecosystem</a:t>
+            </a:r>
+            <a:endParaRPr lang="en-US" dirty="0"/>
+          </a:p>
+        </p:txBody>
+      </p:sp>
+      <p:sp>
+        <p:nvSpPr>
+          <p:cNvPr id="3" name="Content Placeholder 2"/>
+          <p:cNvSpPr>
+            <a:spLocks noGrp="1"/>
+          </p:cNvSpPr>
+          <p:nvPr>
+            <p:ph idx="1"/>
+          </p:nvPr>
+        </p:nvSpPr>
+        <p:spPr/>
+        <p:txBody>
+          <a:bodyPr>
+            <a:normAutofit/>
+          </a:bodyPr>
+          <a:lstStyle/>
+          <a:p>
+            <a:r>
+              <a:rPr lang="en-IN" dirty="0" smtClean="0"/>
+              <a:t>It maintains </a:t>
+            </a:r>
+            <a:r>
+              <a:rPr lang="en-IN" dirty="0" smtClean="0"/>
+              <a:t>c</a:t>
+            </a:r>
+            <a:r>
+              <a:rPr lang="en-IN" dirty="0" smtClean="0"/>
+              <a:t>limate and rainfall.</a:t>
+            </a:r>
+          </a:p>
+          <a:p>
+            <a:r>
+              <a:rPr lang="en-IN" dirty="0" smtClean="0"/>
+              <a:t>It provides biodiversity.</a:t>
+            </a:r>
+          </a:p>
+          <a:p>
+            <a:r>
+              <a:rPr lang="en-IN" dirty="0" smtClean="0"/>
+              <a:t>It provides the wood materials. </a:t>
+            </a:r>
+            <a:endParaRPr lang="en-US" dirty="0" smtClean="0"/>
+          </a:p>
+        </p:txBody>
+      </p:sp>
+    </p:spTree>
+  </p:cSld>
+  <p:clrMapOvr>
+    <a:masterClrMapping/>
+  </p:clrMapOvr>
+</p:sld>
+</file>
+
+<file path=ppt/slides/slide52.xml><?xml version="1.0" encoding="utf-8"?>
+<p:sld xmlns:a="http://schemas.openxmlformats.org/drawingml/2006/main" xmlns:r="http://schemas.openxmlformats.org/officeDocument/2006/relationships" xmlns:p="http://schemas.openxmlformats.org/presentationml/2006/main">
+  <p:cSld>
+    <p:spTree>
+      <p:nvGrpSpPr>
+        <p:cNvPr id="1" name=""/>
+        <p:cNvGrpSpPr/>
+        <p:nvPr/>
+      </p:nvGrpSpPr>
+      <p:grpSpPr>
+        <a:xfrm>
+          <a:off x="0" y="0"/>
+          <a:ext cx="0" cy="0"/>
+          <a:chOff x="0" y="0"/>
+          <a:chExt cx="0" cy="0"/>
+        </a:xfrm>
+      </p:grpSpPr>
+      <p:sp>
+        <p:nvSpPr>
+          <p:cNvPr id="2" name="Title 1"/>
+          <p:cNvSpPr>
+            <a:spLocks noGrp="1"/>
+          </p:cNvSpPr>
+          <p:nvPr>
+            <p:ph type="title"/>
+          </p:nvPr>
+        </p:nvSpPr>
+        <p:spPr/>
+        <p:txBody>
+          <a:bodyPr/>
+          <a:lstStyle/>
+          <a:p>
+            <a:r>
+              <a:rPr lang="en-US" dirty="0" smtClean="0"/>
+              <a:t>Grassland Ecosystem</a:t>
+            </a:r>
+            <a:endParaRPr lang="en-US" dirty="0"/>
+          </a:p>
+        </p:txBody>
+      </p:sp>
+      <p:pic>
+        <p:nvPicPr>
+          <p:cNvPr id="3076" name="Picture 4" descr="Image result for grassland ecosystem"/>
+          <p:cNvPicPr>
+            <a:picLocks noChangeAspect="1" noChangeArrowheads="1"/>
+          </p:cNvPicPr>
+          <p:nvPr/>
+        </p:nvPicPr>
+        <p:blipFill>
+          <a:blip r:embed="rId2"/>
+          <a:srcRect/>
+          <a:stretch>
+            <a:fillRect/>
+          </a:stretch>
+        </p:blipFill>
+        <p:spPr bwMode="auto">
+          <a:xfrm>
+            <a:off x="500034" y="1714488"/>
+            <a:ext cx="5286412" cy="2858837"/>
+          </a:xfrm>
+          <a:prstGeom prst="rect">
+            <a:avLst/>
+          </a:prstGeom>
+          <a:noFill/>
+        </p:spPr>
+      </p:pic>
+      <p:pic>
+        <p:nvPicPr>
+          <p:cNvPr id="3078" name="Picture 6" descr="Image result for grassland ecosystem"/>
+          <p:cNvPicPr>
+            <a:picLocks noChangeAspect="1" noChangeArrowheads="1"/>
+          </p:cNvPicPr>
+          <p:nvPr/>
+        </p:nvPicPr>
+        <p:blipFill>
+          <a:blip r:embed="rId3"/>
+          <a:srcRect/>
+          <a:stretch>
+            <a:fillRect/>
+          </a:stretch>
+        </p:blipFill>
+        <p:spPr bwMode="auto">
+          <a:xfrm>
+            <a:off x="5929322" y="1714488"/>
+            <a:ext cx="2786082" cy="1912220"/>
+          </a:xfrm>
+          <a:prstGeom prst="rect">
+            <a:avLst/>
+          </a:prstGeom>
+          <a:noFill/>
+        </p:spPr>
+      </p:pic>
+      <p:pic>
+        <p:nvPicPr>
+          <p:cNvPr id="3080" name="Picture 8" descr="Related image"/>
+          <p:cNvPicPr>
+            <a:picLocks noChangeAspect="1" noChangeArrowheads="1"/>
+          </p:cNvPicPr>
+          <p:nvPr/>
+        </p:nvPicPr>
+        <p:blipFill>
+          <a:blip r:embed="rId4"/>
+          <a:srcRect/>
+          <a:stretch>
+            <a:fillRect/>
+          </a:stretch>
+        </p:blipFill>
+        <p:spPr bwMode="auto">
+          <a:xfrm>
+            <a:off x="6000760" y="3857627"/>
+            <a:ext cx="2714644" cy="1806473"/>
+          </a:xfrm>
+          <a:prstGeom prst="rect">
+            <a:avLst/>
+          </a:prstGeom>
+          <a:noFill/>
+        </p:spPr>
+      </p:pic>
+    </p:spTree>
+  </p:cSld>
+  <p:clrMapOvr>
+    <a:masterClrMapping/>
+  </p:clrMapOvr>
+</p:sld>
+</file>
+
+<file path=ppt/slides/slide53.xml><?xml version="1.0" encoding="utf-8"?>
+<p:sld xmlns:a="http://schemas.openxmlformats.org/drawingml/2006/main" xmlns:r="http://schemas.openxmlformats.org/officeDocument/2006/relationships" xmlns:p="http://schemas.openxmlformats.org/presentationml/2006/main">
+  <p:cSld>
+    <p:spTree>
+      <p:nvGrpSpPr>
+        <p:cNvPr id="1" name=""/>
+        <p:cNvGrpSpPr/>
+        <p:nvPr/>
+      </p:nvGrpSpPr>
+      <p:grpSpPr>
+        <a:xfrm>
+          <a:off x="0" y="0"/>
+          <a:ext cx="0" cy="0"/>
+          <a:chOff x="0" y="0"/>
+          <a:chExt cx="0" cy="0"/>
+        </a:xfrm>
+      </p:grpSpPr>
+      <p:sp>
+        <p:nvSpPr>
+          <p:cNvPr id="2" name="Title 1"/>
+          <p:cNvSpPr>
+            <a:spLocks noGrp="1"/>
+          </p:cNvSpPr>
+          <p:nvPr>
+            <p:ph type="title"/>
+          </p:nvPr>
+        </p:nvSpPr>
+        <p:spPr/>
+        <p:txBody>
+          <a:bodyPr/>
+          <a:lstStyle/>
+          <a:p>
+            <a:r>
+              <a:rPr lang="en-US" dirty="0" smtClean="0"/>
+              <a:t>Grassland Ecosystem</a:t>
+            </a:r>
+            <a:endParaRPr lang="en-US" dirty="0"/>
+          </a:p>
+        </p:txBody>
+      </p:sp>
+      <p:sp>
+        <p:nvSpPr>
+          <p:cNvPr id="3" name="Content Placeholder 2"/>
+          <p:cNvSpPr>
+            <a:spLocks noGrp="1"/>
+          </p:cNvSpPr>
+          <p:nvPr>
+            <p:ph idx="1"/>
+          </p:nvPr>
+        </p:nvSpPr>
+        <p:spPr/>
+        <p:txBody>
+          <a:bodyPr/>
+          <a:lstStyle/>
+          <a:p>
+            <a:r>
+              <a:rPr lang="en-US" dirty="0" smtClean="0"/>
+              <a:t>It is a plain land occupied by grasses.</a:t>
+            </a:r>
+          </a:p>
+          <a:p>
+            <a:r>
+              <a:rPr lang="en-IN" dirty="0" smtClean="0"/>
+              <a:t>Climate is cool or cold in winters and hot in summers.</a:t>
+            </a:r>
+          </a:p>
+          <a:p>
+            <a:r>
+              <a:rPr lang="en-IN" dirty="0" smtClean="0"/>
+              <a:t>It occupies 20 % of earth surface.</a:t>
+            </a:r>
+          </a:p>
+          <a:p>
+            <a:r>
+              <a:rPr lang="en-IN" dirty="0" smtClean="0"/>
+              <a:t>It forms where rainfall is 25 – 75 cm per year.</a:t>
+            </a:r>
+          </a:p>
+          <a:p>
+            <a:r>
+              <a:rPr lang="en-IN" dirty="0" smtClean="0"/>
+              <a:t>Mostly found in Europe, Asia and North America </a:t>
+            </a:r>
+            <a:endParaRPr lang="en-US" dirty="0"/>
+          </a:p>
+        </p:txBody>
+      </p:sp>
+    </p:spTree>
+  </p:cSld>
+  <p:clrMapOvr>
+    <a:masterClrMapping/>
+  </p:clrMapOvr>
+</p:sld>
+</file>
+
+<file path=ppt/slides/slide54.xml><?xml version="1.0" encoding="utf-8"?>
+<p:sld xmlns:a="http://schemas.openxmlformats.org/drawingml/2006/main" xmlns:r="http://schemas.openxmlformats.org/officeDocument/2006/relationships" xmlns:p="http://schemas.openxmlformats.org/presentationml/2006/main">
+  <p:cSld>
+    <p:spTree>
+      <p:nvGrpSpPr>
+        <p:cNvPr id="1" name=""/>
+        <p:cNvGrpSpPr/>
+        <p:nvPr/>
+      </p:nvGrpSpPr>
+      <p:grpSpPr>
+        <a:xfrm>
+          <a:off x="0" y="0"/>
+          <a:ext cx="0" cy="0"/>
+          <a:chOff x="0" y="0"/>
+          <a:chExt cx="0" cy="0"/>
+        </a:xfrm>
+      </p:grpSpPr>
+      <p:sp>
+        <p:nvSpPr>
+          <p:cNvPr id="2" name="Title 1"/>
+          <p:cNvSpPr>
+            <a:spLocks noGrp="1"/>
+          </p:cNvSpPr>
+          <p:nvPr>
+            <p:ph type="title"/>
+          </p:nvPr>
+        </p:nvSpPr>
+        <p:spPr/>
+        <p:txBody>
+          <a:bodyPr/>
+          <a:lstStyle/>
+          <a:p>
+            <a:r>
+              <a:rPr lang="en-US" dirty="0" smtClean="0"/>
+              <a:t>Grassland Ecosystem</a:t>
+            </a:r>
+            <a:endParaRPr lang="en-US" dirty="0"/>
+          </a:p>
+        </p:txBody>
+      </p:sp>
+      <p:sp>
+        <p:nvSpPr>
+          <p:cNvPr id="3" name="Content Placeholder 2"/>
+          <p:cNvSpPr>
+            <a:spLocks noGrp="1"/>
+          </p:cNvSpPr>
+          <p:nvPr>
+            <p:ph idx="1"/>
+          </p:nvPr>
+        </p:nvSpPr>
+        <p:spPr/>
+        <p:txBody>
+          <a:bodyPr>
+            <a:normAutofit/>
+          </a:bodyPr>
+          <a:lstStyle/>
+          <a:p>
+            <a:r>
+              <a:rPr lang="en-US" dirty="0" smtClean="0"/>
+              <a:t>Characteristics of forests</a:t>
+            </a:r>
+          </a:p>
+          <a:p>
+            <a:pPr lvl="1"/>
+            <a:r>
+              <a:rPr lang="en-US" dirty="0" smtClean="0"/>
+              <a:t>Rainfall is low or uneven</a:t>
+            </a:r>
+          </a:p>
+          <a:p>
+            <a:pPr lvl="1"/>
+            <a:r>
+              <a:rPr lang="en-IN" dirty="0" smtClean="0"/>
+              <a:t>Periodic drought</a:t>
+            </a:r>
+          </a:p>
+          <a:p>
+            <a:pPr lvl="1"/>
+            <a:r>
+              <a:rPr lang="en-IN" dirty="0" smtClean="0"/>
+              <a:t>Flat or slightly rolling surface.</a:t>
+            </a:r>
+          </a:p>
+          <a:p>
+            <a:pPr lvl="1"/>
+            <a:r>
+              <a:rPr lang="en-IN" dirty="0" smtClean="0"/>
+              <a:t>Soil is rich in organic matters and nutrients.</a:t>
+            </a:r>
+            <a:endParaRPr lang="en-IN" dirty="0" smtClean="0"/>
+          </a:p>
+          <a:p>
+            <a:pPr lvl="1"/>
+            <a:r>
+              <a:rPr lang="en-IN" dirty="0" smtClean="0"/>
+              <a:t>Moderate tall grass support for grazing animals  </a:t>
+            </a:r>
+            <a:endParaRPr lang="en-US" dirty="0"/>
+          </a:p>
+        </p:txBody>
+      </p:sp>
+    </p:spTree>
+  </p:cSld>
+  <p:clrMapOvr>
+    <a:masterClrMapping/>
+  </p:clrMapOvr>
+</p:sld>
+</file>
+
+<file path=ppt/slides/slide55.xml><?xml version="1.0" encoding="utf-8"?>
+<p:sld xmlns:a="http://schemas.openxmlformats.org/drawingml/2006/main" xmlns:r="http://schemas.openxmlformats.org/officeDocument/2006/relationships" xmlns:p="http://schemas.openxmlformats.org/presentationml/2006/main">
+  <p:cSld>
+    <p:spTree>
+      <p:nvGrpSpPr>
+        <p:cNvPr id="1" name=""/>
+        <p:cNvGrpSpPr/>
+        <p:nvPr/>
+      </p:nvGrpSpPr>
+      <p:grpSpPr>
+        <a:xfrm>
+          <a:off x="0" y="0"/>
+          <a:ext cx="0" cy="0"/>
+          <a:chOff x="0" y="0"/>
+          <a:chExt cx="0" cy="0"/>
+        </a:xfrm>
+      </p:grpSpPr>
+      <p:sp>
+        <p:nvSpPr>
+          <p:cNvPr id="2" name="Title 1"/>
+          <p:cNvSpPr>
+            <a:spLocks noGrp="1"/>
+          </p:cNvSpPr>
+          <p:nvPr>
+            <p:ph type="title"/>
+          </p:nvPr>
+        </p:nvSpPr>
+        <p:spPr/>
+        <p:txBody>
+          <a:bodyPr/>
+          <a:lstStyle/>
+          <a:p>
+            <a:r>
+              <a:rPr lang="en-US" dirty="0" smtClean="0"/>
+              <a:t>Structure of Grassland Ecosystem</a:t>
+            </a:r>
+            <a:endParaRPr lang="en-US" dirty="0"/>
+          </a:p>
+        </p:txBody>
+      </p:sp>
+      <p:sp>
+        <p:nvSpPr>
+          <p:cNvPr id="3" name="Content Placeholder 2"/>
+          <p:cNvSpPr>
+            <a:spLocks noGrp="1"/>
+          </p:cNvSpPr>
+          <p:nvPr>
+            <p:ph idx="1"/>
+          </p:nvPr>
+        </p:nvSpPr>
+        <p:spPr/>
+        <p:txBody>
+          <a:bodyPr>
+            <a:normAutofit/>
+          </a:bodyPr>
+          <a:lstStyle/>
+          <a:p>
+            <a:r>
+              <a:rPr lang="en-US" dirty="0" err="1" smtClean="0"/>
+              <a:t>Abiotic</a:t>
+            </a:r>
+            <a:r>
+              <a:rPr lang="en-US" dirty="0" smtClean="0"/>
+              <a:t> Components</a:t>
+            </a:r>
+          </a:p>
+          <a:p>
+            <a:pPr lvl="1"/>
+            <a:r>
+              <a:rPr lang="en-IN" dirty="0" smtClean="0"/>
+              <a:t>Nutrients in soil</a:t>
+            </a:r>
+          </a:p>
+          <a:p>
+            <a:pPr lvl="2"/>
+            <a:r>
+              <a:rPr lang="en-IN" dirty="0" smtClean="0"/>
+              <a:t>C, H, N, P, S, H</a:t>
+            </a:r>
+            <a:r>
+              <a:rPr lang="en-IN" sz="1500" dirty="0" smtClean="0"/>
+              <a:t>2</a:t>
+            </a:r>
+            <a:r>
+              <a:rPr lang="en-IN" dirty="0" smtClean="0"/>
+              <a:t>O,</a:t>
+            </a:r>
+            <a:r>
+              <a:rPr lang="en-IN" dirty="0" smtClean="0"/>
+              <a:t> </a:t>
+            </a:r>
+            <a:r>
+              <a:rPr lang="en-IN" dirty="0" smtClean="0"/>
+              <a:t>CO</a:t>
+            </a:r>
+            <a:r>
+              <a:rPr lang="en-IN" sz="1200" dirty="0" smtClean="0"/>
+              <a:t>2</a:t>
+            </a:r>
+          </a:p>
+          <a:p>
+            <a:pPr lvl="2"/>
+            <a:r>
+              <a:rPr lang="en-IN" dirty="0" smtClean="0"/>
+              <a:t>Nitrate, Phosphates, Sulphates </a:t>
+            </a:r>
+            <a:endParaRPr lang="en-US" dirty="0" smtClean="0"/>
+          </a:p>
+        </p:txBody>
+      </p:sp>
+    </p:spTree>
+  </p:cSld>
+  <p:clrMapOvr>
+    <a:masterClrMapping/>
+  </p:clrMapOvr>
+</p:sld>
+</file>
+
+<file path=ppt/slides/slide56.xml><?xml version="1.0" encoding="utf-8"?>
+<p:sld xmlns:a="http://schemas.openxmlformats.org/drawingml/2006/main" xmlns:r="http://schemas.openxmlformats.org/officeDocument/2006/relationships" xmlns:p="http://schemas.openxmlformats.org/presentationml/2006/main">
+  <p:cSld>
+    <p:spTree>
+      <p:nvGrpSpPr>
+        <p:cNvPr id="1" name=""/>
+        <p:cNvGrpSpPr/>
+        <p:nvPr/>
+      </p:nvGrpSpPr>
+      <p:grpSpPr>
+        <a:xfrm>
+          <a:off x="0" y="0"/>
+          <a:ext cx="0" cy="0"/>
+          <a:chOff x="0" y="0"/>
+          <a:chExt cx="0" cy="0"/>
+        </a:xfrm>
+      </p:grpSpPr>
+      <p:sp>
+        <p:nvSpPr>
+          <p:cNvPr id="2" name="Title 1"/>
+          <p:cNvSpPr>
+            <a:spLocks noGrp="1"/>
+          </p:cNvSpPr>
+          <p:nvPr>
+            <p:ph type="title"/>
+          </p:nvPr>
+        </p:nvSpPr>
+        <p:spPr/>
+        <p:txBody>
+          <a:bodyPr/>
+          <a:lstStyle/>
+          <a:p>
+            <a:r>
+              <a:rPr lang="en-US" dirty="0" smtClean="0"/>
+              <a:t>Structure of </a:t>
+            </a:r>
+            <a:r>
+              <a:rPr lang="en-US" dirty="0" smtClean="0"/>
+              <a:t>Grassland </a:t>
+            </a:r>
+            <a:r>
+              <a:rPr lang="en-US" dirty="0" smtClean="0"/>
+              <a:t>Ecosystem</a:t>
+            </a:r>
+            <a:endParaRPr lang="en-US" dirty="0"/>
+          </a:p>
+        </p:txBody>
+      </p:sp>
+      <p:sp>
+        <p:nvSpPr>
+          <p:cNvPr id="3" name="Content Placeholder 2"/>
+          <p:cNvSpPr>
+            <a:spLocks noGrp="1"/>
+          </p:cNvSpPr>
+          <p:nvPr>
+            <p:ph idx="1"/>
+          </p:nvPr>
+        </p:nvSpPr>
+        <p:spPr/>
+        <p:txBody>
+          <a:bodyPr>
+            <a:normAutofit/>
+          </a:bodyPr>
+          <a:lstStyle/>
+          <a:p>
+            <a:r>
+              <a:rPr lang="en-US" dirty="0" smtClean="0"/>
+              <a:t>Biotic Components</a:t>
+            </a:r>
+          </a:p>
+          <a:p>
+            <a:pPr lvl="1"/>
+            <a:r>
+              <a:rPr lang="en-US" dirty="0" smtClean="0"/>
+              <a:t>Producers</a:t>
+            </a:r>
+          </a:p>
+          <a:p>
+            <a:pPr lvl="2"/>
+            <a:r>
+              <a:rPr lang="en-US" dirty="0" smtClean="0"/>
+              <a:t>Grass , Shrubs and few trees.</a:t>
+            </a:r>
+          </a:p>
+          <a:p>
+            <a:pPr lvl="1"/>
+            <a:r>
+              <a:rPr lang="en-US" dirty="0" smtClean="0"/>
+              <a:t>Consumer</a:t>
+            </a:r>
+          </a:p>
+          <a:p>
+            <a:pPr lvl="2"/>
+            <a:r>
+              <a:rPr lang="en-US" dirty="0" smtClean="0"/>
+              <a:t>Primary</a:t>
+            </a:r>
+          </a:p>
+          <a:p>
+            <a:pPr lvl="3"/>
+            <a:r>
+              <a:rPr lang="en-US" dirty="0" smtClean="0"/>
+              <a:t>Cows, Rabbits, Sheep, Deer</a:t>
+            </a:r>
+          </a:p>
+          <a:p>
+            <a:pPr lvl="2"/>
+            <a:r>
+              <a:rPr lang="en-US" dirty="0" smtClean="0"/>
+              <a:t>Secondary</a:t>
+            </a:r>
+          </a:p>
+          <a:p>
+            <a:pPr lvl="3"/>
+            <a:r>
+              <a:rPr lang="en-US" dirty="0" smtClean="0"/>
+              <a:t>Snakes, Birds, Forges, Foxes, etc.,</a:t>
+            </a:r>
+          </a:p>
+          <a:p>
+            <a:pPr lvl="2"/>
+            <a:r>
+              <a:rPr lang="en-US" dirty="0" smtClean="0"/>
+              <a:t>Tertiary</a:t>
+            </a:r>
+          </a:p>
+          <a:p>
+            <a:pPr lvl="3"/>
+            <a:r>
+              <a:rPr lang="en-US" dirty="0" smtClean="0"/>
+              <a:t>Eagles, Hawks</a:t>
+            </a:r>
+          </a:p>
+        </p:txBody>
+      </p:sp>
+    </p:spTree>
+  </p:cSld>
+  <p:clrMapOvr>
+    <a:masterClrMapping/>
+  </p:clrMapOvr>
+</p:sld>
+</file>
+
+<file path=ppt/slides/slide57.xml><?xml version="1.0" encoding="utf-8"?>
+<p:sld xmlns:a="http://schemas.openxmlformats.org/drawingml/2006/main" xmlns:r="http://schemas.openxmlformats.org/officeDocument/2006/relationships" xmlns:p="http://schemas.openxmlformats.org/presentationml/2006/main">
+  <p:cSld>
+    <p:spTree>
+      <p:nvGrpSpPr>
+        <p:cNvPr id="1" name=""/>
+        <p:cNvGrpSpPr/>
+        <p:nvPr/>
+      </p:nvGrpSpPr>
+      <p:grpSpPr>
+        <a:xfrm>
+          <a:off x="0" y="0"/>
+          <a:ext cx="0" cy="0"/>
+          <a:chOff x="0" y="0"/>
+          <a:chExt cx="0" cy="0"/>
+        </a:xfrm>
+      </p:grpSpPr>
+      <p:sp>
+        <p:nvSpPr>
+          <p:cNvPr id="2" name="Title 1"/>
+          <p:cNvSpPr>
+            <a:spLocks noGrp="1"/>
+          </p:cNvSpPr>
+          <p:nvPr>
+            <p:ph type="title"/>
+          </p:nvPr>
+        </p:nvSpPr>
+        <p:spPr/>
+        <p:txBody>
+          <a:bodyPr/>
+          <a:lstStyle/>
+          <a:p>
+            <a:r>
+              <a:rPr lang="en-US" dirty="0" smtClean="0"/>
+              <a:t>Structure of </a:t>
+            </a:r>
+            <a:r>
+              <a:rPr lang="en-US" dirty="0" smtClean="0"/>
+              <a:t>Grassland </a:t>
+            </a:r>
+            <a:r>
+              <a:rPr lang="en-US" dirty="0" smtClean="0"/>
+              <a:t>Ecosystem</a:t>
+            </a:r>
+            <a:endParaRPr lang="en-US" dirty="0"/>
+          </a:p>
+        </p:txBody>
+      </p:sp>
+      <p:sp>
+        <p:nvSpPr>
+          <p:cNvPr id="3" name="Content Placeholder 2"/>
+          <p:cNvSpPr>
+            <a:spLocks noGrp="1"/>
+          </p:cNvSpPr>
+          <p:nvPr>
+            <p:ph idx="1"/>
+          </p:nvPr>
+        </p:nvSpPr>
+        <p:spPr/>
+        <p:txBody>
+          <a:bodyPr>
+            <a:normAutofit/>
+          </a:bodyPr>
+          <a:lstStyle/>
+          <a:p>
+            <a:r>
+              <a:rPr lang="en-US" dirty="0" smtClean="0"/>
+              <a:t>Biotic Components</a:t>
+            </a:r>
+          </a:p>
+          <a:p>
+            <a:pPr lvl="1"/>
+            <a:r>
+              <a:rPr lang="en-US" dirty="0" smtClean="0"/>
+              <a:t>Decomposers</a:t>
+            </a:r>
+          </a:p>
+          <a:p>
+            <a:pPr lvl="2"/>
+            <a:r>
+              <a:rPr lang="en-IN" dirty="0" smtClean="0"/>
+              <a:t>Bacteria</a:t>
+            </a:r>
+          </a:p>
+          <a:p>
+            <a:pPr lvl="2"/>
+            <a:r>
+              <a:rPr lang="en-IN" dirty="0" smtClean="0"/>
+              <a:t>Fungi </a:t>
+            </a:r>
+            <a:endParaRPr lang="en-US" dirty="0" smtClean="0"/>
+          </a:p>
+          <a:p>
+            <a:pPr lvl="2"/>
+            <a:endParaRPr lang="en-US" dirty="0" smtClean="0"/>
+          </a:p>
+        </p:txBody>
+      </p:sp>
+    </p:spTree>
+  </p:cSld>
+  <p:clrMapOvr>
+    <a:masterClrMapping/>
+  </p:clrMapOvr>
+</p:sld>
+</file>
+
+<file path=ppt/slides/slide58.xml><?xml version="1.0" encoding="utf-8"?>
+<p:sld xmlns:a="http://schemas.openxmlformats.org/drawingml/2006/main" xmlns:r="http://schemas.openxmlformats.org/officeDocument/2006/relationships" xmlns:p="http://schemas.openxmlformats.org/presentationml/2006/main">
+  <p:cSld>
+    <p:spTree>
+      <p:nvGrpSpPr>
+        <p:cNvPr id="1" name=""/>
+        <p:cNvGrpSpPr/>
+        <p:nvPr/>
+      </p:nvGrpSpPr>
+      <p:grpSpPr>
+        <a:xfrm>
+          <a:off x="0" y="0"/>
+          <a:ext cx="0" cy="0"/>
+          <a:chOff x="0" y="0"/>
+          <a:chExt cx="0" cy="0"/>
+        </a:xfrm>
+      </p:grpSpPr>
+      <p:sp>
+        <p:nvSpPr>
+          <p:cNvPr id="2" name="Title 1"/>
+          <p:cNvSpPr>
+            <a:spLocks noGrp="1"/>
+          </p:cNvSpPr>
+          <p:nvPr>
+            <p:ph type="title"/>
+          </p:nvPr>
+        </p:nvSpPr>
+        <p:spPr/>
+        <p:txBody>
+          <a:bodyPr>
+            <a:normAutofit fontScale="90000"/>
+          </a:bodyPr>
+          <a:lstStyle/>
+          <a:p>
+            <a:r>
+              <a:rPr lang="en-US" dirty="0" smtClean="0"/>
+              <a:t>Food Chain of Grassland Ecosystem</a:t>
+            </a:r>
+            <a:endParaRPr lang="en-US" dirty="0"/>
+          </a:p>
+        </p:txBody>
+      </p:sp>
+      <p:sp>
+        <p:nvSpPr>
+          <p:cNvPr id="3" name="Content Placeholder 2"/>
+          <p:cNvSpPr>
+            <a:spLocks noGrp="1"/>
+          </p:cNvSpPr>
+          <p:nvPr>
+            <p:ph idx="1"/>
+          </p:nvPr>
+        </p:nvSpPr>
+        <p:spPr/>
+        <p:txBody>
+          <a:bodyPr>
+            <a:normAutofit/>
+          </a:bodyPr>
+          <a:lstStyle/>
+          <a:p>
+            <a:r>
+              <a:rPr lang="en-US" dirty="0" smtClean="0"/>
+              <a:t>Food Chain</a:t>
+            </a:r>
+          </a:p>
+          <a:p>
+            <a:pPr lvl="1"/>
+            <a:r>
+              <a:rPr lang="en-US" dirty="0" smtClean="0"/>
+              <a:t>Grasses</a:t>
+            </a:r>
+            <a:r>
+              <a:rPr lang="en-US" dirty="0" smtClean="0">
+                <a:sym typeface="Wingdings" pitchFamily="2" charset="2"/>
+              </a:rPr>
+              <a:t> Grasshoppers Lizards Eagles</a:t>
+            </a:r>
+          </a:p>
+          <a:p>
+            <a:pPr lvl="1"/>
+            <a:r>
+              <a:rPr lang="en-US" dirty="0" smtClean="0"/>
+              <a:t>Grasses </a:t>
+            </a:r>
+            <a:r>
+              <a:rPr lang="en-US" dirty="0" smtClean="0">
+                <a:sym typeface="Wingdings" pitchFamily="2" charset="2"/>
+              </a:rPr>
+              <a:t> Rabbits Hawk</a:t>
+            </a:r>
+            <a:endParaRPr lang="en-IN" dirty="0" smtClean="0">
+              <a:sym typeface="Wingdings" pitchFamily="2" charset="2"/>
+            </a:endParaRPr>
+          </a:p>
+        </p:txBody>
+      </p:sp>
+    </p:spTree>
+  </p:cSld>
+  <p:clrMapOvr>
+    <a:masterClrMapping/>
+  </p:clrMapOvr>
+</p:sld>
+</file>
+
+<file path=ppt/slides/slide59.xml><?xml version="1.0" encoding="utf-8"?>
+<p:sld xmlns:a="http://schemas.openxmlformats.org/drawingml/2006/main" xmlns:r="http://schemas.openxmlformats.org/officeDocument/2006/relationships" xmlns:p="http://schemas.openxmlformats.org/presentationml/2006/main">
+  <p:cSld>
+    <p:spTree>
+      <p:nvGrpSpPr>
+        <p:cNvPr id="1" name=""/>
+        <p:cNvGrpSpPr/>
+        <p:nvPr/>
+      </p:nvGrpSpPr>
+      <p:grpSpPr>
+        <a:xfrm>
+          <a:off x="0" y="0"/>
+          <a:ext cx="0" cy="0"/>
+          <a:chOff x="0" y="0"/>
+          <a:chExt cx="0" cy="0"/>
+        </a:xfrm>
+      </p:grpSpPr>
+      <p:sp>
+        <p:nvSpPr>
+          <p:cNvPr id="2" name="Title 1"/>
+          <p:cNvSpPr>
+            <a:spLocks noGrp="1"/>
+          </p:cNvSpPr>
+          <p:nvPr>
+            <p:ph type="title"/>
+          </p:nvPr>
+        </p:nvSpPr>
+        <p:spPr/>
+        <p:txBody>
+          <a:bodyPr/>
+          <a:lstStyle/>
+          <a:p>
+            <a:r>
+              <a:rPr lang="en-US" dirty="0" smtClean="0"/>
+              <a:t>Function of Grassland Ecosystem</a:t>
+            </a:r>
+            <a:endParaRPr lang="en-US" dirty="0"/>
+          </a:p>
+        </p:txBody>
+      </p:sp>
+      <p:sp>
+        <p:nvSpPr>
+          <p:cNvPr id="3" name="Content Placeholder 2"/>
+          <p:cNvSpPr>
+            <a:spLocks noGrp="1"/>
+          </p:cNvSpPr>
+          <p:nvPr>
+            <p:ph idx="1"/>
+          </p:nvPr>
+        </p:nvSpPr>
+        <p:spPr/>
+        <p:txBody>
+          <a:bodyPr>
+            <a:normAutofit/>
+          </a:bodyPr>
+          <a:lstStyle/>
+          <a:p>
+            <a:r>
+              <a:rPr lang="en-IN" dirty="0" smtClean="0"/>
+              <a:t>Grass traps solar energy and biomass is consumed by herbivores</a:t>
+            </a:r>
+            <a:endParaRPr lang="en-IN" dirty="0" smtClean="0"/>
+          </a:p>
+          <a:p>
+            <a:r>
+              <a:rPr lang="en-IN" dirty="0" smtClean="0"/>
+              <a:t>Ideal place for grazing animals</a:t>
+            </a:r>
+          </a:p>
+          <a:p>
+            <a:r>
+              <a:rPr lang="en-IN" dirty="0" smtClean="0"/>
+              <a:t>Grass prevent </a:t>
+            </a:r>
+            <a:r>
+              <a:rPr lang="en-IN" smtClean="0"/>
+              <a:t>soil erosion.</a:t>
+            </a:r>
+            <a:endParaRPr lang="en-US" dirty="0" smtClean="0"/>
           </a:p>
         </p:txBody>
       </p:sp>
@@ -27615,6 +29386,382 @@
   <p:clrMapOvr>
     <a:masterClrMapping/>
   </p:clrMapOvr>
+</p:sld>
+</file>
+
+<file path=ppt/slides/slide60.xml><?xml version="1.0" encoding="utf-8"?>
+<p:sld xmlns:a="http://schemas.openxmlformats.org/drawingml/2006/main" xmlns:r="http://schemas.openxmlformats.org/officeDocument/2006/relationships" xmlns:p="http://schemas.openxmlformats.org/presentationml/2006/main">
+  <p:cSld>
+    <p:spTree>
+      <p:nvGrpSpPr>
+        <p:cNvPr id="1" name=""/>
+        <p:cNvGrpSpPr/>
+        <p:nvPr/>
+      </p:nvGrpSpPr>
+      <p:grpSpPr>
+        <a:xfrm>
+          <a:off x="0" y="0"/>
+          <a:ext cx="0" cy="0"/>
+          <a:chOff x="0" y="0"/>
+          <a:chExt cx="0" cy="0"/>
+        </a:xfrm>
+      </p:grpSpPr>
+      <p:sp>
+        <p:nvSpPr>
+          <p:cNvPr id="2" name="Title 1"/>
+          <p:cNvSpPr>
+            <a:spLocks noGrp="1"/>
+          </p:cNvSpPr>
+          <p:nvPr>
+            <p:ph type="title"/>
+          </p:nvPr>
+        </p:nvSpPr>
+        <p:spPr>
+          <a:xfrm>
+            <a:off x="457200" y="1981200"/>
+            <a:ext cx="8229600" cy="1143000"/>
+          </a:xfrm>
+        </p:spPr>
+        <p:txBody>
+          <a:bodyPr/>
+          <a:lstStyle/>
+          <a:p>
+            <a:r>
+              <a:rPr lang="en-US" dirty="0" smtClean="0"/>
+              <a:t>Thank You</a:t>
+            </a:r>
+            <a:endParaRPr lang="en-US" dirty="0"/>
+          </a:p>
+        </p:txBody>
+      </p:sp>
+      <p:sp>
+        <p:nvSpPr>
+          <p:cNvPr id="4" name="Subtitle 2"/>
+          <p:cNvSpPr txBox="1">
+            <a:spLocks/>
+          </p:cNvSpPr>
+          <p:nvPr/>
+        </p:nvSpPr>
+        <p:spPr>
+          <a:xfrm>
+            <a:off x="4038600" y="4191000"/>
+            <a:ext cx="4191000" cy="1752600"/>
+          </a:xfrm>
+          <a:prstGeom prst="rect">
+            <a:avLst/>
+          </a:prstGeom>
+        </p:spPr>
+        <p:txBody>
+          <a:bodyPr vert="horz" lIns="91440" tIns="45720" rIns="91440" bIns="45720" rtlCol="0">
+            <a:normAutofit fontScale="92500" lnSpcReduction="10000"/>
+          </a:bodyPr>
+          <a:lstStyle/>
+          <a:p>
+            <a:pPr marL="342900" marR="0" lvl="0" indent="-342900" algn="r" defTabSz="914400" rtl="0" eaLnBrk="1" fontAlgn="auto" latinLnBrk="0" hangingPunct="1">
+              <a:lnSpc>
+                <a:spcPct val="100000"/>
+              </a:lnSpc>
+              <a:spcBef>
+                <a:spcPct val="20000"/>
+              </a:spcBef>
+              <a:spcAft>
+                <a:spcPts val="0"/>
+              </a:spcAft>
+              <a:buClrTx/>
+              <a:buSzTx/>
+              <a:tabLst/>
+              <a:defRPr/>
+            </a:pPr>
+            <a:r>
+              <a:rPr kumimoji="0" lang="en-US" sz="2200" b="0" i="0" u="none" strike="noStrike" kern="1200" cap="none" spc="0" normalizeH="0" baseline="0" noProof="0" dirty="0" err="1" smtClean="0">
+                <a:ln>
+                  <a:noFill/>
+                </a:ln>
+                <a:solidFill>
+                  <a:schemeClr val="tx1"/>
+                </a:solidFill>
+                <a:effectLst/>
+                <a:uLnTx/>
+                <a:uFillTx/>
+                <a:latin typeface="Cambria" pitchFamily="18" charset="0"/>
+                <a:ea typeface="+mn-ea"/>
+                <a:cs typeface="+mn-cs"/>
+              </a:rPr>
+              <a:t>Rajasekaran</a:t>
+            </a:r>
+            <a:r>
+              <a:rPr kumimoji="0" lang="en-US" sz="2200" b="0" i="0" u="none" strike="noStrike" kern="1200" cap="none" spc="0" normalizeH="0" baseline="0" noProof="0" dirty="0" smtClean="0">
+                <a:ln>
+                  <a:noFill/>
+                </a:ln>
+                <a:solidFill>
+                  <a:schemeClr val="tx1"/>
+                </a:solidFill>
+                <a:effectLst/>
+                <a:uLnTx/>
+                <a:uFillTx/>
+                <a:latin typeface="Cambria" pitchFamily="18" charset="0"/>
+                <a:ea typeface="+mn-ea"/>
+                <a:cs typeface="+mn-cs"/>
+              </a:rPr>
+              <a:t> S</a:t>
+            </a:r>
+          </a:p>
+          <a:p>
+            <a:pPr marL="342900" marR="0" lvl="0" indent="-342900" algn="r" defTabSz="914400" rtl="0" eaLnBrk="1" fontAlgn="auto" latinLnBrk="0" hangingPunct="1">
+              <a:lnSpc>
+                <a:spcPct val="100000"/>
+              </a:lnSpc>
+              <a:spcBef>
+                <a:spcPct val="20000"/>
+              </a:spcBef>
+              <a:spcAft>
+                <a:spcPts val="0"/>
+              </a:spcAft>
+              <a:buClrTx/>
+              <a:buSzTx/>
+              <a:tabLst/>
+              <a:defRPr/>
+            </a:pPr>
+            <a:r>
+              <a:rPr kumimoji="0" lang="en-US" sz="1600" b="0" i="0" u="none" strike="noStrike" kern="1200" cap="none" spc="0" normalizeH="0" baseline="0" noProof="0" dirty="0" smtClean="0">
+                <a:ln>
+                  <a:noFill/>
+                </a:ln>
+                <a:solidFill>
+                  <a:schemeClr val="tx1"/>
+                </a:solidFill>
+                <a:effectLst/>
+                <a:uLnTx/>
+                <a:uFillTx/>
+                <a:latin typeface="Cambria" pitchFamily="18" charset="0"/>
+                <a:ea typeface="+mn-ea"/>
+                <a:cs typeface="+mn-cs"/>
+              </a:rPr>
+              <a:t>Assistant Professor,</a:t>
+            </a:r>
+          </a:p>
+          <a:p>
+            <a:pPr marL="342900" marR="0" lvl="0" indent="-342900" algn="r" defTabSz="914400" rtl="0" eaLnBrk="1" fontAlgn="auto" latinLnBrk="0" hangingPunct="1">
+              <a:lnSpc>
+                <a:spcPct val="100000"/>
+              </a:lnSpc>
+              <a:spcBef>
+                <a:spcPct val="20000"/>
+              </a:spcBef>
+              <a:spcAft>
+                <a:spcPts val="0"/>
+              </a:spcAft>
+              <a:buClrTx/>
+              <a:buSzTx/>
+              <a:tabLst/>
+              <a:defRPr/>
+            </a:pPr>
+            <a:r>
+              <a:rPr kumimoji="0" lang="en-US" sz="1600" b="0" i="0" u="none" strike="noStrike" kern="1200" cap="none" spc="0" normalizeH="0" baseline="0" noProof="0" dirty="0" smtClean="0">
+                <a:ln>
+                  <a:noFill/>
+                </a:ln>
+                <a:solidFill>
+                  <a:schemeClr val="tx1"/>
+                </a:solidFill>
+                <a:effectLst/>
+                <a:uLnTx/>
+                <a:uFillTx/>
+                <a:latin typeface="Cambria" pitchFamily="18" charset="0"/>
+                <a:ea typeface="+mn-ea"/>
+                <a:cs typeface="+mn-cs"/>
+              </a:rPr>
+              <a:t>Department of Information Technology,</a:t>
+            </a:r>
+          </a:p>
+          <a:p>
+            <a:pPr marL="342900" marR="0" lvl="0" indent="-342900" algn="r" defTabSz="914400" rtl="0" eaLnBrk="1" fontAlgn="auto" latinLnBrk="0" hangingPunct="1">
+              <a:lnSpc>
+                <a:spcPct val="100000"/>
+              </a:lnSpc>
+              <a:spcBef>
+                <a:spcPct val="20000"/>
+              </a:spcBef>
+              <a:spcAft>
+                <a:spcPts val="0"/>
+              </a:spcAft>
+              <a:buClrTx/>
+              <a:buSzTx/>
+              <a:tabLst/>
+              <a:defRPr/>
+            </a:pPr>
+            <a:r>
+              <a:rPr kumimoji="0" lang="en-US" sz="1600" b="0" i="0" u="none" strike="noStrike" kern="1200" cap="none" spc="0" normalizeH="0" baseline="0" noProof="0" dirty="0" err="1" smtClean="0">
+                <a:ln>
+                  <a:noFill/>
+                </a:ln>
+                <a:solidFill>
+                  <a:schemeClr val="tx1"/>
+                </a:solidFill>
+                <a:effectLst/>
+                <a:uLnTx/>
+                <a:uFillTx/>
+                <a:latin typeface="Cambria" pitchFamily="18" charset="0"/>
+                <a:ea typeface="+mn-ea"/>
+                <a:cs typeface="+mn-cs"/>
+              </a:rPr>
+              <a:t>KGiSL</a:t>
+            </a:r>
+            <a:r>
+              <a:rPr kumimoji="0" lang="en-US" sz="1600" b="0" i="0" u="none" strike="noStrike" kern="1200" cap="none" spc="0" normalizeH="0" baseline="0" noProof="0" dirty="0" smtClean="0">
+                <a:ln>
+                  <a:noFill/>
+                </a:ln>
+                <a:solidFill>
+                  <a:schemeClr val="tx1"/>
+                </a:solidFill>
+                <a:effectLst/>
+                <a:uLnTx/>
+                <a:uFillTx/>
+                <a:latin typeface="Cambria" pitchFamily="18" charset="0"/>
+                <a:ea typeface="+mn-ea"/>
+                <a:cs typeface="+mn-cs"/>
+              </a:rPr>
+              <a:t> Institute of Technology,</a:t>
+            </a:r>
+          </a:p>
+          <a:p>
+            <a:pPr marL="342900" marR="0" lvl="0" indent="-342900" algn="r" defTabSz="914400" rtl="0" eaLnBrk="1" fontAlgn="auto" latinLnBrk="0" hangingPunct="1">
+              <a:lnSpc>
+                <a:spcPct val="100000"/>
+              </a:lnSpc>
+              <a:spcBef>
+                <a:spcPct val="20000"/>
+              </a:spcBef>
+              <a:spcAft>
+                <a:spcPts val="0"/>
+              </a:spcAft>
+              <a:buClrTx/>
+              <a:buSzTx/>
+              <a:tabLst/>
+              <a:defRPr/>
+            </a:pPr>
+            <a:r>
+              <a:rPr kumimoji="0" lang="en-US" sz="1600" b="0" i="0" u="none" strike="noStrike" kern="1200" cap="none" spc="0" normalizeH="0" baseline="0" noProof="0" dirty="0" smtClean="0">
+                <a:ln>
+                  <a:noFill/>
+                </a:ln>
+                <a:solidFill>
+                  <a:schemeClr val="tx1"/>
+                </a:solidFill>
+                <a:effectLst/>
+                <a:uLnTx/>
+                <a:uFillTx/>
+                <a:latin typeface="Cambria" pitchFamily="18" charset="0"/>
+                <a:ea typeface="+mn-ea"/>
+                <a:cs typeface="+mn-cs"/>
+              </a:rPr>
+              <a:t>email: </a:t>
+            </a:r>
+            <a:r>
+              <a:rPr kumimoji="0" lang="en-US" sz="1600" b="0" i="0" u="none" strike="noStrike" kern="1200" cap="none" spc="0" normalizeH="0" baseline="0" noProof="0" dirty="0" smtClean="0">
+                <a:ln>
+                  <a:noFill/>
+                </a:ln>
+                <a:solidFill>
+                  <a:schemeClr val="tx1"/>
+                </a:solidFill>
+                <a:effectLst/>
+                <a:uLnTx/>
+                <a:uFillTx/>
+                <a:latin typeface="Cambria" pitchFamily="18" charset="0"/>
+                <a:ea typeface="+mn-ea"/>
+                <a:cs typeface="+mn-cs"/>
+                <a:hlinkClick r:id="rId2"/>
+              </a:rPr>
+              <a:t>proffraja@gmail.com</a:t>
+            </a:r>
+            <a:endParaRPr lang="en-US" sz="1600" dirty="0" smtClean="0">
+              <a:latin typeface="Cambria" pitchFamily="18" charset="0"/>
+            </a:endParaRPr>
+          </a:p>
+          <a:p>
+            <a:pPr marL="342900" marR="0" lvl="0" indent="-342900" algn="r" defTabSz="914400" rtl="0" eaLnBrk="1" fontAlgn="auto" latinLnBrk="0" hangingPunct="1">
+              <a:lnSpc>
+                <a:spcPct val="100000"/>
+              </a:lnSpc>
+              <a:spcBef>
+                <a:spcPct val="20000"/>
+              </a:spcBef>
+              <a:spcAft>
+                <a:spcPts val="0"/>
+              </a:spcAft>
+              <a:buClrTx/>
+              <a:buSzTx/>
+              <a:tabLst/>
+              <a:defRPr/>
+            </a:pPr>
+            <a:r>
+              <a:rPr lang="en-US" sz="1600" dirty="0" err="1" smtClean="0">
+                <a:latin typeface="Cambria" pitchFamily="18" charset="0"/>
+              </a:rPr>
+              <a:t>Github:</a:t>
+            </a:r>
+            <a:r>
+              <a:rPr lang="en-US" sz="1600" dirty="0" err="1" smtClean="0">
+                <a:latin typeface="Cambria" pitchFamily="18" charset="0"/>
+                <a:hlinkClick r:id="rId3"/>
+              </a:rPr>
+              <a:t>www.github.com</a:t>
+            </a:r>
+            <a:r>
+              <a:rPr lang="en-US" sz="1600" dirty="0" smtClean="0">
+                <a:latin typeface="Cambria" pitchFamily="18" charset="0"/>
+                <a:hlinkClick r:id="rId3"/>
+              </a:rPr>
+              <a:t>/</a:t>
+            </a:r>
+            <a:r>
+              <a:rPr lang="en-US" sz="1600" dirty="0" err="1" smtClean="0">
+                <a:latin typeface="Cambria" pitchFamily="18" charset="0"/>
+                <a:hlinkClick r:id="rId3"/>
+              </a:rPr>
+              <a:t>rajasekaranap</a:t>
+            </a:r>
+            <a:endParaRPr lang="en-US" sz="1600" dirty="0" smtClean="0">
+              <a:latin typeface="Cambria" pitchFamily="18" charset="0"/>
+            </a:endParaRPr>
+          </a:p>
+          <a:p>
+            <a:pPr marL="342900" marR="0" lvl="0" indent="-342900" algn="r" defTabSz="914400" rtl="0" eaLnBrk="1" fontAlgn="auto" latinLnBrk="0" hangingPunct="1">
+              <a:lnSpc>
+                <a:spcPct val="100000"/>
+              </a:lnSpc>
+              <a:spcBef>
+                <a:spcPct val="20000"/>
+              </a:spcBef>
+              <a:spcAft>
+                <a:spcPts val="0"/>
+              </a:spcAft>
+              <a:buClrTx/>
+              <a:buSzTx/>
+              <a:tabLst/>
+              <a:defRPr/>
+            </a:pPr>
+            <a:endParaRPr lang="en-US" sz="1600" dirty="0" smtClean="0">
+              <a:latin typeface="Cambria" pitchFamily="18" charset="0"/>
+            </a:endParaRPr>
+          </a:p>
+        </p:txBody>
+      </p:sp>
+    </p:spTree>
+  </p:cSld>
+  <p:clrMapOvr>
+    <a:masterClrMapping/>
+  </p:clrMapOvr>
+  <p:timing>
+    <p:tnLst>
+      <p:par>
+        <p:cTn id="1" dur="indefinite" restart="never" nodeType="tmRoot"/>
+      </p:par>
+    </p:tnLst>
+  </p:timing>
 </p:sld>
 </file>
 

</xml_diff>

<commit_message>
Last Update 26-12-2018 16:39:17.33
</commit_message>
<xml_diff>
--- a/Slides/GE8291-U1.pptx
+++ b/Slides/GE8291-U1.pptx
@@ -5,7 +5,7 @@
     <p:sldMasterId id="2147483648" r:id="rId1"/>
   </p:sldMasterIdLst>
   <p:notesMasterIdLst>
-    <p:notesMasterId r:id="rId62"/>
+    <p:notesMasterId r:id="rId73"/>
   </p:notesMasterIdLst>
   <p:sldIdLst>
     <p:sldId id="256" r:id="rId2"/>
@@ -67,7 +67,18 @@
     <p:sldId id="330" r:id="rId58"/>
     <p:sldId id="332" r:id="rId59"/>
     <p:sldId id="333" r:id="rId60"/>
-    <p:sldId id="272" r:id="rId61"/>
+    <p:sldId id="334" r:id="rId61"/>
+    <p:sldId id="335" r:id="rId62"/>
+    <p:sldId id="336" r:id="rId63"/>
+    <p:sldId id="337" r:id="rId64"/>
+    <p:sldId id="338" r:id="rId65"/>
+    <p:sldId id="339" r:id="rId66"/>
+    <p:sldId id="340" r:id="rId67"/>
+    <p:sldId id="341" r:id="rId68"/>
+    <p:sldId id="342" r:id="rId69"/>
+    <p:sldId id="343" r:id="rId70"/>
+    <p:sldId id="344" r:id="rId71"/>
+    <p:sldId id="272" r:id="rId72"/>
   </p:sldIdLst>
   <p:sldSz cx="9144000" cy="6858000" type="screen4x3"/>
   <p:notesSz cx="6858000" cy="9144000"/>
@@ -19155,7 +19166,7 @@
             <a:fld id="{9515075B-F3F0-4441-A1BD-B7B515B708FF}" type="datetimeFigureOut">
               <a:rPr lang="en-US" smtClean="0"/>
               <a:pPr/>
-              <a:t>12/21/2018</a:t>
+              <a:t>12/26/2018</a:t>
             </a:fld>
             <a:endParaRPr lang="en-US"/>
           </a:p>
@@ -19622,7 +19633,7 @@
             <a:fld id="{6E658DF8-B8C0-4C7F-85EB-B53A2DDD44A9}" type="datetimeFigureOut">
               <a:rPr lang="en-US" smtClean="0"/>
               <a:pPr/>
-              <a:t>12/21/2018</a:t>
+              <a:t>12/26/2018</a:t>
             </a:fld>
             <a:endParaRPr lang="en-US"/>
           </a:p>
@@ -19789,7 +19800,7 @@
             <a:fld id="{6E658DF8-B8C0-4C7F-85EB-B53A2DDD44A9}" type="datetimeFigureOut">
               <a:rPr lang="en-US" smtClean="0"/>
               <a:pPr/>
-              <a:t>12/21/2018</a:t>
+              <a:t>12/26/2018</a:t>
             </a:fld>
             <a:endParaRPr lang="en-US"/>
           </a:p>
@@ -19966,7 +19977,7 @@
             <a:fld id="{6E658DF8-B8C0-4C7F-85EB-B53A2DDD44A9}" type="datetimeFigureOut">
               <a:rPr lang="en-US" smtClean="0"/>
               <a:pPr/>
-              <a:t>12/21/2018</a:t>
+              <a:t>12/26/2018</a:t>
             </a:fld>
             <a:endParaRPr lang="en-US"/>
           </a:p>
@@ -20165,7 +20176,7 @@
             <a:fld id="{6E658DF8-B8C0-4C7F-85EB-B53A2DDD44A9}" type="datetimeFigureOut">
               <a:rPr lang="en-US" smtClean="0"/>
               <a:pPr/>
-              <a:t>12/21/2018</a:t>
+              <a:t>12/26/2018</a:t>
             </a:fld>
             <a:endParaRPr lang="en-US"/>
           </a:p>
@@ -20408,7 +20419,7 @@
             <a:fld id="{6E658DF8-B8C0-4C7F-85EB-B53A2DDD44A9}" type="datetimeFigureOut">
               <a:rPr lang="en-US" smtClean="0"/>
               <a:pPr/>
-              <a:t>12/21/2018</a:t>
+              <a:t>12/26/2018</a:t>
             </a:fld>
             <a:endParaRPr lang="en-US"/>
           </a:p>
@@ -20693,7 +20704,7 @@
             <a:fld id="{6E658DF8-B8C0-4C7F-85EB-B53A2DDD44A9}" type="datetimeFigureOut">
               <a:rPr lang="en-US" smtClean="0"/>
               <a:pPr/>
-              <a:t>12/21/2018</a:t>
+              <a:t>12/26/2018</a:t>
             </a:fld>
             <a:endParaRPr lang="en-US"/>
           </a:p>
@@ -21112,7 +21123,7 @@
             <a:fld id="{6E658DF8-B8C0-4C7F-85EB-B53A2DDD44A9}" type="datetimeFigureOut">
               <a:rPr lang="en-US" smtClean="0"/>
               <a:pPr/>
-              <a:t>12/21/2018</a:t>
+              <a:t>12/26/2018</a:t>
             </a:fld>
             <a:endParaRPr lang="en-US"/>
           </a:p>
@@ -21227,7 +21238,7 @@
             <a:fld id="{6E658DF8-B8C0-4C7F-85EB-B53A2DDD44A9}" type="datetimeFigureOut">
               <a:rPr lang="en-US" smtClean="0"/>
               <a:pPr/>
-              <a:t>12/21/2018</a:t>
+              <a:t>12/26/2018</a:t>
             </a:fld>
             <a:endParaRPr lang="en-US"/>
           </a:p>
@@ -21319,7 +21330,7 @@
             <a:fld id="{6E658DF8-B8C0-4C7F-85EB-B53A2DDD44A9}" type="datetimeFigureOut">
               <a:rPr lang="en-US" smtClean="0"/>
               <a:pPr/>
-              <a:t>12/21/2018</a:t>
+              <a:t>12/26/2018</a:t>
             </a:fld>
             <a:endParaRPr lang="en-US"/>
           </a:p>
@@ -21593,7 +21604,7 @@
             <a:fld id="{6E658DF8-B8C0-4C7F-85EB-B53A2DDD44A9}" type="datetimeFigureOut">
               <a:rPr lang="en-US" smtClean="0"/>
               <a:pPr/>
-              <a:t>12/21/2018</a:t>
+              <a:t>12/26/2018</a:t>
             </a:fld>
             <a:endParaRPr lang="en-US"/>
           </a:p>
@@ -21847,7 +21858,7 @@
             <a:fld id="{6E658DF8-B8C0-4C7F-85EB-B53A2DDD44A9}" type="datetimeFigureOut">
               <a:rPr lang="en-US" smtClean="0"/>
               <a:pPr/>
-              <a:t>12/21/2018</a:t>
+              <a:t>12/26/2018</a:t>
             </a:fld>
             <a:endParaRPr lang="en-US"/>
           </a:p>
@@ -22069,7 +22080,7 @@
             <a:fld id="{6E658DF8-B8C0-4C7F-85EB-B53A2DDD44A9}" type="datetimeFigureOut">
               <a:rPr lang="en-US" smtClean="0"/>
               <a:pPr/>
-              <a:t>12/21/2018</a:t>
+              <a:t>12/26/2018</a:t>
             </a:fld>
             <a:endParaRPr lang="en-US"/>
           </a:p>
@@ -27815,7 +27826,6 @@
               <a:rPr lang="en-US" dirty="0" smtClean="0"/>
               <a:t>heavy rainfall</a:t>
             </a:r>
-            <a:endParaRPr lang="en-US" dirty="0" smtClean="0"/>
           </a:p>
         </p:txBody>
       </p:sp>
@@ -28349,15 +28359,7 @@
           <a:p>
             <a:r>
               <a:rPr lang="en-IN" dirty="0" smtClean="0"/>
-              <a:t>It maintains </a:t>
-            </a:r>
-            <a:r>
-              <a:rPr lang="en-IN" dirty="0" smtClean="0"/>
-              <a:t>c</a:t>
-            </a:r>
-            <a:r>
-              <a:rPr lang="en-IN" dirty="0" smtClean="0"/>
-              <a:t>limate and rainfall.</a:t>
+              <a:t>It maintains climate and rainfall.</a:t>
             </a:r>
           </a:p>
           <a:p>
@@ -28693,7 +28695,6 @@
               <a:rPr lang="en-IN" dirty="0" smtClean="0"/>
               <a:t>Soil is rich in organic matters and nutrients.</a:t>
             </a:r>
-            <a:endParaRPr lang="en-IN" dirty="0" smtClean="0"/>
           </a:p>
           <a:p>
             <a:pPr lvl="1"/>
@@ -28798,15 +28799,7 @@
             </a:r>
             <a:r>
               <a:rPr lang="en-IN" dirty="0" smtClean="0"/>
-              <a:t>O,</a:t>
-            </a:r>
-            <a:r>
-              <a:rPr lang="en-IN" dirty="0" smtClean="0"/>
-              <a:t> </a:t>
-            </a:r>
-            <a:r>
-              <a:rPr lang="en-IN" dirty="0" smtClean="0"/>
-              <a:t>CO</a:t>
+              <a:t>O, CO</a:t>
             </a:r>
             <a:r>
               <a:rPr lang="en-IN" sz="1200" dirty="0" smtClean="0"/>
@@ -28865,15 +28858,7 @@
           <a:p>
             <a:r>
               <a:rPr lang="en-US" dirty="0" smtClean="0"/>
-              <a:t>Structure of </a:t>
-            </a:r>
-            <a:r>
-              <a:rPr lang="en-US" dirty="0" smtClean="0"/>
-              <a:t>Grassland </a:t>
-            </a:r>
-            <a:r>
-              <a:rPr lang="en-US" dirty="0" smtClean="0"/>
-              <a:t>Ecosystem</a:t>
+              <a:t>Structure of Grassland Ecosystem</a:t>
             </a:r>
             <a:endParaRPr lang="en-US" dirty="0"/>
           </a:p>
@@ -29008,15 +28993,7 @@
           <a:p>
             <a:r>
               <a:rPr lang="en-US" dirty="0" smtClean="0"/>
-              <a:t>Structure of </a:t>
-            </a:r>
-            <a:r>
-              <a:rPr lang="en-US" dirty="0" smtClean="0"/>
-              <a:t>Grassland </a:t>
-            </a:r>
-            <a:r>
-              <a:rPr lang="en-US" dirty="0" smtClean="0"/>
-              <a:t>Ecosystem</a:t>
+              <a:t>Structure of Grassland Ecosystem</a:t>
             </a:r>
             <a:endParaRPr lang="en-US" dirty="0"/>
           </a:p>
@@ -29244,7 +29221,6 @@
               <a:rPr lang="en-IN" dirty="0" smtClean="0"/>
               <a:t>Grass traps solar energy and biomass is consumed by herbivores</a:t>
             </a:r>
-            <a:endParaRPr lang="en-IN" dirty="0" smtClean="0"/>
           </a:p>
           <a:p>
             <a:r>
@@ -29416,19 +29392,14 @@
             <p:ph type="title"/>
           </p:nvPr>
         </p:nvSpPr>
-        <p:spPr>
-          <a:xfrm>
-            <a:off x="457200" y="1981200"/>
-            <a:ext cx="8229600" cy="1143000"/>
-          </a:xfrm>
-        </p:spPr>
+        <p:spPr/>
         <p:txBody>
           <a:bodyPr/>
           <a:lstStyle/>
           <a:p>
             <a:r>
               <a:rPr lang="en-US" dirty="0" smtClean="0"/>
-              <a:t>Thank You</a:t>
+              <a:t>Desert Ecosystem</a:t>
             </a:r>
             <a:endParaRPr lang="en-US" dirty="0"/>
           </a:p>
@@ -29436,317 +29407,68 @@
       </p:sp>
       <p:sp>
         <p:nvSpPr>
-          <p:cNvPr id="4" name="Subtitle 2"/>
-          <p:cNvSpPr txBox="1">
-            <a:spLocks/>
+          <p:cNvPr id="3" name="Content Placeholder 2"/>
+          <p:cNvSpPr>
+            <a:spLocks noGrp="1"/>
           </p:cNvSpPr>
-          <p:nvPr/>
+          <p:nvPr>
+            <p:ph idx="1"/>
+          </p:nvPr>
         </p:nvSpPr>
-        <p:spPr>
-          <a:xfrm>
-            <a:off x="4038600" y="4191000"/>
-            <a:ext cx="4191000" cy="1752600"/>
-          </a:xfrm>
-          <a:prstGeom prst="rect">
-            <a:avLst/>
-          </a:prstGeom>
-        </p:spPr>
+        <p:spPr/>
         <p:txBody>
-          <a:bodyPr vert="horz" lIns="91440" tIns="45720" rIns="91440" bIns="45720" rtlCol="0">
-            <a:normAutofit fontScale="92500" lnSpcReduction="10000"/>
+          <a:bodyPr>
+            <a:normAutofit/>
           </a:bodyPr>
           <a:lstStyle/>
           <a:p>
-            <a:pPr marL="342900" marR="0" lvl="0" indent="-342900" algn="r" defTabSz="914400" rtl="0" eaLnBrk="1" fontAlgn="auto" latinLnBrk="0" hangingPunct="1">
-              <a:lnSpc>
-                <a:spcPct val="100000"/>
-              </a:lnSpc>
-              <a:spcBef>
-                <a:spcPct val="20000"/>
-              </a:spcBef>
-              <a:spcAft>
-                <a:spcPts val="0"/>
-              </a:spcAft>
-              <a:buClrTx/>
-              <a:buSzTx/>
-              <a:tabLst/>
-              <a:defRPr/>
-            </a:pPr>
-            <a:r>
-              <a:rPr kumimoji="0" lang="en-US" sz="2200" b="0" i="0" u="none" strike="noStrike" kern="1200" cap="none" spc="0" normalizeH="0" baseline="0" noProof="0" dirty="0" err="1" smtClean="0">
-                <a:ln>
-                  <a:noFill/>
-                </a:ln>
-                <a:solidFill>
-                  <a:schemeClr val="tx1"/>
-                </a:solidFill>
-                <a:effectLst/>
-                <a:uLnTx/>
-                <a:uFillTx/>
-                <a:latin typeface="Cambria" pitchFamily="18" charset="0"/>
-                <a:ea typeface="+mn-ea"/>
-                <a:cs typeface="+mn-cs"/>
-              </a:rPr>
-              <a:t>Rajasekaran</a:t>
-            </a:r>
-            <a:r>
-              <a:rPr kumimoji="0" lang="en-US" sz="2200" b="0" i="0" u="none" strike="noStrike" kern="1200" cap="none" spc="0" normalizeH="0" baseline="0" noProof="0" dirty="0" smtClean="0">
-                <a:ln>
-                  <a:noFill/>
-                </a:ln>
-                <a:solidFill>
-                  <a:schemeClr val="tx1"/>
-                </a:solidFill>
-                <a:effectLst/>
-                <a:uLnTx/>
-                <a:uFillTx/>
-                <a:latin typeface="Cambria" pitchFamily="18" charset="0"/>
-                <a:ea typeface="+mn-ea"/>
-                <a:cs typeface="+mn-cs"/>
-              </a:rPr>
-              <a:t> S</a:t>
-            </a:r>
-          </a:p>
-          <a:p>
-            <a:pPr marL="342900" marR="0" lvl="0" indent="-342900" algn="r" defTabSz="914400" rtl="0" eaLnBrk="1" fontAlgn="auto" latinLnBrk="0" hangingPunct="1">
-              <a:lnSpc>
-                <a:spcPct val="100000"/>
-              </a:lnSpc>
-              <a:spcBef>
-                <a:spcPct val="20000"/>
-              </a:spcBef>
-              <a:spcAft>
-                <a:spcPts val="0"/>
-              </a:spcAft>
-              <a:buClrTx/>
-              <a:buSzTx/>
-              <a:tabLst/>
-              <a:defRPr/>
-            </a:pPr>
-            <a:r>
-              <a:rPr kumimoji="0" lang="en-US" sz="1600" b="0" i="0" u="none" strike="noStrike" kern="1200" cap="none" spc="0" normalizeH="0" baseline="0" noProof="0" dirty="0" smtClean="0">
-                <a:ln>
-                  <a:noFill/>
-                </a:ln>
-                <a:solidFill>
-                  <a:schemeClr val="tx1"/>
-                </a:solidFill>
-                <a:effectLst/>
-                <a:uLnTx/>
-                <a:uFillTx/>
-                <a:latin typeface="Cambria" pitchFamily="18" charset="0"/>
-                <a:ea typeface="+mn-ea"/>
-                <a:cs typeface="+mn-cs"/>
-              </a:rPr>
-              <a:t>Assistant Professor,</a:t>
-            </a:r>
-          </a:p>
-          <a:p>
-            <a:pPr marL="342900" marR="0" lvl="0" indent="-342900" algn="r" defTabSz="914400" rtl="0" eaLnBrk="1" fontAlgn="auto" latinLnBrk="0" hangingPunct="1">
-              <a:lnSpc>
-                <a:spcPct val="100000"/>
-              </a:lnSpc>
-              <a:spcBef>
-                <a:spcPct val="20000"/>
-              </a:spcBef>
-              <a:spcAft>
-                <a:spcPts val="0"/>
-              </a:spcAft>
-              <a:buClrTx/>
-              <a:buSzTx/>
-              <a:tabLst/>
-              <a:defRPr/>
-            </a:pPr>
-            <a:r>
-              <a:rPr kumimoji="0" lang="en-US" sz="1600" b="0" i="0" u="none" strike="noStrike" kern="1200" cap="none" spc="0" normalizeH="0" baseline="0" noProof="0" dirty="0" smtClean="0">
-                <a:ln>
-                  <a:noFill/>
-                </a:ln>
-                <a:solidFill>
-                  <a:schemeClr val="tx1"/>
-                </a:solidFill>
-                <a:effectLst/>
-                <a:uLnTx/>
-                <a:uFillTx/>
-                <a:latin typeface="Cambria" pitchFamily="18" charset="0"/>
-                <a:ea typeface="+mn-ea"/>
-                <a:cs typeface="+mn-cs"/>
-              </a:rPr>
-              <a:t>Department of Information Technology,</a:t>
-            </a:r>
-          </a:p>
-          <a:p>
-            <a:pPr marL="342900" marR="0" lvl="0" indent="-342900" algn="r" defTabSz="914400" rtl="0" eaLnBrk="1" fontAlgn="auto" latinLnBrk="0" hangingPunct="1">
-              <a:lnSpc>
-                <a:spcPct val="100000"/>
-              </a:lnSpc>
-              <a:spcBef>
-                <a:spcPct val="20000"/>
-              </a:spcBef>
-              <a:spcAft>
-                <a:spcPts val="0"/>
-              </a:spcAft>
-              <a:buClrTx/>
-              <a:buSzTx/>
-              <a:tabLst/>
-              <a:defRPr/>
-            </a:pPr>
-            <a:r>
-              <a:rPr kumimoji="0" lang="en-US" sz="1600" b="0" i="0" u="none" strike="noStrike" kern="1200" cap="none" spc="0" normalizeH="0" baseline="0" noProof="0" dirty="0" err="1" smtClean="0">
-                <a:ln>
-                  <a:noFill/>
-                </a:ln>
-                <a:solidFill>
-                  <a:schemeClr val="tx1"/>
-                </a:solidFill>
-                <a:effectLst/>
-                <a:uLnTx/>
-                <a:uFillTx/>
-                <a:latin typeface="Cambria" pitchFamily="18" charset="0"/>
-                <a:ea typeface="+mn-ea"/>
-                <a:cs typeface="+mn-cs"/>
-              </a:rPr>
-              <a:t>KGiSL</a:t>
-            </a:r>
-            <a:r>
-              <a:rPr kumimoji="0" lang="en-US" sz="1600" b="0" i="0" u="none" strike="noStrike" kern="1200" cap="none" spc="0" normalizeH="0" baseline="0" noProof="0" dirty="0" smtClean="0">
-                <a:ln>
-                  <a:noFill/>
-                </a:ln>
-                <a:solidFill>
-                  <a:schemeClr val="tx1"/>
-                </a:solidFill>
-                <a:effectLst/>
-                <a:uLnTx/>
-                <a:uFillTx/>
-                <a:latin typeface="Cambria" pitchFamily="18" charset="0"/>
-                <a:ea typeface="+mn-ea"/>
-                <a:cs typeface="+mn-cs"/>
-              </a:rPr>
-              <a:t> Institute of Technology,</a:t>
-            </a:r>
-          </a:p>
-          <a:p>
-            <a:pPr marL="342900" marR="0" lvl="0" indent="-342900" algn="r" defTabSz="914400" rtl="0" eaLnBrk="1" fontAlgn="auto" latinLnBrk="0" hangingPunct="1">
-              <a:lnSpc>
-                <a:spcPct val="100000"/>
-              </a:lnSpc>
-              <a:spcBef>
-                <a:spcPct val="20000"/>
-              </a:spcBef>
-              <a:spcAft>
-                <a:spcPts val="0"/>
-              </a:spcAft>
-              <a:buClrTx/>
-              <a:buSzTx/>
-              <a:tabLst/>
-              <a:defRPr/>
-            </a:pPr>
-            <a:r>
-              <a:rPr kumimoji="0" lang="en-US" sz="1600" b="0" i="0" u="none" strike="noStrike" kern="1200" cap="none" spc="0" normalizeH="0" baseline="0" noProof="0" dirty="0" smtClean="0">
-                <a:ln>
-                  <a:noFill/>
-                </a:ln>
-                <a:solidFill>
-                  <a:schemeClr val="tx1"/>
-                </a:solidFill>
-                <a:effectLst/>
-                <a:uLnTx/>
-                <a:uFillTx/>
-                <a:latin typeface="Cambria" pitchFamily="18" charset="0"/>
-                <a:ea typeface="+mn-ea"/>
-                <a:cs typeface="+mn-cs"/>
-              </a:rPr>
-              <a:t>email: </a:t>
-            </a:r>
-            <a:r>
-              <a:rPr kumimoji="0" lang="en-US" sz="1600" b="0" i="0" u="none" strike="noStrike" kern="1200" cap="none" spc="0" normalizeH="0" baseline="0" noProof="0" dirty="0" smtClean="0">
-                <a:ln>
-                  <a:noFill/>
-                </a:ln>
-                <a:solidFill>
-                  <a:schemeClr val="tx1"/>
-                </a:solidFill>
-                <a:effectLst/>
-                <a:uLnTx/>
-                <a:uFillTx/>
-                <a:latin typeface="Cambria" pitchFamily="18" charset="0"/>
-                <a:ea typeface="+mn-ea"/>
-                <a:cs typeface="+mn-cs"/>
-                <a:hlinkClick r:id="rId2"/>
-              </a:rPr>
-              <a:t>proffraja@gmail.com</a:t>
-            </a:r>
-            <a:endParaRPr lang="en-US" sz="1600" dirty="0" smtClean="0">
-              <a:latin typeface="Cambria" pitchFamily="18" charset="0"/>
-            </a:endParaRPr>
-          </a:p>
-          <a:p>
-            <a:pPr marL="342900" marR="0" lvl="0" indent="-342900" algn="r" defTabSz="914400" rtl="0" eaLnBrk="1" fontAlgn="auto" latinLnBrk="0" hangingPunct="1">
-              <a:lnSpc>
-                <a:spcPct val="100000"/>
-              </a:lnSpc>
-              <a:spcBef>
-                <a:spcPct val="20000"/>
-              </a:spcBef>
-              <a:spcAft>
-                <a:spcPts val="0"/>
-              </a:spcAft>
-              <a:buClrTx/>
-              <a:buSzTx/>
-              <a:tabLst/>
-              <a:defRPr/>
-            </a:pPr>
-            <a:r>
-              <a:rPr lang="en-US" sz="1600" dirty="0" err="1" smtClean="0">
-                <a:latin typeface="Cambria" pitchFamily="18" charset="0"/>
-              </a:rPr>
-              <a:t>Github:</a:t>
-            </a:r>
-            <a:r>
-              <a:rPr lang="en-US" sz="1600" dirty="0" err="1" smtClean="0">
-                <a:latin typeface="Cambria" pitchFamily="18" charset="0"/>
-                <a:hlinkClick r:id="rId3"/>
-              </a:rPr>
-              <a:t>www.github.com</a:t>
-            </a:r>
-            <a:r>
-              <a:rPr lang="en-US" sz="1600" dirty="0" smtClean="0">
-                <a:latin typeface="Cambria" pitchFamily="18" charset="0"/>
-                <a:hlinkClick r:id="rId3"/>
-              </a:rPr>
-              <a:t>/</a:t>
-            </a:r>
-            <a:r>
-              <a:rPr lang="en-US" sz="1600" dirty="0" err="1" smtClean="0">
-                <a:latin typeface="Cambria" pitchFamily="18" charset="0"/>
-                <a:hlinkClick r:id="rId3"/>
-              </a:rPr>
-              <a:t>rajasekaranap</a:t>
-            </a:r>
-            <a:endParaRPr lang="en-US" sz="1600" dirty="0" smtClean="0">
-              <a:latin typeface="Cambria" pitchFamily="18" charset="0"/>
-            </a:endParaRPr>
-          </a:p>
-          <a:p>
-            <a:pPr marL="342900" marR="0" lvl="0" indent="-342900" algn="r" defTabSz="914400" rtl="0" eaLnBrk="1" fontAlgn="auto" latinLnBrk="0" hangingPunct="1">
-              <a:lnSpc>
-                <a:spcPct val="100000"/>
-              </a:lnSpc>
-              <a:spcBef>
-                <a:spcPct val="20000"/>
-              </a:spcBef>
-              <a:spcAft>
-                <a:spcPts val="0"/>
-              </a:spcAft>
-              <a:buClrTx/>
-              <a:buSzTx/>
-              <a:tabLst/>
-              <a:defRPr/>
-            </a:pPr>
-            <a:endParaRPr lang="en-US" sz="1600" dirty="0" smtClean="0">
-              <a:latin typeface="Cambria" pitchFamily="18" charset="0"/>
-            </a:endParaRPr>
+            <a:r>
+              <a:rPr lang="en-US" dirty="0" smtClean="0"/>
+              <a:t>It occupies 17 % of area in the world</a:t>
+            </a:r>
+          </a:p>
+          <a:p>
+            <a:r>
+              <a:rPr lang="en-US" dirty="0" smtClean="0"/>
+              <a:t>It has extreme low rainfall.</a:t>
+            </a:r>
+          </a:p>
+          <a:p>
+            <a:r>
+              <a:rPr lang="en-US" dirty="0" smtClean="0"/>
+              <a:t> The region receives less than 25 cm rainfall in a year is classified as desert.</a:t>
+            </a:r>
+          </a:p>
+          <a:p>
+            <a:r>
+              <a:rPr lang="en-US" dirty="0" smtClean="0"/>
+              <a:t>Example</a:t>
+            </a:r>
+          </a:p>
+          <a:p>
+            <a:pPr lvl="1"/>
+            <a:r>
+              <a:rPr lang="en-US" dirty="0" smtClean="0"/>
+              <a:t>Sahara – Africa</a:t>
+            </a:r>
+          </a:p>
+          <a:p>
+            <a:pPr lvl="1"/>
+            <a:r>
+              <a:rPr lang="en-US" dirty="0" err="1" smtClean="0"/>
+              <a:t>Thar</a:t>
+            </a:r>
+            <a:r>
+              <a:rPr lang="en-US" dirty="0" smtClean="0"/>
+              <a:t> – India</a:t>
+            </a:r>
+          </a:p>
+          <a:p>
+            <a:pPr lvl="1"/>
+            <a:r>
+              <a:rPr lang="en-US" dirty="0" smtClean="0"/>
+              <a:t>Gobi - China</a:t>
+            </a:r>
           </a:p>
         </p:txBody>
       </p:sp>
@@ -29755,13 +29477,1139 @@
   <p:clrMapOvr>
     <a:masterClrMapping/>
   </p:clrMapOvr>
-  <p:timing>
-    <p:tnLst>
-      <p:par>
-        <p:cTn id="1" dur="indefinite" restart="never" nodeType="tmRoot"/>
-      </p:par>
-    </p:tnLst>
-  </p:timing>
+</p:sld>
+</file>
+
+<file path=ppt/slides/slide61.xml><?xml version="1.0" encoding="utf-8"?>
+<p:sld xmlns:a="http://schemas.openxmlformats.org/drawingml/2006/main" xmlns:r="http://schemas.openxmlformats.org/officeDocument/2006/relationships" xmlns:p="http://schemas.openxmlformats.org/presentationml/2006/main">
+  <p:cSld>
+    <p:spTree>
+      <p:nvGrpSpPr>
+        <p:cNvPr id="1" name=""/>
+        <p:cNvGrpSpPr/>
+        <p:nvPr/>
+      </p:nvGrpSpPr>
+      <p:grpSpPr>
+        <a:xfrm>
+          <a:off x="0" y="0"/>
+          <a:ext cx="0" cy="0"/>
+          <a:chOff x="0" y="0"/>
+          <a:chExt cx="0" cy="0"/>
+        </a:xfrm>
+      </p:grpSpPr>
+      <p:sp>
+        <p:nvSpPr>
+          <p:cNvPr id="2" name="Title 1"/>
+          <p:cNvSpPr>
+            <a:spLocks noGrp="1"/>
+          </p:cNvSpPr>
+          <p:nvPr>
+            <p:ph type="title"/>
+          </p:nvPr>
+        </p:nvSpPr>
+        <p:spPr/>
+        <p:txBody>
+          <a:bodyPr/>
+          <a:lstStyle/>
+          <a:p>
+            <a:r>
+              <a:rPr lang="en-US" dirty="0" smtClean="0"/>
+              <a:t>Desert Ecosystem</a:t>
+            </a:r>
+            <a:endParaRPr lang="en-US" dirty="0"/>
+          </a:p>
+        </p:txBody>
+      </p:sp>
+      <p:sp>
+        <p:nvSpPr>
+          <p:cNvPr id="3" name="Content Placeholder 2"/>
+          <p:cNvSpPr>
+            <a:spLocks noGrp="1"/>
+          </p:cNvSpPr>
+          <p:nvPr>
+            <p:ph idx="1"/>
+          </p:nvPr>
+        </p:nvSpPr>
+        <p:spPr/>
+        <p:txBody>
+          <a:bodyPr>
+            <a:normAutofit/>
+          </a:bodyPr>
+          <a:lstStyle/>
+          <a:p>
+            <a:r>
+              <a:rPr lang="en-US" dirty="0" smtClean="0"/>
+              <a:t>Characteristics</a:t>
+            </a:r>
+          </a:p>
+          <a:p>
+            <a:pPr lvl="1"/>
+            <a:r>
+              <a:rPr lang="en-US" dirty="0" smtClean="0"/>
+              <a:t>Dry and climate is hot</a:t>
+            </a:r>
+          </a:p>
+          <a:p>
+            <a:pPr lvl="1"/>
+            <a:r>
+              <a:rPr lang="en-US" dirty="0" smtClean="0"/>
+              <a:t>Very large variations in diurnal (Daily variations) temperatures 5 to 10 digress.</a:t>
+            </a:r>
+          </a:p>
+          <a:p>
+            <a:pPr lvl="1"/>
+            <a:r>
+              <a:rPr lang="en-US" dirty="0" smtClean="0"/>
+              <a:t>Soil contain poor organic mater</a:t>
+            </a:r>
+          </a:p>
+          <a:p>
+            <a:pPr lvl="1"/>
+            <a:r>
+              <a:rPr lang="en-US" dirty="0" smtClean="0"/>
+              <a:t>Very less vegetation.</a:t>
+            </a:r>
+          </a:p>
+          <a:p>
+            <a:pPr lvl="1"/>
+            <a:r>
+              <a:rPr lang="en-US" dirty="0" smtClean="0"/>
+              <a:t>Annual rainfall is less than 25 cm.  </a:t>
+            </a:r>
+          </a:p>
+        </p:txBody>
+      </p:sp>
+    </p:spTree>
+  </p:cSld>
+  <p:clrMapOvr>
+    <a:masterClrMapping/>
+  </p:clrMapOvr>
+</p:sld>
+</file>
+
+<file path=ppt/slides/slide62.xml><?xml version="1.0" encoding="utf-8"?>
+<p:sld xmlns:a="http://schemas.openxmlformats.org/drawingml/2006/main" xmlns:r="http://schemas.openxmlformats.org/officeDocument/2006/relationships" xmlns:p="http://schemas.openxmlformats.org/presentationml/2006/main">
+  <p:cSld>
+    <p:spTree>
+      <p:nvGrpSpPr>
+        <p:cNvPr id="1" name=""/>
+        <p:cNvGrpSpPr/>
+        <p:nvPr/>
+      </p:nvGrpSpPr>
+      <p:grpSpPr>
+        <a:xfrm>
+          <a:off x="0" y="0"/>
+          <a:ext cx="0" cy="0"/>
+          <a:chOff x="0" y="0"/>
+          <a:chExt cx="0" cy="0"/>
+        </a:xfrm>
+      </p:grpSpPr>
+      <p:sp>
+        <p:nvSpPr>
+          <p:cNvPr id="2" name="Title 1"/>
+          <p:cNvSpPr>
+            <a:spLocks noGrp="1"/>
+          </p:cNvSpPr>
+          <p:nvPr>
+            <p:ph type="title"/>
+          </p:nvPr>
+        </p:nvSpPr>
+        <p:spPr/>
+        <p:txBody>
+          <a:bodyPr/>
+          <a:lstStyle/>
+          <a:p>
+            <a:r>
+              <a:rPr lang="en-US" dirty="0" smtClean="0"/>
+              <a:t>Structure of Desert Ecosystem</a:t>
+            </a:r>
+            <a:endParaRPr lang="en-US" dirty="0"/>
+          </a:p>
+        </p:txBody>
+      </p:sp>
+      <p:sp>
+        <p:nvSpPr>
+          <p:cNvPr id="3" name="Content Placeholder 2"/>
+          <p:cNvSpPr>
+            <a:spLocks noGrp="1"/>
+          </p:cNvSpPr>
+          <p:nvPr>
+            <p:ph idx="1"/>
+          </p:nvPr>
+        </p:nvSpPr>
+        <p:spPr/>
+        <p:txBody>
+          <a:bodyPr>
+            <a:normAutofit lnSpcReduction="10000"/>
+          </a:bodyPr>
+          <a:lstStyle/>
+          <a:p>
+            <a:r>
+              <a:rPr lang="en-US" dirty="0" err="1" smtClean="0"/>
+              <a:t>Abiotic</a:t>
+            </a:r>
+            <a:r>
+              <a:rPr lang="en-US" dirty="0" smtClean="0"/>
+              <a:t> Components</a:t>
+            </a:r>
+          </a:p>
+          <a:p>
+            <a:pPr lvl="1"/>
+            <a:r>
+              <a:rPr lang="en-US" dirty="0" smtClean="0"/>
+              <a:t>Dry soil</a:t>
+            </a:r>
+          </a:p>
+          <a:p>
+            <a:pPr lvl="1"/>
+            <a:r>
+              <a:rPr lang="en-US" dirty="0" smtClean="0"/>
+              <a:t>Low rainfall</a:t>
+            </a:r>
+          </a:p>
+          <a:p>
+            <a:pPr lvl="1"/>
+            <a:r>
+              <a:rPr lang="en-US" dirty="0" smtClean="0"/>
+              <a:t>High temperature</a:t>
+            </a:r>
+          </a:p>
+          <a:p>
+            <a:r>
+              <a:rPr lang="en-US" dirty="0" smtClean="0"/>
+              <a:t>Biotic Components</a:t>
+            </a:r>
+          </a:p>
+          <a:p>
+            <a:pPr lvl="1"/>
+            <a:r>
+              <a:rPr lang="en-US" dirty="0" smtClean="0"/>
+              <a:t>Producers</a:t>
+            </a:r>
+          </a:p>
+          <a:p>
+            <a:pPr lvl="2"/>
+            <a:r>
+              <a:rPr lang="en-US" dirty="0" smtClean="0"/>
+              <a:t>Some grasses</a:t>
+            </a:r>
+          </a:p>
+          <a:p>
+            <a:pPr lvl="2"/>
+            <a:r>
+              <a:rPr lang="en-US" dirty="0" smtClean="0"/>
+              <a:t>Some shrubs</a:t>
+            </a:r>
+          </a:p>
+          <a:p>
+            <a:pPr lvl="2"/>
+            <a:r>
+              <a:rPr lang="en-US" dirty="0" smtClean="0"/>
+              <a:t>Bushes and very few trees. </a:t>
+            </a:r>
+          </a:p>
+          <a:p>
+            <a:endParaRPr lang="en-US" dirty="0" smtClean="0"/>
+          </a:p>
+          <a:p>
+            <a:endParaRPr lang="en-US" dirty="0" smtClean="0"/>
+          </a:p>
+        </p:txBody>
+      </p:sp>
+    </p:spTree>
+  </p:cSld>
+  <p:clrMapOvr>
+    <a:masterClrMapping/>
+  </p:clrMapOvr>
+</p:sld>
+</file>
+
+<file path=ppt/slides/slide63.xml><?xml version="1.0" encoding="utf-8"?>
+<p:sld xmlns:a="http://schemas.openxmlformats.org/drawingml/2006/main" xmlns:r="http://schemas.openxmlformats.org/officeDocument/2006/relationships" xmlns:p="http://schemas.openxmlformats.org/presentationml/2006/main">
+  <p:cSld>
+    <p:spTree>
+      <p:nvGrpSpPr>
+        <p:cNvPr id="1" name=""/>
+        <p:cNvGrpSpPr/>
+        <p:nvPr/>
+      </p:nvGrpSpPr>
+      <p:grpSpPr>
+        <a:xfrm>
+          <a:off x="0" y="0"/>
+          <a:ext cx="0" cy="0"/>
+          <a:chOff x="0" y="0"/>
+          <a:chExt cx="0" cy="0"/>
+        </a:xfrm>
+      </p:grpSpPr>
+      <p:sp>
+        <p:nvSpPr>
+          <p:cNvPr id="2" name="Title 1"/>
+          <p:cNvSpPr>
+            <a:spLocks noGrp="1"/>
+          </p:cNvSpPr>
+          <p:nvPr>
+            <p:ph type="title"/>
+          </p:nvPr>
+        </p:nvSpPr>
+        <p:spPr/>
+        <p:txBody>
+          <a:bodyPr/>
+          <a:lstStyle/>
+          <a:p>
+            <a:r>
+              <a:rPr lang="en-US" dirty="0" smtClean="0"/>
+              <a:t>Structure of Desert Ecosystem</a:t>
+            </a:r>
+            <a:endParaRPr lang="en-US" dirty="0"/>
+          </a:p>
+        </p:txBody>
+      </p:sp>
+      <p:sp>
+        <p:nvSpPr>
+          <p:cNvPr id="3" name="Content Placeholder 2"/>
+          <p:cNvSpPr>
+            <a:spLocks noGrp="1"/>
+          </p:cNvSpPr>
+          <p:nvPr>
+            <p:ph idx="1"/>
+          </p:nvPr>
+        </p:nvSpPr>
+        <p:spPr/>
+        <p:txBody>
+          <a:bodyPr>
+            <a:normAutofit/>
+          </a:bodyPr>
+          <a:lstStyle/>
+          <a:p>
+            <a:r>
+              <a:rPr lang="en-US" dirty="0" smtClean="0"/>
+              <a:t>Biotic Components</a:t>
+            </a:r>
+          </a:p>
+          <a:p>
+            <a:pPr lvl="1"/>
+            <a:r>
+              <a:rPr lang="en-US" dirty="0" smtClean="0"/>
+              <a:t>Consumers</a:t>
+            </a:r>
+          </a:p>
+          <a:p>
+            <a:pPr lvl="2"/>
+            <a:r>
+              <a:rPr lang="en-US" dirty="0" smtClean="0"/>
+              <a:t>Primary</a:t>
+            </a:r>
+          </a:p>
+          <a:p>
+            <a:pPr lvl="3"/>
+            <a:r>
+              <a:rPr lang="en-US" dirty="0" smtClean="0"/>
+              <a:t>Insects, Mice, Rabbits, Reptile</a:t>
+            </a:r>
+          </a:p>
+          <a:p>
+            <a:pPr lvl="2"/>
+            <a:r>
+              <a:rPr lang="en-US" dirty="0" smtClean="0"/>
+              <a:t>Secondary</a:t>
+            </a:r>
+          </a:p>
+          <a:p>
+            <a:pPr lvl="3"/>
+            <a:r>
+              <a:rPr lang="en-US" dirty="0" smtClean="0"/>
+              <a:t>Lizards, Darkling Beetle</a:t>
+            </a:r>
+          </a:p>
+          <a:p>
+            <a:pPr lvl="2"/>
+            <a:r>
+              <a:rPr lang="en-US" dirty="0" smtClean="0"/>
+              <a:t>Tertiary</a:t>
+            </a:r>
+          </a:p>
+          <a:p>
+            <a:pPr lvl="3"/>
+            <a:r>
+              <a:rPr lang="en-US" dirty="0" smtClean="0"/>
+              <a:t>Eagles, Owls, Agaves</a:t>
+            </a:r>
+          </a:p>
+          <a:p>
+            <a:pPr lvl="1"/>
+            <a:r>
+              <a:rPr lang="en-US" dirty="0" smtClean="0"/>
+              <a:t>Decomposers</a:t>
+            </a:r>
+          </a:p>
+          <a:p>
+            <a:pPr lvl="2"/>
+            <a:r>
+              <a:rPr lang="en-US" dirty="0" smtClean="0"/>
+              <a:t>Bacteria and Fungi </a:t>
+            </a:r>
+          </a:p>
+          <a:p>
+            <a:pPr lvl="3"/>
+            <a:endParaRPr lang="en-US" dirty="0" smtClean="0"/>
+          </a:p>
+          <a:p>
+            <a:endParaRPr lang="en-US" dirty="0" smtClean="0"/>
+          </a:p>
+          <a:p>
+            <a:endParaRPr lang="en-US" dirty="0" smtClean="0"/>
+          </a:p>
+        </p:txBody>
+      </p:sp>
+    </p:spTree>
+  </p:cSld>
+  <p:clrMapOvr>
+    <a:masterClrMapping/>
+  </p:clrMapOvr>
+</p:sld>
+</file>
+
+<file path=ppt/slides/slide64.xml><?xml version="1.0" encoding="utf-8"?>
+<p:sld xmlns:a="http://schemas.openxmlformats.org/drawingml/2006/main" xmlns:r="http://schemas.openxmlformats.org/officeDocument/2006/relationships" xmlns:p="http://schemas.openxmlformats.org/presentationml/2006/main">
+  <p:cSld>
+    <p:spTree>
+      <p:nvGrpSpPr>
+        <p:cNvPr id="1" name=""/>
+        <p:cNvGrpSpPr/>
+        <p:nvPr/>
+      </p:nvGrpSpPr>
+      <p:grpSpPr>
+        <a:xfrm>
+          <a:off x="0" y="0"/>
+          <a:ext cx="0" cy="0"/>
+          <a:chOff x="0" y="0"/>
+          <a:chExt cx="0" cy="0"/>
+        </a:xfrm>
+      </p:grpSpPr>
+      <p:sp>
+        <p:nvSpPr>
+          <p:cNvPr id="2" name="Title 1"/>
+          <p:cNvSpPr>
+            <a:spLocks noGrp="1"/>
+          </p:cNvSpPr>
+          <p:nvPr>
+            <p:ph type="title"/>
+          </p:nvPr>
+        </p:nvSpPr>
+        <p:spPr/>
+        <p:txBody>
+          <a:bodyPr/>
+          <a:lstStyle/>
+          <a:p>
+            <a:r>
+              <a:rPr lang="en-US" dirty="0" smtClean="0"/>
+              <a:t>Desert Ecosystem</a:t>
+            </a:r>
+            <a:endParaRPr lang="en-US" dirty="0"/>
+          </a:p>
+        </p:txBody>
+      </p:sp>
+      <p:sp>
+        <p:nvSpPr>
+          <p:cNvPr id="3" name="Content Placeholder 2"/>
+          <p:cNvSpPr>
+            <a:spLocks noGrp="1"/>
+          </p:cNvSpPr>
+          <p:nvPr>
+            <p:ph idx="1"/>
+          </p:nvPr>
+        </p:nvSpPr>
+        <p:spPr/>
+        <p:txBody>
+          <a:bodyPr>
+            <a:normAutofit/>
+          </a:bodyPr>
+          <a:lstStyle/>
+          <a:p>
+            <a:r>
+              <a:rPr lang="en-US" dirty="0" smtClean="0"/>
+              <a:t>Food Chain</a:t>
+            </a:r>
+          </a:p>
+          <a:p>
+            <a:pPr lvl="1"/>
+            <a:r>
+              <a:rPr lang="en-US" dirty="0" smtClean="0"/>
+              <a:t>Shrubs or grass or trees </a:t>
+            </a:r>
+            <a:r>
+              <a:rPr lang="en-US" dirty="0" smtClean="0">
+                <a:sym typeface="Wingdings" pitchFamily="2" charset="2"/>
+              </a:rPr>
+              <a:t>Insects Lizards Eagles</a:t>
+            </a:r>
+          </a:p>
+          <a:p>
+            <a:r>
+              <a:rPr lang="en-US" dirty="0" smtClean="0">
+                <a:sym typeface="Wingdings" pitchFamily="2" charset="2"/>
+              </a:rPr>
+              <a:t>Functions</a:t>
+            </a:r>
+          </a:p>
+          <a:p>
+            <a:pPr lvl="1"/>
+            <a:r>
+              <a:rPr lang="en-US" dirty="0" smtClean="0">
+                <a:sym typeface="Wingdings" pitchFamily="2" charset="2"/>
+              </a:rPr>
+              <a:t>Desert land is low in nutrients so not many plant lives.</a:t>
+            </a:r>
+          </a:p>
+          <a:p>
+            <a:pPr lvl="1"/>
+            <a:r>
+              <a:rPr lang="en-US" dirty="0" smtClean="0">
+                <a:sym typeface="Wingdings" pitchFamily="2" charset="2"/>
+              </a:rPr>
+              <a:t>Soil has micro and macronutrients</a:t>
+            </a:r>
+          </a:p>
+          <a:p>
+            <a:pPr lvl="1"/>
+            <a:r>
+              <a:rPr lang="en-US" dirty="0" smtClean="0">
+                <a:sym typeface="Wingdings" pitchFamily="2" charset="2"/>
+              </a:rPr>
+              <a:t>Deserts are less in water hence cannot be easily accessible for over exploitation. </a:t>
+            </a:r>
+            <a:endParaRPr lang="en-US" dirty="0" smtClean="0"/>
+          </a:p>
+        </p:txBody>
+      </p:sp>
+    </p:spTree>
+  </p:cSld>
+  <p:clrMapOvr>
+    <a:masterClrMapping/>
+  </p:clrMapOvr>
+</p:sld>
+</file>
+
+<file path=ppt/slides/slide65.xml><?xml version="1.0" encoding="utf-8"?>
+<p:sld xmlns:a="http://schemas.openxmlformats.org/drawingml/2006/main" xmlns:r="http://schemas.openxmlformats.org/officeDocument/2006/relationships" xmlns:p="http://schemas.openxmlformats.org/presentationml/2006/main">
+  <p:cSld>
+    <p:spTree>
+      <p:nvGrpSpPr>
+        <p:cNvPr id="1" name=""/>
+        <p:cNvGrpSpPr/>
+        <p:nvPr/>
+      </p:nvGrpSpPr>
+      <p:grpSpPr>
+        <a:xfrm>
+          <a:off x="0" y="0"/>
+          <a:ext cx="0" cy="0"/>
+          <a:chOff x="0" y="0"/>
+          <a:chExt cx="0" cy="0"/>
+        </a:xfrm>
+      </p:grpSpPr>
+      <p:sp>
+        <p:nvSpPr>
+          <p:cNvPr id="2" name="Title 1"/>
+          <p:cNvSpPr>
+            <a:spLocks noGrp="1"/>
+          </p:cNvSpPr>
+          <p:nvPr>
+            <p:ph type="title"/>
+          </p:nvPr>
+        </p:nvSpPr>
+        <p:spPr/>
+        <p:txBody>
+          <a:bodyPr/>
+          <a:lstStyle/>
+          <a:p>
+            <a:r>
+              <a:rPr lang="en-US" dirty="0" smtClean="0"/>
+              <a:t>Aquatic Ecosystem</a:t>
+            </a:r>
+            <a:endParaRPr lang="en-US" dirty="0"/>
+          </a:p>
+        </p:txBody>
+      </p:sp>
+      <p:sp>
+        <p:nvSpPr>
+          <p:cNvPr id="3" name="Content Placeholder 2"/>
+          <p:cNvSpPr>
+            <a:spLocks noGrp="1"/>
+          </p:cNvSpPr>
+          <p:nvPr>
+            <p:ph idx="1"/>
+          </p:nvPr>
+        </p:nvSpPr>
+        <p:spPr/>
+        <p:txBody>
+          <a:bodyPr>
+            <a:normAutofit lnSpcReduction="10000"/>
+          </a:bodyPr>
+          <a:lstStyle/>
+          <a:p>
+            <a:r>
+              <a:rPr lang="en-US" dirty="0" smtClean="0"/>
+              <a:t>It occupies 70 % of world.</a:t>
+            </a:r>
+          </a:p>
+          <a:p>
+            <a:r>
+              <a:rPr lang="en-US" dirty="0" smtClean="0"/>
+              <a:t>It helps cycling of chemical substances and influences the growth and activities of terrestrial ecosystem.</a:t>
+            </a:r>
+          </a:p>
+          <a:p>
+            <a:pPr lvl="1"/>
+            <a:r>
+              <a:rPr lang="en-US" dirty="0" smtClean="0"/>
+              <a:t>Pond Ecosystem</a:t>
+            </a:r>
+          </a:p>
+          <a:p>
+            <a:pPr lvl="1"/>
+            <a:r>
+              <a:rPr lang="en-US" dirty="0" smtClean="0"/>
+              <a:t>Lake Ecosystem</a:t>
+            </a:r>
+          </a:p>
+          <a:p>
+            <a:pPr lvl="1"/>
+            <a:r>
+              <a:rPr lang="en-US" dirty="0" smtClean="0"/>
+              <a:t>River Ecosystem</a:t>
+            </a:r>
+          </a:p>
+          <a:p>
+            <a:pPr lvl="1"/>
+            <a:r>
+              <a:rPr lang="en-US" dirty="0" smtClean="0"/>
+              <a:t>Ocean Ecosystem</a:t>
+            </a:r>
+          </a:p>
+          <a:p>
+            <a:pPr lvl="1"/>
+            <a:r>
+              <a:rPr lang="en-US" dirty="0" smtClean="0"/>
+              <a:t>Estuarine Ecosystem </a:t>
+            </a:r>
+            <a:endParaRPr lang="en-US" dirty="0"/>
+          </a:p>
+        </p:txBody>
+      </p:sp>
+    </p:spTree>
+  </p:cSld>
+  <p:clrMapOvr>
+    <a:masterClrMapping/>
+  </p:clrMapOvr>
+</p:sld>
+</file>
+
+<file path=ppt/slides/slide66.xml><?xml version="1.0" encoding="utf-8"?>
+<p:sld xmlns:a="http://schemas.openxmlformats.org/drawingml/2006/main" xmlns:r="http://schemas.openxmlformats.org/officeDocument/2006/relationships" xmlns:p="http://schemas.openxmlformats.org/presentationml/2006/main">
+  <p:cSld>
+    <p:spTree>
+      <p:nvGrpSpPr>
+        <p:cNvPr id="1" name=""/>
+        <p:cNvGrpSpPr/>
+        <p:nvPr/>
+      </p:nvGrpSpPr>
+      <p:grpSpPr>
+        <a:xfrm>
+          <a:off x="0" y="0"/>
+          <a:ext cx="0" cy="0"/>
+          <a:chOff x="0" y="0"/>
+          <a:chExt cx="0" cy="0"/>
+        </a:xfrm>
+      </p:grpSpPr>
+      <p:sp>
+        <p:nvSpPr>
+          <p:cNvPr id="2" name="Title 1"/>
+          <p:cNvSpPr>
+            <a:spLocks noGrp="1"/>
+          </p:cNvSpPr>
+          <p:nvPr>
+            <p:ph type="title"/>
+          </p:nvPr>
+        </p:nvSpPr>
+        <p:spPr/>
+        <p:txBody>
+          <a:bodyPr/>
+          <a:lstStyle/>
+          <a:p>
+            <a:r>
+              <a:rPr lang="en-US" dirty="0" smtClean="0"/>
+              <a:t>Pond Ecosystem</a:t>
+            </a:r>
+            <a:endParaRPr lang="en-US" dirty="0"/>
+          </a:p>
+        </p:txBody>
+      </p:sp>
+      <p:sp>
+        <p:nvSpPr>
+          <p:cNvPr id="3" name="Content Placeholder 2"/>
+          <p:cNvSpPr>
+            <a:spLocks noGrp="1"/>
+          </p:cNvSpPr>
+          <p:nvPr>
+            <p:ph idx="1"/>
+          </p:nvPr>
+        </p:nvSpPr>
+        <p:spPr/>
+        <p:txBody>
+          <a:bodyPr/>
+          <a:lstStyle/>
+          <a:p>
+            <a:r>
+              <a:rPr lang="en-US" dirty="0" smtClean="0"/>
+              <a:t>It is a fresh water ecosystem.</a:t>
+            </a:r>
+          </a:p>
+          <a:p>
+            <a:r>
+              <a:rPr lang="en-US" dirty="0" smtClean="0"/>
+              <a:t>It receives enough water during rainy season.</a:t>
+            </a:r>
+          </a:p>
+          <a:p>
+            <a:r>
+              <a:rPr lang="en-US" dirty="0" smtClean="0"/>
+              <a:t>Characteristics</a:t>
+            </a:r>
+          </a:p>
+          <a:p>
+            <a:pPr lvl="1"/>
+            <a:r>
+              <a:rPr lang="en-US" dirty="0" smtClean="0"/>
+              <a:t>Stagnant fresh water.</a:t>
+            </a:r>
+          </a:p>
+          <a:p>
+            <a:pPr lvl="1"/>
+            <a:r>
+              <a:rPr lang="en-US" dirty="0" smtClean="0"/>
+              <a:t>Temporary or only seasonal.</a:t>
+            </a:r>
+            <a:endParaRPr lang="en-US" dirty="0"/>
+          </a:p>
+        </p:txBody>
+      </p:sp>
+    </p:spTree>
+  </p:cSld>
+  <p:clrMapOvr>
+    <a:masterClrMapping/>
+  </p:clrMapOvr>
+</p:sld>
+</file>
+
+<file path=ppt/slides/slide67.xml><?xml version="1.0" encoding="utf-8"?>
+<p:sld xmlns:a="http://schemas.openxmlformats.org/drawingml/2006/main" xmlns:r="http://schemas.openxmlformats.org/officeDocument/2006/relationships" xmlns:p="http://schemas.openxmlformats.org/presentationml/2006/main">
+  <p:cSld>
+    <p:spTree>
+      <p:nvGrpSpPr>
+        <p:cNvPr id="1" name=""/>
+        <p:cNvGrpSpPr/>
+        <p:nvPr/>
+      </p:nvGrpSpPr>
+      <p:grpSpPr>
+        <a:xfrm>
+          <a:off x="0" y="0"/>
+          <a:ext cx="0" cy="0"/>
+          <a:chOff x="0" y="0"/>
+          <a:chExt cx="0" cy="0"/>
+        </a:xfrm>
+      </p:grpSpPr>
+      <p:sp>
+        <p:nvSpPr>
+          <p:cNvPr id="2" name="Title 1"/>
+          <p:cNvSpPr>
+            <a:spLocks noGrp="1"/>
+          </p:cNvSpPr>
+          <p:nvPr>
+            <p:ph type="title"/>
+          </p:nvPr>
+        </p:nvSpPr>
+        <p:spPr/>
+        <p:txBody>
+          <a:bodyPr/>
+          <a:lstStyle/>
+          <a:p>
+            <a:r>
+              <a:rPr lang="en-US" dirty="0" smtClean="0"/>
+              <a:t>Pond Ecosystem</a:t>
+            </a:r>
+            <a:endParaRPr lang="en-US" dirty="0"/>
+          </a:p>
+        </p:txBody>
+      </p:sp>
+      <p:sp>
+        <p:nvSpPr>
+          <p:cNvPr id="3" name="Content Placeholder 2"/>
+          <p:cNvSpPr>
+            <a:spLocks noGrp="1"/>
+          </p:cNvSpPr>
+          <p:nvPr>
+            <p:ph idx="1"/>
+          </p:nvPr>
+        </p:nvSpPr>
+        <p:spPr/>
+        <p:txBody>
+          <a:bodyPr/>
+          <a:lstStyle/>
+          <a:p>
+            <a:r>
+              <a:rPr lang="en-US" dirty="0" err="1" smtClean="0"/>
+              <a:t>Abiotic</a:t>
+            </a:r>
+            <a:r>
+              <a:rPr lang="en-US" dirty="0" smtClean="0"/>
+              <a:t> Components</a:t>
+            </a:r>
+          </a:p>
+          <a:p>
+            <a:pPr lvl="1"/>
+            <a:r>
+              <a:rPr lang="en-US" dirty="0" smtClean="0"/>
+              <a:t>Temperature</a:t>
+            </a:r>
+          </a:p>
+          <a:p>
+            <a:pPr lvl="1"/>
+            <a:r>
+              <a:rPr lang="en-US" dirty="0" smtClean="0"/>
+              <a:t>pH</a:t>
+            </a:r>
+          </a:p>
+          <a:p>
+            <a:pPr lvl="1"/>
+            <a:r>
+              <a:rPr lang="en-US" dirty="0" smtClean="0"/>
+              <a:t>Light</a:t>
+            </a:r>
+          </a:p>
+          <a:p>
+            <a:pPr lvl="1"/>
+            <a:r>
+              <a:rPr lang="en-US" dirty="0" smtClean="0"/>
+              <a:t>Organic and Inorganic compounds</a:t>
+            </a:r>
+          </a:p>
+          <a:p>
+            <a:pPr lvl="1"/>
+            <a:r>
+              <a:rPr lang="en-US" dirty="0" smtClean="0"/>
+              <a:t>Portions and Lipids</a:t>
+            </a:r>
+          </a:p>
+          <a:p>
+            <a:pPr lvl="1"/>
+            <a:r>
+              <a:rPr lang="en-US" dirty="0" smtClean="0"/>
+              <a:t>Turbidity </a:t>
+            </a:r>
+          </a:p>
+        </p:txBody>
+      </p:sp>
+    </p:spTree>
+  </p:cSld>
+  <p:clrMapOvr>
+    <a:masterClrMapping/>
+  </p:clrMapOvr>
+</p:sld>
+</file>
+
+<file path=ppt/slides/slide68.xml><?xml version="1.0" encoding="utf-8"?>
+<p:sld xmlns:a="http://schemas.openxmlformats.org/drawingml/2006/main" xmlns:r="http://schemas.openxmlformats.org/officeDocument/2006/relationships" xmlns:p="http://schemas.openxmlformats.org/presentationml/2006/main">
+  <p:cSld>
+    <p:spTree>
+      <p:nvGrpSpPr>
+        <p:cNvPr id="1" name=""/>
+        <p:cNvGrpSpPr/>
+        <p:nvPr/>
+      </p:nvGrpSpPr>
+      <p:grpSpPr>
+        <a:xfrm>
+          <a:off x="0" y="0"/>
+          <a:ext cx="0" cy="0"/>
+          <a:chOff x="0" y="0"/>
+          <a:chExt cx="0" cy="0"/>
+        </a:xfrm>
+      </p:grpSpPr>
+      <p:sp>
+        <p:nvSpPr>
+          <p:cNvPr id="2" name="Title 1"/>
+          <p:cNvSpPr>
+            <a:spLocks noGrp="1"/>
+          </p:cNvSpPr>
+          <p:nvPr>
+            <p:ph type="title"/>
+          </p:nvPr>
+        </p:nvSpPr>
+        <p:spPr/>
+        <p:txBody>
+          <a:bodyPr/>
+          <a:lstStyle/>
+          <a:p>
+            <a:r>
+              <a:rPr lang="en-US" dirty="0" smtClean="0"/>
+              <a:t>Pond Ecosystem</a:t>
+            </a:r>
+            <a:endParaRPr lang="en-US" dirty="0"/>
+          </a:p>
+        </p:txBody>
+      </p:sp>
+      <p:sp>
+        <p:nvSpPr>
+          <p:cNvPr id="3" name="Content Placeholder 2"/>
+          <p:cNvSpPr>
+            <a:spLocks noGrp="1"/>
+          </p:cNvSpPr>
+          <p:nvPr>
+            <p:ph idx="1"/>
+          </p:nvPr>
+        </p:nvSpPr>
+        <p:spPr/>
+        <p:txBody>
+          <a:bodyPr/>
+          <a:lstStyle/>
+          <a:p>
+            <a:r>
+              <a:rPr lang="en-US" dirty="0" smtClean="0"/>
+              <a:t>Biotic Components</a:t>
+            </a:r>
+          </a:p>
+          <a:p>
+            <a:pPr lvl="1"/>
+            <a:r>
+              <a:rPr lang="en-US" dirty="0" smtClean="0"/>
+              <a:t>Producers</a:t>
+            </a:r>
+          </a:p>
+          <a:p>
+            <a:pPr lvl="2"/>
+            <a:r>
+              <a:rPr lang="en-US" dirty="0" smtClean="0"/>
+              <a:t>Rooted plants</a:t>
+            </a:r>
+          </a:p>
+          <a:p>
+            <a:pPr lvl="2"/>
+            <a:r>
+              <a:rPr lang="en-US" dirty="0" smtClean="0"/>
+              <a:t>Floating and suspended lower plants</a:t>
+            </a:r>
+          </a:p>
+          <a:p>
+            <a:pPr lvl="2"/>
+            <a:r>
+              <a:rPr lang="en-US" dirty="0" smtClean="0"/>
+              <a:t>Phytoplankton</a:t>
+            </a:r>
+          </a:p>
+          <a:p>
+            <a:pPr lvl="3"/>
+            <a:r>
+              <a:rPr lang="en-US" dirty="0" smtClean="0"/>
+              <a:t>Algae, </a:t>
+            </a:r>
+            <a:r>
+              <a:rPr lang="en-US" dirty="0" err="1" smtClean="0"/>
+              <a:t>Flagellies</a:t>
+            </a:r>
+            <a:r>
+              <a:rPr lang="en-US" dirty="0" smtClean="0"/>
+              <a:t>, </a:t>
+            </a:r>
+            <a:r>
+              <a:rPr lang="en-US" dirty="0" err="1" smtClean="0"/>
+              <a:t>Volvox</a:t>
+            </a:r>
+            <a:endParaRPr lang="en-US" dirty="0" smtClean="0"/>
+          </a:p>
+          <a:p>
+            <a:pPr lvl="2"/>
+            <a:r>
+              <a:rPr lang="en-US" dirty="0" err="1" smtClean="0"/>
+              <a:t>Microphytes</a:t>
+            </a:r>
+            <a:endParaRPr lang="en-US" dirty="0" smtClean="0"/>
+          </a:p>
+          <a:p>
+            <a:pPr lvl="3"/>
+            <a:r>
+              <a:rPr lang="en-US" dirty="0" err="1" smtClean="0"/>
+              <a:t>Hydrilla</a:t>
+            </a:r>
+            <a:r>
+              <a:rPr lang="en-US" dirty="0" smtClean="0"/>
+              <a:t>, </a:t>
+            </a:r>
+            <a:r>
+              <a:rPr lang="en-US" dirty="0" err="1" smtClean="0"/>
+              <a:t>Demna</a:t>
+            </a:r>
+            <a:endParaRPr lang="en-US" dirty="0" smtClean="0"/>
+          </a:p>
+        </p:txBody>
+      </p:sp>
+    </p:spTree>
+  </p:cSld>
+  <p:clrMapOvr>
+    <a:masterClrMapping/>
+  </p:clrMapOvr>
+</p:sld>
+</file>
+
+<file path=ppt/slides/slide69.xml><?xml version="1.0" encoding="utf-8"?>
+<p:sld xmlns:a="http://schemas.openxmlformats.org/drawingml/2006/main" xmlns:r="http://schemas.openxmlformats.org/officeDocument/2006/relationships" xmlns:p="http://schemas.openxmlformats.org/presentationml/2006/main">
+  <p:cSld>
+    <p:spTree>
+      <p:nvGrpSpPr>
+        <p:cNvPr id="1" name=""/>
+        <p:cNvGrpSpPr/>
+        <p:nvPr/>
+      </p:nvGrpSpPr>
+      <p:grpSpPr>
+        <a:xfrm>
+          <a:off x="0" y="0"/>
+          <a:ext cx="0" cy="0"/>
+          <a:chOff x="0" y="0"/>
+          <a:chExt cx="0" cy="0"/>
+        </a:xfrm>
+      </p:grpSpPr>
+      <p:sp>
+        <p:nvSpPr>
+          <p:cNvPr id="2" name="Title 1"/>
+          <p:cNvSpPr>
+            <a:spLocks noGrp="1"/>
+          </p:cNvSpPr>
+          <p:nvPr>
+            <p:ph type="title"/>
+          </p:nvPr>
+        </p:nvSpPr>
+        <p:spPr/>
+        <p:txBody>
+          <a:bodyPr/>
+          <a:lstStyle/>
+          <a:p>
+            <a:r>
+              <a:rPr lang="en-US" dirty="0" smtClean="0"/>
+              <a:t>Pond Ecosystem</a:t>
+            </a:r>
+            <a:endParaRPr lang="en-US" dirty="0"/>
+          </a:p>
+        </p:txBody>
+      </p:sp>
+      <p:sp>
+        <p:nvSpPr>
+          <p:cNvPr id="3" name="Content Placeholder 2"/>
+          <p:cNvSpPr>
+            <a:spLocks noGrp="1"/>
+          </p:cNvSpPr>
+          <p:nvPr>
+            <p:ph idx="1"/>
+          </p:nvPr>
+        </p:nvSpPr>
+        <p:spPr/>
+        <p:txBody>
+          <a:bodyPr>
+            <a:normAutofit fontScale="92500" lnSpcReduction="10000"/>
+          </a:bodyPr>
+          <a:lstStyle/>
+          <a:p>
+            <a:r>
+              <a:rPr lang="en-US" dirty="0" smtClean="0"/>
+              <a:t>Biotic Components</a:t>
+            </a:r>
+          </a:p>
+          <a:p>
+            <a:pPr lvl="1"/>
+            <a:r>
+              <a:rPr lang="en-US" dirty="0" smtClean="0"/>
+              <a:t>Consumers</a:t>
+            </a:r>
+          </a:p>
+          <a:p>
+            <a:pPr lvl="2"/>
+            <a:r>
+              <a:rPr lang="en-US" dirty="0" smtClean="0"/>
+              <a:t>Primary</a:t>
+            </a:r>
+          </a:p>
+          <a:p>
+            <a:pPr lvl="3"/>
+            <a:r>
+              <a:rPr lang="en-US" dirty="0" smtClean="0"/>
+              <a:t>Zooplankton</a:t>
+            </a:r>
+          </a:p>
+          <a:p>
+            <a:pPr lvl="3"/>
+            <a:r>
+              <a:rPr lang="en-US" dirty="0" smtClean="0"/>
+              <a:t>Protozoan's, ciliates</a:t>
+            </a:r>
+          </a:p>
+          <a:p>
+            <a:pPr lvl="2"/>
+            <a:r>
+              <a:rPr lang="en-US" dirty="0" smtClean="0"/>
+              <a:t>Secondary</a:t>
+            </a:r>
+          </a:p>
+          <a:p>
+            <a:pPr lvl="3"/>
+            <a:r>
+              <a:rPr lang="en-US" dirty="0" smtClean="0"/>
+              <a:t>Insects like water beetles</a:t>
+            </a:r>
+          </a:p>
+          <a:p>
+            <a:pPr lvl="3"/>
+            <a:r>
+              <a:rPr lang="en-US" dirty="0" smtClean="0"/>
+              <a:t>Small fish</a:t>
+            </a:r>
+          </a:p>
+          <a:p>
+            <a:pPr lvl="2"/>
+            <a:r>
+              <a:rPr lang="en-US" dirty="0" smtClean="0"/>
+              <a:t>Tertiary</a:t>
+            </a:r>
+          </a:p>
+          <a:p>
+            <a:pPr lvl="3"/>
+            <a:r>
+              <a:rPr lang="en-US" dirty="0" smtClean="0"/>
+              <a:t>Large fishes</a:t>
+            </a:r>
+          </a:p>
+          <a:p>
+            <a:pPr lvl="1"/>
+            <a:r>
+              <a:rPr lang="en-US" dirty="0" smtClean="0"/>
+              <a:t>Decomposers</a:t>
+            </a:r>
+          </a:p>
+          <a:p>
+            <a:pPr lvl="2"/>
+            <a:r>
+              <a:rPr lang="en-US" dirty="0" smtClean="0"/>
+              <a:t>Bacteria, Fungi, </a:t>
+            </a:r>
+            <a:r>
+              <a:rPr lang="en-US" dirty="0" err="1" smtClean="0"/>
+              <a:t>Actinomycetes</a:t>
+            </a:r>
+            <a:endParaRPr lang="en-US" dirty="0" smtClean="0"/>
+          </a:p>
+        </p:txBody>
+      </p:sp>
+    </p:spTree>
+  </p:cSld>
+  <p:clrMapOvr>
+    <a:masterClrMapping/>
+  </p:clrMapOvr>
 </p:sld>
 </file>
 
@@ -29929,6 +30777,475 @@
   <p:clrMapOvr>
     <a:masterClrMapping/>
   </p:clrMapOvr>
+</p:sld>
+</file>
+
+<file path=ppt/slides/slide70.xml><?xml version="1.0" encoding="utf-8"?>
+<p:sld xmlns:a="http://schemas.openxmlformats.org/drawingml/2006/main" xmlns:r="http://schemas.openxmlformats.org/officeDocument/2006/relationships" xmlns:p="http://schemas.openxmlformats.org/presentationml/2006/main">
+  <p:cSld>
+    <p:spTree>
+      <p:nvGrpSpPr>
+        <p:cNvPr id="1" name=""/>
+        <p:cNvGrpSpPr/>
+        <p:nvPr/>
+      </p:nvGrpSpPr>
+      <p:grpSpPr>
+        <a:xfrm>
+          <a:off x="0" y="0"/>
+          <a:ext cx="0" cy="0"/>
+          <a:chOff x="0" y="0"/>
+          <a:chExt cx="0" cy="0"/>
+        </a:xfrm>
+      </p:grpSpPr>
+      <p:sp>
+        <p:nvSpPr>
+          <p:cNvPr id="2" name="Title 1"/>
+          <p:cNvSpPr>
+            <a:spLocks noGrp="1"/>
+          </p:cNvSpPr>
+          <p:nvPr>
+            <p:ph type="title"/>
+          </p:nvPr>
+        </p:nvSpPr>
+        <p:spPr/>
+        <p:txBody>
+          <a:bodyPr/>
+          <a:lstStyle/>
+          <a:p>
+            <a:r>
+              <a:rPr lang="en-US" dirty="0" smtClean="0"/>
+              <a:t>Pond Ecosystem</a:t>
+            </a:r>
+            <a:endParaRPr lang="en-US" dirty="0"/>
+          </a:p>
+        </p:txBody>
+      </p:sp>
+      <p:sp>
+        <p:nvSpPr>
+          <p:cNvPr id="3" name="Content Placeholder 2"/>
+          <p:cNvSpPr>
+            <a:spLocks noGrp="1"/>
+          </p:cNvSpPr>
+          <p:nvPr>
+            <p:ph idx="1"/>
+          </p:nvPr>
+        </p:nvSpPr>
+        <p:spPr/>
+        <p:txBody>
+          <a:bodyPr/>
+          <a:lstStyle/>
+          <a:p>
+            <a:r>
+              <a:rPr lang="en-US" dirty="0" smtClean="0"/>
+              <a:t> Functions of pond ecosystem</a:t>
+            </a:r>
+          </a:p>
+          <a:p>
+            <a:pPr lvl="1"/>
+            <a:r>
+              <a:rPr lang="en-US" dirty="0" smtClean="0"/>
+              <a:t>It is resources for small water requirements and village forming.</a:t>
+            </a:r>
+          </a:p>
+          <a:p>
+            <a:pPr lvl="1"/>
+            <a:r>
+              <a:rPr lang="en-US" dirty="0" smtClean="0"/>
+              <a:t>It contains more algae, plants, animals and self </a:t>
+            </a:r>
+            <a:r>
+              <a:rPr lang="en-US" smtClean="0"/>
+              <a:t>sufficient ecosystem.</a:t>
+            </a:r>
+            <a:endParaRPr lang="en-US" dirty="0" smtClean="0"/>
+          </a:p>
+          <a:p>
+            <a:pPr lvl="1"/>
+            <a:endParaRPr lang="en-US" dirty="0"/>
+          </a:p>
+        </p:txBody>
+      </p:sp>
+    </p:spTree>
+  </p:cSld>
+  <p:clrMapOvr>
+    <a:masterClrMapping/>
+  </p:clrMapOvr>
+</p:sld>
+</file>
+
+<file path=ppt/slides/slide71.xml><?xml version="1.0" encoding="utf-8"?>
+<p:sld xmlns:a="http://schemas.openxmlformats.org/drawingml/2006/main" xmlns:r="http://schemas.openxmlformats.org/officeDocument/2006/relationships" xmlns:p="http://schemas.openxmlformats.org/presentationml/2006/main">
+  <p:cSld>
+    <p:spTree>
+      <p:nvGrpSpPr>
+        <p:cNvPr id="1" name=""/>
+        <p:cNvGrpSpPr/>
+        <p:nvPr/>
+      </p:nvGrpSpPr>
+      <p:grpSpPr>
+        <a:xfrm>
+          <a:off x="0" y="0"/>
+          <a:ext cx="0" cy="0"/>
+          <a:chOff x="0" y="0"/>
+          <a:chExt cx="0" cy="0"/>
+        </a:xfrm>
+      </p:grpSpPr>
+      <p:sp>
+        <p:nvSpPr>
+          <p:cNvPr id="2" name="Title 1"/>
+          <p:cNvSpPr>
+            <a:spLocks noGrp="1"/>
+          </p:cNvSpPr>
+          <p:nvPr>
+            <p:ph type="title"/>
+          </p:nvPr>
+        </p:nvSpPr>
+        <p:spPr>
+          <a:xfrm>
+            <a:off x="457200" y="1981200"/>
+            <a:ext cx="8229600" cy="1143000"/>
+          </a:xfrm>
+        </p:spPr>
+        <p:txBody>
+          <a:bodyPr/>
+          <a:lstStyle/>
+          <a:p>
+            <a:r>
+              <a:rPr lang="en-US" dirty="0" smtClean="0"/>
+              <a:t>Thank You</a:t>
+            </a:r>
+            <a:endParaRPr lang="en-US" dirty="0"/>
+          </a:p>
+        </p:txBody>
+      </p:sp>
+      <p:sp>
+        <p:nvSpPr>
+          <p:cNvPr id="4" name="Subtitle 2"/>
+          <p:cNvSpPr txBox="1">
+            <a:spLocks/>
+          </p:cNvSpPr>
+          <p:nvPr/>
+        </p:nvSpPr>
+        <p:spPr>
+          <a:xfrm>
+            <a:off x="4038600" y="4191000"/>
+            <a:ext cx="4191000" cy="1752600"/>
+          </a:xfrm>
+          <a:prstGeom prst="rect">
+            <a:avLst/>
+          </a:prstGeom>
+        </p:spPr>
+        <p:txBody>
+          <a:bodyPr vert="horz" lIns="91440" tIns="45720" rIns="91440" bIns="45720" rtlCol="0">
+            <a:normAutofit fontScale="92500" lnSpcReduction="10000"/>
+          </a:bodyPr>
+          <a:lstStyle/>
+          <a:p>
+            <a:pPr marL="342900" marR="0" lvl="0" indent="-342900" algn="r" defTabSz="914400" rtl="0" eaLnBrk="1" fontAlgn="auto" latinLnBrk="0" hangingPunct="1">
+              <a:lnSpc>
+                <a:spcPct val="100000"/>
+              </a:lnSpc>
+              <a:spcBef>
+                <a:spcPct val="20000"/>
+              </a:spcBef>
+              <a:spcAft>
+                <a:spcPts val="0"/>
+              </a:spcAft>
+              <a:buClrTx/>
+              <a:buSzTx/>
+              <a:tabLst/>
+              <a:defRPr/>
+            </a:pPr>
+            <a:r>
+              <a:rPr kumimoji="0" lang="en-US" sz="2200" b="0" i="0" u="none" strike="noStrike" kern="1200" cap="none" spc="0" normalizeH="0" baseline="0" noProof="0" dirty="0" err="1" smtClean="0">
+                <a:ln>
+                  <a:noFill/>
+                </a:ln>
+                <a:solidFill>
+                  <a:schemeClr val="tx1"/>
+                </a:solidFill>
+                <a:effectLst/>
+                <a:uLnTx/>
+                <a:uFillTx/>
+                <a:latin typeface="Cambria" pitchFamily="18" charset="0"/>
+                <a:ea typeface="+mn-ea"/>
+                <a:cs typeface="+mn-cs"/>
+              </a:rPr>
+              <a:t>Rajasekaran</a:t>
+            </a:r>
+            <a:r>
+              <a:rPr kumimoji="0" lang="en-US" sz="2200" b="0" i="0" u="none" strike="noStrike" kern="1200" cap="none" spc="0" normalizeH="0" baseline="0" noProof="0" dirty="0" smtClean="0">
+                <a:ln>
+                  <a:noFill/>
+                </a:ln>
+                <a:solidFill>
+                  <a:schemeClr val="tx1"/>
+                </a:solidFill>
+                <a:effectLst/>
+                <a:uLnTx/>
+                <a:uFillTx/>
+                <a:latin typeface="Cambria" pitchFamily="18" charset="0"/>
+                <a:ea typeface="+mn-ea"/>
+                <a:cs typeface="+mn-cs"/>
+              </a:rPr>
+              <a:t> S</a:t>
+            </a:r>
+          </a:p>
+          <a:p>
+            <a:pPr marL="342900" marR="0" lvl="0" indent="-342900" algn="r" defTabSz="914400" rtl="0" eaLnBrk="1" fontAlgn="auto" latinLnBrk="0" hangingPunct="1">
+              <a:lnSpc>
+                <a:spcPct val="100000"/>
+              </a:lnSpc>
+              <a:spcBef>
+                <a:spcPct val="20000"/>
+              </a:spcBef>
+              <a:spcAft>
+                <a:spcPts val="0"/>
+              </a:spcAft>
+              <a:buClrTx/>
+              <a:buSzTx/>
+              <a:tabLst/>
+              <a:defRPr/>
+            </a:pPr>
+            <a:r>
+              <a:rPr kumimoji="0" lang="en-US" sz="1600" b="0" i="0" u="none" strike="noStrike" kern="1200" cap="none" spc="0" normalizeH="0" baseline="0" noProof="0" dirty="0" smtClean="0">
+                <a:ln>
+                  <a:noFill/>
+                </a:ln>
+                <a:solidFill>
+                  <a:schemeClr val="tx1"/>
+                </a:solidFill>
+                <a:effectLst/>
+                <a:uLnTx/>
+                <a:uFillTx/>
+                <a:latin typeface="Cambria" pitchFamily="18" charset="0"/>
+                <a:ea typeface="+mn-ea"/>
+                <a:cs typeface="+mn-cs"/>
+              </a:rPr>
+              <a:t>Assistant Professor,</a:t>
+            </a:r>
+          </a:p>
+          <a:p>
+            <a:pPr marL="342900" marR="0" lvl="0" indent="-342900" algn="r" defTabSz="914400" rtl="0" eaLnBrk="1" fontAlgn="auto" latinLnBrk="0" hangingPunct="1">
+              <a:lnSpc>
+                <a:spcPct val="100000"/>
+              </a:lnSpc>
+              <a:spcBef>
+                <a:spcPct val="20000"/>
+              </a:spcBef>
+              <a:spcAft>
+                <a:spcPts val="0"/>
+              </a:spcAft>
+              <a:buClrTx/>
+              <a:buSzTx/>
+              <a:tabLst/>
+              <a:defRPr/>
+            </a:pPr>
+            <a:r>
+              <a:rPr kumimoji="0" lang="en-US" sz="1600" b="0" i="0" u="none" strike="noStrike" kern="1200" cap="none" spc="0" normalizeH="0" baseline="0" noProof="0" dirty="0" smtClean="0">
+                <a:ln>
+                  <a:noFill/>
+                </a:ln>
+                <a:solidFill>
+                  <a:schemeClr val="tx1"/>
+                </a:solidFill>
+                <a:effectLst/>
+                <a:uLnTx/>
+                <a:uFillTx/>
+                <a:latin typeface="Cambria" pitchFamily="18" charset="0"/>
+                <a:ea typeface="+mn-ea"/>
+                <a:cs typeface="+mn-cs"/>
+              </a:rPr>
+              <a:t>Department of Information Technology,</a:t>
+            </a:r>
+          </a:p>
+          <a:p>
+            <a:pPr marL="342900" marR="0" lvl="0" indent="-342900" algn="r" defTabSz="914400" rtl="0" eaLnBrk="1" fontAlgn="auto" latinLnBrk="0" hangingPunct="1">
+              <a:lnSpc>
+                <a:spcPct val="100000"/>
+              </a:lnSpc>
+              <a:spcBef>
+                <a:spcPct val="20000"/>
+              </a:spcBef>
+              <a:spcAft>
+                <a:spcPts val="0"/>
+              </a:spcAft>
+              <a:buClrTx/>
+              <a:buSzTx/>
+              <a:tabLst/>
+              <a:defRPr/>
+            </a:pPr>
+            <a:r>
+              <a:rPr kumimoji="0" lang="en-US" sz="1600" b="0" i="0" u="none" strike="noStrike" kern="1200" cap="none" spc="0" normalizeH="0" baseline="0" noProof="0" dirty="0" err="1" smtClean="0">
+                <a:ln>
+                  <a:noFill/>
+                </a:ln>
+                <a:solidFill>
+                  <a:schemeClr val="tx1"/>
+                </a:solidFill>
+                <a:effectLst/>
+                <a:uLnTx/>
+                <a:uFillTx/>
+                <a:latin typeface="Cambria" pitchFamily="18" charset="0"/>
+                <a:ea typeface="+mn-ea"/>
+                <a:cs typeface="+mn-cs"/>
+              </a:rPr>
+              <a:t>KGiSL</a:t>
+            </a:r>
+            <a:r>
+              <a:rPr kumimoji="0" lang="en-US" sz="1600" b="0" i="0" u="none" strike="noStrike" kern="1200" cap="none" spc="0" normalizeH="0" baseline="0" noProof="0" dirty="0" smtClean="0">
+                <a:ln>
+                  <a:noFill/>
+                </a:ln>
+                <a:solidFill>
+                  <a:schemeClr val="tx1"/>
+                </a:solidFill>
+                <a:effectLst/>
+                <a:uLnTx/>
+                <a:uFillTx/>
+                <a:latin typeface="Cambria" pitchFamily="18" charset="0"/>
+                <a:ea typeface="+mn-ea"/>
+                <a:cs typeface="+mn-cs"/>
+              </a:rPr>
+              <a:t> Institute of Technology,</a:t>
+            </a:r>
+          </a:p>
+          <a:p>
+            <a:pPr marL="342900" marR="0" lvl="0" indent="-342900" algn="r" defTabSz="914400" rtl="0" eaLnBrk="1" fontAlgn="auto" latinLnBrk="0" hangingPunct="1">
+              <a:lnSpc>
+                <a:spcPct val="100000"/>
+              </a:lnSpc>
+              <a:spcBef>
+                <a:spcPct val="20000"/>
+              </a:spcBef>
+              <a:spcAft>
+                <a:spcPts val="0"/>
+              </a:spcAft>
+              <a:buClrTx/>
+              <a:buSzTx/>
+              <a:tabLst/>
+              <a:defRPr/>
+            </a:pPr>
+            <a:r>
+              <a:rPr kumimoji="0" lang="en-US" sz="1600" b="0" i="0" u="none" strike="noStrike" kern="1200" cap="none" spc="0" normalizeH="0" baseline="0" noProof="0" dirty="0" smtClean="0">
+                <a:ln>
+                  <a:noFill/>
+                </a:ln>
+                <a:solidFill>
+                  <a:schemeClr val="tx1"/>
+                </a:solidFill>
+                <a:effectLst/>
+                <a:uLnTx/>
+                <a:uFillTx/>
+                <a:latin typeface="Cambria" pitchFamily="18" charset="0"/>
+                <a:ea typeface="+mn-ea"/>
+                <a:cs typeface="+mn-cs"/>
+              </a:rPr>
+              <a:t>email: </a:t>
+            </a:r>
+            <a:r>
+              <a:rPr kumimoji="0" lang="en-US" sz="1600" b="0" i="0" u="none" strike="noStrike" kern="1200" cap="none" spc="0" normalizeH="0" baseline="0" noProof="0" dirty="0" smtClean="0">
+                <a:ln>
+                  <a:noFill/>
+                </a:ln>
+                <a:solidFill>
+                  <a:schemeClr val="tx1"/>
+                </a:solidFill>
+                <a:effectLst/>
+                <a:uLnTx/>
+                <a:uFillTx/>
+                <a:latin typeface="Cambria" pitchFamily="18" charset="0"/>
+                <a:ea typeface="+mn-ea"/>
+                <a:cs typeface="+mn-cs"/>
+                <a:hlinkClick r:id="rId2"/>
+              </a:rPr>
+              <a:t>proffraja@gmail.com</a:t>
+            </a:r>
+            <a:endParaRPr lang="en-US" sz="1600" dirty="0" smtClean="0">
+              <a:latin typeface="Cambria" pitchFamily="18" charset="0"/>
+            </a:endParaRPr>
+          </a:p>
+          <a:p>
+            <a:pPr marL="342900" marR="0" lvl="0" indent="-342900" algn="r" defTabSz="914400" rtl="0" eaLnBrk="1" fontAlgn="auto" latinLnBrk="0" hangingPunct="1">
+              <a:lnSpc>
+                <a:spcPct val="100000"/>
+              </a:lnSpc>
+              <a:spcBef>
+                <a:spcPct val="20000"/>
+              </a:spcBef>
+              <a:spcAft>
+                <a:spcPts val="0"/>
+              </a:spcAft>
+              <a:buClrTx/>
+              <a:buSzTx/>
+              <a:tabLst/>
+              <a:defRPr/>
+            </a:pPr>
+            <a:r>
+              <a:rPr lang="en-US" sz="1600" dirty="0" err="1" smtClean="0">
+                <a:latin typeface="Cambria" pitchFamily="18" charset="0"/>
+              </a:rPr>
+              <a:t>Github:</a:t>
+            </a:r>
+            <a:r>
+              <a:rPr lang="en-US" sz="1600" dirty="0" err="1" smtClean="0">
+                <a:latin typeface="Cambria" pitchFamily="18" charset="0"/>
+                <a:hlinkClick r:id="rId3"/>
+              </a:rPr>
+              <a:t>www.github.com</a:t>
+            </a:r>
+            <a:r>
+              <a:rPr lang="en-US" sz="1600" dirty="0" smtClean="0">
+                <a:latin typeface="Cambria" pitchFamily="18" charset="0"/>
+                <a:hlinkClick r:id="rId3"/>
+              </a:rPr>
+              <a:t>/</a:t>
+            </a:r>
+            <a:r>
+              <a:rPr lang="en-US" sz="1600" dirty="0" err="1" smtClean="0">
+                <a:latin typeface="Cambria" pitchFamily="18" charset="0"/>
+                <a:hlinkClick r:id="rId3"/>
+              </a:rPr>
+              <a:t>rajasekaranap</a:t>
+            </a:r>
+            <a:endParaRPr lang="en-US" sz="1600" dirty="0" smtClean="0">
+              <a:latin typeface="Cambria" pitchFamily="18" charset="0"/>
+            </a:endParaRPr>
+          </a:p>
+          <a:p>
+            <a:pPr marL="342900" marR="0" lvl="0" indent="-342900" algn="r" defTabSz="914400" rtl="0" eaLnBrk="1" fontAlgn="auto" latinLnBrk="0" hangingPunct="1">
+              <a:lnSpc>
+                <a:spcPct val="100000"/>
+              </a:lnSpc>
+              <a:spcBef>
+                <a:spcPct val="20000"/>
+              </a:spcBef>
+              <a:spcAft>
+                <a:spcPts val="0"/>
+              </a:spcAft>
+              <a:buClrTx/>
+              <a:buSzTx/>
+              <a:tabLst/>
+              <a:defRPr/>
+            </a:pPr>
+            <a:endParaRPr lang="en-US" sz="1600" dirty="0" smtClean="0">
+              <a:latin typeface="Cambria" pitchFamily="18" charset="0"/>
+            </a:endParaRPr>
+          </a:p>
+        </p:txBody>
+      </p:sp>
+    </p:spTree>
+  </p:cSld>
+  <p:clrMapOvr>
+    <a:masterClrMapping/>
+  </p:clrMapOvr>
+  <p:timing>
+    <p:tnLst>
+      <p:par>
+        <p:cTn id="1" dur="indefinite" restart="never" nodeType="tmRoot"/>
+      </p:par>
+    </p:tnLst>
+  </p:timing>
 </p:sld>
 </file>
 

</xml_diff>

<commit_message>
Last Update 26-12-2018 17:31:39.72
</commit_message>
<xml_diff>
--- a/Slides/GE8291-U1.pptx
+++ b/Slides/GE8291-U1.pptx
@@ -5,7 +5,7 @@
     <p:sldMasterId id="2147483648" r:id="rId1"/>
   </p:sldMasterIdLst>
   <p:notesMasterIdLst>
-    <p:notesMasterId r:id="rId73"/>
+    <p:notesMasterId r:id="rId80"/>
   </p:notesMasterIdLst>
   <p:sldIdLst>
     <p:sldId id="256" r:id="rId2"/>
@@ -78,7 +78,14 @@
     <p:sldId id="342" r:id="rId69"/>
     <p:sldId id="343" r:id="rId70"/>
     <p:sldId id="344" r:id="rId71"/>
-    <p:sldId id="272" r:id="rId72"/>
+    <p:sldId id="345" r:id="rId72"/>
+    <p:sldId id="346" r:id="rId73"/>
+    <p:sldId id="347" r:id="rId74"/>
+    <p:sldId id="348" r:id="rId75"/>
+    <p:sldId id="349" r:id="rId76"/>
+    <p:sldId id="350" r:id="rId77"/>
+    <p:sldId id="351" r:id="rId78"/>
+    <p:sldId id="272" r:id="rId79"/>
   </p:sldIdLst>
   <p:sldSz cx="9144000" cy="6858000" type="screen4x3"/>
   <p:notesSz cx="6858000" cy="9144000"/>
@@ -177,6 +184,22 @@
       </a:defRPr>
     </a:lvl9pPr>
   </p:defaultTextStyle>
+  <p:extLst>
+    <p:ext uri="{EFAFB233-063F-42B5-8137-9DF3F51BA10A}">
+      <p15:sldGuideLst xmlns:p15="http://schemas.microsoft.com/office/powerpoint/2012/main">
+        <p15:guide id="1" orient="horz" pos="2160">
+          <p15:clr>
+            <a:srgbClr val="A4A3A4"/>
+          </p15:clr>
+        </p15:guide>
+        <p15:guide id="2" pos="2880">
+          <p15:clr>
+            <a:srgbClr val="A4A3A4"/>
+          </p15:clr>
+        </p15:guide>
+      </p15:sldGuideLst>
+    </p:ext>
+  </p:extLst>
 </p:presentation>
 </file>
 
@@ -4397,18 +4420,18 @@
     </dgm:pt>
   </dgm:ptLst>
   <dgm:cxnLst>
+    <dgm:cxn modelId="{4BC0C0AD-A8F3-4B82-8C28-3548D06C709A}" type="presOf" srcId="{55A47C89-021B-4DB4-BA96-199B186E4A1E}" destId="{BA54D09C-629B-48A5-A6EB-14D98D3CB28A}" srcOrd="0" destOrd="0" presId="urn:microsoft.com/office/officeart/2005/8/layout/orgChart1"/>
+    <dgm:cxn modelId="{3F64E102-9A5F-4BD6-9CFA-31038F0B4783}" type="presOf" srcId="{EC994CA6-A578-4662-803C-CBDF96915619}" destId="{462C6D18-4B03-4914-9592-07A9DBA4276C}" srcOrd="0" destOrd="0" presId="urn:microsoft.com/office/officeart/2005/8/layout/orgChart1"/>
+    <dgm:cxn modelId="{11FB3743-27CF-479C-BCC0-F452EA8B14D8}" type="presOf" srcId="{056BB3FC-AC9F-49DF-8F11-DB361C5BD555}" destId="{081A4DB5-0265-473A-AD3A-49EDE6A91B89}" srcOrd="0" destOrd="0" presId="urn:microsoft.com/office/officeart/2005/8/layout/orgChart1"/>
+    <dgm:cxn modelId="{F7524E33-A5C7-4D68-AE69-EF491F40628A}" srcId="{5C55DE1A-ED42-4F88-AF4C-39AAA324473F}" destId="{D5B20370-9597-482D-8EF3-E0838DB0C033}" srcOrd="0" destOrd="0" parTransId="{9C053DE2-7905-48A4-9BF0-C60190436F7F}" sibTransId="{C45AE0BF-DED7-40A7-9143-EED100F52DC5}"/>
+    <dgm:cxn modelId="{B4410A94-3429-4BC2-91BC-B40851C462F5}" type="presOf" srcId="{5C55DE1A-ED42-4F88-AF4C-39AAA324473F}" destId="{BAC011DE-93B2-480A-A520-B4C82F1C9C6B}" srcOrd="0" destOrd="0" presId="urn:microsoft.com/office/officeart/2005/8/layout/orgChart1"/>
     <dgm:cxn modelId="{E2E32635-2BD5-404A-BC45-CFAB4EB3F698}" type="presOf" srcId="{9C053DE2-7905-48A4-9BF0-C60190436F7F}" destId="{7E6DBE80-8530-4541-A14E-7023574A25E9}" srcOrd="0" destOrd="0" presId="urn:microsoft.com/office/officeart/2005/8/layout/orgChart1"/>
-    <dgm:cxn modelId="{3F64E102-9A5F-4BD6-9CFA-31038F0B4783}" type="presOf" srcId="{EC994CA6-A578-4662-803C-CBDF96915619}" destId="{462C6D18-4B03-4914-9592-07A9DBA4276C}" srcOrd="0" destOrd="0" presId="urn:microsoft.com/office/officeart/2005/8/layout/orgChart1"/>
+    <dgm:cxn modelId="{D68A82F0-1BF0-4095-8EA7-22DB7F145FBE}" type="presOf" srcId="{5C55DE1A-ED42-4F88-AF4C-39AAA324473F}" destId="{DB184887-4319-42FF-BF21-40FB3AFE97E1}" srcOrd="1" destOrd="0" presId="urn:microsoft.com/office/officeart/2005/8/layout/orgChart1"/>
     <dgm:cxn modelId="{A12D7DDD-5AF4-44C3-9CCA-9E6A2F28877D}" type="presOf" srcId="{056BB3FC-AC9F-49DF-8F11-DB361C5BD555}" destId="{1FC59AA8-0461-440B-A756-D3F44B8339C3}" srcOrd="1" destOrd="0" presId="urn:microsoft.com/office/officeart/2005/8/layout/orgChart1"/>
-    <dgm:cxn modelId="{D154C7E2-9DF3-46F4-99CC-1CA0B317C50A}" type="presOf" srcId="{D5B20370-9597-482D-8EF3-E0838DB0C033}" destId="{D7A6A533-96DE-4685-9324-7C8448E000ED}" srcOrd="0" destOrd="0" presId="urn:microsoft.com/office/officeart/2005/8/layout/orgChart1"/>
     <dgm:cxn modelId="{DD1366CF-3AD0-4CE2-9173-0AC59007A021}" srcId="{5C55DE1A-ED42-4F88-AF4C-39AAA324473F}" destId="{056BB3FC-AC9F-49DF-8F11-DB361C5BD555}" srcOrd="1" destOrd="0" parTransId="{EC994CA6-A578-4662-803C-CBDF96915619}" sibTransId="{B699E894-6C7C-4751-AC41-FC99CCFC11F2}"/>
-    <dgm:cxn modelId="{4BC0C0AD-A8F3-4B82-8C28-3548D06C709A}" type="presOf" srcId="{55A47C89-021B-4DB4-BA96-199B186E4A1E}" destId="{BA54D09C-629B-48A5-A6EB-14D98D3CB28A}" srcOrd="0" destOrd="0" presId="urn:microsoft.com/office/officeart/2005/8/layout/orgChart1"/>
-    <dgm:cxn modelId="{F7524E33-A5C7-4D68-AE69-EF491F40628A}" srcId="{5C55DE1A-ED42-4F88-AF4C-39AAA324473F}" destId="{D5B20370-9597-482D-8EF3-E0838DB0C033}" srcOrd="0" destOrd="0" parTransId="{9C053DE2-7905-48A4-9BF0-C60190436F7F}" sibTransId="{C45AE0BF-DED7-40A7-9143-EED100F52DC5}"/>
-    <dgm:cxn modelId="{D68A82F0-1BF0-4095-8EA7-22DB7F145FBE}" type="presOf" srcId="{5C55DE1A-ED42-4F88-AF4C-39AAA324473F}" destId="{DB184887-4319-42FF-BF21-40FB3AFE97E1}" srcOrd="1" destOrd="0" presId="urn:microsoft.com/office/officeart/2005/8/layout/orgChart1"/>
     <dgm:cxn modelId="{860889E6-8BEB-4E6E-97FB-11C07731B482}" type="presOf" srcId="{D5B20370-9597-482D-8EF3-E0838DB0C033}" destId="{5402881A-9087-45BB-956A-D8EA84942E78}" srcOrd="1" destOrd="0" presId="urn:microsoft.com/office/officeart/2005/8/layout/orgChart1"/>
     <dgm:cxn modelId="{EFC89B27-DA10-4A5F-85E2-C1554BDD9590}" srcId="{55A47C89-021B-4DB4-BA96-199B186E4A1E}" destId="{5C55DE1A-ED42-4F88-AF4C-39AAA324473F}" srcOrd="0" destOrd="0" parTransId="{D548175A-D994-4558-9D34-CD34E6AF629F}" sibTransId="{CE0F3D66-9076-47D5-8436-0BEEE8F7F65C}"/>
-    <dgm:cxn modelId="{B4410A94-3429-4BC2-91BC-B40851C462F5}" type="presOf" srcId="{5C55DE1A-ED42-4F88-AF4C-39AAA324473F}" destId="{BAC011DE-93B2-480A-A520-B4C82F1C9C6B}" srcOrd="0" destOrd="0" presId="urn:microsoft.com/office/officeart/2005/8/layout/orgChart1"/>
-    <dgm:cxn modelId="{11FB3743-27CF-479C-BCC0-F452EA8B14D8}" type="presOf" srcId="{056BB3FC-AC9F-49DF-8F11-DB361C5BD555}" destId="{081A4DB5-0265-473A-AD3A-49EDE6A91B89}" srcOrd="0" destOrd="0" presId="urn:microsoft.com/office/officeart/2005/8/layout/orgChart1"/>
+    <dgm:cxn modelId="{D154C7E2-9DF3-46F4-99CC-1CA0B317C50A}" type="presOf" srcId="{D5B20370-9597-482D-8EF3-E0838DB0C033}" destId="{D7A6A533-96DE-4685-9324-7C8448E000ED}" srcOrd="0" destOrd="0" presId="urn:microsoft.com/office/officeart/2005/8/layout/orgChart1"/>
     <dgm:cxn modelId="{599DBA65-1494-4A6D-B8F4-39206AF2828D}" type="presParOf" srcId="{BA54D09C-629B-48A5-A6EB-14D98D3CB28A}" destId="{EBF20417-30A9-454E-BD6A-ABC98F4471DA}" srcOrd="0" destOrd="0" presId="urn:microsoft.com/office/officeart/2005/8/layout/orgChart1"/>
     <dgm:cxn modelId="{8CC285CF-0E8B-4640-904E-D2BACF012220}" type="presParOf" srcId="{EBF20417-30A9-454E-BD6A-ABC98F4471DA}" destId="{5B46141D-99E9-4FF4-852E-33582D600E96}" srcOrd="0" destOrd="0" presId="urn:microsoft.com/office/officeart/2005/8/layout/orgChart1"/>
     <dgm:cxn modelId="{FE7D288A-D7B2-48EB-B2FF-F9C08DCFB437}" type="presParOf" srcId="{5B46141D-99E9-4FF4-852E-33582D600E96}" destId="{BAC011DE-93B2-480A-A520-B4C82F1C9C6B}" srcOrd="0" destOrd="0" presId="urn:microsoft.com/office/officeart/2005/8/layout/orgChart1"/>
@@ -4432,6 +4455,11 @@
   </dgm:cxnLst>
   <dgm:bg/>
   <dgm:whole/>
+  <dgm:extLst>
+    <a:ext uri="http://schemas.microsoft.com/office/drawing/2008/diagram">
+      <dsp:dataModelExt xmlns:dsp="http://schemas.microsoft.com/office/drawing/2008/diagram" relId="rId6" minVer="http://schemas.openxmlformats.org/drawingml/2006/diagram"/>
+    </a:ext>
+  </dgm:extLst>
 </dgm:dataModel>
 </file>
 
@@ -6156,78 +6184,78 @@
     </dgm:pt>
   </dgm:ptLst>
   <dgm:cxnLst>
+    <dgm:cxn modelId="{E861297B-DAA6-49EF-A6D3-EA0F2973C3A1}" type="presOf" srcId="{7A3C7205-EAAC-4B5D-915D-5FE855339856}" destId="{B226F02C-62A4-4448-AA42-E9BB76D7873B}" srcOrd="0" destOrd="0" presId="urn:microsoft.com/office/officeart/2005/8/layout/orgChart1"/>
+    <dgm:cxn modelId="{E9BE3214-7232-47AF-BA28-6527EEA68666}" srcId="{7A3C7205-EAAC-4B5D-915D-5FE855339856}" destId="{4D280E73-C220-4E30-B63E-9B1739A95856}" srcOrd="2" destOrd="0" parTransId="{FE956D94-D05D-4D03-8567-4FE224FFC262}" sibTransId="{C06E3A9B-4607-4E28-91C0-A0F3B1CB68A8}"/>
+    <dgm:cxn modelId="{BA5744B5-044D-47FE-B30E-69C75150D6D6}" type="presOf" srcId="{61D67F75-F592-4776-8F53-A7589C845C0E}" destId="{1AD96763-63C0-4FA5-8EA5-118782686E59}" srcOrd="0" destOrd="0" presId="urn:microsoft.com/office/officeart/2005/8/layout/orgChart1"/>
+    <dgm:cxn modelId="{4FB0B9B3-7BC7-4F18-AD9C-8A5CBB052662}" type="presOf" srcId="{62CD2F92-67D1-42F2-82D8-E44BA13F5871}" destId="{2FAB245F-D0EA-429A-B169-D396D0054243}" srcOrd="1" destOrd="0" presId="urn:microsoft.com/office/officeart/2005/8/layout/orgChart1"/>
+    <dgm:cxn modelId="{C57527B2-7BC5-4A09-A7B0-6DB3867EA357}" type="presOf" srcId="{6C6B25E2-10A9-4E80-85A1-564097713135}" destId="{E4E57F41-042F-45A5-8D92-5723CFA79F87}" srcOrd="0" destOrd="0" presId="urn:microsoft.com/office/officeart/2005/8/layout/orgChart1"/>
+    <dgm:cxn modelId="{B8B4329D-282F-4CB7-9DCA-581380D6EBA1}" type="presOf" srcId="{9865DEC0-D025-4798-98A8-C46ABE87EC17}" destId="{88DDF2EA-3960-4499-BD2D-E21BC3F5F746}" srcOrd="0" destOrd="0" presId="urn:microsoft.com/office/officeart/2005/8/layout/orgChart1"/>
+    <dgm:cxn modelId="{0EEAAA0F-A4C0-41A0-A8D8-0DE7FD44722E}" type="presOf" srcId="{7620FD18-4838-4468-B172-A6B784463028}" destId="{5A6678EB-7128-4F8F-B047-B26E028C719D}" srcOrd="1" destOrd="0" presId="urn:microsoft.com/office/officeart/2005/8/layout/orgChart1"/>
+    <dgm:cxn modelId="{B063F5A3-6DB0-48AC-B8AC-249AB73290F5}" srcId="{BF688012-A4AB-43BD-AD67-B342DA9EB1A1}" destId="{2173B93B-7E8D-4C49-AC97-64857F82749B}" srcOrd="2" destOrd="0" parTransId="{E48B2AB6-26CB-4E1B-8B9F-1DC0CD81B351}" sibTransId="{5B48E4F0-0AC1-41F1-89D9-F5F6B9366964}"/>
+    <dgm:cxn modelId="{FA239301-BEDE-47F2-BFB2-14C6E2BA9B9F}" type="presOf" srcId="{5277690B-52E9-4875-9F8A-83396E7C12A6}" destId="{6AD2365B-3588-4178-8141-6BFB42A34A66}" srcOrd="0" destOrd="0" presId="urn:microsoft.com/office/officeart/2005/8/layout/orgChart1"/>
+    <dgm:cxn modelId="{015D8A43-133B-4337-9756-CE96B50C38EA}" type="presOf" srcId="{2173B93B-7E8D-4C49-AC97-64857F82749B}" destId="{9253B386-F021-43BE-BAEC-A09FD83909F6}" srcOrd="1" destOrd="0" presId="urn:microsoft.com/office/officeart/2005/8/layout/orgChart1"/>
+    <dgm:cxn modelId="{1F24DB4A-20B2-4AAD-926C-74FEB709D207}" type="presOf" srcId="{E001767D-6D35-4A6C-B9A6-7740121562D5}" destId="{566A6DF9-374F-4469-AD40-0EC0C4A60C2C}" srcOrd="0" destOrd="0" presId="urn:microsoft.com/office/officeart/2005/8/layout/orgChart1"/>
+    <dgm:cxn modelId="{D6A3D43D-53A3-4807-8C95-A4EEFEC0A1B1}" type="presOf" srcId="{3872A134-C573-43E3-90EC-1CD53F585656}" destId="{CA65C09C-229D-4D64-B2FD-89469AA9897A}" srcOrd="0" destOrd="0" presId="urn:microsoft.com/office/officeart/2005/8/layout/orgChart1"/>
+    <dgm:cxn modelId="{ECFF7018-0959-462F-A5BB-55D402E171C9}" type="presOf" srcId="{80A001E8-4F9D-4E91-B59C-F2776E57C053}" destId="{A3AB63B1-6FF6-4CFE-BE56-37A3A8D2594D}" srcOrd="0" destOrd="0" presId="urn:microsoft.com/office/officeart/2005/8/layout/orgChart1"/>
+    <dgm:cxn modelId="{6F76389B-175F-47FA-B390-957AC54C2BCD}" type="presOf" srcId="{BF688012-A4AB-43BD-AD67-B342DA9EB1A1}" destId="{54179FE0-E21E-468C-91A1-90D7E80FDCE3}" srcOrd="0" destOrd="0" presId="urn:microsoft.com/office/officeart/2005/8/layout/orgChart1"/>
+    <dgm:cxn modelId="{21C68A9A-BB3F-4256-A5FD-2745794EB3E7}" srcId="{A07C290F-AC18-4321-8B25-D3221D0E84C9}" destId="{7620FD18-4838-4468-B172-A6B784463028}" srcOrd="0" destOrd="0" parTransId="{5277690B-52E9-4875-9F8A-83396E7C12A6}" sibTransId="{B7933695-494E-4F83-A817-21DBC3294BAE}"/>
+    <dgm:cxn modelId="{A6CF6271-3CF8-4D40-9F92-DBE099EED50A}" type="presOf" srcId="{FE956D94-D05D-4D03-8567-4FE224FFC262}" destId="{EE0106A1-E5B1-42CF-ACE6-D4517C63B683}" srcOrd="0" destOrd="0" presId="urn:microsoft.com/office/officeart/2005/8/layout/orgChart1"/>
+    <dgm:cxn modelId="{605BC45E-C75F-4323-9E9E-20730919E17F}" type="presOf" srcId="{EF231D0F-4B8A-47EF-9993-CF9E4EC9FDAD}" destId="{95E08B68-777F-4D00-8FCB-A8680867E0C0}" srcOrd="0" destOrd="0" presId="urn:microsoft.com/office/officeart/2005/8/layout/orgChart1"/>
+    <dgm:cxn modelId="{5AD7452F-3031-4D05-B3E6-C8DA3E745134}" type="presOf" srcId="{8C1B2657-5F7E-404A-8CE0-B4A07CF673E2}" destId="{5ECA00EF-B94E-4E22-A142-A63424C6E283}" srcOrd="0" destOrd="0" presId="urn:microsoft.com/office/officeart/2005/8/layout/orgChart1"/>
+    <dgm:cxn modelId="{7A323DB2-12B3-4638-B444-446DF528B5EF}" type="presOf" srcId="{2EBD4A55-9279-4BC6-A6FA-9FC62D72F31C}" destId="{9B036ED7-37E3-4F2B-A9C6-275137D0B616}" srcOrd="0" destOrd="0" presId="urn:microsoft.com/office/officeart/2005/8/layout/orgChart1"/>
+    <dgm:cxn modelId="{3B3FD2CE-09D9-4DDC-9BF4-18FE03D7A5D1}" srcId="{2EBD4A55-9279-4BC6-A6FA-9FC62D72F31C}" destId="{62CD2F92-67D1-42F2-82D8-E44BA13F5871}" srcOrd="0" destOrd="0" parTransId="{7BE560D8-C2A5-4694-A3CC-4AAECDF3A8D2}" sibTransId="{F5C65613-03A1-4C46-9A3C-874711BFD563}"/>
+    <dgm:cxn modelId="{CCE46313-E02E-4345-9474-5B3E7BDD225D}" type="presOf" srcId="{7A3C7205-EAAC-4B5D-915D-5FE855339856}" destId="{86FA19A9-1844-48D1-BBD0-A64C22FC1AC1}" srcOrd="1" destOrd="0" presId="urn:microsoft.com/office/officeart/2005/8/layout/orgChart1"/>
+    <dgm:cxn modelId="{72CBF410-39C9-4329-9B1B-FD5908546A23}" type="presOf" srcId="{90BCFBA6-F895-4CE3-AD64-DF9E61328D90}" destId="{5BCC797F-6BB1-4070-B9FD-B195C913EED0}" srcOrd="0" destOrd="0" presId="urn:microsoft.com/office/officeart/2005/8/layout/orgChart1"/>
+    <dgm:cxn modelId="{9911D8D2-44B0-4793-9F1E-8B6028BACAA3}" srcId="{9865DEC0-D025-4798-98A8-C46ABE87EC17}" destId="{E001767D-6D35-4A6C-B9A6-7740121562D5}" srcOrd="1" destOrd="0" parTransId="{5678B143-443A-4963-9137-479830FB38DB}" sibTransId="{6B0635EE-968F-4BF7-AC0F-B5F64FAB8E02}"/>
+    <dgm:cxn modelId="{FEF7EFE8-30D5-48D1-9DCE-C1E4B3CE2E81}" type="presOf" srcId="{25F1C896-6120-4023-97DF-CA2B6F26AAAA}" destId="{649E9FC4-0653-44C7-9689-DC743DF91669}" srcOrd="0" destOrd="0" presId="urn:microsoft.com/office/officeart/2005/8/layout/orgChart1"/>
+    <dgm:cxn modelId="{8AC4F82C-7371-464F-AD8C-613098089D2B}" srcId="{E001767D-6D35-4A6C-B9A6-7740121562D5}" destId="{083F4181-BB32-437B-9476-74609C2591A2}" srcOrd="0" destOrd="0" parTransId="{A004CB57-A062-4ED3-801D-E645530CAD54}" sibTransId="{093EB064-5336-4BB3-94CA-590606824138}"/>
+    <dgm:cxn modelId="{513889FA-7FB7-411E-993F-C5C37C38817F}" type="presOf" srcId="{A004CB57-A062-4ED3-801D-E645530CAD54}" destId="{CF8A37F1-7162-499F-BFFD-EF955C673C25}" srcOrd="0" destOrd="0" presId="urn:microsoft.com/office/officeart/2005/8/layout/orgChart1"/>
+    <dgm:cxn modelId="{4F385C33-200F-4DEF-80E0-0CECCC6D3989}" type="presOf" srcId="{FEB668BB-EAB8-415D-B6CF-CA5219B9B56B}" destId="{699F2A82-D7E3-40C9-896A-33AC22BC8E58}" srcOrd="1" destOrd="0" presId="urn:microsoft.com/office/officeart/2005/8/layout/orgChart1"/>
+    <dgm:cxn modelId="{A059C9F9-C504-4F24-B898-31FCC5231B91}" srcId="{A07C290F-AC18-4321-8B25-D3221D0E84C9}" destId="{42EDB7D4-A283-43B3-B2C1-8C2292516AF5}" srcOrd="2" destOrd="0" parTransId="{61D67F75-F592-4776-8F53-A7589C845C0E}" sibTransId="{6BCDE400-11F3-41BE-94E2-58F92BC895D3}"/>
+    <dgm:cxn modelId="{2724335C-91C5-4ABE-B28F-FF0D6D611DEA}" type="presOf" srcId="{42EDB7D4-A283-43B3-B2C1-8C2292516AF5}" destId="{8FA63504-6396-444A-882B-9FA3141E2465}" srcOrd="1" destOrd="0" presId="urn:microsoft.com/office/officeart/2005/8/layout/orgChart1"/>
+    <dgm:cxn modelId="{C6568566-7E4B-4208-9D7A-929AEA3C3153}" type="presOf" srcId="{083F4181-BB32-437B-9476-74609C2591A2}" destId="{FF785875-DC96-4A01-A6B2-EA63D58F4FEB}" srcOrd="1" destOrd="0" presId="urn:microsoft.com/office/officeart/2005/8/layout/orgChart1"/>
     <dgm:cxn modelId="{8AA3F1C5-D91A-4724-8425-4F91EC00D7DB}" type="presOf" srcId="{E1D4F0F6-B5AA-4085-B5D2-D8B40B0A7442}" destId="{D4531E96-6B31-4849-8709-2602F0648367}" srcOrd="0" destOrd="0" presId="urn:microsoft.com/office/officeart/2005/8/layout/orgChart1"/>
-    <dgm:cxn modelId="{F640125D-73EB-41B9-ADA0-8D6ADA284E53}" type="presOf" srcId="{8C1B2657-5F7E-404A-8CE0-B4A07CF673E2}" destId="{8FE2F7CD-050B-453A-A061-F705FDBDBADC}" srcOrd="1" destOrd="0" presId="urn:microsoft.com/office/officeart/2005/8/layout/orgChart1"/>
+    <dgm:cxn modelId="{81E95876-18D3-434A-92C3-A0FE60FAB4F2}" type="presOf" srcId="{B8C29E49-2928-48E6-80EB-7F706E7FC5DD}" destId="{150BD734-8A8C-4C28-8AC3-2FDF05FFC52F}" srcOrd="0" destOrd="0" presId="urn:microsoft.com/office/officeart/2005/8/layout/orgChart1"/>
+    <dgm:cxn modelId="{6927ABD8-ED6E-4554-9208-E7336F3CFC8D}" type="presOf" srcId="{A07C290F-AC18-4321-8B25-D3221D0E84C9}" destId="{7671796F-ADCE-4E28-92EA-923FC010BB66}" srcOrd="0" destOrd="0" presId="urn:microsoft.com/office/officeart/2005/8/layout/orgChart1"/>
+    <dgm:cxn modelId="{3B8A6A21-5030-426D-B2CE-FDE650472C4E}" type="presOf" srcId="{A07C290F-AC18-4321-8B25-D3221D0E84C9}" destId="{332A815B-B084-4882-AF9F-5D502D65535B}" srcOrd="1" destOrd="0" presId="urn:microsoft.com/office/officeart/2005/8/layout/orgChart1"/>
+    <dgm:cxn modelId="{6BEF71F9-FC32-4554-BE4F-5875F30752F7}" type="presOf" srcId="{42EDB7D4-A283-43B3-B2C1-8C2292516AF5}" destId="{CEEAAF22-0B04-45D0-8A00-642A0031A2A2}" srcOrd="0" destOrd="0" presId="urn:microsoft.com/office/officeart/2005/8/layout/orgChart1"/>
+    <dgm:cxn modelId="{9F56E74D-A0E6-4D84-A5C4-1E26E0588480}" srcId="{BF688012-A4AB-43BD-AD67-B342DA9EB1A1}" destId="{8C1B2657-5F7E-404A-8CE0-B4A07CF673E2}" srcOrd="1" destOrd="0" parTransId="{B3167CFE-AC5C-4306-ACF3-68303FC955E4}" sibTransId="{0904BD6C-9E83-436D-9D77-9104287B6048}"/>
+    <dgm:cxn modelId="{76BD524C-BA8A-4354-97EC-CD2414643A34}" type="presOf" srcId="{7620FD18-4838-4468-B172-A6B784463028}" destId="{C24A5D1C-BC85-4C9C-8130-21B624143549}" srcOrd="0" destOrd="0" presId="urn:microsoft.com/office/officeart/2005/8/layout/orgChart1"/>
+    <dgm:cxn modelId="{F0B2CDBF-C415-4F82-986C-136A7032A51A}" srcId="{7A3C7205-EAAC-4B5D-915D-5FE855339856}" destId="{FEB668BB-EAB8-415D-B6CF-CA5219B9B56B}" srcOrd="0" destOrd="0" parTransId="{75CC2F58-C17C-43C3-AFAD-B96D79B02C9C}" sibTransId="{8790F5B2-9A20-47B9-9ED1-C6D5D455423B}"/>
+    <dgm:cxn modelId="{70A229D0-75AC-4994-B733-98FFB4F23E9B}" type="presOf" srcId="{5343FAF3-3C83-4C8E-896F-6FCFE89ADDF5}" destId="{5339DA53-2B94-40C5-A189-1BD162D72DA8}" srcOrd="0" destOrd="0" presId="urn:microsoft.com/office/officeart/2005/8/layout/orgChart1"/>
+    <dgm:cxn modelId="{DB382CCA-DB20-4329-9099-219B4ABD9539}" type="presOf" srcId="{4D280E73-C220-4E30-B63E-9B1739A95856}" destId="{799469BD-9AEA-4CEB-806D-325C3C43584F}" srcOrd="1" destOrd="0" presId="urn:microsoft.com/office/officeart/2005/8/layout/orgChart1"/>
+    <dgm:cxn modelId="{E93C766A-4CC2-4357-AE9C-E0802E3CF80B}" srcId="{62CD2F92-67D1-42F2-82D8-E44BA13F5871}" destId="{A07C290F-AC18-4321-8B25-D3221D0E84C9}" srcOrd="1" destOrd="0" parTransId="{2CAB26BC-C5D9-46DC-A754-0BC5C13823DA}" sibTransId="{06A51518-B45B-4933-8DA9-0E0B255A6384}"/>
+    <dgm:cxn modelId="{A5AD7D33-78E0-473F-A991-50AC5AB0ADD9}" type="presOf" srcId="{90BCFBA6-F895-4CE3-AD64-DF9E61328D90}" destId="{D2BA3124-902C-4BDC-B6A4-88FC64AEE88C}" srcOrd="1" destOrd="0" presId="urn:microsoft.com/office/officeart/2005/8/layout/orgChart1"/>
+    <dgm:cxn modelId="{C94BC6E6-4BCC-4A3B-AF76-E9364DFCF002}" type="presOf" srcId="{4D280E73-C220-4E30-B63E-9B1739A95856}" destId="{B9264E8D-B910-4FA7-ACF4-6F1FAD9F38C2}" srcOrd="0" destOrd="0" presId="urn:microsoft.com/office/officeart/2005/8/layout/orgChart1"/>
+    <dgm:cxn modelId="{7ED22E2B-AB25-4B80-AEF3-8A7D59E78DFB}" type="presOf" srcId="{EF231D0F-4B8A-47EF-9993-CF9E4EC9FDAD}" destId="{C36626A7-CAC8-4F7D-B4FF-5D99259F655E}" srcOrd="1" destOrd="0" presId="urn:microsoft.com/office/officeart/2005/8/layout/orgChart1"/>
+    <dgm:cxn modelId="{31603B74-F89B-426F-A57B-10759BA15473}" srcId="{E001767D-6D35-4A6C-B9A6-7740121562D5}" destId="{3F15C59F-F17C-45CC-9D61-F0735F2ABC44}" srcOrd="1" destOrd="0" parTransId="{5343FAF3-3C83-4C8E-896F-6FCFE89ADDF5}" sibTransId="{ED8BC698-E19B-424D-9FC6-D138FB538588}"/>
+    <dgm:cxn modelId="{C0CE9AFE-DA16-42AC-8DAF-864184713CDF}" srcId="{E001767D-6D35-4A6C-B9A6-7740121562D5}" destId="{3930C99B-97E6-4BDF-B18D-85EE3E6D3C40}" srcOrd="2" destOrd="0" parTransId="{B8C29E49-2928-48E6-80EB-7F706E7FC5DD}" sibTransId="{B449ADC9-83D2-4491-B670-AAFCFAAEC77D}"/>
+    <dgm:cxn modelId="{EA640006-D0C4-4EBA-AAEB-B577B0D8610D}" type="presOf" srcId="{E001767D-6D35-4A6C-B9A6-7740121562D5}" destId="{5106A322-C110-4F01-A3A7-4696D1FB2F75}" srcOrd="1" destOrd="0" presId="urn:microsoft.com/office/officeart/2005/8/layout/orgChart1"/>
+    <dgm:cxn modelId="{FBC494EB-D9AF-4DA4-BF17-A8D362FEDF92}" type="presOf" srcId="{5678B143-443A-4963-9137-479830FB38DB}" destId="{48114D2C-411D-468B-8557-F6099245D351}" srcOrd="0" destOrd="0" presId="urn:microsoft.com/office/officeart/2005/8/layout/orgChart1"/>
+    <dgm:cxn modelId="{5208FE65-ABEF-4789-AAB3-363FDAAD751D}" type="presOf" srcId="{9865DEC0-D025-4798-98A8-C46ABE87EC17}" destId="{8B336876-CEEE-4B02-BC8D-9137E7F88973}" srcOrd="1" destOrd="0" presId="urn:microsoft.com/office/officeart/2005/8/layout/orgChart1"/>
+    <dgm:cxn modelId="{842EDC32-C8BC-4CC7-A506-485F030F13E8}" type="presOf" srcId="{3930C99B-97E6-4BDF-B18D-85EE3E6D3C40}" destId="{3E36BB7F-DE5E-4BC7-91AE-BD47FBF73405}" srcOrd="1" destOrd="0" presId="urn:microsoft.com/office/officeart/2005/8/layout/orgChart1"/>
+    <dgm:cxn modelId="{DE5DDD15-0C11-4EBD-8DCF-7F3EBE2583B9}" type="presOf" srcId="{BF688012-A4AB-43BD-AD67-B342DA9EB1A1}" destId="{66DC34A8-A7E5-4938-A3F2-D6902157BF3B}" srcOrd="1" destOrd="0" presId="urn:microsoft.com/office/officeart/2005/8/layout/orgChart1"/>
+    <dgm:cxn modelId="{AE57072A-0677-485C-BB00-0332E0059E72}" srcId="{7A3C7205-EAAC-4B5D-915D-5FE855339856}" destId="{90BCFBA6-F895-4CE3-AD64-DF9E61328D90}" srcOrd="1" destOrd="0" parTransId="{5F1C10C6-36CC-4703-9733-4BACC3DE4EA5}" sibTransId="{1E495C40-0EEF-4709-8699-1EB26379AF5F}"/>
+    <dgm:cxn modelId="{231AFDB7-134F-4C1A-B9C8-47E20EF46913}" type="presOf" srcId="{69C11C85-A3AC-4B3B-8603-00C0E053F7D0}" destId="{72EDD89F-F6D4-4B35-988A-0EF5C924C88B}" srcOrd="0" destOrd="0" presId="urn:microsoft.com/office/officeart/2005/8/layout/orgChart1"/>
+    <dgm:cxn modelId="{52ED120A-B48E-428C-A5BA-B123F481B142}" type="presOf" srcId="{75CC2F58-C17C-43C3-AFAD-B96D79B02C9C}" destId="{06F6250B-A68A-44D4-82E8-AB48F93939B5}" srcOrd="0" destOrd="0" presId="urn:microsoft.com/office/officeart/2005/8/layout/orgChart1"/>
+    <dgm:cxn modelId="{372001CB-C610-430A-B4C1-CA995C28E126}" type="presOf" srcId="{083F4181-BB32-437B-9476-74609C2591A2}" destId="{A6D4204E-923B-47BE-9AA1-5A46215F12C5}" srcOrd="0" destOrd="0" presId="urn:microsoft.com/office/officeart/2005/8/layout/orgChart1"/>
+    <dgm:cxn modelId="{1E875F86-EFE6-4FEE-BB86-2A9B6924839D}" type="presOf" srcId="{3F15C59F-F17C-45CC-9D61-F0735F2ABC44}" destId="{323A37B4-C59E-4A21-B72C-90DA273EA45B}" srcOrd="0" destOrd="0" presId="urn:microsoft.com/office/officeart/2005/8/layout/orgChart1"/>
     <dgm:cxn modelId="{598499D2-2D8B-468F-A371-F54B5FD08AEB}" srcId="{9865DEC0-D025-4798-98A8-C46ABE87EC17}" destId="{BF688012-A4AB-43BD-AD67-B342DA9EB1A1}" srcOrd="0" destOrd="0" parTransId="{69C11C85-A3AC-4B3B-8603-00C0E053F7D0}" sibTransId="{36FFCCAB-9A02-4F18-A531-1B65A44F2E2D}"/>
-    <dgm:cxn modelId="{FEF7EFE8-30D5-48D1-9DCE-C1E4B3CE2E81}" type="presOf" srcId="{25F1C896-6120-4023-97DF-CA2B6F26AAAA}" destId="{649E9FC4-0653-44C7-9689-DC743DF91669}" srcOrd="0" destOrd="0" presId="urn:microsoft.com/office/officeart/2005/8/layout/orgChart1"/>
-    <dgm:cxn modelId="{ECFF7018-0959-462F-A5BB-55D402E171C9}" type="presOf" srcId="{80A001E8-4F9D-4E91-B59C-F2776E57C053}" destId="{A3AB63B1-6FF6-4CFE-BE56-37A3A8D2594D}" srcOrd="0" destOrd="0" presId="urn:microsoft.com/office/officeart/2005/8/layout/orgChart1"/>
-    <dgm:cxn modelId="{A5AD7D33-78E0-473F-A991-50AC5AB0ADD9}" type="presOf" srcId="{90BCFBA6-F895-4CE3-AD64-DF9E61328D90}" destId="{D2BA3124-902C-4BDC-B6A4-88FC64AEE88C}" srcOrd="1" destOrd="0" presId="urn:microsoft.com/office/officeart/2005/8/layout/orgChart1"/>
-    <dgm:cxn modelId="{7A323DB2-12B3-4638-B444-446DF528B5EF}" type="presOf" srcId="{2EBD4A55-9279-4BC6-A6FA-9FC62D72F31C}" destId="{9B036ED7-37E3-4F2B-A9C6-275137D0B616}" srcOrd="0" destOrd="0" presId="urn:microsoft.com/office/officeart/2005/8/layout/orgChart1"/>
-    <dgm:cxn modelId="{31FAFD1E-8E6B-476E-A52F-2AE46D757CA5}" srcId="{A07C290F-AC18-4321-8B25-D3221D0E84C9}" destId="{7A3C7205-EAAC-4B5D-915D-5FE855339856}" srcOrd="1" destOrd="0" parTransId="{E1D4F0F6-B5AA-4085-B5D2-D8B40B0A7442}" sibTransId="{E9603A0D-54E4-4F0B-A2FA-3916F47942BB}"/>
-    <dgm:cxn modelId="{70A229D0-75AC-4994-B733-98FFB4F23E9B}" type="presOf" srcId="{5343FAF3-3C83-4C8E-896F-6FCFE89ADDF5}" destId="{5339DA53-2B94-40C5-A189-1BD162D72DA8}" srcOrd="0" destOrd="0" presId="urn:microsoft.com/office/officeart/2005/8/layout/orgChart1"/>
-    <dgm:cxn modelId="{015D8A43-133B-4337-9756-CE96B50C38EA}" type="presOf" srcId="{2173B93B-7E8D-4C49-AC97-64857F82749B}" destId="{9253B386-F021-43BE-BAEC-A09FD83909F6}" srcOrd="1" destOrd="0" presId="urn:microsoft.com/office/officeart/2005/8/layout/orgChart1"/>
-    <dgm:cxn modelId="{21C68A9A-BB3F-4256-A5FD-2745794EB3E7}" srcId="{A07C290F-AC18-4321-8B25-D3221D0E84C9}" destId="{7620FD18-4838-4468-B172-A6B784463028}" srcOrd="0" destOrd="0" parTransId="{5277690B-52E9-4875-9F8A-83396E7C12A6}" sibTransId="{B7933695-494E-4F83-A817-21DBC3294BAE}"/>
-    <dgm:cxn modelId="{31603B74-F89B-426F-A57B-10759BA15473}" srcId="{E001767D-6D35-4A6C-B9A6-7740121562D5}" destId="{3F15C59F-F17C-45CC-9D61-F0735F2ABC44}" srcOrd="1" destOrd="0" parTransId="{5343FAF3-3C83-4C8E-896F-6FCFE89ADDF5}" sibTransId="{ED8BC698-E19B-424D-9FC6-D138FB538588}"/>
-    <dgm:cxn modelId="{4F385C33-200F-4DEF-80E0-0CECCC6D3989}" type="presOf" srcId="{FEB668BB-EAB8-415D-B6CF-CA5219B9B56B}" destId="{699F2A82-D7E3-40C9-896A-33AC22BC8E58}" srcOrd="1" destOrd="0" presId="urn:microsoft.com/office/officeart/2005/8/layout/orgChart1"/>
-    <dgm:cxn modelId="{F0B2CDBF-C415-4F82-986C-136A7032A51A}" srcId="{7A3C7205-EAAC-4B5D-915D-5FE855339856}" destId="{FEB668BB-EAB8-415D-B6CF-CA5219B9B56B}" srcOrd="0" destOrd="0" parTransId="{75CC2F58-C17C-43C3-AFAD-B96D79B02C9C}" sibTransId="{8790F5B2-9A20-47B9-9ED1-C6D5D455423B}"/>
-    <dgm:cxn modelId="{372001CB-C610-430A-B4C1-CA995C28E126}" type="presOf" srcId="{083F4181-BB32-437B-9476-74609C2591A2}" destId="{A6D4204E-923B-47BE-9AA1-5A46215F12C5}" srcOrd="0" destOrd="0" presId="urn:microsoft.com/office/officeart/2005/8/layout/orgChart1"/>
-    <dgm:cxn modelId="{CCE46313-E02E-4345-9474-5B3E7BDD225D}" type="presOf" srcId="{7A3C7205-EAAC-4B5D-915D-5FE855339856}" destId="{86FA19A9-1844-48D1-BBD0-A64C22FC1AC1}" srcOrd="1" destOrd="0" presId="urn:microsoft.com/office/officeart/2005/8/layout/orgChart1"/>
-    <dgm:cxn modelId="{FA239301-BEDE-47F2-BFB2-14C6E2BA9B9F}" type="presOf" srcId="{5277690B-52E9-4875-9F8A-83396E7C12A6}" destId="{6AD2365B-3588-4178-8141-6BFB42A34A66}" srcOrd="0" destOrd="0" presId="urn:microsoft.com/office/officeart/2005/8/layout/orgChart1"/>
-    <dgm:cxn modelId="{5BAF93E0-2320-420B-8493-D5C1A142E7FB}" type="presOf" srcId="{E48B2AB6-26CB-4E1B-8B9F-1DC0CD81B351}" destId="{9DD49CB5-9275-460B-9C6B-CD2D60334277}" srcOrd="0" destOrd="0" presId="urn:microsoft.com/office/officeart/2005/8/layout/orgChart1"/>
-    <dgm:cxn modelId="{0EEAAA0F-A4C0-41A0-A8D8-0DE7FD44722E}" type="presOf" srcId="{7620FD18-4838-4468-B172-A6B784463028}" destId="{5A6678EB-7128-4F8F-B047-B26E028C719D}" srcOrd="1" destOrd="0" presId="urn:microsoft.com/office/officeart/2005/8/layout/orgChart1"/>
-    <dgm:cxn modelId="{4FB0B9B3-7BC7-4F18-AD9C-8A5CBB052662}" type="presOf" srcId="{62CD2F92-67D1-42F2-82D8-E44BA13F5871}" destId="{2FAB245F-D0EA-429A-B169-D396D0054243}" srcOrd="1" destOrd="0" presId="urn:microsoft.com/office/officeart/2005/8/layout/orgChart1"/>
-    <dgm:cxn modelId="{7ED22E2B-AB25-4B80-AEF3-8A7D59E78DFB}" type="presOf" srcId="{EF231D0F-4B8A-47EF-9993-CF9E4EC9FDAD}" destId="{C36626A7-CAC8-4F7D-B4FF-5D99259F655E}" srcOrd="1" destOrd="0" presId="urn:microsoft.com/office/officeart/2005/8/layout/orgChart1"/>
-    <dgm:cxn modelId="{605BC45E-C75F-4323-9E9E-20730919E17F}" type="presOf" srcId="{EF231D0F-4B8A-47EF-9993-CF9E4EC9FDAD}" destId="{95E08B68-777F-4D00-8FCB-A8680867E0C0}" srcOrd="0" destOrd="0" presId="urn:microsoft.com/office/officeart/2005/8/layout/orgChart1"/>
-    <dgm:cxn modelId="{6BEF71F9-FC32-4554-BE4F-5875F30752F7}" type="presOf" srcId="{42EDB7D4-A283-43B3-B2C1-8C2292516AF5}" destId="{CEEAAF22-0B04-45D0-8A00-642A0031A2A2}" srcOrd="0" destOrd="0" presId="urn:microsoft.com/office/officeart/2005/8/layout/orgChart1"/>
-    <dgm:cxn modelId="{ECF5A1BC-8458-4B3F-9DF5-0EAD2B54BEEC}" type="presOf" srcId="{5F1C10C6-36CC-4703-9733-4BACC3DE4EA5}" destId="{2A389793-3294-4BF8-92AF-66E45906D15D}" srcOrd="0" destOrd="0" presId="urn:microsoft.com/office/officeart/2005/8/layout/orgChart1"/>
-    <dgm:cxn modelId="{6927ABD8-ED6E-4554-9208-E7336F3CFC8D}" type="presOf" srcId="{A07C290F-AC18-4321-8B25-D3221D0E84C9}" destId="{7671796F-ADCE-4E28-92EA-923FC010BB66}" srcOrd="0" destOrd="0" presId="urn:microsoft.com/office/officeart/2005/8/layout/orgChart1"/>
-    <dgm:cxn modelId="{B8B4329D-282F-4CB7-9DCA-581380D6EBA1}" type="presOf" srcId="{9865DEC0-D025-4798-98A8-C46ABE87EC17}" destId="{88DDF2EA-3960-4499-BD2D-E21BC3F5F746}" srcOrd="0" destOrd="0" presId="urn:microsoft.com/office/officeart/2005/8/layout/orgChart1"/>
-    <dgm:cxn modelId="{DE5DDD15-0C11-4EBD-8DCF-7F3EBE2583B9}" type="presOf" srcId="{BF688012-A4AB-43BD-AD67-B342DA9EB1A1}" destId="{66DC34A8-A7E5-4938-A3F2-D6902157BF3B}" srcOrd="1" destOrd="0" presId="urn:microsoft.com/office/officeart/2005/8/layout/orgChart1"/>
-    <dgm:cxn modelId="{DDBF6018-9D69-4A2B-95D6-B0EFF8F7DB7F}" type="presOf" srcId="{62CD2F92-67D1-42F2-82D8-E44BA13F5871}" destId="{7C0DC374-EC83-4EF5-815B-8B4DB303D388}" srcOrd="0" destOrd="0" presId="urn:microsoft.com/office/officeart/2005/8/layout/orgChart1"/>
-    <dgm:cxn modelId="{AE57072A-0677-485C-BB00-0332E0059E72}" srcId="{7A3C7205-EAAC-4B5D-915D-5FE855339856}" destId="{90BCFBA6-F895-4CE3-AD64-DF9E61328D90}" srcOrd="1" destOrd="0" parTransId="{5F1C10C6-36CC-4703-9733-4BACC3DE4EA5}" sibTransId="{1E495C40-0EEF-4709-8699-1EB26379AF5F}"/>
-    <dgm:cxn modelId="{C94BC6E6-4BCC-4A3B-AF76-E9364DFCF002}" type="presOf" srcId="{4D280E73-C220-4E30-B63E-9B1739A95856}" destId="{B9264E8D-B910-4FA7-ACF4-6F1FAD9F38C2}" srcOrd="0" destOrd="0" presId="urn:microsoft.com/office/officeart/2005/8/layout/orgChart1"/>
-    <dgm:cxn modelId="{E9BE3214-7232-47AF-BA28-6527EEA68666}" srcId="{7A3C7205-EAAC-4B5D-915D-5FE855339856}" destId="{4D280E73-C220-4E30-B63E-9B1739A95856}" srcOrd="2" destOrd="0" parTransId="{FE956D94-D05D-4D03-8567-4FE224FFC262}" sibTransId="{C06E3A9B-4607-4E28-91C0-A0F3B1CB68A8}"/>
-    <dgm:cxn modelId="{4655E751-C66A-4115-9E22-F4B565497B90}" type="presOf" srcId="{2173B93B-7E8D-4C49-AC97-64857F82749B}" destId="{1A320179-1009-4B6D-954B-90BC43F13266}" srcOrd="0" destOrd="0" presId="urn:microsoft.com/office/officeart/2005/8/layout/orgChart1"/>
-    <dgm:cxn modelId="{D6A3D43D-53A3-4807-8C95-A4EEFEC0A1B1}" type="presOf" srcId="{3872A134-C573-43E3-90EC-1CD53F585656}" destId="{CA65C09C-229D-4D64-B2FD-89469AA9897A}" srcOrd="0" destOrd="0" presId="urn:microsoft.com/office/officeart/2005/8/layout/orgChart1"/>
-    <dgm:cxn modelId="{513889FA-7FB7-411E-993F-C5C37C38817F}" type="presOf" srcId="{A004CB57-A062-4ED3-801D-E645530CAD54}" destId="{CF8A37F1-7162-499F-BFFD-EF955C673C25}" srcOrd="0" destOrd="0" presId="urn:microsoft.com/office/officeart/2005/8/layout/orgChart1"/>
-    <dgm:cxn modelId="{8AC4F82C-7371-464F-AD8C-613098089D2B}" srcId="{E001767D-6D35-4A6C-B9A6-7740121562D5}" destId="{083F4181-BB32-437B-9476-74609C2591A2}" srcOrd="0" destOrd="0" parTransId="{A004CB57-A062-4ED3-801D-E645530CAD54}" sibTransId="{093EB064-5336-4BB3-94CA-590606824138}"/>
-    <dgm:cxn modelId="{C0CE9AFE-DA16-42AC-8DAF-864184713CDF}" srcId="{E001767D-6D35-4A6C-B9A6-7740121562D5}" destId="{3930C99B-97E6-4BDF-B18D-85EE3E6D3C40}" srcOrd="2" destOrd="0" parTransId="{B8C29E49-2928-48E6-80EB-7F706E7FC5DD}" sibTransId="{B449ADC9-83D2-4491-B670-AAFCFAAEC77D}"/>
-    <dgm:cxn modelId="{BA5744B5-044D-47FE-B30E-69C75150D6D6}" type="presOf" srcId="{61D67F75-F592-4776-8F53-A7589C845C0E}" destId="{1AD96763-63C0-4FA5-8EA5-118782686E59}" srcOrd="0" destOrd="0" presId="urn:microsoft.com/office/officeart/2005/8/layout/orgChart1"/>
+    <dgm:cxn modelId="{4B174296-D1DB-4057-9017-31136E2468B5}" type="presOf" srcId="{FEB668BB-EAB8-415D-B6CF-CA5219B9B56B}" destId="{A0185BAE-3C86-4B5B-97B5-8EDFBB0BC9DD}" srcOrd="0" destOrd="0" presId="urn:microsoft.com/office/officeart/2005/8/layout/orgChart1"/>
     <dgm:cxn modelId="{3A1F916D-E7C4-4C8B-9FC7-F0DB1983DD2E}" srcId="{BF688012-A4AB-43BD-AD67-B342DA9EB1A1}" destId="{6C6B25E2-10A9-4E80-85A1-564097713135}" srcOrd="0" destOrd="0" parTransId="{80A001E8-4F9D-4E91-B59C-F2776E57C053}" sibTransId="{64940C1A-B227-482C-914B-E08467F2BE48}"/>
     <dgm:cxn modelId="{23CB565F-A023-4E3D-B244-4C32FE400351}" srcId="{62CD2F92-67D1-42F2-82D8-E44BA13F5871}" destId="{9865DEC0-D025-4798-98A8-C46ABE87EC17}" srcOrd="0" destOrd="0" parTransId="{25F1C896-6120-4023-97DF-CA2B6F26AAAA}" sibTransId="{B93B8CDB-7700-4EDA-9DDE-D5C5B2CBA561}"/>
+    <dgm:cxn modelId="{ECF5A1BC-8458-4B3F-9DF5-0EAD2B54BEEC}" type="presOf" srcId="{5F1C10C6-36CC-4703-9733-4BACC3DE4EA5}" destId="{2A389793-3294-4BF8-92AF-66E45906D15D}" srcOrd="0" destOrd="0" presId="urn:microsoft.com/office/officeart/2005/8/layout/orgChart1"/>
+    <dgm:cxn modelId="{31FAFD1E-8E6B-476E-A52F-2AE46D757CA5}" srcId="{A07C290F-AC18-4321-8B25-D3221D0E84C9}" destId="{7A3C7205-EAAC-4B5D-915D-5FE855339856}" srcOrd="1" destOrd="0" parTransId="{E1D4F0F6-B5AA-4085-B5D2-D8B40B0A7442}" sibTransId="{E9603A0D-54E4-4F0B-A2FA-3916F47942BB}"/>
     <dgm:cxn modelId="{5BA7ACA7-BF59-40D0-8B76-BD6F0DF9B3E0}" type="presOf" srcId="{6C6B25E2-10A9-4E80-85A1-564097713135}" destId="{22AEF71C-1F6A-4A30-83ED-D0E222A1371D}" srcOrd="1" destOrd="0" presId="urn:microsoft.com/office/officeart/2005/8/layout/orgChart1"/>
-    <dgm:cxn modelId="{E861297B-DAA6-49EF-A6D3-EA0F2973C3A1}" type="presOf" srcId="{7A3C7205-EAAC-4B5D-915D-5FE855339856}" destId="{B226F02C-62A4-4448-AA42-E9BB76D7873B}" srcOrd="0" destOrd="0" presId="urn:microsoft.com/office/officeart/2005/8/layout/orgChart1"/>
-    <dgm:cxn modelId="{1F24DB4A-20B2-4AAD-926C-74FEB709D207}" type="presOf" srcId="{E001767D-6D35-4A6C-B9A6-7740121562D5}" destId="{566A6DF9-374F-4469-AD40-0EC0C4A60C2C}" srcOrd="0" destOrd="0" presId="urn:microsoft.com/office/officeart/2005/8/layout/orgChart1"/>
-    <dgm:cxn modelId="{FBC494EB-D9AF-4DA4-BF17-A8D362FEDF92}" type="presOf" srcId="{5678B143-443A-4963-9137-479830FB38DB}" destId="{48114D2C-411D-468B-8557-F6099245D351}" srcOrd="0" destOrd="0" presId="urn:microsoft.com/office/officeart/2005/8/layout/orgChart1"/>
-    <dgm:cxn modelId="{76BD524C-BA8A-4354-97EC-CD2414643A34}" type="presOf" srcId="{7620FD18-4838-4468-B172-A6B784463028}" destId="{C24A5D1C-BC85-4C9C-8130-21B624143549}" srcOrd="0" destOrd="0" presId="urn:microsoft.com/office/officeart/2005/8/layout/orgChart1"/>
-    <dgm:cxn modelId="{B063F5A3-6DB0-48AC-B8AC-249AB73290F5}" srcId="{BF688012-A4AB-43BD-AD67-B342DA9EB1A1}" destId="{2173B93B-7E8D-4C49-AC97-64857F82749B}" srcOrd="2" destOrd="0" parTransId="{E48B2AB6-26CB-4E1B-8B9F-1DC0CD81B351}" sibTransId="{5B48E4F0-0AC1-41F1-89D9-F5F6B9366964}"/>
-    <dgm:cxn modelId="{3B8A6A21-5030-426D-B2CE-FDE650472C4E}" type="presOf" srcId="{A07C290F-AC18-4321-8B25-D3221D0E84C9}" destId="{332A815B-B084-4882-AF9F-5D502D65535B}" srcOrd="1" destOrd="0" presId="urn:microsoft.com/office/officeart/2005/8/layout/orgChart1"/>
+    <dgm:cxn modelId="{4655E751-C66A-4115-9E22-F4B565497B90}" type="presOf" srcId="{2173B93B-7E8D-4C49-AC97-64857F82749B}" destId="{1A320179-1009-4B6D-954B-90BC43F13266}" srcOrd="0" destOrd="0" presId="urn:microsoft.com/office/officeart/2005/8/layout/orgChart1"/>
     <dgm:cxn modelId="{8EC86AA2-E52C-4B8B-8E3E-147880DC3A56}" type="presOf" srcId="{B3167CFE-AC5C-4306-ACF3-68303FC955E4}" destId="{FDB13833-990D-41FB-8281-8DBC63378CDE}" srcOrd="0" destOrd="0" presId="urn:microsoft.com/office/officeart/2005/8/layout/orgChart1"/>
-    <dgm:cxn modelId="{9911D8D2-44B0-4793-9F1E-8B6028BACAA3}" srcId="{9865DEC0-D025-4798-98A8-C46ABE87EC17}" destId="{E001767D-6D35-4A6C-B9A6-7740121562D5}" srcOrd="1" destOrd="0" parTransId="{5678B143-443A-4963-9137-479830FB38DB}" sibTransId="{6B0635EE-968F-4BF7-AC0F-B5F64FAB8E02}"/>
-    <dgm:cxn modelId="{9F56E74D-A0E6-4D84-A5C4-1E26E0588480}" srcId="{BF688012-A4AB-43BD-AD67-B342DA9EB1A1}" destId="{8C1B2657-5F7E-404A-8CE0-B4A07CF673E2}" srcOrd="1" destOrd="0" parTransId="{B3167CFE-AC5C-4306-ACF3-68303FC955E4}" sibTransId="{0904BD6C-9E83-436D-9D77-9104287B6048}"/>
-    <dgm:cxn modelId="{1E875F86-EFE6-4FEE-BB86-2A9B6924839D}" type="presOf" srcId="{3F15C59F-F17C-45CC-9D61-F0735F2ABC44}" destId="{323A37B4-C59E-4A21-B72C-90DA273EA45B}" srcOrd="0" destOrd="0" presId="urn:microsoft.com/office/officeart/2005/8/layout/orgChart1"/>
-    <dgm:cxn modelId="{E93C766A-4CC2-4357-AE9C-E0802E3CF80B}" srcId="{62CD2F92-67D1-42F2-82D8-E44BA13F5871}" destId="{A07C290F-AC18-4321-8B25-D3221D0E84C9}" srcOrd="1" destOrd="0" parTransId="{2CAB26BC-C5D9-46DC-A754-0BC5C13823DA}" sibTransId="{06A51518-B45B-4933-8DA9-0E0B255A6384}"/>
-    <dgm:cxn modelId="{A059C9F9-C504-4F24-B898-31FCC5231B91}" srcId="{A07C290F-AC18-4321-8B25-D3221D0E84C9}" destId="{42EDB7D4-A283-43B3-B2C1-8C2292516AF5}" srcOrd="2" destOrd="0" parTransId="{61D67F75-F592-4776-8F53-A7589C845C0E}" sibTransId="{6BCDE400-11F3-41BE-94E2-58F92BC895D3}"/>
-    <dgm:cxn modelId="{842EDC32-C8BC-4CC7-A506-485F030F13E8}" type="presOf" srcId="{3930C99B-97E6-4BDF-B18D-85EE3E6D3C40}" destId="{3E36BB7F-DE5E-4BC7-91AE-BD47FBF73405}" srcOrd="1" destOrd="0" presId="urn:microsoft.com/office/officeart/2005/8/layout/orgChart1"/>
+    <dgm:cxn modelId="{F640125D-73EB-41B9-ADA0-8D6ADA284E53}" type="presOf" srcId="{8C1B2657-5F7E-404A-8CE0-B4A07CF673E2}" destId="{8FE2F7CD-050B-453A-A061-F705FDBDBADC}" srcOrd="1" destOrd="0" presId="urn:microsoft.com/office/officeart/2005/8/layout/orgChart1"/>
+    <dgm:cxn modelId="{DDBF6018-9D69-4A2B-95D6-B0EFF8F7DB7F}" type="presOf" srcId="{62CD2F92-67D1-42F2-82D8-E44BA13F5871}" destId="{7C0DC374-EC83-4EF5-815B-8B4DB303D388}" srcOrd="0" destOrd="0" presId="urn:microsoft.com/office/officeart/2005/8/layout/orgChart1"/>
+    <dgm:cxn modelId="{626EE35A-6342-4C29-8C11-832CFEECFF1D}" srcId="{BF688012-A4AB-43BD-AD67-B342DA9EB1A1}" destId="{EF231D0F-4B8A-47EF-9993-CF9E4EC9FDAD}" srcOrd="3" destOrd="0" parTransId="{3872A134-C573-43E3-90EC-1CD53F585656}" sibTransId="{7757546A-E857-4D8E-9CCE-1B0EDA97E1F6}"/>
+    <dgm:cxn modelId="{06DE750B-626C-4088-B7B3-94286FCF6508}" type="presOf" srcId="{2CAB26BC-C5D9-46DC-A754-0BC5C13823DA}" destId="{16D09170-3A44-4A74-89DF-E76112F215EE}" srcOrd="0" destOrd="0" presId="urn:microsoft.com/office/officeart/2005/8/layout/orgChart1"/>
+    <dgm:cxn modelId="{F73CABDE-4478-452B-8075-758DCA9BB91F}" type="presOf" srcId="{3930C99B-97E6-4BDF-B18D-85EE3E6D3C40}" destId="{579AFED9-5216-4D3E-8327-8AF77B1E3E0E}" srcOrd="0" destOrd="0" presId="urn:microsoft.com/office/officeart/2005/8/layout/orgChart1"/>
     <dgm:cxn modelId="{8FE162A4-3062-4C31-B5EC-909F8BEF9816}" type="presOf" srcId="{3F15C59F-F17C-45CC-9D61-F0735F2ABC44}" destId="{CDA672C7-E272-4507-A580-7D8912352F83}" srcOrd="1" destOrd="0" presId="urn:microsoft.com/office/officeart/2005/8/layout/orgChart1"/>
-    <dgm:cxn modelId="{F73CABDE-4478-452B-8075-758DCA9BB91F}" type="presOf" srcId="{3930C99B-97E6-4BDF-B18D-85EE3E6D3C40}" destId="{579AFED9-5216-4D3E-8327-8AF77B1E3E0E}" srcOrd="0" destOrd="0" presId="urn:microsoft.com/office/officeart/2005/8/layout/orgChart1"/>
-    <dgm:cxn modelId="{72CBF410-39C9-4329-9B1B-FD5908546A23}" type="presOf" srcId="{90BCFBA6-F895-4CE3-AD64-DF9E61328D90}" destId="{5BCC797F-6BB1-4070-B9FD-B195C913EED0}" srcOrd="0" destOrd="0" presId="urn:microsoft.com/office/officeart/2005/8/layout/orgChart1"/>
-    <dgm:cxn modelId="{DB382CCA-DB20-4329-9099-219B4ABD9539}" type="presOf" srcId="{4D280E73-C220-4E30-B63E-9B1739A95856}" destId="{799469BD-9AEA-4CEB-806D-325C3C43584F}" srcOrd="1" destOrd="0" presId="urn:microsoft.com/office/officeart/2005/8/layout/orgChart1"/>
-    <dgm:cxn modelId="{EA640006-D0C4-4EBA-AAEB-B577B0D8610D}" type="presOf" srcId="{E001767D-6D35-4A6C-B9A6-7740121562D5}" destId="{5106A322-C110-4F01-A3A7-4696D1FB2F75}" srcOrd="1" destOrd="0" presId="urn:microsoft.com/office/officeart/2005/8/layout/orgChart1"/>
-    <dgm:cxn modelId="{A6CF6271-3CF8-4D40-9F92-DBE099EED50A}" type="presOf" srcId="{FE956D94-D05D-4D03-8567-4FE224FFC262}" destId="{EE0106A1-E5B1-42CF-ACE6-D4517C63B683}" srcOrd="0" destOrd="0" presId="urn:microsoft.com/office/officeart/2005/8/layout/orgChart1"/>
-    <dgm:cxn modelId="{06DE750B-626C-4088-B7B3-94286FCF6508}" type="presOf" srcId="{2CAB26BC-C5D9-46DC-A754-0BC5C13823DA}" destId="{16D09170-3A44-4A74-89DF-E76112F215EE}" srcOrd="0" destOrd="0" presId="urn:microsoft.com/office/officeart/2005/8/layout/orgChart1"/>
-    <dgm:cxn modelId="{5AD7452F-3031-4D05-B3E6-C8DA3E745134}" type="presOf" srcId="{8C1B2657-5F7E-404A-8CE0-B4A07CF673E2}" destId="{5ECA00EF-B94E-4E22-A142-A63424C6E283}" srcOrd="0" destOrd="0" presId="urn:microsoft.com/office/officeart/2005/8/layout/orgChart1"/>
-    <dgm:cxn modelId="{2724335C-91C5-4ABE-B28F-FF0D6D611DEA}" type="presOf" srcId="{42EDB7D4-A283-43B3-B2C1-8C2292516AF5}" destId="{8FA63504-6396-444A-882B-9FA3141E2465}" srcOrd="1" destOrd="0" presId="urn:microsoft.com/office/officeart/2005/8/layout/orgChart1"/>
-    <dgm:cxn modelId="{C57527B2-7BC5-4A09-A7B0-6DB3867EA357}" type="presOf" srcId="{6C6B25E2-10A9-4E80-85A1-564097713135}" destId="{E4E57F41-042F-45A5-8D92-5723CFA79F87}" srcOrd="0" destOrd="0" presId="urn:microsoft.com/office/officeart/2005/8/layout/orgChart1"/>
-    <dgm:cxn modelId="{3B3FD2CE-09D9-4DDC-9BF4-18FE03D7A5D1}" srcId="{2EBD4A55-9279-4BC6-A6FA-9FC62D72F31C}" destId="{62CD2F92-67D1-42F2-82D8-E44BA13F5871}" srcOrd="0" destOrd="0" parTransId="{7BE560D8-C2A5-4694-A3CC-4AAECDF3A8D2}" sibTransId="{F5C65613-03A1-4C46-9A3C-874711BFD563}"/>
-    <dgm:cxn modelId="{C6568566-7E4B-4208-9D7A-929AEA3C3153}" type="presOf" srcId="{083F4181-BB32-437B-9476-74609C2591A2}" destId="{FF785875-DC96-4A01-A6B2-EA63D58F4FEB}" srcOrd="1" destOrd="0" presId="urn:microsoft.com/office/officeart/2005/8/layout/orgChart1"/>
-    <dgm:cxn modelId="{231AFDB7-134F-4C1A-B9C8-47E20EF46913}" type="presOf" srcId="{69C11C85-A3AC-4B3B-8603-00C0E053F7D0}" destId="{72EDD89F-F6D4-4B35-988A-0EF5C924C88B}" srcOrd="0" destOrd="0" presId="urn:microsoft.com/office/officeart/2005/8/layout/orgChart1"/>
-    <dgm:cxn modelId="{52ED120A-B48E-428C-A5BA-B123F481B142}" type="presOf" srcId="{75CC2F58-C17C-43C3-AFAD-B96D79B02C9C}" destId="{06F6250B-A68A-44D4-82E8-AB48F93939B5}" srcOrd="0" destOrd="0" presId="urn:microsoft.com/office/officeart/2005/8/layout/orgChart1"/>
-    <dgm:cxn modelId="{4B174296-D1DB-4057-9017-31136E2468B5}" type="presOf" srcId="{FEB668BB-EAB8-415D-B6CF-CA5219B9B56B}" destId="{A0185BAE-3C86-4B5B-97B5-8EDFBB0BC9DD}" srcOrd="0" destOrd="0" presId="urn:microsoft.com/office/officeart/2005/8/layout/orgChart1"/>
-    <dgm:cxn modelId="{5208FE65-ABEF-4789-AAB3-363FDAAD751D}" type="presOf" srcId="{9865DEC0-D025-4798-98A8-C46ABE87EC17}" destId="{8B336876-CEEE-4B02-BC8D-9137E7F88973}" srcOrd="1" destOrd="0" presId="urn:microsoft.com/office/officeart/2005/8/layout/orgChart1"/>
-    <dgm:cxn modelId="{6F76389B-175F-47FA-B390-957AC54C2BCD}" type="presOf" srcId="{BF688012-A4AB-43BD-AD67-B342DA9EB1A1}" destId="{54179FE0-E21E-468C-91A1-90D7E80FDCE3}" srcOrd="0" destOrd="0" presId="urn:microsoft.com/office/officeart/2005/8/layout/orgChart1"/>
-    <dgm:cxn modelId="{81E95876-18D3-434A-92C3-A0FE60FAB4F2}" type="presOf" srcId="{B8C29E49-2928-48E6-80EB-7F706E7FC5DD}" destId="{150BD734-8A8C-4C28-8AC3-2FDF05FFC52F}" srcOrd="0" destOrd="0" presId="urn:microsoft.com/office/officeart/2005/8/layout/orgChart1"/>
-    <dgm:cxn modelId="{626EE35A-6342-4C29-8C11-832CFEECFF1D}" srcId="{BF688012-A4AB-43BD-AD67-B342DA9EB1A1}" destId="{EF231D0F-4B8A-47EF-9993-CF9E4EC9FDAD}" srcOrd="3" destOrd="0" parTransId="{3872A134-C573-43E3-90EC-1CD53F585656}" sibTransId="{7757546A-E857-4D8E-9CCE-1B0EDA97E1F6}"/>
+    <dgm:cxn modelId="{5BAF93E0-2320-420B-8493-D5C1A142E7FB}" type="presOf" srcId="{E48B2AB6-26CB-4E1B-8B9F-1DC0CD81B351}" destId="{9DD49CB5-9275-460B-9C6B-CD2D60334277}" srcOrd="0" destOrd="0" presId="urn:microsoft.com/office/officeart/2005/8/layout/orgChart1"/>
     <dgm:cxn modelId="{F8F5F5FA-B93F-4C0E-96B4-53480FF3B7AF}" type="presParOf" srcId="{9B036ED7-37E3-4F2B-A9C6-275137D0B616}" destId="{655FFEDE-2DCF-4852-8D19-40C478A3E988}" srcOrd="0" destOrd="0" presId="urn:microsoft.com/office/officeart/2005/8/layout/orgChart1"/>
     <dgm:cxn modelId="{D34505C0-44E2-4D51-BFCD-303E13A0BEFE}" type="presParOf" srcId="{655FFEDE-2DCF-4852-8D19-40C478A3E988}" destId="{BAAD81C7-922A-43C5-AA07-7368CF9F9B1B}" srcOrd="0" destOrd="0" presId="urn:microsoft.com/office/officeart/2005/8/layout/orgChart1"/>
     <dgm:cxn modelId="{91458E5E-9A76-41E0-8588-50036A1D3E55}" type="presParOf" srcId="{BAAD81C7-922A-43C5-AA07-7368CF9F9B1B}" destId="{7C0DC374-EC83-4EF5-815B-8B4DB303D388}" srcOrd="0" destOrd="0" presId="urn:microsoft.com/office/officeart/2005/8/layout/orgChart1"/>
@@ -6356,6 +6384,11 @@
   </dgm:cxnLst>
   <dgm:bg/>
   <dgm:whole/>
+  <dgm:extLst>
+    <a:ext uri="http://schemas.microsoft.com/office/drawing/2008/diagram">
+      <dsp:dataModelExt xmlns:dsp="http://schemas.microsoft.com/office/drawing/2008/diagram" relId="rId6" minVer="http://schemas.openxmlformats.org/drawingml/2006/diagram"/>
+    </a:ext>
+  </dgm:extLst>
 </dgm:dataModel>
 </file>
 
@@ -6666,18 +6699,18 @@
     </dgm:pt>
   </dgm:ptLst>
   <dgm:cxnLst>
+    <dgm:cxn modelId="{0617F088-3F1C-476B-A2A9-B48BA731EFB7}" type="presOf" srcId="{A7570A90-78D5-4E48-A224-D64597EBD661}" destId="{CDE1ACCA-4F6E-40EE-9BE2-28B38AD78DC6}" srcOrd="0" destOrd="0" presId="urn:microsoft.com/office/officeart/2005/8/layout/orgChart1"/>
+    <dgm:cxn modelId="{F730C472-7353-47FA-B3DA-E9EEEABDC6FA}" srcId="{E5E5FAC6-6137-493A-AFCF-48F0DB7E5841}" destId="{CBBFD718-5C73-4CA7-A8C1-B95794128BF8}" srcOrd="0" destOrd="0" parTransId="{5E8BD9AC-D52D-41EE-A2C4-EF4216569D2C}" sibTransId="{E246867B-BFB4-418B-9332-CB0AA8C7434C}"/>
+    <dgm:cxn modelId="{6BAA1D6D-7240-43B1-B135-656216CA1901}" type="presOf" srcId="{CBBFD718-5C73-4CA7-A8C1-B95794128BF8}" destId="{5DCD1722-B9E1-4CC8-A323-22382DE4F7DF}" srcOrd="1" destOrd="0" presId="urn:microsoft.com/office/officeart/2005/8/layout/orgChart1"/>
+    <dgm:cxn modelId="{51F23762-D643-4815-9BD3-3F2A1CDE1EF5}" type="presOf" srcId="{7744D2B1-315B-4DC3-B122-A3153F29193E}" destId="{4CD82B40-3485-4437-9838-A88F5B5F8179}" srcOrd="0" destOrd="0" presId="urn:microsoft.com/office/officeart/2005/8/layout/orgChart1"/>
+    <dgm:cxn modelId="{16FB144F-0713-426E-8D67-D1ABB51B82B3}" type="presOf" srcId="{CBBFD718-5C73-4CA7-A8C1-B95794128BF8}" destId="{0A077FA9-5195-4CA5-9B9E-9404BD96984F}" srcOrd="0" destOrd="0" presId="urn:microsoft.com/office/officeart/2005/8/layout/orgChart1"/>
+    <dgm:cxn modelId="{54C1FDCA-3AE8-4B12-B206-BE1655FE3F75}" srcId="{A7570A90-78D5-4E48-A224-D64597EBD661}" destId="{E5E5FAC6-6137-493A-AFCF-48F0DB7E5841}" srcOrd="0" destOrd="0" parTransId="{0C6655A7-A367-423E-BE05-7D1FF4F5C4D3}" sibTransId="{52F9C9CB-09B3-48E5-B0CD-760993F2307A}"/>
+    <dgm:cxn modelId="{5B8CDEED-5B3A-464A-A4BF-50B28F581222}" type="presOf" srcId="{E5E5FAC6-6137-493A-AFCF-48F0DB7E5841}" destId="{092955F6-5152-42F7-A936-98A57A547EE7}" srcOrd="1" destOrd="0" presId="urn:microsoft.com/office/officeart/2005/8/layout/orgChart1"/>
+    <dgm:cxn modelId="{C6CA273D-C315-4B51-BAB4-DB836A5DA0BA}" type="presOf" srcId="{7744D2B1-315B-4DC3-B122-A3153F29193E}" destId="{84052D5F-2742-4104-96ED-E0512FF76418}" srcOrd="1" destOrd="0" presId="urn:microsoft.com/office/officeart/2005/8/layout/orgChart1"/>
+    <dgm:cxn modelId="{1EF7433B-1DD2-40B6-B0D3-7DD1B652702D}" type="presOf" srcId="{C10FD2ED-AEDE-4125-A5DE-7081129DB763}" destId="{4CEB6F93-9673-4746-858E-29CC1BB14E77}" srcOrd="0" destOrd="0" presId="urn:microsoft.com/office/officeart/2005/8/layout/orgChart1"/>
+    <dgm:cxn modelId="{412D6539-2E12-42CF-BA6C-D61E3F88BFE2}" type="presOf" srcId="{5E8BD9AC-D52D-41EE-A2C4-EF4216569D2C}" destId="{FFFFF3DB-F186-430A-9FD4-5E501E28B13A}" srcOrd="0" destOrd="0" presId="urn:microsoft.com/office/officeart/2005/8/layout/orgChart1"/>
+    <dgm:cxn modelId="{C98D3CF9-BD6E-48D2-9096-5B34436E1472}" type="presOf" srcId="{E5E5FAC6-6137-493A-AFCF-48F0DB7E5841}" destId="{027085D2-6C34-4733-9E48-D4023F973D39}" srcOrd="0" destOrd="0" presId="urn:microsoft.com/office/officeart/2005/8/layout/orgChart1"/>
     <dgm:cxn modelId="{D8F97A6C-71E6-45CF-8C9E-8B039FFFCE65}" srcId="{E5E5FAC6-6137-493A-AFCF-48F0DB7E5841}" destId="{7744D2B1-315B-4DC3-B122-A3153F29193E}" srcOrd="1" destOrd="0" parTransId="{C10FD2ED-AEDE-4125-A5DE-7081129DB763}" sibTransId="{98818A19-52F1-41BA-A410-963E704CB68F}"/>
-    <dgm:cxn modelId="{F730C472-7353-47FA-B3DA-E9EEEABDC6FA}" srcId="{E5E5FAC6-6137-493A-AFCF-48F0DB7E5841}" destId="{CBBFD718-5C73-4CA7-A8C1-B95794128BF8}" srcOrd="0" destOrd="0" parTransId="{5E8BD9AC-D52D-41EE-A2C4-EF4216569D2C}" sibTransId="{E246867B-BFB4-418B-9332-CB0AA8C7434C}"/>
-    <dgm:cxn modelId="{C98D3CF9-BD6E-48D2-9096-5B34436E1472}" type="presOf" srcId="{E5E5FAC6-6137-493A-AFCF-48F0DB7E5841}" destId="{027085D2-6C34-4733-9E48-D4023F973D39}" srcOrd="0" destOrd="0" presId="urn:microsoft.com/office/officeart/2005/8/layout/orgChart1"/>
-    <dgm:cxn modelId="{6BAA1D6D-7240-43B1-B135-656216CA1901}" type="presOf" srcId="{CBBFD718-5C73-4CA7-A8C1-B95794128BF8}" destId="{5DCD1722-B9E1-4CC8-A323-22382DE4F7DF}" srcOrd="1" destOrd="0" presId="urn:microsoft.com/office/officeart/2005/8/layout/orgChart1"/>
-    <dgm:cxn modelId="{412D6539-2E12-42CF-BA6C-D61E3F88BFE2}" type="presOf" srcId="{5E8BD9AC-D52D-41EE-A2C4-EF4216569D2C}" destId="{FFFFF3DB-F186-430A-9FD4-5E501E28B13A}" srcOrd="0" destOrd="0" presId="urn:microsoft.com/office/officeart/2005/8/layout/orgChart1"/>
-    <dgm:cxn modelId="{54C1FDCA-3AE8-4B12-B206-BE1655FE3F75}" srcId="{A7570A90-78D5-4E48-A224-D64597EBD661}" destId="{E5E5FAC6-6137-493A-AFCF-48F0DB7E5841}" srcOrd="0" destOrd="0" parTransId="{0C6655A7-A367-423E-BE05-7D1FF4F5C4D3}" sibTransId="{52F9C9CB-09B3-48E5-B0CD-760993F2307A}"/>
-    <dgm:cxn modelId="{0617F088-3F1C-476B-A2A9-B48BA731EFB7}" type="presOf" srcId="{A7570A90-78D5-4E48-A224-D64597EBD661}" destId="{CDE1ACCA-4F6E-40EE-9BE2-28B38AD78DC6}" srcOrd="0" destOrd="0" presId="urn:microsoft.com/office/officeart/2005/8/layout/orgChart1"/>
-    <dgm:cxn modelId="{16FB144F-0713-426E-8D67-D1ABB51B82B3}" type="presOf" srcId="{CBBFD718-5C73-4CA7-A8C1-B95794128BF8}" destId="{0A077FA9-5195-4CA5-9B9E-9404BD96984F}" srcOrd="0" destOrd="0" presId="urn:microsoft.com/office/officeart/2005/8/layout/orgChart1"/>
-    <dgm:cxn modelId="{51F23762-D643-4815-9BD3-3F2A1CDE1EF5}" type="presOf" srcId="{7744D2B1-315B-4DC3-B122-A3153F29193E}" destId="{4CD82B40-3485-4437-9838-A88F5B5F8179}" srcOrd="0" destOrd="0" presId="urn:microsoft.com/office/officeart/2005/8/layout/orgChart1"/>
-    <dgm:cxn modelId="{5B8CDEED-5B3A-464A-A4BF-50B28F581222}" type="presOf" srcId="{E5E5FAC6-6137-493A-AFCF-48F0DB7E5841}" destId="{092955F6-5152-42F7-A936-98A57A547EE7}" srcOrd="1" destOrd="0" presId="urn:microsoft.com/office/officeart/2005/8/layout/orgChart1"/>
-    <dgm:cxn modelId="{1EF7433B-1DD2-40B6-B0D3-7DD1B652702D}" type="presOf" srcId="{C10FD2ED-AEDE-4125-A5DE-7081129DB763}" destId="{4CEB6F93-9673-4746-858E-29CC1BB14E77}" srcOrd="0" destOrd="0" presId="urn:microsoft.com/office/officeart/2005/8/layout/orgChart1"/>
-    <dgm:cxn modelId="{C6CA273D-C315-4B51-BAB4-DB836A5DA0BA}" type="presOf" srcId="{7744D2B1-315B-4DC3-B122-A3153F29193E}" destId="{84052D5F-2742-4104-96ED-E0512FF76418}" srcOrd="1" destOrd="0" presId="urn:microsoft.com/office/officeart/2005/8/layout/orgChart1"/>
     <dgm:cxn modelId="{59343923-2B8A-4CA1-8B1C-4BEFFE237CD6}" type="presParOf" srcId="{CDE1ACCA-4F6E-40EE-9BE2-28B38AD78DC6}" destId="{ED1A191C-F5F1-44CE-969B-D7777D655B40}" srcOrd="0" destOrd="0" presId="urn:microsoft.com/office/officeart/2005/8/layout/orgChart1"/>
     <dgm:cxn modelId="{40BD0139-922B-4F84-9378-4F5E9B299972}" type="presParOf" srcId="{ED1A191C-F5F1-44CE-969B-D7777D655B40}" destId="{8573027C-1730-4E2F-8252-C400E4CB13D1}" srcOrd="0" destOrd="0" presId="urn:microsoft.com/office/officeart/2005/8/layout/orgChart1"/>
     <dgm:cxn modelId="{A8722378-215D-442C-B307-281C2530F7FD}" type="presParOf" srcId="{8573027C-1730-4E2F-8252-C400E4CB13D1}" destId="{027085D2-6C34-4733-9E48-D4023F973D39}" srcOrd="0" destOrd="0" presId="urn:microsoft.com/office/officeart/2005/8/layout/orgChart1"/>
@@ -6701,6 +6734,11 @@
   </dgm:cxnLst>
   <dgm:bg/>
   <dgm:whole/>
+  <dgm:extLst>
+    <a:ext uri="http://schemas.microsoft.com/office/drawing/2008/diagram">
+      <dsp:dataModelExt xmlns:dsp="http://schemas.microsoft.com/office/drawing/2008/diagram" relId="rId6" minVer="http://schemas.openxmlformats.org/drawingml/2006/diagram"/>
+    </a:ext>
+  </dgm:extLst>
 </dgm:dataModel>
 </file>
 
@@ -7292,37 +7330,37 @@
     </dgm:pt>
   </dgm:ptLst>
   <dgm:cxnLst>
-    <dgm:cxn modelId="{7084DAA2-E59C-4F0A-953C-E99F743B0047}" type="presOf" srcId="{273BCF21-B834-4BE7-BFF2-A3BF8465A53F}" destId="{E953EB40-DE25-40D4-B358-AB78D22BB191}" srcOrd="0" destOrd="0" presId="urn:microsoft.com/office/officeart/2005/8/layout/bProcess3"/>
-    <dgm:cxn modelId="{27F5D17B-1F57-47AD-BC26-075FD1D1A4D8}" srcId="{1B35C749-0FAC-4633-A54A-2151D01D73E9}" destId="{7AFCBDAD-B0CB-4971-B541-3D3D791D477E}" srcOrd="7" destOrd="0" parTransId="{27D384C5-1680-4017-8153-5B8323DE3B00}" sibTransId="{E3EB0BF8-5D37-4870-84DE-D7E24C915D0C}"/>
-    <dgm:cxn modelId="{3E55429E-5B52-4C12-842B-03DB2B2C2AE7}" type="presOf" srcId="{66EBE6AC-FFBA-4B21-9CFD-A20A2C50B09C}" destId="{59843F75-1210-4E69-AB1B-7DBEB2EBD213}" srcOrd="1" destOrd="0" presId="urn:microsoft.com/office/officeart/2005/8/layout/bProcess3"/>
+    <dgm:cxn modelId="{B9C6D9E8-FFAC-4240-ADAB-56D11ECA0C13}" type="presOf" srcId="{49F5C075-6F91-4534-90EF-1E3C46B7CDAB}" destId="{2285F4ED-8377-4AAE-8983-73210395BBEA}" srcOrd="0" destOrd="0" presId="urn:microsoft.com/office/officeart/2005/8/layout/bProcess3"/>
+    <dgm:cxn modelId="{D0869D4A-0CCA-41F3-9DD3-4ED596B06E75}" type="presOf" srcId="{50E9E6FB-F2A1-4C3C-8ED0-BAE19D73E35E}" destId="{2FAA9B58-6B5D-4335-A250-181F004764F0}" srcOrd="1" destOrd="0" presId="urn:microsoft.com/office/officeart/2005/8/layout/bProcess3"/>
     <dgm:cxn modelId="{FE542C3D-BBB3-4DD3-BF4B-7D402B414457}" type="presOf" srcId="{FD8B56A7-F781-4359-A392-18A5A5EAFD08}" destId="{32D3371C-2473-4D1C-8EEE-C1A1B80CEC07}" srcOrd="1" destOrd="0" presId="urn:microsoft.com/office/officeart/2005/8/layout/bProcess3"/>
-    <dgm:cxn modelId="{B4CE57C3-0833-4E62-948B-B57F681CF9C2}" srcId="{1B35C749-0FAC-4633-A54A-2151D01D73E9}" destId="{0BE9A2D8-31BB-4CE9-A3B0-CA3B9F9C68B3}" srcOrd="0" destOrd="0" parTransId="{8F091320-784A-4E72-9A29-F103CA12AD74}" sibTransId="{C5485345-1FEB-4BFA-AE2E-79B532928A84}"/>
+    <dgm:cxn modelId="{2C640B6D-DD5F-4676-A603-F59B381ECD34}" srcId="{1B35C749-0FAC-4633-A54A-2151D01D73E9}" destId="{692AF6EC-90A6-4438-B374-6D128451B9C6}" srcOrd="6" destOrd="0" parTransId="{8CA4902C-7B9F-4296-B079-CF1CDC158965}" sibTransId="{66EBE6AC-FFBA-4B21-9CFD-A20A2C50B09C}"/>
     <dgm:cxn modelId="{4BFDD7D3-9F7F-4AA8-B0A4-D088A543E3B8}" type="presOf" srcId="{50E9E6FB-F2A1-4C3C-8ED0-BAE19D73E35E}" destId="{AF214629-685D-4AAE-A91E-8FADE0AD143F}" srcOrd="0" destOrd="0" presId="urn:microsoft.com/office/officeart/2005/8/layout/bProcess3"/>
+    <dgm:cxn modelId="{E1EE091C-62ED-4F46-BF54-6B18F1F7092D}" type="presOf" srcId="{5C45A363-7A7A-4FA3-9ECD-B022C15B934E}" destId="{25F3FB88-54D6-425B-AC4E-7DD9E1B1A196}" srcOrd="0" destOrd="0" presId="urn:microsoft.com/office/officeart/2005/8/layout/bProcess3"/>
+    <dgm:cxn modelId="{00B6F532-F45E-48DC-964E-03AF45CCFBB2}" srcId="{1B35C749-0FAC-4633-A54A-2151D01D73E9}" destId="{5884A237-5755-41CC-8582-8E6C88D4C50A}" srcOrd="3" destOrd="0" parTransId="{0F6C4D36-F6CD-463D-A31D-295A670D6E05}" sibTransId="{FD8B56A7-F781-4359-A392-18A5A5EAFD08}"/>
+    <dgm:cxn modelId="{6C8D0457-665F-4F8E-A243-E3F043C576B1}" type="presOf" srcId="{C5485345-1FEB-4BFA-AE2E-79B532928A84}" destId="{20262314-1671-480A-9E81-70DF05D47B74}" srcOrd="0" destOrd="0" presId="urn:microsoft.com/office/officeart/2005/8/layout/bProcess3"/>
     <dgm:cxn modelId="{07C3D10E-B7BA-4EBB-A2D9-D8A00EF1505A}" type="presOf" srcId="{D904E3A6-6AFE-46A0-8334-D62B7D1609EC}" destId="{9F5AD9FD-D879-4A9C-A91D-4A29D743FF70}" srcOrd="0" destOrd="0" presId="urn:microsoft.com/office/officeart/2005/8/layout/bProcess3"/>
     <dgm:cxn modelId="{9C2E68D6-AA40-4B78-9B9D-73C3E25E5CD4}" type="presOf" srcId="{5C45A363-7A7A-4FA3-9ECD-B022C15B934E}" destId="{80167E65-E64B-46C6-B4D8-E698702E54E2}" srcOrd="1" destOrd="0" presId="urn:microsoft.com/office/officeart/2005/8/layout/bProcess3"/>
-    <dgm:cxn modelId="{372EA098-1D0E-4E3C-86ED-E305A81F6B9E}" type="presOf" srcId="{6076BBA9-B7A8-45A9-B3AD-F648D1EE4EF8}" destId="{6978034D-F608-4659-9128-71F98EC8E58B}" srcOrd="1" destOrd="0" presId="urn:microsoft.com/office/officeart/2005/8/layout/bProcess3"/>
-    <dgm:cxn modelId="{D0869D4A-0CCA-41F3-9DD3-4ED596B06E75}" type="presOf" srcId="{50E9E6FB-F2A1-4C3C-8ED0-BAE19D73E35E}" destId="{2FAA9B58-6B5D-4335-A250-181F004764F0}" srcOrd="1" destOrd="0" presId="urn:microsoft.com/office/officeart/2005/8/layout/bProcess3"/>
     <dgm:cxn modelId="{70A2AAEC-B27B-445E-B055-105D2BEECDE6}" type="presOf" srcId="{D771E5F0-E6ED-48C0-8CCD-F931688ADE09}" destId="{CCE20427-E360-40CC-B4B1-9BA59CA86C94}" srcOrd="0" destOrd="0" presId="urn:microsoft.com/office/officeart/2005/8/layout/bProcess3"/>
-    <dgm:cxn modelId="{C21BE7E8-3CC2-483A-9678-C8951B7672F9}" type="presOf" srcId="{FD8B56A7-F781-4359-A392-18A5A5EAFD08}" destId="{93E0DD11-107C-4740-A25F-830761CDA98E}" srcOrd="0" destOrd="0" presId="urn:microsoft.com/office/officeart/2005/8/layout/bProcess3"/>
-    <dgm:cxn modelId="{834A9293-829E-4FD6-B337-77CEA740EEAB}" type="presOf" srcId="{0BE9A2D8-31BB-4CE9-A3B0-CA3B9F9C68B3}" destId="{3FE18E05-D30A-4A95-BDA6-AD987600F5DC}" srcOrd="0" destOrd="0" presId="urn:microsoft.com/office/officeart/2005/8/layout/bProcess3"/>
-    <dgm:cxn modelId="{87A66FFD-515D-4FAA-BCC7-200FB8AF4DDA}" type="presOf" srcId="{E2299760-B0D4-404A-9CB9-A58AC28848AC}" destId="{7084BB0B-BD20-429A-A4CD-AD72DF04F99B}" srcOrd="0" destOrd="0" presId="urn:microsoft.com/office/officeart/2005/8/layout/bProcess3"/>
-    <dgm:cxn modelId="{40329A88-E4C3-48DD-AF5C-E1CB3CFCDC6C}" srcId="{1B35C749-0FAC-4633-A54A-2151D01D73E9}" destId="{D771E5F0-E6ED-48C0-8CCD-F931688ADE09}" srcOrd="4" destOrd="0" parTransId="{B6ACB080-9F8C-4A96-A543-131C0A294974}" sibTransId="{50E9E6FB-F2A1-4C3C-8ED0-BAE19D73E35E}"/>
+    <dgm:cxn modelId="{3E55429E-5B52-4C12-842B-03DB2B2C2AE7}" type="presOf" srcId="{66EBE6AC-FFBA-4B21-9CFD-A20A2C50B09C}" destId="{59843F75-1210-4E69-AB1B-7DBEB2EBD213}" srcOrd="1" destOrd="0" presId="urn:microsoft.com/office/officeart/2005/8/layout/bProcess3"/>
+    <dgm:cxn modelId="{8F0A02C8-CE18-4B8B-BC35-8DBA6204275E}" srcId="{1B35C749-0FAC-4633-A54A-2151D01D73E9}" destId="{273BCF21-B834-4BE7-BFF2-A3BF8465A53F}" srcOrd="2" destOrd="0" parTransId="{6C059FA2-8E71-4FCF-B6BB-E62CBD5637A9}" sibTransId="{49F5C075-6F91-4534-90EF-1E3C46B7CDAB}"/>
+    <dgm:cxn modelId="{72CBB521-2B0B-4FD5-B826-6B9AEE9B14F5}" type="presOf" srcId="{1B35C749-0FAC-4633-A54A-2151D01D73E9}" destId="{E06879EE-A190-46AD-92DE-2EF2FC2CE701}" srcOrd="0" destOrd="0" presId="urn:microsoft.com/office/officeart/2005/8/layout/bProcess3"/>
+    <dgm:cxn modelId="{4F6E135B-6F89-42E9-96A3-465A93FDF0CA}" srcId="{1B35C749-0FAC-4633-A54A-2151D01D73E9}" destId="{E2299760-B0D4-404A-9CB9-A58AC28848AC}" srcOrd="1" destOrd="0" parTransId="{3181CFE7-12C0-4BB7-BF57-420CFADB1DA0}" sibTransId="{6076BBA9-B7A8-45A9-B3AD-F648D1EE4EF8}"/>
+    <dgm:cxn modelId="{0298356F-8751-41D7-9E4D-6CF8A8E2672B}" type="presOf" srcId="{7AFCBDAD-B0CB-4971-B541-3D3D791D477E}" destId="{3D29F44E-3A44-478A-B972-695C660220F9}" srcOrd="0" destOrd="0" presId="urn:microsoft.com/office/officeart/2005/8/layout/bProcess3"/>
     <dgm:cxn modelId="{83199706-A662-424E-B443-F050CBF5147C}" type="presOf" srcId="{C5485345-1FEB-4BFA-AE2E-79B532928A84}" destId="{D10F74A4-29F7-476A-8333-D5A8AF43CB1C}" srcOrd="1" destOrd="0" presId="urn:microsoft.com/office/officeart/2005/8/layout/bProcess3"/>
     <dgm:cxn modelId="{55DC005C-8FAE-4756-AFA2-4CCAA32139E3}" srcId="{1B35C749-0FAC-4633-A54A-2151D01D73E9}" destId="{D904E3A6-6AFE-46A0-8334-D62B7D1609EC}" srcOrd="5" destOrd="0" parTransId="{8EE4547C-B4E9-4114-B2E9-A4F3F6370A81}" sibTransId="{5C45A363-7A7A-4FA3-9ECD-B022C15B934E}"/>
-    <dgm:cxn modelId="{0298356F-8751-41D7-9E4D-6CF8A8E2672B}" type="presOf" srcId="{7AFCBDAD-B0CB-4971-B541-3D3D791D477E}" destId="{3D29F44E-3A44-478A-B972-695C660220F9}" srcOrd="0" destOrd="0" presId="urn:microsoft.com/office/officeart/2005/8/layout/bProcess3"/>
-    <dgm:cxn modelId="{E1EE091C-62ED-4F46-BF54-6B18F1F7092D}" type="presOf" srcId="{5C45A363-7A7A-4FA3-9ECD-B022C15B934E}" destId="{25F3FB88-54D6-425B-AC4E-7DD9E1B1A196}" srcOrd="0" destOrd="0" presId="urn:microsoft.com/office/officeart/2005/8/layout/bProcess3"/>
+    <dgm:cxn modelId="{27F5D17B-1F57-47AD-BC26-075FD1D1A4D8}" srcId="{1B35C749-0FAC-4633-A54A-2151D01D73E9}" destId="{7AFCBDAD-B0CB-4971-B541-3D3D791D477E}" srcOrd="7" destOrd="0" parTransId="{27D384C5-1680-4017-8153-5B8323DE3B00}" sibTransId="{E3EB0BF8-5D37-4870-84DE-D7E24C915D0C}"/>
+    <dgm:cxn modelId="{C21BE7E8-3CC2-483A-9678-C8951B7672F9}" type="presOf" srcId="{FD8B56A7-F781-4359-A392-18A5A5EAFD08}" destId="{93E0DD11-107C-4740-A25F-830761CDA98E}" srcOrd="0" destOrd="0" presId="urn:microsoft.com/office/officeart/2005/8/layout/bProcess3"/>
+    <dgm:cxn modelId="{87A66FFD-515D-4FAA-BCC7-200FB8AF4DDA}" type="presOf" srcId="{E2299760-B0D4-404A-9CB9-A58AC28848AC}" destId="{7084BB0B-BD20-429A-A4CD-AD72DF04F99B}" srcOrd="0" destOrd="0" presId="urn:microsoft.com/office/officeart/2005/8/layout/bProcess3"/>
+    <dgm:cxn modelId="{D60E5242-A01B-4F14-BBF5-4650FB424686}" type="presOf" srcId="{66EBE6AC-FFBA-4B21-9CFD-A20A2C50B09C}" destId="{58269705-6462-4062-A853-0836726E2AD2}" srcOrd="0" destOrd="0" presId="urn:microsoft.com/office/officeart/2005/8/layout/bProcess3"/>
     <dgm:cxn modelId="{9EC1A9F1-CC2C-4077-89D7-505B106C8293}" type="presOf" srcId="{6076BBA9-B7A8-45A9-B3AD-F648D1EE4EF8}" destId="{CBD0AFA0-6BC1-4C32-BF50-B880F7A0B383}" srcOrd="0" destOrd="0" presId="urn:microsoft.com/office/officeart/2005/8/layout/bProcess3"/>
-    <dgm:cxn modelId="{4F6E135B-6F89-42E9-96A3-465A93FDF0CA}" srcId="{1B35C749-0FAC-4633-A54A-2151D01D73E9}" destId="{E2299760-B0D4-404A-9CB9-A58AC28848AC}" srcOrd="1" destOrd="0" parTransId="{3181CFE7-12C0-4BB7-BF57-420CFADB1DA0}" sibTransId="{6076BBA9-B7A8-45A9-B3AD-F648D1EE4EF8}"/>
-    <dgm:cxn modelId="{B9C6D9E8-FFAC-4240-ADAB-56D11ECA0C13}" type="presOf" srcId="{49F5C075-6F91-4534-90EF-1E3C46B7CDAB}" destId="{2285F4ED-8377-4AAE-8983-73210395BBEA}" srcOrd="0" destOrd="0" presId="urn:microsoft.com/office/officeart/2005/8/layout/bProcess3"/>
+    <dgm:cxn modelId="{6D89B2A8-2B66-488A-B519-DF0EE62ADA9F}" type="presOf" srcId="{49F5C075-6F91-4534-90EF-1E3C46B7CDAB}" destId="{4564C43D-E089-4EA6-A6B9-ED5CB86087FE}" srcOrd="1" destOrd="0" presId="urn:microsoft.com/office/officeart/2005/8/layout/bProcess3"/>
+    <dgm:cxn modelId="{77C2D4BC-347C-4496-B5DE-04C5EA555C3C}" type="presOf" srcId="{692AF6EC-90A6-4438-B374-6D128451B9C6}" destId="{8F19D433-964C-4295-8103-ED9156835325}" srcOrd="0" destOrd="0" presId="urn:microsoft.com/office/officeart/2005/8/layout/bProcess3"/>
+    <dgm:cxn modelId="{7084DAA2-E59C-4F0A-953C-E99F743B0047}" type="presOf" srcId="{273BCF21-B834-4BE7-BFF2-A3BF8465A53F}" destId="{E953EB40-DE25-40D4-B358-AB78D22BB191}" srcOrd="0" destOrd="0" presId="urn:microsoft.com/office/officeart/2005/8/layout/bProcess3"/>
+    <dgm:cxn modelId="{B4CE57C3-0833-4E62-948B-B57F681CF9C2}" srcId="{1B35C749-0FAC-4633-A54A-2151D01D73E9}" destId="{0BE9A2D8-31BB-4CE9-A3B0-CA3B9F9C68B3}" srcOrd="0" destOrd="0" parTransId="{8F091320-784A-4E72-9A29-F103CA12AD74}" sibTransId="{C5485345-1FEB-4BFA-AE2E-79B532928A84}"/>
+    <dgm:cxn modelId="{372EA098-1D0E-4E3C-86ED-E305A81F6B9E}" type="presOf" srcId="{6076BBA9-B7A8-45A9-B3AD-F648D1EE4EF8}" destId="{6978034D-F608-4659-9128-71F98EC8E58B}" srcOrd="1" destOrd="0" presId="urn:microsoft.com/office/officeart/2005/8/layout/bProcess3"/>
     <dgm:cxn modelId="{FB539F42-7165-44F7-ACD6-E71482E6640B}" type="presOf" srcId="{5884A237-5755-41CC-8582-8E6C88D4C50A}" destId="{978F40F7-1170-4426-9F6D-C85BB73408CF}" srcOrd="0" destOrd="0" presId="urn:microsoft.com/office/officeart/2005/8/layout/bProcess3"/>
-    <dgm:cxn modelId="{2C640B6D-DD5F-4676-A603-F59B381ECD34}" srcId="{1B35C749-0FAC-4633-A54A-2151D01D73E9}" destId="{692AF6EC-90A6-4438-B374-6D128451B9C6}" srcOrd="6" destOrd="0" parTransId="{8CA4902C-7B9F-4296-B079-CF1CDC158965}" sibTransId="{66EBE6AC-FFBA-4B21-9CFD-A20A2C50B09C}"/>
-    <dgm:cxn modelId="{6D89B2A8-2B66-488A-B519-DF0EE62ADA9F}" type="presOf" srcId="{49F5C075-6F91-4534-90EF-1E3C46B7CDAB}" destId="{4564C43D-E089-4EA6-A6B9-ED5CB86087FE}" srcOrd="1" destOrd="0" presId="urn:microsoft.com/office/officeart/2005/8/layout/bProcess3"/>
-    <dgm:cxn modelId="{8F0A02C8-CE18-4B8B-BC35-8DBA6204275E}" srcId="{1B35C749-0FAC-4633-A54A-2151D01D73E9}" destId="{273BCF21-B834-4BE7-BFF2-A3BF8465A53F}" srcOrd="2" destOrd="0" parTransId="{6C059FA2-8E71-4FCF-B6BB-E62CBD5637A9}" sibTransId="{49F5C075-6F91-4534-90EF-1E3C46B7CDAB}"/>
-    <dgm:cxn modelId="{D60E5242-A01B-4F14-BBF5-4650FB424686}" type="presOf" srcId="{66EBE6AC-FFBA-4B21-9CFD-A20A2C50B09C}" destId="{58269705-6462-4062-A853-0836726E2AD2}" srcOrd="0" destOrd="0" presId="urn:microsoft.com/office/officeart/2005/8/layout/bProcess3"/>
-    <dgm:cxn modelId="{00B6F532-F45E-48DC-964E-03AF45CCFBB2}" srcId="{1B35C749-0FAC-4633-A54A-2151D01D73E9}" destId="{5884A237-5755-41CC-8582-8E6C88D4C50A}" srcOrd="3" destOrd="0" parTransId="{0F6C4D36-F6CD-463D-A31D-295A670D6E05}" sibTransId="{FD8B56A7-F781-4359-A392-18A5A5EAFD08}"/>
-    <dgm:cxn modelId="{72CBB521-2B0B-4FD5-B826-6B9AEE9B14F5}" type="presOf" srcId="{1B35C749-0FAC-4633-A54A-2151D01D73E9}" destId="{E06879EE-A190-46AD-92DE-2EF2FC2CE701}" srcOrd="0" destOrd="0" presId="urn:microsoft.com/office/officeart/2005/8/layout/bProcess3"/>
-    <dgm:cxn modelId="{6C8D0457-665F-4F8E-A243-E3F043C576B1}" type="presOf" srcId="{C5485345-1FEB-4BFA-AE2E-79B532928A84}" destId="{20262314-1671-480A-9E81-70DF05D47B74}" srcOrd="0" destOrd="0" presId="urn:microsoft.com/office/officeart/2005/8/layout/bProcess3"/>
-    <dgm:cxn modelId="{77C2D4BC-347C-4496-B5DE-04C5EA555C3C}" type="presOf" srcId="{692AF6EC-90A6-4438-B374-6D128451B9C6}" destId="{8F19D433-964C-4295-8103-ED9156835325}" srcOrd="0" destOrd="0" presId="urn:microsoft.com/office/officeart/2005/8/layout/bProcess3"/>
+    <dgm:cxn modelId="{40329A88-E4C3-48DD-AF5C-E1CB3CFCDC6C}" srcId="{1B35C749-0FAC-4633-A54A-2151D01D73E9}" destId="{D771E5F0-E6ED-48C0-8CCD-F931688ADE09}" srcOrd="4" destOrd="0" parTransId="{B6ACB080-9F8C-4A96-A543-131C0A294974}" sibTransId="{50E9E6FB-F2A1-4C3C-8ED0-BAE19D73E35E}"/>
+    <dgm:cxn modelId="{834A9293-829E-4FD6-B337-77CEA740EEAB}" type="presOf" srcId="{0BE9A2D8-31BB-4CE9-A3B0-CA3B9F9C68B3}" destId="{3FE18E05-D30A-4A95-BDA6-AD987600F5DC}" srcOrd="0" destOrd="0" presId="urn:microsoft.com/office/officeart/2005/8/layout/bProcess3"/>
     <dgm:cxn modelId="{75D9CA11-E9D0-439F-8823-A08923390A81}" type="presParOf" srcId="{E06879EE-A190-46AD-92DE-2EF2FC2CE701}" destId="{3FE18E05-D30A-4A95-BDA6-AD987600F5DC}" srcOrd="0" destOrd="0" presId="urn:microsoft.com/office/officeart/2005/8/layout/bProcess3"/>
     <dgm:cxn modelId="{53D9D0D9-7DA2-44EB-8BF1-A6C496A14AE6}" type="presParOf" srcId="{E06879EE-A190-46AD-92DE-2EF2FC2CE701}" destId="{20262314-1671-480A-9E81-70DF05D47B74}" srcOrd="1" destOrd="0" presId="urn:microsoft.com/office/officeart/2005/8/layout/bProcess3"/>
     <dgm:cxn modelId="{05C8DEC3-15DA-445E-9DDC-49076B98B59F}" type="presParOf" srcId="{20262314-1671-480A-9E81-70DF05D47B74}" destId="{D10F74A4-29F7-476A-8333-D5A8AF43CB1C}" srcOrd="0" destOrd="0" presId="urn:microsoft.com/office/officeart/2005/8/layout/bProcess3"/>
@@ -7348,6 +7386,11 @@
   </dgm:cxnLst>
   <dgm:bg/>
   <dgm:whole/>
+  <dgm:extLst>
+    <a:ext uri="http://schemas.microsoft.com/office/drawing/2008/diagram">
+      <dsp:dataModelExt xmlns:dsp="http://schemas.microsoft.com/office/drawing/2008/diagram" relId="rId6" minVer="http://schemas.openxmlformats.org/drawingml/2006/diagram"/>
+    </a:ext>
+  </dgm:extLst>
 </dgm:dataModel>
 </file>
 
@@ -8623,9 +8666,9 @@
     <dgm:cxn modelId="{0EEC7D51-AFA1-4530-83FC-92EDD602E361}" srcId="{4CE94B52-B7CA-49DB-913E-DFFD0B512971}" destId="{8C46C7A8-C3A6-416C-BE4D-1D59C04A0616}" srcOrd="0" destOrd="0" parTransId="{5291BAFE-50EB-4AEB-9CE0-3B2F36452EFC}" sibTransId="{5E34B318-15D3-4018-B28E-4B742A68B413}"/>
     <dgm:cxn modelId="{A812B344-420D-40C9-A0AE-B724FF0BB55F}" srcId="{4CE94B52-B7CA-49DB-913E-DFFD0B512971}" destId="{57BAB4A4-4C96-4566-A071-764E0D6471C5}" srcOrd="1" destOrd="0" parTransId="{CB20C354-CF44-483E-B30D-65DCD4BEFBCF}" sibTransId="{7A0136B2-C62B-42F0-9776-6B80221F7A3A}"/>
     <dgm:cxn modelId="{6FECCF32-907F-444C-9E1D-DABF253F0AE6}" type="presOf" srcId="{32566BEC-8261-4EDA-BD80-21C6B4E839C2}" destId="{42DE635D-FEA7-4D13-A18B-3D2CDD8D9D25}" srcOrd="0" destOrd="0" presId="urn:microsoft.com/office/officeart/2005/8/layout/orgChart1"/>
+    <dgm:cxn modelId="{16E5C66E-8E46-44C5-85E9-9CC00A71C5CC}" type="presOf" srcId="{8C46C7A8-C3A6-416C-BE4D-1D59C04A0616}" destId="{1A16ED28-EE93-42F0-8ECD-B0B8EA6681AE}" srcOrd="1" destOrd="0" presId="urn:microsoft.com/office/officeart/2005/8/layout/orgChart1"/>
     <dgm:cxn modelId="{41D3E4D8-F864-4A21-AC32-8875BFC5343B}" type="presOf" srcId="{69AD430E-C984-4C3F-AD04-6AE9245422DE}" destId="{905FA4BD-823A-4DBC-B6C3-AE0EF7EB544B}" srcOrd="0" destOrd="0" presId="urn:microsoft.com/office/officeart/2005/8/layout/orgChart1"/>
     <dgm:cxn modelId="{4D8C1491-A2A0-4D7C-98E6-635D280B9624}" type="presOf" srcId="{4046CB89-1C62-4AE9-8F32-765CFB574D93}" destId="{DF52E326-4209-46ED-A116-13A781D164D3}" srcOrd="1" destOrd="0" presId="urn:microsoft.com/office/officeart/2005/8/layout/orgChart1"/>
-    <dgm:cxn modelId="{16E5C66E-8E46-44C5-85E9-9CC00A71C5CC}" type="presOf" srcId="{8C46C7A8-C3A6-416C-BE4D-1D59C04A0616}" destId="{1A16ED28-EE93-42F0-8ECD-B0B8EA6681AE}" srcOrd="1" destOrd="0" presId="urn:microsoft.com/office/officeart/2005/8/layout/orgChart1"/>
     <dgm:cxn modelId="{6AE92279-B42F-422A-ACBF-43071E69B28D}" type="presOf" srcId="{FD1BDC84-2197-4366-887A-CA22AD7CB0C7}" destId="{6D56C6D8-74B1-43BE-B288-DF6E5634A838}" srcOrd="0" destOrd="0" presId="urn:microsoft.com/office/officeart/2005/8/layout/orgChart1"/>
     <dgm:cxn modelId="{EDA9BECD-C6CA-453A-98D7-76C215F6D7A7}" type="presOf" srcId="{4C125362-B319-4302-82C6-B82336E14B66}" destId="{25141F2D-D674-49BB-AE68-0CA0C220D782}" srcOrd="0" destOrd="0" presId="urn:microsoft.com/office/officeart/2005/8/layout/orgChart1"/>
     <dgm:cxn modelId="{C875C6A4-1B04-4B5A-B4BD-5E15F0C8EFB0}" type="presOf" srcId="{7137F455-13A3-4DC9-8C7B-BC8FD94C6324}" destId="{986EBD1B-F624-49CF-A7A2-8DAECA30A5D6}" srcOrd="0" destOrd="0" presId="urn:microsoft.com/office/officeart/2005/8/layout/orgChart1"/>
@@ -8658,8 +8701,8 @@
     <dgm:cxn modelId="{E180A5B4-23FC-4DA4-AA8F-BAD2FAD130FD}" type="presOf" srcId="{62BB8B7A-11B3-4683-A3B2-198F9DB8CF18}" destId="{667723AA-80BA-4063-808C-36ED4D8CF8FE}" srcOrd="1" destOrd="0" presId="urn:microsoft.com/office/officeart/2005/8/layout/orgChart1"/>
     <dgm:cxn modelId="{067363B5-9A36-49E5-B189-186492D5F7D3}" type="presOf" srcId="{4CE94B52-B7CA-49DB-913E-DFFD0B512971}" destId="{10EFC701-3233-4158-BF9F-CBAA1551CA49}" srcOrd="0" destOrd="0" presId="urn:microsoft.com/office/officeart/2005/8/layout/orgChart1"/>
     <dgm:cxn modelId="{A5A0C5CF-0DE8-44FB-8EF9-578A2ABA1AA0}" type="presOf" srcId="{CB20C354-CF44-483E-B30D-65DCD4BEFBCF}" destId="{6F0B2341-6DE9-45F7-B07F-BCBA3B1ED4CE}" srcOrd="0" destOrd="0" presId="urn:microsoft.com/office/officeart/2005/8/layout/orgChart1"/>
+    <dgm:cxn modelId="{2A78422B-1B78-4A05-89B6-1D93375C9A11}" type="presOf" srcId="{79F3DFFE-3EBC-4C48-85F0-30EB10204FB9}" destId="{09C0EBA3-7236-4AE4-A870-635EA7F58EE0}" srcOrd="1" destOrd="0" presId="urn:microsoft.com/office/officeart/2005/8/layout/orgChart1"/>
     <dgm:cxn modelId="{AE34F005-0BC6-4724-8AE5-C6EF23CA19AB}" type="presOf" srcId="{79F3DFFE-3EBC-4C48-85F0-30EB10204FB9}" destId="{D1370E5A-24B5-48E4-A609-70BFD9FCB851}" srcOrd="0" destOrd="0" presId="urn:microsoft.com/office/officeart/2005/8/layout/orgChart1"/>
-    <dgm:cxn modelId="{2A78422B-1B78-4A05-89B6-1D93375C9A11}" type="presOf" srcId="{79F3DFFE-3EBC-4C48-85F0-30EB10204FB9}" destId="{09C0EBA3-7236-4AE4-A870-635EA7F58EE0}" srcOrd="1" destOrd="0" presId="urn:microsoft.com/office/officeart/2005/8/layout/orgChart1"/>
     <dgm:cxn modelId="{B8DAF96E-AF23-4208-8F4C-2BA517CC7B21}" type="presOf" srcId="{344E5DE4-1469-41EC-A8E3-47C52589CB06}" destId="{1A5C9C4F-64FB-40ED-A99E-D38A51E57A1A}" srcOrd="0" destOrd="0" presId="urn:microsoft.com/office/officeart/2005/8/layout/orgChart1"/>
     <dgm:cxn modelId="{D68CD62D-E676-4558-B5B2-C7155D893189}" type="presOf" srcId="{32566BEC-8261-4EDA-BD80-21C6B4E839C2}" destId="{B11876D7-9C9C-47A0-BAE8-985FB97E955A}" srcOrd="1" destOrd="0" presId="urn:microsoft.com/office/officeart/2005/8/layout/orgChart1"/>
     <dgm:cxn modelId="{734512D6-4F45-4F55-B098-B9F33F98EAE9}" type="presOf" srcId="{6F627769-1BC1-4180-BBAD-43FBEF02E7A3}" destId="{8C178A2A-732D-4104-AE7D-0EB7E87922FE}" srcOrd="0" destOrd="0" presId="urn:microsoft.com/office/officeart/2005/8/layout/orgChart1"/>
@@ -8759,7 +8802,72 @@
   </dgm:cxnLst>
   <dgm:bg/>
   <dgm:whole/>
+  <dgm:extLst>
+    <a:ext uri="http://schemas.microsoft.com/office/drawing/2008/diagram">
+      <dsp:dataModelExt xmlns:dsp="http://schemas.microsoft.com/office/drawing/2008/diagram" relId="rId6" minVer="http://schemas.openxmlformats.org/drawingml/2006/diagram"/>
+    </a:ext>
+  </dgm:extLst>
 </dgm:dataModel>
+</file>
+
+<file path=ppt/diagrams/drawing1.xml><?xml version="1.0" encoding="utf-8"?>
+<dsp:drawing xmlns:dgm="http://schemas.openxmlformats.org/drawingml/2006/diagram" xmlns:dsp="http://schemas.microsoft.com/office/drawing/2008/diagram" xmlns:a="http://schemas.openxmlformats.org/drawingml/2006/main">
+  <dsp:spTree>
+    <dsp:nvGrpSpPr>
+      <dsp:cNvPr id="0" name=""/>
+      <dsp:cNvGrpSpPr/>
+    </dsp:nvGrpSpPr>
+    <dsp:grpSpPr/>
+  </dsp:spTree>
+</dsp:drawing>
+</file>
+
+<file path=ppt/diagrams/drawing2.xml><?xml version="1.0" encoding="utf-8"?>
+<dsp:drawing xmlns:dgm="http://schemas.openxmlformats.org/drawingml/2006/diagram" xmlns:dsp="http://schemas.microsoft.com/office/drawing/2008/diagram" xmlns:a="http://schemas.openxmlformats.org/drawingml/2006/main">
+  <dsp:spTree>
+    <dsp:nvGrpSpPr>
+      <dsp:cNvPr id="0" name=""/>
+      <dsp:cNvGrpSpPr/>
+    </dsp:nvGrpSpPr>
+    <dsp:grpSpPr/>
+  </dsp:spTree>
+</dsp:drawing>
+</file>
+
+<file path=ppt/diagrams/drawing3.xml><?xml version="1.0" encoding="utf-8"?>
+<dsp:drawing xmlns:dgm="http://schemas.openxmlformats.org/drawingml/2006/diagram" xmlns:dsp="http://schemas.microsoft.com/office/drawing/2008/diagram" xmlns:a="http://schemas.openxmlformats.org/drawingml/2006/main">
+  <dsp:spTree>
+    <dsp:nvGrpSpPr>
+      <dsp:cNvPr id="0" name=""/>
+      <dsp:cNvGrpSpPr/>
+    </dsp:nvGrpSpPr>
+    <dsp:grpSpPr/>
+  </dsp:spTree>
+</dsp:drawing>
+</file>
+
+<file path=ppt/diagrams/drawing4.xml><?xml version="1.0" encoding="utf-8"?>
+<dsp:drawing xmlns:dgm="http://schemas.openxmlformats.org/drawingml/2006/diagram" xmlns:dsp="http://schemas.microsoft.com/office/drawing/2008/diagram" xmlns:a="http://schemas.openxmlformats.org/drawingml/2006/main">
+  <dsp:spTree>
+    <dsp:nvGrpSpPr>
+      <dsp:cNvPr id="0" name=""/>
+      <dsp:cNvGrpSpPr/>
+    </dsp:nvGrpSpPr>
+    <dsp:grpSpPr/>
+  </dsp:spTree>
+</dsp:drawing>
+</file>
+
+<file path=ppt/diagrams/drawing5.xml><?xml version="1.0" encoding="utf-8"?>
+<dsp:drawing xmlns:dgm="http://schemas.openxmlformats.org/drawingml/2006/diagram" xmlns:dsp="http://schemas.microsoft.com/office/drawing/2008/diagram" xmlns:a="http://schemas.openxmlformats.org/drawingml/2006/main">
+  <dsp:spTree>
+    <dsp:nvGrpSpPr>
+      <dsp:cNvPr id="0" name=""/>
+      <dsp:cNvGrpSpPr/>
+    </dsp:nvGrpSpPr>
+    <dsp:grpSpPr/>
+  </dsp:spTree>
+</dsp:drawing>
 </file>
 
 <file path=ppt/diagrams/layout1.xml><?xml version="1.0" encoding="utf-8"?>
@@ -19335,6 +19443,11 @@
         </p:txBody>
       </p:sp>
     </p:spTree>
+    <p:extLst>
+      <p:ext uri="{BB962C8B-B14F-4D97-AF65-F5344CB8AC3E}">
+        <p14:creationId xmlns:p14="http://schemas.microsoft.com/office/powerpoint/2010/main" val="2833881311"/>
+      </p:ext>
+    </p:extLst>
   </p:cSld>
   <p:clrMap bg1="lt1" tx1="dk1" bg2="lt2" tx2="dk2" accent1="accent1" accent2="accent2" accent3="accent3" accent4="accent4" accent5="accent5" accent6="accent6" hlink="hlink" folHlink="folHlink"/>
   <p:notesStyle>
@@ -30874,6 +30987,778 @@
 </file>
 
 <file path=ppt/slides/slide71.xml><?xml version="1.0" encoding="utf-8"?>
+<p:sld xmlns:a="http://schemas.openxmlformats.org/drawingml/2006/main" xmlns:r="http://schemas.openxmlformats.org/officeDocument/2006/relationships" xmlns:p="http://schemas.openxmlformats.org/presentationml/2006/main">
+  <p:cSld>
+    <p:spTree>
+      <p:nvGrpSpPr>
+        <p:cNvPr id="1" name=""/>
+        <p:cNvGrpSpPr/>
+        <p:nvPr/>
+      </p:nvGrpSpPr>
+      <p:grpSpPr>
+        <a:xfrm>
+          <a:off x="0" y="0"/>
+          <a:ext cx="0" cy="0"/>
+          <a:chOff x="0" y="0"/>
+          <a:chExt cx="0" cy="0"/>
+        </a:xfrm>
+      </p:grpSpPr>
+      <p:sp>
+        <p:nvSpPr>
+          <p:cNvPr id="2" name="Title 1"/>
+          <p:cNvSpPr>
+            <a:spLocks noGrp="1"/>
+          </p:cNvSpPr>
+          <p:nvPr>
+            <p:ph type="title"/>
+          </p:nvPr>
+        </p:nvSpPr>
+        <p:spPr/>
+        <p:txBody>
+          <a:bodyPr/>
+          <a:lstStyle/>
+          <a:p>
+            <a:r>
+              <a:rPr lang="en-US" dirty="0" smtClean="0"/>
+              <a:t>Lake Ecosystem</a:t>
+            </a:r>
+            <a:endParaRPr lang="en-IN" dirty="0"/>
+          </a:p>
+        </p:txBody>
+      </p:sp>
+      <p:sp>
+        <p:nvSpPr>
+          <p:cNvPr id="3" name="Content Placeholder 2"/>
+          <p:cNvSpPr>
+            <a:spLocks noGrp="1"/>
+          </p:cNvSpPr>
+          <p:nvPr>
+            <p:ph idx="1"/>
+          </p:nvPr>
+        </p:nvSpPr>
+        <p:spPr/>
+        <p:txBody>
+          <a:bodyPr/>
+          <a:lstStyle/>
+          <a:p>
+            <a:r>
+              <a:rPr lang="en-US" dirty="0" smtClean="0"/>
+              <a:t>Lakes are large natural shallow water bodies.</a:t>
+            </a:r>
+          </a:p>
+          <a:p>
+            <a:r>
+              <a:rPr lang="en-US" dirty="0" smtClean="0"/>
+              <a:t>Lakes are used for many purpose.</a:t>
+            </a:r>
+          </a:p>
+          <a:p>
+            <a:r>
+              <a:rPr lang="en-US" dirty="0" smtClean="0"/>
+              <a:t>Lakes are supplied with water from rainfall, melting snow and streams.</a:t>
+            </a:r>
+          </a:p>
+        </p:txBody>
+      </p:sp>
+    </p:spTree>
+    <p:extLst>
+      <p:ext uri="{BB962C8B-B14F-4D97-AF65-F5344CB8AC3E}">
+        <p14:creationId xmlns:p14="http://schemas.microsoft.com/office/powerpoint/2010/main" val="2724335759"/>
+      </p:ext>
+    </p:extLst>
+  </p:cSld>
+  <p:clrMapOvr>
+    <a:masterClrMapping/>
+  </p:clrMapOvr>
+</p:sld>
+</file>
+
+<file path=ppt/slides/slide72.xml><?xml version="1.0" encoding="utf-8"?>
+<p:sld xmlns:a="http://schemas.openxmlformats.org/drawingml/2006/main" xmlns:r="http://schemas.openxmlformats.org/officeDocument/2006/relationships" xmlns:p="http://schemas.openxmlformats.org/presentationml/2006/main">
+  <p:cSld>
+    <p:spTree>
+      <p:nvGrpSpPr>
+        <p:cNvPr id="1" name=""/>
+        <p:cNvGrpSpPr/>
+        <p:nvPr/>
+      </p:nvGrpSpPr>
+      <p:grpSpPr>
+        <a:xfrm>
+          <a:off x="0" y="0"/>
+          <a:ext cx="0" cy="0"/>
+          <a:chOff x="0" y="0"/>
+          <a:chExt cx="0" cy="0"/>
+        </a:xfrm>
+      </p:grpSpPr>
+      <p:sp>
+        <p:nvSpPr>
+          <p:cNvPr id="2" name="Title 1"/>
+          <p:cNvSpPr>
+            <a:spLocks noGrp="1"/>
+          </p:cNvSpPr>
+          <p:nvPr>
+            <p:ph type="title"/>
+          </p:nvPr>
+        </p:nvSpPr>
+        <p:spPr/>
+        <p:txBody>
+          <a:bodyPr/>
+          <a:lstStyle/>
+          <a:p>
+            <a:r>
+              <a:rPr lang="en-US" dirty="0" smtClean="0"/>
+              <a:t>Types of Lakes</a:t>
+            </a:r>
+            <a:endParaRPr lang="en-IN" dirty="0"/>
+          </a:p>
+        </p:txBody>
+      </p:sp>
+      <p:sp>
+        <p:nvSpPr>
+          <p:cNvPr id="3" name="Content Placeholder 2"/>
+          <p:cNvSpPr>
+            <a:spLocks noGrp="1"/>
+          </p:cNvSpPr>
+          <p:nvPr>
+            <p:ph idx="1"/>
+          </p:nvPr>
+        </p:nvSpPr>
+        <p:spPr/>
+        <p:txBody>
+          <a:bodyPr/>
+          <a:lstStyle/>
+          <a:p>
+            <a:r>
+              <a:rPr lang="en-US" dirty="0" smtClean="0"/>
+              <a:t>Oligotrophic lakes</a:t>
+            </a:r>
+          </a:p>
+          <a:p>
+            <a:pPr lvl="1"/>
+            <a:r>
+              <a:rPr lang="en-US" dirty="0" smtClean="0"/>
+              <a:t>Low nutrient concentrations.</a:t>
+            </a:r>
+          </a:p>
+          <a:p>
+            <a:r>
+              <a:rPr lang="en-US" dirty="0" smtClean="0"/>
+              <a:t>Eutrophic lakes</a:t>
+            </a:r>
+          </a:p>
+          <a:p>
+            <a:pPr lvl="1"/>
+            <a:r>
+              <a:rPr lang="en-US" dirty="0" smtClean="0"/>
+              <a:t>They are over nourished by nutrients like N and P.</a:t>
+            </a:r>
+          </a:p>
+          <a:p>
+            <a:r>
+              <a:rPr lang="en-US" dirty="0" smtClean="0"/>
+              <a:t>Dystrophic </a:t>
+            </a:r>
+            <a:r>
+              <a:rPr lang="en-US" dirty="0" err="1" smtClean="0"/>
+              <a:t>lasks</a:t>
+            </a:r>
+            <a:endParaRPr lang="en-US" dirty="0"/>
+          </a:p>
+          <a:p>
+            <a:pPr lvl="1"/>
+            <a:r>
+              <a:rPr lang="en-US" dirty="0" smtClean="0"/>
+              <a:t>They have low pH, high </a:t>
+            </a:r>
+            <a:r>
+              <a:rPr lang="en-US" dirty="0" err="1" smtClean="0"/>
+              <a:t>humic</a:t>
+            </a:r>
+            <a:r>
+              <a:rPr lang="en-US" dirty="0" smtClean="0"/>
+              <a:t> acid content and brown waters</a:t>
+            </a:r>
+          </a:p>
+        </p:txBody>
+      </p:sp>
+    </p:spTree>
+    <p:extLst>
+      <p:ext uri="{BB962C8B-B14F-4D97-AF65-F5344CB8AC3E}">
+        <p14:creationId xmlns:p14="http://schemas.microsoft.com/office/powerpoint/2010/main" val="3183047995"/>
+      </p:ext>
+    </p:extLst>
+  </p:cSld>
+  <p:clrMapOvr>
+    <a:masterClrMapping/>
+  </p:clrMapOvr>
+</p:sld>
+</file>
+
+<file path=ppt/slides/slide73.xml><?xml version="1.0" encoding="utf-8"?>
+<p:sld xmlns:a="http://schemas.openxmlformats.org/drawingml/2006/main" xmlns:r="http://schemas.openxmlformats.org/officeDocument/2006/relationships" xmlns:p="http://schemas.openxmlformats.org/presentationml/2006/main">
+  <p:cSld>
+    <p:spTree>
+      <p:nvGrpSpPr>
+        <p:cNvPr id="1" name=""/>
+        <p:cNvGrpSpPr/>
+        <p:nvPr/>
+      </p:nvGrpSpPr>
+      <p:grpSpPr>
+        <a:xfrm>
+          <a:off x="0" y="0"/>
+          <a:ext cx="0" cy="0"/>
+          <a:chOff x="0" y="0"/>
+          <a:chExt cx="0" cy="0"/>
+        </a:xfrm>
+      </p:grpSpPr>
+      <p:sp>
+        <p:nvSpPr>
+          <p:cNvPr id="2" name="Title 1"/>
+          <p:cNvSpPr>
+            <a:spLocks noGrp="1"/>
+          </p:cNvSpPr>
+          <p:nvPr>
+            <p:ph type="title"/>
+          </p:nvPr>
+        </p:nvSpPr>
+        <p:spPr/>
+        <p:txBody>
+          <a:bodyPr/>
+          <a:lstStyle/>
+          <a:p>
+            <a:r>
+              <a:rPr lang="en-US" dirty="0" smtClean="0"/>
+              <a:t>Types of Lakes</a:t>
+            </a:r>
+            <a:endParaRPr lang="en-IN" dirty="0"/>
+          </a:p>
+        </p:txBody>
+      </p:sp>
+      <p:sp>
+        <p:nvSpPr>
+          <p:cNvPr id="3" name="Content Placeholder 2"/>
+          <p:cNvSpPr>
+            <a:spLocks noGrp="1"/>
+          </p:cNvSpPr>
+          <p:nvPr>
+            <p:ph idx="1"/>
+          </p:nvPr>
+        </p:nvSpPr>
+        <p:spPr/>
+        <p:txBody>
+          <a:bodyPr/>
+          <a:lstStyle/>
+          <a:p>
+            <a:r>
+              <a:rPr lang="en-US" dirty="0" smtClean="0"/>
+              <a:t>Volcanic lakes</a:t>
+            </a:r>
+          </a:p>
+          <a:p>
+            <a:pPr lvl="1"/>
+            <a:r>
+              <a:rPr lang="en-US" dirty="0" smtClean="0"/>
+              <a:t>They receive water from magma after volcanic eruptions.</a:t>
+            </a:r>
+          </a:p>
+          <a:p>
+            <a:r>
+              <a:rPr lang="en-US" dirty="0" err="1" smtClean="0"/>
+              <a:t>Meromictic</a:t>
+            </a:r>
+            <a:r>
+              <a:rPr lang="en-US" dirty="0" smtClean="0"/>
+              <a:t> lakes</a:t>
+            </a:r>
+          </a:p>
+          <a:p>
+            <a:pPr lvl="1"/>
+            <a:r>
+              <a:rPr lang="en-US" dirty="0" smtClean="0"/>
+              <a:t>They are rich in salts.</a:t>
+            </a:r>
+          </a:p>
+          <a:p>
+            <a:r>
+              <a:rPr lang="en-US" dirty="0" smtClean="0"/>
+              <a:t>Artificial Lakes</a:t>
+            </a:r>
+          </a:p>
+          <a:p>
+            <a:pPr lvl="1"/>
+            <a:r>
+              <a:rPr lang="en-US" dirty="0" smtClean="0"/>
+              <a:t>They are created due to construction of dams.</a:t>
+            </a:r>
+          </a:p>
+          <a:p>
+            <a:pPr lvl="1"/>
+            <a:endParaRPr lang="en-US" dirty="0" smtClean="0"/>
+          </a:p>
+        </p:txBody>
+      </p:sp>
+    </p:spTree>
+    <p:extLst>
+      <p:ext uri="{BB962C8B-B14F-4D97-AF65-F5344CB8AC3E}">
+        <p14:creationId xmlns:p14="http://schemas.microsoft.com/office/powerpoint/2010/main" val="4008828244"/>
+      </p:ext>
+    </p:extLst>
+  </p:cSld>
+  <p:clrMapOvr>
+    <a:masterClrMapping/>
+  </p:clrMapOvr>
+</p:sld>
+</file>
+
+<file path=ppt/slides/slide74.xml><?xml version="1.0" encoding="utf-8"?>
+<p:sld xmlns:a="http://schemas.openxmlformats.org/drawingml/2006/main" xmlns:r="http://schemas.openxmlformats.org/officeDocument/2006/relationships" xmlns:p="http://schemas.openxmlformats.org/presentationml/2006/main">
+  <p:cSld>
+    <p:spTree>
+      <p:nvGrpSpPr>
+        <p:cNvPr id="1" name=""/>
+        <p:cNvGrpSpPr/>
+        <p:nvPr/>
+      </p:nvGrpSpPr>
+      <p:grpSpPr>
+        <a:xfrm>
+          <a:off x="0" y="0"/>
+          <a:ext cx="0" cy="0"/>
+          <a:chOff x="0" y="0"/>
+          <a:chExt cx="0" cy="0"/>
+        </a:xfrm>
+      </p:grpSpPr>
+      <p:sp>
+        <p:nvSpPr>
+          <p:cNvPr id="2" name="Title 1"/>
+          <p:cNvSpPr>
+            <a:spLocks noGrp="1"/>
+          </p:cNvSpPr>
+          <p:nvPr>
+            <p:ph type="title"/>
+          </p:nvPr>
+        </p:nvSpPr>
+        <p:spPr/>
+        <p:txBody>
+          <a:bodyPr/>
+          <a:lstStyle/>
+          <a:p>
+            <a:r>
+              <a:rPr lang="en-US" dirty="0" smtClean="0"/>
+              <a:t>Zones of Lake</a:t>
+            </a:r>
+            <a:endParaRPr lang="en-IN" dirty="0"/>
+          </a:p>
+        </p:txBody>
+      </p:sp>
+      <p:pic>
+        <p:nvPicPr>
+          <p:cNvPr id="1026" name="Picture 2" descr="Image result for zones of lake"/>
+          <p:cNvPicPr>
+            <a:picLocks noChangeAspect="1" noChangeArrowheads="1"/>
+          </p:cNvPicPr>
+          <p:nvPr/>
+        </p:nvPicPr>
+        <p:blipFill>
+          <a:blip r:embed="rId2">
+            <a:extLst>
+              <a:ext uri="{28A0092B-C50C-407E-A947-70E740481C1C}">
+                <a14:useLocalDpi xmlns:a14="http://schemas.microsoft.com/office/drawing/2010/main" val="0"/>
+              </a:ext>
+            </a:extLst>
+          </a:blip>
+          <a:srcRect/>
+          <a:stretch>
+            <a:fillRect/>
+          </a:stretch>
+        </p:blipFill>
+        <p:spPr bwMode="auto">
+          <a:xfrm>
+            <a:off x="581074" y="2074567"/>
+            <a:ext cx="8105726" cy="4073130"/>
+          </a:xfrm>
+          <a:prstGeom prst="rect">
+            <a:avLst/>
+          </a:prstGeom>
+        </p:spPr>
+        <p:style>
+          <a:lnRef idx="2">
+            <a:schemeClr val="accent1"/>
+          </a:lnRef>
+          <a:fillRef idx="1">
+            <a:schemeClr val="lt1"/>
+          </a:fillRef>
+          <a:effectRef idx="0">
+            <a:schemeClr val="accent1"/>
+          </a:effectRef>
+          <a:fontRef idx="minor">
+            <a:schemeClr val="dk1"/>
+          </a:fontRef>
+        </p:style>
+      </p:pic>
+    </p:spTree>
+    <p:extLst>
+      <p:ext uri="{BB962C8B-B14F-4D97-AF65-F5344CB8AC3E}">
+        <p14:creationId xmlns:p14="http://schemas.microsoft.com/office/powerpoint/2010/main" val="2581143382"/>
+      </p:ext>
+    </p:extLst>
+  </p:cSld>
+  <p:clrMapOvr>
+    <a:masterClrMapping/>
+  </p:clrMapOvr>
+</p:sld>
+</file>
+
+<file path=ppt/slides/slide75.xml><?xml version="1.0" encoding="utf-8"?>
+<p:sld xmlns:a="http://schemas.openxmlformats.org/drawingml/2006/main" xmlns:r="http://schemas.openxmlformats.org/officeDocument/2006/relationships" xmlns:p="http://schemas.openxmlformats.org/presentationml/2006/main">
+  <p:cSld>
+    <p:spTree>
+      <p:nvGrpSpPr>
+        <p:cNvPr id="1" name=""/>
+        <p:cNvGrpSpPr/>
+        <p:nvPr/>
+      </p:nvGrpSpPr>
+      <p:grpSpPr>
+        <a:xfrm>
+          <a:off x="0" y="0"/>
+          <a:ext cx="0" cy="0"/>
+          <a:chOff x="0" y="0"/>
+          <a:chExt cx="0" cy="0"/>
+        </a:xfrm>
+      </p:grpSpPr>
+      <p:sp>
+        <p:nvSpPr>
+          <p:cNvPr id="2" name="Title 1"/>
+          <p:cNvSpPr>
+            <a:spLocks noGrp="1"/>
+          </p:cNvSpPr>
+          <p:nvPr>
+            <p:ph type="title"/>
+          </p:nvPr>
+        </p:nvSpPr>
+        <p:spPr/>
+        <p:txBody>
+          <a:bodyPr/>
+          <a:lstStyle/>
+          <a:p>
+            <a:r>
+              <a:rPr lang="en-US" dirty="0"/>
+              <a:t>Zones of Lake</a:t>
+            </a:r>
+            <a:endParaRPr lang="en-IN" dirty="0"/>
+          </a:p>
+        </p:txBody>
+      </p:sp>
+      <p:sp>
+        <p:nvSpPr>
+          <p:cNvPr id="3" name="Content Placeholder 2"/>
+          <p:cNvSpPr>
+            <a:spLocks noGrp="1"/>
+          </p:cNvSpPr>
+          <p:nvPr>
+            <p:ph idx="1"/>
+          </p:nvPr>
+        </p:nvSpPr>
+        <p:spPr/>
+        <p:txBody>
+          <a:bodyPr/>
+          <a:lstStyle/>
+          <a:p>
+            <a:r>
+              <a:rPr lang="en-US" dirty="0" smtClean="0"/>
+              <a:t>Littoral Zone</a:t>
+            </a:r>
+          </a:p>
+          <a:p>
+            <a:pPr lvl="1" algn="just"/>
+            <a:r>
+              <a:rPr lang="en-US" dirty="0"/>
+              <a:t>adjoins the shore (and is thus the home of rooted plants) and extends down to a point called the light compensation level, or the depth at which the rate of photosynthesis equals the rate of respiration</a:t>
+            </a:r>
+            <a:r>
+              <a:rPr lang="en-US" dirty="0" smtClean="0"/>
+              <a:t>.</a:t>
+            </a:r>
+          </a:p>
+          <a:p>
+            <a:pPr lvl="1" algn="just"/>
+            <a:r>
+              <a:rPr lang="en-US" dirty="0" smtClean="0"/>
+              <a:t>It has the shallow water.</a:t>
+            </a:r>
+            <a:endParaRPr lang="en-IN" dirty="0"/>
+          </a:p>
+        </p:txBody>
+      </p:sp>
+    </p:spTree>
+    <p:extLst>
+      <p:ext uri="{BB962C8B-B14F-4D97-AF65-F5344CB8AC3E}">
+        <p14:creationId xmlns:p14="http://schemas.microsoft.com/office/powerpoint/2010/main" val="2459318431"/>
+      </p:ext>
+    </p:extLst>
+  </p:cSld>
+  <p:clrMapOvr>
+    <a:masterClrMapping/>
+  </p:clrMapOvr>
+</p:sld>
+</file>
+
+<file path=ppt/slides/slide76.xml><?xml version="1.0" encoding="utf-8"?>
+<p:sld xmlns:a="http://schemas.openxmlformats.org/drawingml/2006/main" xmlns:r="http://schemas.openxmlformats.org/officeDocument/2006/relationships" xmlns:p="http://schemas.openxmlformats.org/presentationml/2006/main">
+  <p:cSld>
+    <p:spTree>
+      <p:nvGrpSpPr>
+        <p:cNvPr id="1" name=""/>
+        <p:cNvGrpSpPr/>
+        <p:nvPr/>
+      </p:nvGrpSpPr>
+      <p:grpSpPr>
+        <a:xfrm>
+          <a:off x="0" y="0"/>
+          <a:ext cx="0" cy="0"/>
+          <a:chOff x="0" y="0"/>
+          <a:chExt cx="0" cy="0"/>
+        </a:xfrm>
+      </p:grpSpPr>
+      <p:sp>
+        <p:nvSpPr>
+          <p:cNvPr id="2" name="Title 1"/>
+          <p:cNvSpPr>
+            <a:spLocks noGrp="1"/>
+          </p:cNvSpPr>
+          <p:nvPr>
+            <p:ph type="title"/>
+          </p:nvPr>
+        </p:nvSpPr>
+        <p:spPr/>
+        <p:txBody>
+          <a:bodyPr/>
+          <a:lstStyle/>
+          <a:p>
+            <a:r>
+              <a:rPr lang="en-US" dirty="0"/>
+              <a:t>Zones of Lake</a:t>
+            </a:r>
+            <a:endParaRPr lang="en-IN" dirty="0"/>
+          </a:p>
+        </p:txBody>
+      </p:sp>
+      <p:sp>
+        <p:nvSpPr>
+          <p:cNvPr id="3" name="Content Placeholder 2"/>
+          <p:cNvSpPr>
+            <a:spLocks noGrp="1"/>
+          </p:cNvSpPr>
+          <p:nvPr>
+            <p:ph idx="1"/>
+          </p:nvPr>
+        </p:nvSpPr>
+        <p:spPr/>
+        <p:txBody>
+          <a:bodyPr/>
+          <a:lstStyle/>
+          <a:p>
+            <a:r>
+              <a:rPr lang="en-US" dirty="0" smtClean="0"/>
+              <a:t>Limnetic zone:</a:t>
+            </a:r>
+          </a:p>
+          <a:p>
+            <a:pPr lvl="1"/>
+            <a:r>
+              <a:rPr lang="en-US" dirty="0" smtClean="0"/>
+              <a:t>Effective penetration of sunlight.</a:t>
+            </a:r>
+          </a:p>
+          <a:p>
+            <a:pPr lvl="1"/>
+            <a:r>
+              <a:rPr lang="en-US" dirty="0"/>
+              <a:t> derives its oxygen content from the photosynthetic </a:t>
+            </a:r>
+            <a:r>
+              <a:rPr lang="en-US" dirty="0" smtClean="0"/>
+              <a:t>activity and atmosphere.</a:t>
+            </a:r>
+          </a:p>
+          <a:p>
+            <a:r>
+              <a:rPr lang="en-US" dirty="0" smtClean="0"/>
+              <a:t>Pro-fundal zone</a:t>
+            </a:r>
+          </a:p>
+          <a:p>
+            <a:pPr lvl="1"/>
+            <a:r>
+              <a:rPr lang="en-US" dirty="0"/>
+              <a:t>The bottom and deep water area of a lake, which is beyond the depth of effective light penetration is called the pro-fundal zone. </a:t>
+            </a:r>
+            <a:endParaRPr lang="en-IN" dirty="0"/>
+          </a:p>
+        </p:txBody>
+      </p:sp>
+    </p:spTree>
+    <p:extLst>
+      <p:ext uri="{BB962C8B-B14F-4D97-AF65-F5344CB8AC3E}">
+        <p14:creationId xmlns:p14="http://schemas.microsoft.com/office/powerpoint/2010/main" val="3457542274"/>
+      </p:ext>
+    </p:extLst>
+  </p:cSld>
+  <p:clrMapOvr>
+    <a:masterClrMapping/>
+  </p:clrMapOvr>
+</p:sld>
+</file>
+
+<file path=ppt/slides/slide77.xml><?xml version="1.0" encoding="utf-8"?>
+<p:sld xmlns:a="http://schemas.openxmlformats.org/drawingml/2006/main" xmlns:r="http://schemas.openxmlformats.org/officeDocument/2006/relationships" xmlns:p="http://schemas.openxmlformats.org/presentationml/2006/main">
+  <p:cSld>
+    <p:spTree>
+      <p:nvGrpSpPr>
+        <p:cNvPr id="1" name=""/>
+        <p:cNvGrpSpPr/>
+        <p:nvPr/>
+      </p:nvGrpSpPr>
+      <p:grpSpPr>
+        <a:xfrm>
+          <a:off x="0" y="0"/>
+          <a:ext cx="0" cy="0"/>
+          <a:chOff x="0" y="0"/>
+          <a:chExt cx="0" cy="0"/>
+        </a:xfrm>
+      </p:grpSpPr>
+      <p:sp>
+        <p:nvSpPr>
+          <p:cNvPr id="2" name="Title 1"/>
+          <p:cNvSpPr>
+            <a:spLocks noGrp="1"/>
+          </p:cNvSpPr>
+          <p:nvPr>
+            <p:ph type="title"/>
+          </p:nvPr>
+        </p:nvSpPr>
+        <p:spPr/>
+        <p:txBody>
+          <a:bodyPr/>
+          <a:lstStyle/>
+          <a:p>
+            <a:r>
+              <a:rPr lang="en-US" dirty="0"/>
+              <a:t>Zones of Lake</a:t>
+            </a:r>
+            <a:endParaRPr lang="en-IN" dirty="0"/>
+          </a:p>
+        </p:txBody>
+      </p:sp>
+      <p:sp>
+        <p:nvSpPr>
+          <p:cNvPr id="3" name="Content Placeholder 2"/>
+          <p:cNvSpPr>
+            <a:spLocks noGrp="1"/>
+          </p:cNvSpPr>
+          <p:nvPr>
+            <p:ph idx="1"/>
+          </p:nvPr>
+        </p:nvSpPr>
+        <p:spPr/>
+        <p:txBody>
+          <a:bodyPr/>
+          <a:lstStyle/>
+          <a:p>
+            <a:r>
+              <a:rPr lang="en-US" dirty="0" smtClean="0"/>
+              <a:t>Benthic zone</a:t>
+            </a:r>
+          </a:p>
+          <a:p>
+            <a:pPr lvl="1"/>
+            <a:r>
+              <a:rPr lang="en-US" dirty="0" smtClean="0"/>
+              <a:t>Almost zero percent in light penetration.</a:t>
+            </a:r>
+          </a:p>
+          <a:p>
+            <a:pPr lvl="1"/>
+            <a:r>
+              <a:rPr lang="en-US" dirty="0" smtClean="0"/>
+              <a:t>Creature must adapt for this situation.</a:t>
+            </a:r>
+          </a:p>
+          <a:p>
+            <a:pPr lvl="1"/>
+            <a:r>
+              <a:rPr lang="en-US" dirty="0" smtClean="0"/>
+              <a:t>Water pressure is high.</a:t>
+            </a:r>
+          </a:p>
+          <a:p>
+            <a:pPr lvl="1"/>
+            <a:r>
+              <a:rPr lang="en-US" dirty="0" smtClean="0"/>
+              <a:t>Lake sediment is there.</a:t>
+            </a:r>
+            <a:endParaRPr lang="en-IN" dirty="0"/>
+          </a:p>
+        </p:txBody>
+      </p:sp>
+      <p:pic>
+        <p:nvPicPr>
+          <p:cNvPr id="2050" name="Picture 2" descr="Image result for benthic zone"/>
+          <p:cNvPicPr>
+            <a:picLocks noChangeAspect="1" noChangeArrowheads="1"/>
+          </p:cNvPicPr>
+          <p:nvPr/>
+        </p:nvPicPr>
+        <p:blipFill>
+          <a:blip r:embed="rId2">
+            <a:extLst>
+              <a:ext uri="{28A0092B-C50C-407E-A947-70E740481C1C}">
+                <a14:useLocalDpi xmlns:a14="http://schemas.microsoft.com/office/drawing/2010/main" val="0"/>
+              </a:ext>
+            </a:extLst>
+          </a:blip>
+          <a:srcRect/>
+          <a:stretch>
+            <a:fillRect/>
+          </a:stretch>
+        </p:blipFill>
+        <p:spPr bwMode="auto">
+          <a:xfrm>
+            <a:off x="5089125" y="3428491"/>
+            <a:ext cx="3612876" cy="2709658"/>
+          </a:xfrm>
+          <a:prstGeom prst="rect">
+            <a:avLst/>
+          </a:prstGeom>
+        </p:spPr>
+        <p:style>
+          <a:lnRef idx="2">
+            <a:schemeClr val="accent1"/>
+          </a:lnRef>
+          <a:fillRef idx="1">
+            <a:schemeClr val="lt1"/>
+          </a:fillRef>
+          <a:effectRef idx="0">
+            <a:schemeClr val="accent1"/>
+          </a:effectRef>
+          <a:fontRef idx="minor">
+            <a:schemeClr val="dk1"/>
+          </a:fontRef>
+        </p:style>
+      </p:pic>
+    </p:spTree>
+    <p:extLst>
+      <p:ext uri="{BB962C8B-B14F-4D97-AF65-F5344CB8AC3E}">
+        <p14:creationId xmlns:p14="http://schemas.microsoft.com/office/powerpoint/2010/main" val="473604474"/>
+      </p:ext>
+    </p:extLst>
+  </p:cSld>
+  <p:clrMapOvr>
+    <a:masterClrMapping/>
+  </p:clrMapOvr>
+</p:sld>
+</file>
+
+<file path=ppt/slides/slide78.xml><?xml version="1.0" encoding="utf-8"?>
 <p:sld xmlns:a="http://schemas.openxmlformats.org/drawingml/2006/main" xmlns:r="http://schemas.openxmlformats.org/officeDocument/2006/relationships" xmlns:p="http://schemas.openxmlformats.org/presentationml/2006/main">
   <p:cSld>
     <p:spTree>

</xml_diff>

<commit_message>
Last Update 27-12-2018  9:24:05.02
</commit_message>
<xml_diff>
--- a/Slides/GE8291-U1.pptx
+++ b/Slides/GE8291-U1.pptx
@@ -5,7 +5,7 @@
     <p:sldMasterId id="2147483648" r:id="rId1"/>
   </p:sldMasterIdLst>
   <p:notesMasterIdLst>
-    <p:notesMasterId r:id="rId80"/>
+    <p:notesMasterId r:id="rId93"/>
   </p:notesMasterIdLst>
   <p:sldIdLst>
     <p:sldId id="256" r:id="rId2"/>
@@ -85,7 +85,20 @@
     <p:sldId id="349" r:id="rId76"/>
     <p:sldId id="350" r:id="rId77"/>
     <p:sldId id="351" r:id="rId78"/>
-    <p:sldId id="272" r:id="rId79"/>
+    <p:sldId id="352" r:id="rId79"/>
+    <p:sldId id="353" r:id="rId80"/>
+    <p:sldId id="354" r:id="rId81"/>
+    <p:sldId id="355" r:id="rId82"/>
+    <p:sldId id="356" r:id="rId83"/>
+    <p:sldId id="357" r:id="rId84"/>
+    <p:sldId id="358" r:id="rId85"/>
+    <p:sldId id="359" r:id="rId86"/>
+    <p:sldId id="360" r:id="rId87"/>
+    <p:sldId id="361" r:id="rId88"/>
+    <p:sldId id="362" r:id="rId89"/>
+    <p:sldId id="363" r:id="rId90"/>
+    <p:sldId id="364" r:id="rId91"/>
+    <p:sldId id="272" r:id="rId92"/>
   </p:sldIdLst>
   <p:sldSz cx="9144000" cy="6858000" type="screen4x3"/>
   <p:notesSz cx="6858000" cy="9144000"/>
@@ -7330,37 +7343,37 @@
     </dgm:pt>
   </dgm:ptLst>
   <dgm:cxnLst>
+    <dgm:cxn modelId="{6D89B2A8-2B66-488A-B519-DF0EE62ADA9F}" type="presOf" srcId="{49F5C075-6F91-4534-90EF-1E3C46B7CDAB}" destId="{4564C43D-E089-4EA6-A6B9-ED5CB86087FE}" srcOrd="1" destOrd="0" presId="urn:microsoft.com/office/officeart/2005/8/layout/bProcess3"/>
+    <dgm:cxn modelId="{D60E5242-A01B-4F14-BBF5-4650FB424686}" type="presOf" srcId="{66EBE6AC-FFBA-4B21-9CFD-A20A2C50B09C}" destId="{58269705-6462-4062-A853-0836726E2AD2}" srcOrd="0" destOrd="0" presId="urn:microsoft.com/office/officeart/2005/8/layout/bProcess3"/>
+    <dgm:cxn modelId="{55DC005C-8FAE-4756-AFA2-4CCAA32139E3}" srcId="{1B35C749-0FAC-4633-A54A-2151D01D73E9}" destId="{D904E3A6-6AFE-46A0-8334-D62B7D1609EC}" srcOrd="5" destOrd="0" parTransId="{8EE4547C-B4E9-4114-B2E9-A4F3F6370A81}" sibTransId="{5C45A363-7A7A-4FA3-9ECD-B022C15B934E}"/>
+    <dgm:cxn modelId="{87A66FFD-515D-4FAA-BCC7-200FB8AF4DDA}" type="presOf" srcId="{E2299760-B0D4-404A-9CB9-A58AC28848AC}" destId="{7084BB0B-BD20-429A-A4CD-AD72DF04F99B}" srcOrd="0" destOrd="0" presId="urn:microsoft.com/office/officeart/2005/8/layout/bProcess3"/>
+    <dgm:cxn modelId="{4BFDD7D3-9F7F-4AA8-B0A4-D088A543E3B8}" type="presOf" srcId="{50E9E6FB-F2A1-4C3C-8ED0-BAE19D73E35E}" destId="{AF214629-685D-4AAE-A91E-8FADE0AD143F}" srcOrd="0" destOrd="0" presId="urn:microsoft.com/office/officeart/2005/8/layout/bProcess3"/>
+    <dgm:cxn modelId="{B4CE57C3-0833-4E62-948B-B57F681CF9C2}" srcId="{1B35C749-0FAC-4633-A54A-2151D01D73E9}" destId="{0BE9A2D8-31BB-4CE9-A3B0-CA3B9F9C68B3}" srcOrd="0" destOrd="0" parTransId="{8F091320-784A-4E72-9A29-F103CA12AD74}" sibTransId="{C5485345-1FEB-4BFA-AE2E-79B532928A84}"/>
     <dgm:cxn modelId="{B9C6D9E8-FFAC-4240-ADAB-56D11ECA0C13}" type="presOf" srcId="{49F5C075-6F91-4534-90EF-1E3C46B7CDAB}" destId="{2285F4ED-8377-4AAE-8983-73210395BBEA}" srcOrd="0" destOrd="0" presId="urn:microsoft.com/office/officeart/2005/8/layout/bProcess3"/>
+    <dgm:cxn modelId="{8F0A02C8-CE18-4B8B-BC35-8DBA6204275E}" srcId="{1B35C749-0FAC-4633-A54A-2151D01D73E9}" destId="{273BCF21-B834-4BE7-BFF2-A3BF8465A53F}" srcOrd="2" destOrd="0" parTransId="{6C059FA2-8E71-4FCF-B6BB-E62CBD5637A9}" sibTransId="{49F5C075-6F91-4534-90EF-1E3C46B7CDAB}"/>
+    <dgm:cxn modelId="{2C640B6D-DD5F-4676-A603-F59B381ECD34}" srcId="{1B35C749-0FAC-4633-A54A-2151D01D73E9}" destId="{692AF6EC-90A6-4438-B374-6D128451B9C6}" srcOrd="6" destOrd="0" parTransId="{8CA4902C-7B9F-4296-B079-CF1CDC158965}" sibTransId="{66EBE6AC-FFBA-4B21-9CFD-A20A2C50B09C}"/>
+    <dgm:cxn modelId="{7084DAA2-E59C-4F0A-953C-E99F743B0047}" type="presOf" srcId="{273BCF21-B834-4BE7-BFF2-A3BF8465A53F}" destId="{E953EB40-DE25-40D4-B358-AB78D22BB191}" srcOrd="0" destOrd="0" presId="urn:microsoft.com/office/officeart/2005/8/layout/bProcess3"/>
+    <dgm:cxn modelId="{9C2E68D6-AA40-4B78-9B9D-73C3E25E5CD4}" type="presOf" srcId="{5C45A363-7A7A-4FA3-9ECD-B022C15B934E}" destId="{80167E65-E64B-46C6-B4D8-E698702E54E2}" srcOrd="1" destOrd="0" presId="urn:microsoft.com/office/officeart/2005/8/layout/bProcess3"/>
+    <dgm:cxn modelId="{3E55429E-5B52-4C12-842B-03DB2B2C2AE7}" type="presOf" srcId="{66EBE6AC-FFBA-4B21-9CFD-A20A2C50B09C}" destId="{59843F75-1210-4E69-AB1B-7DBEB2EBD213}" srcOrd="1" destOrd="0" presId="urn:microsoft.com/office/officeart/2005/8/layout/bProcess3"/>
+    <dgm:cxn modelId="{77C2D4BC-347C-4496-B5DE-04C5EA555C3C}" type="presOf" srcId="{692AF6EC-90A6-4438-B374-6D128451B9C6}" destId="{8F19D433-964C-4295-8103-ED9156835325}" srcOrd="0" destOrd="0" presId="urn:microsoft.com/office/officeart/2005/8/layout/bProcess3"/>
+    <dgm:cxn modelId="{27F5D17B-1F57-47AD-BC26-075FD1D1A4D8}" srcId="{1B35C749-0FAC-4633-A54A-2151D01D73E9}" destId="{7AFCBDAD-B0CB-4971-B541-3D3D791D477E}" srcOrd="7" destOrd="0" parTransId="{27D384C5-1680-4017-8153-5B8323DE3B00}" sibTransId="{E3EB0BF8-5D37-4870-84DE-D7E24C915D0C}"/>
+    <dgm:cxn modelId="{FE542C3D-BBB3-4DD3-BF4B-7D402B414457}" type="presOf" srcId="{FD8B56A7-F781-4359-A392-18A5A5EAFD08}" destId="{32D3371C-2473-4D1C-8EEE-C1A1B80CEC07}" srcOrd="1" destOrd="0" presId="urn:microsoft.com/office/officeart/2005/8/layout/bProcess3"/>
+    <dgm:cxn modelId="{40329A88-E4C3-48DD-AF5C-E1CB3CFCDC6C}" srcId="{1B35C749-0FAC-4633-A54A-2151D01D73E9}" destId="{D771E5F0-E6ED-48C0-8CCD-F931688ADE09}" srcOrd="4" destOrd="0" parTransId="{B6ACB080-9F8C-4A96-A543-131C0A294974}" sibTransId="{50E9E6FB-F2A1-4C3C-8ED0-BAE19D73E35E}"/>
+    <dgm:cxn modelId="{83199706-A662-424E-B443-F050CBF5147C}" type="presOf" srcId="{C5485345-1FEB-4BFA-AE2E-79B532928A84}" destId="{D10F74A4-29F7-476A-8333-D5A8AF43CB1C}" srcOrd="1" destOrd="0" presId="urn:microsoft.com/office/officeart/2005/8/layout/bProcess3"/>
+    <dgm:cxn modelId="{70A2AAEC-B27B-445E-B055-105D2BEECDE6}" type="presOf" srcId="{D771E5F0-E6ED-48C0-8CCD-F931688ADE09}" destId="{CCE20427-E360-40CC-B4B1-9BA59CA86C94}" srcOrd="0" destOrd="0" presId="urn:microsoft.com/office/officeart/2005/8/layout/bProcess3"/>
+    <dgm:cxn modelId="{834A9293-829E-4FD6-B337-77CEA740EEAB}" type="presOf" srcId="{0BE9A2D8-31BB-4CE9-A3B0-CA3B9F9C68B3}" destId="{3FE18E05-D30A-4A95-BDA6-AD987600F5DC}" srcOrd="0" destOrd="0" presId="urn:microsoft.com/office/officeart/2005/8/layout/bProcess3"/>
+    <dgm:cxn modelId="{E1EE091C-62ED-4F46-BF54-6B18F1F7092D}" type="presOf" srcId="{5C45A363-7A7A-4FA3-9ECD-B022C15B934E}" destId="{25F3FB88-54D6-425B-AC4E-7DD9E1B1A196}" srcOrd="0" destOrd="0" presId="urn:microsoft.com/office/officeart/2005/8/layout/bProcess3"/>
     <dgm:cxn modelId="{D0869D4A-0CCA-41F3-9DD3-4ED596B06E75}" type="presOf" srcId="{50E9E6FB-F2A1-4C3C-8ED0-BAE19D73E35E}" destId="{2FAA9B58-6B5D-4335-A250-181F004764F0}" srcOrd="1" destOrd="0" presId="urn:microsoft.com/office/officeart/2005/8/layout/bProcess3"/>
-    <dgm:cxn modelId="{FE542C3D-BBB3-4DD3-BF4B-7D402B414457}" type="presOf" srcId="{FD8B56A7-F781-4359-A392-18A5A5EAFD08}" destId="{32D3371C-2473-4D1C-8EEE-C1A1B80CEC07}" srcOrd="1" destOrd="0" presId="urn:microsoft.com/office/officeart/2005/8/layout/bProcess3"/>
-    <dgm:cxn modelId="{2C640B6D-DD5F-4676-A603-F59B381ECD34}" srcId="{1B35C749-0FAC-4633-A54A-2151D01D73E9}" destId="{692AF6EC-90A6-4438-B374-6D128451B9C6}" srcOrd="6" destOrd="0" parTransId="{8CA4902C-7B9F-4296-B079-CF1CDC158965}" sibTransId="{66EBE6AC-FFBA-4B21-9CFD-A20A2C50B09C}"/>
-    <dgm:cxn modelId="{4BFDD7D3-9F7F-4AA8-B0A4-D088A543E3B8}" type="presOf" srcId="{50E9E6FB-F2A1-4C3C-8ED0-BAE19D73E35E}" destId="{AF214629-685D-4AAE-A91E-8FADE0AD143F}" srcOrd="0" destOrd="0" presId="urn:microsoft.com/office/officeart/2005/8/layout/bProcess3"/>
-    <dgm:cxn modelId="{E1EE091C-62ED-4F46-BF54-6B18F1F7092D}" type="presOf" srcId="{5C45A363-7A7A-4FA3-9ECD-B022C15B934E}" destId="{25F3FB88-54D6-425B-AC4E-7DD9E1B1A196}" srcOrd="0" destOrd="0" presId="urn:microsoft.com/office/officeart/2005/8/layout/bProcess3"/>
+    <dgm:cxn modelId="{0298356F-8751-41D7-9E4D-6CF8A8E2672B}" type="presOf" srcId="{7AFCBDAD-B0CB-4971-B541-3D3D791D477E}" destId="{3D29F44E-3A44-478A-B972-695C660220F9}" srcOrd="0" destOrd="0" presId="urn:microsoft.com/office/officeart/2005/8/layout/bProcess3"/>
+    <dgm:cxn modelId="{07C3D10E-B7BA-4EBB-A2D9-D8A00EF1505A}" type="presOf" srcId="{D904E3A6-6AFE-46A0-8334-D62B7D1609EC}" destId="{9F5AD9FD-D879-4A9C-A91D-4A29D743FF70}" srcOrd="0" destOrd="0" presId="urn:microsoft.com/office/officeart/2005/8/layout/bProcess3"/>
+    <dgm:cxn modelId="{FB539F42-7165-44F7-ACD6-E71482E6640B}" type="presOf" srcId="{5884A237-5755-41CC-8582-8E6C88D4C50A}" destId="{978F40F7-1170-4426-9F6D-C85BB73408CF}" srcOrd="0" destOrd="0" presId="urn:microsoft.com/office/officeart/2005/8/layout/bProcess3"/>
     <dgm:cxn modelId="{00B6F532-F45E-48DC-964E-03AF45CCFBB2}" srcId="{1B35C749-0FAC-4633-A54A-2151D01D73E9}" destId="{5884A237-5755-41CC-8582-8E6C88D4C50A}" srcOrd="3" destOrd="0" parTransId="{0F6C4D36-F6CD-463D-A31D-295A670D6E05}" sibTransId="{FD8B56A7-F781-4359-A392-18A5A5EAFD08}"/>
+    <dgm:cxn modelId="{72CBB521-2B0B-4FD5-B826-6B9AEE9B14F5}" type="presOf" srcId="{1B35C749-0FAC-4633-A54A-2151D01D73E9}" destId="{E06879EE-A190-46AD-92DE-2EF2FC2CE701}" srcOrd="0" destOrd="0" presId="urn:microsoft.com/office/officeart/2005/8/layout/bProcess3"/>
+    <dgm:cxn modelId="{C21BE7E8-3CC2-483A-9678-C8951B7672F9}" type="presOf" srcId="{FD8B56A7-F781-4359-A392-18A5A5EAFD08}" destId="{93E0DD11-107C-4740-A25F-830761CDA98E}" srcOrd="0" destOrd="0" presId="urn:microsoft.com/office/officeart/2005/8/layout/bProcess3"/>
     <dgm:cxn modelId="{6C8D0457-665F-4F8E-A243-E3F043C576B1}" type="presOf" srcId="{C5485345-1FEB-4BFA-AE2E-79B532928A84}" destId="{20262314-1671-480A-9E81-70DF05D47B74}" srcOrd="0" destOrd="0" presId="urn:microsoft.com/office/officeart/2005/8/layout/bProcess3"/>
-    <dgm:cxn modelId="{07C3D10E-B7BA-4EBB-A2D9-D8A00EF1505A}" type="presOf" srcId="{D904E3A6-6AFE-46A0-8334-D62B7D1609EC}" destId="{9F5AD9FD-D879-4A9C-A91D-4A29D743FF70}" srcOrd="0" destOrd="0" presId="urn:microsoft.com/office/officeart/2005/8/layout/bProcess3"/>
-    <dgm:cxn modelId="{9C2E68D6-AA40-4B78-9B9D-73C3E25E5CD4}" type="presOf" srcId="{5C45A363-7A7A-4FA3-9ECD-B022C15B934E}" destId="{80167E65-E64B-46C6-B4D8-E698702E54E2}" srcOrd="1" destOrd="0" presId="urn:microsoft.com/office/officeart/2005/8/layout/bProcess3"/>
-    <dgm:cxn modelId="{70A2AAEC-B27B-445E-B055-105D2BEECDE6}" type="presOf" srcId="{D771E5F0-E6ED-48C0-8CCD-F931688ADE09}" destId="{CCE20427-E360-40CC-B4B1-9BA59CA86C94}" srcOrd="0" destOrd="0" presId="urn:microsoft.com/office/officeart/2005/8/layout/bProcess3"/>
-    <dgm:cxn modelId="{3E55429E-5B52-4C12-842B-03DB2B2C2AE7}" type="presOf" srcId="{66EBE6AC-FFBA-4B21-9CFD-A20A2C50B09C}" destId="{59843F75-1210-4E69-AB1B-7DBEB2EBD213}" srcOrd="1" destOrd="0" presId="urn:microsoft.com/office/officeart/2005/8/layout/bProcess3"/>
-    <dgm:cxn modelId="{8F0A02C8-CE18-4B8B-BC35-8DBA6204275E}" srcId="{1B35C749-0FAC-4633-A54A-2151D01D73E9}" destId="{273BCF21-B834-4BE7-BFF2-A3BF8465A53F}" srcOrd="2" destOrd="0" parTransId="{6C059FA2-8E71-4FCF-B6BB-E62CBD5637A9}" sibTransId="{49F5C075-6F91-4534-90EF-1E3C46B7CDAB}"/>
-    <dgm:cxn modelId="{72CBB521-2B0B-4FD5-B826-6B9AEE9B14F5}" type="presOf" srcId="{1B35C749-0FAC-4633-A54A-2151D01D73E9}" destId="{E06879EE-A190-46AD-92DE-2EF2FC2CE701}" srcOrd="0" destOrd="0" presId="urn:microsoft.com/office/officeart/2005/8/layout/bProcess3"/>
+    <dgm:cxn modelId="{372EA098-1D0E-4E3C-86ED-E305A81F6B9E}" type="presOf" srcId="{6076BBA9-B7A8-45A9-B3AD-F648D1EE4EF8}" destId="{6978034D-F608-4659-9128-71F98EC8E58B}" srcOrd="1" destOrd="0" presId="urn:microsoft.com/office/officeart/2005/8/layout/bProcess3"/>
+    <dgm:cxn modelId="{9EC1A9F1-CC2C-4077-89D7-505B106C8293}" type="presOf" srcId="{6076BBA9-B7A8-45A9-B3AD-F648D1EE4EF8}" destId="{CBD0AFA0-6BC1-4C32-BF50-B880F7A0B383}" srcOrd="0" destOrd="0" presId="urn:microsoft.com/office/officeart/2005/8/layout/bProcess3"/>
     <dgm:cxn modelId="{4F6E135B-6F89-42E9-96A3-465A93FDF0CA}" srcId="{1B35C749-0FAC-4633-A54A-2151D01D73E9}" destId="{E2299760-B0D4-404A-9CB9-A58AC28848AC}" srcOrd="1" destOrd="0" parTransId="{3181CFE7-12C0-4BB7-BF57-420CFADB1DA0}" sibTransId="{6076BBA9-B7A8-45A9-B3AD-F648D1EE4EF8}"/>
-    <dgm:cxn modelId="{0298356F-8751-41D7-9E4D-6CF8A8E2672B}" type="presOf" srcId="{7AFCBDAD-B0CB-4971-B541-3D3D791D477E}" destId="{3D29F44E-3A44-478A-B972-695C660220F9}" srcOrd="0" destOrd="0" presId="urn:microsoft.com/office/officeart/2005/8/layout/bProcess3"/>
-    <dgm:cxn modelId="{83199706-A662-424E-B443-F050CBF5147C}" type="presOf" srcId="{C5485345-1FEB-4BFA-AE2E-79B532928A84}" destId="{D10F74A4-29F7-476A-8333-D5A8AF43CB1C}" srcOrd="1" destOrd="0" presId="urn:microsoft.com/office/officeart/2005/8/layout/bProcess3"/>
-    <dgm:cxn modelId="{55DC005C-8FAE-4756-AFA2-4CCAA32139E3}" srcId="{1B35C749-0FAC-4633-A54A-2151D01D73E9}" destId="{D904E3A6-6AFE-46A0-8334-D62B7D1609EC}" srcOrd="5" destOrd="0" parTransId="{8EE4547C-B4E9-4114-B2E9-A4F3F6370A81}" sibTransId="{5C45A363-7A7A-4FA3-9ECD-B022C15B934E}"/>
-    <dgm:cxn modelId="{27F5D17B-1F57-47AD-BC26-075FD1D1A4D8}" srcId="{1B35C749-0FAC-4633-A54A-2151D01D73E9}" destId="{7AFCBDAD-B0CB-4971-B541-3D3D791D477E}" srcOrd="7" destOrd="0" parTransId="{27D384C5-1680-4017-8153-5B8323DE3B00}" sibTransId="{E3EB0BF8-5D37-4870-84DE-D7E24C915D0C}"/>
-    <dgm:cxn modelId="{C21BE7E8-3CC2-483A-9678-C8951B7672F9}" type="presOf" srcId="{FD8B56A7-F781-4359-A392-18A5A5EAFD08}" destId="{93E0DD11-107C-4740-A25F-830761CDA98E}" srcOrd="0" destOrd="0" presId="urn:microsoft.com/office/officeart/2005/8/layout/bProcess3"/>
-    <dgm:cxn modelId="{87A66FFD-515D-4FAA-BCC7-200FB8AF4DDA}" type="presOf" srcId="{E2299760-B0D4-404A-9CB9-A58AC28848AC}" destId="{7084BB0B-BD20-429A-A4CD-AD72DF04F99B}" srcOrd="0" destOrd="0" presId="urn:microsoft.com/office/officeart/2005/8/layout/bProcess3"/>
-    <dgm:cxn modelId="{D60E5242-A01B-4F14-BBF5-4650FB424686}" type="presOf" srcId="{66EBE6AC-FFBA-4B21-9CFD-A20A2C50B09C}" destId="{58269705-6462-4062-A853-0836726E2AD2}" srcOrd="0" destOrd="0" presId="urn:microsoft.com/office/officeart/2005/8/layout/bProcess3"/>
-    <dgm:cxn modelId="{9EC1A9F1-CC2C-4077-89D7-505B106C8293}" type="presOf" srcId="{6076BBA9-B7A8-45A9-B3AD-F648D1EE4EF8}" destId="{CBD0AFA0-6BC1-4C32-BF50-B880F7A0B383}" srcOrd="0" destOrd="0" presId="urn:microsoft.com/office/officeart/2005/8/layout/bProcess3"/>
-    <dgm:cxn modelId="{6D89B2A8-2B66-488A-B519-DF0EE62ADA9F}" type="presOf" srcId="{49F5C075-6F91-4534-90EF-1E3C46B7CDAB}" destId="{4564C43D-E089-4EA6-A6B9-ED5CB86087FE}" srcOrd="1" destOrd="0" presId="urn:microsoft.com/office/officeart/2005/8/layout/bProcess3"/>
-    <dgm:cxn modelId="{77C2D4BC-347C-4496-B5DE-04C5EA555C3C}" type="presOf" srcId="{692AF6EC-90A6-4438-B374-6D128451B9C6}" destId="{8F19D433-964C-4295-8103-ED9156835325}" srcOrd="0" destOrd="0" presId="urn:microsoft.com/office/officeart/2005/8/layout/bProcess3"/>
-    <dgm:cxn modelId="{7084DAA2-E59C-4F0A-953C-E99F743B0047}" type="presOf" srcId="{273BCF21-B834-4BE7-BFF2-A3BF8465A53F}" destId="{E953EB40-DE25-40D4-B358-AB78D22BB191}" srcOrd="0" destOrd="0" presId="urn:microsoft.com/office/officeart/2005/8/layout/bProcess3"/>
-    <dgm:cxn modelId="{B4CE57C3-0833-4E62-948B-B57F681CF9C2}" srcId="{1B35C749-0FAC-4633-A54A-2151D01D73E9}" destId="{0BE9A2D8-31BB-4CE9-A3B0-CA3B9F9C68B3}" srcOrd="0" destOrd="0" parTransId="{8F091320-784A-4E72-9A29-F103CA12AD74}" sibTransId="{C5485345-1FEB-4BFA-AE2E-79B532928A84}"/>
-    <dgm:cxn modelId="{372EA098-1D0E-4E3C-86ED-E305A81F6B9E}" type="presOf" srcId="{6076BBA9-B7A8-45A9-B3AD-F648D1EE4EF8}" destId="{6978034D-F608-4659-9128-71F98EC8E58B}" srcOrd="1" destOrd="0" presId="urn:microsoft.com/office/officeart/2005/8/layout/bProcess3"/>
-    <dgm:cxn modelId="{FB539F42-7165-44F7-ACD6-E71482E6640B}" type="presOf" srcId="{5884A237-5755-41CC-8582-8E6C88D4C50A}" destId="{978F40F7-1170-4426-9F6D-C85BB73408CF}" srcOrd="0" destOrd="0" presId="urn:microsoft.com/office/officeart/2005/8/layout/bProcess3"/>
-    <dgm:cxn modelId="{40329A88-E4C3-48DD-AF5C-E1CB3CFCDC6C}" srcId="{1B35C749-0FAC-4633-A54A-2151D01D73E9}" destId="{D771E5F0-E6ED-48C0-8CCD-F931688ADE09}" srcOrd="4" destOrd="0" parTransId="{B6ACB080-9F8C-4A96-A543-131C0A294974}" sibTransId="{50E9E6FB-F2A1-4C3C-8ED0-BAE19D73E35E}"/>
-    <dgm:cxn modelId="{834A9293-829E-4FD6-B337-77CEA740EEAB}" type="presOf" srcId="{0BE9A2D8-31BB-4CE9-A3B0-CA3B9F9C68B3}" destId="{3FE18E05-D30A-4A95-BDA6-AD987600F5DC}" srcOrd="0" destOrd="0" presId="urn:microsoft.com/office/officeart/2005/8/layout/bProcess3"/>
     <dgm:cxn modelId="{75D9CA11-E9D0-439F-8823-A08923390A81}" type="presParOf" srcId="{E06879EE-A190-46AD-92DE-2EF2FC2CE701}" destId="{3FE18E05-D30A-4A95-BDA6-AD987600F5DC}" srcOrd="0" destOrd="0" presId="urn:microsoft.com/office/officeart/2005/8/layout/bProcess3"/>
     <dgm:cxn modelId="{53D9D0D9-7DA2-44EB-8BF1-A6C496A14AE6}" type="presParOf" srcId="{E06879EE-A190-46AD-92DE-2EF2FC2CE701}" destId="{20262314-1671-480A-9E81-70DF05D47B74}" srcOrd="1" destOrd="0" presId="urn:microsoft.com/office/officeart/2005/8/layout/bProcess3"/>
     <dgm:cxn modelId="{05C8DEC3-15DA-445E-9DDC-49076B98B59F}" type="presParOf" srcId="{20262314-1671-480A-9E81-70DF05D47B74}" destId="{D10F74A4-29F7-476A-8333-D5A8AF43CB1C}" srcOrd="0" destOrd="0" presId="urn:microsoft.com/office/officeart/2005/8/layout/bProcess3"/>
@@ -19274,7 +19287,7 @@
             <a:fld id="{9515075B-F3F0-4441-A1BD-B7B515B708FF}" type="datetimeFigureOut">
               <a:rPr lang="en-US" smtClean="0"/>
               <a:pPr/>
-              <a:t>12/26/2018</a:t>
+              <a:t>12/27/2018</a:t>
             </a:fld>
             <a:endParaRPr lang="en-US"/>
           </a:p>
@@ -19746,7 +19759,7 @@
             <a:fld id="{6E658DF8-B8C0-4C7F-85EB-B53A2DDD44A9}" type="datetimeFigureOut">
               <a:rPr lang="en-US" smtClean="0"/>
               <a:pPr/>
-              <a:t>12/26/2018</a:t>
+              <a:t>12/27/2018</a:t>
             </a:fld>
             <a:endParaRPr lang="en-US"/>
           </a:p>
@@ -19913,7 +19926,7 @@
             <a:fld id="{6E658DF8-B8C0-4C7F-85EB-B53A2DDD44A9}" type="datetimeFigureOut">
               <a:rPr lang="en-US" smtClean="0"/>
               <a:pPr/>
-              <a:t>12/26/2018</a:t>
+              <a:t>12/27/2018</a:t>
             </a:fld>
             <a:endParaRPr lang="en-US"/>
           </a:p>
@@ -20090,7 +20103,7 @@
             <a:fld id="{6E658DF8-B8C0-4C7F-85EB-B53A2DDD44A9}" type="datetimeFigureOut">
               <a:rPr lang="en-US" smtClean="0"/>
               <a:pPr/>
-              <a:t>12/26/2018</a:t>
+              <a:t>12/27/2018</a:t>
             </a:fld>
             <a:endParaRPr lang="en-US"/>
           </a:p>
@@ -20289,7 +20302,7 @@
             <a:fld id="{6E658DF8-B8C0-4C7F-85EB-B53A2DDD44A9}" type="datetimeFigureOut">
               <a:rPr lang="en-US" smtClean="0"/>
               <a:pPr/>
-              <a:t>12/26/2018</a:t>
+              <a:t>12/27/2018</a:t>
             </a:fld>
             <a:endParaRPr lang="en-US"/>
           </a:p>
@@ -20532,7 +20545,7 @@
             <a:fld id="{6E658DF8-B8C0-4C7F-85EB-B53A2DDD44A9}" type="datetimeFigureOut">
               <a:rPr lang="en-US" smtClean="0"/>
               <a:pPr/>
-              <a:t>12/26/2018</a:t>
+              <a:t>12/27/2018</a:t>
             </a:fld>
             <a:endParaRPr lang="en-US"/>
           </a:p>
@@ -20817,7 +20830,7 @@
             <a:fld id="{6E658DF8-B8C0-4C7F-85EB-B53A2DDD44A9}" type="datetimeFigureOut">
               <a:rPr lang="en-US" smtClean="0"/>
               <a:pPr/>
-              <a:t>12/26/2018</a:t>
+              <a:t>12/27/2018</a:t>
             </a:fld>
             <a:endParaRPr lang="en-US"/>
           </a:p>
@@ -21236,7 +21249,7 @@
             <a:fld id="{6E658DF8-B8C0-4C7F-85EB-B53A2DDD44A9}" type="datetimeFigureOut">
               <a:rPr lang="en-US" smtClean="0"/>
               <a:pPr/>
-              <a:t>12/26/2018</a:t>
+              <a:t>12/27/2018</a:t>
             </a:fld>
             <a:endParaRPr lang="en-US"/>
           </a:p>
@@ -21351,7 +21364,7 @@
             <a:fld id="{6E658DF8-B8C0-4C7F-85EB-B53A2DDD44A9}" type="datetimeFigureOut">
               <a:rPr lang="en-US" smtClean="0"/>
               <a:pPr/>
-              <a:t>12/26/2018</a:t>
+              <a:t>12/27/2018</a:t>
             </a:fld>
             <a:endParaRPr lang="en-US"/>
           </a:p>
@@ -21443,7 +21456,7 @@
             <a:fld id="{6E658DF8-B8C0-4C7F-85EB-B53A2DDD44A9}" type="datetimeFigureOut">
               <a:rPr lang="en-US" smtClean="0"/>
               <a:pPr/>
-              <a:t>12/26/2018</a:t>
+              <a:t>12/27/2018</a:t>
             </a:fld>
             <a:endParaRPr lang="en-US"/>
           </a:p>
@@ -21717,7 +21730,7 @@
             <a:fld id="{6E658DF8-B8C0-4C7F-85EB-B53A2DDD44A9}" type="datetimeFigureOut">
               <a:rPr lang="en-US" smtClean="0"/>
               <a:pPr/>
-              <a:t>12/26/2018</a:t>
+              <a:t>12/27/2018</a:t>
             </a:fld>
             <a:endParaRPr lang="en-US"/>
           </a:p>
@@ -21971,7 +21984,7 @@
             <a:fld id="{6E658DF8-B8C0-4C7F-85EB-B53A2DDD44A9}" type="datetimeFigureOut">
               <a:rPr lang="en-US" smtClean="0"/>
               <a:pPr/>
-              <a:t>12/26/2018</a:t>
+              <a:t>12/27/2018</a:t>
             </a:fld>
             <a:endParaRPr lang="en-US"/>
           </a:p>
@@ -22193,7 +22206,7 @@
             <a:fld id="{6E658DF8-B8C0-4C7F-85EB-B53A2DDD44A9}" type="datetimeFigureOut">
               <a:rPr lang="en-US" smtClean="0"/>
               <a:pPr/>
-              <a:t>12/26/2018</a:t>
+              <a:t>12/27/2018</a:t>
             </a:fld>
             <a:endParaRPr lang="en-US"/>
           </a:p>
@@ -31785,352 +31798,201 @@
             <p:ph type="title"/>
           </p:nvPr>
         </p:nvSpPr>
-        <p:spPr>
-          <a:xfrm>
-            <a:off x="457200" y="1981200"/>
-            <a:ext cx="8229600" cy="1143000"/>
-          </a:xfrm>
-        </p:spPr>
+        <p:spPr/>
         <p:txBody>
           <a:bodyPr/>
           <a:lstStyle/>
           <a:p>
             <a:r>
               <a:rPr lang="en-US" dirty="0" smtClean="0"/>
-              <a:t>Thank You</a:t>
-            </a:r>
-            <a:endParaRPr lang="en-US" dirty="0"/>
+              <a:t>Lake Ecosystem</a:t>
+            </a:r>
+            <a:endParaRPr lang="en-IN" dirty="0"/>
           </a:p>
         </p:txBody>
       </p:sp>
       <p:sp>
         <p:nvSpPr>
-          <p:cNvPr id="4" name="Subtitle 2"/>
-          <p:cNvSpPr txBox="1">
-            <a:spLocks/>
+          <p:cNvPr id="3" name="Content Placeholder 2"/>
+          <p:cNvSpPr>
+            <a:spLocks noGrp="1"/>
           </p:cNvSpPr>
-          <p:nvPr/>
+          <p:nvPr>
+            <p:ph idx="1"/>
+          </p:nvPr>
         </p:nvSpPr>
-        <p:spPr>
-          <a:xfrm>
-            <a:off x="4038600" y="4191000"/>
-            <a:ext cx="4191000" cy="1752600"/>
-          </a:xfrm>
-          <a:prstGeom prst="rect">
-            <a:avLst/>
-          </a:prstGeom>
-        </p:spPr>
+        <p:spPr/>
         <p:txBody>
-          <a:bodyPr vert="horz" lIns="91440" tIns="45720" rIns="91440" bIns="45720" rtlCol="0">
-            <a:normAutofit fontScale="92500" lnSpcReduction="10000"/>
-          </a:bodyPr>
+          <a:bodyPr/>
           <a:lstStyle/>
           <a:p>
-            <a:pPr marL="342900" marR="0" lvl="0" indent="-342900" algn="r" defTabSz="914400" rtl="0" eaLnBrk="1" fontAlgn="auto" latinLnBrk="0" hangingPunct="1">
-              <a:lnSpc>
-                <a:spcPct val="100000"/>
-              </a:lnSpc>
-              <a:spcBef>
-                <a:spcPct val="20000"/>
-              </a:spcBef>
-              <a:spcAft>
-                <a:spcPts val="0"/>
-              </a:spcAft>
-              <a:buClrTx/>
-              <a:buSzTx/>
-              <a:tabLst/>
-              <a:defRPr/>
-            </a:pPr>
-            <a:r>
-              <a:rPr kumimoji="0" lang="en-US" sz="2200" b="0" i="0" u="none" strike="noStrike" kern="1200" cap="none" spc="0" normalizeH="0" baseline="0" noProof="0" dirty="0" err="1" smtClean="0">
-                <a:ln>
-                  <a:noFill/>
-                </a:ln>
-                <a:solidFill>
-                  <a:schemeClr val="tx1"/>
-                </a:solidFill>
-                <a:effectLst/>
-                <a:uLnTx/>
-                <a:uFillTx/>
-                <a:latin typeface="Cambria" pitchFamily="18" charset="0"/>
-                <a:ea typeface="+mn-ea"/>
-                <a:cs typeface="+mn-cs"/>
-              </a:rPr>
-              <a:t>Rajasekaran</a:t>
-            </a:r>
-            <a:r>
-              <a:rPr kumimoji="0" lang="en-US" sz="2200" b="0" i="0" u="none" strike="noStrike" kern="1200" cap="none" spc="0" normalizeH="0" baseline="0" noProof="0" dirty="0" smtClean="0">
-                <a:ln>
-                  <a:noFill/>
-                </a:ln>
-                <a:solidFill>
-                  <a:schemeClr val="tx1"/>
-                </a:solidFill>
-                <a:effectLst/>
-                <a:uLnTx/>
-                <a:uFillTx/>
-                <a:latin typeface="Cambria" pitchFamily="18" charset="0"/>
-                <a:ea typeface="+mn-ea"/>
-                <a:cs typeface="+mn-cs"/>
-              </a:rPr>
-              <a:t> S</a:t>
-            </a:r>
-          </a:p>
-          <a:p>
-            <a:pPr marL="342900" marR="0" lvl="0" indent="-342900" algn="r" defTabSz="914400" rtl="0" eaLnBrk="1" fontAlgn="auto" latinLnBrk="0" hangingPunct="1">
-              <a:lnSpc>
-                <a:spcPct val="100000"/>
-              </a:lnSpc>
-              <a:spcBef>
-                <a:spcPct val="20000"/>
-              </a:spcBef>
-              <a:spcAft>
-                <a:spcPts val="0"/>
-              </a:spcAft>
-              <a:buClrTx/>
-              <a:buSzTx/>
-              <a:tabLst/>
-              <a:defRPr/>
-            </a:pPr>
-            <a:r>
-              <a:rPr kumimoji="0" lang="en-US" sz="1600" b="0" i="0" u="none" strike="noStrike" kern="1200" cap="none" spc="0" normalizeH="0" baseline="0" noProof="0" dirty="0" smtClean="0">
-                <a:ln>
-                  <a:noFill/>
-                </a:ln>
-                <a:solidFill>
-                  <a:schemeClr val="tx1"/>
-                </a:solidFill>
-                <a:effectLst/>
-                <a:uLnTx/>
-                <a:uFillTx/>
-                <a:latin typeface="Cambria" pitchFamily="18" charset="0"/>
-                <a:ea typeface="+mn-ea"/>
-                <a:cs typeface="+mn-cs"/>
-              </a:rPr>
-              <a:t>Assistant Professor,</a:t>
-            </a:r>
-          </a:p>
-          <a:p>
-            <a:pPr marL="342900" marR="0" lvl="0" indent="-342900" algn="r" defTabSz="914400" rtl="0" eaLnBrk="1" fontAlgn="auto" latinLnBrk="0" hangingPunct="1">
-              <a:lnSpc>
-                <a:spcPct val="100000"/>
-              </a:lnSpc>
-              <a:spcBef>
-                <a:spcPct val="20000"/>
-              </a:spcBef>
-              <a:spcAft>
-                <a:spcPts val="0"/>
-              </a:spcAft>
-              <a:buClrTx/>
-              <a:buSzTx/>
-              <a:tabLst/>
-              <a:defRPr/>
-            </a:pPr>
-            <a:r>
-              <a:rPr kumimoji="0" lang="en-US" sz="1600" b="0" i="0" u="none" strike="noStrike" kern="1200" cap="none" spc="0" normalizeH="0" baseline="0" noProof="0" dirty="0" smtClean="0">
-                <a:ln>
-                  <a:noFill/>
-                </a:ln>
-                <a:solidFill>
-                  <a:schemeClr val="tx1"/>
-                </a:solidFill>
-                <a:effectLst/>
-                <a:uLnTx/>
-                <a:uFillTx/>
-                <a:latin typeface="Cambria" pitchFamily="18" charset="0"/>
-                <a:ea typeface="+mn-ea"/>
-                <a:cs typeface="+mn-cs"/>
-              </a:rPr>
-              <a:t>Department of Information Technology,</a:t>
-            </a:r>
-          </a:p>
-          <a:p>
-            <a:pPr marL="342900" marR="0" lvl="0" indent="-342900" algn="r" defTabSz="914400" rtl="0" eaLnBrk="1" fontAlgn="auto" latinLnBrk="0" hangingPunct="1">
-              <a:lnSpc>
-                <a:spcPct val="100000"/>
-              </a:lnSpc>
-              <a:spcBef>
-                <a:spcPct val="20000"/>
-              </a:spcBef>
-              <a:spcAft>
-                <a:spcPts val="0"/>
-              </a:spcAft>
-              <a:buClrTx/>
-              <a:buSzTx/>
-              <a:tabLst/>
-              <a:defRPr/>
-            </a:pPr>
-            <a:r>
-              <a:rPr kumimoji="0" lang="en-US" sz="1600" b="0" i="0" u="none" strike="noStrike" kern="1200" cap="none" spc="0" normalizeH="0" baseline="0" noProof="0" dirty="0" err="1" smtClean="0">
-                <a:ln>
-                  <a:noFill/>
-                </a:ln>
-                <a:solidFill>
-                  <a:schemeClr val="tx1"/>
-                </a:solidFill>
-                <a:effectLst/>
-                <a:uLnTx/>
-                <a:uFillTx/>
-                <a:latin typeface="Cambria" pitchFamily="18" charset="0"/>
-                <a:ea typeface="+mn-ea"/>
-                <a:cs typeface="+mn-cs"/>
-              </a:rPr>
-              <a:t>KGiSL</a:t>
-            </a:r>
-            <a:r>
-              <a:rPr kumimoji="0" lang="en-US" sz="1600" b="0" i="0" u="none" strike="noStrike" kern="1200" cap="none" spc="0" normalizeH="0" baseline="0" noProof="0" dirty="0" smtClean="0">
-                <a:ln>
-                  <a:noFill/>
-                </a:ln>
-                <a:solidFill>
-                  <a:schemeClr val="tx1"/>
-                </a:solidFill>
-                <a:effectLst/>
-                <a:uLnTx/>
-                <a:uFillTx/>
-                <a:latin typeface="Cambria" pitchFamily="18" charset="0"/>
-                <a:ea typeface="+mn-ea"/>
-                <a:cs typeface="+mn-cs"/>
-              </a:rPr>
-              <a:t> Institute of Technology,</a:t>
-            </a:r>
-          </a:p>
-          <a:p>
-            <a:pPr marL="342900" marR="0" lvl="0" indent="-342900" algn="r" defTabSz="914400" rtl="0" eaLnBrk="1" fontAlgn="auto" latinLnBrk="0" hangingPunct="1">
-              <a:lnSpc>
-                <a:spcPct val="100000"/>
-              </a:lnSpc>
-              <a:spcBef>
-                <a:spcPct val="20000"/>
-              </a:spcBef>
-              <a:spcAft>
-                <a:spcPts val="0"/>
-              </a:spcAft>
-              <a:buClrTx/>
-              <a:buSzTx/>
-              <a:tabLst/>
-              <a:defRPr/>
-            </a:pPr>
-            <a:r>
-              <a:rPr kumimoji="0" lang="en-US" sz="1600" b="0" i="0" u="none" strike="noStrike" kern="1200" cap="none" spc="0" normalizeH="0" baseline="0" noProof="0" dirty="0" smtClean="0">
-                <a:ln>
-                  <a:noFill/>
-                </a:ln>
-                <a:solidFill>
-                  <a:schemeClr val="tx1"/>
-                </a:solidFill>
-                <a:effectLst/>
-                <a:uLnTx/>
-                <a:uFillTx/>
-                <a:latin typeface="Cambria" pitchFamily="18" charset="0"/>
-                <a:ea typeface="+mn-ea"/>
-                <a:cs typeface="+mn-cs"/>
-              </a:rPr>
-              <a:t>email: </a:t>
-            </a:r>
-            <a:r>
-              <a:rPr kumimoji="0" lang="en-US" sz="1600" b="0" i="0" u="none" strike="noStrike" kern="1200" cap="none" spc="0" normalizeH="0" baseline="0" noProof="0" dirty="0" smtClean="0">
-                <a:ln>
-                  <a:noFill/>
-                </a:ln>
-                <a:solidFill>
-                  <a:schemeClr val="tx1"/>
-                </a:solidFill>
-                <a:effectLst/>
-                <a:uLnTx/>
-                <a:uFillTx/>
-                <a:latin typeface="Cambria" pitchFamily="18" charset="0"/>
-                <a:ea typeface="+mn-ea"/>
-                <a:cs typeface="+mn-cs"/>
-                <a:hlinkClick r:id="rId2"/>
-              </a:rPr>
-              <a:t>proffraja@gmail.com</a:t>
-            </a:r>
-            <a:endParaRPr lang="en-US" sz="1600" dirty="0" smtClean="0">
-              <a:latin typeface="Cambria" pitchFamily="18" charset="0"/>
-            </a:endParaRPr>
-          </a:p>
-          <a:p>
-            <a:pPr marL="342900" marR="0" lvl="0" indent="-342900" algn="r" defTabSz="914400" rtl="0" eaLnBrk="1" fontAlgn="auto" latinLnBrk="0" hangingPunct="1">
-              <a:lnSpc>
-                <a:spcPct val="100000"/>
-              </a:lnSpc>
-              <a:spcBef>
-                <a:spcPct val="20000"/>
-              </a:spcBef>
-              <a:spcAft>
-                <a:spcPts val="0"/>
-              </a:spcAft>
-              <a:buClrTx/>
-              <a:buSzTx/>
-              <a:tabLst/>
-              <a:defRPr/>
-            </a:pPr>
-            <a:r>
-              <a:rPr lang="en-US" sz="1600" dirty="0" err="1" smtClean="0">
-                <a:latin typeface="Cambria" pitchFamily="18" charset="0"/>
-              </a:rPr>
-              <a:t>Github:</a:t>
-            </a:r>
-            <a:r>
-              <a:rPr lang="en-US" sz="1600" dirty="0" err="1" smtClean="0">
-                <a:latin typeface="Cambria" pitchFamily="18" charset="0"/>
-                <a:hlinkClick r:id="rId3"/>
-              </a:rPr>
-              <a:t>www.github.com</a:t>
-            </a:r>
-            <a:r>
-              <a:rPr lang="en-US" sz="1600" dirty="0" smtClean="0">
-                <a:latin typeface="Cambria" pitchFamily="18" charset="0"/>
-                <a:hlinkClick r:id="rId3"/>
-              </a:rPr>
-              <a:t>/</a:t>
-            </a:r>
-            <a:r>
-              <a:rPr lang="en-US" sz="1600" dirty="0" err="1" smtClean="0">
-                <a:latin typeface="Cambria" pitchFamily="18" charset="0"/>
-                <a:hlinkClick r:id="rId3"/>
-              </a:rPr>
-              <a:t>rajasekaranap</a:t>
-            </a:r>
-            <a:endParaRPr lang="en-US" sz="1600" dirty="0" smtClean="0">
-              <a:latin typeface="Cambria" pitchFamily="18" charset="0"/>
-            </a:endParaRPr>
-          </a:p>
-          <a:p>
-            <a:pPr marL="342900" marR="0" lvl="0" indent="-342900" algn="r" defTabSz="914400" rtl="0" eaLnBrk="1" fontAlgn="auto" latinLnBrk="0" hangingPunct="1">
-              <a:lnSpc>
-                <a:spcPct val="100000"/>
-              </a:lnSpc>
-              <a:spcBef>
-                <a:spcPct val="20000"/>
-              </a:spcBef>
-              <a:spcAft>
-                <a:spcPts val="0"/>
-              </a:spcAft>
-              <a:buClrTx/>
-              <a:buSzTx/>
-              <a:tabLst/>
-              <a:defRPr/>
-            </a:pPr>
-            <a:endParaRPr lang="en-US" sz="1600" dirty="0" smtClean="0">
-              <a:latin typeface="Cambria" pitchFamily="18" charset="0"/>
-            </a:endParaRPr>
+            <a:r>
+              <a:rPr lang="en-US" dirty="0" smtClean="0"/>
+              <a:t>Characteristics</a:t>
+            </a:r>
+          </a:p>
+          <a:p>
+            <a:pPr lvl="1"/>
+            <a:r>
+              <a:rPr lang="en-US" dirty="0" smtClean="0"/>
+              <a:t>Shallow fresh water body</a:t>
+            </a:r>
+          </a:p>
+          <a:p>
+            <a:pPr lvl="1"/>
+            <a:r>
+              <a:rPr lang="en-US" dirty="0" smtClean="0"/>
+              <a:t>Permanent water body with large resources.</a:t>
+            </a:r>
+          </a:p>
+          <a:p>
+            <a:pPr lvl="1"/>
+            <a:r>
+              <a:rPr lang="en-US" dirty="0" smtClean="0"/>
+              <a:t>Helps in irrigation and drinking.</a:t>
+            </a:r>
+            <a:endParaRPr lang="en-IN" dirty="0"/>
           </a:p>
         </p:txBody>
       </p:sp>
     </p:spTree>
+    <p:extLst>
+      <p:ext uri="{BB962C8B-B14F-4D97-AF65-F5344CB8AC3E}">
+        <p14:creationId xmlns:p14="http://schemas.microsoft.com/office/powerpoint/2010/main" val="1751781108"/>
+      </p:ext>
+    </p:extLst>
   </p:cSld>
   <p:clrMapOvr>
     <a:masterClrMapping/>
   </p:clrMapOvr>
-  <p:timing>
-    <p:tnLst>
-      <p:par>
-        <p:cTn id="1" dur="indefinite" restart="never" nodeType="tmRoot"/>
-      </p:par>
-    </p:tnLst>
-  </p:timing>
+</p:sld>
+</file>
+
+<file path=ppt/slides/slide79.xml><?xml version="1.0" encoding="utf-8"?>
+<p:sld xmlns:a="http://schemas.openxmlformats.org/drawingml/2006/main" xmlns:r="http://schemas.openxmlformats.org/officeDocument/2006/relationships" xmlns:p="http://schemas.openxmlformats.org/presentationml/2006/main">
+  <p:cSld>
+    <p:spTree>
+      <p:nvGrpSpPr>
+        <p:cNvPr id="1" name=""/>
+        <p:cNvGrpSpPr/>
+        <p:nvPr/>
+      </p:nvGrpSpPr>
+      <p:grpSpPr>
+        <a:xfrm>
+          <a:off x="0" y="0"/>
+          <a:ext cx="0" cy="0"/>
+          <a:chOff x="0" y="0"/>
+          <a:chExt cx="0" cy="0"/>
+        </a:xfrm>
+      </p:grpSpPr>
+      <p:sp>
+        <p:nvSpPr>
+          <p:cNvPr id="2" name="Title 1"/>
+          <p:cNvSpPr>
+            <a:spLocks noGrp="1"/>
+          </p:cNvSpPr>
+          <p:nvPr>
+            <p:ph type="title"/>
+          </p:nvPr>
+        </p:nvSpPr>
+        <p:spPr/>
+        <p:txBody>
+          <a:bodyPr/>
+          <a:lstStyle/>
+          <a:p>
+            <a:r>
+              <a:rPr lang="en-US" dirty="0" smtClean="0"/>
+              <a:t>Lake Ecosystem</a:t>
+            </a:r>
+            <a:endParaRPr lang="en-IN" dirty="0"/>
+          </a:p>
+        </p:txBody>
+      </p:sp>
+      <p:sp>
+        <p:nvSpPr>
+          <p:cNvPr id="3" name="Content Placeholder 2"/>
+          <p:cNvSpPr>
+            <a:spLocks noGrp="1"/>
+          </p:cNvSpPr>
+          <p:nvPr>
+            <p:ph idx="1"/>
+          </p:nvPr>
+        </p:nvSpPr>
+        <p:spPr/>
+        <p:txBody>
+          <a:bodyPr/>
+          <a:lstStyle/>
+          <a:p>
+            <a:r>
+              <a:rPr lang="en-US" dirty="0" smtClean="0"/>
+              <a:t>Abiotic Components</a:t>
+            </a:r>
+          </a:p>
+          <a:p>
+            <a:pPr lvl="1"/>
+            <a:r>
+              <a:rPr lang="en-US" dirty="0" smtClean="0"/>
+              <a:t>Temperature</a:t>
+            </a:r>
+            <a:endParaRPr lang="en-US" dirty="0"/>
+          </a:p>
+          <a:p>
+            <a:pPr lvl="1"/>
+            <a:r>
+              <a:rPr lang="en-US" dirty="0" smtClean="0"/>
+              <a:t>Light </a:t>
+            </a:r>
+          </a:p>
+          <a:p>
+            <a:pPr lvl="1"/>
+            <a:r>
+              <a:rPr lang="en-US" dirty="0" smtClean="0"/>
+              <a:t>Proteins and lipids</a:t>
+            </a:r>
+          </a:p>
+          <a:p>
+            <a:pPr lvl="1"/>
+            <a:r>
+              <a:rPr lang="en-US" dirty="0" smtClean="0"/>
+              <a:t>Turbidity</a:t>
+            </a:r>
+          </a:p>
+          <a:p>
+            <a:pPr lvl="1"/>
+            <a:r>
+              <a:rPr lang="en-US" dirty="0" smtClean="0"/>
+              <a:t>O</a:t>
+            </a:r>
+            <a:r>
+              <a:rPr lang="en-US" sz="2000" dirty="0" smtClean="0"/>
+              <a:t>2</a:t>
+            </a:r>
+            <a:r>
+              <a:rPr lang="en-US" dirty="0" smtClean="0"/>
+              <a:t> and CO</a:t>
+            </a:r>
+            <a:r>
+              <a:rPr lang="en-US" sz="2000" dirty="0" smtClean="0"/>
+              <a:t>2</a:t>
+            </a:r>
+            <a:endParaRPr lang="en-US" sz="2000" dirty="0"/>
+          </a:p>
+          <a:p>
+            <a:pPr lvl="1"/>
+            <a:endParaRPr lang="en-IN" dirty="0"/>
+          </a:p>
+        </p:txBody>
+      </p:sp>
+    </p:spTree>
+    <p:extLst>
+      <p:ext uri="{BB962C8B-B14F-4D97-AF65-F5344CB8AC3E}">
+        <p14:creationId xmlns:p14="http://schemas.microsoft.com/office/powerpoint/2010/main" val="3790665912"/>
+      </p:ext>
+    </p:extLst>
+  </p:cSld>
+  <p:clrMapOvr>
+    <a:masterClrMapping/>
+  </p:clrMapOvr>
 </p:sld>
 </file>
 
@@ -32206,6 +32068,1313 @@
         </p:spPr>
       </p:pic>
     </p:spTree>
+  </p:cSld>
+  <p:clrMapOvr>
+    <a:masterClrMapping/>
+  </p:clrMapOvr>
+</p:sld>
+</file>
+
+<file path=ppt/slides/slide80.xml><?xml version="1.0" encoding="utf-8"?>
+<p:sld xmlns:a="http://schemas.openxmlformats.org/drawingml/2006/main" xmlns:r="http://schemas.openxmlformats.org/officeDocument/2006/relationships" xmlns:p="http://schemas.openxmlformats.org/presentationml/2006/main">
+  <p:cSld>
+    <p:spTree>
+      <p:nvGrpSpPr>
+        <p:cNvPr id="1" name=""/>
+        <p:cNvGrpSpPr/>
+        <p:nvPr/>
+      </p:nvGrpSpPr>
+      <p:grpSpPr>
+        <a:xfrm>
+          <a:off x="0" y="0"/>
+          <a:ext cx="0" cy="0"/>
+          <a:chOff x="0" y="0"/>
+          <a:chExt cx="0" cy="0"/>
+        </a:xfrm>
+      </p:grpSpPr>
+      <p:sp>
+        <p:nvSpPr>
+          <p:cNvPr id="2" name="Title 1"/>
+          <p:cNvSpPr>
+            <a:spLocks noGrp="1"/>
+          </p:cNvSpPr>
+          <p:nvPr>
+            <p:ph type="title"/>
+          </p:nvPr>
+        </p:nvSpPr>
+        <p:spPr/>
+        <p:txBody>
+          <a:bodyPr/>
+          <a:lstStyle/>
+          <a:p>
+            <a:r>
+              <a:rPr lang="en-US" dirty="0"/>
+              <a:t>Lake Ecosystem</a:t>
+            </a:r>
+            <a:endParaRPr lang="en-IN" dirty="0"/>
+          </a:p>
+        </p:txBody>
+      </p:sp>
+      <p:sp>
+        <p:nvSpPr>
+          <p:cNvPr id="3" name="Content Placeholder 2"/>
+          <p:cNvSpPr>
+            <a:spLocks noGrp="1"/>
+          </p:cNvSpPr>
+          <p:nvPr>
+            <p:ph idx="1"/>
+          </p:nvPr>
+        </p:nvSpPr>
+        <p:spPr/>
+        <p:txBody>
+          <a:bodyPr/>
+          <a:lstStyle/>
+          <a:p>
+            <a:r>
+              <a:rPr lang="en-US" dirty="0" smtClean="0"/>
+              <a:t>Biotic Components</a:t>
+            </a:r>
+          </a:p>
+          <a:p>
+            <a:pPr lvl="1"/>
+            <a:r>
+              <a:rPr lang="en-US" dirty="0" smtClean="0"/>
+              <a:t>They are green plants submerged, floating plants</a:t>
+            </a:r>
+          </a:p>
+          <a:p>
+            <a:pPr lvl="2"/>
+            <a:r>
+              <a:rPr lang="en-US" dirty="0" smtClean="0"/>
+              <a:t>Phytoplankton</a:t>
+            </a:r>
+          </a:p>
+          <a:p>
+            <a:pPr lvl="2"/>
+            <a:r>
+              <a:rPr lang="en-US" dirty="0" smtClean="0"/>
+              <a:t>Algae</a:t>
+            </a:r>
+          </a:p>
+          <a:p>
+            <a:pPr lvl="2"/>
+            <a:r>
+              <a:rPr lang="en-US" dirty="0" smtClean="0"/>
+              <a:t>Flagellates</a:t>
+            </a:r>
+          </a:p>
+          <a:p>
+            <a:pPr lvl="1"/>
+            <a:r>
+              <a:rPr lang="en-US" dirty="0" smtClean="0"/>
+              <a:t>Consumers</a:t>
+            </a:r>
+          </a:p>
+          <a:p>
+            <a:pPr lvl="2"/>
+            <a:r>
+              <a:rPr lang="en-US" dirty="0" smtClean="0"/>
+              <a:t>Primary</a:t>
+            </a:r>
+          </a:p>
+          <a:p>
+            <a:pPr lvl="3"/>
+            <a:r>
+              <a:rPr lang="en-US" dirty="0" err="1" smtClean="0"/>
+              <a:t>Cilictes</a:t>
+            </a:r>
+            <a:r>
+              <a:rPr lang="en-US" dirty="0" smtClean="0"/>
+              <a:t>, protozoans </a:t>
+            </a:r>
+            <a:endParaRPr lang="en-IN" dirty="0"/>
+          </a:p>
+        </p:txBody>
+      </p:sp>
+    </p:spTree>
+    <p:extLst>
+      <p:ext uri="{BB962C8B-B14F-4D97-AF65-F5344CB8AC3E}">
+        <p14:creationId xmlns:p14="http://schemas.microsoft.com/office/powerpoint/2010/main" val="3602188827"/>
+      </p:ext>
+    </p:extLst>
+  </p:cSld>
+  <p:clrMapOvr>
+    <a:masterClrMapping/>
+  </p:clrMapOvr>
+</p:sld>
+</file>
+
+<file path=ppt/slides/slide81.xml><?xml version="1.0" encoding="utf-8"?>
+<p:sld xmlns:a="http://schemas.openxmlformats.org/drawingml/2006/main" xmlns:r="http://schemas.openxmlformats.org/officeDocument/2006/relationships" xmlns:p="http://schemas.openxmlformats.org/presentationml/2006/main">
+  <p:cSld>
+    <p:spTree>
+      <p:nvGrpSpPr>
+        <p:cNvPr id="1" name=""/>
+        <p:cNvGrpSpPr/>
+        <p:nvPr/>
+      </p:nvGrpSpPr>
+      <p:grpSpPr>
+        <a:xfrm>
+          <a:off x="0" y="0"/>
+          <a:ext cx="0" cy="0"/>
+          <a:chOff x="0" y="0"/>
+          <a:chExt cx="0" cy="0"/>
+        </a:xfrm>
+      </p:grpSpPr>
+      <p:sp>
+        <p:nvSpPr>
+          <p:cNvPr id="2" name="Title 1"/>
+          <p:cNvSpPr>
+            <a:spLocks noGrp="1"/>
+          </p:cNvSpPr>
+          <p:nvPr>
+            <p:ph type="title"/>
+          </p:nvPr>
+        </p:nvSpPr>
+        <p:spPr/>
+        <p:txBody>
+          <a:bodyPr/>
+          <a:lstStyle/>
+          <a:p>
+            <a:r>
+              <a:rPr lang="en-US" dirty="0"/>
+              <a:t>Lake Ecosystem</a:t>
+            </a:r>
+            <a:endParaRPr lang="en-IN" dirty="0"/>
+          </a:p>
+        </p:txBody>
+      </p:sp>
+      <p:sp>
+        <p:nvSpPr>
+          <p:cNvPr id="3" name="Content Placeholder 2"/>
+          <p:cNvSpPr>
+            <a:spLocks noGrp="1"/>
+          </p:cNvSpPr>
+          <p:nvPr>
+            <p:ph idx="1"/>
+          </p:nvPr>
+        </p:nvSpPr>
+        <p:spPr/>
+        <p:txBody>
+          <a:bodyPr>
+            <a:normAutofit lnSpcReduction="10000"/>
+          </a:bodyPr>
+          <a:lstStyle/>
+          <a:p>
+            <a:r>
+              <a:rPr lang="en-US" dirty="0" smtClean="0"/>
+              <a:t>Biotic Components</a:t>
+            </a:r>
+          </a:p>
+          <a:p>
+            <a:pPr lvl="1"/>
+            <a:r>
+              <a:rPr lang="en-US" dirty="0" smtClean="0"/>
+              <a:t>Consumers</a:t>
+            </a:r>
+          </a:p>
+          <a:p>
+            <a:pPr lvl="2"/>
+            <a:r>
+              <a:rPr lang="en-US" dirty="0" smtClean="0"/>
+              <a:t>Secondary</a:t>
+            </a:r>
+          </a:p>
+          <a:p>
+            <a:pPr lvl="3"/>
+            <a:r>
+              <a:rPr lang="en-US" dirty="0" smtClean="0"/>
+              <a:t>Insects and small fishes</a:t>
+            </a:r>
+          </a:p>
+          <a:p>
+            <a:pPr lvl="2"/>
+            <a:r>
+              <a:rPr lang="en-US" dirty="0" smtClean="0"/>
+              <a:t>Tertiary</a:t>
+            </a:r>
+          </a:p>
+          <a:p>
+            <a:pPr lvl="3"/>
+            <a:r>
+              <a:rPr lang="en-US" dirty="0" smtClean="0"/>
+              <a:t>Large fishes</a:t>
+            </a:r>
+          </a:p>
+          <a:p>
+            <a:pPr lvl="1"/>
+            <a:r>
+              <a:rPr lang="en-US" dirty="0" smtClean="0"/>
+              <a:t>Decomposers</a:t>
+            </a:r>
+          </a:p>
+          <a:p>
+            <a:pPr lvl="2"/>
+            <a:r>
+              <a:rPr lang="en-US" dirty="0" smtClean="0"/>
+              <a:t>Bacteria</a:t>
+            </a:r>
+          </a:p>
+          <a:p>
+            <a:pPr lvl="2"/>
+            <a:r>
+              <a:rPr lang="en-US" dirty="0" smtClean="0"/>
+              <a:t>Fungi</a:t>
+            </a:r>
+          </a:p>
+          <a:p>
+            <a:pPr lvl="2"/>
+            <a:r>
+              <a:rPr lang="en-US" dirty="0" err="1" smtClean="0"/>
+              <a:t>Actinomycetes</a:t>
+            </a:r>
+            <a:endParaRPr lang="en-US" dirty="0" smtClean="0"/>
+          </a:p>
+          <a:p>
+            <a:pPr lvl="3"/>
+            <a:endParaRPr lang="en-US" dirty="0" smtClean="0"/>
+          </a:p>
+          <a:p>
+            <a:pPr lvl="3"/>
+            <a:endParaRPr lang="en-IN" dirty="0"/>
+          </a:p>
+        </p:txBody>
+      </p:sp>
+    </p:spTree>
+    <p:extLst>
+      <p:ext uri="{BB962C8B-B14F-4D97-AF65-F5344CB8AC3E}">
+        <p14:creationId xmlns:p14="http://schemas.microsoft.com/office/powerpoint/2010/main" val="4141770888"/>
+      </p:ext>
+    </p:extLst>
+  </p:cSld>
+  <p:clrMapOvr>
+    <a:masterClrMapping/>
+  </p:clrMapOvr>
+</p:sld>
+</file>
+
+<file path=ppt/slides/slide82.xml><?xml version="1.0" encoding="utf-8"?>
+<p:sld xmlns:a="http://schemas.openxmlformats.org/drawingml/2006/main" xmlns:r="http://schemas.openxmlformats.org/officeDocument/2006/relationships" xmlns:p="http://schemas.openxmlformats.org/presentationml/2006/main">
+  <p:cSld>
+    <p:spTree>
+      <p:nvGrpSpPr>
+        <p:cNvPr id="1" name=""/>
+        <p:cNvGrpSpPr/>
+        <p:nvPr/>
+      </p:nvGrpSpPr>
+      <p:grpSpPr>
+        <a:xfrm>
+          <a:off x="0" y="0"/>
+          <a:ext cx="0" cy="0"/>
+          <a:chOff x="0" y="0"/>
+          <a:chExt cx="0" cy="0"/>
+        </a:xfrm>
+      </p:grpSpPr>
+      <p:sp>
+        <p:nvSpPr>
+          <p:cNvPr id="2" name="Title 1"/>
+          <p:cNvSpPr>
+            <a:spLocks noGrp="1"/>
+          </p:cNvSpPr>
+          <p:nvPr>
+            <p:ph type="title"/>
+          </p:nvPr>
+        </p:nvSpPr>
+        <p:spPr/>
+        <p:txBody>
+          <a:bodyPr/>
+          <a:lstStyle/>
+          <a:p>
+            <a:r>
+              <a:rPr lang="en-US" dirty="0" smtClean="0"/>
+              <a:t>River (Stream) Ecosystem</a:t>
+            </a:r>
+            <a:endParaRPr lang="en-IN" dirty="0"/>
+          </a:p>
+        </p:txBody>
+      </p:sp>
+      <p:sp>
+        <p:nvSpPr>
+          <p:cNvPr id="3" name="Content Placeholder 2"/>
+          <p:cNvSpPr>
+            <a:spLocks noGrp="1"/>
+          </p:cNvSpPr>
+          <p:nvPr>
+            <p:ph idx="1"/>
+          </p:nvPr>
+        </p:nvSpPr>
+        <p:spPr/>
+        <p:txBody>
+          <a:bodyPr/>
+          <a:lstStyle/>
+          <a:p>
+            <a:r>
+              <a:rPr lang="en-US" dirty="0" smtClean="0"/>
+              <a:t>The running water of stream or river is usually well oxygenated, because it absorbs oxygen from the air.</a:t>
+            </a:r>
+          </a:p>
+          <a:p>
+            <a:r>
+              <a:rPr lang="en-US" dirty="0" smtClean="0"/>
+              <a:t>The number of animals in river is low in stream</a:t>
+            </a:r>
+          </a:p>
+        </p:txBody>
+      </p:sp>
+      <p:pic>
+        <p:nvPicPr>
+          <p:cNvPr id="1026" name="Picture 2" descr="Image result for river ecosystem"/>
+          <p:cNvPicPr>
+            <a:picLocks noChangeAspect="1" noChangeArrowheads="1"/>
+          </p:cNvPicPr>
+          <p:nvPr/>
+        </p:nvPicPr>
+        <p:blipFill>
+          <a:blip r:embed="rId2">
+            <a:extLst>
+              <a:ext uri="{28A0092B-C50C-407E-A947-70E740481C1C}">
+                <a14:useLocalDpi xmlns:a14="http://schemas.microsoft.com/office/drawing/2010/main" val="0"/>
+              </a:ext>
+            </a:extLst>
+          </a:blip>
+          <a:srcRect/>
+          <a:stretch>
+            <a:fillRect/>
+          </a:stretch>
+        </p:blipFill>
+        <p:spPr bwMode="auto">
+          <a:xfrm>
+            <a:off x="4355976" y="4077072"/>
+            <a:ext cx="3716188" cy="2472696"/>
+          </a:xfrm>
+          <a:prstGeom prst="rect">
+            <a:avLst/>
+          </a:prstGeom>
+          <a:noFill/>
+          <a:extLst>
+            <a:ext uri="{909E8E84-426E-40DD-AFC4-6F175D3DCCD1}">
+              <a14:hiddenFill xmlns:a14="http://schemas.microsoft.com/office/drawing/2010/main">
+                <a:solidFill>
+                  <a:srgbClr val="FFFFFF"/>
+                </a:solidFill>
+              </a14:hiddenFill>
+            </a:ext>
+          </a:extLst>
+        </p:spPr>
+      </p:pic>
+    </p:spTree>
+    <p:extLst>
+      <p:ext uri="{BB962C8B-B14F-4D97-AF65-F5344CB8AC3E}">
+        <p14:creationId xmlns:p14="http://schemas.microsoft.com/office/powerpoint/2010/main" val="2140459236"/>
+      </p:ext>
+    </p:extLst>
+  </p:cSld>
+  <p:clrMapOvr>
+    <a:masterClrMapping/>
+  </p:clrMapOvr>
+</p:sld>
+</file>
+
+<file path=ppt/slides/slide83.xml><?xml version="1.0" encoding="utf-8"?>
+<p:sld xmlns:a="http://schemas.openxmlformats.org/drawingml/2006/main" xmlns:r="http://schemas.openxmlformats.org/officeDocument/2006/relationships" xmlns:p="http://schemas.openxmlformats.org/presentationml/2006/main">
+  <p:cSld>
+    <p:spTree>
+      <p:nvGrpSpPr>
+        <p:cNvPr id="1" name=""/>
+        <p:cNvGrpSpPr/>
+        <p:nvPr/>
+      </p:nvGrpSpPr>
+      <p:grpSpPr>
+        <a:xfrm>
+          <a:off x="0" y="0"/>
+          <a:ext cx="0" cy="0"/>
+          <a:chOff x="0" y="0"/>
+          <a:chExt cx="0" cy="0"/>
+        </a:xfrm>
+      </p:grpSpPr>
+      <p:sp>
+        <p:nvSpPr>
+          <p:cNvPr id="2" name="Title 1"/>
+          <p:cNvSpPr>
+            <a:spLocks noGrp="1"/>
+          </p:cNvSpPr>
+          <p:nvPr>
+            <p:ph type="title"/>
+          </p:nvPr>
+        </p:nvSpPr>
+        <p:spPr/>
+        <p:txBody>
+          <a:bodyPr/>
+          <a:lstStyle/>
+          <a:p>
+            <a:r>
+              <a:rPr lang="en-US" dirty="0"/>
+              <a:t>River (Stream) Ecosystem</a:t>
+            </a:r>
+            <a:endParaRPr lang="en-IN" dirty="0"/>
+          </a:p>
+        </p:txBody>
+      </p:sp>
+      <p:sp>
+        <p:nvSpPr>
+          <p:cNvPr id="3" name="Content Placeholder 2"/>
+          <p:cNvSpPr>
+            <a:spLocks noGrp="1"/>
+          </p:cNvSpPr>
+          <p:nvPr>
+            <p:ph idx="1"/>
+          </p:nvPr>
+        </p:nvSpPr>
+        <p:spPr/>
+        <p:txBody>
+          <a:bodyPr/>
+          <a:lstStyle/>
+          <a:p>
+            <a:r>
+              <a:rPr lang="en-US" dirty="0" smtClean="0"/>
+              <a:t>Characteristics</a:t>
+            </a:r>
+          </a:p>
+          <a:p>
+            <a:pPr lvl="1"/>
+            <a:r>
+              <a:rPr lang="en-US" dirty="0" smtClean="0"/>
+              <a:t>Fresh water</a:t>
+            </a:r>
+          </a:p>
+          <a:p>
+            <a:pPr lvl="1"/>
+            <a:r>
+              <a:rPr lang="en-US" dirty="0" smtClean="0"/>
+              <a:t>Free flowing water</a:t>
+            </a:r>
+          </a:p>
+          <a:p>
+            <a:pPr lvl="1"/>
+            <a:r>
+              <a:rPr lang="en-US" dirty="0" smtClean="0"/>
+              <a:t>Due to running dissolved oxygen is high</a:t>
+            </a:r>
+          </a:p>
+          <a:p>
+            <a:pPr lvl="1"/>
+            <a:r>
+              <a:rPr lang="en-US" dirty="0" smtClean="0"/>
+              <a:t>River deposits large amount of nutrients</a:t>
+            </a:r>
+            <a:endParaRPr lang="en-IN" dirty="0"/>
+          </a:p>
+        </p:txBody>
+      </p:sp>
+    </p:spTree>
+    <p:extLst>
+      <p:ext uri="{BB962C8B-B14F-4D97-AF65-F5344CB8AC3E}">
+        <p14:creationId xmlns:p14="http://schemas.microsoft.com/office/powerpoint/2010/main" val="2086039576"/>
+      </p:ext>
+    </p:extLst>
+  </p:cSld>
+  <p:clrMapOvr>
+    <a:masterClrMapping/>
+  </p:clrMapOvr>
+</p:sld>
+</file>
+
+<file path=ppt/slides/slide84.xml><?xml version="1.0" encoding="utf-8"?>
+<p:sld xmlns:a="http://schemas.openxmlformats.org/drawingml/2006/main" xmlns:r="http://schemas.openxmlformats.org/officeDocument/2006/relationships" xmlns:p="http://schemas.openxmlformats.org/presentationml/2006/main">
+  <p:cSld>
+    <p:spTree>
+      <p:nvGrpSpPr>
+        <p:cNvPr id="1" name=""/>
+        <p:cNvGrpSpPr/>
+        <p:nvPr/>
+      </p:nvGrpSpPr>
+      <p:grpSpPr>
+        <a:xfrm>
+          <a:off x="0" y="0"/>
+          <a:ext cx="0" cy="0"/>
+          <a:chOff x="0" y="0"/>
+          <a:chExt cx="0" cy="0"/>
+        </a:xfrm>
+      </p:grpSpPr>
+      <p:sp>
+        <p:nvSpPr>
+          <p:cNvPr id="2" name="Title 1"/>
+          <p:cNvSpPr>
+            <a:spLocks noGrp="1"/>
+          </p:cNvSpPr>
+          <p:nvPr>
+            <p:ph type="title"/>
+          </p:nvPr>
+        </p:nvSpPr>
+        <p:spPr/>
+        <p:txBody>
+          <a:bodyPr/>
+          <a:lstStyle/>
+          <a:p>
+            <a:r>
+              <a:rPr lang="en-US" dirty="0"/>
+              <a:t>River (Stream) Ecosystem</a:t>
+            </a:r>
+            <a:endParaRPr lang="en-IN" dirty="0"/>
+          </a:p>
+        </p:txBody>
+      </p:sp>
+      <p:sp>
+        <p:nvSpPr>
+          <p:cNvPr id="3" name="Content Placeholder 2"/>
+          <p:cNvSpPr>
+            <a:spLocks noGrp="1"/>
+          </p:cNvSpPr>
+          <p:nvPr>
+            <p:ph idx="1"/>
+          </p:nvPr>
+        </p:nvSpPr>
+        <p:spPr/>
+        <p:txBody>
+          <a:bodyPr/>
+          <a:lstStyle/>
+          <a:p>
+            <a:r>
+              <a:rPr lang="en-US" dirty="0" smtClean="0"/>
+              <a:t>Abiotic Components</a:t>
+            </a:r>
+          </a:p>
+          <a:p>
+            <a:pPr lvl="1"/>
+            <a:r>
+              <a:rPr lang="en-US" dirty="0" smtClean="0"/>
+              <a:t>Temperature</a:t>
+            </a:r>
+            <a:endParaRPr lang="en-US" dirty="0"/>
+          </a:p>
+          <a:p>
+            <a:pPr lvl="1"/>
+            <a:r>
+              <a:rPr lang="en-US" dirty="0" smtClean="0"/>
+              <a:t>Light</a:t>
+            </a:r>
+          </a:p>
+          <a:p>
+            <a:pPr lvl="1"/>
+            <a:r>
+              <a:rPr lang="en-US" dirty="0" smtClean="0"/>
+              <a:t>pH</a:t>
+            </a:r>
+          </a:p>
+          <a:p>
+            <a:pPr lvl="1"/>
+            <a:r>
+              <a:rPr lang="en-US" dirty="0" smtClean="0"/>
+              <a:t>Nutrients</a:t>
+            </a:r>
+          </a:p>
+          <a:p>
+            <a:pPr lvl="1"/>
+            <a:r>
+              <a:rPr lang="en-US" dirty="0" smtClean="0"/>
+              <a:t>Organic and inorganic components</a:t>
+            </a:r>
+            <a:endParaRPr lang="en-IN" dirty="0"/>
+          </a:p>
+        </p:txBody>
+      </p:sp>
+    </p:spTree>
+    <p:extLst>
+      <p:ext uri="{BB962C8B-B14F-4D97-AF65-F5344CB8AC3E}">
+        <p14:creationId xmlns:p14="http://schemas.microsoft.com/office/powerpoint/2010/main" val="705168888"/>
+      </p:ext>
+    </p:extLst>
+  </p:cSld>
+  <p:clrMapOvr>
+    <a:masterClrMapping/>
+  </p:clrMapOvr>
+</p:sld>
+</file>
+
+<file path=ppt/slides/slide85.xml><?xml version="1.0" encoding="utf-8"?>
+<p:sld xmlns:a="http://schemas.openxmlformats.org/drawingml/2006/main" xmlns:r="http://schemas.openxmlformats.org/officeDocument/2006/relationships" xmlns:p="http://schemas.openxmlformats.org/presentationml/2006/main">
+  <p:cSld>
+    <p:spTree>
+      <p:nvGrpSpPr>
+        <p:cNvPr id="1" name=""/>
+        <p:cNvGrpSpPr/>
+        <p:nvPr/>
+      </p:nvGrpSpPr>
+      <p:grpSpPr>
+        <a:xfrm>
+          <a:off x="0" y="0"/>
+          <a:ext cx="0" cy="0"/>
+          <a:chOff x="0" y="0"/>
+          <a:chExt cx="0" cy="0"/>
+        </a:xfrm>
+      </p:grpSpPr>
+      <p:sp>
+        <p:nvSpPr>
+          <p:cNvPr id="2" name="Title 1"/>
+          <p:cNvSpPr>
+            <a:spLocks noGrp="1"/>
+          </p:cNvSpPr>
+          <p:nvPr>
+            <p:ph type="title"/>
+          </p:nvPr>
+        </p:nvSpPr>
+        <p:spPr/>
+        <p:txBody>
+          <a:bodyPr/>
+          <a:lstStyle/>
+          <a:p>
+            <a:r>
+              <a:rPr lang="en-US" dirty="0"/>
+              <a:t>River (Stream) Ecosystem</a:t>
+            </a:r>
+            <a:endParaRPr lang="en-IN" dirty="0"/>
+          </a:p>
+        </p:txBody>
+      </p:sp>
+      <p:sp>
+        <p:nvSpPr>
+          <p:cNvPr id="3" name="Content Placeholder 2"/>
+          <p:cNvSpPr>
+            <a:spLocks noGrp="1"/>
+          </p:cNvSpPr>
+          <p:nvPr>
+            <p:ph idx="1"/>
+          </p:nvPr>
+        </p:nvSpPr>
+        <p:spPr/>
+        <p:txBody>
+          <a:bodyPr/>
+          <a:lstStyle/>
+          <a:p>
+            <a:r>
+              <a:rPr lang="en-US" dirty="0" smtClean="0"/>
+              <a:t>Biotic Components</a:t>
+            </a:r>
+            <a:endParaRPr lang="en-US" dirty="0"/>
+          </a:p>
+          <a:p>
+            <a:pPr lvl="1"/>
+            <a:r>
+              <a:rPr lang="en-US" dirty="0" smtClean="0"/>
+              <a:t>Producers</a:t>
+            </a:r>
+          </a:p>
+          <a:p>
+            <a:pPr lvl="2"/>
+            <a:r>
+              <a:rPr lang="en-US" dirty="0" smtClean="0"/>
+              <a:t>Phytoplankton</a:t>
+            </a:r>
+          </a:p>
+          <a:p>
+            <a:pPr lvl="2"/>
+            <a:r>
+              <a:rPr lang="en-US" dirty="0" smtClean="0"/>
+              <a:t>Algae</a:t>
+            </a:r>
+          </a:p>
+          <a:p>
+            <a:pPr lvl="2"/>
+            <a:r>
+              <a:rPr lang="en-US" dirty="0" smtClean="0"/>
+              <a:t>Water grasses</a:t>
+            </a:r>
+          </a:p>
+          <a:p>
+            <a:pPr lvl="2"/>
+            <a:r>
+              <a:rPr lang="en-US" dirty="0" smtClean="0"/>
+              <a:t>Aquatic masses</a:t>
+            </a:r>
+          </a:p>
+          <a:p>
+            <a:pPr lvl="1"/>
+            <a:r>
+              <a:rPr lang="en-US" dirty="0" smtClean="0"/>
+              <a:t>Consumers</a:t>
+            </a:r>
+          </a:p>
+          <a:p>
+            <a:pPr lvl="2"/>
+            <a:r>
+              <a:rPr lang="en-US" dirty="0" smtClean="0"/>
+              <a:t>Primary</a:t>
+            </a:r>
+          </a:p>
+          <a:p>
+            <a:pPr lvl="3"/>
+            <a:r>
+              <a:rPr lang="en-US" dirty="0" smtClean="0"/>
+              <a:t>Water insects, snails, fishes</a:t>
+            </a:r>
+            <a:endParaRPr lang="en-IN" dirty="0"/>
+          </a:p>
+        </p:txBody>
+      </p:sp>
+    </p:spTree>
+    <p:extLst>
+      <p:ext uri="{BB962C8B-B14F-4D97-AF65-F5344CB8AC3E}">
+        <p14:creationId xmlns:p14="http://schemas.microsoft.com/office/powerpoint/2010/main" val="3522246255"/>
+      </p:ext>
+    </p:extLst>
+  </p:cSld>
+  <p:clrMapOvr>
+    <a:masterClrMapping/>
+  </p:clrMapOvr>
+</p:sld>
+</file>
+
+<file path=ppt/slides/slide86.xml><?xml version="1.0" encoding="utf-8"?>
+<p:sld xmlns:a="http://schemas.openxmlformats.org/drawingml/2006/main" xmlns:r="http://schemas.openxmlformats.org/officeDocument/2006/relationships" xmlns:p="http://schemas.openxmlformats.org/presentationml/2006/main">
+  <p:cSld>
+    <p:spTree>
+      <p:nvGrpSpPr>
+        <p:cNvPr id="1" name=""/>
+        <p:cNvGrpSpPr/>
+        <p:nvPr/>
+      </p:nvGrpSpPr>
+      <p:grpSpPr>
+        <a:xfrm>
+          <a:off x="0" y="0"/>
+          <a:ext cx="0" cy="0"/>
+          <a:chOff x="0" y="0"/>
+          <a:chExt cx="0" cy="0"/>
+        </a:xfrm>
+      </p:grpSpPr>
+      <p:sp>
+        <p:nvSpPr>
+          <p:cNvPr id="2" name="Title 1"/>
+          <p:cNvSpPr>
+            <a:spLocks noGrp="1"/>
+          </p:cNvSpPr>
+          <p:nvPr>
+            <p:ph type="title"/>
+          </p:nvPr>
+        </p:nvSpPr>
+        <p:spPr/>
+        <p:txBody>
+          <a:bodyPr/>
+          <a:lstStyle/>
+          <a:p>
+            <a:r>
+              <a:rPr lang="en-US" dirty="0"/>
+              <a:t>River (Stream) Ecosystem</a:t>
+            </a:r>
+            <a:endParaRPr lang="en-IN" dirty="0"/>
+          </a:p>
+        </p:txBody>
+      </p:sp>
+      <p:sp>
+        <p:nvSpPr>
+          <p:cNvPr id="3" name="Content Placeholder 2"/>
+          <p:cNvSpPr>
+            <a:spLocks noGrp="1"/>
+          </p:cNvSpPr>
+          <p:nvPr>
+            <p:ph idx="1"/>
+          </p:nvPr>
+        </p:nvSpPr>
+        <p:spPr/>
+        <p:txBody>
+          <a:bodyPr/>
+          <a:lstStyle/>
+          <a:p>
+            <a:r>
+              <a:rPr lang="en-US" dirty="0" smtClean="0"/>
+              <a:t>Biotic Components</a:t>
+            </a:r>
+            <a:endParaRPr lang="en-US" dirty="0"/>
+          </a:p>
+          <a:p>
+            <a:pPr lvl="1"/>
+            <a:r>
+              <a:rPr lang="en-US" dirty="0" smtClean="0"/>
+              <a:t>Consumers</a:t>
+            </a:r>
+          </a:p>
+          <a:p>
+            <a:pPr lvl="2"/>
+            <a:r>
+              <a:rPr lang="en-US" dirty="0" smtClean="0"/>
+              <a:t>Secondary</a:t>
+            </a:r>
+          </a:p>
+          <a:p>
+            <a:pPr lvl="3"/>
+            <a:r>
+              <a:rPr lang="en-US" dirty="0" smtClean="0"/>
+              <a:t>Birds and mammals</a:t>
+            </a:r>
+            <a:endParaRPr lang="en-IN" dirty="0" smtClean="0"/>
+          </a:p>
+          <a:p>
+            <a:pPr lvl="1"/>
+            <a:r>
+              <a:rPr lang="en-US" dirty="0" smtClean="0"/>
+              <a:t>Decomposers</a:t>
+            </a:r>
+          </a:p>
+          <a:p>
+            <a:pPr lvl="2"/>
+            <a:r>
+              <a:rPr lang="en-US" dirty="0" smtClean="0"/>
+              <a:t>Bacteria</a:t>
+            </a:r>
+          </a:p>
+          <a:p>
+            <a:pPr lvl="2"/>
+            <a:r>
+              <a:rPr lang="en-US" dirty="0" smtClean="0"/>
+              <a:t>Fungi</a:t>
+            </a:r>
+          </a:p>
+        </p:txBody>
+      </p:sp>
+    </p:spTree>
+    <p:extLst>
+      <p:ext uri="{BB962C8B-B14F-4D97-AF65-F5344CB8AC3E}">
+        <p14:creationId xmlns:p14="http://schemas.microsoft.com/office/powerpoint/2010/main" val="19090324"/>
+      </p:ext>
+    </p:extLst>
+  </p:cSld>
+  <p:clrMapOvr>
+    <a:masterClrMapping/>
+  </p:clrMapOvr>
+</p:sld>
+</file>
+
+<file path=ppt/slides/slide87.xml><?xml version="1.0" encoding="utf-8"?>
+<p:sld xmlns:a="http://schemas.openxmlformats.org/drawingml/2006/main" xmlns:r="http://schemas.openxmlformats.org/officeDocument/2006/relationships" xmlns:p="http://schemas.openxmlformats.org/presentationml/2006/main">
+  <p:cSld>
+    <p:spTree>
+      <p:nvGrpSpPr>
+        <p:cNvPr id="1" name=""/>
+        <p:cNvGrpSpPr/>
+        <p:nvPr/>
+      </p:nvGrpSpPr>
+      <p:grpSpPr>
+        <a:xfrm>
+          <a:off x="0" y="0"/>
+          <a:ext cx="0" cy="0"/>
+          <a:chOff x="0" y="0"/>
+          <a:chExt cx="0" cy="0"/>
+        </a:xfrm>
+      </p:grpSpPr>
+      <p:sp>
+        <p:nvSpPr>
+          <p:cNvPr id="2" name="Title 1"/>
+          <p:cNvSpPr>
+            <a:spLocks noGrp="1"/>
+          </p:cNvSpPr>
+          <p:nvPr>
+            <p:ph type="title"/>
+          </p:nvPr>
+        </p:nvSpPr>
+        <p:spPr/>
+        <p:txBody>
+          <a:bodyPr>
+            <a:noAutofit/>
+          </a:bodyPr>
+          <a:lstStyle/>
+          <a:p>
+            <a:r>
+              <a:rPr lang="en-US" sz="3600" dirty="0" smtClean="0"/>
+              <a:t>Marine Ecosystem</a:t>
+            </a:r>
+            <a:r>
+              <a:rPr lang="en-US" sz="3200" dirty="0" smtClean="0"/>
+              <a:t/>
+            </a:r>
+            <a:br>
+              <a:rPr lang="en-US" sz="3200" dirty="0" smtClean="0"/>
+            </a:br>
+            <a:r>
+              <a:rPr lang="en-US" sz="2400" b="1" i="1" dirty="0" smtClean="0"/>
+              <a:t>(Saltwater Ecosystem)</a:t>
+            </a:r>
+            <a:endParaRPr lang="en-IN" sz="2400" b="1" i="1" dirty="0"/>
+          </a:p>
+        </p:txBody>
+      </p:sp>
+      <p:pic>
+        <p:nvPicPr>
+          <p:cNvPr id="2050" name="Picture 2" descr="Image result for oceans ecosystem"/>
+          <p:cNvPicPr>
+            <a:picLocks noChangeAspect="1" noChangeArrowheads="1"/>
+          </p:cNvPicPr>
+          <p:nvPr/>
+        </p:nvPicPr>
+        <p:blipFill>
+          <a:blip r:embed="rId2">
+            <a:extLst>
+              <a:ext uri="{28A0092B-C50C-407E-A947-70E740481C1C}">
+                <a14:useLocalDpi xmlns:a14="http://schemas.microsoft.com/office/drawing/2010/main" val="0"/>
+              </a:ext>
+            </a:extLst>
+          </a:blip>
+          <a:srcRect/>
+          <a:stretch>
+            <a:fillRect/>
+          </a:stretch>
+        </p:blipFill>
+        <p:spPr bwMode="auto">
+          <a:xfrm>
+            <a:off x="457200" y="1772816"/>
+            <a:ext cx="2857500" cy="1905000"/>
+          </a:xfrm>
+          <a:prstGeom prst="rect">
+            <a:avLst/>
+          </a:prstGeom>
+          <a:noFill/>
+          <a:extLst>
+            <a:ext uri="{909E8E84-426E-40DD-AFC4-6F175D3DCCD1}">
+              <a14:hiddenFill xmlns:a14="http://schemas.microsoft.com/office/drawing/2010/main">
+                <a:solidFill>
+                  <a:srgbClr val="FFFFFF"/>
+                </a:solidFill>
+              </a14:hiddenFill>
+            </a:ext>
+          </a:extLst>
+        </p:spPr>
+      </p:pic>
+      <p:pic>
+        <p:nvPicPr>
+          <p:cNvPr id="2052" name="Picture 4" descr="Related image"/>
+          <p:cNvPicPr>
+            <a:picLocks noChangeAspect="1" noChangeArrowheads="1"/>
+          </p:cNvPicPr>
+          <p:nvPr/>
+        </p:nvPicPr>
+        <p:blipFill>
+          <a:blip r:embed="rId3">
+            <a:extLst>
+              <a:ext uri="{28A0092B-C50C-407E-A947-70E740481C1C}">
+                <a14:useLocalDpi xmlns:a14="http://schemas.microsoft.com/office/drawing/2010/main" val="0"/>
+              </a:ext>
+            </a:extLst>
+          </a:blip>
+          <a:srcRect/>
+          <a:stretch>
+            <a:fillRect/>
+          </a:stretch>
+        </p:blipFill>
+        <p:spPr bwMode="auto">
+          <a:xfrm>
+            <a:off x="3563887" y="1683156"/>
+            <a:ext cx="3550024" cy="1994660"/>
+          </a:xfrm>
+          <a:prstGeom prst="rect">
+            <a:avLst/>
+          </a:prstGeom>
+          <a:noFill/>
+          <a:extLst>
+            <a:ext uri="{909E8E84-426E-40DD-AFC4-6F175D3DCCD1}">
+              <a14:hiddenFill xmlns:a14="http://schemas.microsoft.com/office/drawing/2010/main">
+                <a:solidFill>
+                  <a:srgbClr val="FFFFFF"/>
+                </a:solidFill>
+              </a14:hiddenFill>
+            </a:ext>
+          </a:extLst>
+        </p:spPr>
+      </p:pic>
+      <p:pic>
+        <p:nvPicPr>
+          <p:cNvPr id="2054" name="Picture 6" descr="Related image"/>
+          <p:cNvPicPr>
+            <a:picLocks noChangeAspect="1" noChangeArrowheads="1"/>
+          </p:cNvPicPr>
+          <p:nvPr/>
+        </p:nvPicPr>
+        <p:blipFill>
+          <a:blip r:embed="rId4">
+            <a:extLst>
+              <a:ext uri="{28A0092B-C50C-407E-A947-70E740481C1C}">
+                <a14:useLocalDpi xmlns:a14="http://schemas.microsoft.com/office/drawing/2010/main" val="0"/>
+              </a:ext>
+            </a:extLst>
+          </a:blip>
+          <a:srcRect/>
+          <a:stretch>
+            <a:fillRect/>
+          </a:stretch>
+        </p:blipFill>
+        <p:spPr bwMode="auto">
+          <a:xfrm>
+            <a:off x="467544" y="3933056"/>
+            <a:ext cx="2779662" cy="1616742"/>
+          </a:xfrm>
+          <a:prstGeom prst="rect">
+            <a:avLst/>
+          </a:prstGeom>
+          <a:noFill/>
+          <a:extLst>
+            <a:ext uri="{909E8E84-426E-40DD-AFC4-6F175D3DCCD1}">
+              <a14:hiddenFill xmlns:a14="http://schemas.microsoft.com/office/drawing/2010/main">
+                <a:solidFill>
+                  <a:srgbClr val="FFFFFF"/>
+                </a:solidFill>
+              </a14:hiddenFill>
+            </a:ext>
+          </a:extLst>
+        </p:spPr>
+      </p:pic>
+      <p:pic>
+        <p:nvPicPr>
+          <p:cNvPr id="2056" name="Picture 8" descr="Image result for estuarine ecosystem"/>
+          <p:cNvPicPr>
+            <a:picLocks noChangeAspect="1" noChangeArrowheads="1"/>
+          </p:cNvPicPr>
+          <p:nvPr/>
+        </p:nvPicPr>
+        <p:blipFill>
+          <a:blip r:embed="rId5">
+            <a:extLst>
+              <a:ext uri="{28A0092B-C50C-407E-A947-70E740481C1C}">
+                <a14:useLocalDpi xmlns:a14="http://schemas.microsoft.com/office/drawing/2010/main" val="0"/>
+              </a:ext>
+            </a:extLst>
+          </a:blip>
+          <a:srcRect/>
+          <a:stretch>
+            <a:fillRect/>
+          </a:stretch>
+        </p:blipFill>
+        <p:spPr bwMode="auto">
+          <a:xfrm>
+            <a:off x="3563618" y="3933056"/>
+            <a:ext cx="4812562" cy="2743764"/>
+          </a:xfrm>
+          <a:prstGeom prst="rect">
+            <a:avLst/>
+          </a:prstGeom>
+          <a:noFill/>
+          <a:extLst>
+            <a:ext uri="{909E8E84-426E-40DD-AFC4-6F175D3DCCD1}">
+              <a14:hiddenFill xmlns:a14="http://schemas.microsoft.com/office/drawing/2010/main">
+                <a:solidFill>
+                  <a:srgbClr val="FFFFFF"/>
+                </a:solidFill>
+              </a14:hiddenFill>
+            </a:ext>
+          </a:extLst>
+        </p:spPr>
+      </p:pic>
+    </p:spTree>
+    <p:extLst>
+      <p:ext uri="{BB962C8B-B14F-4D97-AF65-F5344CB8AC3E}">
+        <p14:creationId xmlns:p14="http://schemas.microsoft.com/office/powerpoint/2010/main" val="450579889"/>
+      </p:ext>
+    </p:extLst>
+  </p:cSld>
+  <p:clrMapOvr>
+    <a:masterClrMapping/>
+  </p:clrMapOvr>
+</p:sld>
+</file>
+
+<file path=ppt/slides/slide88.xml><?xml version="1.0" encoding="utf-8"?>
+<p:sld xmlns:a="http://schemas.openxmlformats.org/drawingml/2006/main" xmlns:r="http://schemas.openxmlformats.org/officeDocument/2006/relationships" xmlns:p="http://schemas.openxmlformats.org/presentationml/2006/main">
+  <p:cSld>
+    <p:spTree>
+      <p:nvGrpSpPr>
+        <p:cNvPr id="1" name=""/>
+        <p:cNvGrpSpPr/>
+        <p:nvPr/>
+      </p:nvGrpSpPr>
+      <p:grpSpPr>
+        <a:xfrm>
+          <a:off x="0" y="0"/>
+          <a:ext cx="0" cy="0"/>
+          <a:chOff x="0" y="0"/>
+          <a:chExt cx="0" cy="0"/>
+        </a:xfrm>
+      </p:grpSpPr>
+      <p:sp>
+        <p:nvSpPr>
+          <p:cNvPr id="2" name="Title 1"/>
+          <p:cNvSpPr>
+            <a:spLocks noGrp="1"/>
+          </p:cNvSpPr>
+          <p:nvPr>
+            <p:ph type="title"/>
+          </p:nvPr>
+        </p:nvSpPr>
+        <p:spPr/>
+        <p:txBody>
+          <a:bodyPr/>
+          <a:lstStyle/>
+          <a:p>
+            <a:r>
+              <a:rPr lang="en-US" dirty="0" smtClean="0"/>
+              <a:t>Ocean Ecosystem</a:t>
+            </a:r>
+            <a:endParaRPr lang="en-IN" dirty="0"/>
+          </a:p>
+        </p:txBody>
+      </p:sp>
+      <p:sp>
+        <p:nvSpPr>
+          <p:cNvPr id="3" name="Content Placeholder 2"/>
+          <p:cNvSpPr>
+            <a:spLocks noGrp="1"/>
+          </p:cNvSpPr>
+          <p:nvPr>
+            <p:ph idx="1"/>
+          </p:nvPr>
+        </p:nvSpPr>
+        <p:spPr/>
+        <p:txBody>
+          <a:bodyPr>
+            <a:normAutofit lnSpcReduction="10000"/>
+          </a:bodyPr>
+          <a:lstStyle/>
+          <a:p>
+            <a:r>
+              <a:rPr lang="en-US" dirty="0" smtClean="0"/>
+              <a:t>It covers two third of earth surface</a:t>
+            </a:r>
+          </a:p>
+          <a:p>
+            <a:r>
+              <a:rPr lang="en-US" dirty="0" smtClean="0"/>
+              <a:t>It is characterized by high concentration of salt and minerals.</a:t>
+            </a:r>
+          </a:p>
+          <a:p>
+            <a:r>
+              <a:rPr lang="en-US" dirty="0" smtClean="0"/>
+              <a:t>It supports huge variety of sea-products and drugs.</a:t>
+            </a:r>
+          </a:p>
+          <a:p>
+            <a:r>
+              <a:rPr lang="en-US" dirty="0" smtClean="0"/>
+              <a:t>It supports large variety of animals and plants</a:t>
+            </a:r>
+          </a:p>
+          <a:p>
+            <a:r>
+              <a:rPr lang="en-US" dirty="0" smtClean="0"/>
+              <a:t>It provides iron, magnesium, phosphorus, natural gas. </a:t>
+            </a:r>
+            <a:endParaRPr lang="en-IN" dirty="0"/>
+          </a:p>
+        </p:txBody>
+      </p:sp>
+    </p:spTree>
+    <p:extLst>
+      <p:ext uri="{BB962C8B-B14F-4D97-AF65-F5344CB8AC3E}">
+        <p14:creationId xmlns:p14="http://schemas.microsoft.com/office/powerpoint/2010/main" val="1511238361"/>
+      </p:ext>
+    </p:extLst>
+  </p:cSld>
+  <p:clrMapOvr>
+    <a:masterClrMapping/>
+  </p:clrMapOvr>
+</p:sld>
+</file>
+
+<file path=ppt/slides/slide89.xml><?xml version="1.0" encoding="utf-8"?>
+<p:sld xmlns:a="http://schemas.openxmlformats.org/drawingml/2006/main" xmlns:r="http://schemas.openxmlformats.org/officeDocument/2006/relationships" xmlns:p="http://schemas.openxmlformats.org/presentationml/2006/main">
+  <p:cSld>
+    <p:spTree>
+      <p:nvGrpSpPr>
+        <p:cNvPr id="1" name=""/>
+        <p:cNvGrpSpPr/>
+        <p:nvPr/>
+      </p:nvGrpSpPr>
+      <p:grpSpPr>
+        <a:xfrm>
+          <a:off x="0" y="0"/>
+          <a:ext cx="0" cy="0"/>
+          <a:chOff x="0" y="0"/>
+          <a:chExt cx="0" cy="0"/>
+        </a:xfrm>
+      </p:grpSpPr>
+      <p:sp>
+        <p:nvSpPr>
+          <p:cNvPr id="2" name="Title 1"/>
+          <p:cNvSpPr>
+            <a:spLocks noGrp="1"/>
+          </p:cNvSpPr>
+          <p:nvPr>
+            <p:ph type="title"/>
+          </p:nvPr>
+        </p:nvSpPr>
+        <p:spPr/>
+        <p:txBody>
+          <a:bodyPr/>
+          <a:lstStyle/>
+          <a:p>
+            <a:r>
+              <a:rPr lang="en-US" dirty="0" smtClean="0"/>
+              <a:t>Zones of Ecosystem</a:t>
+            </a:r>
+            <a:endParaRPr lang="en-IN" dirty="0"/>
+          </a:p>
+        </p:txBody>
+      </p:sp>
+      <p:sp>
+        <p:nvSpPr>
+          <p:cNvPr id="3" name="Content Placeholder 2"/>
+          <p:cNvSpPr>
+            <a:spLocks noGrp="1"/>
+          </p:cNvSpPr>
+          <p:nvPr>
+            <p:ph idx="1"/>
+          </p:nvPr>
+        </p:nvSpPr>
+        <p:spPr/>
+        <p:txBody>
+          <a:bodyPr/>
+          <a:lstStyle/>
+          <a:p>
+            <a:r>
+              <a:rPr lang="en-US" dirty="0" smtClean="0"/>
+              <a:t>Coastal zone</a:t>
+            </a:r>
+          </a:p>
+          <a:p>
+            <a:pPr lvl="1"/>
+            <a:r>
+              <a:rPr lang="en-US" dirty="0" smtClean="0"/>
+              <a:t>It is relatively warm</a:t>
+            </a:r>
+          </a:p>
+          <a:p>
+            <a:pPr lvl="1"/>
+            <a:r>
+              <a:rPr lang="en-US" dirty="0" smtClean="0"/>
+              <a:t>Nutrient rich</a:t>
+            </a:r>
+          </a:p>
+          <a:p>
+            <a:pPr lvl="1"/>
+            <a:r>
+              <a:rPr lang="en-US" dirty="0" smtClean="0"/>
+              <a:t>Shallow water</a:t>
+            </a:r>
+          </a:p>
+          <a:p>
+            <a:pPr lvl="1"/>
+            <a:r>
+              <a:rPr lang="en-US" dirty="0" smtClean="0"/>
+              <a:t>It is high is primary productivity</a:t>
+            </a:r>
+          </a:p>
+          <a:p>
+            <a:pPr lvl="1"/>
+            <a:endParaRPr lang="en-IN" dirty="0"/>
+          </a:p>
+        </p:txBody>
+      </p:sp>
+    </p:spTree>
+    <p:extLst>
+      <p:ext uri="{BB962C8B-B14F-4D97-AF65-F5344CB8AC3E}">
+        <p14:creationId xmlns:p14="http://schemas.microsoft.com/office/powerpoint/2010/main" val="811502759"/>
+      </p:ext>
+    </p:extLst>
   </p:cSld>
   <p:clrMapOvr>
     <a:masterClrMapping/>
@@ -32281,6 +33450,546 @@
   <p:clrMapOvr>
     <a:masterClrMapping/>
   </p:clrMapOvr>
+</p:sld>
+</file>
+
+<file path=ppt/slides/slide90.xml><?xml version="1.0" encoding="utf-8"?>
+<p:sld xmlns:a="http://schemas.openxmlformats.org/drawingml/2006/main" xmlns:r="http://schemas.openxmlformats.org/officeDocument/2006/relationships" xmlns:p="http://schemas.openxmlformats.org/presentationml/2006/main">
+  <p:cSld>
+    <p:spTree>
+      <p:nvGrpSpPr>
+        <p:cNvPr id="1" name=""/>
+        <p:cNvGrpSpPr/>
+        <p:nvPr/>
+      </p:nvGrpSpPr>
+      <p:grpSpPr>
+        <a:xfrm>
+          <a:off x="0" y="0"/>
+          <a:ext cx="0" cy="0"/>
+          <a:chOff x="0" y="0"/>
+          <a:chExt cx="0" cy="0"/>
+        </a:xfrm>
+      </p:grpSpPr>
+      <p:sp>
+        <p:nvSpPr>
+          <p:cNvPr id="2" name="Title 1"/>
+          <p:cNvSpPr>
+            <a:spLocks noGrp="1"/>
+          </p:cNvSpPr>
+          <p:nvPr>
+            <p:ph type="title"/>
+          </p:nvPr>
+        </p:nvSpPr>
+        <p:spPr/>
+        <p:txBody>
+          <a:bodyPr/>
+          <a:lstStyle/>
+          <a:p>
+            <a:r>
+              <a:rPr lang="en-US" dirty="0" smtClean="0"/>
+              <a:t>Zones of Ecosystem</a:t>
+            </a:r>
+            <a:endParaRPr lang="en-IN" dirty="0"/>
+          </a:p>
+        </p:txBody>
+      </p:sp>
+      <p:sp>
+        <p:nvSpPr>
+          <p:cNvPr id="3" name="Content Placeholder 2"/>
+          <p:cNvSpPr>
+            <a:spLocks noGrp="1"/>
+          </p:cNvSpPr>
+          <p:nvPr>
+            <p:ph idx="1"/>
+          </p:nvPr>
+        </p:nvSpPr>
+        <p:spPr/>
+        <p:txBody>
+          <a:bodyPr>
+            <a:normAutofit lnSpcReduction="10000"/>
+          </a:bodyPr>
+          <a:lstStyle/>
+          <a:p>
+            <a:r>
+              <a:rPr lang="en-US" dirty="0" smtClean="0"/>
+              <a:t>Open sea</a:t>
+            </a:r>
+          </a:p>
+          <a:p>
+            <a:pPr lvl="1"/>
+            <a:r>
+              <a:rPr lang="en-US" dirty="0" smtClean="0"/>
+              <a:t>Deeper part of the ocean</a:t>
+            </a:r>
+          </a:p>
+          <a:p>
+            <a:pPr lvl="1"/>
+            <a:r>
+              <a:rPr lang="en-US" dirty="0" smtClean="0"/>
+              <a:t>Divided into three regions</a:t>
+            </a:r>
+          </a:p>
+          <a:p>
+            <a:pPr lvl="2"/>
+            <a:r>
+              <a:rPr lang="en-US" dirty="0" smtClean="0"/>
+              <a:t>Euphotic zone</a:t>
+            </a:r>
+          </a:p>
+          <a:p>
+            <a:pPr lvl="3"/>
+            <a:r>
+              <a:rPr lang="en-US" dirty="0" smtClean="0"/>
+              <a:t>Revives good light</a:t>
+            </a:r>
+          </a:p>
+          <a:p>
+            <a:pPr lvl="3"/>
+            <a:r>
+              <a:rPr lang="en-US" dirty="0" smtClean="0"/>
+              <a:t>High photosynthetic activity</a:t>
+            </a:r>
+          </a:p>
+          <a:p>
+            <a:pPr lvl="2"/>
+            <a:r>
+              <a:rPr lang="en-US" dirty="0" err="1" smtClean="0"/>
+              <a:t>Bathyal</a:t>
+            </a:r>
+            <a:r>
+              <a:rPr lang="en-US" dirty="0" smtClean="0"/>
+              <a:t> zone</a:t>
+            </a:r>
+          </a:p>
+          <a:p>
+            <a:pPr lvl="3"/>
+            <a:r>
+              <a:rPr lang="en-US" dirty="0" smtClean="0"/>
+              <a:t>Receives dim light</a:t>
+            </a:r>
+          </a:p>
+          <a:p>
+            <a:pPr lvl="3"/>
+            <a:r>
+              <a:rPr lang="en-US" dirty="0" smtClean="0"/>
+              <a:t>Geologically active</a:t>
+            </a:r>
+          </a:p>
+          <a:p>
+            <a:pPr lvl="2"/>
+            <a:r>
+              <a:rPr lang="en-US" dirty="0" smtClean="0"/>
+              <a:t>Abyssal zone</a:t>
+            </a:r>
+          </a:p>
+          <a:p>
+            <a:pPr lvl="3"/>
+            <a:r>
+              <a:rPr lang="en-US" dirty="0" smtClean="0"/>
+              <a:t>It is dark zone </a:t>
+            </a:r>
+            <a:r>
+              <a:rPr lang="en-US" smtClean="0"/>
+              <a:t>very deep (2000 to 5000 m)</a:t>
+            </a:r>
+            <a:endParaRPr lang="en-US" dirty="0" smtClean="0"/>
+          </a:p>
+          <a:p>
+            <a:pPr lvl="3"/>
+            <a:endParaRPr lang="en-US" dirty="0" smtClean="0"/>
+          </a:p>
+          <a:p>
+            <a:pPr lvl="2"/>
+            <a:endParaRPr lang="en-IN" dirty="0"/>
+          </a:p>
+        </p:txBody>
+      </p:sp>
+    </p:spTree>
+    <p:extLst>
+      <p:ext uri="{BB962C8B-B14F-4D97-AF65-F5344CB8AC3E}">
+        <p14:creationId xmlns:p14="http://schemas.microsoft.com/office/powerpoint/2010/main" val="2654108376"/>
+      </p:ext>
+    </p:extLst>
+  </p:cSld>
+  <p:clrMapOvr>
+    <a:masterClrMapping/>
+  </p:clrMapOvr>
+</p:sld>
+</file>
+
+<file path=ppt/slides/slide91.xml><?xml version="1.0" encoding="utf-8"?>
+<p:sld xmlns:a="http://schemas.openxmlformats.org/drawingml/2006/main" xmlns:r="http://schemas.openxmlformats.org/officeDocument/2006/relationships" xmlns:p="http://schemas.openxmlformats.org/presentationml/2006/main">
+  <p:cSld>
+    <p:spTree>
+      <p:nvGrpSpPr>
+        <p:cNvPr id="1" name=""/>
+        <p:cNvGrpSpPr/>
+        <p:nvPr/>
+      </p:nvGrpSpPr>
+      <p:grpSpPr>
+        <a:xfrm>
+          <a:off x="0" y="0"/>
+          <a:ext cx="0" cy="0"/>
+          <a:chOff x="0" y="0"/>
+          <a:chExt cx="0" cy="0"/>
+        </a:xfrm>
+      </p:grpSpPr>
+      <p:sp>
+        <p:nvSpPr>
+          <p:cNvPr id="2" name="Title 1"/>
+          <p:cNvSpPr>
+            <a:spLocks noGrp="1"/>
+          </p:cNvSpPr>
+          <p:nvPr>
+            <p:ph type="title"/>
+          </p:nvPr>
+        </p:nvSpPr>
+        <p:spPr>
+          <a:xfrm>
+            <a:off x="457200" y="1981200"/>
+            <a:ext cx="8229600" cy="1143000"/>
+          </a:xfrm>
+        </p:spPr>
+        <p:txBody>
+          <a:bodyPr/>
+          <a:lstStyle/>
+          <a:p>
+            <a:r>
+              <a:rPr lang="en-US" dirty="0" smtClean="0"/>
+              <a:t>Thank You</a:t>
+            </a:r>
+            <a:endParaRPr lang="en-US" dirty="0"/>
+          </a:p>
+        </p:txBody>
+      </p:sp>
+      <p:sp>
+        <p:nvSpPr>
+          <p:cNvPr id="4" name="Subtitle 2"/>
+          <p:cNvSpPr txBox="1">
+            <a:spLocks/>
+          </p:cNvSpPr>
+          <p:nvPr/>
+        </p:nvSpPr>
+        <p:spPr>
+          <a:xfrm>
+            <a:off x="4038600" y="4191000"/>
+            <a:ext cx="4191000" cy="1752600"/>
+          </a:xfrm>
+          <a:prstGeom prst="rect">
+            <a:avLst/>
+          </a:prstGeom>
+        </p:spPr>
+        <p:txBody>
+          <a:bodyPr vert="horz" lIns="91440" tIns="45720" rIns="91440" bIns="45720" rtlCol="0">
+            <a:normAutofit fontScale="92500" lnSpcReduction="10000"/>
+          </a:bodyPr>
+          <a:lstStyle/>
+          <a:p>
+            <a:pPr marL="342900" marR="0" lvl="0" indent="-342900" algn="r" defTabSz="914400" rtl="0" eaLnBrk="1" fontAlgn="auto" latinLnBrk="0" hangingPunct="1">
+              <a:lnSpc>
+                <a:spcPct val="100000"/>
+              </a:lnSpc>
+              <a:spcBef>
+                <a:spcPct val="20000"/>
+              </a:spcBef>
+              <a:spcAft>
+                <a:spcPts val="0"/>
+              </a:spcAft>
+              <a:buClrTx/>
+              <a:buSzTx/>
+              <a:tabLst/>
+              <a:defRPr/>
+            </a:pPr>
+            <a:r>
+              <a:rPr kumimoji="0" lang="en-US" sz="2200" b="0" i="0" u="none" strike="noStrike" kern="1200" cap="none" spc="0" normalizeH="0" baseline="0" noProof="0" dirty="0" err="1" smtClean="0">
+                <a:ln>
+                  <a:noFill/>
+                </a:ln>
+                <a:solidFill>
+                  <a:schemeClr val="tx1"/>
+                </a:solidFill>
+                <a:effectLst/>
+                <a:uLnTx/>
+                <a:uFillTx/>
+                <a:latin typeface="Cambria" pitchFamily="18" charset="0"/>
+                <a:ea typeface="+mn-ea"/>
+                <a:cs typeface="+mn-cs"/>
+              </a:rPr>
+              <a:t>Rajasekaran</a:t>
+            </a:r>
+            <a:r>
+              <a:rPr kumimoji="0" lang="en-US" sz="2200" b="0" i="0" u="none" strike="noStrike" kern="1200" cap="none" spc="0" normalizeH="0" baseline="0" noProof="0" dirty="0" smtClean="0">
+                <a:ln>
+                  <a:noFill/>
+                </a:ln>
+                <a:solidFill>
+                  <a:schemeClr val="tx1"/>
+                </a:solidFill>
+                <a:effectLst/>
+                <a:uLnTx/>
+                <a:uFillTx/>
+                <a:latin typeface="Cambria" pitchFamily="18" charset="0"/>
+                <a:ea typeface="+mn-ea"/>
+                <a:cs typeface="+mn-cs"/>
+              </a:rPr>
+              <a:t> S</a:t>
+            </a:r>
+          </a:p>
+          <a:p>
+            <a:pPr marL="342900" marR="0" lvl="0" indent="-342900" algn="r" defTabSz="914400" rtl="0" eaLnBrk="1" fontAlgn="auto" latinLnBrk="0" hangingPunct="1">
+              <a:lnSpc>
+                <a:spcPct val="100000"/>
+              </a:lnSpc>
+              <a:spcBef>
+                <a:spcPct val="20000"/>
+              </a:spcBef>
+              <a:spcAft>
+                <a:spcPts val="0"/>
+              </a:spcAft>
+              <a:buClrTx/>
+              <a:buSzTx/>
+              <a:tabLst/>
+              <a:defRPr/>
+            </a:pPr>
+            <a:r>
+              <a:rPr kumimoji="0" lang="en-US" sz="1600" b="0" i="0" u="none" strike="noStrike" kern="1200" cap="none" spc="0" normalizeH="0" baseline="0" noProof="0" dirty="0" smtClean="0">
+                <a:ln>
+                  <a:noFill/>
+                </a:ln>
+                <a:solidFill>
+                  <a:schemeClr val="tx1"/>
+                </a:solidFill>
+                <a:effectLst/>
+                <a:uLnTx/>
+                <a:uFillTx/>
+                <a:latin typeface="Cambria" pitchFamily="18" charset="0"/>
+                <a:ea typeface="+mn-ea"/>
+                <a:cs typeface="+mn-cs"/>
+              </a:rPr>
+              <a:t>Assistant Professor,</a:t>
+            </a:r>
+          </a:p>
+          <a:p>
+            <a:pPr marL="342900" marR="0" lvl="0" indent="-342900" algn="r" defTabSz="914400" rtl="0" eaLnBrk="1" fontAlgn="auto" latinLnBrk="0" hangingPunct="1">
+              <a:lnSpc>
+                <a:spcPct val="100000"/>
+              </a:lnSpc>
+              <a:spcBef>
+                <a:spcPct val="20000"/>
+              </a:spcBef>
+              <a:spcAft>
+                <a:spcPts val="0"/>
+              </a:spcAft>
+              <a:buClrTx/>
+              <a:buSzTx/>
+              <a:tabLst/>
+              <a:defRPr/>
+            </a:pPr>
+            <a:r>
+              <a:rPr kumimoji="0" lang="en-US" sz="1600" b="0" i="0" u="none" strike="noStrike" kern="1200" cap="none" spc="0" normalizeH="0" baseline="0" noProof="0" dirty="0" smtClean="0">
+                <a:ln>
+                  <a:noFill/>
+                </a:ln>
+                <a:solidFill>
+                  <a:schemeClr val="tx1"/>
+                </a:solidFill>
+                <a:effectLst/>
+                <a:uLnTx/>
+                <a:uFillTx/>
+                <a:latin typeface="Cambria" pitchFamily="18" charset="0"/>
+                <a:ea typeface="+mn-ea"/>
+                <a:cs typeface="+mn-cs"/>
+              </a:rPr>
+              <a:t>Department of Information Technology,</a:t>
+            </a:r>
+          </a:p>
+          <a:p>
+            <a:pPr marL="342900" marR="0" lvl="0" indent="-342900" algn="r" defTabSz="914400" rtl="0" eaLnBrk="1" fontAlgn="auto" latinLnBrk="0" hangingPunct="1">
+              <a:lnSpc>
+                <a:spcPct val="100000"/>
+              </a:lnSpc>
+              <a:spcBef>
+                <a:spcPct val="20000"/>
+              </a:spcBef>
+              <a:spcAft>
+                <a:spcPts val="0"/>
+              </a:spcAft>
+              <a:buClrTx/>
+              <a:buSzTx/>
+              <a:tabLst/>
+              <a:defRPr/>
+            </a:pPr>
+            <a:r>
+              <a:rPr kumimoji="0" lang="en-US" sz="1600" b="0" i="0" u="none" strike="noStrike" kern="1200" cap="none" spc="0" normalizeH="0" baseline="0" noProof="0" dirty="0" err="1" smtClean="0">
+                <a:ln>
+                  <a:noFill/>
+                </a:ln>
+                <a:solidFill>
+                  <a:schemeClr val="tx1"/>
+                </a:solidFill>
+                <a:effectLst/>
+                <a:uLnTx/>
+                <a:uFillTx/>
+                <a:latin typeface="Cambria" pitchFamily="18" charset="0"/>
+                <a:ea typeface="+mn-ea"/>
+                <a:cs typeface="+mn-cs"/>
+              </a:rPr>
+              <a:t>KGiSL</a:t>
+            </a:r>
+            <a:r>
+              <a:rPr kumimoji="0" lang="en-US" sz="1600" b="0" i="0" u="none" strike="noStrike" kern="1200" cap="none" spc="0" normalizeH="0" baseline="0" noProof="0" dirty="0" smtClean="0">
+                <a:ln>
+                  <a:noFill/>
+                </a:ln>
+                <a:solidFill>
+                  <a:schemeClr val="tx1"/>
+                </a:solidFill>
+                <a:effectLst/>
+                <a:uLnTx/>
+                <a:uFillTx/>
+                <a:latin typeface="Cambria" pitchFamily="18" charset="0"/>
+                <a:ea typeface="+mn-ea"/>
+                <a:cs typeface="+mn-cs"/>
+              </a:rPr>
+              <a:t> Institute of Technology,</a:t>
+            </a:r>
+          </a:p>
+          <a:p>
+            <a:pPr marL="342900" marR="0" lvl="0" indent="-342900" algn="r" defTabSz="914400" rtl="0" eaLnBrk="1" fontAlgn="auto" latinLnBrk="0" hangingPunct="1">
+              <a:lnSpc>
+                <a:spcPct val="100000"/>
+              </a:lnSpc>
+              <a:spcBef>
+                <a:spcPct val="20000"/>
+              </a:spcBef>
+              <a:spcAft>
+                <a:spcPts val="0"/>
+              </a:spcAft>
+              <a:buClrTx/>
+              <a:buSzTx/>
+              <a:tabLst/>
+              <a:defRPr/>
+            </a:pPr>
+            <a:r>
+              <a:rPr kumimoji="0" lang="en-US" sz="1600" b="0" i="0" u="none" strike="noStrike" kern="1200" cap="none" spc="0" normalizeH="0" baseline="0" noProof="0" dirty="0" smtClean="0">
+                <a:ln>
+                  <a:noFill/>
+                </a:ln>
+                <a:solidFill>
+                  <a:schemeClr val="tx1"/>
+                </a:solidFill>
+                <a:effectLst/>
+                <a:uLnTx/>
+                <a:uFillTx/>
+                <a:latin typeface="Cambria" pitchFamily="18" charset="0"/>
+                <a:ea typeface="+mn-ea"/>
+                <a:cs typeface="+mn-cs"/>
+              </a:rPr>
+              <a:t>email: </a:t>
+            </a:r>
+            <a:r>
+              <a:rPr kumimoji="0" lang="en-US" sz="1600" b="0" i="0" u="none" strike="noStrike" kern="1200" cap="none" spc="0" normalizeH="0" baseline="0" noProof="0" dirty="0" smtClean="0">
+                <a:ln>
+                  <a:noFill/>
+                </a:ln>
+                <a:solidFill>
+                  <a:schemeClr val="tx1"/>
+                </a:solidFill>
+                <a:effectLst/>
+                <a:uLnTx/>
+                <a:uFillTx/>
+                <a:latin typeface="Cambria" pitchFamily="18" charset="0"/>
+                <a:ea typeface="+mn-ea"/>
+                <a:cs typeface="+mn-cs"/>
+                <a:hlinkClick r:id="rId2"/>
+              </a:rPr>
+              <a:t>proffraja@gmail.com</a:t>
+            </a:r>
+            <a:endParaRPr lang="en-US" sz="1600" dirty="0" smtClean="0">
+              <a:latin typeface="Cambria" pitchFamily="18" charset="0"/>
+            </a:endParaRPr>
+          </a:p>
+          <a:p>
+            <a:pPr marL="342900" marR="0" lvl="0" indent="-342900" algn="r" defTabSz="914400" rtl="0" eaLnBrk="1" fontAlgn="auto" latinLnBrk="0" hangingPunct="1">
+              <a:lnSpc>
+                <a:spcPct val="100000"/>
+              </a:lnSpc>
+              <a:spcBef>
+                <a:spcPct val="20000"/>
+              </a:spcBef>
+              <a:spcAft>
+                <a:spcPts val="0"/>
+              </a:spcAft>
+              <a:buClrTx/>
+              <a:buSzTx/>
+              <a:tabLst/>
+              <a:defRPr/>
+            </a:pPr>
+            <a:r>
+              <a:rPr lang="en-US" sz="1600" dirty="0" err="1" smtClean="0">
+                <a:latin typeface="Cambria" pitchFamily="18" charset="0"/>
+              </a:rPr>
+              <a:t>Github:</a:t>
+            </a:r>
+            <a:r>
+              <a:rPr lang="en-US" sz="1600" dirty="0" err="1" smtClean="0">
+                <a:latin typeface="Cambria" pitchFamily="18" charset="0"/>
+                <a:hlinkClick r:id="rId3"/>
+              </a:rPr>
+              <a:t>www.github.com</a:t>
+            </a:r>
+            <a:r>
+              <a:rPr lang="en-US" sz="1600" dirty="0" smtClean="0">
+                <a:latin typeface="Cambria" pitchFamily="18" charset="0"/>
+                <a:hlinkClick r:id="rId3"/>
+              </a:rPr>
+              <a:t>/</a:t>
+            </a:r>
+            <a:r>
+              <a:rPr lang="en-US" sz="1600" dirty="0" err="1" smtClean="0">
+                <a:latin typeface="Cambria" pitchFamily="18" charset="0"/>
+                <a:hlinkClick r:id="rId3"/>
+              </a:rPr>
+              <a:t>rajasekaranap</a:t>
+            </a:r>
+            <a:endParaRPr lang="en-US" sz="1600" dirty="0" smtClean="0">
+              <a:latin typeface="Cambria" pitchFamily="18" charset="0"/>
+            </a:endParaRPr>
+          </a:p>
+          <a:p>
+            <a:pPr marL="342900" marR="0" lvl="0" indent="-342900" algn="r" defTabSz="914400" rtl="0" eaLnBrk="1" fontAlgn="auto" latinLnBrk="0" hangingPunct="1">
+              <a:lnSpc>
+                <a:spcPct val="100000"/>
+              </a:lnSpc>
+              <a:spcBef>
+                <a:spcPct val="20000"/>
+              </a:spcBef>
+              <a:spcAft>
+                <a:spcPts val="0"/>
+              </a:spcAft>
+              <a:buClrTx/>
+              <a:buSzTx/>
+              <a:tabLst/>
+              <a:defRPr/>
+            </a:pPr>
+            <a:endParaRPr lang="en-US" sz="1600" dirty="0" smtClean="0">
+              <a:latin typeface="Cambria" pitchFamily="18" charset="0"/>
+            </a:endParaRPr>
+          </a:p>
+        </p:txBody>
+      </p:sp>
+    </p:spTree>
+  </p:cSld>
+  <p:clrMapOvr>
+    <a:masterClrMapping/>
+  </p:clrMapOvr>
+  <p:timing>
+    <p:tnLst>
+      <p:par>
+        <p:cTn id="1" dur="indefinite" restart="never" nodeType="tmRoot"/>
+      </p:par>
+    </p:tnLst>
+  </p:timing>
 </p:sld>
 </file>
 

</xml_diff>

<commit_message>
Last Update 27-12-2018  9:25:02.83
</commit_message>
<xml_diff>
--- a/Slides/GE8291-U1.pptx
+++ b/Slides/GE8291-U1.pptx
@@ -7343,37 +7343,37 @@
     </dgm:pt>
   </dgm:ptLst>
   <dgm:cxnLst>
+    <dgm:cxn modelId="{B9C6D9E8-FFAC-4240-ADAB-56D11ECA0C13}" type="presOf" srcId="{49F5C075-6F91-4534-90EF-1E3C46B7CDAB}" destId="{2285F4ED-8377-4AAE-8983-73210395BBEA}" srcOrd="0" destOrd="0" presId="urn:microsoft.com/office/officeart/2005/8/layout/bProcess3"/>
+    <dgm:cxn modelId="{D0869D4A-0CCA-41F3-9DD3-4ED596B06E75}" type="presOf" srcId="{50E9E6FB-F2A1-4C3C-8ED0-BAE19D73E35E}" destId="{2FAA9B58-6B5D-4335-A250-181F004764F0}" srcOrd="1" destOrd="0" presId="urn:microsoft.com/office/officeart/2005/8/layout/bProcess3"/>
+    <dgm:cxn modelId="{FE542C3D-BBB3-4DD3-BF4B-7D402B414457}" type="presOf" srcId="{FD8B56A7-F781-4359-A392-18A5A5EAFD08}" destId="{32D3371C-2473-4D1C-8EEE-C1A1B80CEC07}" srcOrd="1" destOrd="0" presId="urn:microsoft.com/office/officeart/2005/8/layout/bProcess3"/>
+    <dgm:cxn modelId="{2C640B6D-DD5F-4676-A603-F59B381ECD34}" srcId="{1B35C749-0FAC-4633-A54A-2151D01D73E9}" destId="{692AF6EC-90A6-4438-B374-6D128451B9C6}" srcOrd="6" destOrd="0" parTransId="{8CA4902C-7B9F-4296-B079-CF1CDC158965}" sibTransId="{66EBE6AC-FFBA-4B21-9CFD-A20A2C50B09C}"/>
+    <dgm:cxn modelId="{4BFDD7D3-9F7F-4AA8-B0A4-D088A543E3B8}" type="presOf" srcId="{50E9E6FB-F2A1-4C3C-8ED0-BAE19D73E35E}" destId="{AF214629-685D-4AAE-A91E-8FADE0AD143F}" srcOrd="0" destOrd="0" presId="urn:microsoft.com/office/officeart/2005/8/layout/bProcess3"/>
+    <dgm:cxn modelId="{E1EE091C-62ED-4F46-BF54-6B18F1F7092D}" type="presOf" srcId="{5C45A363-7A7A-4FA3-9ECD-B022C15B934E}" destId="{25F3FB88-54D6-425B-AC4E-7DD9E1B1A196}" srcOrd="0" destOrd="0" presId="urn:microsoft.com/office/officeart/2005/8/layout/bProcess3"/>
+    <dgm:cxn modelId="{00B6F532-F45E-48DC-964E-03AF45CCFBB2}" srcId="{1B35C749-0FAC-4633-A54A-2151D01D73E9}" destId="{5884A237-5755-41CC-8582-8E6C88D4C50A}" srcOrd="3" destOrd="0" parTransId="{0F6C4D36-F6CD-463D-A31D-295A670D6E05}" sibTransId="{FD8B56A7-F781-4359-A392-18A5A5EAFD08}"/>
+    <dgm:cxn modelId="{6C8D0457-665F-4F8E-A243-E3F043C576B1}" type="presOf" srcId="{C5485345-1FEB-4BFA-AE2E-79B532928A84}" destId="{20262314-1671-480A-9E81-70DF05D47B74}" srcOrd="0" destOrd="0" presId="urn:microsoft.com/office/officeart/2005/8/layout/bProcess3"/>
+    <dgm:cxn modelId="{07C3D10E-B7BA-4EBB-A2D9-D8A00EF1505A}" type="presOf" srcId="{D904E3A6-6AFE-46A0-8334-D62B7D1609EC}" destId="{9F5AD9FD-D879-4A9C-A91D-4A29D743FF70}" srcOrd="0" destOrd="0" presId="urn:microsoft.com/office/officeart/2005/8/layout/bProcess3"/>
+    <dgm:cxn modelId="{9C2E68D6-AA40-4B78-9B9D-73C3E25E5CD4}" type="presOf" srcId="{5C45A363-7A7A-4FA3-9ECD-B022C15B934E}" destId="{80167E65-E64B-46C6-B4D8-E698702E54E2}" srcOrd="1" destOrd="0" presId="urn:microsoft.com/office/officeart/2005/8/layout/bProcess3"/>
+    <dgm:cxn modelId="{70A2AAEC-B27B-445E-B055-105D2BEECDE6}" type="presOf" srcId="{D771E5F0-E6ED-48C0-8CCD-F931688ADE09}" destId="{CCE20427-E360-40CC-B4B1-9BA59CA86C94}" srcOrd="0" destOrd="0" presId="urn:microsoft.com/office/officeart/2005/8/layout/bProcess3"/>
+    <dgm:cxn modelId="{3E55429E-5B52-4C12-842B-03DB2B2C2AE7}" type="presOf" srcId="{66EBE6AC-FFBA-4B21-9CFD-A20A2C50B09C}" destId="{59843F75-1210-4E69-AB1B-7DBEB2EBD213}" srcOrd="1" destOrd="0" presId="urn:microsoft.com/office/officeart/2005/8/layout/bProcess3"/>
+    <dgm:cxn modelId="{8F0A02C8-CE18-4B8B-BC35-8DBA6204275E}" srcId="{1B35C749-0FAC-4633-A54A-2151D01D73E9}" destId="{273BCF21-B834-4BE7-BFF2-A3BF8465A53F}" srcOrd="2" destOrd="0" parTransId="{6C059FA2-8E71-4FCF-B6BB-E62CBD5637A9}" sibTransId="{49F5C075-6F91-4534-90EF-1E3C46B7CDAB}"/>
+    <dgm:cxn modelId="{72CBB521-2B0B-4FD5-B826-6B9AEE9B14F5}" type="presOf" srcId="{1B35C749-0FAC-4633-A54A-2151D01D73E9}" destId="{E06879EE-A190-46AD-92DE-2EF2FC2CE701}" srcOrd="0" destOrd="0" presId="urn:microsoft.com/office/officeart/2005/8/layout/bProcess3"/>
+    <dgm:cxn modelId="{4F6E135B-6F89-42E9-96A3-465A93FDF0CA}" srcId="{1B35C749-0FAC-4633-A54A-2151D01D73E9}" destId="{E2299760-B0D4-404A-9CB9-A58AC28848AC}" srcOrd="1" destOrd="0" parTransId="{3181CFE7-12C0-4BB7-BF57-420CFADB1DA0}" sibTransId="{6076BBA9-B7A8-45A9-B3AD-F648D1EE4EF8}"/>
+    <dgm:cxn modelId="{0298356F-8751-41D7-9E4D-6CF8A8E2672B}" type="presOf" srcId="{7AFCBDAD-B0CB-4971-B541-3D3D791D477E}" destId="{3D29F44E-3A44-478A-B972-695C660220F9}" srcOrd="0" destOrd="0" presId="urn:microsoft.com/office/officeart/2005/8/layout/bProcess3"/>
+    <dgm:cxn modelId="{83199706-A662-424E-B443-F050CBF5147C}" type="presOf" srcId="{C5485345-1FEB-4BFA-AE2E-79B532928A84}" destId="{D10F74A4-29F7-476A-8333-D5A8AF43CB1C}" srcOrd="1" destOrd="0" presId="urn:microsoft.com/office/officeart/2005/8/layout/bProcess3"/>
+    <dgm:cxn modelId="{55DC005C-8FAE-4756-AFA2-4CCAA32139E3}" srcId="{1B35C749-0FAC-4633-A54A-2151D01D73E9}" destId="{D904E3A6-6AFE-46A0-8334-D62B7D1609EC}" srcOrd="5" destOrd="0" parTransId="{8EE4547C-B4E9-4114-B2E9-A4F3F6370A81}" sibTransId="{5C45A363-7A7A-4FA3-9ECD-B022C15B934E}"/>
+    <dgm:cxn modelId="{27F5D17B-1F57-47AD-BC26-075FD1D1A4D8}" srcId="{1B35C749-0FAC-4633-A54A-2151D01D73E9}" destId="{7AFCBDAD-B0CB-4971-B541-3D3D791D477E}" srcOrd="7" destOrd="0" parTransId="{27D384C5-1680-4017-8153-5B8323DE3B00}" sibTransId="{E3EB0BF8-5D37-4870-84DE-D7E24C915D0C}"/>
+    <dgm:cxn modelId="{C21BE7E8-3CC2-483A-9678-C8951B7672F9}" type="presOf" srcId="{FD8B56A7-F781-4359-A392-18A5A5EAFD08}" destId="{93E0DD11-107C-4740-A25F-830761CDA98E}" srcOrd="0" destOrd="0" presId="urn:microsoft.com/office/officeart/2005/8/layout/bProcess3"/>
+    <dgm:cxn modelId="{87A66FFD-515D-4FAA-BCC7-200FB8AF4DDA}" type="presOf" srcId="{E2299760-B0D4-404A-9CB9-A58AC28848AC}" destId="{7084BB0B-BD20-429A-A4CD-AD72DF04F99B}" srcOrd="0" destOrd="0" presId="urn:microsoft.com/office/officeart/2005/8/layout/bProcess3"/>
+    <dgm:cxn modelId="{D60E5242-A01B-4F14-BBF5-4650FB424686}" type="presOf" srcId="{66EBE6AC-FFBA-4B21-9CFD-A20A2C50B09C}" destId="{58269705-6462-4062-A853-0836726E2AD2}" srcOrd="0" destOrd="0" presId="urn:microsoft.com/office/officeart/2005/8/layout/bProcess3"/>
+    <dgm:cxn modelId="{9EC1A9F1-CC2C-4077-89D7-505B106C8293}" type="presOf" srcId="{6076BBA9-B7A8-45A9-B3AD-F648D1EE4EF8}" destId="{CBD0AFA0-6BC1-4C32-BF50-B880F7A0B383}" srcOrd="0" destOrd="0" presId="urn:microsoft.com/office/officeart/2005/8/layout/bProcess3"/>
     <dgm:cxn modelId="{6D89B2A8-2B66-488A-B519-DF0EE62ADA9F}" type="presOf" srcId="{49F5C075-6F91-4534-90EF-1E3C46B7CDAB}" destId="{4564C43D-E089-4EA6-A6B9-ED5CB86087FE}" srcOrd="1" destOrd="0" presId="urn:microsoft.com/office/officeart/2005/8/layout/bProcess3"/>
-    <dgm:cxn modelId="{D60E5242-A01B-4F14-BBF5-4650FB424686}" type="presOf" srcId="{66EBE6AC-FFBA-4B21-9CFD-A20A2C50B09C}" destId="{58269705-6462-4062-A853-0836726E2AD2}" srcOrd="0" destOrd="0" presId="urn:microsoft.com/office/officeart/2005/8/layout/bProcess3"/>
-    <dgm:cxn modelId="{55DC005C-8FAE-4756-AFA2-4CCAA32139E3}" srcId="{1B35C749-0FAC-4633-A54A-2151D01D73E9}" destId="{D904E3A6-6AFE-46A0-8334-D62B7D1609EC}" srcOrd="5" destOrd="0" parTransId="{8EE4547C-B4E9-4114-B2E9-A4F3F6370A81}" sibTransId="{5C45A363-7A7A-4FA3-9ECD-B022C15B934E}"/>
-    <dgm:cxn modelId="{87A66FFD-515D-4FAA-BCC7-200FB8AF4DDA}" type="presOf" srcId="{E2299760-B0D4-404A-9CB9-A58AC28848AC}" destId="{7084BB0B-BD20-429A-A4CD-AD72DF04F99B}" srcOrd="0" destOrd="0" presId="urn:microsoft.com/office/officeart/2005/8/layout/bProcess3"/>
-    <dgm:cxn modelId="{4BFDD7D3-9F7F-4AA8-B0A4-D088A543E3B8}" type="presOf" srcId="{50E9E6FB-F2A1-4C3C-8ED0-BAE19D73E35E}" destId="{AF214629-685D-4AAE-A91E-8FADE0AD143F}" srcOrd="0" destOrd="0" presId="urn:microsoft.com/office/officeart/2005/8/layout/bProcess3"/>
+    <dgm:cxn modelId="{77C2D4BC-347C-4496-B5DE-04C5EA555C3C}" type="presOf" srcId="{692AF6EC-90A6-4438-B374-6D128451B9C6}" destId="{8F19D433-964C-4295-8103-ED9156835325}" srcOrd="0" destOrd="0" presId="urn:microsoft.com/office/officeart/2005/8/layout/bProcess3"/>
+    <dgm:cxn modelId="{7084DAA2-E59C-4F0A-953C-E99F743B0047}" type="presOf" srcId="{273BCF21-B834-4BE7-BFF2-A3BF8465A53F}" destId="{E953EB40-DE25-40D4-B358-AB78D22BB191}" srcOrd="0" destOrd="0" presId="urn:microsoft.com/office/officeart/2005/8/layout/bProcess3"/>
     <dgm:cxn modelId="{B4CE57C3-0833-4E62-948B-B57F681CF9C2}" srcId="{1B35C749-0FAC-4633-A54A-2151D01D73E9}" destId="{0BE9A2D8-31BB-4CE9-A3B0-CA3B9F9C68B3}" srcOrd="0" destOrd="0" parTransId="{8F091320-784A-4E72-9A29-F103CA12AD74}" sibTransId="{C5485345-1FEB-4BFA-AE2E-79B532928A84}"/>
-    <dgm:cxn modelId="{B9C6D9E8-FFAC-4240-ADAB-56D11ECA0C13}" type="presOf" srcId="{49F5C075-6F91-4534-90EF-1E3C46B7CDAB}" destId="{2285F4ED-8377-4AAE-8983-73210395BBEA}" srcOrd="0" destOrd="0" presId="urn:microsoft.com/office/officeart/2005/8/layout/bProcess3"/>
-    <dgm:cxn modelId="{8F0A02C8-CE18-4B8B-BC35-8DBA6204275E}" srcId="{1B35C749-0FAC-4633-A54A-2151D01D73E9}" destId="{273BCF21-B834-4BE7-BFF2-A3BF8465A53F}" srcOrd="2" destOrd="0" parTransId="{6C059FA2-8E71-4FCF-B6BB-E62CBD5637A9}" sibTransId="{49F5C075-6F91-4534-90EF-1E3C46B7CDAB}"/>
-    <dgm:cxn modelId="{2C640B6D-DD5F-4676-A603-F59B381ECD34}" srcId="{1B35C749-0FAC-4633-A54A-2151D01D73E9}" destId="{692AF6EC-90A6-4438-B374-6D128451B9C6}" srcOrd="6" destOrd="0" parTransId="{8CA4902C-7B9F-4296-B079-CF1CDC158965}" sibTransId="{66EBE6AC-FFBA-4B21-9CFD-A20A2C50B09C}"/>
-    <dgm:cxn modelId="{7084DAA2-E59C-4F0A-953C-E99F743B0047}" type="presOf" srcId="{273BCF21-B834-4BE7-BFF2-A3BF8465A53F}" destId="{E953EB40-DE25-40D4-B358-AB78D22BB191}" srcOrd="0" destOrd="0" presId="urn:microsoft.com/office/officeart/2005/8/layout/bProcess3"/>
-    <dgm:cxn modelId="{9C2E68D6-AA40-4B78-9B9D-73C3E25E5CD4}" type="presOf" srcId="{5C45A363-7A7A-4FA3-9ECD-B022C15B934E}" destId="{80167E65-E64B-46C6-B4D8-E698702E54E2}" srcOrd="1" destOrd="0" presId="urn:microsoft.com/office/officeart/2005/8/layout/bProcess3"/>
-    <dgm:cxn modelId="{3E55429E-5B52-4C12-842B-03DB2B2C2AE7}" type="presOf" srcId="{66EBE6AC-FFBA-4B21-9CFD-A20A2C50B09C}" destId="{59843F75-1210-4E69-AB1B-7DBEB2EBD213}" srcOrd="1" destOrd="0" presId="urn:microsoft.com/office/officeart/2005/8/layout/bProcess3"/>
-    <dgm:cxn modelId="{77C2D4BC-347C-4496-B5DE-04C5EA555C3C}" type="presOf" srcId="{692AF6EC-90A6-4438-B374-6D128451B9C6}" destId="{8F19D433-964C-4295-8103-ED9156835325}" srcOrd="0" destOrd="0" presId="urn:microsoft.com/office/officeart/2005/8/layout/bProcess3"/>
-    <dgm:cxn modelId="{27F5D17B-1F57-47AD-BC26-075FD1D1A4D8}" srcId="{1B35C749-0FAC-4633-A54A-2151D01D73E9}" destId="{7AFCBDAD-B0CB-4971-B541-3D3D791D477E}" srcOrd="7" destOrd="0" parTransId="{27D384C5-1680-4017-8153-5B8323DE3B00}" sibTransId="{E3EB0BF8-5D37-4870-84DE-D7E24C915D0C}"/>
-    <dgm:cxn modelId="{FE542C3D-BBB3-4DD3-BF4B-7D402B414457}" type="presOf" srcId="{FD8B56A7-F781-4359-A392-18A5A5EAFD08}" destId="{32D3371C-2473-4D1C-8EEE-C1A1B80CEC07}" srcOrd="1" destOrd="0" presId="urn:microsoft.com/office/officeart/2005/8/layout/bProcess3"/>
+    <dgm:cxn modelId="{372EA098-1D0E-4E3C-86ED-E305A81F6B9E}" type="presOf" srcId="{6076BBA9-B7A8-45A9-B3AD-F648D1EE4EF8}" destId="{6978034D-F608-4659-9128-71F98EC8E58B}" srcOrd="1" destOrd="0" presId="urn:microsoft.com/office/officeart/2005/8/layout/bProcess3"/>
+    <dgm:cxn modelId="{FB539F42-7165-44F7-ACD6-E71482E6640B}" type="presOf" srcId="{5884A237-5755-41CC-8582-8E6C88D4C50A}" destId="{978F40F7-1170-4426-9F6D-C85BB73408CF}" srcOrd="0" destOrd="0" presId="urn:microsoft.com/office/officeart/2005/8/layout/bProcess3"/>
     <dgm:cxn modelId="{40329A88-E4C3-48DD-AF5C-E1CB3CFCDC6C}" srcId="{1B35C749-0FAC-4633-A54A-2151D01D73E9}" destId="{D771E5F0-E6ED-48C0-8CCD-F931688ADE09}" srcOrd="4" destOrd="0" parTransId="{B6ACB080-9F8C-4A96-A543-131C0A294974}" sibTransId="{50E9E6FB-F2A1-4C3C-8ED0-BAE19D73E35E}"/>
-    <dgm:cxn modelId="{83199706-A662-424E-B443-F050CBF5147C}" type="presOf" srcId="{C5485345-1FEB-4BFA-AE2E-79B532928A84}" destId="{D10F74A4-29F7-476A-8333-D5A8AF43CB1C}" srcOrd="1" destOrd="0" presId="urn:microsoft.com/office/officeart/2005/8/layout/bProcess3"/>
-    <dgm:cxn modelId="{70A2AAEC-B27B-445E-B055-105D2BEECDE6}" type="presOf" srcId="{D771E5F0-E6ED-48C0-8CCD-F931688ADE09}" destId="{CCE20427-E360-40CC-B4B1-9BA59CA86C94}" srcOrd="0" destOrd="0" presId="urn:microsoft.com/office/officeart/2005/8/layout/bProcess3"/>
     <dgm:cxn modelId="{834A9293-829E-4FD6-B337-77CEA740EEAB}" type="presOf" srcId="{0BE9A2D8-31BB-4CE9-A3B0-CA3B9F9C68B3}" destId="{3FE18E05-D30A-4A95-BDA6-AD987600F5DC}" srcOrd="0" destOrd="0" presId="urn:microsoft.com/office/officeart/2005/8/layout/bProcess3"/>
-    <dgm:cxn modelId="{E1EE091C-62ED-4F46-BF54-6B18F1F7092D}" type="presOf" srcId="{5C45A363-7A7A-4FA3-9ECD-B022C15B934E}" destId="{25F3FB88-54D6-425B-AC4E-7DD9E1B1A196}" srcOrd="0" destOrd="0" presId="urn:microsoft.com/office/officeart/2005/8/layout/bProcess3"/>
-    <dgm:cxn modelId="{D0869D4A-0CCA-41F3-9DD3-4ED596B06E75}" type="presOf" srcId="{50E9E6FB-F2A1-4C3C-8ED0-BAE19D73E35E}" destId="{2FAA9B58-6B5D-4335-A250-181F004764F0}" srcOrd="1" destOrd="0" presId="urn:microsoft.com/office/officeart/2005/8/layout/bProcess3"/>
-    <dgm:cxn modelId="{0298356F-8751-41D7-9E4D-6CF8A8E2672B}" type="presOf" srcId="{7AFCBDAD-B0CB-4971-B541-3D3D791D477E}" destId="{3D29F44E-3A44-478A-B972-695C660220F9}" srcOrd="0" destOrd="0" presId="urn:microsoft.com/office/officeart/2005/8/layout/bProcess3"/>
-    <dgm:cxn modelId="{07C3D10E-B7BA-4EBB-A2D9-D8A00EF1505A}" type="presOf" srcId="{D904E3A6-6AFE-46A0-8334-D62B7D1609EC}" destId="{9F5AD9FD-D879-4A9C-A91D-4A29D743FF70}" srcOrd="0" destOrd="0" presId="urn:microsoft.com/office/officeart/2005/8/layout/bProcess3"/>
-    <dgm:cxn modelId="{FB539F42-7165-44F7-ACD6-E71482E6640B}" type="presOf" srcId="{5884A237-5755-41CC-8582-8E6C88D4C50A}" destId="{978F40F7-1170-4426-9F6D-C85BB73408CF}" srcOrd="0" destOrd="0" presId="urn:microsoft.com/office/officeart/2005/8/layout/bProcess3"/>
-    <dgm:cxn modelId="{00B6F532-F45E-48DC-964E-03AF45CCFBB2}" srcId="{1B35C749-0FAC-4633-A54A-2151D01D73E9}" destId="{5884A237-5755-41CC-8582-8E6C88D4C50A}" srcOrd="3" destOrd="0" parTransId="{0F6C4D36-F6CD-463D-A31D-295A670D6E05}" sibTransId="{FD8B56A7-F781-4359-A392-18A5A5EAFD08}"/>
-    <dgm:cxn modelId="{72CBB521-2B0B-4FD5-B826-6B9AEE9B14F5}" type="presOf" srcId="{1B35C749-0FAC-4633-A54A-2151D01D73E9}" destId="{E06879EE-A190-46AD-92DE-2EF2FC2CE701}" srcOrd="0" destOrd="0" presId="urn:microsoft.com/office/officeart/2005/8/layout/bProcess3"/>
-    <dgm:cxn modelId="{C21BE7E8-3CC2-483A-9678-C8951B7672F9}" type="presOf" srcId="{FD8B56A7-F781-4359-A392-18A5A5EAFD08}" destId="{93E0DD11-107C-4740-A25F-830761CDA98E}" srcOrd="0" destOrd="0" presId="urn:microsoft.com/office/officeart/2005/8/layout/bProcess3"/>
-    <dgm:cxn modelId="{6C8D0457-665F-4F8E-A243-E3F043C576B1}" type="presOf" srcId="{C5485345-1FEB-4BFA-AE2E-79B532928A84}" destId="{20262314-1671-480A-9E81-70DF05D47B74}" srcOrd="0" destOrd="0" presId="urn:microsoft.com/office/officeart/2005/8/layout/bProcess3"/>
-    <dgm:cxn modelId="{372EA098-1D0E-4E3C-86ED-E305A81F6B9E}" type="presOf" srcId="{6076BBA9-B7A8-45A9-B3AD-F648D1EE4EF8}" destId="{6978034D-F608-4659-9128-71F98EC8E58B}" srcOrd="1" destOrd="0" presId="urn:microsoft.com/office/officeart/2005/8/layout/bProcess3"/>
-    <dgm:cxn modelId="{9EC1A9F1-CC2C-4077-89D7-505B106C8293}" type="presOf" srcId="{6076BBA9-B7A8-45A9-B3AD-F648D1EE4EF8}" destId="{CBD0AFA0-6BC1-4C32-BF50-B880F7A0B383}" srcOrd="0" destOrd="0" presId="urn:microsoft.com/office/officeart/2005/8/layout/bProcess3"/>
-    <dgm:cxn modelId="{4F6E135B-6F89-42E9-96A3-465A93FDF0CA}" srcId="{1B35C749-0FAC-4633-A54A-2151D01D73E9}" destId="{E2299760-B0D4-404A-9CB9-A58AC28848AC}" srcOrd="1" destOrd="0" parTransId="{3181CFE7-12C0-4BB7-BF57-420CFADB1DA0}" sibTransId="{6076BBA9-B7A8-45A9-B3AD-F648D1EE4EF8}"/>
     <dgm:cxn modelId="{75D9CA11-E9D0-439F-8823-A08923390A81}" type="presParOf" srcId="{E06879EE-A190-46AD-92DE-2EF2FC2CE701}" destId="{3FE18E05-D30A-4A95-BDA6-AD987600F5DC}" srcOrd="0" destOrd="0" presId="urn:microsoft.com/office/officeart/2005/8/layout/bProcess3"/>
     <dgm:cxn modelId="{53D9D0D9-7DA2-44EB-8BF1-A6C496A14AE6}" type="presParOf" srcId="{E06879EE-A190-46AD-92DE-2EF2FC2CE701}" destId="{20262314-1671-480A-9E81-70DF05D47B74}" srcOrd="1" destOrd="0" presId="urn:microsoft.com/office/officeart/2005/8/layout/bProcess3"/>
     <dgm:cxn modelId="{05C8DEC3-15DA-445E-9DDC-49076B98B59F}" type="presParOf" srcId="{20262314-1671-480A-9E81-70DF05D47B74}" destId="{D10F74A4-29F7-476A-8333-D5A8AF43CB1C}" srcOrd="0" destOrd="0" presId="urn:microsoft.com/office/officeart/2005/8/layout/bProcess3"/>
@@ -33309,7 +33309,11 @@
           <a:p>
             <a:r>
               <a:rPr lang="en-US" dirty="0" smtClean="0"/>
-              <a:t>Zones of Ecosystem</a:t>
+              <a:t>Zones of </a:t>
+            </a:r>
+            <a:r>
+              <a:rPr lang="en-US" dirty="0" smtClean="0"/>
+              <a:t>Ocean</a:t>
             </a:r>
             <a:endParaRPr lang="en-IN" dirty="0"/>
           </a:p>
@@ -33487,7 +33491,15 @@
           <a:p>
             <a:r>
               <a:rPr lang="en-US" dirty="0" smtClean="0"/>
-              <a:t>Zones of Ecosystem</a:t>
+              <a:t>Zones </a:t>
+            </a:r>
+            <a:r>
+              <a:rPr lang="en-US" smtClean="0"/>
+              <a:t>of </a:t>
+            </a:r>
+            <a:r>
+              <a:rPr lang="en-US" smtClean="0"/>
+              <a:t>Ocean</a:t>
             </a:r>
             <a:endParaRPr lang="en-IN" dirty="0"/>
           </a:p>

</xml_diff>

<commit_message>
Last Update 27-12-2018  9:28:29.97
</commit_message>
<xml_diff>
--- a/Slides/GE8291-U1.pptx
+++ b/Slides/GE8291-U1.pptx
@@ -7343,37 +7343,37 @@
     </dgm:pt>
   </dgm:ptLst>
   <dgm:cxnLst>
+    <dgm:cxn modelId="{6D89B2A8-2B66-488A-B519-DF0EE62ADA9F}" type="presOf" srcId="{49F5C075-6F91-4534-90EF-1E3C46B7CDAB}" destId="{4564C43D-E089-4EA6-A6B9-ED5CB86087FE}" srcOrd="1" destOrd="0" presId="urn:microsoft.com/office/officeart/2005/8/layout/bProcess3"/>
+    <dgm:cxn modelId="{D60E5242-A01B-4F14-BBF5-4650FB424686}" type="presOf" srcId="{66EBE6AC-FFBA-4B21-9CFD-A20A2C50B09C}" destId="{58269705-6462-4062-A853-0836726E2AD2}" srcOrd="0" destOrd="0" presId="urn:microsoft.com/office/officeart/2005/8/layout/bProcess3"/>
+    <dgm:cxn modelId="{55DC005C-8FAE-4756-AFA2-4CCAA32139E3}" srcId="{1B35C749-0FAC-4633-A54A-2151D01D73E9}" destId="{D904E3A6-6AFE-46A0-8334-D62B7D1609EC}" srcOrd="5" destOrd="0" parTransId="{8EE4547C-B4E9-4114-B2E9-A4F3F6370A81}" sibTransId="{5C45A363-7A7A-4FA3-9ECD-B022C15B934E}"/>
+    <dgm:cxn modelId="{87A66FFD-515D-4FAA-BCC7-200FB8AF4DDA}" type="presOf" srcId="{E2299760-B0D4-404A-9CB9-A58AC28848AC}" destId="{7084BB0B-BD20-429A-A4CD-AD72DF04F99B}" srcOrd="0" destOrd="0" presId="urn:microsoft.com/office/officeart/2005/8/layout/bProcess3"/>
+    <dgm:cxn modelId="{4BFDD7D3-9F7F-4AA8-B0A4-D088A543E3B8}" type="presOf" srcId="{50E9E6FB-F2A1-4C3C-8ED0-BAE19D73E35E}" destId="{AF214629-685D-4AAE-A91E-8FADE0AD143F}" srcOrd="0" destOrd="0" presId="urn:microsoft.com/office/officeart/2005/8/layout/bProcess3"/>
+    <dgm:cxn modelId="{B4CE57C3-0833-4E62-948B-B57F681CF9C2}" srcId="{1B35C749-0FAC-4633-A54A-2151D01D73E9}" destId="{0BE9A2D8-31BB-4CE9-A3B0-CA3B9F9C68B3}" srcOrd="0" destOrd="0" parTransId="{8F091320-784A-4E72-9A29-F103CA12AD74}" sibTransId="{C5485345-1FEB-4BFA-AE2E-79B532928A84}"/>
     <dgm:cxn modelId="{B9C6D9E8-FFAC-4240-ADAB-56D11ECA0C13}" type="presOf" srcId="{49F5C075-6F91-4534-90EF-1E3C46B7CDAB}" destId="{2285F4ED-8377-4AAE-8983-73210395BBEA}" srcOrd="0" destOrd="0" presId="urn:microsoft.com/office/officeart/2005/8/layout/bProcess3"/>
+    <dgm:cxn modelId="{8F0A02C8-CE18-4B8B-BC35-8DBA6204275E}" srcId="{1B35C749-0FAC-4633-A54A-2151D01D73E9}" destId="{273BCF21-B834-4BE7-BFF2-A3BF8465A53F}" srcOrd="2" destOrd="0" parTransId="{6C059FA2-8E71-4FCF-B6BB-E62CBD5637A9}" sibTransId="{49F5C075-6F91-4534-90EF-1E3C46B7CDAB}"/>
+    <dgm:cxn modelId="{2C640B6D-DD5F-4676-A603-F59B381ECD34}" srcId="{1B35C749-0FAC-4633-A54A-2151D01D73E9}" destId="{692AF6EC-90A6-4438-B374-6D128451B9C6}" srcOrd="6" destOrd="0" parTransId="{8CA4902C-7B9F-4296-B079-CF1CDC158965}" sibTransId="{66EBE6AC-FFBA-4B21-9CFD-A20A2C50B09C}"/>
+    <dgm:cxn modelId="{7084DAA2-E59C-4F0A-953C-E99F743B0047}" type="presOf" srcId="{273BCF21-B834-4BE7-BFF2-A3BF8465A53F}" destId="{E953EB40-DE25-40D4-B358-AB78D22BB191}" srcOrd="0" destOrd="0" presId="urn:microsoft.com/office/officeart/2005/8/layout/bProcess3"/>
+    <dgm:cxn modelId="{9C2E68D6-AA40-4B78-9B9D-73C3E25E5CD4}" type="presOf" srcId="{5C45A363-7A7A-4FA3-9ECD-B022C15B934E}" destId="{80167E65-E64B-46C6-B4D8-E698702E54E2}" srcOrd="1" destOrd="0" presId="urn:microsoft.com/office/officeart/2005/8/layout/bProcess3"/>
+    <dgm:cxn modelId="{3E55429E-5B52-4C12-842B-03DB2B2C2AE7}" type="presOf" srcId="{66EBE6AC-FFBA-4B21-9CFD-A20A2C50B09C}" destId="{59843F75-1210-4E69-AB1B-7DBEB2EBD213}" srcOrd="1" destOrd="0" presId="urn:microsoft.com/office/officeart/2005/8/layout/bProcess3"/>
+    <dgm:cxn modelId="{77C2D4BC-347C-4496-B5DE-04C5EA555C3C}" type="presOf" srcId="{692AF6EC-90A6-4438-B374-6D128451B9C6}" destId="{8F19D433-964C-4295-8103-ED9156835325}" srcOrd="0" destOrd="0" presId="urn:microsoft.com/office/officeart/2005/8/layout/bProcess3"/>
+    <dgm:cxn modelId="{27F5D17B-1F57-47AD-BC26-075FD1D1A4D8}" srcId="{1B35C749-0FAC-4633-A54A-2151D01D73E9}" destId="{7AFCBDAD-B0CB-4971-B541-3D3D791D477E}" srcOrd="7" destOrd="0" parTransId="{27D384C5-1680-4017-8153-5B8323DE3B00}" sibTransId="{E3EB0BF8-5D37-4870-84DE-D7E24C915D0C}"/>
+    <dgm:cxn modelId="{FE542C3D-BBB3-4DD3-BF4B-7D402B414457}" type="presOf" srcId="{FD8B56A7-F781-4359-A392-18A5A5EAFD08}" destId="{32D3371C-2473-4D1C-8EEE-C1A1B80CEC07}" srcOrd="1" destOrd="0" presId="urn:microsoft.com/office/officeart/2005/8/layout/bProcess3"/>
+    <dgm:cxn modelId="{40329A88-E4C3-48DD-AF5C-E1CB3CFCDC6C}" srcId="{1B35C749-0FAC-4633-A54A-2151D01D73E9}" destId="{D771E5F0-E6ED-48C0-8CCD-F931688ADE09}" srcOrd="4" destOrd="0" parTransId="{B6ACB080-9F8C-4A96-A543-131C0A294974}" sibTransId="{50E9E6FB-F2A1-4C3C-8ED0-BAE19D73E35E}"/>
+    <dgm:cxn modelId="{83199706-A662-424E-B443-F050CBF5147C}" type="presOf" srcId="{C5485345-1FEB-4BFA-AE2E-79B532928A84}" destId="{D10F74A4-29F7-476A-8333-D5A8AF43CB1C}" srcOrd="1" destOrd="0" presId="urn:microsoft.com/office/officeart/2005/8/layout/bProcess3"/>
+    <dgm:cxn modelId="{70A2AAEC-B27B-445E-B055-105D2BEECDE6}" type="presOf" srcId="{D771E5F0-E6ED-48C0-8CCD-F931688ADE09}" destId="{CCE20427-E360-40CC-B4B1-9BA59CA86C94}" srcOrd="0" destOrd="0" presId="urn:microsoft.com/office/officeart/2005/8/layout/bProcess3"/>
+    <dgm:cxn modelId="{834A9293-829E-4FD6-B337-77CEA740EEAB}" type="presOf" srcId="{0BE9A2D8-31BB-4CE9-A3B0-CA3B9F9C68B3}" destId="{3FE18E05-D30A-4A95-BDA6-AD987600F5DC}" srcOrd="0" destOrd="0" presId="urn:microsoft.com/office/officeart/2005/8/layout/bProcess3"/>
+    <dgm:cxn modelId="{E1EE091C-62ED-4F46-BF54-6B18F1F7092D}" type="presOf" srcId="{5C45A363-7A7A-4FA3-9ECD-B022C15B934E}" destId="{25F3FB88-54D6-425B-AC4E-7DD9E1B1A196}" srcOrd="0" destOrd="0" presId="urn:microsoft.com/office/officeart/2005/8/layout/bProcess3"/>
     <dgm:cxn modelId="{D0869D4A-0CCA-41F3-9DD3-4ED596B06E75}" type="presOf" srcId="{50E9E6FB-F2A1-4C3C-8ED0-BAE19D73E35E}" destId="{2FAA9B58-6B5D-4335-A250-181F004764F0}" srcOrd="1" destOrd="0" presId="urn:microsoft.com/office/officeart/2005/8/layout/bProcess3"/>
-    <dgm:cxn modelId="{FE542C3D-BBB3-4DD3-BF4B-7D402B414457}" type="presOf" srcId="{FD8B56A7-F781-4359-A392-18A5A5EAFD08}" destId="{32D3371C-2473-4D1C-8EEE-C1A1B80CEC07}" srcOrd="1" destOrd="0" presId="urn:microsoft.com/office/officeart/2005/8/layout/bProcess3"/>
-    <dgm:cxn modelId="{2C640B6D-DD5F-4676-A603-F59B381ECD34}" srcId="{1B35C749-0FAC-4633-A54A-2151D01D73E9}" destId="{692AF6EC-90A6-4438-B374-6D128451B9C6}" srcOrd="6" destOrd="0" parTransId="{8CA4902C-7B9F-4296-B079-CF1CDC158965}" sibTransId="{66EBE6AC-FFBA-4B21-9CFD-A20A2C50B09C}"/>
-    <dgm:cxn modelId="{4BFDD7D3-9F7F-4AA8-B0A4-D088A543E3B8}" type="presOf" srcId="{50E9E6FB-F2A1-4C3C-8ED0-BAE19D73E35E}" destId="{AF214629-685D-4AAE-A91E-8FADE0AD143F}" srcOrd="0" destOrd="0" presId="urn:microsoft.com/office/officeart/2005/8/layout/bProcess3"/>
-    <dgm:cxn modelId="{E1EE091C-62ED-4F46-BF54-6B18F1F7092D}" type="presOf" srcId="{5C45A363-7A7A-4FA3-9ECD-B022C15B934E}" destId="{25F3FB88-54D6-425B-AC4E-7DD9E1B1A196}" srcOrd="0" destOrd="0" presId="urn:microsoft.com/office/officeart/2005/8/layout/bProcess3"/>
+    <dgm:cxn modelId="{0298356F-8751-41D7-9E4D-6CF8A8E2672B}" type="presOf" srcId="{7AFCBDAD-B0CB-4971-B541-3D3D791D477E}" destId="{3D29F44E-3A44-478A-B972-695C660220F9}" srcOrd="0" destOrd="0" presId="urn:microsoft.com/office/officeart/2005/8/layout/bProcess3"/>
+    <dgm:cxn modelId="{07C3D10E-B7BA-4EBB-A2D9-D8A00EF1505A}" type="presOf" srcId="{D904E3A6-6AFE-46A0-8334-D62B7D1609EC}" destId="{9F5AD9FD-D879-4A9C-A91D-4A29D743FF70}" srcOrd="0" destOrd="0" presId="urn:microsoft.com/office/officeart/2005/8/layout/bProcess3"/>
+    <dgm:cxn modelId="{FB539F42-7165-44F7-ACD6-E71482E6640B}" type="presOf" srcId="{5884A237-5755-41CC-8582-8E6C88D4C50A}" destId="{978F40F7-1170-4426-9F6D-C85BB73408CF}" srcOrd="0" destOrd="0" presId="urn:microsoft.com/office/officeart/2005/8/layout/bProcess3"/>
     <dgm:cxn modelId="{00B6F532-F45E-48DC-964E-03AF45CCFBB2}" srcId="{1B35C749-0FAC-4633-A54A-2151D01D73E9}" destId="{5884A237-5755-41CC-8582-8E6C88D4C50A}" srcOrd="3" destOrd="0" parTransId="{0F6C4D36-F6CD-463D-A31D-295A670D6E05}" sibTransId="{FD8B56A7-F781-4359-A392-18A5A5EAFD08}"/>
+    <dgm:cxn modelId="{72CBB521-2B0B-4FD5-B826-6B9AEE9B14F5}" type="presOf" srcId="{1B35C749-0FAC-4633-A54A-2151D01D73E9}" destId="{E06879EE-A190-46AD-92DE-2EF2FC2CE701}" srcOrd="0" destOrd="0" presId="urn:microsoft.com/office/officeart/2005/8/layout/bProcess3"/>
+    <dgm:cxn modelId="{C21BE7E8-3CC2-483A-9678-C8951B7672F9}" type="presOf" srcId="{FD8B56A7-F781-4359-A392-18A5A5EAFD08}" destId="{93E0DD11-107C-4740-A25F-830761CDA98E}" srcOrd="0" destOrd="0" presId="urn:microsoft.com/office/officeart/2005/8/layout/bProcess3"/>
     <dgm:cxn modelId="{6C8D0457-665F-4F8E-A243-E3F043C576B1}" type="presOf" srcId="{C5485345-1FEB-4BFA-AE2E-79B532928A84}" destId="{20262314-1671-480A-9E81-70DF05D47B74}" srcOrd="0" destOrd="0" presId="urn:microsoft.com/office/officeart/2005/8/layout/bProcess3"/>
-    <dgm:cxn modelId="{07C3D10E-B7BA-4EBB-A2D9-D8A00EF1505A}" type="presOf" srcId="{D904E3A6-6AFE-46A0-8334-D62B7D1609EC}" destId="{9F5AD9FD-D879-4A9C-A91D-4A29D743FF70}" srcOrd="0" destOrd="0" presId="urn:microsoft.com/office/officeart/2005/8/layout/bProcess3"/>
-    <dgm:cxn modelId="{9C2E68D6-AA40-4B78-9B9D-73C3E25E5CD4}" type="presOf" srcId="{5C45A363-7A7A-4FA3-9ECD-B022C15B934E}" destId="{80167E65-E64B-46C6-B4D8-E698702E54E2}" srcOrd="1" destOrd="0" presId="urn:microsoft.com/office/officeart/2005/8/layout/bProcess3"/>
-    <dgm:cxn modelId="{70A2AAEC-B27B-445E-B055-105D2BEECDE6}" type="presOf" srcId="{D771E5F0-E6ED-48C0-8CCD-F931688ADE09}" destId="{CCE20427-E360-40CC-B4B1-9BA59CA86C94}" srcOrd="0" destOrd="0" presId="urn:microsoft.com/office/officeart/2005/8/layout/bProcess3"/>
-    <dgm:cxn modelId="{3E55429E-5B52-4C12-842B-03DB2B2C2AE7}" type="presOf" srcId="{66EBE6AC-FFBA-4B21-9CFD-A20A2C50B09C}" destId="{59843F75-1210-4E69-AB1B-7DBEB2EBD213}" srcOrd="1" destOrd="0" presId="urn:microsoft.com/office/officeart/2005/8/layout/bProcess3"/>
-    <dgm:cxn modelId="{8F0A02C8-CE18-4B8B-BC35-8DBA6204275E}" srcId="{1B35C749-0FAC-4633-A54A-2151D01D73E9}" destId="{273BCF21-B834-4BE7-BFF2-A3BF8465A53F}" srcOrd="2" destOrd="0" parTransId="{6C059FA2-8E71-4FCF-B6BB-E62CBD5637A9}" sibTransId="{49F5C075-6F91-4534-90EF-1E3C46B7CDAB}"/>
-    <dgm:cxn modelId="{72CBB521-2B0B-4FD5-B826-6B9AEE9B14F5}" type="presOf" srcId="{1B35C749-0FAC-4633-A54A-2151D01D73E9}" destId="{E06879EE-A190-46AD-92DE-2EF2FC2CE701}" srcOrd="0" destOrd="0" presId="urn:microsoft.com/office/officeart/2005/8/layout/bProcess3"/>
+    <dgm:cxn modelId="{372EA098-1D0E-4E3C-86ED-E305A81F6B9E}" type="presOf" srcId="{6076BBA9-B7A8-45A9-B3AD-F648D1EE4EF8}" destId="{6978034D-F608-4659-9128-71F98EC8E58B}" srcOrd="1" destOrd="0" presId="urn:microsoft.com/office/officeart/2005/8/layout/bProcess3"/>
+    <dgm:cxn modelId="{9EC1A9F1-CC2C-4077-89D7-505B106C8293}" type="presOf" srcId="{6076BBA9-B7A8-45A9-B3AD-F648D1EE4EF8}" destId="{CBD0AFA0-6BC1-4C32-BF50-B880F7A0B383}" srcOrd="0" destOrd="0" presId="urn:microsoft.com/office/officeart/2005/8/layout/bProcess3"/>
     <dgm:cxn modelId="{4F6E135B-6F89-42E9-96A3-465A93FDF0CA}" srcId="{1B35C749-0FAC-4633-A54A-2151D01D73E9}" destId="{E2299760-B0D4-404A-9CB9-A58AC28848AC}" srcOrd="1" destOrd="0" parTransId="{3181CFE7-12C0-4BB7-BF57-420CFADB1DA0}" sibTransId="{6076BBA9-B7A8-45A9-B3AD-F648D1EE4EF8}"/>
-    <dgm:cxn modelId="{0298356F-8751-41D7-9E4D-6CF8A8E2672B}" type="presOf" srcId="{7AFCBDAD-B0CB-4971-B541-3D3D791D477E}" destId="{3D29F44E-3A44-478A-B972-695C660220F9}" srcOrd="0" destOrd="0" presId="urn:microsoft.com/office/officeart/2005/8/layout/bProcess3"/>
-    <dgm:cxn modelId="{83199706-A662-424E-B443-F050CBF5147C}" type="presOf" srcId="{C5485345-1FEB-4BFA-AE2E-79B532928A84}" destId="{D10F74A4-29F7-476A-8333-D5A8AF43CB1C}" srcOrd="1" destOrd="0" presId="urn:microsoft.com/office/officeart/2005/8/layout/bProcess3"/>
-    <dgm:cxn modelId="{55DC005C-8FAE-4756-AFA2-4CCAA32139E3}" srcId="{1B35C749-0FAC-4633-A54A-2151D01D73E9}" destId="{D904E3A6-6AFE-46A0-8334-D62B7D1609EC}" srcOrd="5" destOrd="0" parTransId="{8EE4547C-B4E9-4114-B2E9-A4F3F6370A81}" sibTransId="{5C45A363-7A7A-4FA3-9ECD-B022C15B934E}"/>
-    <dgm:cxn modelId="{27F5D17B-1F57-47AD-BC26-075FD1D1A4D8}" srcId="{1B35C749-0FAC-4633-A54A-2151D01D73E9}" destId="{7AFCBDAD-B0CB-4971-B541-3D3D791D477E}" srcOrd="7" destOrd="0" parTransId="{27D384C5-1680-4017-8153-5B8323DE3B00}" sibTransId="{E3EB0BF8-5D37-4870-84DE-D7E24C915D0C}"/>
-    <dgm:cxn modelId="{C21BE7E8-3CC2-483A-9678-C8951B7672F9}" type="presOf" srcId="{FD8B56A7-F781-4359-A392-18A5A5EAFD08}" destId="{93E0DD11-107C-4740-A25F-830761CDA98E}" srcOrd="0" destOrd="0" presId="urn:microsoft.com/office/officeart/2005/8/layout/bProcess3"/>
-    <dgm:cxn modelId="{87A66FFD-515D-4FAA-BCC7-200FB8AF4DDA}" type="presOf" srcId="{E2299760-B0D4-404A-9CB9-A58AC28848AC}" destId="{7084BB0B-BD20-429A-A4CD-AD72DF04F99B}" srcOrd="0" destOrd="0" presId="urn:microsoft.com/office/officeart/2005/8/layout/bProcess3"/>
-    <dgm:cxn modelId="{D60E5242-A01B-4F14-BBF5-4650FB424686}" type="presOf" srcId="{66EBE6AC-FFBA-4B21-9CFD-A20A2C50B09C}" destId="{58269705-6462-4062-A853-0836726E2AD2}" srcOrd="0" destOrd="0" presId="urn:microsoft.com/office/officeart/2005/8/layout/bProcess3"/>
-    <dgm:cxn modelId="{9EC1A9F1-CC2C-4077-89D7-505B106C8293}" type="presOf" srcId="{6076BBA9-B7A8-45A9-B3AD-F648D1EE4EF8}" destId="{CBD0AFA0-6BC1-4C32-BF50-B880F7A0B383}" srcOrd="0" destOrd="0" presId="urn:microsoft.com/office/officeart/2005/8/layout/bProcess3"/>
-    <dgm:cxn modelId="{6D89B2A8-2B66-488A-B519-DF0EE62ADA9F}" type="presOf" srcId="{49F5C075-6F91-4534-90EF-1E3C46B7CDAB}" destId="{4564C43D-E089-4EA6-A6B9-ED5CB86087FE}" srcOrd="1" destOrd="0" presId="urn:microsoft.com/office/officeart/2005/8/layout/bProcess3"/>
-    <dgm:cxn modelId="{77C2D4BC-347C-4496-B5DE-04C5EA555C3C}" type="presOf" srcId="{692AF6EC-90A6-4438-B374-6D128451B9C6}" destId="{8F19D433-964C-4295-8103-ED9156835325}" srcOrd="0" destOrd="0" presId="urn:microsoft.com/office/officeart/2005/8/layout/bProcess3"/>
-    <dgm:cxn modelId="{7084DAA2-E59C-4F0A-953C-E99F743B0047}" type="presOf" srcId="{273BCF21-B834-4BE7-BFF2-A3BF8465A53F}" destId="{E953EB40-DE25-40D4-B358-AB78D22BB191}" srcOrd="0" destOrd="0" presId="urn:microsoft.com/office/officeart/2005/8/layout/bProcess3"/>
-    <dgm:cxn modelId="{B4CE57C3-0833-4E62-948B-B57F681CF9C2}" srcId="{1B35C749-0FAC-4633-A54A-2151D01D73E9}" destId="{0BE9A2D8-31BB-4CE9-A3B0-CA3B9F9C68B3}" srcOrd="0" destOrd="0" parTransId="{8F091320-784A-4E72-9A29-F103CA12AD74}" sibTransId="{C5485345-1FEB-4BFA-AE2E-79B532928A84}"/>
-    <dgm:cxn modelId="{372EA098-1D0E-4E3C-86ED-E305A81F6B9E}" type="presOf" srcId="{6076BBA9-B7A8-45A9-B3AD-F648D1EE4EF8}" destId="{6978034D-F608-4659-9128-71F98EC8E58B}" srcOrd="1" destOrd="0" presId="urn:microsoft.com/office/officeart/2005/8/layout/bProcess3"/>
-    <dgm:cxn modelId="{FB539F42-7165-44F7-ACD6-E71482E6640B}" type="presOf" srcId="{5884A237-5755-41CC-8582-8E6C88D4C50A}" destId="{978F40F7-1170-4426-9F6D-C85BB73408CF}" srcOrd="0" destOrd="0" presId="urn:microsoft.com/office/officeart/2005/8/layout/bProcess3"/>
-    <dgm:cxn modelId="{40329A88-E4C3-48DD-AF5C-E1CB3CFCDC6C}" srcId="{1B35C749-0FAC-4633-A54A-2151D01D73E9}" destId="{D771E5F0-E6ED-48C0-8CCD-F931688ADE09}" srcOrd="4" destOrd="0" parTransId="{B6ACB080-9F8C-4A96-A543-131C0A294974}" sibTransId="{50E9E6FB-F2A1-4C3C-8ED0-BAE19D73E35E}"/>
-    <dgm:cxn modelId="{834A9293-829E-4FD6-B337-77CEA740EEAB}" type="presOf" srcId="{0BE9A2D8-31BB-4CE9-A3B0-CA3B9F9C68B3}" destId="{3FE18E05-D30A-4A95-BDA6-AD987600F5DC}" srcOrd="0" destOrd="0" presId="urn:microsoft.com/office/officeart/2005/8/layout/bProcess3"/>
     <dgm:cxn modelId="{75D9CA11-E9D0-439F-8823-A08923390A81}" type="presParOf" srcId="{E06879EE-A190-46AD-92DE-2EF2FC2CE701}" destId="{3FE18E05-D30A-4A95-BDA6-AD987600F5DC}" srcOrd="0" destOrd="0" presId="urn:microsoft.com/office/officeart/2005/8/layout/bProcess3"/>
     <dgm:cxn modelId="{53D9D0D9-7DA2-44EB-8BF1-A6C496A14AE6}" type="presParOf" srcId="{E06879EE-A190-46AD-92DE-2EF2FC2CE701}" destId="{20262314-1671-480A-9E81-70DF05D47B74}" srcOrd="1" destOrd="0" presId="urn:microsoft.com/office/officeart/2005/8/layout/bProcess3"/>
     <dgm:cxn modelId="{05C8DEC3-15DA-445E-9DDC-49076B98B59F}" type="presParOf" srcId="{20262314-1671-480A-9E81-70DF05D47B74}" destId="{D10F74A4-29F7-476A-8333-D5A8AF43CB1C}" srcOrd="0" destOrd="0" presId="urn:microsoft.com/office/officeart/2005/8/layout/bProcess3"/>
@@ -31172,8 +31172,8 @@
               <a:t>Dystrophic </a:t>
             </a:r>
             <a:r>
-              <a:rPr lang="en-US" dirty="0" err="1" smtClean="0"/>
-              <a:t>lasks</a:t>
+              <a:rPr lang="en-US" dirty="0" smtClean="0"/>
+              <a:t>lakes</a:t>
             </a:r>
             <a:endParaRPr lang="en-US" dirty="0"/>
           </a:p>
@@ -33309,11 +33309,7 @@
           <a:p>
             <a:r>
               <a:rPr lang="en-US" dirty="0" smtClean="0"/>
-              <a:t>Zones of </a:t>
-            </a:r>
-            <a:r>
-              <a:rPr lang="en-US" dirty="0" smtClean="0"/>
-              <a:t>Ocean</a:t>
+              <a:t>Zones of Ocean</a:t>
             </a:r>
             <a:endParaRPr lang="en-IN" dirty="0"/>
           </a:p>
@@ -33495,11 +33491,7 @@
             </a:r>
             <a:r>
               <a:rPr lang="en-US" smtClean="0"/>
-              <a:t>of </a:t>
-            </a:r>
-            <a:r>
-              <a:rPr lang="en-US" smtClean="0"/>
-              <a:t>Ocean</a:t>
+              <a:t>of Ocean</a:t>
             </a:r>
             <a:endParaRPr lang="en-IN" dirty="0"/>
           </a:p>

</xml_diff>

<commit_message>
Last Update 30-01-2019 11:46:05.39
</commit_message>
<xml_diff>
--- a/Slides/GE8291-U1.pptx
+++ b/Slides/GE8291-U1.pptx
@@ -5,7 +5,7 @@
     <p:sldMasterId id="2147483648" r:id="rId1"/>
   </p:sldMasterIdLst>
   <p:notesMasterIdLst>
-    <p:notesMasterId r:id="rId93"/>
+    <p:notesMasterId r:id="rId110"/>
   </p:notesMasterIdLst>
   <p:sldIdLst>
     <p:sldId id="256" r:id="rId2"/>
@@ -98,7 +98,24 @@
     <p:sldId id="362" r:id="rId89"/>
     <p:sldId id="363" r:id="rId90"/>
     <p:sldId id="364" r:id="rId91"/>
-    <p:sldId id="272" r:id="rId92"/>
+    <p:sldId id="365" r:id="rId92"/>
+    <p:sldId id="366" r:id="rId93"/>
+    <p:sldId id="368" r:id="rId94"/>
+    <p:sldId id="370" r:id="rId95"/>
+    <p:sldId id="371" r:id="rId96"/>
+    <p:sldId id="373" r:id="rId97"/>
+    <p:sldId id="374" r:id="rId98"/>
+    <p:sldId id="375" r:id="rId99"/>
+    <p:sldId id="376" r:id="rId100"/>
+    <p:sldId id="377" r:id="rId101"/>
+    <p:sldId id="378" r:id="rId102"/>
+    <p:sldId id="379" r:id="rId103"/>
+    <p:sldId id="380" r:id="rId104"/>
+    <p:sldId id="381" r:id="rId105"/>
+    <p:sldId id="382" r:id="rId106"/>
+    <p:sldId id="383" r:id="rId107"/>
+    <p:sldId id="384" r:id="rId108"/>
+    <p:sldId id="272" r:id="rId109"/>
   </p:sldIdLst>
   <p:sldSz cx="9144000" cy="6858000" type="screen4x3"/>
   <p:notesSz cx="6858000" cy="9144000"/>
@@ -7343,37 +7360,37 @@
     </dgm:pt>
   </dgm:ptLst>
   <dgm:cxnLst>
+    <dgm:cxn modelId="{B9C6D9E8-FFAC-4240-ADAB-56D11ECA0C13}" type="presOf" srcId="{49F5C075-6F91-4534-90EF-1E3C46B7CDAB}" destId="{2285F4ED-8377-4AAE-8983-73210395BBEA}" srcOrd="0" destOrd="0" presId="urn:microsoft.com/office/officeart/2005/8/layout/bProcess3"/>
+    <dgm:cxn modelId="{D0869D4A-0CCA-41F3-9DD3-4ED596B06E75}" type="presOf" srcId="{50E9E6FB-F2A1-4C3C-8ED0-BAE19D73E35E}" destId="{2FAA9B58-6B5D-4335-A250-181F004764F0}" srcOrd="1" destOrd="0" presId="urn:microsoft.com/office/officeart/2005/8/layout/bProcess3"/>
+    <dgm:cxn modelId="{FE542C3D-BBB3-4DD3-BF4B-7D402B414457}" type="presOf" srcId="{FD8B56A7-F781-4359-A392-18A5A5EAFD08}" destId="{32D3371C-2473-4D1C-8EEE-C1A1B80CEC07}" srcOrd="1" destOrd="0" presId="urn:microsoft.com/office/officeart/2005/8/layout/bProcess3"/>
+    <dgm:cxn modelId="{2C640B6D-DD5F-4676-A603-F59B381ECD34}" srcId="{1B35C749-0FAC-4633-A54A-2151D01D73E9}" destId="{692AF6EC-90A6-4438-B374-6D128451B9C6}" srcOrd="6" destOrd="0" parTransId="{8CA4902C-7B9F-4296-B079-CF1CDC158965}" sibTransId="{66EBE6AC-FFBA-4B21-9CFD-A20A2C50B09C}"/>
+    <dgm:cxn modelId="{4BFDD7D3-9F7F-4AA8-B0A4-D088A543E3B8}" type="presOf" srcId="{50E9E6FB-F2A1-4C3C-8ED0-BAE19D73E35E}" destId="{AF214629-685D-4AAE-A91E-8FADE0AD143F}" srcOrd="0" destOrd="0" presId="urn:microsoft.com/office/officeart/2005/8/layout/bProcess3"/>
+    <dgm:cxn modelId="{E1EE091C-62ED-4F46-BF54-6B18F1F7092D}" type="presOf" srcId="{5C45A363-7A7A-4FA3-9ECD-B022C15B934E}" destId="{25F3FB88-54D6-425B-AC4E-7DD9E1B1A196}" srcOrd="0" destOrd="0" presId="urn:microsoft.com/office/officeart/2005/8/layout/bProcess3"/>
+    <dgm:cxn modelId="{00B6F532-F45E-48DC-964E-03AF45CCFBB2}" srcId="{1B35C749-0FAC-4633-A54A-2151D01D73E9}" destId="{5884A237-5755-41CC-8582-8E6C88D4C50A}" srcOrd="3" destOrd="0" parTransId="{0F6C4D36-F6CD-463D-A31D-295A670D6E05}" sibTransId="{FD8B56A7-F781-4359-A392-18A5A5EAFD08}"/>
+    <dgm:cxn modelId="{6C8D0457-665F-4F8E-A243-E3F043C576B1}" type="presOf" srcId="{C5485345-1FEB-4BFA-AE2E-79B532928A84}" destId="{20262314-1671-480A-9E81-70DF05D47B74}" srcOrd="0" destOrd="0" presId="urn:microsoft.com/office/officeart/2005/8/layout/bProcess3"/>
+    <dgm:cxn modelId="{07C3D10E-B7BA-4EBB-A2D9-D8A00EF1505A}" type="presOf" srcId="{D904E3A6-6AFE-46A0-8334-D62B7D1609EC}" destId="{9F5AD9FD-D879-4A9C-A91D-4A29D743FF70}" srcOrd="0" destOrd="0" presId="urn:microsoft.com/office/officeart/2005/8/layout/bProcess3"/>
+    <dgm:cxn modelId="{9C2E68D6-AA40-4B78-9B9D-73C3E25E5CD4}" type="presOf" srcId="{5C45A363-7A7A-4FA3-9ECD-B022C15B934E}" destId="{80167E65-E64B-46C6-B4D8-E698702E54E2}" srcOrd="1" destOrd="0" presId="urn:microsoft.com/office/officeart/2005/8/layout/bProcess3"/>
+    <dgm:cxn modelId="{70A2AAEC-B27B-445E-B055-105D2BEECDE6}" type="presOf" srcId="{D771E5F0-E6ED-48C0-8CCD-F931688ADE09}" destId="{CCE20427-E360-40CC-B4B1-9BA59CA86C94}" srcOrd="0" destOrd="0" presId="urn:microsoft.com/office/officeart/2005/8/layout/bProcess3"/>
+    <dgm:cxn modelId="{3E55429E-5B52-4C12-842B-03DB2B2C2AE7}" type="presOf" srcId="{66EBE6AC-FFBA-4B21-9CFD-A20A2C50B09C}" destId="{59843F75-1210-4E69-AB1B-7DBEB2EBD213}" srcOrd="1" destOrd="0" presId="urn:microsoft.com/office/officeart/2005/8/layout/bProcess3"/>
+    <dgm:cxn modelId="{8F0A02C8-CE18-4B8B-BC35-8DBA6204275E}" srcId="{1B35C749-0FAC-4633-A54A-2151D01D73E9}" destId="{273BCF21-B834-4BE7-BFF2-A3BF8465A53F}" srcOrd="2" destOrd="0" parTransId="{6C059FA2-8E71-4FCF-B6BB-E62CBD5637A9}" sibTransId="{49F5C075-6F91-4534-90EF-1E3C46B7CDAB}"/>
+    <dgm:cxn modelId="{72CBB521-2B0B-4FD5-B826-6B9AEE9B14F5}" type="presOf" srcId="{1B35C749-0FAC-4633-A54A-2151D01D73E9}" destId="{E06879EE-A190-46AD-92DE-2EF2FC2CE701}" srcOrd="0" destOrd="0" presId="urn:microsoft.com/office/officeart/2005/8/layout/bProcess3"/>
+    <dgm:cxn modelId="{4F6E135B-6F89-42E9-96A3-465A93FDF0CA}" srcId="{1B35C749-0FAC-4633-A54A-2151D01D73E9}" destId="{E2299760-B0D4-404A-9CB9-A58AC28848AC}" srcOrd="1" destOrd="0" parTransId="{3181CFE7-12C0-4BB7-BF57-420CFADB1DA0}" sibTransId="{6076BBA9-B7A8-45A9-B3AD-F648D1EE4EF8}"/>
+    <dgm:cxn modelId="{0298356F-8751-41D7-9E4D-6CF8A8E2672B}" type="presOf" srcId="{7AFCBDAD-B0CB-4971-B541-3D3D791D477E}" destId="{3D29F44E-3A44-478A-B972-695C660220F9}" srcOrd="0" destOrd="0" presId="urn:microsoft.com/office/officeart/2005/8/layout/bProcess3"/>
+    <dgm:cxn modelId="{83199706-A662-424E-B443-F050CBF5147C}" type="presOf" srcId="{C5485345-1FEB-4BFA-AE2E-79B532928A84}" destId="{D10F74A4-29F7-476A-8333-D5A8AF43CB1C}" srcOrd="1" destOrd="0" presId="urn:microsoft.com/office/officeart/2005/8/layout/bProcess3"/>
+    <dgm:cxn modelId="{55DC005C-8FAE-4756-AFA2-4CCAA32139E3}" srcId="{1B35C749-0FAC-4633-A54A-2151D01D73E9}" destId="{D904E3A6-6AFE-46A0-8334-D62B7D1609EC}" srcOrd="5" destOrd="0" parTransId="{8EE4547C-B4E9-4114-B2E9-A4F3F6370A81}" sibTransId="{5C45A363-7A7A-4FA3-9ECD-B022C15B934E}"/>
+    <dgm:cxn modelId="{27F5D17B-1F57-47AD-BC26-075FD1D1A4D8}" srcId="{1B35C749-0FAC-4633-A54A-2151D01D73E9}" destId="{7AFCBDAD-B0CB-4971-B541-3D3D791D477E}" srcOrd="7" destOrd="0" parTransId="{27D384C5-1680-4017-8153-5B8323DE3B00}" sibTransId="{E3EB0BF8-5D37-4870-84DE-D7E24C915D0C}"/>
+    <dgm:cxn modelId="{C21BE7E8-3CC2-483A-9678-C8951B7672F9}" type="presOf" srcId="{FD8B56A7-F781-4359-A392-18A5A5EAFD08}" destId="{93E0DD11-107C-4740-A25F-830761CDA98E}" srcOrd="0" destOrd="0" presId="urn:microsoft.com/office/officeart/2005/8/layout/bProcess3"/>
+    <dgm:cxn modelId="{87A66FFD-515D-4FAA-BCC7-200FB8AF4DDA}" type="presOf" srcId="{E2299760-B0D4-404A-9CB9-A58AC28848AC}" destId="{7084BB0B-BD20-429A-A4CD-AD72DF04F99B}" srcOrd="0" destOrd="0" presId="urn:microsoft.com/office/officeart/2005/8/layout/bProcess3"/>
+    <dgm:cxn modelId="{D60E5242-A01B-4F14-BBF5-4650FB424686}" type="presOf" srcId="{66EBE6AC-FFBA-4B21-9CFD-A20A2C50B09C}" destId="{58269705-6462-4062-A853-0836726E2AD2}" srcOrd="0" destOrd="0" presId="urn:microsoft.com/office/officeart/2005/8/layout/bProcess3"/>
+    <dgm:cxn modelId="{9EC1A9F1-CC2C-4077-89D7-505B106C8293}" type="presOf" srcId="{6076BBA9-B7A8-45A9-B3AD-F648D1EE4EF8}" destId="{CBD0AFA0-6BC1-4C32-BF50-B880F7A0B383}" srcOrd="0" destOrd="0" presId="urn:microsoft.com/office/officeart/2005/8/layout/bProcess3"/>
     <dgm:cxn modelId="{6D89B2A8-2B66-488A-B519-DF0EE62ADA9F}" type="presOf" srcId="{49F5C075-6F91-4534-90EF-1E3C46B7CDAB}" destId="{4564C43D-E089-4EA6-A6B9-ED5CB86087FE}" srcOrd="1" destOrd="0" presId="urn:microsoft.com/office/officeart/2005/8/layout/bProcess3"/>
-    <dgm:cxn modelId="{D60E5242-A01B-4F14-BBF5-4650FB424686}" type="presOf" srcId="{66EBE6AC-FFBA-4B21-9CFD-A20A2C50B09C}" destId="{58269705-6462-4062-A853-0836726E2AD2}" srcOrd="0" destOrd="0" presId="urn:microsoft.com/office/officeart/2005/8/layout/bProcess3"/>
-    <dgm:cxn modelId="{55DC005C-8FAE-4756-AFA2-4CCAA32139E3}" srcId="{1B35C749-0FAC-4633-A54A-2151D01D73E9}" destId="{D904E3A6-6AFE-46A0-8334-D62B7D1609EC}" srcOrd="5" destOrd="0" parTransId="{8EE4547C-B4E9-4114-B2E9-A4F3F6370A81}" sibTransId="{5C45A363-7A7A-4FA3-9ECD-B022C15B934E}"/>
-    <dgm:cxn modelId="{87A66FFD-515D-4FAA-BCC7-200FB8AF4DDA}" type="presOf" srcId="{E2299760-B0D4-404A-9CB9-A58AC28848AC}" destId="{7084BB0B-BD20-429A-A4CD-AD72DF04F99B}" srcOrd="0" destOrd="0" presId="urn:microsoft.com/office/officeart/2005/8/layout/bProcess3"/>
-    <dgm:cxn modelId="{4BFDD7D3-9F7F-4AA8-B0A4-D088A543E3B8}" type="presOf" srcId="{50E9E6FB-F2A1-4C3C-8ED0-BAE19D73E35E}" destId="{AF214629-685D-4AAE-A91E-8FADE0AD143F}" srcOrd="0" destOrd="0" presId="urn:microsoft.com/office/officeart/2005/8/layout/bProcess3"/>
+    <dgm:cxn modelId="{77C2D4BC-347C-4496-B5DE-04C5EA555C3C}" type="presOf" srcId="{692AF6EC-90A6-4438-B374-6D128451B9C6}" destId="{8F19D433-964C-4295-8103-ED9156835325}" srcOrd="0" destOrd="0" presId="urn:microsoft.com/office/officeart/2005/8/layout/bProcess3"/>
+    <dgm:cxn modelId="{7084DAA2-E59C-4F0A-953C-E99F743B0047}" type="presOf" srcId="{273BCF21-B834-4BE7-BFF2-A3BF8465A53F}" destId="{E953EB40-DE25-40D4-B358-AB78D22BB191}" srcOrd="0" destOrd="0" presId="urn:microsoft.com/office/officeart/2005/8/layout/bProcess3"/>
     <dgm:cxn modelId="{B4CE57C3-0833-4E62-948B-B57F681CF9C2}" srcId="{1B35C749-0FAC-4633-A54A-2151D01D73E9}" destId="{0BE9A2D8-31BB-4CE9-A3B0-CA3B9F9C68B3}" srcOrd="0" destOrd="0" parTransId="{8F091320-784A-4E72-9A29-F103CA12AD74}" sibTransId="{C5485345-1FEB-4BFA-AE2E-79B532928A84}"/>
-    <dgm:cxn modelId="{B9C6D9E8-FFAC-4240-ADAB-56D11ECA0C13}" type="presOf" srcId="{49F5C075-6F91-4534-90EF-1E3C46B7CDAB}" destId="{2285F4ED-8377-4AAE-8983-73210395BBEA}" srcOrd="0" destOrd="0" presId="urn:microsoft.com/office/officeart/2005/8/layout/bProcess3"/>
-    <dgm:cxn modelId="{8F0A02C8-CE18-4B8B-BC35-8DBA6204275E}" srcId="{1B35C749-0FAC-4633-A54A-2151D01D73E9}" destId="{273BCF21-B834-4BE7-BFF2-A3BF8465A53F}" srcOrd="2" destOrd="0" parTransId="{6C059FA2-8E71-4FCF-B6BB-E62CBD5637A9}" sibTransId="{49F5C075-6F91-4534-90EF-1E3C46B7CDAB}"/>
-    <dgm:cxn modelId="{2C640B6D-DD5F-4676-A603-F59B381ECD34}" srcId="{1B35C749-0FAC-4633-A54A-2151D01D73E9}" destId="{692AF6EC-90A6-4438-B374-6D128451B9C6}" srcOrd="6" destOrd="0" parTransId="{8CA4902C-7B9F-4296-B079-CF1CDC158965}" sibTransId="{66EBE6AC-FFBA-4B21-9CFD-A20A2C50B09C}"/>
-    <dgm:cxn modelId="{7084DAA2-E59C-4F0A-953C-E99F743B0047}" type="presOf" srcId="{273BCF21-B834-4BE7-BFF2-A3BF8465A53F}" destId="{E953EB40-DE25-40D4-B358-AB78D22BB191}" srcOrd="0" destOrd="0" presId="urn:microsoft.com/office/officeart/2005/8/layout/bProcess3"/>
-    <dgm:cxn modelId="{9C2E68D6-AA40-4B78-9B9D-73C3E25E5CD4}" type="presOf" srcId="{5C45A363-7A7A-4FA3-9ECD-B022C15B934E}" destId="{80167E65-E64B-46C6-B4D8-E698702E54E2}" srcOrd="1" destOrd="0" presId="urn:microsoft.com/office/officeart/2005/8/layout/bProcess3"/>
-    <dgm:cxn modelId="{3E55429E-5B52-4C12-842B-03DB2B2C2AE7}" type="presOf" srcId="{66EBE6AC-FFBA-4B21-9CFD-A20A2C50B09C}" destId="{59843F75-1210-4E69-AB1B-7DBEB2EBD213}" srcOrd="1" destOrd="0" presId="urn:microsoft.com/office/officeart/2005/8/layout/bProcess3"/>
-    <dgm:cxn modelId="{77C2D4BC-347C-4496-B5DE-04C5EA555C3C}" type="presOf" srcId="{692AF6EC-90A6-4438-B374-6D128451B9C6}" destId="{8F19D433-964C-4295-8103-ED9156835325}" srcOrd="0" destOrd="0" presId="urn:microsoft.com/office/officeart/2005/8/layout/bProcess3"/>
-    <dgm:cxn modelId="{27F5D17B-1F57-47AD-BC26-075FD1D1A4D8}" srcId="{1B35C749-0FAC-4633-A54A-2151D01D73E9}" destId="{7AFCBDAD-B0CB-4971-B541-3D3D791D477E}" srcOrd="7" destOrd="0" parTransId="{27D384C5-1680-4017-8153-5B8323DE3B00}" sibTransId="{E3EB0BF8-5D37-4870-84DE-D7E24C915D0C}"/>
-    <dgm:cxn modelId="{FE542C3D-BBB3-4DD3-BF4B-7D402B414457}" type="presOf" srcId="{FD8B56A7-F781-4359-A392-18A5A5EAFD08}" destId="{32D3371C-2473-4D1C-8EEE-C1A1B80CEC07}" srcOrd="1" destOrd="0" presId="urn:microsoft.com/office/officeart/2005/8/layout/bProcess3"/>
+    <dgm:cxn modelId="{372EA098-1D0E-4E3C-86ED-E305A81F6B9E}" type="presOf" srcId="{6076BBA9-B7A8-45A9-B3AD-F648D1EE4EF8}" destId="{6978034D-F608-4659-9128-71F98EC8E58B}" srcOrd="1" destOrd="0" presId="urn:microsoft.com/office/officeart/2005/8/layout/bProcess3"/>
+    <dgm:cxn modelId="{FB539F42-7165-44F7-ACD6-E71482E6640B}" type="presOf" srcId="{5884A237-5755-41CC-8582-8E6C88D4C50A}" destId="{978F40F7-1170-4426-9F6D-C85BB73408CF}" srcOrd="0" destOrd="0" presId="urn:microsoft.com/office/officeart/2005/8/layout/bProcess3"/>
     <dgm:cxn modelId="{40329A88-E4C3-48DD-AF5C-E1CB3CFCDC6C}" srcId="{1B35C749-0FAC-4633-A54A-2151D01D73E9}" destId="{D771E5F0-E6ED-48C0-8CCD-F931688ADE09}" srcOrd="4" destOrd="0" parTransId="{B6ACB080-9F8C-4A96-A543-131C0A294974}" sibTransId="{50E9E6FB-F2A1-4C3C-8ED0-BAE19D73E35E}"/>
-    <dgm:cxn modelId="{83199706-A662-424E-B443-F050CBF5147C}" type="presOf" srcId="{C5485345-1FEB-4BFA-AE2E-79B532928A84}" destId="{D10F74A4-29F7-476A-8333-D5A8AF43CB1C}" srcOrd="1" destOrd="0" presId="urn:microsoft.com/office/officeart/2005/8/layout/bProcess3"/>
-    <dgm:cxn modelId="{70A2AAEC-B27B-445E-B055-105D2BEECDE6}" type="presOf" srcId="{D771E5F0-E6ED-48C0-8CCD-F931688ADE09}" destId="{CCE20427-E360-40CC-B4B1-9BA59CA86C94}" srcOrd="0" destOrd="0" presId="urn:microsoft.com/office/officeart/2005/8/layout/bProcess3"/>
     <dgm:cxn modelId="{834A9293-829E-4FD6-B337-77CEA740EEAB}" type="presOf" srcId="{0BE9A2D8-31BB-4CE9-A3B0-CA3B9F9C68B3}" destId="{3FE18E05-D30A-4A95-BDA6-AD987600F5DC}" srcOrd="0" destOrd="0" presId="urn:microsoft.com/office/officeart/2005/8/layout/bProcess3"/>
-    <dgm:cxn modelId="{E1EE091C-62ED-4F46-BF54-6B18F1F7092D}" type="presOf" srcId="{5C45A363-7A7A-4FA3-9ECD-B022C15B934E}" destId="{25F3FB88-54D6-425B-AC4E-7DD9E1B1A196}" srcOrd="0" destOrd="0" presId="urn:microsoft.com/office/officeart/2005/8/layout/bProcess3"/>
-    <dgm:cxn modelId="{D0869D4A-0CCA-41F3-9DD3-4ED596B06E75}" type="presOf" srcId="{50E9E6FB-F2A1-4C3C-8ED0-BAE19D73E35E}" destId="{2FAA9B58-6B5D-4335-A250-181F004764F0}" srcOrd="1" destOrd="0" presId="urn:microsoft.com/office/officeart/2005/8/layout/bProcess3"/>
-    <dgm:cxn modelId="{0298356F-8751-41D7-9E4D-6CF8A8E2672B}" type="presOf" srcId="{7AFCBDAD-B0CB-4971-B541-3D3D791D477E}" destId="{3D29F44E-3A44-478A-B972-695C660220F9}" srcOrd="0" destOrd="0" presId="urn:microsoft.com/office/officeart/2005/8/layout/bProcess3"/>
-    <dgm:cxn modelId="{07C3D10E-B7BA-4EBB-A2D9-D8A00EF1505A}" type="presOf" srcId="{D904E3A6-6AFE-46A0-8334-D62B7D1609EC}" destId="{9F5AD9FD-D879-4A9C-A91D-4A29D743FF70}" srcOrd="0" destOrd="0" presId="urn:microsoft.com/office/officeart/2005/8/layout/bProcess3"/>
-    <dgm:cxn modelId="{FB539F42-7165-44F7-ACD6-E71482E6640B}" type="presOf" srcId="{5884A237-5755-41CC-8582-8E6C88D4C50A}" destId="{978F40F7-1170-4426-9F6D-C85BB73408CF}" srcOrd="0" destOrd="0" presId="urn:microsoft.com/office/officeart/2005/8/layout/bProcess3"/>
-    <dgm:cxn modelId="{00B6F532-F45E-48DC-964E-03AF45CCFBB2}" srcId="{1B35C749-0FAC-4633-A54A-2151D01D73E9}" destId="{5884A237-5755-41CC-8582-8E6C88D4C50A}" srcOrd="3" destOrd="0" parTransId="{0F6C4D36-F6CD-463D-A31D-295A670D6E05}" sibTransId="{FD8B56A7-F781-4359-A392-18A5A5EAFD08}"/>
-    <dgm:cxn modelId="{72CBB521-2B0B-4FD5-B826-6B9AEE9B14F5}" type="presOf" srcId="{1B35C749-0FAC-4633-A54A-2151D01D73E9}" destId="{E06879EE-A190-46AD-92DE-2EF2FC2CE701}" srcOrd="0" destOrd="0" presId="urn:microsoft.com/office/officeart/2005/8/layout/bProcess3"/>
-    <dgm:cxn modelId="{C21BE7E8-3CC2-483A-9678-C8951B7672F9}" type="presOf" srcId="{FD8B56A7-F781-4359-A392-18A5A5EAFD08}" destId="{93E0DD11-107C-4740-A25F-830761CDA98E}" srcOrd="0" destOrd="0" presId="urn:microsoft.com/office/officeart/2005/8/layout/bProcess3"/>
-    <dgm:cxn modelId="{6C8D0457-665F-4F8E-A243-E3F043C576B1}" type="presOf" srcId="{C5485345-1FEB-4BFA-AE2E-79B532928A84}" destId="{20262314-1671-480A-9E81-70DF05D47B74}" srcOrd="0" destOrd="0" presId="urn:microsoft.com/office/officeart/2005/8/layout/bProcess3"/>
-    <dgm:cxn modelId="{372EA098-1D0E-4E3C-86ED-E305A81F6B9E}" type="presOf" srcId="{6076BBA9-B7A8-45A9-B3AD-F648D1EE4EF8}" destId="{6978034D-F608-4659-9128-71F98EC8E58B}" srcOrd="1" destOrd="0" presId="urn:microsoft.com/office/officeart/2005/8/layout/bProcess3"/>
-    <dgm:cxn modelId="{9EC1A9F1-CC2C-4077-89D7-505B106C8293}" type="presOf" srcId="{6076BBA9-B7A8-45A9-B3AD-F648D1EE4EF8}" destId="{CBD0AFA0-6BC1-4C32-BF50-B880F7A0B383}" srcOrd="0" destOrd="0" presId="urn:microsoft.com/office/officeart/2005/8/layout/bProcess3"/>
-    <dgm:cxn modelId="{4F6E135B-6F89-42E9-96A3-465A93FDF0CA}" srcId="{1B35C749-0FAC-4633-A54A-2151D01D73E9}" destId="{E2299760-B0D4-404A-9CB9-A58AC28848AC}" srcOrd="1" destOrd="0" parTransId="{3181CFE7-12C0-4BB7-BF57-420CFADB1DA0}" sibTransId="{6076BBA9-B7A8-45A9-B3AD-F648D1EE4EF8}"/>
     <dgm:cxn modelId="{75D9CA11-E9D0-439F-8823-A08923390A81}" type="presParOf" srcId="{E06879EE-A190-46AD-92DE-2EF2FC2CE701}" destId="{3FE18E05-D30A-4A95-BDA6-AD987600F5DC}" srcOrd="0" destOrd="0" presId="urn:microsoft.com/office/officeart/2005/8/layout/bProcess3"/>
     <dgm:cxn modelId="{53D9D0D9-7DA2-44EB-8BF1-A6C496A14AE6}" type="presParOf" srcId="{E06879EE-A190-46AD-92DE-2EF2FC2CE701}" destId="{20262314-1671-480A-9E81-70DF05D47B74}" srcOrd="1" destOrd="0" presId="urn:microsoft.com/office/officeart/2005/8/layout/bProcess3"/>
     <dgm:cxn modelId="{05C8DEC3-15DA-445E-9DDC-49076B98B59F}" type="presParOf" srcId="{20262314-1671-480A-9E81-70DF05D47B74}" destId="{D10F74A4-29F7-476A-8333-D5A8AF43CB1C}" srcOrd="0" destOrd="0" presId="urn:microsoft.com/office/officeart/2005/8/layout/bProcess3"/>
@@ -19287,7 +19304,7 @@
             <a:fld id="{9515075B-F3F0-4441-A1BD-B7B515B708FF}" type="datetimeFigureOut">
               <a:rPr lang="en-US" smtClean="0"/>
               <a:pPr/>
-              <a:t>12/27/2018</a:t>
+              <a:t>1/18/2019</a:t>
             </a:fld>
             <a:endParaRPr lang="en-US"/>
           </a:p>
@@ -19759,7 +19776,7 @@
             <a:fld id="{6E658DF8-B8C0-4C7F-85EB-B53A2DDD44A9}" type="datetimeFigureOut">
               <a:rPr lang="en-US" smtClean="0"/>
               <a:pPr/>
-              <a:t>12/27/2018</a:t>
+              <a:t>1/18/2019</a:t>
             </a:fld>
             <a:endParaRPr lang="en-US"/>
           </a:p>
@@ -19926,7 +19943,7 @@
             <a:fld id="{6E658DF8-B8C0-4C7F-85EB-B53A2DDD44A9}" type="datetimeFigureOut">
               <a:rPr lang="en-US" smtClean="0"/>
               <a:pPr/>
-              <a:t>12/27/2018</a:t>
+              <a:t>1/18/2019</a:t>
             </a:fld>
             <a:endParaRPr lang="en-US"/>
           </a:p>
@@ -20103,7 +20120,7 @@
             <a:fld id="{6E658DF8-B8C0-4C7F-85EB-B53A2DDD44A9}" type="datetimeFigureOut">
               <a:rPr lang="en-US" smtClean="0"/>
               <a:pPr/>
-              <a:t>12/27/2018</a:t>
+              <a:t>1/18/2019</a:t>
             </a:fld>
             <a:endParaRPr lang="en-US"/>
           </a:p>
@@ -20302,7 +20319,7 @@
             <a:fld id="{6E658DF8-B8C0-4C7F-85EB-B53A2DDD44A9}" type="datetimeFigureOut">
               <a:rPr lang="en-US" smtClean="0"/>
               <a:pPr/>
-              <a:t>12/27/2018</a:t>
+              <a:t>1/18/2019</a:t>
             </a:fld>
             <a:endParaRPr lang="en-US"/>
           </a:p>
@@ -20545,7 +20562,7 @@
             <a:fld id="{6E658DF8-B8C0-4C7F-85EB-B53A2DDD44A9}" type="datetimeFigureOut">
               <a:rPr lang="en-US" smtClean="0"/>
               <a:pPr/>
-              <a:t>12/27/2018</a:t>
+              <a:t>1/18/2019</a:t>
             </a:fld>
             <a:endParaRPr lang="en-US"/>
           </a:p>
@@ -20830,7 +20847,7 @@
             <a:fld id="{6E658DF8-B8C0-4C7F-85EB-B53A2DDD44A9}" type="datetimeFigureOut">
               <a:rPr lang="en-US" smtClean="0"/>
               <a:pPr/>
-              <a:t>12/27/2018</a:t>
+              <a:t>1/18/2019</a:t>
             </a:fld>
             <a:endParaRPr lang="en-US"/>
           </a:p>
@@ -21249,7 +21266,7 @@
             <a:fld id="{6E658DF8-B8C0-4C7F-85EB-B53A2DDD44A9}" type="datetimeFigureOut">
               <a:rPr lang="en-US" smtClean="0"/>
               <a:pPr/>
-              <a:t>12/27/2018</a:t>
+              <a:t>1/18/2019</a:t>
             </a:fld>
             <a:endParaRPr lang="en-US"/>
           </a:p>
@@ -21364,7 +21381,7 @@
             <a:fld id="{6E658DF8-B8C0-4C7F-85EB-B53A2DDD44A9}" type="datetimeFigureOut">
               <a:rPr lang="en-US" smtClean="0"/>
               <a:pPr/>
-              <a:t>12/27/2018</a:t>
+              <a:t>1/18/2019</a:t>
             </a:fld>
             <a:endParaRPr lang="en-US"/>
           </a:p>
@@ -21456,7 +21473,7 @@
             <a:fld id="{6E658DF8-B8C0-4C7F-85EB-B53A2DDD44A9}" type="datetimeFigureOut">
               <a:rPr lang="en-US" smtClean="0"/>
               <a:pPr/>
-              <a:t>12/27/2018</a:t>
+              <a:t>1/18/2019</a:t>
             </a:fld>
             <a:endParaRPr lang="en-US"/>
           </a:p>
@@ -21730,7 +21747,7 @@
             <a:fld id="{6E658DF8-B8C0-4C7F-85EB-B53A2DDD44A9}" type="datetimeFigureOut">
               <a:rPr lang="en-US" smtClean="0"/>
               <a:pPr/>
-              <a:t>12/27/2018</a:t>
+              <a:t>1/18/2019</a:t>
             </a:fld>
             <a:endParaRPr lang="en-US"/>
           </a:p>
@@ -21984,7 +22001,7 @@
             <a:fld id="{6E658DF8-B8C0-4C7F-85EB-B53A2DDD44A9}" type="datetimeFigureOut">
               <a:rPr lang="en-US" smtClean="0"/>
               <a:pPr/>
-              <a:t>12/27/2018</a:t>
+              <a:t>1/18/2019</a:t>
             </a:fld>
             <a:endParaRPr lang="en-US"/>
           </a:p>
@@ -22206,7 +22223,7 @@
             <a:fld id="{6E658DF8-B8C0-4C7F-85EB-B53A2DDD44A9}" type="datetimeFigureOut">
               <a:rPr lang="en-US" smtClean="0"/>
               <a:pPr/>
-              <a:t>12/27/2018</a:t>
+              <a:t>1/18/2019</a:t>
             </a:fld>
             <a:endParaRPr lang="en-US"/>
           </a:p>
@@ -22911,6 +22928,1459 @@
   <p:clrMapOvr>
     <a:masterClrMapping/>
   </p:clrMapOvr>
+</p:sld>
+</file>
+
+<file path=ppt/slides/slide100.xml><?xml version="1.0" encoding="utf-8"?>
+<p:sld xmlns:a="http://schemas.openxmlformats.org/drawingml/2006/main" xmlns:r="http://schemas.openxmlformats.org/officeDocument/2006/relationships" xmlns:p="http://schemas.openxmlformats.org/presentationml/2006/main">
+  <p:cSld>
+    <p:spTree>
+      <p:nvGrpSpPr>
+        <p:cNvPr id="1" name=""/>
+        <p:cNvGrpSpPr/>
+        <p:nvPr/>
+      </p:nvGrpSpPr>
+      <p:grpSpPr>
+        <a:xfrm>
+          <a:off x="0" y="0"/>
+          <a:ext cx="0" cy="0"/>
+          <a:chOff x="0" y="0"/>
+          <a:chExt cx="0" cy="0"/>
+        </a:xfrm>
+      </p:grpSpPr>
+      <p:sp>
+        <p:nvSpPr>
+          <p:cNvPr id="2" name="Title 1"/>
+          <p:cNvSpPr>
+            <a:spLocks noGrp="1"/>
+          </p:cNvSpPr>
+          <p:nvPr>
+            <p:ph type="title"/>
+          </p:nvPr>
+        </p:nvSpPr>
+        <p:spPr/>
+        <p:txBody>
+          <a:bodyPr/>
+          <a:lstStyle/>
+          <a:p>
+            <a:r>
+              <a:rPr lang="en-IN" smtClean="0"/>
+              <a:t>Biodiversity National </a:t>
+            </a:r>
+            <a:r>
+              <a:rPr lang="en-IN" dirty="0" smtClean="0"/>
+              <a:t>Level</a:t>
+            </a:r>
+            <a:endParaRPr lang="en-IN" dirty="0"/>
+          </a:p>
+        </p:txBody>
+      </p:sp>
+      <p:sp>
+        <p:nvSpPr>
+          <p:cNvPr id="3" name="Content Placeholder 2"/>
+          <p:cNvSpPr>
+            <a:spLocks noGrp="1"/>
+          </p:cNvSpPr>
+          <p:nvPr>
+            <p:ph idx="1"/>
+          </p:nvPr>
+        </p:nvSpPr>
+        <p:spPr/>
+        <p:txBody>
+          <a:bodyPr/>
+          <a:lstStyle/>
+          <a:p>
+            <a:r>
+              <a:rPr lang="en-IN" dirty="0" smtClean="0"/>
+              <a:t>India is 2</a:t>
+            </a:r>
+            <a:r>
+              <a:rPr lang="en-IN" baseline="30000" dirty="0" smtClean="0"/>
+              <a:t>nd</a:t>
+            </a:r>
+            <a:r>
+              <a:rPr lang="en-IN" dirty="0" smtClean="0"/>
+              <a:t> largest country conations 5% of worlds biodiversity and 2% of earth surface.</a:t>
+            </a:r>
+          </a:p>
+          <a:p>
+            <a:r>
+              <a:rPr lang="en-IN" dirty="0" smtClean="0"/>
+              <a:t>Rank of India</a:t>
+            </a:r>
+          </a:p>
+          <a:p>
+            <a:pPr lvl="1"/>
+            <a:r>
+              <a:rPr lang="en-IN" dirty="0" smtClean="0"/>
+              <a:t>10</a:t>
+            </a:r>
+            <a:r>
+              <a:rPr lang="en-IN" baseline="30000" dirty="0" smtClean="0"/>
+              <a:t>th</a:t>
+            </a:r>
+            <a:r>
+              <a:rPr lang="en-IN" dirty="0" smtClean="0"/>
+              <a:t> in plant rich countries.</a:t>
+            </a:r>
+            <a:endParaRPr lang="en-IN" dirty="0"/>
+          </a:p>
+          <a:p>
+            <a:pPr lvl="1"/>
+            <a:r>
+              <a:rPr lang="en-IN" dirty="0" smtClean="0"/>
+              <a:t>11</a:t>
+            </a:r>
+            <a:r>
+              <a:rPr lang="en-IN" baseline="30000" dirty="0" smtClean="0"/>
+              <a:t>th</a:t>
+            </a:r>
+            <a:r>
+              <a:rPr lang="en-IN" dirty="0" smtClean="0"/>
+              <a:t> in endemic species of higher vertebrates.</a:t>
+            </a:r>
+          </a:p>
+          <a:p>
+            <a:pPr lvl="1"/>
+            <a:r>
+              <a:rPr lang="en-IN" dirty="0" smtClean="0"/>
+              <a:t>6</a:t>
+            </a:r>
+            <a:r>
+              <a:rPr lang="en-IN" baseline="30000" dirty="0" smtClean="0"/>
+              <a:t>th</a:t>
+            </a:r>
+            <a:r>
+              <a:rPr lang="en-IN" dirty="0" smtClean="0"/>
+              <a:t> in centres of biodiversity and origin of agricultural crops.</a:t>
+            </a:r>
+          </a:p>
+          <a:p>
+            <a:pPr lvl="1"/>
+            <a:r>
+              <a:rPr lang="en-IN" dirty="0" smtClean="0"/>
+              <a:t>10</a:t>
+            </a:r>
+            <a:r>
+              <a:rPr lang="en-IN" baseline="30000" dirty="0" smtClean="0"/>
+              <a:t>th</a:t>
+            </a:r>
+            <a:r>
+              <a:rPr lang="en-IN" dirty="0" smtClean="0"/>
+              <a:t> rank in diversity of mammals.</a:t>
+            </a:r>
+          </a:p>
+          <a:p>
+            <a:endParaRPr lang="en-IN" dirty="0"/>
+          </a:p>
+        </p:txBody>
+      </p:sp>
+    </p:spTree>
+    <p:extLst>
+      <p:ext uri="{BB962C8B-B14F-4D97-AF65-F5344CB8AC3E}">
+        <p14:creationId xmlns:p14="http://schemas.microsoft.com/office/powerpoint/2010/main" val="2434090944"/>
+      </p:ext>
+    </p:extLst>
+  </p:cSld>
+  <p:clrMapOvr>
+    <a:masterClrMapping/>
+  </p:clrMapOvr>
+</p:sld>
+</file>
+
+<file path=ppt/slides/slide101.xml><?xml version="1.0" encoding="utf-8"?>
+<p:sld xmlns:a="http://schemas.openxmlformats.org/drawingml/2006/main" xmlns:r="http://schemas.openxmlformats.org/officeDocument/2006/relationships" xmlns:p="http://schemas.openxmlformats.org/presentationml/2006/main">
+  <p:cSld>
+    <p:spTree>
+      <p:nvGrpSpPr>
+        <p:cNvPr id="1" name=""/>
+        <p:cNvGrpSpPr/>
+        <p:nvPr/>
+      </p:nvGrpSpPr>
+      <p:grpSpPr>
+        <a:xfrm>
+          <a:off x="0" y="0"/>
+          <a:ext cx="0" cy="0"/>
+          <a:chOff x="0" y="0"/>
+          <a:chExt cx="0" cy="0"/>
+        </a:xfrm>
+      </p:grpSpPr>
+      <p:sp>
+        <p:nvSpPr>
+          <p:cNvPr id="2" name="Title 1"/>
+          <p:cNvSpPr>
+            <a:spLocks noGrp="1"/>
+          </p:cNvSpPr>
+          <p:nvPr>
+            <p:ph type="title"/>
+          </p:nvPr>
+        </p:nvSpPr>
+        <p:spPr/>
+        <p:txBody>
+          <a:bodyPr/>
+          <a:lstStyle/>
+          <a:p>
+            <a:r>
+              <a:rPr lang="en-IN" dirty="0" smtClean="0"/>
+              <a:t>India as a Mega Diversity Nation</a:t>
+            </a:r>
+            <a:endParaRPr lang="en-IN" dirty="0"/>
+          </a:p>
+        </p:txBody>
+      </p:sp>
+      <p:sp>
+        <p:nvSpPr>
+          <p:cNvPr id="3" name="Content Placeholder 2"/>
+          <p:cNvSpPr>
+            <a:spLocks noGrp="1"/>
+          </p:cNvSpPr>
+          <p:nvPr>
+            <p:ph idx="1"/>
+          </p:nvPr>
+        </p:nvSpPr>
+        <p:spPr/>
+        <p:txBody>
+          <a:bodyPr>
+            <a:normAutofit lnSpcReduction="10000"/>
+          </a:bodyPr>
+          <a:lstStyle/>
+          <a:p>
+            <a:r>
+              <a:rPr lang="en-IN" dirty="0" smtClean="0"/>
+              <a:t>It is 12 mega countries in the world.</a:t>
+            </a:r>
+          </a:p>
+          <a:p>
+            <a:r>
+              <a:rPr lang="en-IN" dirty="0" smtClean="0"/>
+              <a:t>Rare species</a:t>
+            </a:r>
+          </a:p>
+          <a:p>
+            <a:pPr lvl="1"/>
+            <a:r>
+              <a:rPr lang="en-IN" dirty="0" smtClean="0"/>
+              <a:t>Bengal Tiger</a:t>
+            </a:r>
+          </a:p>
+          <a:p>
+            <a:pPr lvl="1"/>
+            <a:r>
+              <a:rPr lang="en-IN" dirty="0" smtClean="0"/>
+              <a:t>Indian Elephant</a:t>
+            </a:r>
+          </a:p>
+          <a:p>
+            <a:pPr lvl="1"/>
+            <a:r>
+              <a:rPr lang="en-IN" dirty="0" smtClean="0"/>
+              <a:t>Asian lion of </a:t>
+            </a:r>
+            <a:r>
+              <a:rPr lang="en-IN" dirty="0" err="1" smtClean="0"/>
+              <a:t>Gir</a:t>
+            </a:r>
+            <a:endParaRPr lang="en-IN" dirty="0"/>
+          </a:p>
+          <a:p>
+            <a:pPr lvl="1"/>
+            <a:r>
+              <a:rPr lang="en-IN" dirty="0" smtClean="0"/>
+              <a:t>50,000 species of insects.</a:t>
+            </a:r>
+          </a:p>
+          <a:p>
+            <a:pPr lvl="1"/>
+            <a:r>
+              <a:rPr lang="en-IN" dirty="0" smtClean="0"/>
+              <a:t>13,000 butterflies and moths.</a:t>
+            </a:r>
+          </a:p>
+          <a:p>
+            <a:pPr lvl="1"/>
+            <a:r>
+              <a:rPr lang="en-IN" dirty="0" smtClean="0"/>
+              <a:t>18% plants of endemic</a:t>
+            </a:r>
+          </a:p>
+          <a:p>
+            <a:pPr lvl="1"/>
+            <a:r>
+              <a:rPr lang="en-IN" dirty="0" smtClean="0"/>
+              <a:t>50% of lizard are endemic </a:t>
+            </a:r>
+            <a:endParaRPr lang="en-IN" dirty="0"/>
+          </a:p>
+        </p:txBody>
+      </p:sp>
+    </p:spTree>
+    <p:extLst>
+      <p:ext uri="{BB962C8B-B14F-4D97-AF65-F5344CB8AC3E}">
+        <p14:creationId xmlns:p14="http://schemas.microsoft.com/office/powerpoint/2010/main" val="2698481826"/>
+      </p:ext>
+    </p:extLst>
+  </p:cSld>
+  <p:clrMapOvr>
+    <a:masterClrMapping/>
+  </p:clrMapOvr>
+</p:sld>
+</file>
+
+<file path=ppt/slides/slide102.xml><?xml version="1.0" encoding="utf-8"?>
+<p:sld xmlns:a="http://schemas.openxmlformats.org/drawingml/2006/main" xmlns:r="http://schemas.openxmlformats.org/officeDocument/2006/relationships" xmlns:p="http://schemas.openxmlformats.org/presentationml/2006/main">
+  <p:cSld>
+    <p:spTree>
+      <p:nvGrpSpPr>
+        <p:cNvPr id="1" name=""/>
+        <p:cNvGrpSpPr/>
+        <p:nvPr/>
+      </p:nvGrpSpPr>
+      <p:grpSpPr>
+        <a:xfrm>
+          <a:off x="0" y="0"/>
+          <a:ext cx="0" cy="0"/>
+          <a:chOff x="0" y="0"/>
+          <a:chExt cx="0" cy="0"/>
+        </a:xfrm>
+      </p:grpSpPr>
+      <p:sp>
+        <p:nvSpPr>
+          <p:cNvPr id="2" name="Title 1"/>
+          <p:cNvSpPr>
+            <a:spLocks noGrp="1"/>
+          </p:cNvSpPr>
+          <p:nvPr>
+            <p:ph type="title"/>
+          </p:nvPr>
+        </p:nvSpPr>
+        <p:spPr/>
+        <p:txBody>
+          <a:bodyPr/>
+          <a:lstStyle/>
+          <a:p>
+            <a:r>
+              <a:rPr lang="en-IN" dirty="0" smtClean="0"/>
+              <a:t>India as a Mega Diversity Nation</a:t>
+            </a:r>
+            <a:endParaRPr lang="en-IN" dirty="0"/>
+          </a:p>
+        </p:txBody>
+      </p:sp>
+      <p:sp>
+        <p:nvSpPr>
+          <p:cNvPr id="3" name="Content Placeholder 2"/>
+          <p:cNvSpPr>
+            <a:spLocks noGrp="1"/>
+          </p:cNvSpPr>
+          <p:nvPr>
+            <p:ph idx="1"/>
+          </p:nvPr>
+        </p:nvSpPr>
+        <p:spPr/>
+        <p:txBody>
+          <a:bodyPr>
+            <a:normAutofit fontScale="92500" lnSpcReduction="10000"/>
+          </a:bodyPr>
+          <a:lstStyle/>
+          <a:p>
+            <a:r>
+              <a:rPr lang="en-IN" b="1" i="1" dirty="0" smtClean="0"/>
+              <a:t>India has</a:t>
+            </a:r>
+          </a:p>
+          <a:p>
+            <a:pPr lvl="1"/>
+            <a:r>
+              <a:rPr lang="en-IN" dirty="0" smtClean="0"/>
+              <a:t>5 world heritage sites</a:t>
+            </a:r>
+          </a:p>
+          <a:p>
+            <a:pPr lvl="1"/>
+            <a:r>
+              <a:rPr lang="en-IN" dirty="0" smtClean="0"/>
+              <a:t>12 biosphere reserves</a:t>
+            </a:r>
+          </a:p>
+          <a:p>
+            <a:pPr lvl="1"/>
+            <a:r>
+              <a:rPr lang="en-IN" dirty="0" smtClean="0"/>
+              <a:t>6 </a:t>
+            </a:r>
+            <a:r>
+              <a:rPr lang="en-IN" dirty="0" err="1" smtClean="0"/>
+              <a:t>ramsar</a:t>
+            </a:r>
+            <a:r>
+              <a:rPr lang="en-IN" dirty="0" smtClean="0"/>
+              <a:t> wetlands</a:t>
+            </a:r>
+          </a:p>
+          <a:p>
+            <a:pPr lvl="1"/>
+            <a:r>
+              <a:rPr lang="en-IN" dirty="0" smtClean="0"/>
+              <a:t>27 indigenous breeds of cattle</a:t>
+            </a:r>
+          </a:p>
+          <a:p>
+            <a:pPr lvl="1"/>
+            <a:r>
+              <a:rPr lang="en-IN" dirty="0" smtClean="0"/>
+              <a:t>40 breeds of sheep</a:t>
+            </a:r>
+          </a:p>
+          <a:p>
+            <a:pPr lvl="1"/>
+            <a:r>
+              <a:rPr lang="en-IN" dirty="0" smtClean="0"/>
+              <a:t>22 breeds of goats</a:t>
+            </a:r>
+          </a:p>
+          <a:p>
+            <a:pPr lvl="1"/>
+            <a:r>
+              <a:rPr lang="en-IN" dirty="0" smtClean="0"/>
+              <a:t>8 breeds of buffaloes</a:t>
+            </a:r>
+            <a:endParaRPr lang="en-IN" dirty="0"/>
+          </a:p>
+          <a:p>
+            <a:pPr lvl="1"/>
+            <a:r>
+              <a:rPr lang="en-IN" dirty="0" smtClean="0"/>
+              <a:t>89 national parks</a:t>
+            </a:r>
+          </a:p>
+          <a:p>
+            <a:pPr lvl="1"/>
+            <a:r>
+              <a:rPr lang="en-IN" dirty="0" smtClean="0"/>
+              <a:t>497 sanctuaries</a:t>
+            </a:r>
+          </a:p>
+          <a:p>
+            <a:pPr lvl="1"/>
+            <a:endParaRPr lang="en-IN" dirty="0" smtClean="0"/>
+          </a:p>
+          <a:p>
+            <a:pPr lvl="1"/>
+            <a:endParaRPr lang="en-IN" dirty="0"/>
+          </a:p>
+        </p:txBody>
+      </p:sp>
+    </p:spTree>
+    <p:extLst>
+      <p:ext uri="{BB962C8B-B14F-4D97-AF65-F5344CB8AC3E}">
+        <p14:creationId xmlns:p14="http://schemas.microsoft.com/office/powerpoint/2010/main" val="218290988"/>
+      </p:ext>
+    </p:extLst>
+  </p:cSld>
+  <p:clrMapOvr>
+    <a:masterClrMapping/>
+  </p:clrMapOvr>
+</p:sld>
+</file>
+
+<file path=ppt/slides/slide103.xml><?xml version="1.0" encoding="utf-8"?>
+<p:sld xmlns:a="http://schemas.openxmlformats.org/drawingml/2006/main" xmlns:r="http://schemas.openxmlformats.org/officeDocument/2006/relationships" xmlns:p="http://schemas.openxmlformats.org/presentationml/2006/main">
+  <p:cSld>
+    <p:spTree>
+      <p:nvGrpSpPr>
+        <p:cNvPr id="1" name=""/>
+        <p:cNvGrpSpPr/>
+        <p:nvPr/>
+      </p:nvGrpSpPr>
+      <p:grpSpPr>
+        <a:xfrm>
+          <a:off x="0" y="0"/>
+          <a:ext cx="0" cy="0"/>
+          <a:chOff x="0" y="0"/>
+          <a:chExt cx="0" cy="0"/>
+        </a:xfrm>
+      </p:grpSpPr>
+      <p:sp>
+        <p:nvSpPr>
+          <p:cNvPr id="2" name="Title 1"/>
+          <p:cNvSpPr>
+            <a:spLocks noGrp="1"/>
+          </p:cNvSpPr>
+          <p:nvPr>
+            <p:ph type="title"/>
+          </p:nvPr>
+        </p:nvSpPr>
+        <p:spPr/>
+        <p:txBody>
+          <a:bodyPr/>
+          <a:lstStyle/>
+          <a:p>
+            <a:r>
+              <a:rPr lang="en-IN" dirty="0" smtClean="0"/>
+              <a:t>Hot spots of Biodiversity</a:t>
+            </a:r>
+            <a:endParaRPr lang="en-IN" dirty="0"/>
+          </a:p>
+        </p:txBody>
+      </p:sp>
+      <p:sp>
+        <p:nvSpPr>
+          <p:cNvPr id="3" name="Content Placeholder 2"/>
+          <p:cNvSpPr>
+            <a:spLocks noGrp="1"/>
+          </p:cNvSpPr>
+          <p:nvPr>
+            <p:ph idx="1"/>
+          </p:nvPr>
+        </p:nvSpPr>
+        <p:spPr/>
+        <p:txBody>
+          <a:bodyPr/>
+          <a:lstStyle/>
+          <a:p>
+            <a:r>
+              <a:rPr lang="en-IN" b="1" i="1" dirty="0" smtClean="0"/>
+              <a:t>Endemic Species</a:t>
+            </a:r>
+          </a:p>
+          <a:p>
+            <a:pPr lvl="1"/>
+            <a:r>
+              <a:rPr lang="en-US" b="1" dirty="0"/>
+              <a:t>Endemic species</a:t>
+            </a:r>
+            <a:r>
+              <a:rPr lang="en-US" dirty="0"/>
+              <a:t> are </a:t>
+            </a:r>
+            <a:r>
+              <a:rPr lang="en-US" b="1" dirty="0"/>
+              <a:t>plants</a:t>
+            </a:r>
+            <a:r>
+              <a:rPr lang="en-US" dirty="0"/>
+              <a:t> and </a:t>
+            </a:r>
+            <a:r>
+              <a:rPr lang="en-US" b="1" dirty="0"/>
+              <a:t>animals</a:t>
+            </a:r>
+            <a:r>
+              <a:rPr lang="en-US" dirty="0"/>
+              <a:t> that exist only in one geographic region</a:t>
+            </a:r>
+            <a:r>
+              <a:rPr lang="en-US" dirty="0" smtClean="0"/>
+              <a:t>.</a:t>
+            </a:r>
+          </a:p>
+          <a:p>
+            <a:r>
+              <a:rPr lang="en-US" b="1" i="1" dirty="0" smtClean="0"/>
+              <a:t>Hotspot</a:t>
+            </a:r>
+          </a:p>
+          <a:p>
+            <a:pPr lvl="1"/>
+            <a:r>
+              <a:rPr lang="en-IN" dirty="0"/>
+              <a:t>Hot spots are the geographic area which has high endemic species</a:t>
+            </a:r>
+            <a:r>
+              <a:rPr lang="en-IN" dirty="0" smtClean="0"/>
+              <a:t>.</a:t>
+            </a:r>
+          </a:p>
+          <a:p>
+            <a:pPr lvl="1"/>
+            <a:endParaRPr lang="en-IN" dirty="0"/>
+          </a:p>
+        </p:txBody>
+      </p:sp>
+    </p:spTree>
+    <p:extLst>
+      <p:ext uri="{BB962C8B-B14F-4D97-AF65-F5344CB8AC3E}">
+        <p14:creationId xmlns:p14="http://schemas.microsoft.com/office/powerpoint/2010/main" val="869131246"/>
+      </p:ext>
+    </p:extLst>
+  </p:cSld>
+  <p:clrMapOvr>
+    <a:masterClrMapping/>
+  </p:clrMapOvr>
+</p:sld>
+</file>
+
+<file path=ppt/slides/slide104.xml><?xml version="1.0" encoding="utf-8"?>
+<p:sld xmlns:a="http://schemas.openxmlformats.org/drawingml/2006/main" xmlns:r="http://schemas.openxmlformats.org/officeDocument/2006/relationships" xmlns:p="http://schemas.openxmlformats.org/presentationml/2006/main">
+  <p:cSld>
+    <p:spTree>
+      <p:nvGrpSpPr>
+        <p:cNvPr id="1" name=""/>
+        <p:cNvGrpSpPr/>
+        <p:nvPr/>
+      </p:nvGrpSpPr>
+      <p:grpSpPr>
+        <a:xfrm>
+          <a:off x="0" y="0"/>
+          <a:ext cx="0" cy="0"/>
+          <a:chOff x="0" y="0"/>
+          <a:chExt cx="0" cy="0"/>
+        </a:xfrm>
+      </p:grpSpPr>
+      <p:sp>
+        <p:nvSpPr>
+          <p:cNvPr id="2" name="Title 1"/>
+          <p:cNvSpPr>
+            <a:spLocks noGrp="1"/>
+          </p:cNvSpPr>
+          <p:nvPr>
+            <p:ph type="title"/>
+          </p:nvPr>
+        </p:nvSpPr>
+        <p:spPr/>
+        <p:txBody>
+          <a:bodyPr/>
+          <a:lstStyle/>
+          <a:p>
+            <a:r>
+              <a:rPr lang="en-IN" dirty="0" smtClean="0"/>
+              <a:t>Criteria for recognising hot spots</a:t>
+            </a:r>
+            <a:endParaRPr lang="en-IN" dirty="0"/>
+          </a:p>
+        </p:txBody>
+      </p:sp>
+      <p:sp>
+        <p:nvSpPr>
+          <p:cNvPr id="3" name="Content Placeholder 2"/>
+          <p:cNvSpPr>
+            <a:spLocks noGrp="1"/>
+          </p:cNvSpPr>
+          <p:nvPr>
+            <p:ph idx="1"/>
+          </p:nvPr>
+        </p:nvSpPr>
+        <p:spPr/>
+        <p:txBody>
+          <a:bodyPr/>
+          <a:lstStyle/>
+          <a:p>
+            <a:r>
+              <a:rPr lang="en-IN" dirty="0" smtClean="0"/>
+              <a:t>Rich in endemic spices.</a:t>
+            </a:r>
+          </a:p>
+          <a:p>
+            <a:r>
+              <a:rPr lang="en-IN" dirty="0" smtClean="0"/>
+              <a:t>Significant percentage of specialised species.</a:t>
+            </a:r>
+          </a:p>
+          <a:p>
+            <a:r>
+              <a:rPr lang="en-IN" dirty="0" smtClean="0"/>
+              <a:t>The site under threat.</a:t>
+            </a:r>
+          </a:p>
+          <a:p>
+            <a:r>
+              <a:rPr lang="en-IN" dirty="0" smtClean="0"/>
+              <a:t>Contain gene pools of plants of potentially useful plants.</a:t>
+            </a:r>
+          </a:p>
+        </p:txBody>
+      </p:sp>
+    </p:spTree>
+    <p:extLst>
+      <p:ext uri="{BB962C8B-B14F-4D97-AF65-F5344CB8AC3E}">
+        <p14:creationId xmlns:p14="http://schemas.microsoft.com/office/powerpoint/2010/main" val="14913265"/>
+      </p:ext>
+    </p:extLst>
+  </p:cSld>
+  <p:clrMapOvr>
+    <a:masterClrMapping/>
+  </p:clrMapOvr>
+</p:sld>
+</file>
+
+<file path=ppt/slides/slide105.xml><?xml version="1.0" encoding="utf-8"?>
+<p:sld xmlns:a="http://schemas.openxmlformats.org/drawingml/2006/main" xmlns:r="http://schemas.openxmlformats.org/officeDocument/2006/relationships" xmlns:p="http://schemas.openxmlformats.org/presentationml/2006/main">
+  <p:cSld>
+    <p:spTree>
+      <p:nvGrpSpPr>
+        <p:cNvPr id="1" name=""/>
+        <p:cNvGrpSpPr/>
+        <p:nvPr/>
+      </p:nvGrpSpPr>
+      <p:grpSpPr>
+        <a:xfrm>
+          <a:off x="0" y="0"/>
+          <a:ext cx="0" cy="0"/>
+          <a:chOff x="0" y="0"/>
+          <a:chExt cx="0" cy="0"/>
+        </a:xfrm>
+      </p:grpSpPr>
+      <p:sp>
+        <p:nvSpPr>
+          <p:cNvPr id="2" name="Title 1"/>
+          <p:cNvSpPr>
+            <a:spLocks noGrp="1"/>
+          </p:cNvSpPr>
+          <p:nvPr>
+            <p:ph type="title"/>
+          </p:nvPr>
+        </p:nvSpPr>
+        <p:spPr/>
+        <p:txBody>
+          <a:bodyPr/>
+          <a:lstStyle/>
+          <a:p>
+            <a:r>
+              <a:rPr lang="en-IN" dirty="0" smtClean="0"/>
+              <a:t>Hotspots in India</a:t>
+            </a:r>
+            <a:endParaRPr lang="en-IN" dirty="0"/>
+          </a:p>
+        </p:txBody>
+      </p:sp>
+      <p:sp>
+        <p:nvSpPr>
+          <p:cNvPr id="3" name="Content Placeholder 2"/>
+          <p:cNvSpPr>
+            <a:spLocks noGrp="1"/>
+          </p:cNvSpPr>
+          <p:nvPr>
+            <p:ph idx="1"/>
+          </p:nvPr>
+        </p:nvSpPr>
+        <p:spPr/>
+        <p:txBody>
+          <a:bodyPr>
+            <a:normAutofit lnSpcReduction="10000"/>
+          </a:bodyPr>
+          <a:lstStyle/>
+          <a:p>
+            <a:r>
+              <a:rPr lang="en-IN" b="1" i="1" dirty="0" smtClean="0"/>
+              <a:t>Eastern Himalayas (Indo-Burma region)</a:t>
+            </a:r>
+          </a:p>
+          <a:p>
+            <a:pPr lvl="1"/>
+            <a:r>
+              <a:rPr lang="en-IN" dirty="0" smtClean="0"/>
+              <a:t>9000 types of plants</a:t>
+            </a:r>
+          </a:p>
+          <a:p>
+            <a:pPr lvl="1"/>
+            <a:r>
+              <a:rPr lang="en-IN" dirty="0" smtClean="0"/>
+              <a:t>3500 endemic species</a:t>
+            </a:r>
+          </a:p>
+          <a:p>
+            <a:pPr lvl="1"/>
+            <a:r>
+              <a:rPr lang="en-IN" dirty="0" smtClean="0"/>
+              <a:t>55 endemic flowers are recognized as rare.</a:t>
+            </a:r>
+          </a:p>
+          <a:p>
+            <a:pPr lvl="1"/>
+            <a:r>
+              <a:rPr lang="en-IN" dirty="0" smtClean="0"/>
+              <a:t>Recognized as “cradle of speciation”.</a:t>
+            </a:r>
+          </a:p>
+          <a:p>
+            <a:pPr lvl="1"/>
+            <a:r>
+              <a:rPr lang="en-IN" dirty="0" smtClean="0"/>
+              <a:t>Rich in wild relatives of plants of economic significance(rice, banana, citrus…).</a:t>
+            </a:r>
+          </a:p>
+          <a:p>
+            <a:pPr lvl="1"/>
+            <a:r>
+              <a:rPr lang="en-IN" dirty="0" smtClean="0"/>
+              <a:t>Centre of origin and diversification of five palms</a:t>
+            </a:r>
+          </a:p>
+          <a:p>
+            <a:pPr lvl="1"/>
+            <a:r>
+              <a:rPr lang="en-IN" dirty="0" smtClean="0"/>
+              <a:t>Tea is cultivated for last 4000 years</a:t>
+            </a:r>
+          </a:p>
+          <a:p>
+            <a:pPr lvl="1"/>
+            <a:endParaRPr lang="en-IN" dirty="0" smtClean="0"/>
+          </a:p>
+          <a:p>
+            <a:pPr lvl="1"/>
+            <a:endParaRPr lang="en-IN" dirty="0"/>
+          </a:p>
+        </p:txBody>
+      </p:sp>
+    </p:spTree>
+    <p:extLst>
+      <p:ext uri="{BB962C8B-B14F-4D97-AF65-F5344CB8AC3E}">
+        <p14:creationId xmlns:p14="http://schemas.microsoft.com/office/powerpoint/2010/main" val="1953488382"/>
+      </p:ext>
+    </p:extLst>
+  </p:cSld>
+  <p:clrMapOvr>
+    <a:masterClrMapping/>
+  </p:clrMapOvr>
+</p:sld>
+</file>
+
+<file path=ppt/slides/slide106.xml><?xml version="1.0" encoding="utf-8"?>
+<p:sld xmlns:a="http://schemas.openxmlformats.org/drawingml/2006/main" xmlns:r="http://schemas.openxmlformats.org/officeDocument/2006/relationships" xmlns:p="http://schemas.openxmlformats.org/presentationml/2006/main">
+  <p:cSld>
+    <p:spTree>
+      <p:nvGrpSpPr>
+        <p:cNvPr id="1" name=""/>
+        <p:cNvGrpSpPr/>
+        <p:nvPr/>
+      </p:nvGrpSpPr>
+      <p:grpSpPr>
+        <a:xfrm>
+          <a:off x="0" y="0"/>
+          <a:ext cx="0" cy="0"/>
+          <a:chOff x="0" y="0"/>
+          <a:chExt cx="0" cy="0"/>
+        </a:xfrm>
+      </p:grpSpPr>
+      <p:sp>
+        <p:nvSpPr>
+          <p:cNvPr id="2" name="Title 1"/>
+          <p:cNvSpPr>
+            <a:spLocks noGrp="1"/>
+          </p:cNvSpPr>
+          <p:nvPr>
+            <p:ph type="title"/>
+          </p:nvPr>
+        </p:nvSpPr>
+        <p:spPr/>
+        <p:txBody>
+          <a:bodyPr/>
+          <a:lstStyle/>
+          <a:p>
+            <a:r>
+              <a:rPr lang="en-IN" dirty="0" smtClean="0"/>
+              <a:t>Hotspots in India</a:t>
+            </a:r>
+            <a:endParaRPr lang="en-IN" dirty="0"/>
+          </a:p>
+        </p:txBody>
+      </p:sp>
+      <p:sp>
+        <p:nvSpPr>
+          <p:cNvPr id="3" name="Content Placeholder 2"/>
+          <p:cNvSpPr>
+            <a:spLocks noGrp="1"/>
+          </p:cNvSpPr>
+          <p:nvPr>
+            <p:ph idx="1"/>
+          </p:nvPr>
+        </p:nvSpPr>
+        <p:spPr/>
+        <p:txBody>
+          <a:bodyPr>
+            <a:normAutofit lnSpcReduction="10000"/>
+          </a:bodyPr>
+          <a:lstStyle/>
+          <a:p>
+            <a:r>
+              <a:rPr lang="en-IN" b="1" i="1" dirty="0" smtClean="0"/>
+              <a:t>Western Ghats</a:t>
+            </a:r>
+          </a:p>
+          <a:p>
+            <a:pPr lvl="1"/>
+            <a:r>
+              <a:rPr lang="en-IN" dirty="0" smtClean="0"/>
+              <a:t>It has 315 types of vertebrates.</a:t>
+            </a:r>
+          </a:p>
+          <a:p>
+            <a:pPr lvl="1"/>
+            <a:r>
+              <a:rPr lang="en-IN" dirty="0" smtClean="0"/>
+              <a:t>12 mammal</a:t>
+            </a:r>
+          </a:p>
+          <a:p>
+            <a:pPr lvl="1"/>
+            <a:r>
+              <a:rPr lang="en-IN" dirty="0" smtClean="0"/>
+              <a:t>13 birds</a:t>
+            </a:r>
+          </a:p>
+          <a:p>
+            <a:pPr lvl="1"/>
+            <a:r>
+              <a:rPr lang="en-IN" dirty="0" smtClean="0"/>
+              <a:t>89 retails</a:t>
+            </a:r>
+          </a:p>
+          <a:p>
+            <a:pPr lvl="1"/>
+            <a:r>
+              <a:rPr lang="en-IN" dirty="0" smtClean="0"/>
+              <a:t>87 amphibians</a:t>
+            </a:r>
+          </a:p>
+          <a:p>
+            <a:pPr lvl="1"/>
+            <a:r>
+              <a:rPr lang="en-IN" dirty="0" smtClean="0"/>
+              <a:t>104 fish</a:t>
+            </a:r>
+          </a:p>
+          <a:p>
+            <a:pPr lvl="1"/>
+            <a:r>
+              <a:rPr lang="en-IN" dirty="0" smtClean="0"/>
+              <a:t>235 species of endemic flowering plants</a:t>
+            </a:r>
+          </a:p>
+          <a:p>
+            <a:pPr lvl="1"/>
+            <a:r>
+              <a:rPr lang="en-IN" dirty="0" smtClean="0"/>
+              <a:t>1500 endemic species of plants </a:t>
+            </a:r>
+          </a:p>
+          <a:p>
+            <a:pPr lvl="2"/>
+            <a:endParaRPr lang="en-IN" dirty="0" smtClean="0"/>
+          </a:p>
+          <a:p>
+            <a:pPr lvl="1"/>
+            <a:endParaRPr lang="en-IN" dirty="0"/>
+          </a:p>
+        </p:txBody>
+      </p:sp>
+    </p:spTree>
+    <p:extLst>
+      <p:ext uri="{BB962C8B-B14F-4D97-AF65-F5344CB8AC3E}">
+        <p14:creationId xmlns:p14="http://schemas.microsoft.com/office/powerpoint/2010/main" val="2294159032"/>
+      </p:ext>
+    </p:extLst>
+  </p:cSld>
+  <p:clrMapOvr>
+    <a:masterClrMapping/>
+  </p:clrMapOvr>
+</p:sld>
+</file>
+
+<file path=ppt/slides/slide107.xml><?xml version="1.0" encoding="utf-8"?>
+<p:sld xmlns:a="http://schemas.openxmlformats.org/drawingml/2006/main" xmlns:r="http://schemas.openxmlformats.org/officeDocument/2006/relationships" xmlns:p="http://schemas.openxmlformats.org/presentationml/2006/main">
+  <p:cSld>
+    <p:spTree>
+      <p:nvGrpSpPr>
+        <p:cNvPr id="1" name=""/>
+        <p:cNvGrpSpPr/>
+        <p:nvPr/>
+      </p:nvGrpSpPr>
+      <p:grpSpPr>
+        <a:xfrm>
+          <a:off x="0" y="0"/>
+          <a:ext cx="0" cy="0"/>
+          <a:chOff x="0" y="0"/>
+          <a:chExt cx="0" cy="0"/>
+        </a:xfrm>
+      </p:grpSpPr>
+      <p:sp>
+        <p:nvSpPr>
+          <p:cNvPr id="2" name="Title 1"/>
+          <p:cNvSpPr>
+            <a:spLocks noGrp="1"/>
+          </p:cNvSpPr>
+          <p:nvPr>
+            <p:ph type="title"/>
+          </p:nvPr>
+        </p:nvSpPr>
+        <p:spPr/>
+        <p:txBody>
+          <a:bodyPr/>
+          <a:lstStyle/>
+          <a:p>
+            <a:r>
+              <a:rPr lang="en-IN" dirty="0" smtClean="0"/>
+              <a:t>Threats to Biodiversity </a:t>
+            </a:r>
+            <a:endParaRPr lang="en-IN" dirty="0"/>
+          </a:p>
+        </p:txBody>
+      </p:sp>
+      <p:sp>
+        <p:nvSpPr>
+          <p:cNvPr id="3" name="Content Placeholder 2"/>
+          <p:cNvSpPr>
+            <a:spLocks noGrp="1"/>
+          </p:cNvSpPr>
+          <p:nvPr>
+            <p:ph idx="1"/>
+          </p:nvPr>
+        </p:nvSpPr>
+        <p:spPr/>
+        <p:txBody>
+          <a:bodyPr>
+            <a:normAutofit fontScale="92500"/>
+          </a:bodyPr>
+          <a:lstStyle/>
+          <a:p>
+            <a:r>
+              <a:rPr lang="en-IN" dirty="0" smtClean="0"/>
+              <a:t>Any disturbance in the ecosystem that causes of reduction of biodiversity is known as threat.</a:t>
+            </a:r>
+          </a:p>
+          <a:p>
+            <a:r>
+              <a:rPr lang="en-IN" dirty="0" smtClean="0"/>
+              <a:t>Known Threats</a:t>
+            </a:r>
+          </a:p>
+          <a:p>
+            <a:pPr lvl="1"/>
+            <a:r>
+              <a:rPr lang="en-IN" dirty="0" smtClean="0"/>
+              <a:t>Habitat loss</a:t>
+            </a:r>
+          </a:p>
+          <a:p>
+            <a:pPr lvl="1"/>
+            <a:r>
+              <a:rPr lang="en-IN" dirty="0" smtClean="0"/>
+              <a:t>Over-exploitation</a:t>
+            </a:r>
+          </a:p>
+          <a:p>
+            <a:pPr lvl="1"/>
+            <a:r>
+              <a:rPr lang="en-IN" dirty="0" smtClean="0"/>
+              <a:t>Pollution</a:t>
+            </a:r>
+          </a:p>
+          <a:p>
+            <a:pPr lvl="1"/>
+            <a:r>
+              <a:rPr lang="en-IN" dirty="0" smtClean="0"/>
+              <a:t>Species Introduction</a:t>
+            </a:r>
+          </a:p>
+          <a:p>
+            <a:pPr lvl="1"/>
+            <a:r>
+              <a:rPr lang="en-IN" dirty="0" smtClean="0"/>
+              <a:t>Natural Climates</a:t>
+            </a:r>
+          </a:p>
+          <a:p>
+            <a:pPr lvl="2"/>
+            <a:r>
+              <a:rPr lang="en-IN" dirty="0" smtClean="0"/>
+              <a:t>Drought, Disease, Cyclone</a:t>
+            </a:r>
+            <a:r>
+              <a:rPr lang="en-IN" smtClean="0"/>
+              <a:t>, Floods  </a:t>
+            </a:r>
+            <a:endParaRPr lang="en-IN" dirty="0"/>
+          </a:p>
+        </p:txBody>
+      </p:sp>
+    </p:spTree>
+    <p:extLst>
+      <p:ext uri="{BB962C8B-B14F-4D97-AF65-F5344CB8AC3E}">
+        <p14:creationId xmlns:p14="http://schemas.microsoft.com/office/powerpoint/2010/main" val="3157038853"/>
+      </p:ext>
+    </p:extLst>
+  </p:cSld>
+  <p:clrMapOvr>
+    <a:masterClrMapping/>
+  </p:clrMapOvr>
+</p:sld>
+</file>
+
+<file path=ppt/slides/slide108.xml><?xml version="1.0" encoding="utf-8"?>
+<p:sld xmlns:a="http://schemas.openxmlformats.org/drawingml/2006/main" xmlns:r="http://schemas.openxmlformats.org/officeDocument/2006/relationships" xmlns:p="http://schemas.openxmlformats.org/presentationml/2006/main">
+  <p:cSld>
+    <p:spTree>
+      <p:nvGrpSpPr>
+        <p:cNvPr id="1" name=""/>
+        <p:cNvGrpSpPr/>
+        <p:nvPr/>
+      </p:nvGrpSpPr>
+      <p:grpSpPr>
+        <a:xfrm>
+          <a:off x="0" y="0"/>
+          <a:ext cx="0" cy="0"/>
+          <a:chOff x="0" y="0"/>
+          <a:chExt cx="0" cy="0"/>
+        </a:xfrm>
+      </p:grpSpPr>
+      <p:sp>
+        <p:nvSpPr>
+          <p:cNvPr id="2" name="Title 1"/>
+          <p:cNvSpPr>
+            <a:spLocks noGrp="1"/>
+          </p:cNvSpPr>
+          <p:nvPr>
+            <p:ph type="title"/>
+          </p:nvPr>
+        </p:nvSpPr>
+        <p:spPr>
+          <a:xfrm>
+            <a:off x="457200" y="1981200"/>
+            <a:ext cx="8229600" cy="1143000"/>
+          </a:xfrm>
+        </p:spPr>
+        <p:txBody>
+          <a:bodyPr/>
+          <a:lstStyle/>
+          <a:p>
+            <a:r>
+              <a:rPr lang="en-US" dirty="0" smtClean="0"/>
+              <a:t>Thank You</a:t>
+            </a:r>
+            <a:endParaRPr lang="en-US" dirty="0"/>
+          </a:p>
+        </p:txBody>
+      </p:sp>
+      <p:sp>
+        <p:nvSpPr>
+          <p:cNvPr id="4" name="Subtitle 2"/>
+          <p:cNvSpPr txBox="1">
+            <a:spLocks/>
+          </p:cNvSpPr>
+          <p:nvPr/>
+        </p:nvSpPr>
+        <p:spPr>
+          <a:xfrm>
+            <a:off x="4038600" y="4191000"/>
+            <a:ext cx="4191000" cy="1752600"/>
+          </a:xfrm>
+          <a:prstGeom prst="rect">
+            <a:avLst/>
+          </a:prstGeom>
+        </p:spPr>
+        <p:txBody>
+          <a:bodyPr vert="horz" lIns="91440" tIns="45720" rIns="91440" bIns="45720" rtlCol="0">
+            <a:normAutofit fontScale="92500" lnSpcReduction="10000"/>
+          </a:bodyPr>
+          <a:lstStyle/>
+          <a:p>
+            <a:pPr marL="342900" marR="0" lvl="0" indent="-342900" algn="r" defTabSz="914400" rtl="0" eaLnBrk="1" fontAlgn="auto" latinLnBrk="0" hangingPunct="1">
+              <a:lnSpc>
+                <a:spcPct val="100000"/>
+              </a:lnSpc>
+              <a:spcBef>
+                <a:spcPct val="20000"/>
+              </a:spcBef>
+              <a:spcAft>
+                <a:spcPts val="0"/>
+              </a:spcAft>
+              <a:buClrTx/>
+              <a:buSzTx/>
+              <a:tabLst/>
+              <a:defRPr/>
+            </a:pPr>
+            <a:r>
+              <a:rPr kumimoji="0" lang="en-US" sz="2200" b="0" i="0" u="none" strike="noStrike" kern="1200" cap="none" spc="0" normalizeH="0" baseline="0" noProof="0" dirty="0" err="1" smtClean="0">
+                <a:ln>
+                  <a:noFill/>
+                </a:ln>
+                <a:solidFill>
+                  <a:schemeClr val="tx1"/>
+                </a:solidFill>
+                <a:effectLst/>
+                <a:uLnTx/>
+                <a:uFillTx/>
+                <a:latin typeface="Cambria" pitchFamily="18" charset="0"/>
+                <a:ea typeface="+mn-ea"/>
+                <a:cs typeface="+mn-cs"/>
+              </a:rPr>
+              <a:t>Rajasekaran</a:t>
+            </a:r>
+            <a:r>
+              <a:rPr kumimoji="0" lang="en-US" sz="2200" b="0" i="0" u="none" strike="noStrike" kern="1200" cap="none" spc="0" normalizeH="0" baseline="0" noProof="0" dirty="0" smtClean="0">
+                <a:ln>
+                  <a:noFill/>
+                </a:ln>
+                <a:solidFill>
+                  <a:schemeClr val="tx1"/>
+                </a:solidFill>
+                <a:effectLst/>
+                <a:uLnTx/>
+                <a:uFillTx/>
+                <a:latin typeface="Cambria" pitchFamily="18" charset="0"/>
+                <a:ea typeface="+mn-ea"/>
+                <a:cs typeface="+mn-cs"/>
+              </a:rPr>
+              <a:t> S</a:t>
+            </a:r>
+          </a:p>
+          <a:p>
+            <a:pPr marL="342900" marR="0" lvl="0" indent="-342900" algn="r" defTabSz="914400" rtl="0" eaLnBrk="1" fontAlgn="auto" latinLnBrk="0" hangingPunct="1">
+              <a:lnSpc>
+                <a:spcPct val="100000"/>
+              </a:lnSpc>
+              <a:spcBef>
+                <a:spcPct val="20000"/>
+              </a:spcBef>
+              <a:spcAft>
+                <a:spcPts val="0"/>
+              </a:spcAft>
+              <a:buClrTx/>
+              <a:buSzTx/>
+              <a:tabLst/>
+              <a:defRPr/>
+            </a:pPr>
+            <a:r>
+              <a:rPr kumimoji="0" lang="en-US" sz="1600" b="0" i="0" u="none" strike="noStrike" kern="1200" cap="none" spc="0" normalizeH="0" baseline="0" noProof="0" dirty="0" smtClean="0">
+                <a:ln>
+                  <a:noFill/>
+                </a:ln>
+                <a:solidFill>
+                  <a:schemeClr val="tx1"/>
+                </a:solidFill>
+                <a:effectLst/>
+                <a:uLnTx/>
+                <a:uFillTx/>
+                <a:latin typeface="Cambria" pitchFamily="18" charset="0"/>
+                <a:ea typeface="+mn-ea"/>
+                <a:cs typeface="+mn-cs"/>
+              </a:rPr>
+              <a:t>Assistant Professor,</a:t>
+            </a:r>
+          </a:p>
+          <a:p>
+            <a:pPr marL="342900" marR="0" lvl="0" indent="-342900" algn="r" defTabSz="914400" rtl="0" eaLnBrk="1" fontAlgn="auto" latinLnBrk="0" hangingPunct="1">
+              <a:lnSpc>
+                <a:spcPct val="100000"/>
+              </a:lnSpc>
+              <a:spcBef>
+                <a:spcPct val="20000"/>
+              </a:spcBef>
+              <a:spcAft>
+                <a:spcPts val="0"/>
+              </a:spcAft>
+              <a:buClrTx/>
+              <a:buSzTx/>
+              <a:tabLst/>
+              <a:defRPr/>
+            </a:pPr>
+            <a:r>
+              <a:rPr kumimoji="0" lang="en-US" sz="1600" b="0" i="0" u="none" strike="noStrike" kern="1200" cap="none" spc="0" normalizeH="0" baseline="0" noProof="0" dirty="0" smtClean="0">
+                <a:ln>
+                  <a:noFill/>
+                </a:ln>
+                <a:solidFill>
+                  <a:schemeClr val="tx1"/>
+                </a:solidFill>
+                <a:effectLst/>
+                <a:uLnTx/>
+                <a:uFillTx/>
+                <a:latin typeface="Cambria" pitchFamily="18" charset="0"/>
+                <a:ea typeface="+mn-ea"/>
+                <a:cs typeface="+mn-cs"/>
+              </a:rPr>
+              <a:t>Department of Information Technology,</a:t>
+            </a:r>
+          </a:p>
+          <a:p>
+            <a:pPr marL="342900" marR="0" lvl="0" indent="-342900" algn="r" defTabSz="914400" rtl="0" eaLnBrk="1" fontAlgn="auto" latinLnBrk="0" hangingPunct="1">
+              <a:lnSpc>
+                <a:spcPct val="100000"/>
+              </a:lnSpc>
+              <a:spcBef>
+                <a:spcPct val="20000"/>
+              </a:spcBef>
+              <a:spcAft>
+                <a:spcPts val="0"/>
+              </a:spcAft>
+              <a:buClrTx/>
+              <a:buSzTx/>
+              <a:tabLst/>
+              <a:defRPr/>
+            </a:pPr>
+            <a:r>
+              <a:rPr kumimoji="0" lang="en-US" sz="1600" b="0" i="0" u="none" strike="noStrike" kern="1200" cap="none" spc="0" normalizeH="0" baseline="0" noProof="0" dirty="0" err="1" smtClean="0">
+                <a:ln>
+                  <a:noFill/>
+                </a:ln>
+                <a:solidFill>
+                  <a:schemeClr val="tx1"/>
+                </a:solidFill>
+                <a:effectLst/>
+                <a:uLnTx/>
+                <a:uFillTx/>
+                <a:latin typeface="Cambria" pitchFamily="18" charset="0"/>
+                <a:ea typeface="+mn-ea"/>
+                <a:cs typeface="+mn-cs"/>
+              </a:rPr>
+              <a:t>KGiSL</a:t>
+            </a:r>
+            <a:r>
+              <a:rPr kumimoji="0" lang="en-US" sz="1600" b="0" i="0" u="none" strike="noStrike" kern="1200" cap="none" spc="0" normalizeH="0" baseline="0" noProof="0" dirty="0" smtClean="0">
+                <a:ln>
+                  <a:noFill/>
+                </a:ln>
+                <a:solidFill>
+                  <a:schemeClr val="tx1"/>
+                </a:solidFill>
+                <a:effectLst/>
+                <a:uLnTx/>
+                <a:uFillTx/>
+                <a:latin typeface="Cambria" pitchFamily="18" charset="0"/>
+                <a:ea typeface="+mn-ea"/>
+                <a:cs typeface="+mn-cs"/>
+              </a:rPr>
+              <a:t> Institute of Technology,</a:t>
+            </a:r>
+          </a:p>
+          <a:p>
+            <a:pPr marL="342900" marR="0" lvl="0" indent="-342900" algn="r" defTabSz="914400" rtl="0" eaLnBrk="1" fontAlgn="auto" latinLnBrk="0" hangingPunct="1">
+              <a:lnSpc>
+                <a:spcPct val="100000"/>
+              </a:lnSpc>
+              <a:spcBef>
+                <a:spcPct val="20000"/>
+              </a:spcBef>
+              <a:spcAft>
+                <a:spcPts val="0"/>
+              </a:spcAft>
+              <a:buClrTx/>
+              <a:buSzTx/>
+              <a:tabLst/>
+              <a:defRPr/>
+            </a:pPr>
+            <a:r>
+              <a:rPr kumimoji="0" lang="en-US" sz="1600" b="0" i="0" u="none" strike="noStrike" kern="1200" cap="none" spc="0" normalizeH="0" baseline="0" noProof="0" dirty="0" smtClean="0">
+                <a:ln>
+                  <a:noFill/>
+                </a:ln>
+                <a:solidFill>
+                  <a:schemeClr val="tx1"/>
+                </a:solidFill>
+                <a:effectLst/>
+                <a:uLnTx/>
+                <a:uFillTx/>
+                <a:latin typeface="Cambria" pitchFamily="18" charset="0"/>
+                <a:ea typeface="+mn-ea"/>
+                <a:cs typeface="+mn-cs"/>
+              </a:rPr>
+              <a:t>email: </a:t>
+            </a:r>
+            <a:r>
+              <a:rPr kumimoji="0" lang="en-US" sz="1600" b="0" i="0" u="none" strike="noStrike" kern="1200" cap="none" spc="0" normalizeH="0" baseline="0" noProof="0" dirty="0" smtClean="0">
+                <a:ln>
+                  <a:noFill/>
+                </a:ln>
+                <a:solidFill>
+                  <a:schemeClr val="tx1"/>
+                </a:solidFill>
+                <a:effectLst/>
+                <a:uLnTx/>
+                <a:uFillTx/>
+                <a:latin typeface="Cambria" pitchFamily="18" charset="0"/>
+                <a:ea typeface="+mn-ea"/>
+                <a:cs typeface="+mn-cs"/>
+                <a:hlinkClick r:id="rId2"/>
+              </a:rPr>
+              <a:t>proffraja@gmail.com</a:t>
+            </a:r>
+            <a:endParaRPr lang="en-US" sz="1600" dirty="0" smtClean="0">
+              <a:latin typeface="Cambria" pitchFamily="18" charset="0"/>
+            </a:endParaRPr>
+          </a:p>
+          <a:p>
+            <a:pPr marL="342900" marR="0" lvl="0" indent="-342900" algn="r" defTabSz="914400" rtl="0" eaLnBrk="1" fontAlgn="auto" latinLnBrk="0" hangingPunct="1">
+              <a:lnSpc>
+                <a:spcPct val="100000"/>
+              </a:lnSpc>
+              <a:spcBef>
+                <a:spcPct val="20000"/>
+              </a:spcBef>
+              <a:spcAft>
+                <a:spcPts val="0"/>
+              </a:spcAft>
+              <a:buClrTx/>
+              <a:buSzTx/>
+              <a:tabLst/>
+              <a:defRPr/>
+            </a:pPr>
+            <a:r>
+              <a:rPr lang="en-US" sz="1600" dirty="0" err="1" smtClean="0">
+                <a:latin typeface="Cambria" pitchFamily="18" charset="0"/>
+              </a:rPr>
+              <a:t>Github:</a:t>
+            </a:r>
+            <a:r>
+              <a:rPr lang="en-US" sz="1600" dirty="0" err="1" smtClean="0">
+                <a:latin typeface="Cambria" pitchFamily="18" charset="0"/>
+                <a:hlinkClick r:id="rId3"/>
+              </a:rPr>
+              <a:t>www.github.com</a:t>
+            </a:r>
+            <a:r>
+              <a:rPr lang="en-US" sz="1600" dirty="0" smtClean="0">
+                <a:latin typeface="Cambria" pitchFamily="18" charset="0"/>
+                <a:hlinkClick r:id="rId3"/>
+              </a:rPr>
+              <a:t>/</a:t>
+            </a:r>
+            <a:r>
+              <a:rPr lang="en-US" sz="1600" dirty="0" err="1" smtClean="0">
+                <a:latin typeface="Cambria" pitchFamily="18" charset="0"/>
+                <a:hlinkClick r:id="rId3"/>
+              </a:rPr>
+              <a:t>rajasekaranap</a:t>
+            </a:r>
+            <a:endParaRPr lang="en-US" sz="1600" dirty="0" smtClean="0">
+              <a:latin typeface="Cambria" pitchFamily="18" charset="0"/>
+            </a:endParaRPr>
+          </a:p>
+          <a:p>
+            <a:pPr marL="342900" marR="0" lvl="0" indent="-342900" algn="r" defTabSz="914400" rtl="0" eaLnBrk="1" fontAlgn="auto" latinLnBrk="0" hangingPunct="1">
+              <a:lnSpc>
+                <a:spcPct val="100000"/>
+              </a:lnSpc>
+              <a:spcBef>
+                <a:spcPct val="20000"/>
+              </a:spcBef>
+              <a:spcAft>
+                <a:spcPts val="0"/>
+              </a:spcAft>
+              <a:buClrTx/>
+              <a:buSzTx/>
+              <a:tabLst/>
+              <a:defRPr/>
+            </a:pPr>
+            <a:endParaRPr lang="en-US" sz="1600" dirty="0" smtClean="0">
+              <a:latin typeface="Cambria" pitchFamily="18" charset="0"/>
+            </a:endParaRPr>
+          </a:p>
+        </p:txBody>
+      </p:sp>
+    </p:spTree>
+  </p:cSld>
+  <p:clrMapOvr>
+    <a:masterClrMapping/>
+  </p:clrMapOvr>
+  <p:timing>
+    <p:tnLst>
+      <p:par>
+        <p:cTn id="1" dur="indefinite" restart="never" nodeType="tmRoot"/>
+      </p:par>
+    </p:tnLst>
+  </p:timing>
 </p:sld>
 </file>
 
@@ -31169,11 +32639,7 @@
           <a:p>
             <a:r>
               <a:rPr lang="en-US" dirty="0" smtClean="0"/>
-              <a:t>Dystrophic </a:t>
-            </a:r>
-            <a:r>
-              <a:rPr lang="en-US" dirty="0" smtClean="0"/>
-              <a:t>lakes</a:t>
+              <a:t>Dystrophic lakes</a:t>
             </a:r>
             <a:endParaRPr lang="en-US" dirty="0"/>
           </a:p>
@@ -33648,352 +35114,1431 @@
             <p:ph type="title"/>
           </p:nvPr>
         </p:nvSpPr>
-        <p:spPr>
-          <a:xfrm>
-            <a:off x="457200" y="1981200"/>
-            <a:ext cx="8229600" cy="1143000"/>
-          </a:xfrm>
-        </p:spPr>
+        <p:spPr/>
         <p:txBody>
           <a:bodyPr/>
           <a:lstStyle/>
           <a:p>
             <a:r>
-              <a:rPr lang="en-US" dirty="0" smtClean="0"/>
-              <a:t>Thank You</a:t>
-            </a:r>
-            <a:endParaRPr lang="en-US" dirty="0"/>
+              <a:rPr lang="en-IN" dirty="0" smtClean="0"/>
+              <a:t>Values of Biodiversity</a:t>
+            </a:r>
+            <a:endParaRPr lang="en-IN" dirty="0"/>
           </a:p>
         </p:txBody>
       </p:sp>
       <p:sp>
         <p:nvSpPr>
-          <p:cNvPr id="4" name="Subtitle 2"/>
-          <p:cNvSpPr txBox="1">
-            <a:spLocks/>
+          <p:cNvPr id="3" name="Content Placeholder 2"/>
+          <p:cNvSpPr>
+            <a:spLocks noGrp="1"/>
           </p:cNvSpPr>
-          <p:nvPr/>
+          <p:nvPr>
+            <p:ph idx="1"/>
+          </p:nvPr>
         </p:nvSpPr>
-        <p:spPr>
-          <a:xfrm>
-            <a:off x="4038600" y="4191000"/>
-            <a:ext cx="4191000" cy="1752600"/>
-          </a:xfrm>
-          <a:prstGeom prst="rect">
-            <a:avLst/>
-          </a:prstGeom>
-        </p:spPr>
+        <p:spPr/>
         <p:txBody>
-          <a:bodyPr vert="horz" lIns="91440" tIns="45720" rIns="91440" bIns="45720" rtlCol="0">
-            <a:normAutofit fontScale="92500" lnSpcReduction="10000"/>
-          </a:bodyPr>
+          <a:bodyPr/>
           <a:lstStyle/>
           <a:p>
-            <a:pPr marL="342900" marR="0" lvl="0" indent="-342900" algn="r" defTabSz="914400" rtl="0" eaLnBrk="1" fontAlgn="auto" latinLnBrk="0" hangingPunct="1">
-              <a:lnSpc>
-                <a:spcPct val="100000"/>
-              </a:lnSpc>
-              <a:spcBef>
-                <a:spcPct val="20000"/>
-              </a:spcBef>
-              <a:spcAft>
-                <a:spcPts val="0"/>
-              </a:spcAft>
-              <a:buClrTx/>
-              <a:buSzTx/>
-              <a:tabLst/>
-              <a:defRPr/>
-            </a:pPr>
-            <a:r>
-              <a:rPr kumimoji="0" lang="en-US" sz="2200" b="0" i="0" u="none" strike="noStrike" kern="1200" cap="none" spc="0" normalizeH="0" baseline="0" noProof="0" dirty="0" err="1" smtClean="0">
-                <a:ln>
-                  <a:noFill/>
-                </a:ln>
-                <a:solidFill>
-                  <a:schemeClr val="tx1"/>
-                </a:solidFill>
-                <a:effectLst/>
-                <a:uLnTx/>
-                <a:uFillTx/>
-                <a:latin typeface="Cambria" pitchFamily="18" charset="0"/>
-                <a:ea typeface="+mn-ea"/>
-                <a:cs typeface="+mn-cs"/>
-              </a:rPr>
-              <a:t>Rajasekaran</a:t>
-            </a:r>
-            <a:r>
-              <a:rPr kumimoji="0" lang="en-US" sz="2200" b="0" i="0" u="none" strike="noStrike" kern="1200" cap="none" spc="0" normalizeH="0" baseline="0" noProof="0" dirty="0" smtClean="0">
-                <a:ln>
-                  <a:noFill/>
-                </a:ln>
-                <a:solidFill>
-                  <a:schemeClr val="tx1"/>
-                </a:solidFill>
-                <a:effectLst/>
-                <a:uLnTx/>
-                <a:uFillTx/>
-                <a:latin typeface="Cambria" pitchFamily="18" charset="0"/>
-                <a:ea typeface="+mn-ea"/>
-                <a:cs typeface="+mn-cs"/>
-              </a:rPr>
-              <a:t> S</a:t>
-            </a:r>
-          </a:p>
-          <a:p>
-            <a:pPr marL="342900" marR="0" lvl="0" indent="-342900" algn="r" defTabSz="914400" rtl="0" eaLnBrk="1" fontAlgn="auto" latinLnBrk="0" hangingPunct="1">
-              <a:lnSpc>
-                <a:spcPct val="100000"/>
-              </a:lnSpc>
-              <a:spcBef>
-                <a:spcPct val="20000"/>
-              </a:spcBef>
-              <a:spcAft>
-                <a:spcPts val="0"/>
-              </a:spcAft>
-              <a:buClrTx/>
-              <a:buSzTx/>
-              <a:tabLst/>
-              <a:defRPr/>
-            </a:pPr>
-            <a:r>
-              <a:rPr kumimoji="0" lang="en-US" sz="1600" b="0" i="0" u="none" strike="noStrike" kern="1200" cap="none" spc="0" normalizeH="0" baseline="0" noProof="0" dirty="0" smtClean="0">
-                <a:ln>
-                  <a:noFill/>
-                </a:ln>
-                <a:solidFill>
-                  <a:schemeClr val="tx1"/>
-                </a:solidFill>
-                <a:effectLst/>
-                <a:uLnTx/>
-                <a:uFillTx/>
-                <a:latin typeface="Cambria" pitchFamily="18" charset="0"/>
-                <a:ea typeface="+mn-ea"/>
-                <a:cs typeface="+mn-cs"/>
-              </a:rPr>
-              <a:t>Assistant Professor,</a:t>
-            </a:r>
-          </a:p>
-          <a:p>
-            <a:pPr marL="342900" marR="0" lvl="0" indent="-342900" algn="r" defTabSz="914400" rtl="0" eaLnBrk="1" fontAlgn="auto" latinLnBrk="0" hangingPunct="1">
-              <a:lnSpc>
-                <a:spcPct val="100000"/>
-              </a:lnSpc>
-              <a:spcBef>
-                <a:spcPct val="20000"/>
-              </a:spcBef>
-              <a:spcAft>
-                <a:spcPts val="0"/>
-              </a:spcAft>
-              <a:buClrTx/>
-              <a:buSzTx/>
-              <a:tabLst/>
-              <a:defRPr/>
-            </a:pPr>
-            <a:r>
-              <a:rPr kumimoji="0" lang="en-US" sz="1600" b="0" i="0" u="none" strike="noStrike" kern="1200" cap="none" spc="0" normalizeH="0" baseline="0" noProof="0" dirty="0" smtClean="0">
-                <a:ln>
-                  <a:noFill/>
-                </a:ln>
-                <a:solidFill>
-                  <a:schemeClr val="tx1"/>
-                </a:solidFill>
-                <a:effectLst/>
-                <a:uLnTx/>
-                <a:uFillTx/>
-                <a:latin typeface="Cambria" pitchFamily="18" charset="0"/>
-                <a:ea typeface="+mn-ea"/>
-                <a:cs typeface="+mn-cs"/>
-              </a:rPr>
-              <a:t>Department of Information Technology,</a:t>
-            </a:r>
-          </a:p>
-          <a:p>
-            <a:pPr marL="342900" marR="0" lvl="0" indent="-342900" algn="r" defTabSz="914400" rtl="0" eaLnBrk="1" fontAlgn="auto" latinLnBrk="0" hangingPunct="1">
-              <a:lnSpc>
-                <a:spcPct val="100000"/>
-              </a:lnSpc>
-              <a:spcBef>
-                <a:spcPct val="20000"/>
-              </a:spcBef>
-              <a:spcAft>
-                <a:spcPts val="0"/>
-              </a:spcAft>
-              <a:buClrTx/>
-              <a:buSzTx/>
-              <a:tabLst/>
-              <a:defRPr/>
-            </a:pPr>
-            <a:r>
-              <a:rPr kumimoji="0" lang="en-US" sz="1600" b="0" i="0" u="none" strike="noStrike" kern="1200" cap="none" spc="0" normalizeH="0" baseline="0" noProof="0" dirty="0" err="1" smtClean="0">
-                <a:ln>
-                  <a:noFill/>
-                </a:ln>
-                <a:solidFill>
-                  <a:schemeClr val="tx1"/>
-                </a:solidFill>
-                <a:effectLst/>
-                <a:uLnTx/>
-                <a:uFillTx/>
-                <a:latin typeface="Cambria" pitchFamily="18" charset="0"/>
-                <a:ea typeface="+mn-ea"/>
-                <a:cs typeface="+mn-cs"/>
-              </a:rPr>
-              <a:t>KGiSL</a:t>
-            </a:r>
-            <a:r>
-              <a:rPr kumimoji="0" lang="en-US" sz="1600" b="0" i="0" u="none" strike="noStrike" kern="1200" cap="none" spc="0" normalizeH="0" baseline="0" noProof="0" dirty="0" smtClean="0">
-                <a:ln>
-                  <a:noFill/>
-                </a:ln>
-                <a:solidFill>
-                  <a:schemeClr val="tx1"/>
-                </a:solidFill>
-                <a:effectLst/>
-                <a:uLnTx/>
-                <a:uFillTx/>
-                <a:latin typeface="Cambria" pitchFamily="18" charset="0"/>
-                <a:ea typeface="+mn-ea"/>
-                <a:cs typeface="+mn-cs"/>
-              </a:rPr>
-              <a:t> Institute of Technology,</a:t>
-            </a:r>
-          </a:p>
-          <a:p>
-            <a:pPr marL="342900" marR="0" lvl="0" indent="-342900" algn="r" defTabSz="914400" rtl="0" eaLnBrk="1" fontAlgn="auto" latinLnBrk="0" hangingPunct="1">
-              <a:lnSpc>
-                <a:spcPct val="100000"/>
-              </a:lnSpc>
-              <a:spcBef>
-                <a:spcPct val="20000"/>
-              </a:spcBef>
-              <a:spcAft>
-                <a:spcPts val="0"/>
-              </a:spcAft>
-              <a:buClrTx/>
-              <a:buSzTx/>
-              <a:tabLst/>
-              <a:defRPr/>
-            </a:pPr>
-            <a:r>
-              <a:rPr kumimoji="0" lang="en-US" sz="1600" b="0" i="0" u="none" strike="noStrike" kern="1200" cap="none" spc="0" normalizeH="0" baseline="0" noProof="0" dirty="0" smtClean="0">
-                <a:ln>
-                  <a:noFill/>
-                </a:ln>
-                <a:solidFill>
-                  <a:schemeClr val="tx1"/>
-                </a:solidFill>
-                <a:effectLst/>
-                <a:uLnTx/>
-                <a:uFillTx/>
-                <a:latin typeface="Cambria" pitchFamily="18" charset="0"/>
-                <a:ea typeface="+mn-ea"/>
-                <a:cs typeface="+mn-cs"/>
-              </a:rPr>
-              <a:t>email: </a:t>
-            </a:r>
-            <a:r>
-              <a:rPr kumimoji="0" lang="en-US" sz="1600" b="0" i="0" u="none" strike="noStrike" kern="1200" cap="none" spc="0" normalizeH="0" baseline="0" noProof="0" dirty="0" smtClean="0">
-                <a:ln>
-                  <a:noFill/>
-                </a:ln>
-                <a:solidFill>
-                  <a:schemeClr val="tx1"/>
-                </a:solidFill>
-                <a:effectLst/>
-                <a:uLnTx/>
-                <a:uFillTx/>
-                <a:latin typeface="Cambria" pitchFamily="18" charset="0"/>
-                <a:ea typeface="+mn-ea"/>
-                <a:cs typeface="+mn-cs"/>
-                <a:hlinkClick r:id="rId2"/>
-              </a:rPr>
-              <a:t>proffraja@gmail.com</a:t>
-            </a:r>
-            <a:endParaRPr lang="en-US" sz="1600" dirty="0" smtClean="0">
-              <a:latin typeface="Cambria" pitchFamily="18" charset="0"/>
-            </a:endParaRPr>
-          </a:p>
-          <a:p>
-            <a:pPr marL="342900" marR="0" lvl="0" indent="-342900" algn="r" defTabSz="914400" rtl="0" eaLnBrk="1" fontAlgn="auto" latinLnBrk="0" hangingPunct="1">
-              <a:lnSpc>
-                <a:spcPct val="100000"/>
-              </a:lnSpc>
-              <a:spcBef>
-                <a:spcPct val="20000"/>
-              </a:spcBef>
-              <a:spcAft>
-                <a:spcPts val="0"/>
-              </a:spcAft>
-              <a:buClrTx/>
-              <a:buSzTx/>
-              <a:tabLst/>
-              <a:defRPr/>
-            </a:pPr>
-            <a:r>
-              <a:rPr lang="en-US" sz="1600" dirty="0" err="1" smtClean="0">
-                <a:latin typeface="Cambria" pitchFamily="18" charset="0"/>
-              </a:rPr>
-              <a:t>Github:</a:t>
-            </a:r>
-            <a:r>
-              <a:rPr lang="en-US" sz="1600" dirty="0" err="1" smtClean="0">
-                <a:latin typeface="Cambria" pitchFamily="18" charset="0"/>
-                <a:hlinkClick r:id="rId3"/>
-              </a:rPr>
-              <a:t>www.github.com</a:t>
-            </a:r>
-            <a:r>
-              <a:rPr lang="en-US" sz="1600" dirty="0" smtClean="0">
-                <a:latin typeface="Cambria" pitchFamily="18" charset="0"/>
-                <a:hlinkClick r:id="rId3"/>
-              </a:rPr>
-              <a:t>/</a:t>
-            </a:r>
-            <a:r>
-              <a:rPr lang="en-US" sz="1600" dirty="0" err="1" smtClean="0">
-                <a:latin typeface="Cambria" pitchFamily="18" charset="0"/>
-                <a:hlinkClick r:id="rId3"/>
-              </a:rPr>
-              <a:t>rajasekaranap</a:t>
-            </a:r>
-            <a:endParaRPr lang="en-US" sz="1600" dirty="0" smtClean="0">
-              <a:latin typeface="Cambria" pitchFamily="18" charset="0"/>
-            </a:endParaRPr>
-          </a:p>
-          <a:p>
-            <a:pPr marL="342900" marR="0" lvl="0" indent="-342900" algn="r" defTabSz="914400" rtl="0" eaLnBrk="1" fontAlgn="auto" latinLnBrk="0" hangingPunct="1">
-              <a:lnSpc>
-                <a:spcPct val="100000"/>
-              </a:lnSpc>
-              <a:spcBef>
-                <a:spcPct val="20000"/>
-              </a:spcBef>
-              <a:spcAft>
-                <a:spcPts val="0"/>
-              </a:spcAft>
-              <a:buClrTx/>
-              <a:buSzTx/>
-              <a:tabLst/>
-              <a:defRPr/>
-            </a:pPr>
-            <a:endParaRPr lang="en-US" sz="1600" dirty="0" smtClean="0">
-              <a:latin typeface="Cambria" pitchFamily="18" charset="0"/>
-            </a:endParaRPr>
+            <a:r>
+              <a:rPr lang="en-IN" dirty="0" smtClean="0"/>
+              <a:t>Evaluation of biodiversity</a:t>
+            </a:r>
+          </a:p>
+          <a:p>
+            <a:r>
+              <a:rPr lang="en-IN" dirty="0" smtClean="0"/>
+              <a:t>Two Types</a:t>
+            </a:r>
+          </a:p>
+          <a:p>
+            <a:pPr lvl="1"/>
+            <a:r>
+              <a:rPr lang="en-IN" dirty="0" smtClean="0"/>
+              <a:t>Direct Values</a:t>
+            </a:r>
+          </a:p>
+          <a:p>
+            <a:pPr lvl="1"/>
+            <a:r>
+              <a:rPr lang="en-IN" dirty="0" smtClean="0"/>
+              <a:t>Indirect Values</a:t>
+            </a:r>
           </a:p>
         </p:txBody>
       </p:sp>
     </p:spTree>
+    <p:extLst>
+      <p:ext uri="{BB962C8B-B14F-4D97-AF65-F5344CB8AC3E}">
+        <p14:creationId xmlns:p14="http://schemas.microsoft.com/office/powerpoint/2010/main" val="3414053602"/>
+      </p:ext>
+    </p:extLst>
   </p:cSld>
   <p:clrMapOvr>
     <a:masterClrMapping/>
   </p:clrMapOvr>
-  <p:timing>
-    <p:tnLst>
-      <p:par>
-        <p:cTn id="1" dur="indefinite" restart="never" nodeType="tmRoot"/>
-      </p:par>
-    </p:tnLst>
-  </p:timing>
+</p:sld>
+</file>
+
+<file path=ppt/slides/slide92.xml><?xml version="1.0" encoding="utf-8"?>
+<p:sld xmlns:a="http://schemas.openxmlformats.org/drawingml/2006/main" xmlns:r="http://schemas.openxmlformats.org/officeDocument/2006/relationships" xmlns:p="http://schemas.openxmlformats.org/presentationml/2006/main">
+  <p:cSld>
+    <p:spTree>
+      <p:nvGrpSpPr>
+        <p:cNvPr id="1" name=""/>
+        <p:cNvGrpSpPr/>
+        <p:nvPr/>
+      </p:nvGrpSpPr>
+      <p:grpSpPr>
+        <a:xfrm>
+          <a:off x="0" y="0"/>
+          <a:ext cx="0" cy="0"/>
+          <a:chOff x="0" y="0"/>
+          <a:chExt cx="0" cy="0"/>
+        </a:xfrm>
+      </p:grpSpPr>
+      <p:sp>
+        <p:nvSpPr>
+          <p:cNvPr id="2" name="Title 1"/>
+          <p:cNvSpPr>
+            <a:spLocks noGrp="1"/>
+          </p:cNvSpPr>
+          <p:nvPr>
+            <p:ph type="title"/>
+          </p:nvPr>
+        </p:nvSpPr>
+        <p:spPr/>
+        <p:txBody>
+          <a:bodyPr/>
+          <a:lstStyle/>
+          <a:p>
+            <a:r>
+              <a:rPr lang="en-IN" dirty="0"/>
+              <a:t>Values of Biodiversity</a:t>
+            </a:r>
+          </a:p>
+        </p:txBody>
+      </p:sp>
+      <p:sp>
+        <p:nvSpPr>
+          <p:cNvPr id="3" name="Content Placeholder 2"/>
+          <p:cNvSpPr>
+            <a:spLocks noGrp="1"/>
+          </p:cNvSpPr>
+          <p:nvPr>
+            <p:ph idx="1"/>
+          </p:nvPr>
+        </p:nvSpPr>
+        <p:spPr/>
+        <p:txBody>
+          <a:bodyPr/>
+          <a:lstStyle/>
+          <a:p>
+            <a:r>
+              <a:rPr lang="en-IN" dirty="0" smtClean="0"/>
+              <a:t>Direct Values</a:t>
+            </a:r>
+          </a:p>
+          <a:p>
+            <a:pPr lvl="1"/>
+            <a:r>
+              <a:rPr lang="en-IN" dirty="0" smtClean="0"/>
+              <a:t>Direct use of medicinal and agricultural values</a:t>
+            </a:r>
+          </a:p>
+          <a:p>
+            <a:pPr lvl="1"/>
+            <a:r>
+              <a:rPr lang="en-IN" dirty="0" smtClean="0"/>
+              <a:t>Harvest and consumption</a:t>
+            </a:r>
+            <a:endParaRPr lang="en-IN" dirty="0"/>
+          </a:p>
+          <a:p>
+            <a:r>
+              <a:rPr lang="en-IN" dirty="0" smtClean="0"/>
+              <a:t>Types</a:t>
+            </a:r>
+          </a:p>
+          <a:p>
+            <a:pPr lvl="1"/>
+            <a:r>
+              <a:rPr lang="en-IN" dirty="0" smtClean="0"/>
+              <a:t>Consumptive use values</a:t>
+            </a:r>
+          </a:p>
+          <a:p>
+            <a:pPr lvl="1"/>
+            <a:r>
+              <a:rPr lang="en-IN" dirty="0" smtClean="0"/>
+              <a:t>Productive use values</a:t>
+            </a:r>
+          </a:p>
+          <a:p>
+            <a:pPr lvl="1"/>
+            <a:endParaRPr lang="en-IN" dirty="0"/>
+          </a:p>
+        </p:txBody>
+      </p:sp>
+    </p:spTree>
+    <p:extLst>
+      <p:ext uri="{BB962C8B-B14F-4D97-AF65-F5344CB8AC3E}">
+        <p14:creationId xmlns:p14="http://schemas.microsoft.com/office/powerpoint/2010/main" val="1158614274"/>
+      </p:ext>
+    </p:extLst>
+  </p:cSld>
+  <p:clrMapOvr>
+    <a:masterClrMapping/>
+  </p:clrMapOvr>
+</p:sld>
+</file>
+
+<file path=ppt/slides/slide93.xml><?xml version="1.0" encoding="utf-8"?>
+<p:sld xmlns:a="http://schemas.openxmlformats.org/drawingml/2006/main" xmlns:r="http://schemas.openxmlformats.org/officeDocument/2006/relationships" xmlns:p="http://schemas.openxmlformats.org/presentationml/2006/main">
+  <p:cSld>
+    <p:spTree>
+      <p:nvGrpSpPr>
+        <p:cNvPr id="1" name=""/>
+        <p:cNvGrpSpPr/>
+        <p:nvPr/>
+      </p:nvGrpSpPr>
+      <p:grpSpPr>
+        <a:xfrm>
+          <a:off x="0" y="0"/>
+          <a:ext cx="0" cy="0"/>
+          <a:chOff x="0" y="0"/>
+          <a:chExt cx="0" cy="0"/>
+        </a:xfrm>
+      </p:grpSpPr>
+      <p:sp>
+        <p:nvSpPr>
+          <p:cNvPr id="2" name="Title 1"/>
+          <p:cNvSpPr>
+            <a:spLocks noGrp="1"/>
+          </p:cNvSpPr>
+          <p:nvPr>
+            <p:ph type="title"/>
+          </p:nvPr>
+        </p:nvSpPr>
+        <p:spPr/>
+        <p:txBody>
+          <a:bodyPr/>
+          <a:lstStyle/>
+          <a:p>
+            <a:r>
+              <a:rPr lang="en-IN" dirty="0"/>
+              <a:t>Values of Biodiversity</a:t>
+            </a:r>
+          </a:p>
+        </p:txBody>
+      </p:sp>
+      <p:sp>
+        <p:nvSpPr>
+          <p:cNvPr id="3" name="Content Placeholder 2"/>
+          <p:cNvSpPr>
+            <a:spLocks noGrp="1"/>
+          </p:cNvSpPr>
+          <p:nvPr>
+            <p:ph idx="1"/>
+          </p:nvPr>
+        </p:nvSpPr>
+        <p:spPr/>
+        <p:txBody>
+          <a:bodyPr>
+            <a:normAutofit lnSpcReduction="10000"/>
+          </a:bodyPr>
+          <a:lstStyle/>
+          <a:p>
+            <a:r>
+              <a:rPr lang="en-IN" dirty="0" smtClean="0"/>
+              <a:t>Consumptive use values</a:t>
+            </a:r>
+          </a:p>
+          <a:p>
+            <a:pPr lvl="1"/>
+            <a:r>
+              <a:rPr lang="en-IN" dirty="0" smtClean="0"/>
+              <a:t>It is where the natural products are consumed directly without passing through market.</a:t>
+            </a:r>
+          </a:p>
+          <a:p>
+            <a:pPr lvl="1"/>
+            <a:r>
+              <a:rPr lang="en-IN" dirty="0" err="1" smtClean="0"/>
+              <a:t>Eg</a:t>
+            </a:r>
+            <a:r>
+              <a:rPr lang="en-IN" dirty="0" smtClean="0"/>
+              <a:t>:</a:t>
+            </a:r>
+          </a:p>
+          <a:p>
+            <a:pPr lvl="2"/>
+            <a:r>
+              <a:rPr lang="en-IN" dirty="0" smtClean="0"/>
+              <a:t>Food</a:t>
+            </a:r>
+          </a:p>
+          <a:p>
+            <a:pPr lvl="3"/>
+            <a:r>
+              <a:rPr lang="en-IN" dirty="0" smtClean="0"/>
+              <a:t>Wild plats, Wild animals</a:t>
+            </a:r>
+          </a:p>
+          <a:p>
+            <a:pPr lvl="2"/>
+            <a:r>
+              <a:rPr lang="en-IN" dirty="0" smtClean="0"/>
+              <a:t>Drugs and medicine</a:t>
+            </a:r>
+          </a:p>
+          <a:p>
+            <a:pPr lvl="3"/>
+            <a:r>
+              <a:rPr lang="en-IN" dirty="0" smtClean="0"/>
+              <a:t>70% of Morden medicine derived from plant and extracts.</a:t>
+            </a:r>
+          </a:p>
+          <a:p>
+            <a:pPr lvl="3"/>
+            <a:r>
+              <a:rPr lang="en-IN" dirty="0" smtClean="0"/>
+              <a:t>20000 species are used is Ayurveda, </a:t>
+            </a:r>
+            <a:r>
+              <a:rPr lang="en-IN" dirty="0" err="1" smtClean="0"/>
+              <a:t>Sidha</a:t>
+            </a:r>
+            <a:r>
+              <a:rPr lang="en-IN" dirty="0" smtClean="0"/>
+              <a:t> and </a:t>
+            </a:r>
+            <a:r>
+              <a:rPr lang="en-IN" dirty="0" err="1" smtClean="0"/>
+              <a:t>Unani</a:t>
+            </a:r>
+            <a:endParaRPr lang="en-IN" dirty="0" smtClean="0"/>
+          </a:p>
+          <a:p>
+            <a:pPr lvl="2"/>
+            <a:r>
+              <a:rPr lang="en-IN" dirty="0" smtClean="0"/>
+              <a:t>Fuel</a:t>
+            </a:r>
+          </a:p>
+          <a:p>
+            <a:pPr lvl="3"/>
+            <a:r>
+              <a:rPr lang="en-IN" dirty="0" smtClean="0"/>
+              <a:t>Coal, Petroleum, Natural gas, Firewood</a:t>
+            </a:r>
+          </a:p>
+          <a:p>
+            <a:pPr lvl="3"/>
+            <a:endParaRPr lang="en-IN" dirty="0" smtClean="0"/>
+          </a:p>
+          <a:p>
+            <a:pPr lvl="2"/>
+            <a:endParaRPr lang="en-IN" dirty="0"/>
+          </a:p>
+        </p:txBody>
+      </p:sp>
+    </p:spTree>
+    <p:extLst>
+      <p:ext uri="{BB962C8B-B14F-4D97-AF65-F5344CB8AC3E}">
+        <p14:creationId xmlns:p14="http://schemas.microsoft.com/office/powerpoint/2010/main" val="3379012542"/>
+      </p:ext>
+    </p:extLst>
+  </p:cSld>
+  <p:clrMapOvr>
+    <a:masterClrMapping/>
+  </p:clrMapOvr>
+</p:sld>
+</file>
+
+<file path=ppt/slides/slide94.xml><?xml version="1.0" encoding="utf-8"?>
+<p:sld xmlns:a="http://schemas.openxmlformats.org/drawingml/2006/main" xmlns:r="http://schemas.openxmlformats.org/officeDocument/2006/relationships" xmlns:p="http://schemas.openxmlformats.org/presentationml/2006/main">
+  <p:cSld>
+    <p:spTree>
+      <p:nvGrpSpPr>
+        <p:cNvPr id="1" name=""/>
+        <p:cNvGrpSpPr/>
+        <p:nvPr/>
+      </p:nvGrpSpPr>
+      <p:grpSpPr>
+        <a:xfrm>
+          <a:off x="0" y="0"/>
+          <a:ext cx="0" cy="0"/>
+          <a:chOff x="0" y="0"/>
+          <a:chExt cx="0" cy="0"/>
+        </a:xfrm>
+      </p:grpSpPr>
+      <p:sp>
+        <p:nvSpPr>
+          <p:cNvPr id="2" name="Title 1"/>
+          <p:cNvSpPr>
+            <a:spLocks noGrp="1"/>
+          </p:cNvSpPr>
+          <p:nvPr>
+            <p:ph type="title"/>
+          </p:nvPr>
+        </p:nvSpPr>
+        <p:spPr/>
+        <p:txBody>
+          <a:bodyPr/>
+          <a:lstStyle/>
+          <a:p>
+            <a:r>
+              <a:rPr lang="en-IN" dirty="0"/>
+              <a:t>Values of Biodiversity</a:t>
+            </a:r>
+          </a:p>
+        </p:txBody>
+      </p:sp>
+      <p:sp>
+        <p:nvSpPr>
+          <p:cNvPr id="3" name="Content Placeholder 2"/>
+          <p:cNvSpPr>
+            <a:spLocks noGrp="1"/>
+          </p:cNvSpPr>
+          <p:nvPr>
+            <p:ph idx="1"/>
+          </p:nvPr>
+        </p:nvSpPr>
+        <p:spPr/>
+        <p:txBody>
+          <a:bodyPr>
+            <a:normAutofit lnSpcReduction="10000"/>
+          </a:bodyPr>
+          <a:lstStyle/>
+          <a:p>
+            <a:r>
+              <a:rPr lang="en-IN" dirty="0" smtClean="0"/>
+              <a:t>Productive Values</a:t>
+            </a:r>
+          </a:p>
+          <a:p>
+            <a:pPr lvl="1"/>
+            <a:r>
+              <a:rPr lang="en-IN" dirty="0" smtClean="0"/>
+              <a:t>It is commercial value of natural products.</a:t>
+            </a:r>
+          </a:p>
+          <a:p>
+            <a:pPr lvl="1"/>
+            <a:r>
+              <a:rPr lang="en-IN" dirty="0" smtClean="0"/>
+              <a:t>It is marketed and sold.</a:t>
+            </a:r>
+          </a:p>
+          <a:p>
+            <a:pPr lvl="1"/>
+            <a:r>
+              <a:rPr lang="en-US" dirty="0" err="1" smtClean="0"/>
+              <a:t>Eg</a:t>
+            </a:r>
+            <a:r>
+              <a:rPr lang="en-US" dirty="0" smtClean="0"/>
+              <a:t>:</a:t>
+            </a:r>
+          </a:p>
+          <a:p>
+            <a:pPr lvl="2"/>
+            <a:r>
+              <a:rPr lang="en-US" dirty="0" smtClean="0"/>
+              <a:t>Silk (silk worm)</a:t>
+            </a:r>
+          </a:p>
+          <a:p>
+            <a:pPr lvl="2"/>
+            <a:r>
+              <a:rPr lang="en-US" dirty="0" smtClean="0"/>
+              <a:t>Wool (sheep)</a:t>
+            </a:r>
+          </a:p>
+          <a:p>
+            <a:pPr lvl="2"/>
+            <a:r>
+              <a:rPr lang="en-US" dirty="0" smtClean="0"/>
+              <a:t>Mush (Musk deer)</a:t>
+            </a:r>
+          </a:p>
+          <a:p>
+            <a:pPr lvl="2"/>
+            <a:r>
+              <a:rPr lang="en-US" dirty="0" smtClean="0"/>
+              <a:t>Tusk (Elephants)</a:t>
+            </a:r>
+          </a:p>
+          <a:p>
+            <a:pPr lvl="2"/>
+            <a:r>
+              <a:rPr lang="en-US" dirty="0" smtClean="0"/>
+              <a:t>Leather (all animals)</a:t>
+            </a:r>
+          </a:p>
+          <a:p>
+            <a:pPr lvl="2"/>
+            <a:r>
+              <a:rPr lang="en-US" dirty="0" smtClean="0"/>
+              <a:t>Food (Fish and animals)</a:t>
+            </a:r>
+            <a:endParaRPr lang="en-IN" dirty="0" smtClean="0"/>
+          </a:p>
+          <a:p>
+            <a:pPr lvl="2"/>
+            <a:endParaRPr lang="en-IN" dirty="0"/>
+          </a:p>
+        </p:txBody>
+      </p:sp>
+    </p:spTree>
+    <p:extLst>
+      <p:ext uri="{BB962C8B-B14F-4D97-AF65-F5344CB8AC3E}">
+        <p14:creationId xmlns:p14="http://schemas.microsoft.com/office/powerpoint/2010/main" val="2543436085"/>
+      </p:ext>
+    </p:extLst>
+  </p:cSld>
+  <p:clrMapOvr>
+    <a:masterClrMapping/>
+  </p:clrMapOvr>
+</p:sld>
+</file>
+
+<file path=ppt/slides/slide95.xml><?xml version="1.0" encoding="utf-8"?>
+<p:sld xmlns:a="http://schemas.openxmlformats.org/drawingml/2006/main" xmlns:r="http://schemas.openxmlformats.org/officeDocument/2006/relationships" xmlns:p="http://schemas.openxmlformats.org/presentationml/2006/main">
+  <p:cSld>
+    <p:spTree>
+      <p:nvGrpSpPr>
+        <p:cNvPr id="1" name=""/>
+        <p:cNvGrpSpPr/>
+        <p:nvPr/>
+      </p:nvGrpSpPr>
+      <p:grpSpPr>
+        <a:xfrm>
+          <a:off x="0" y="0"/>
+          <a:ext cx="0" cy="0"/>
+          <a:chOff x="0" y="0"/>
+          <a:chExt cx="0" cy="0"/>
+        </a:xfrm>
+      </p:grpSpPr>
+      <p:sp>
+        <p:nvSpPr>
+          <p:cNvPr id="2" name="Title 1"/>
+          <p:cNvSpPr>
+            <a:spLocks noGrp="1"/>
+          </p:cNvSpPr>
+          <p:nvPr>
+            <p:ph type="title"/>
+          </p:nvPr>
+        </p:nvSpPr>
+        <p:spPr/>
+        <p:txBody>
+          <a:bodyPr/>
+          <a:lstStyle/>
+          <a:p>
+            <a:r>
+              <a:rPr lang="en-IN" dirty="0"/>
+              <a:t>Values of Biodiversity</a:t>
+            </a:r>
+          </a:p>
+        </p:txBody>
+      </p:sp>
+      <p:sp>
+        <p:nvSpPr>
+          <p:cNvPr id="3" name="Content Placeholder 2"/>
+          <p:cNvSpPr>
+            <a:spLocks noGrp="1"/>
+          </p:cNvSpPr>
+          <p:nvPr>
+            <p:ph idx="1"/>
+          </p:nvPr>
+        </p:nvSpPr>
+        <p:spPr/>
+        <p:txBody>
+          <a:bodyPr/>
+          <a:lstStyle/>
+          <a:p>
+            <a:r>
+              <a:rPr lang="en-US" dirty="0" smtClean="0"/>
+              <a:t>Indirect Values</a:t>
+            </a:r>
+          </a:p>
+          <a:p>
+            <a:pPr lvl="1"/>
+            <a:r>
+              <a:rPr lang="en-US" dirty="0" smtClean="0"/>
+              <a:t>It involves in the functions performed by biodiversity which are not of any direct use.</a:t>
+            </a:r>
+          </a:p>
+          <a:p>
+            <a:pPr lvl="1"/>
+            <a:r>
+              <a:rPr lang="en-US" dirty="0" smtClean="0"/>
+              <a:t>It has economic benefits without consumption.</a:t>
+            </a:r>
+          </a:p>
+          <a:p>
+            <a:pPr lvl="1"/>
+            <a:r>
+              <a:rPr lang="en-US" dirty="0" smtClean="0"/>
+              <a:t>Types</a:t>
+            </a:r>
+          </a:p>
+          <a:p>
+            <a:pPr lvl="2"/>
+            <a:r>
+              <a:rPr lang="en-US" dirty="0" smtClean="0"/>
+              <a:t>Social Values</a:t>
+            </a:r>
+          </a:p>
+          <a:p>
+            <a:pPr lvl="2"/>
+            <a:r>
+              <a:rPr lang="en-US" dirty="0" smtClean="0"/>
+              <a:t>Ethical Values</a:t>
+            </a:r>
+          </a:p>
+          <a:p>
+            <a:pPr lvl="2"/>
+            <a:r>
+              <a:rPr lang="en-US" dirty="0" smtClean="0"/>
+              <a:t>Aesthetic values</a:t>
+            </a:r>
+          </a:p>
+          <a:p>
+            <a:pPr lvl="1"/>
+            <a:endParaRPr lang="en-IN" dirty="0"/>
+          </a:p>
+        </p:txBody>
+      </p:sp>
+    </p:spTree>
+    <p:extLst>
+      <p:ext uri="{BB962C8B-B14F-4D97-AF65-F5344CB8AC3E}">
+        <p14:creationId xmlns:p14="http://schemas.microsoft.com/office/powerpoint/2010/main" val="3671273939"/>
+      </p:ext>
+    </p:extLst>
+  </p:cSld>
+  <p:clrMapOvr>
+    <a:masterClrMapping/>
+  </p:clrMapOvr>
+</p:sld>
+</file>
+
+<file path=ppt/slides/slide96.xml><?xml version="1.0" encoding="utf-8"?>
+<p:sld xmlns:a="http://schemas.openxmlformats.org/drawingml/2006/main" xmlns:r="http://schemas.openxmlformats.org/officeDocument/2006/relationships" xmlns:p="http://schemas.openxmlformats.org/presentationml/2006/main">
+  <p:cSld>
+    <p:spTree>
+      <p:nvGrpSpPr>
+        <p:cNvPr id="1" name=""/>
+        <p:cNvGrpSpPr/>
+        <p:nvPr/>
+      </p:nvGrpSpPr>
+      <p:grpSpPr>
+        <a:xfrm>
+          <a:off x="0" y="0"/>
+          <a:ext cx="0" cy="0"/>
+          <a:chOff x="0" y="0"/>
+          <a:chExt cx="0" cy="0"/>
+        </a:xfrm>
+      </p:grpSpPr>
+      <p:sp>
+        <p:nvSpPr>
+          <p:cNvPr id="2" name="Title 1"/>
+          <p:cNvSpPr>
+            <a:spLocks noGrp="1"/>
+          </p:cNvSpPr>
+          <p:nvPr>
+            <p:ph type="title"/>
+          </p:nvPr>
+        </p:nvSpPr>
+        <p:spPr/>
+        <p:txBody>
+          <a:bodyPr/>
+          <a:lstStyle/>
+          <a:p>
+            <a:r>
+              <a:rPr lang="en-IN" dirty="0"/>
+              <a:t>Values of Biodiversity</a:t>
+            </a:r>
+          </a:p>
+        </p:txBody>
+      </p:sp>
+      <p:sp>
+        <p:nvSpPr>
+          <p:cNvPr id="3" name="Content Placeholder 2"/>
+          <p:cNvSpPr>
+            <a:spLocks noGrp="1"/>
+          </p:cNvSpPr>
+          <p:nvPr>
+            <p:ph idx="1"/>
+          </p:nvPr>
+        </p:nvSpPr>
+        <p:spPr/>
+        <p:txBody>
+          <a:bodyPr/>
+          <a:lstStyle/>
+          <a:p>
+            <a:r>
+              <a:rPr lang="en-US" dirty="0" smtClean="0"/>
+              <a:t>Ethical Values</a:t>
+            </a:r>
+          </a:p>
+          <a:p>
+            <a:pPr lvl="1"/>
+            <a:r>
+              <a:rPr lang="en-US" dirty="0" smtClean="0"/>
+              <a:t>In this species may or may not use but the existence of these will give us pleasure.</a:t>
+            </a:r>
+          </a:p>
+          <a:p>
+            <a:pPr lvl="1"/>
+            <a:r>
+              <a:rPr lang="en-US" dirty="0" smtClean="0"/>
+              <a:t>It involves issues like “All life must be preserved”.</a:t>
+            </a:r>
+          </a:p>
+          <a:p>
+            <a:pPr lvl="1"/>
+            <a:r>
+              <a:rPr lang="en-US" dirty="0" err="1" smtClean="0"/>
+              <a:t>Eg</a:t>
+            </a:r>
+            <a:r>
+              <a:rPr lang="en-US" dirty="0" smtClean="0"/>
+              <a:t>:</a:t>
+            </a:r>
+          </a:p>
+          <a:p>
+            <a:pPr lvl="2"/>
+            <a:r>
+              <a:rPr lang="en-US" dirty="0" smtClean="0"/>
+              <a:t>River ganga worship</a:t>
+            </a:r>
+          </a:p>
+          <a:p>
+            <a:pPr lvl="2"/>
+            <a:r>
+              <a:rPr lang="en-US" dirty="0" err="1" smtClean="0"/>
+              <a:t>Vembu</a:t>
+            </a:r>
+            <a:r>
+              <a:rPr lang="en-US" dirty="0" smtClean="0"/>
+              <a:t>, </a:t>
+            </a:r>
+            <a:r>
+              <a:rPr lang="en-US" dirty="0" err="1" smtClean="0"/>
+              <a:t>Tulsi</a:t>
+            </a:r>
+            <a:r>
+              <a:rPr lang="en-US" dirty="0" smtClean="0"/>
+              <a:t> worship</a:t>
+            </a:r>
+            <a:endParaRPr lang="en-US" dirty="0"/>
+          </a:p>
+          <a:p>
+            <a:pPr lvl="2"/>
+            <a:r>
+              <a:rPr lang="en-US" dirty="0" smtClean="0"/>
+              <a:t>Wild life existence </a:t>
+            </a:r>
+          </a:p>
+        </p:txBody>
+      </p:sp>
+    </p:spTree>
+    <p:extLst>
+      <p:ext uri="{BB962C8B-B14F-4D97-AF65-F5344CB8AC3E}">
+        <p14:creationId xmlns:p14="http://schemas.microsoft.com/office/powerpoint/2010/main" val="3505280383"/>
+      </p:ext>
+    </p:extLst>
+  </p:cSld>
+  <p:clrMapOvr>
+    <a:masterClrMapping/>
+  </p:clrMapOvr>
+</p:sld>
+</file>
+
+<file path=ppt/slides/slide97.xml><?xml version="1.0" encoding="utf-8"?>
+<p:sld xmlns:a="http://schemas.openxmlformats.org/drawingml/2006/main" xmlns:r="http://schemas.openxmlformats.org/officeDocument/2006/relationships" xmlns:p="http://schemas.openxmlformats.org/presentationml/2006/main">
+  <p:cSld>
+    <p:spTree>
+      <p:nvGrpSpPr>
+        <p:cNvPr id="1" name=""/>
+        <p:cNvGrpSpPr/>
+        <p:nvPr/>
+      </p:nvGrpSpPr>
+      <p:grpSpPr>
+        <a:xfrm>
+          <a:off x="0" y="0"/>
+          <a:ext cx="0" cy="0"/>
+          <a:chOff x="0" y="0"/>
+          <a:chExt cx="0" cy="0"/>
+        </a:xfrm>
+      </p:grpSpPr>
+      <p:sp>
+        <p:nvSpPr>
+          <p:cNvPr id="2" name="Title 1"/>
+          <p:cNvSpPr>
+            <a:spLocks noGrp="1"/>
+          </p:cNvSpPr>
+          <p:nvPr>
+            <p:ph type="title"/>
+          </p:nvPr>
+        </p:nvSpPr>
+        <p:spPr/>
+        <p:txBody>
+          <a:bodyPr/>
+          <a:lstStyle/>
+          <a:p>
+            <a:r>
+              <a:rPr lang="en-IN" dirty="0"/>
+              <a:t>Values of Biodiversity</a:t>
+            </a:r>
+          </a:p>
+        </p:txBody>
+      </p:sp>
+      <p:sp>
+        <p:nvSpPr>
+          <p:cNvPr id="3" name="Content Placeholder 2"/>
+          <p:cNvSpPr>
+            <a:spLocks noGrp="1"/>
+          </p:cNvSpPr>
+          <p:nvPr>
+            <p:ph idx="1"/>
+          </p:nvPr>
+        </p:nvSpPr>
+        <p:spPr/>
+        <p:txBody>
+          <a:bodyPr>
+            <a:normAutofit lnSpcReduction="10000"/>
+          </a:bodyPr>
+          <a:lstStyle/>
+          <a:p>
+            <a:r>
+              <a:rPr lang="en-US" dirty="0" smtClean="0"/>
+              <a:t>Aesthetic Values</a:t>
+            </a:r>
+          </a:p>
+          <a:p>
+            <a:pPr lvl="1"/>
+            <a:r>
+              <a:rPr lang="en-US" dirty="0" smtClean="0"/>
+              <a:t>Admiring beauty of the nature and protect it.</a:t>
+            </a:r>
+          </a:p>
+          <a:p>
+            <a:pPr lvl="1"/>
+            <a:r>
+              <a:rPr lang="en-US" dirty="0" smtClean="0"/>
+              <a:t>By protecting this aesthetic value it gives the indirect economic growth.</a:t>
+            </a:r>
+          </a:p>
+          <a:p>
+            <a:pPr lvl="1"/>
+            <a:r>
+              <a:rPr lang="en-US" dirty="0" err="1" smtClean="0"/>
+              <a:t>Eg</a:t>
+            </a:r>
+            <a:r>
+              <a:rPr lang="en-US" dirty="0" smtClean="0"/>
+              <a:t>:</a:t>
+            </a:r>
+          </a:p>
+          <a:p>
+            <a:pPr lvl="2"/>
+            <a:r>
+              <a:rPr lang="en-US" dirty="0" smtClean="0"/>
+              <a:t>Eco- Tourism</a:t>
+            </a:r>
+          </a:p>
+          <a:p>
+            <a:pPr lvl="3"/>
+            <a:r>
+              <a:rPr lang="en-US" dirty="0" smtClean="0"/>
+              <a:t>Enjoying wild life</a:t>
+            </a:r>
+          </a:p>
+          <a:p>
+            <a:pPr lvl="3"/>
+            <a:r>
+              <a:rPr lang="en-US" dirty="0" smtClean="0"/>
+              <a:t>Camping and Living</a:t>
+            </a:r>
+          </a:p>
+          <a:p>
+            <a:r>
+              <a:rPr lang="en-US" dirty="0" smtClean="0"/>
+              <a:t>Option Value</a:t>
+            </a:r>
+          </a:p>
+          <a:p>
+            <a:pPr lvl="1"/>
+            <a:r>
+              <a:rPr lang="en-US" dirty="0" smtClean="0"/>
+              <a:t>Unknown values of biodiversity</a:t>
+            </a:r>
+            <a:endParaRPr lang="en-US" dirty="0"/>
+          </a:p>
+          <a:p>
+            <a:pPr lvl="3"/>
+            <a:endParaRPr lang="en-US" dirty="0" smtClean="0"/>
+          </a:p>
+        </p:txBody>
+      </p:sp>
+    </p:spTree>
+    <p:extLst>
+      <p:ext uri="{BB962C8B-B14F-4D97-AF65-F5344CB8AC3E}">
+        <p14:creationId xmlns:p14="http://schemas.microsoft.com/office/powerpoint/2010/main" val="989195436"/>
+      </p:ext>
+    </p:extLst>
+  </p:cSld>
+  <p:clrMapOvr>
+    <a:masterClrMapping/>
+  </p:clrMapOvr>
+</p:sld>
+</file>
+
+<file path=ppt/slides/slide98.xml><?xml version="1.0" encoding="utf-8"?>
+<p:sld xmlns:a="http://schemas.openxmlformats.org/drawingml/2006/main" xmlns:r="http://schemas.openxmlformats.org/officeDocument/2006/relationships" xmlns:p="http://schemas.openxmlformats.org/presentationml/2006/main">
+  <p:cSld>
+    <p:spTree>
+      <p:nvGrpSpPr>
+        <p:cNvPr id="1" name=""/>
+        <p:cNvGrpSpPr/>
+        <p:nvPr/>
+      </p:nvGrpSpPr>
+      <p:grpSpPr>
+        <a:xfrm>
+          <a:off x="0" y="0"/>
+          <a:ext cx="0" cy="0"/>
+          <a:chOff x="0" y="0"/>
+          <a:chExt cx="0" cy="0"/>
+        </a:xfrm>
+      </p:grpSpPr>
+      <p:sp>
+        <p:nvSpPr>
+          <p:cNvPr id="2" name="Title 1"/>
+          <p:cNvSpPr>
+            <a:spLocks noGrp="1"/>
+          </p:cNvSpPr>
+          <p:nvPr>
+            <p:ph type="title"/>
+          </p:nvPr>
+        </p:nvSpPr>
+        <p:spPr/>
+        <p:txBody>
+          <a:bodyPr/>
+          <a:lstStyle/>
+          <a:p>
+            <a:r>
+              <a:rPr lang="en-US" dirty="0" smtClean="0"/>
+              <a:t>Bio Diversity at Global Level</a:t>
+            </a:r>
+            <a:endParaRPr lang="en-IN" dirty="0"/>
+          </a:p>
+        </p:txBody>
+      </p:sp>
+      <p:sp>
+        <p:nvSpPr>
+          <p:cNvPr id="3" name="Content Placeholder 2"/>
+          <p:cNvSpPr>
+            <a:spLocks noGrp="1"/>
+          </p:cNvSpPr>
+          <p:nvPr>
+            <p:ph idx="1"/>
+          </p:nvPr>
+        </p:nvSpPr>
+        <p:spPr/>
+        <p:txBody>
+          <a:bodyPr/>
+          <a:lstStyle/>
+          <a:p>
+            <a:r>
+              <a:rPr lang="en-US" dirty="0" smtClean="0"/>
+              <a:t>1.75 million species are discovered.</a:t>
+            </a:r>
+          </a:p>
+          <a:p>
+            <a:endParaRPr lang="en-IN" dirty="0"/>
+          </a:p>
+        </p:txBody>
+      </p:sp>
+      <p:graphicFrame>
+        <p:nvGraphicFramePr>
+          <p:cNvPr id="4" name="Table 3"/>
+          <p:cNvGraphicFramePr>
+            <a:graphicFrameLocks noGrp="1"/>
+          </p:cNvGraphicFramePr>
+          <p:nvPr>
+            <p:extLst>
+              <p:ext uri="{D42A27DB-BD31-4B8C-83A1-F6EECF244321}">
+                <p14:modId xmlns:p14="http://schemas.microsoft.com/office/powerpoint/2010/main" val="4256907383"/>
+              </p:ext>
+            </p:extLst>
+          </p:nvPr>
+        </p:nvGraphicFramePr>
+        <p:xfrm>
+          <a:off x="1331640" y="2492896"/>
+          <a:ext cx="6096000" cy="2595880"/>
+        </p:xfrm>
+        <a:graphic>
+          <a:graphicData uri="http://schemas.openxmlformats.org/drawingml/2006/table">
+            <a:tbl>
+              <a:tblPr firstRow="1" bandRow="1">
+                <a:tableStyleId>{5C22544A-7EE6-4342-B048-85BDC9FD1C3A}</a:tableStyleId>
+              </a:tblPr>
+              <a:tblGrid>
+                <a:gridCol w="2032000"/>
+                <a:gridCol w="2032000"/>
+                <a:gridCol w="2032000"/>
+              </a:tblGrid>
+              <a:tr h="370840">
+                <a:tc>
+                  <a:txBody>
+                    <a:bodyPr/>
+                    <a:lstStyle/>
+                    <a:p>
+                      <a:r>
+                        <a:rPr lang="en-US" dirty="0" smtClean="0"/>
+                        <a:t>Kingdom</a:t>
+                      </a:r>
+                      <a:endParaRPr lang="en-IN" dirty="0"/>
+                    </a:p>
+                  </a:txBody>
+                  <a:tcPr/>
+                </a:tc>
+                <a:tc>
+                  <a:txBody>
+                    <a:bodyPr/>
+                    <a:lstStyle/>
+                    <a:p>
+                      <a:r>
+                        <a:rPr lang="en-US" dirty="0" smtClean="0"/>
+                        <a:t>Described</a:t>
+                      </a:r>
+                      <a:r>
+                        <a:rPr lang="en-US" baseline="0" dirty="0" smtClean="0"/>
+                        <a:t> Species</a:t>
+                      </a:r>
+                      <a:endParaRPr lang="en-IN" dirty="0"/>
+                    </a:p>
+                  </a:txBody>
+                  <a:tcPr/>
+                </a:tc>
+                <a:tc>
+                  <a:txBody>
+                    <a:bodyPr/>
+                    <a:lstStyle/>
+                    <a:p>
+                      <a:r>
+                        <a:rPr lang="en-US" dirty="0" smtClean="0"/>
+                        <a:t>Estimated Total</a:t>
+                      </a:r>
+                      <a:endParaRPr lang="en-IN" dirty="0"/>
+                    </a:p>
+                  </a:txBody>
+                  <a:tcPr/>
+                </a:tc>
+              </a:tr>
+              <a:tr h="370840">
+                <a:tc>
+                  <a:txBody>
+                    <a:bodyPr/>
+                    <a:lstStyle/>
+                    <a:p>
+                      <a:r>
+                        <a:rPr lang="en-US" dirty="0" smtClean="0"/>
+                        <a:t>Bacteria</a:t>
+                      </a:r>
+                      <a:endParaRPr lang="en-IN" dirty="0"/>
+                    </a:p>
+                  </a:txBody>
+                  <a:tcPr/>
+                </a:tc>
+                <a:tc>
+                  <a:txBody>
+                    <a:bodyPr/>
+                    <a:lstStyle/>
+                    <a:p>
+                      <a:r>
+                        <a:rPr lang="en-US" dirty="0" smtClean="0"/>
+                        <a:t>4000</a:t>
+                      </a:r>
+                      <a:endParaRPr lang="en-IN" dirty="0"/>
+                    </a:p>
+                  </a:txBody>
+                  <a:tcPr/>
+                </a:tc>
+                <a:tc>
+                  <a:txBody>
+                    <a:bodyPr/>
+                    <a:lstStyle/>
+                    <a:p>
+                      <a:r>
+                        <a:rPr lang="en-US" dirty="0" smtClean="0"/>
+                        <a:t>1000000</a:t>
+                      </a:r>
+                      <a:endParaRPr lang="en-IN" dirty="0"/>
+                    </a:p>
+                  </a:txBody>
+                  <a:tcPr/>
+                </a:tc>
+              </a:tr>
+              <a:tr h="370840">
+                <a:tc>
+                  <a:txBody>
+                    <a:bodyPr/>
+                    <a:lstStyle/>
+                    <a:p>
+                      <a:r>
+                        <a:rPr lang="en-US" dirty="0" smtClean="0"/>
+                        <a:t>Algae and protozoa</a:t>
+                      </a:r>
+                      <a:endParaRPr lang="en-IN" dirty="0"/>
+                    </a:p>
+                  </a:txBody>
+                  <a:tcPr/>
+                </a:tc>
+                <a:tc>
+                  <a:txBody>
+                    <a:bodyPr/>
+                    <a:lstStyle/>
+                    <a:p>
+                      <a:r>
+                        <a:rPr lang="en-US" dirty="0" smtClean="0"/>
+                        <a:t>80000</a:t>
+                      </a:r>
+                      <a:endParaRPr lang="en-IN" dirty="0"/>
+                    </a:p>
+                  </a:txBody>
+                  <a:tcPr/>
+                </a:tc>
+                <a:tc>
+                  <a:txBody>
+                    <a:bodyPr/>
+                    <a:lstStyle/>
+                    <a:p>
+                      <a:r>
+                        <a:rPr lang="en-US" dirty="0" smtClean="0"/>
+                        <a:t>600000</a:t>
+                      </a:r>
+                      <a:endParaRPr lang="en-IN" dirty="0"/>
+                    </a:p>
+                  </a:txBody>
+                  <a:tcPr/>
+                </a:tc>
+              </a:tr>
+              <a:tr h="370840">
+                <a:tc>
+                  <a:txBody>
+                    <a:bodyPr/>
+                    <a:lstStyle/>
+                    <a:p>
+                      <a:r>
+                        <a:rPr lang="en-US" dirty="0" smtClean="0"/>
+                        <a:t>Fungi</a:t>
+                      </a:r>
+                      <a:endParaRPr lang="en-IN" dirty="0"/>
+                    </a:p>
+                  </a:txBody>
+                  <a:tcPr/>
+                </a:tc>
+                <a:tc>
+                  <a:txBody>
+                    <a:bodyPr/>
+                    <a:lstStyle/>
+                    <a:p>
+                      <a:r>
+                        <a:rPr lang="en-US" dirty="0" smtClean="0"/>
+                        <a:t>70000</a:t>
+                      </a:r>
+                      <a:endParaRPr lang="en-IN" dirty="0"/>
+                    </a:p>
+                  </a:txBody>
+                  <a:tcPr/>
+                </a:tc>
+                <a:tc>
+                  <a:txBody>
+                    <a:bodyPr/>
+                    <a:lstStyle/>
+                    <a:p>
+                      <a:r>
+                        <a:rPr lang="en-US" dirty="0" smtClean="0"/>
+                        <a:t>10500000</a:t>
+                      </a:r>
+                      <a:endParaRPr lang="en-IN" dirty="0"/>
+                    </a:p>
+                  </a:txBody>
+                  <a:tcPr/>
+                </a:tc>
+              </a:tr>
+              <a:tr h="370840">
+                <a:tc>
+                  <a:txBody>
+                    <a:bodyPr/>
+                    <a:lstStyle/>
+                    <a:p>
+                      <a:r>
+                        <a:rPr lang="en-US" dirty="0" smtClean="0"/>
+                        <a:t>Animals</a:t>
+                      </a:r>
+                      <a:endParaRPr lang="en-IN" dirty="0"/>
+                    </a:p>
+                  </a:txBody>
+                  <a:tcPr/>
+                </a:tc>
+                <a:tc>
+                  <a:txBody>
+                    <a:bodyPr/>
+                    <a:lstStyle/>
+                    <a:p>
+                      <a:r>
+                        <a:rPr lang="en-US" dirty="0" smtClean="0"/>
+                        <a:t>1320000</a:t>
+                      </a:r>
+                      <a:endParaRPr lang="en-IN" dirty="0"/>
+                    </a:p>
+                  </a:txBody>
+                  <a:tcPr/>
+                </a:tc>
+                <a:tc>
+                  <a:txBody>
+                    <a:bodyPr/>
+                    <a:lstStyle/>
+                    <a:p>
+                      <a:r>
+                        <a:rPr lang="en-US" dirty="0" smtClean="0"/>
+                        <a:t>10000000</a:t>
+                      </a:r>
+                      <a:endParaRPr lang="en-IN" dirty="0"/>
+                    </a:p>
+                  </a:txBody>
+                  <a:tcPr/>
+                </a:tc>
+              </a:tr>
+              <a:tr h="370840">
+                <a:tc>
+                  <a:txBody>
+                    <a:bodyPr/>
+                    <a:lstStyle/>
+                    <a:p>
+                      <a:r>
+                        <a:rPr lang="en-US" dirty="0" smtClean="0"/>
+                        <a:t>Planets</a:t>
+                      </a:r>
+                      <a:endParaRPr lang="en-IN" dirty="0"/>
+                    </a:p>
+                  </a:txBody>
+                  <a:tcPr/>
+                </a:tc>
+                <a:tc>
+                  <a:txBody>
+                    <a:bodyPr/>
+                    <a:lstStyle/>
+                    <a:p>
+                      <a:r>
+                        <a:rPr lang="en-US" dirty="0" smtClean="0"/>
+                        <a:t>270000</a:t>
+                      </a:r>
+                      <a:endParaRPr lang="en-IN" dirty="0"/>
+                    </a:p>
+                  </a:txBody>
+                  <a:tcPr/>
+                </a:tc>
+                <a:tc>
+                  <a:txBody>
+                    <a:bodyPr/>
+                    <a:lstStyle/>
+                    <a:p>
+                      <a:r>
+                        <a:rPr lang="en-US" dirty="0" smtClean="0"/>
+                        <a:t>3000000</a:t>
+                      </a:r>
+                      <a:endParaRPr lang="en-IN" dirty="0"/>
+                    </a:p>
+                  </a:txBody>
+                  <a:tcPr/>
+                </a:tc>
+              </a:tr>
+              <a:tr h="370840">
+                <a:tc>
+                  <a:txBody>
+                    <a:bodyPr/>
+                    <a:lstStyle/>
+                    <a:p>
+                      <a:r>
+                        <a:rPr lang="en-US" dirty="0" smtClean="0"/>
+                        <a:t>Total</a:t>
+                      </a:r>
+                      <a:endParaRPr lang="en-IN" dirty="0"/>
+                    </a:p>
+                  </a:txBody>
+                  <a:tcPr/>
+                </a:tc>
+                <a:tc>
+                  <a:txBody>
+                    <a:bodyPr/>
+                    <a:lstStyle/>
+                    <a:p>
+                      <a:r>
+                        <a:rPr lang="en-US" dirty="0" smtClean="0"/>
+                        <a:t>1744000</a:t>
+                      </a:r>
+                      <a:endParaRPr lang="en-IN" dirty="0"/>
+                    </a:p>
+                  </a:txBody>
+                  <a:tcPr/>
+                </a:tc>
+                <a:tc>
+                  <a:txBody>
+                    <a:bodyPr/>
+                    <a:lstStyle/>
+                    <a:p>
+                      <a:r>
+                        <a:rPr lang="en-US" dirty="0" smtClean="0"/>
+                        <a:t>14000000</a:t>
+                      </a:r>
+                      <a:endParaRPr lang="en-IN" dirty="0"/>
+                    </a:p>
+                  </a:txBody>
+                  <a:tcPr/>
+                </a:tc>
+              </a:tr>
+            </a:tbl>
+          </a:graphicData>
+        </a:graphic>
+      </p:graphicFrame>
+    </p:spTree>
+    <p:extLst>
+      <p:ext uri="{BB962C8B-B14F-4D97-AF65-F5344CB8AC3E}">
+        <p14:creationId xmlns:p14="http://schemas.microsoft.com/office/powerpoint/2010/main" val="2990557647"/>
+      </p:ext>
+    </p:extLst>
+  </p:cSld>
+  <p:clrMapOvr>
+    <a:masterClrMapping/>
+  </p:clrMapOvr>
+</p:sld>
+</file>
+
+<file path=ppt/slides/slide99.xml><?xml version="1.0" encoding="utf-8"?>
+<p:sld xmlns:a="http://schemas.openxmlformats.org/drawingml/2006/main" xmlns:r="http://schemas.openxmlformats.org/officeDocument/2006/relationships" xmlns:p="http://schemas.openxmlformats.org/presentationml/2006/main">
+  <p:cSld>
+    <p:spTree>
+      <p:nvGrpSpPr>
+        <p:cNvPr id="1" name=""/>
+        <p:cNvGrpSpPr/>
+        <p:nvPr/>
+      </p:nvGrpSpPr>
+      <p:grpSpPr>
+        <a:xfrm>
+          <a:off x="0" y="0"/>
+          <a:ext cx="0" cy="0"/>
+          <a:chOff x="0" y="0"/>
+          <a:chExt cx="0" cy="0"/>
+        </a:xfrm>
+      </p:grpSpPr>
+      <p:sp>
+        <p:nvSpPr>
+          <p:cNvPr id="2" name="Title 1"/>
+          <p:cNvSpPr>
+            <a:spLocks noGrp="1"/>
+          </p:cNvSpPr>
+          <p:nvPr>
+            <p:ph type="title"/>
+          </p:nvPr>
+        </p:nvSpPr>
+        <p:spPr/>
+        <p:txBody>
+          <a:bodyPr/>
+          <a:lstStyle/>
+          <a:p>
+            <a:r>
+              <a:rPr lang="en-US" dirty="0" smtClean="0"/>
+              <a:t>Bio Diversity at Global Level</a:t>
+            </a:r>
+            <a:endParaRPr lang="en-IN" dirty="0"/>
+          </a:p>
+        </p:txBody>
+      </p:sp>
+      <p:sp>
+        <p:nvSpPr>
+          <p:cNvPr id="3" name="Content Placeholder 2"/>
+          <p:cNvSpPr>
+            <a:spLocks noGrp="1"/>
+          </p:cNvSpPr>
+          <p:nvPr>
+            <p:ph idx="1"/>
+          </p:nvPr>
+        </p:nvSpPr>
+        <p:spPr/>
+        <p:txBody>
+          <a:bodyPr/>
+          <a:lstStyle/>
+          <a:p>
+            <a:r>
+              <a:rPr lang="en-US" dirty="0" smtClean="0"/>
+              <a:t>1.75 million species are discovered.</a:t>
+            </a:r>
+          </a:p>
+          <a:p>
+            <a:r>
+              <a:rPr lang="en-US" dirty="0" smtClean="0"/>
+              <a:t>71 % of earth is covered by water.</a:t>
+            </a:r>
+          </a:p>
+          <a:p>
+            <a:r>
+              <a:rPr lang="en-US" dirty="0" smtClean="0"/>
+              <a:t>2.3 % is non saline water.</a:t>
+            </a:r>
+          </a:p>
+          <a:p>
+            <a:r>
+              <a:rPr lang="en-US" dirty="0" smtClean="0"/>
+              <a:t>2/3 is locked in ice</a:t>
+            </a:r>
+          </a:p>
+          <a:p>
+            <a:r>
+              <a:rPr lang="en-US" dirty="0" smtClean="0"/>
+              <a:t>1/3 is ground water</a:t>
+            </a:r>
+          </a:p>
+          <a:p>
+            <a:r>
+              <a:rPr lang="en-US" dirty="0" smtClean="0"/>
+              <a:t>40 % fish in fresh water</a:t>
+            </a:r>
+          </a:p>
+          <a:p>
+            <a:r>
+              <a:rPr lang="en-US" dirty="0" smtClean="0"/>
+              <a:t>29 % covered </a:t>
+            </a:r>
+            <a:r>
+              <a:rPr lang="en-US" smtClean="0"/>
+              <a:t>by human</a:t>
+            </a:r>
+            <a:endParaRPr lang="en-US" dirty="0" smtClean="0"/>
+          </a:p>
+          <a:p>
+            <a:endParaRPr lang="en-IN" dirty="0"/>
+          </a:p>
+        </p:txBody>
+      </p:sp>
+    </p:spTree>
+    <p:extLst>
+      <p:ext uri="{BB962C8B-B14F-4D97-AF65-F5344CB8AC3E}">
+        <p14:creationId xmlns:p14="http://schemas.microsoft.com/office/powerpoint/2010/main" val="1613791257"/>
+      </p:ext>
+    </p:extLst>
+  </p:cSld>
+  <p:clrMapOvr>
+    <a:masterClrMapping/>
+  </p:clrMapOvr>
 </p:sld>
 </file>
 

</xml_diff>